<commit_message>
Added: Example for Layer; Configuration File PLM added.
</commit_message>
<xml_diff>
--- a/tools/projmgr/docs/Manual/images/overview.pptx
+++ b/tools/projmgr/docs/Manual/images/overview.pptx
@@ -5,16 +5,17 @@
     <p:sldMasterId id="2147483661" r:id="rId1"/>
   </p:sldMasterIdLst>
   <p:notesMasterIdLst>
-    <p:notesMasterId r:id="rId6"/>
+    <p:notesMasterId r:id="rId7"/>
   </p:notesMasterIdLst>
   <p:handoutMasterIdLst>
-    <p:handoutMasterId r:id="rId7"/>
+    <p:handoutMasterId r:id="rId8"/>
   </p:handoutMasterIdLst>
   <p:sldIdLst>
     <p:sldId id="345" r:id="rId2"/>
     <p:sldId id="14964" r:id="rId3"/>
     <p:sldId id="14961" r:id="rId4"/>
     <p:sldId id="14942" r:id="rId5"/>
+    <p:sldId id="14535" r:id="rId6"/>
   </p:sldIdLst>
   <p:sldSz cx="12192000" cy="6858000"/>
   <p:notesSz cx="6858000" cy="9144000"/>
@@ -294,7 +295,7 @@
           <a:p>
             <a:fld id="{008FFADC-39A7-449E-8C68-8776E6FB3C1A}" type="datetimeFigureOut">
               <a:rPr lang="en-GB" smtClean="0"/>
-              <a:t>23/12/2021</a:t>
+              <a:t>12/01/2022</a:t>
             </a:fld>
             <a:endParaRPr lang="en-GB"/>
           </a:p>
@@ -471,7 +472,7 @@
           <a:p>
             <a:fld id="{30B9BAAB-B703-4BB5-9D08-B460FC03C23A}" type="datetimeFigureOut">
               <a:rPr lang="en-GB" smtClean="0"/>
-              <a:t>23/12/2021</a:t>
+              <a:t>12/01/2022</a:t>
             </a:fld>
             <a:endParaRPr lang="en-GB"/>
           </a:p>
@@ -1688,6 +1689,96 @@
     <p:extLst>
       <p:ext uri="{BB962C8B-B14F-4D97-AF65-F5344CB8AC3E}">
         <p14:creationId xmlns:p14="http://schemas.microsoft.com/office/powerpoint/2010/main" val="2513220202"/>
+      </p:ext>
+    </p:extLst>
+  </p:cSld>
+  <p:clrMapOvr>
+    <a:masterClrMapping/>
+  </p:clrMapOvr>
+</p:notes>
+</file>
+
+<file path=ppt/notesSlides/notesSlide2.xml><?xml version="1.0" encoding="utf-8"?>
+<p:notes xmlns:a="http://schemas.openxmlformats.org/drawingml/2006/main" xmlns:r="http://schemas.openxmlformats.org/officeDocument/2006/relationships" xmlns:p="http://schemas.openxmlformats.org/presentationml/2006/main">
+  <p:cSld>
+    <p:spTree>
+      <p:nvGrpSpPr>
+        <p:cNvPr id="1" name=""/>
+        <p:cNvGrpSpPr/>
+        <p:nvPr/>
+      </p:nvGrpSpPr>
+      <p:grpSpPr>
+        <a:xfrm>
+          <a:off x="0" y="0"/>
+          <a:ext cx="0" cy="0"/>
+          <a:chOff x="0" y="0"/>
+          <a:chExt cx="0" cy="0"/>
+        </a:xfrm>
+      </p:grpSpPr>
+      <p:sp>
+        <p:nvSpPr>
+          <p:cNvPr id="2" name="Slide Image Placeholder 1"/>
+          <p:cNvSpPr>
+            <a:spLocks noGrp="1" noRot="1" noChangeAspect="1"/>
+          </p:cNvSpPr>
+          <p:nvPr>
+            <p:ph type="sldImg"/>
+          </p:nvPr>
+        </p:nvSpPr>
+        <p:spPr/>
+      </p:sp>
+      <p:sp>
+        <p:nvSpPr>
+          <p:cNvPr id="3" name="Notes Placeholder 2"/>
+          <p:cNvSpPr>
+            <a:spLocks noGrp="1"/>
+          </p:cNvSpPr>
+          <p:nvPr>
+            <p:ph type="body" idx="1"/>
+          </p:nvPr>
+        </p:nvSpPr>
+        <p:spPr/>
+        <p:txBody>
+          <a:bodyPr/>
+          <a:lstStyle/>
+          <a:p>
+            <a:endParaRPr lang="en-GB"/>
+          </a:p>
+        </p:txBody>
+      </p:sp>
+      <p:sp>
+        <p:nvSpPr>
+          <p:cNvPr id="4" name="Slide Number Placeholder 3"/>
+          <p:cNvSpPr>
+            <a:spLocks noGrp="1"/>
+          </p:cNvSpPr>
+          <p:nvPr>
+            <p:ph type="sldNum" sz="quarter" idx="5"/>
+          </p:nvPr>
+        </p:nvSpPr>
+        <p:spPr/>
+        <p:txBody>
+          <a:bodyPr/>
+          <a:lstStyle/>
+          <a:p>
+            <a:pPr>
+              <a:defRPr/>
+            </a:pPr>
+            <a:fld id="{3B16354E-6974-4833-AB87-3220A0835E84}" type="slidenum">
+              <a:rPr lang="en-US" altLang="en-US" smtClean="0"/>
+              <a:pPr>
+                <a:defRPr/>
+              </a:pPr>
+              <a:t>5</a:t>
+            </a:fld>
+            <a:endParaRPr lang="en-US" altLang="en-US"/>
+          </a:p>
+        </p:txBody>
+      </p:sp>
+    </p:spTree>
+    <p:extLst>
+      <p:ext uri="{BB962C8B-B14F-4D97-AF65-F5344CB8AC3E}">
+        <p14:creationId xmlns:p14="http://schemas.microsoft.com/office/powerpoint/2010/main" val="2475493267"/>
       </p:ext>
     </p:extLst>
   </p:cSld>
@@ -18605,6 +18696,3704 @@
   <p:clrMapOvr>
     <a:masterClrMapping/>
   </p:clrMapOvr>
+</p:sld>
+</file>
+
+<file path=ppt/slides/slide5.xml><?xml version="1.0" encoding="utf-8"?>
+<p:sld xmlns:a="http://schemas.openxmlformats.org/drawingml/2006/main" xmlns:r="http://schemas.openxmlformats.org/officeDocument/2006/relationships" xmlns:p="http://schemas.openxmlformats.org/presentationml/2006/main">
+  <p:cSld>
+    <p:spTree>
+      <p:nvGrpSpPr>
+        <p:cNvPr id="1" name=""/>
+        <p:cNvGrpSpPr/>
+        <p:nvPr/>
+      </p:nvGrpSpPr>
+      <p:grpSpPr>
+        <a:xfrm>
+          <a:off x="0" y="0"/>
+          <a:ext cx="0" cy="0"/>
+          <a:chOff x="0" y="0"/>
+          <a:chExt cx="0" cy="0"/>
+        </a:xfrm>
+      </p:grpSpPr>
+      <p:sp>
+        <p:nvSpPr>
+          <p:cNvPr id="54" name="Rectangle 53">
+            <a:extLst>
+              <a:ext uri="{FF2B5EF4-FFF2-40B4-BE49-F238E27FC236}">
+                <a16:creationId xmlns:a16="http://schemas.microsoft.com/office/drawing/2014/main" id="{708715B0-CAF1-45CB-B8CE-F3EE46DD60CB}"/>
+              </a:ext>
+            </a:extLst>
+          </p:cNvPr>
+          <p:cNvSpPr/>
+          <p:nvPr/>
+        </p:nvSpPr>
+        <p:spPr>
+          <a:xfrm>
+            <a:off x="7092175" y="2935268"/>
+            <a:ext cx="2235200" cy="1187998"/>
+          </a:xfrm>
+          <a:prstGeom prst="rect">
+            <a:avLst/>
+          </a:prstGeom>
+          <a:solidFill>
+            <a:schemeClr val="accent1">
+              <a:lumMod val="40000"/>
+              <a:lumOff val="60000"/>
+              <a:alpha val="40000"/>
+            </a:schemeClr>
+          </a:solidFill>
+          <a:ln w="9525" cap="flat" cmpd="sng" algn="ctr">
+            <a:noFill/>
+            <a:prstDash val="solid"/>
+          </a:ln>
+          <a:effectLst/>
+        </p:spPr>
+        <p:txBody>
+          <a:bodyPr vert="vert270" lIns="36003" tIns="45723" rIns="91444" bIns="45723" rtlCol="0" anchor="t"/>
+          <a:lstStyle/>
+          <a:p>
+            <a:pPr marL="0" marR="0" lvl="0" indent="0" algn="ctr" defTabSz="457210" rtl="0" eaLnBrk="1" fontAlgn="auto" latinLnBrk="0" hangingPunct="1">
+              <a:lnSpc>
+                <a:spcPts val="1700"/>
+              </a:lnSpc>
+              <a:spcBef>
+                <a:spcPts val="0"/>
+              </a:spcBef>
+              <a:spcAft>
+                <a:spcPts val="0"/>
+              </a:spcAft>
+              <a:buClrTx/>
+              <a:buSzTx/>
+              <a:buFontTx/>
+              <a:buNone/>
+              <a:tabLst/>
+              <a:defRPr/>
+            </a:pPr>
+            <a:r>
+              <a:rPr kumimoji="0" lang="en-US" sz="1600" b="0" i="0" u="none" strike="noStrike" kern="0" cap="none" spc="0" normalizeH="0" baseline="0" noProof="0" dirty="0">
+                <a:ln>
+                  <a:noFill/>
+                </a:ln>
+                <a:solidFill>
+                  <a:srgbClr val="000000"/>
+                </a:solidFill>
+                <a:effectLst/>
+                <a:uLnTx/>
+                <a:uFillTx/>
+                <a:latin typeface="+mn-lt"/>
+                <a:ea typeface="ＭＳ Ｐゴシック" panose="020B0600070205080204" pitchFamily="34" charset="-128"/>
+                <a:cs typeface="+mn-cs"/>
+              </a:rPr>
+              <a:t>RTOS Layer</a:t>
+            </a:r>
+            <a:endParaRPr kumimoji="0" lang="en-GB" sz="1600" b="0" i="0" u="none" strike="noStrike" kern="0" cap="none" spc="0" normalizeH="0" baseline="0" noProof="0" dirty="0">
+              <a:ln>
+                <a:noFill/>
+              </a:ln>
+              <a:solidFill>
+                <a:srgbClr val="000000"/>
+              </a:solidFill>
+              <a:effectLst/>
+              <a:uLnTx/>
+              <a:uFillTx/>
+              <a:latin typeface="+mn-lt"/>
+              <a:ea typeface="ＭＳ Ｐゴシック" panose="020B0600070205080204" pitchFamily="34" charset="-128"/>
+              <a:cs typeface="+mn-cs"/>
+            </a:endParaRPr>
+          </a:p>
+        </p:txBody>
+      </p:sp>
+      <p:sp>
+        <p:nvSpPr>
+          <p:cNvPr id="36" name="Rectangle 35">
+            <a:extLst>
+              <a:ext uri="{FF2B5EF4-FFF2-40B4-BE49-F238E27FC236}">
+                <a16:creationId xmlns:a16="http://schemas.microsoft.com/office/drawing/2014/main" id="{A7CCDBC5-D11D-4324-B973-8ABEE5641330}"/>
+              </a:ext>
+            </a:extLst>
+          </p:cNvPr>
+          <p:cNvSpPr/>
+          <p:nvPr/>
+        </p:nvSpPr>
+        <p:spPr>
+          <a:xfrm>
+            <a:off x="593835" y="1292136"/>
+            <a:ext cx="2376326" cy="743952"/>
+          </a:xfrm>
+          <a:prstGeom prst="rect">
+            <a:avLst/>
+          </a:prstGeom>
+          <a:solidFill>
+            <a:schemeClr val="accent4">
+              <a:lumMod val="75000"/>
+              <a:alpha val="20000"/>
+            </a:schemeClr>
+          </a:solidFill>
+          <a:ln w="9525" cap="flat" cmpd="sng" algn="ctr">
+            <a:noFill/>
+            <a:prstDash val="solid"/>
+          </a:ln>
+          <a:effectLst/>
+        </p:spPr>
+        <p:txBody>
+          <a:bodyPr vert="vert270" lIns="36003" tIns="45723" rIns="91444" bIns="45723" rtlCol="0" anchor="t"/>
+          <a:lstStyle/>
+          <a:p>
+            <a:pPr marL="0" marR="0" lvl="0" indent="0" algn="ctr" defTabSz="457210" rtl="0" eaLnBrk="1" fontAlgn="auto" latinLnBrk="0" hangingPunct="1">
+              <a:lnSpc>
+                <a:spcPts val="1700"/>
+              </a:lnSpc>
+              <a:spcBef>
+                <a:spcPts val="0"/>
+              </a:spcBef>
+              <a:spcAft>
+                <a:spcPts val="0"/>
+              </a:spcAft>
+              <a:buClrTx/>
+              <a:buSzTx/>
+              <a:buFontTx/>
+              <a:buNone/>
+              <a:tabLst/>
+              <a:defRPr/>
+            </a:pPr>
+            <a:r>
+              <a:rPr lang="en-US" sz="1600" kern="0">
+                <a:solidFill>
+                  <a:srgbClr val="000000"/>
+                </a:solidFill>
+                <a:latin typeface="+mn-lt"/>
+              </a:rPr>
+              <a:t>App</a:t>
+            </a:r>
+            <a:br>
+              <a:rPr kumimoji="0" lang="en-US" sz="1600" b="0" i="0" u="none" strike="noStrike" kern="0" cap="none" spc="0" normalizeH="0" baseline="0" noProof="0">
+                <a:ln>
+                  <a:noFill/>
+                </a:ln>
+                <a:solidFill>
+                  <a:srgbClr val="000000"/>
+                </a:solidFill>
+                <a:effectLst/>
+                <a:uLnTx/>
+                <a:uFillTx/>
+                <a:latin typeface="+mn-lt"/>
+                <a:ea typeface="ＭＳ Ｐゴシック" panose="020B0600070205080204" pitchFamily="34" charset="-128"/>
+                <a:cs typeface="+mn-cs"/>
+              </a:rPr>
+            </a:br>
+            <a:r>
+              <a:rPr kumimoji="0" lang="en-US" sz="1600" b="0" i="0" u="none" strike="noStrike" kern="0" cap="none" spc="0" normalizeH="0" baseline="0" noProof="0">
+                <a:ln>
+                  <a:noFill/>
+                </a:ln>
+                <a:solidFill>
+                  <a:srgbClr val="000000"/>
+                </a:solidFill>
+                <a:effectLst/>
+                <a:uLnTx/>
+                <a:uFillTx/>
+                <a:latin typeface="+mn-lt"/>
+                <a:ea typeface="ＭＳ Ｐゴシック" panose="020B0600070205080204" pitchFamily="34" charset="-128"/>
+                <a:cs typeface="+mn-cs"/>
+              </a:rPr>
+              <a:t>Layer</a:t>
+            </a:r>
+            <a:endParaRPr kumimoji="0" lang="en-GB" sz="1600" b="0" i="0" u="none" strike="noStrike" kern="0" cap="none" spc="0" normalizeH="0" baseline="0" noProof="0">
+              <a:ln>
+                <a:noFill/>
+              </a:ln>
+              <a:solidFill>
+                <a:srgbClr val="000000"/>
+              </a:solidFill>
+              <a:effectLst/>
+              <a:uLnTx/>
+              <a:uFillTx/>
+              <a:latin typeface="+mn-lt"/>
+              <a:ea typeface="ＭＳ Ｐゴシック" panose="020B0600070205080204" pitchFamily="34" charset="-128"/>
+              <a:cs typeface="+mn-cs"/>
+            </a:endParaRPr>
+          </a:p>
+        </p:txBody>
+      </p:sp>
+      <p:sp>
+        <p:nvSpPr>
+          <p:cNvPr id="3" name="Rectangle 2">
+            <a:extLst>
+              <a:ext uri="{FF2B5EF4-FFF2-40B4-BE49-F238E27FC236}">
+                <a16:creationId xmlns:a16="http://schemas.microsoft.com/office/drawing/2014/main" id="{4D20B3B5-0119-44EB-995F-8DCE7FBDB0BF}"/>
+              </a:ext>
+            </a:extLst>
+          </p:cNvPr>
+          <p:cNvSpPr/>
+          <p:nvPr/>
+        </p:nvSpPr>
+        <p:spPr>
+          <a:xfrm>
+            <a:off x="709127" y="6298163"/>
+            <a:ext cx="1754155" cy="345233"/>
+          </a:xfrm>
+          <a:prstGeom prst="rect">
+            <a:avLst/>
+          </a:prstGeom>
+          <a:solidFill>
+            <a:schemeClr val="bg1"/>
+          </a:solidFill>
+          <a:ln>
+            <a:noFill/>
+          </a:ln>
+        </p:spPr>
+        <p:style>
+          <a:lnRef idx="2">
+            <a:schemeClr val="accent1">
+              <a:shade val="50000"/>
+            </a:schemeClr>
+          </a:lnRef>
+          <a:fillRef idx="1">
+            <a:schemeClr val="accent1"/>
+          </a:fillRef>
+          <a:effectRef idx="0">
+            <a:schemeClr val="accent1"/>
+          </a:effectRef>
+          <a:fontRef idx="minor">
+            <a:schemeClr val="lt1"/>
+          </a:fontRef>
+        </p:style>
+        <p:txBody>
+          <a:bodyPr rtlCol="0" anchor="ctr"/>
+          <a:lstStyle/>
+          <a:p>
+            <a:pPr algn="ctr"/>
+            <a:endParaRPr lang="en-GB"/>
+          </a:p>
+        </p:txBody>
+      </p:sp>
+      <p:sp>
+        <p:nvSpPr>
+          <p:cNvPr id="24" name="Rectangle 23">
+            <a:extLst>
+              <a:ext uri="{FF2B5EF4-FFF2-40B4-BE49-F238E27FC236}">
+                <a16:creationId xmlns:a16="http://schemas.microsoft.com/office/drawing/2014/main" id="{9A7363C6-2AF9-4169-AB55-98108F792271}"/>
+              </a:ext>
+            </a:extLst>
+          </p:cNvPr>
+          <p:cNvSpPr/>
+          <p:nvPr/>
+        </p:nvSpPr>
+        <p:spPr>
+          <a:xfrm>
+            <a:off x="583324" y="2109316"/>
+            <a:ext cx="2386837" cy="743952"/>
+          </a:xfrm>
+          <a:prstGeom prst="rect">
+            <a:avLst/>
+          </a:prstGeom>
+          <a:solidFill>
+            <a:schemeClr val="accent3">
+              <a:lumMod val="60000"/>
+              <a:lumOff val="40000"/>
+              <a:alpha val="20000"/>
+            </a:schemeClr>
+          </a:solidFill>
+          <a:ln w="9525" cap="flat" cmpd="sng" algn="ctr">
+            <a:noFill/>
+            <a:prstDash val="solid"/>
+          </a:ln>
+          <a:effectLst/>
+        </p:spPr>
+        <p:txBody>
+          <a:bodyPr vert="vert270" lIns="36003" tIns="45723" rIns="91444" bIns="45723" rtlCol="0" anchor="t"/>
+          <a:lstStyle/>
+          <a:p>
+            <a:pPr marL="0" marR="0" lvl="0" indent="0" algn="ctr" defTabSz="457210" rtl="0" eaLnBrk="1" fontAlgn="auto" latinLnBrk="0" hangingPunct="1">
+              <a:lnSpc>
+                <a:spcPts val="1700"/>
+              </a:lnSpc>
+              <a:spcBef>
+                <a:spcPts val="0"/>
+              </a:spcBef>
+              <a:spcAft>
+                <a:spcPts val="0"/>
+              </a:spcAft>
+              <a:buClrTx/>
+              <a:buSzTx/>
+              <a:buFontTx/>
+              <a:buNone/>
+              <a:tabLst/>
+              <a:defRPr/>
+            </a:pPr>
+            <a:r>
+              <a:rPr lang="en-US" sz="1600" kern="0" dirty="0">
+                <a:solidFill>
+                  <a:srgbClr val="000000"/>
+                </a:solidFill>
+                <a:latin typeface="+mn-lt"/>
+              </a:rPr>
+              <a:t>Socket</a:t>
+            </a:r>
+            <a:br>
+              <a:rPr kumimoji="0" lang="en-US" sz="1600" b="0" i="0" u="none" strike="noStrike" kern="0" cap="none" spc="0" normalizeH="0" baseline="0" noProof="0" dirty="0">
+                <a:ln>
+                  <a:noFill/>
+                </a:ln>
+                <a:solidFill>
+                  <a:srgbClr val="000000"/>
+                </a:solidFill>
+                <a:effectLst/>
+                <a:uLnTx/>
+                <a:uFillTx/>
+                <a:latin typeface="+mn-lt"/>
+                <a:ea typeface="ＭＳ Ｐゴシック" panose="020B0600070205080204" pitchFamily="34" charset="-128"/>
+                <a:cs typeface="+mn-cs"/>
+              </a:rPr>
+            </a:br>
+            <a:r>
+              <a:rPr kumimoji="0" lang="en-US" sz="1600" b="0" i="0" u="none" strike="noStrike" kern="0" cap="none" spc="0" normalizeH="0" baseline="0" noProof="0" dirty="0">
+                <a:ln>
+                  <a:noFill/>
+                </a:ln>
+                <a:solidFill>
+                  <a:srgbClr val="000000"/>
+                </a:solidFill>
+                <a:effectLst/>
+                <a:uLnTx/>
+                <a:uFillTx/>
+                <a:latin typeface="+mn-lt"/>
+                <a:ea typeface="ＭＳ Ｐゴシック" panose="020B0600070205080204" pitchFamily="34" charset="-128"/>
+                <a:cs typeface="+mn-cs"/>
+              </a:rPr>
+              <a:t>Layer</a:t>
+            </a:r>
+            <a:endParaRPr kumimoji="0" lang="en-GB" sz="1600" b="0" i="0" u="none" strike="noStrike" kern="0" cap="none" spc="0" normalizeH="0" baseline="0" noProof="0" dirty="0">
+              <a:ln>
+                <a:noFill/>
+              </a:ln>
+              <a:solidFill>
+                <a:srgbClr val="000000"/>
+              </a:solidFill>
+              <a:effectLst/>
+              <a:uLnTx/>
+              <a:uFillTx/>
+              <a:latin typeface="+mn-lt"/>
+              <a:ea typeface="ＭＳ Ｐゴシック" panose="020B0600070205080204" pitchFamily="34" charset="-128"/>
+              <a:cs typeface="+mn-cs"/>
+            </a:endParaRPr>
+          </a:p>
+        </p:txBody>
+      </p:sp>
+      <p:sp>
+        <p:nvSpPr>
+          <p:cNvPr id="2" name="Title 1">
+            <a:extLst>
+              <a:ext uri="{FF2B5EF4-FFF2-40B4-BE49-F238E27FC236}">
+                <a16:creationId xmlns:a16="http://schemas.microsoft.com/office/drawing/2014/main" id="{66B49C65-9D93-0940-A2D2-FDC728ABEBFC}"/>
+              </a:ext>
+            </a:extLst>
+          </p:cNvPr>
+          <p:cNvSpPr>
+            <a:spLocks noGrp="1"/>
+          </p:cNvSpPr>
+          <p:nvPr>
+            <p:ph type="title"/>
+          </p:nvPr>
+        </p:nvSpPr>
+        <p:spPr>
+          <a:xfrm>
+            <a:off x="479425" y="312759"/>
+            <a:ext cx="11233150" cy="512830"/>
+          </a:xfrm>
+        </p:spPr>
+        <p:txBody>
+          <a:bodyPr/>
+          <a:lstStyle/>
+          <a:p>
+            <a:r>
+              <a:rPr lang="en-US" sz="3200"/>
+              <a:t>Software Layers Group Pre-configured Software Components</a:t>
+            </a:r>
+          </a:p>
+        </p:txBody>
+      </p:sp>
+      <p:sp>
+        <p:nvSpPr>
+          <p:cNvPr id="4" name="Text Placeholder 3">
+            <a:extLst>
+              <a:ext uri="{FF2B5EF4-FFF2-40B4-BE49-F238E27FC236}">
+                <a16:creationId xmlns:a16="http://schemas.microsoft.com/office/drawing/2014/main" id="{30D7E723-384B-4C01-AD05-AA23E9DE3B9E}"/>
+              </a:ext>
+            </a:extLst>
+          </p:cNvPr>
+          <p:cNvSpPr>
+            <a:spLocks noGrp="1"/>
+          </p:cNvSpPr>
+          <p:nvPr>
+            <p:ph type="body" sz="quarter" idx="13"/>
+          </p:nvPr>
+        </p:nvSpPr>
+        <p:spPr>
+          <a:xfrm>
+            <a:off x="479425" y="683698"/>
+            <a:ext cx="11233150" cy="344488"/>
+          </a:xfrm>
+        </p:spPr>
+        <p:txBody>
+          <a:bodyPr/>
+          <a:lstStyle/>
+          <a:p>
+            <a:r>
+              <a:rPr lang="en-US"/>
+              <a:t>IoT for Cortex-M – reference examples for many evaluation kits</a:t>
+            </a:r>
+            <a:endParaRPr lang="en-GB"/>
+          </a:p>
+        </p:txBody>
+      </p:sp>
+      <p:sp>
+        <p:nvSpPr>
+          <p:cNvPr id="21" name="Rectangle 20">
+            <a:extLst>
+              <a:ext uri="{FF2B5EF4-FFF2-40B4-BE49-F238E27FC236}">
+                <a16:creationId xmlns:a16="http://schemas.microsoft.com/office/drawing/2014/main" id="{55D6DD88-1FD7-4BA4-AB28-44E626DD2497}"/>
+              </a:ext>
+            </a:extLst>
+          </p:cNvPr>
+          <p:cNvSpPr/>
+          <p:nvPr/>
+        </p:nvSpPr>
+        <p:spPr>
+          <a:xfrm>
+            <a:off x="580103" y="2940140"/>
+            <a:ext cx="5142437" cy="1187998"/>
+          </a:xfrm>
+          <a:prstGeom prst="rect">
+            <a:avLst/>
+          </a:prstGeom>
+          <a:solidFill>
+            <a:schemeClr val="accent1">
+              <a:lumMod val="40000"/>
+              <a:lumOff val="60000"/>
+              <a:alpha val="40000"/>
+            </a:schemeClr>
+          </a:solidFill>
+          <a:ln w="9525" cap="flat" cmpd="sng" algn="ctr">
+            <a:noFill/>
+            <a:prstDash val="solid"/>
+          </a:ln>
+          <a:effectLst/>
+        </p:spPr>
+        <p:txBody>
+          <a:bodyPr vert="vert270" lIns="36003" tIns="45723" rIns="91444" bIns="45723" rtlCol="0" anchor="t"/>
+          <a:lstStyle/>
+          <a:p>
+            <a:pPr marL="0" marR="0" lvl="0" indent="0" algn="ctr" defTabSz="457210" rtl="0" eaLnBrk="1" fontAlgn="auto" latinLnBrk="0" hangingPunct="1">
+              <a:lnSpc>
+                <a:spcPts val="1700"/>
+              </a:lnSpc>
+              <a:spcBef>
+                <a:spcPts val="0"/>
+              </a:spcBef>
+              <a:spcAft>
+                <a:spcPts val="0"/>
+              </a:spcAft>
+              <a:buClrTx/>
+              <a:buSzTx/>
+              <a:buFontTx/>
+              <a:buNone/>
+              <a:tabLst/>
+              <a:defRPr/>
+            </a:pPr>
+            <a:r>
+              <a:rPr kumimoji="0" lang="en-US" sz="1600" b="0" i="0" u="none" strike="noStrike" kern="0" cap="none" spc="0" normalizeH="0" baseline="0" noProof="0">
+                <a:ln>
+                  <a:noFill/>
+                </a:ln>
+                <a:solidFill>
+                  <a:srgbClr val="000000"/>
+                </a:solidFill>
+                <a:effectLst/>
+                <a:uLnTx/>
+                <a:uFillTx/>
+                <a:latin typeface="+mn-lt"/>
+                <a:ea typeface="ＭＳ Ｐゴシック" panose="020B0600070205080204" pitchFamily="34" charset="-128"/>
+                <a:cs typeface="+mn-cs"/>
+              </a:rPr>
+              <a:t>Board</a:t>
+            </a:r>
+            <a:br>
+              <a:rPr kumimoji="0" lang="en-US" sz="1600" b="0" i="0" u="none" strike="noStrike" kern="0" cap="none" spc="0" normalizeH="0" baseline="0" noProof="0">
+                <a:ln>
+                  <a:noFill/>
+                </a:ln>
+                <a:solidFill>
+                  <a:srgbClr val="000000"/>
+                </a:solidFill>
+                <a:effectLst/>
+                <a:uLnTx/>
+                <a:uFillTx/>
+                <a:latin typeface="+mn-lt"/>
+                <a:ea typeface="ＭＳ Ｐゴシック" panose="020B0600070205080204" pitchFamily="34" charset="-128"/>
+                <a:cs typeface="+mn-cs"/>
+              </a:rPr>
+            </a:br>
+            <a:r>
+              <a:rPr kumimoji="0" lang="en-US" sz="1600" b="0" i="0" u="none" strike="noStrike" kern="0" cap="none" spc="0" normalizeH="0" baseline="0" noProof="0">
+                <a:ln>
+                  <a:noFill/>
+                </a:ln>
+                <a:solidFill>
+                  <a:srgbClr val="000000"/>
+                </a:solidFill>
+                <a:effectLst/>
+                <a:uLnTx/>
+                <a:uFillTx/>
+                <a:latin typeface="+mn-lt"/>
+                <a:ea typeface="ＭＳ Ｐゴシック" panose="020B0600070205080204" pitchFamily="34" charset="-128"/>
+                <a:cs typeface="+mn-cs"/>
+              </a:rPr>
+              <a:t>Layer</a:t>
+            </a:r>
+            <a:endParaRPr kumimoji="0" lang="en-GB" sz="1600" b="0" i="0" u="none" strike="noStrike" kern="0" cap="none" spc="0" normalizeH="0" baseline="0" noProof="0">
+              <a:ln>
+                <a:noFill/>
+              </a:ln>
+              <a:solidFill>
+                <a:srgbClr val="000000"/>
+              </a:solidFill>
+              <a:effectLst/>
+              <a:uLnTx/>
+              <a:uFillTx/>
+              <a:latin typeface="+mn-lt"/>
+              <a:ea typeface="ＭＳ Ｐゴシック" panose="020B0600070205080204" pitchFamily="34" charset="-128"/>
+              <a:cs typeface="+mn-cs"/>
+            </a:endParaRPr>
+          </a:p>
+        </p:txBody>
+      </p:sp>
+      <p:sp>
+        <p:nvSpPr>
+          <p:cNvPr id="22" name="Rectangle 21">
+            <a:extLst>
+              <a:ext uri="{FF2B5EF4-FFF2-40B4-BE49-F238E27FC236}">
+                <a16:creationId xmlns:a16="http://schemas.microsoft.com/office/drawing/2014/main" id="{625250BE-9572-402C-BAC5-3DB87DF2F7C0}"/>
+              </a:ext>
+            </a:extLst>
+          </p:cNvPr>
+          <p:cNvSpPr/>
+          <p:nvPr/>
+        </p:nvSpPr>
+        <p:spPr>
+          <a:xfrm>
+            <a:off x="584200" y="4252722"/>
+            <a:ext cx="6940188" cy="821881"/>
+          </a:xfrm>
+          <a:prstGeom prst="rect">
+            <a:avLst/>
+          </a:prstGeom>
+          <a:solidFill>
+            <a:srgbClr val="808082">
+              <a:alpha val="40000"/>
+            </a:srgbClr>
+          </a:solidFill>
+          <a:ln w="9525" cap="flat" cmpd="sng" algn="ctr">
+            <a:noFill/>
+            <a:prstDash val="solid"/>
+          </a:ln>
+          <a:effectLst/>
+        </p:spPr>
+        <p:txBody>
+          <a:bodyPr vert="vert270" lIns="144007" tIns="45723" rIns="91444" bIns="45723" rtlCol="0" anchor="t"/>
+          <a:lstStyle/>
+          <a:p>
+            <a:pPr marL="0" marR="0" lvl="0" indent="0" algn="ctr" defTabSz="457210" rtl="0" eaLnBrk="1" fontAlgn="auto" latinLnBrk="0" hangingPunct="1">
+              <a:lnSpc>
+                <a:spcPct val="100000"/>
+              </a:lnSpc>
+              <a:spcBef>
+                <a:spcPts val="0"/>
+              </a:spcBef>
+              <a:spcAft>
+                <a:spcPts val="0"/>
+              </a:spcAft>
+              <a:buClrTx/>
+              <a:buSzTx/>
+              <a:buFontTx/>
+              <a:buNone/>
+              <a:tabLst/>
+              <a:defRPr/>
+            </a:pPr>
+            <a:r>
+              <a:rPr kumimoji="0" lang="en-GB" sz="1600" b="0" i="0" u="none" strike="noStrike" kern="0" cap="none" spc="0" normalizeH="0" baseline="0" noProof="0">
+                <a:ln>
+                  <a:noFill/>
+                </a:ln>
+                <a:solidFill>
+                  <a:srgbClr val="000000"/>
+                </a:solidFill>
+                <a:effectLst/>
+                <a:uLnTx/>
+                <a:uFillTx/>
+                <a:latin typeface="+mn-lt"/>
+                <a:ea typeface="ＭＳ Ｐゴシック" panose="020B0600070205080204" pitchFamily="34" charset="-128"/>
+                <a:cs typeface="+mn-cs"/>
+              </a:rPr>
+              <a:t>MCU</a:t>
+            </a:r>
+          </a:p>
+        </p:txBody>
+      </p:sp>
+      <p:sp>
+        <p:nvSpPr>
+          <p:cNvPr id="27" name="Rectangle 26">
+            <a:extLst>
+              <a:ext uri="{FF2B5EF4-FFF2-40B4-BE49-F238E27FC236}">
+                <a16:creationId xmlns:a16="http://schemas.microsoft.com/office/drawing/2014/main" id="{B5AA21C1-2259-49A4-81EC-B41EA89DA738}"/>
+              </a:ext>
+            </a:extLst>
+          </p:cNvPr>
+          <p:cNvSpPr/>
+          <p:nvPr/>
+        </p:nvSpPr>
+        <p:spPr>
+          <a:xfrm>
+            <a:off x="3905434" y="5451181"/>
+            <a:ext cx="1645920" cy="1167328"/>
+          </a:xfrm>
+          <a:prstGeom prst="rect">
+            <a:avLst/>
+          </a:prstGeom>
+          <a:solidFill>
+            <a:srgbClr val="58595B"/>
+          </a:solidFill>
+          <a:ln w="9525" cap="flat" cmpd="sng" algn="ctr">
+            <a:noFill/>
+            <a:prstDash val="solid"/>
+          </a:ln>
+          <a:effectLst/>
+        </p:spPr>
+        <p:txBody>
+          <a:bodyPr lIns="91444" tIns="45723" rIns="91444" bIns="45723" numCol="1" rtlCol="0" anchor="t"/>
+          <a:lstStyle/>
+          <a:p>
+            <a:pPr marL="0" marR="0" lvl="0" indent="0" algn="l" defTabSz="457210" rtl="0" eaLnBrk="1" fontAlgn="auto" latinLnBrk="0" hangingPunct="1">
+              <a:lnSpc>
+                <a:spcPct val="100000"/>
+              </a:lnSpc>
+              <a:spcBef>
+                <a:spcPts val="0"/>
+              </a:spcBef>
+              <a:spcAft>
+                <a:spcPts val="0"/>
+              </a:spcAft>
+              <a:buClrTx/>
+              <a:buSzTx/>
+              <a:buFontTx/>
+              <a:buNone/>
+              <a:tabLst/>
+              <a:defRPr/>
+            </a:pPr>
+            <a:r>
+              <a:rPr kumimoji="0" lang="en-US" sz="1600" b="0" i="0" u="none" strike="noStrike" kern="0" cap="none" spc="0" normalizeH="0" baseline="0" noProof="0">
+                <a:ln>
+                  <a:noFill/>
+                </a:ln>
+                <a:solidFill>
+                  <a:srgbClr val="FFFFFF"/>
+                </a:solidFill>
+                <a:effectLst/>
+                <a:uLnTx/>
+                <a:uFillTx/>
+                <a:latin typeface="+mn-lt"/>
+                <a:ea typeface="ＭＳ Ｐゴシック" panose="020B0600070205080204" pitchFamily="34" charset="-128"/>
+                <a:cs typeface="+mn-cs"/>
+              </a:rPr>
+              <a:t>Board</a:t>
+            </a:r>
+          </a:p>
+          <a:p>
+            <a:pPr marL="114304" marR="0" lvl="0" indent="-114304" algn="l" defTabSz="457210" rtl="0" eaLnBrk="1" fontAlgn="auto" latinLnBrk="0" hangingPunct="1">
+              <a:lnSpc>
+                <a:spcPct val="100000"/>
+              </a:lnSpc>
+              <a:spcBef>
+                <a:spcPts val="0"/>
+              </a:spcBef>
+              <a:spcAft>
+                <a:spcPts val="0"/>
+              </a:spcAft>
+              <a:buClrTx/>
+              <a:buSzTx/>
+              <a:buFont typeface="Arial" panose="020B0604020202020204" pitchFamily="34" charset="0"/>
+              <a:buChar char="•"/>
+              <a:tabLst/>
+              <a:defRPr/>
+            </a:pPr>
+            <a:r>
+              <a:rPr kumimoji="0" lang="en-US" sz="1600" b="0" i="0" u="none" strike="noStrike" kern="0" cap="none" spc="0" normalizeH="0" baseline="0" noProof="0">
+                <a:ln>
+                  <a:noFill/>
+                </a:ln>
+                <a:solidFill>
+                  <a:srgbClr val="FFFFFF"/>
+                </a:solidFill>
+                <a:effectLst/>
+                <a:uLnTx/>
+                <a:uFillTx/>
+                <a:latin typeface="+mn-lt"/>
+                <a:ea typeface="ＭＳ Ｐゴシック" panose="020B0600070205080204" pitchFamily="34" charset="-128"/>
+                <a:cs typeface="+mn-cs"/>
+              </a:rPr>
+              <a:t>LED</a:t>
+            </a:r>
+          </a:p>
+          <a:p>
+            <a:pPr marL="114304" marR="0" lvl="0" indent="-114304" algn="l" defTabSz="457210" rtl="0" eaLnBrk="1" fontAlgn="auto" latinLnBrk="0" hangingPunct="1">
+              <a:lnSpc>
+                <a:spcPct val="100000"/>
+              </a:lnSpc>
+              <a:spcBef>
+                <a:spcPts val="0"/>
+              </a:spcBef>
+              <a:spcAft>
+                <a:spcPts val="0"/>
+              </a:spcAft>
+              <a:buClrTx/>
+              <a:buSzTx/>
+              <a:buFont typeface="Arial" panose="020B0604020202020204" pitchFamily="34" charset="0"/>
+              <a:buChar char="•"/>
+              <a:tabLst/>
+              <a:defRPr/>
+            </a:pPr>
+            <a:r>
+              <a:rPr kumimoji="0" lang="en-US" sz="1600" b="0" i="0" u="none" strike="noStrike" kern="0" cap="none" spc="0" normalizeH="0" baseline="0" noProof="0">
+                <a:ln>
+                  <a:noFill/>
+                </a:ln>
+                <a:solidFill>
+                  <a:srgbClr val="FFFFFF"/>
+                </a:solidFill>
+                <a:effectLst/>
+                <a:uLnTx/>
+                <a:uFillTx/>
+                <a:latin typeface="+mn-lt"/>
+                <a:ea typeface="ＭＳ Ｐゴシック" panose="020B0600070205080204" pitchFamily="34" charset="-128"/>
+                <a:cs typeface="+mn-cs"/>
+              </a:rPr>
+              <a:t>Sensor inputs</a:t>
+            </a:r>
+          </a:p>
+          <a:p>
+            <a:pPr marL="114304" marR="0" lvl="0" indent="-114304" algn="l" defTabSz="457210" rtl="0" eaLnBrk="1" fontAlgn="auto" latinLnBrk="0" hangingPunct="1">
+              <a:lnSpc>
+                <a:spcPct val="100000"/>
+              </a:lnSpc>
+              <a:spcBef>
+                <a:spcPts val="0"/>
+              </a:spcBef>
+              <a:spcAft>
+                <a:spcPts val="0"/>
+              </a:spcAft>
+              <a:buClrTx/>
+              <a:buSzTx/>
+              <a:buFont typeface="Arial" panose="020B0604020202020204" pitchFamily="34" charset="0"/>
+              <a:buChar char="•"/>
+              <a:tabLst/>
+              <a:defRPr/>
+            </a:pPr>
+            <a:r>
+              <a:rPr kumimoji="0" lang="en-US" sz="1600" b="0" i="0" u="none" strike="noStrike" kern="0" cap="none" spc="0" normalizeH="0" baseline="0" noProof="0">
+                <a:ln>
+                  <a:noFill/>
+                </a:ln>
+                <a:solidFill>
+                  <a:srgbClr val="FFFFFF"/>
+                </a:solidFill>
+                <a:effectLst/>
+                <a:uLnTx/>
+                <a:uFillTx/>
+                <a:latin typeface="+mn-lt"/>
+                <a:ea typeface="ＭＳ Ｐゴシック" panose="020B0600070205080204" pitchFamily="34" charset="-128"/>
+                <a:cs typeface="+mn-cs"/>
+              </a:rPr>
+              <a:t>Display</a:t>
+            </a:r>
+          </a:p>
+        </p:txBody>
+      </p:sp>
+      <p:sp>
+        <p:nvSpPr>
+          <p:cNvPr id="30" name="Down Arrow 26">
+            <a:extLst>
+              <a:ext uri="{FF2B5EF4-FFF2-40B4-BE49-F238E27FC236}">
+                <a16:creationId xmlns:a16="http://schemas.microsoft.com/office/drawing/2014/main" id="{D6981AE9-5DF4-413F-9F55-F18CBA15AB85}"/>
+              </a:ext>
+            </a:extLst>
+          </p:cNvPr>
+          <p:cNvSpPr/>
+          <p:nvPr/>
+        </p:nvSpPr>
+        <p:spPr>
+          <a:xfrm>
+            <a:off x="4148074" y="1639615"/>
+            <a:ext cx="1160951" cy="3811570"/>
+          </a:xfrm>
+          <a:prstGeom prst="downArrow">
+            <a:avLst>
+              <a:gd name="adj1" fmla="val 50000"/>
+              <a:gd name="adj2" fmla="val 26971"/>
+            </a:avLst>
+          </a:prstGeom>
+          <a:gradFill rotWithShape="1">
+            <a:gsLst>
+              <a:gs pos="0">
+                <a:srgbClr val="ED174F">
+                  <a:lumMod val="20000"/>
+                  <a:lumOff val="80000"/>
+                </a:srgbClr>
+              </a:gs>
+              <a:gs pos="64000">
+                <a:srgbClr val="ED174F">
+                  <a:lumMod val="40000"/>
+                  <a:lumOff val="60000"/>
+                </a:srgbClr>
+              </a:gs>
+              <a:gs pos="100000">
+                <a:srgbClr val="FF0000">
+                  <a:alpha val="60000"/>
+                </a:srgbClr>
+              </a:gs>
+            </a:gsLst>
+            <a:lin ang="5400000" scaled="0"/>
+          </a:gradFill>
+          <a:ln w="9525" cap="flat" cmpd="sng" algn="ctr">
+            <a:noFill/>
+            <a:prstDash val="solid"/>
+          </a:ln>
+          <a:effectLst/>
+        </p:spPr>
+        <p:txBody>
+          <a:bodyPr lIns="91444" tIns="45723" rIns="91444" bIns="45723" rtlCol="0" anchor="ctr"/>
+          <a:lstStyle/>
+          <a:p>
+            <a:pPr marL="0" marR="0" lvl="0" indent="0" algn="ctr" defTabSz="457210" rtl="0" eaLnBrk="1" fontAlgn="auto" latinLnBrk="0" hangingPunct="1">
+              <a:lnSpc>
+                <a:spcPct val="100000"/>
+              </a:lnSpc>
+              <a:spcBef>
+                <a:spcPts val="0"/>
+              </a:spcBef>
+              <a:spcAft>
+                <a:spcPts val="0"/>
+              </a:spcAft>
+              <a:buClrTx/>
+              <a:buSzTx/>
+              <a:buFontTx/>
+              <a:buNone/>
+              <a:tabLst/>
+              <a:defRPr/>
+            </a:pPr>
+            <a:endParaRPr kumimoji="0" lang="en-GB" sz="1467" b="0" i="0" u="none" strike="noStrike" kern="0" cap="none" spc="0" normalizeH="0" baseline="0" noProof="0">
+              <a:ln>
+                <a:noFill/>
+              </a:ln>
+              <a:solidFill>
+                <a:srgbClr val="FFFFFF"/>
+              </a:solidFill>
+              <a:effectLst/>
+              <a:uLnTx/>
+              <a:uFillTx/>
+              <a:latin typeface="+mn-lt"/>
+              <a:ea typeface="ＭＳ Ｐゴシック" panose="020B0600070205080204" pitchFamily="34" charset="-128"/>
+              <a:cs typeface="+mn-cs"/>
+            </a:endParaRPr>
+          </a:p>
+        </p:txBody>
+      </p:sp>
+      <p:sp>
+        <p:nvSpPr>
+          <p:cNvPr id="40" name="Rectangle 39">
+            <a:extLst>
+              <a:ext uri="{FF2B5EF4-FFF2-40B4-BE49-F238E27FC236}">
+                <a16:creationId xmlns:a16="http://schemas.microsoft.com/office/drawing/2014/main" id="{E68A9320-69F2-4B09-9EC9-F66B43DA0FD1}"/>
+              </a:ext>
+            </a:extLst>
+          </p:cNvPr>
+          <p:cNvSpPr/>
+          <p:nvPr/>
+        </p:nvSpPr>
+        <p:spPr>
+          <a:xfrm>
+            <a:off x="3919136" y="3009534"/>
+            <a:ext cx="1645920" cy="445876"/>
+          </a:xfrm>
+          <a:prstGeom prst="rect">
+            <a:avLst/>
+          </a:prstGeom>
+          <a:solidFill>
+            <a:srgbClr val="4E5584"/>
+          </a:solidFill>
+          <a:ln w="9525" cap="flat" cmpd="sng" algn="ctr">
+            <a:noFill/>
+            <a:prstDash val="solid"/>
+          </a:ln>
+          <a:effectLst/>
+        </p:spPr>
+        <p:txBody>
+          <a:bodyPr lIns="36003" tIns="45723" rIns="36003" bIns="45723" rtlCol="0" anchor="ctr"/>
+          <a:lstStyle/>
+          <a:p>
+            <a:pPr marL="0" marR="0" lvl="0" indent="0" algn="ctr" defTabSz="457210" rtl="0" eaLnBrk="1" fontAlgn="auto" latinLnBrk="0" hangingPunct="1">
+              <a:lnSpc>
+                <a:spcPct val="100000"/>
+              </a:lnSpc>
+              <a:spcBef>
+                <a:spcPts val="0"/>
+              </a:spcBef>
+              <a:spcAft>
+                <a:spcPts val="0"/>
+              </a:spcAft>
+              <a:buClrTx/>
+              <a:buSzTx/>
+              <a:buFontTx/>
+              <a:buNone/>
+              <a:tabLst/>
+              <a:defRPr/>
+            </a:pPr>
+            <a:r>
+              <a:rPr kumimoji="0" lang="en-US" sz="1600" b="0" i="0" u="none" strike="noStrike" kern="0" cap="none" spc="0" normalizeH="0" baseline="0" noProof="0">
+                <a:ln>
+                  <a:noFill/>
+                </a:ln>
+                <a:solidFill>
+                  <a:srgbClr val="FFFFFF"/>
+                </a:solidFill>
+                <a:effectLst/>
+                <a:uLnTx/>
+                <a:uFillTx/>
+                <a:latin typeface="+mn-lt"/>
+                <a:ea typeface="ＭＳ Ｐゴシック" panose="020B0600070205080204" pitchFamily="34" charset="-128"/>
+                <a:cs typeface="+mn-cs"/>
+              </a:rPr>
+              <a:t>CMSIS-Driver-VIO</a:t>
+            </a:r>
+          </a:p>
+          <a:p>
+            <a:pPr marL="0" marR="0" lvl="0" indent="0" algn="ctr" defTabSz="457210" rtl="0" eaLnBrk="1" fontAlgn="auto" latinLnBrk="0" hangingPunct="1">
+              <a:lnSpc>
+                <a:spcPct val="100000"/>
+              </a:lnSpc>
+              <a:spcBef>
+                <a:spcPts val="0"/>
+              </a:spcBef>
+              <a:spcAft>
+                <a:spcPts val="0"/>
+              </a:spcAft>
+              <a:buClrTx/>
+              <a:buSzTx/>
+              <a:buFontTx/>
+              <a:buNone/>
+              <a:tabLst/>
+              <a:defRPr/>
+            </a:pPr>
+            <a:r>
+              <a:rPr kumimoji="0" lang="en-US" sz="1300" b="0" i="0" u="none" strike="noStrike" kern="0" cap="none" spc="0" normalizeH="0" baseline="0" noProof="0">
+                <a:ln>
+                  <a:noFill/>
+                </a:ln>
+                <a:solidFill>
+                  <a:srgbClr val="FFFFFF"/>
+                </a:solidFill>
+                <a:effectLst/>
+                <a:uLnTx/>
+                <a:uFillTx/>
+                <a:latin typeface="+mn-lt"/>
+                <a:ea typeface="ＭＳ Ｐゴシック" panose="020B0600070205080204" pitchFamily="34" charset="-128"/>
+                <a:cs typeface="+mn-cs"/>
+              </a:rPr>
+              <a:t>Virtual I/O</a:t>
+            </a:r>
+          </a:p>
+        </p:txBody>
+      </p:sp>
+      <p:sp>
+        <p:nvSpPr>
+          <p:cNvPr id="41" name="Rectangle 40">
+            <a:extLst>
+              <a:ext uri="{FF2B5EF4-FFF2-40B4-BE49-F238E27FC236}">
+                <a16:creationId xmlns:a16="http://schemas.microsoft.com/office/drawing/2014/main" id="{A4F01639-7D0D-46C0-B57C-1A095CC940E5}"/>
+              </a:ext>
+            </a:extLst>
+          </p:cNvPr>
+          <p:cNvSpPr/>
+          <p:nvPr/>
+        </p:nvSpPr>
+        <p:spPr>
+          <a:xfrm>
+            <a:off x="7524387" y="3000565"/>
+            <a:ext cx="1645920" cy="445876"/>
+          </a:xfrm>
+          <a:prstGeom prst="rect">
+            <a:avLst/>
+          </a:prstGeom>
+          <a:solidFill>
+            <a:srgbClr val="4E5584"/>
+          </a:solidFill>
+          <a:ln w="9525" cap="flat" cmpd="sng" algn="ctr">
+            <a:noFill/>
+            <a:prstDash val="solid"/>
+          </a:ln>
+          <a:effectLst/>
+        </p:spPr>
+        <p:txBody>
+          <a:bodyPr lIns="36003" tIns="45723" rIns="36003" bIns="45723" rtlCol="0" anchor="ctr"/>
+          <a:lstStyle/>
+          <a:p>
+            <a:pPr marL="0" marR="0" lvl="0" indent="0" algn="ctr" defTabSz="457210" rtl="0" eaLnBrk="1" fontAlgn="auto" latinLnBrk="0" hangingPunct="1">
+              <a:lnSpc>
+                <a:spcPct val="100000"/>
+              </a:lnSpc>
+              <a:spcBef>
+                <a:spcPts val="0"/>
+              </a:spcBef>
+              <a:spcAft>
+                <a:spcPts val="0"/>
+              </a:spcAft>
+              <a:buClrTx/>
+              <a:buSzTx/>
+              <a:buFontTx/>
+              <a:buNone/>
+              <a:tabLst/>
+              <a:defRPr/>
+            </a:pPr>
+            <a:r>
+              <a:rPr kumimoji="0" lang="en-US" sz="1600" b="0" i="0" u="none" strike="noStrike" kern="0" cap="none" spc="0" normalizeH="0" baseline="0" noProof="0">
+                <a:ln>
+                  <a:noFill/>
+                </a:ln>
+                <a:solidFill>
+                  <a:srgbClr val="FFFFFF"/>
+                </a:solidFill>
+                <a:effectLst/>
+                <a:uLnTx/>
+                <a:uFillTx/>
+                <a:latin typeface="+mn-lt"/>
+                <a:ea typeface="ＭＳ Ｐゴシック" panose="020B0600070205080204" pitchFamily="34" charset="-128"/>
+                <a:cs typeface="+mn-cs"/>
+              </a:rPr>
+              <a:t>CMSIS-RTOS2</a:t>
+            </a:r>
+          </a:p>
+        </p:txBody>
+      </p:sp>
+      <p:sp>
+        <p:nvSpPr>
+          <p:cNvPr id="35" name="Rectangle 34">
+            <a:extLst>
+              <a:ext uri="{FF2B5EF4-FFF2-40B4-BE49-F238E27FC236}">
+                <a16:creationId xmlns:a16="http://schemas.microsoft.com/office/drawing/2014/main" id="{7A4F3A5B-12F3-433E-AC31-A6F9BE832221}"/>
+              </a:ext>
+            </a:extLst>
+          </p:cNvPr>
+          <p:cNvSpPr/>
+          <p:nvPr/>
+        </p:nvSpPr>
+        <p:spPr>
+          <a:xfrm>
+            <a:off x="3926964" y="1347951"/>
+            <a:ext cx="1659984" cy="610321"/>
+          </a:xfrm>
+          <a:prstGeom prst="rect">
+            <a:avLst/>
+          </a:prstGeom>
+          <a:solidFill>
+            <a:srgbClr val="128CAB">
+              <a:alpha val="80000"/>
+            </a:srgbClr>
+          </a:solidFill>
+          <a:ln w="9525" cap="flat" cmpd="sng" algn="ctr">
+            <a:noFill/>
+            <a:prstDash val="solid"/>
+          </a:ln>
+          <a:effectLst/>
+        </p:spPr>
+        <p:txBody>
+          <a:bodyPr lIns="91444" tIns="45723" rIns="91444" bIns="45723" rtlCol="0" anchor="ctr"/>
+          <a:lstStyle/>
+          <a:p>
+            <a:pPr marL="0" marR="0" lvl="0" indent="0" algn="ctr" defTabSz="457210" rtl="0" eaLnBrk="1" fontAlgn="auto" latinLnBrk="0" hangingPunct="1">
+              <a:lnSpc>
+                <a:spcPct val="100000"/>
+              </a:lnSpc>
+              <a:spcBef>
+                <a:spcPts val="0"/>
+              </a:spcBef>
+              <a:spcAft>
+                <a:spcPts val="0"/>
+              </a:spcAft>
+              <a:buClrTx/>
+              <a:buSzTx/>
+              <a:buFontTx/>
+              <a:buNone/>
+              <a:tabLst/>
+              <a:defRPr/>
+            </a:pPr>
+            <a:r>
+              <a:rPr kumimoji="0" lang="en-US" sz="1600" b="0" i="0" u="none" strike="noStrike" kern="0" cap="none" spc="0" normalizeH="0" baseline="0" noProof="0" dirty="0">
+                <a:ln>
+                  <a:noFill/>
+                </a:ln>
+                <a:solidFill>
+                  <a:srgbClr val="FFFFFF"/>
+                </a:solidFill>
+                <a:effectLst/>
+                <a:uLnTx/>
+                <a:uFillTx/>
+                <a:latin typeface="+mn-lt"/>
+                <a:ea typeface="ＭＳ Ｐゴシック" panose="020B0600070205080204" pitchFamily="34" charset="-128"/>
+                <a:cs typeface="+mn-cs"/>
+              </a:rPr>
+              <a:t>Example Application Code</a:t>
+            </a:r>
+            <a:endParaRPr kumimoji="0" lang="en-GB" sz="1600" b="0" i="0" u="none" strike="noStrike" kern="0" cap="none" spc="0" normalizeH="0" baseline="0" noProof="0" dirty="0">
+              <a:ln>
+                <a:noFill/>
+              </a:ln>
+              <a:solidFill>
+                <a:srgbClr val="FFFFFF"/>
+              </a:solidFill>
+              <a:effectLst/>
+              <a:uLnTx/>
+              <a:uFillTx/>
+              <a:latin typeface="+mn-lt"/>
+              <a:ea typeface="ＭＳ Ｐゴシック" panose="020B0600070205080204" pitchFamily="34" charset="-128"/>
+              <a:cs typeface="+mn-cs"/>
+            </a:endParaRPr>
+          </a:p>
+        </p:txBody>
+      </p:sp>
+      <p:sp>
+        <p:nvSpPr>
+          <p:cNvPr id="39" name="Rectangle 38">
+            <a:extLst>
+              <a:ext uri="{FF2B5EF4-FFF2-40B4-BE49-F238E27FC236}">
+                <a16:creationId xmlns:a16="http://schemas.microsoft.com/office/drawing/2014/main" id="{753CD197-D1CC-4FBD-9594-AC59E6CDC8A8}"/>
+              </a:ext>
+            </a:extLst>
+          </p:cNvPr>
+          <p:cNvSpPr/>
+          <p:nvPr/>
+        </p:nvSpPr>
+        <p:spPr>
+          <a:xfrm rot="16200000">
+            <a:off x="9374313" y="2256249"/>
+            <a:ext cx="2715769" cy="2425171"/>
+          </a:xfrm>
+          <a:prstGeom prst="rect">
+            <a:avLst/>
+          </a:prstGeom>
+          <a:solidFill>
+            <a:schemeClr val="accent6">
+              <a:lumMod val="40000"/>
+              <a:lumOff val="60000"/>
+              <a:alpha val="50000"/>
+            </a:schemeClr>
+          </a:solidFill>
+          <a:ln>
+            <a:noFill/>
+          </a:ln>
+          <a:effectLst/>
+        </p:spPr>
+        <p:style>
+          <a:lnRef idx="1">
+            <a:schemeClr val="accent1"/>
+          </a:lnRef>
+          <a:fillRef idx="3">
+            <a:schemeClr val="accent1"/>
+          </a:fillRef>
+          <a:effectRef idx="2">
+            <a:schemeClr val="accent1"/>
+          </a:effectRef>
+          <a:fontRef idx="minor">
+            <a:schemeClr val="lt1"/>
+          </a:fontRef>
+        </p:style>
+        <p:txBody>
+          <a:bodyPr rtlCol="0" anchor="ctr"/>
+          <a:lstStyle/>
+          <a:p>
+            <a:pPr marL="0" marR="0" lvl="0" indent="0" algn="ctr" defTabSz="913852" rtl="0" eaLnBrk="0" fontAlgn="base" latinLnBrk="0" hangingPunct="0">
+              <a:lnSpc>
+                <a:spcPct val="100000"/>
+              </a:lnSpc>
+              <a:spcBef>
+                <a:spcPct val="0"/>
+              </a:spcBef>
+              <a:spcAft>
+                <a:spcPct val="0"/>
+              </a:spcAft>
+              <a:buClrTx/>
+              <a:buSzTx/>
+              <a:buFontTx/>
+              <a:buNone/>
+              <a:tabLst/>
+              <a:defRPr/>
+            </a:pPr>
+            <a:endParaRPr kumimoji="0" lang="en-US" sz="2000" b="0" i="0" u="none" strike="noStrike" kern="1200" cap="none" spc="0" normalizeH="0" baseline="0" noProof="0">
+              <a:ln>
+                <a:noFill/>
+              </a:ln>
+              <a:solidFill>
+                <a:prstClr val="white"/>
+              </a:solidFill>
+              <a:effectLst/>
+              <a:uLnTx/>
+              <a:uFillTx/>
+              <a:ea typeface="+mn-ea"/>
+              <a:cs typeface="+mn-cs"/>
+            </a:endParaRPr>
+          </a:p>
+        </p:txBody>
+      </p:sp>
+      <p:sp>
+        <p:nvSpPr>
+          <p:cNvPr id="42" name="TextBox 41">
+            <a:extLst>
+              <a:ext uri="{FF2B5EF4-FFF2-40B4-BE49-F238E27FC236}">
+                <a16:creationId xmlns:a16="http://schemas.microsoft.com/office/drawing/2014/main" id="{2F331FBC-B4AA-4EE8-8ADE-61EE96C87EE7}"/>
+              </a:ext>
+            </a:extLst>
+          </p:cNvPr>
+          <p:cNvSpPr txBox="1"/>
+          <p:nvPr/>
+        </p:nvSpPr>
+        <p:spPr>
+          <a:xfrm>
+            <a:off x="9523844" y="2163035"/>
+            <a:ext cx="2406935" cy="520142"/>
+          </a:xfrm>
+          <a:prstGeom prst="rect">
+            <a:avLst/>
+          </a:prstGeom>
+          <a:noFill/>
+        </p:spPr>
+        <p:txBody>
+          <a:bodyPr wrap="square" lIns="0" tIns="0" rIns="0" bIns="0" rtlCol="0" anchor="t">
+            <a:spAutoFit/>
+          </a:bodyPr>
+          <a:lstStyle/>
+          <a:p>
+            <a:pPr algn="ctr" defTabSz="914126" eaLnBrk="1" hangingPunct="1">
+              <a:lnSpc>
+                <a:spcPct val="90000"/>
+              </a:lnSpc>
+              <a:spcBef>
+                <a:spcPts val="0"/>
+              </a:spcBef>
+              <a:spcAft>
+                <a:spcPts val="600"/>
+              </a:spcAft>
+              <a:defRPr/>
+            </a:pPr>
+            <a:r>
+              <a:rPr kumimoji="0" lang="en-GB" sz="1600" b="0" i="0" u="none" strike="noStrike" kern="1200" cap="none" spc="0" normalizeH="0" baseline="0" noProof="0">
+                <a:ln>
+                  <a:noFill/>
+                </a:ln>
+                <a:solidFill>
+                  <a:srgbClr val="333E48"/>
+                </a:solidFill>
+                <a:effectLst/>
+                <a:uLnTx/>
+                <a:uFillTx/>
+                <a:latin typeface="+mn-lt"/>
+                <a:ea typeface="ＭＳ Ｐゴシック"/>
+                <a:cs typeface="+mn-cs"/>
+              </a:rPr>
+              <a:t>Trusted </a:t>
+            </a:r>
+            <a:r>
+              <a:rPr lang="en-GB" sz="1600">
+                <a:solidFill>
+                  <a:srgbClr val="333E48"/>
+                </a:solidFill>
+                <a:latin typeface="+mn-lt"/>
+                <a:ea typeface="ＭＳ Ｐゴシック"/>
+              </a:rPr>
+              <a:t>Firmware-M (TF-M)</a:t>
+            </a:r>
+            <a:endParaRPr lang="en-US" sz="1600">
+              <a:solidFill>
+                <a:srgbClr val="333E48"/>
+              </a:solidFill>
+              <a:latin typeface="+mn-lt"/>
+              <a:ea typeface="ＭＳ Ｐゴシック"/>
+            </a:endParaRPr>
+          </a:p>
+          <a:p>
+            <a:pPr algn="ctr" defTabSz="914126">
+              <a:lnSpc>
+                <a:spcPct val="90000"/>
+              </a:lnSpc>
+              <a:spcBef>
+                <a:spcPts val="0"/>
+              </a:spcBef>
+              <a:spcAft>
+                <a:spcPts val="600"/>
+              </a:spcAft>
+              <a:defRPr/>
+            </a:pPr>
+            <a:r>
+              <a:rPr lang="en-GB" sz="1600">
+                <a:solidFill>
+                  <a:srgbClr val="333E48"/>
+                </a:solidFill>
+                <a:latin typeface="+mn-lt"/>
+                <a:ea typeface="ＭＳ Ｐゴシック"/>
+              </a:rPr>
+              <a:t>implements</a:t>
+            </a:r>
+            <a:r>
+              <a:rPr kumimoji="0" lang="en-GB" sz="1600" b="0" i="0" u="none" strike="noStrike" kern="1200" cap="none" spc="0" normalizeH="0" baseline="0" noProof="0">
+                <a:ln>
+                  <a:noFill/>
+                </a:ln>
+                <a:solidFill>
+                  <a:srgbClr val="333E48"/>
+                </a:solidFill>
+                <a:effectLst/>
+                <a:uLnTx/>
+                <a:uFillTx/>
+                <a:latin typeface="+mn-lt"/>
+                <a:ea typeface="ＭＳ Ｐゴシック"/>
+                <a:cs typeface="+mn-cs"/>
+              </a:rPr>
+              <a:t> Security</a:t>
+            </a:r>
+            <a:endParaRPr lang="en-US" sz="1600" b="0" i="0" u="none" strike="noStrike" kern="1200" cap="none" spc="0" normalizeH="0" baseline="0" noProof="0">
+              <a:ln>
+                <a:noFill/>
+              </a:ln>
+              <a:solidFill>
+                <a:srgbClr val="333E48"/>
+              </a:solidFill>
+              <a:effectLst/>
+              <a:uLnTx/>
+              <a:uFillTx/>
+              <a:latin typeface="+mn-lt"/>
+              <a:ea typeface="ＭＳ Ｐゴシック"/>
+              <a:cs typeface="Calibri"/>
+            </a:endParaRPr>
+          </a:p>
+        </p:txBody>
+      </p:sp>
+      <p:sp>
+        <p:nvSpPr>
+          <p:cNvPr id="43" name="Rectangle 42">
+            <a:extLst>
+              <a:ext uri="{FF2B5EF4-FFF2-40B4-BE49-F238E27FC236}">
+                <a16:creationId xmlns:a16="http://schemas.microsoft.com/office/drawing/2014/main" id="{C35DC07A-006F-4A06-9ED6-E627D3375AF2}"/>
+              </a:ext>
+            </a:extLst>
+          </p:cNvPr>
+          <p:cNvSpPr/>
+          <p:nvPr/>
+        </p:nvSpPr>
+        <p:spPr>
+          <a:xfrm>
+            <a:off x="9697292" y="3331378"/>
+            <a:ext cx="2069727" cy="407754"/>
+          </a:xfrm>
+          <a:prstGeom prst="rect">
+            <a:avLst/>
+          </a:prstGeom>
+          <a:solidFill>
+            <a:schemeClr val="accent2"/>
+          </a:solidFill>
+          <a:ln>
+            <a:noFill/>
+          </a:ln>
+          <a:effectLst/>
+        </p:spPr>
+        <p:style>
+          <a:lnRef idx="1">
+            <a:schemeClr val="accent1"/>
+          </a:lnRef>
+          <a:fillRef idx="3">
+            <a:schemeClr val="accent1"/>
+          </a:fillRef>
+          <a:effectRef idx="2">
+            <a:schemeClr val="accent1"/>
+          </a:effectRef>
+          <a:fontRef idx="minor">
+            <a:schemeClr val="lt1"/>
+          </a:fontRef>
+        </p:style>
+        <p:txBody>
+          <a:bodyPr rtlCol="0" anchor="ctr"/>
+          <a:lstStyle/>
+          <a:p>
+            <a:pPr marL="0" marR="0" lvl="0" indent="0" algn="ctr" defTabSz="913852" rtl="0" eaLnBrk="0" fontAlgn="base" latinLnBrk="0" hangingPunct="0">
+              <a:lnSpc>
+                <a:spcPct val="100000"/>
+              </a:lnSpc>
+              <a:spcBef>
+                <a:spcPct val="0"/>
+              </a:spcBef>
+              <a:spcAft>
+                <a:spcPct val="0"/>
+              </a:spcAft>
+              <a:buClrTx/>
+              <a:buSzTx/>
+              <a:buFontTx/>
+              <a:buNone/>
+              <a:tabLst/>
+              <a:defRPr/>
+            </a:pPr>
+            <a:r>
+              <a:rPr kumimoji="0" lang="en-US" sz="1600" b="0" i="0" u="none" strike="noStrike" kern="1200" cap="none" spc="0" normalizeH="0" baseline="0" noProof="0">
+                <a:ln>
+                  <a:noFill/>
+                </a:ln>
+                <a:solidFill>
+                  <a:prstClr val="white"/>
+                </a:solidFill>
+                <a:effectLst/>
+                <a:uLnTx/>
+                <a:uFillTx/>
+                <a:ea typeface="+mn-ea"/>
+                <a:cs typeface="+mn-cs"/>
+              </a:rPr>
+              <a:t>Storage</a:t>
+            </a:r>
+          </a:p>
+        </p:txBody>
+      </p:sp>
+      <p:sp>
+        <p:nvSpPr>
+          <p:cNvPr id="44" name="Rectangle 43">
+            <a:extLst>
+              <a:ext uri="{FF2B5EF4-FFF2-40B4-BE49-F238E27FC236}">
+                <a16:creationId xmlns:a16="http://schemas.microsoft.com/office/drawing/2014/main" id="{B1E222C2-3A5F-4446-9B93-A300AEFBF790}"/>
+              </a:ext>
+            </a:extLst>
+          </p:cNvPr>
+          <p:cNvSpPr/>
+          <p:nvPr/>
+        </p:nvSpPr>
+        <p:spPr>
+          <a:xfrm>
+            <a:off x="9697130" y="2842472"/>
+            <a:ext cx="2069729" cy="407754"/>
+          </a:xfrm>
+          <a:prstGeom prst="rect">
+            <a:avLst/>
+          </a:prstGeom>
+          <a:solidFill>
+            <a:schemeClr val="accent2"/>
+          </a:solidFill>
+          <a:ln>
+            <a:noFill/>
+          </a:ln>
+          <a:effectLst/>
+        </p:spPr>
+        <p:style>
+          <a:lnRef idx="1">
+            <a:schemeClr val="accent1"/>
+          </a:lnRef>
+          <a:fillRef idx="3">
+            <a:schemeClr val="accent1"/>
+          </a:fillRef>
+          <a:effectRef idx="2">
+            <a:schemeClr val="accent1"/>
+          </a:effectRef>
+          <a:fontRef idx="minor">
+            <a:schemeClr val="lt1"/>
+          </a:fontRef>
+        </p:style>
+        <p:txBody>
+          <a:bodyPr rtlCol="0" anchor="ctr"/>
+          <a:lstStyle/>
+          <a:p>
+            <a:pPr marL="0" marR="0" lvl="0" indent="0" algn="ctr" defTabSz="913852" rtl="0" eaLnBrk="0" fontAlgn="base" latinLnBrk="0" hangingPunct="0">
+              <a:lnSpc>
+                <a:spcPct val="100000"/>
+              </a:lnSpc>
+              <a:spcBef>
+                <a:spcPct val="0"/>
+              </a:spcBef>
+              <a:spcAft>
+                <a:spcPct val="0"/>
+              </a:spcAft>
+              <a:buClrTx/>
+              <a:buSzTx/>
+              <a:buFontTx/>
+              <a:buNone/>
+              <a:tabLst/>
+              <a:defRPr/>
+            </a:pPr>
+            <a:r>
+              <a:rPr kumimoji="0" lang="en-US" sz="1600" b="0" i="0" u="none" strike="noStrike" kern="1200" cap="none" spc="0" normalizeH="0" baseline="0" noProof="0">
+                <a:ln>
+                  <a:noFill/>
+                </a:ln>
+                <a:solidFill>
+                  <a:prstClr val="white"/>
+                </a:solidFill>
+                <a:effectLst/>
+                <a:uLnTx/>
+                <a:uFillTx/>
+                <a:ea typeface="+mn-ea"/>
+                <a:cs typeface="+mn-cs"/>
+              </a:rPr>
+              <a:t>Crypto</a:t>
+            </a:r>
+          </a:p>
+        </p:txBody>
+      </p:sp>
+      <p:sp>
+        <p:nvSpPr>
+          <p:cNvPr id="45" name="Rectangle 44">
+            <a:extLst>
+              <a:ext uri="{FF2B5EF4-FFF2-40B4-BE49-F238E27FC236}">
+                <a16:creationId xmlns:a16="http://schemas.microsoft.com/office/drawing/2014/main" id="{7A0F3903-7CAB-4B03-8AD4-751A3FF804B7}"/>
+              </a:ext>
+            </a:extLst>
+          </p:cNvPr>
+          <p:cNvSpPr/>
+          <p:nvPr/>
+        </p:nvSpPr>
+        <p:spPr>
+          <a:xfrm>
+            <a:off x="9687827" y="3811732"/>
+            <a:ext cx="2069726" cy="407754"/>
+          </a:xfrm>
+          <a:prstGeom prst="rect">
+            <a:avLst/>
+          </a:prstGeom>
+          <a:solidFill>
+            <a:schemeClr val="accent2"/>
+          </a:solidFill>
+          <a:ln>
+            <a:noFill/>
+          </a:ln>
+          <a:effectLst/>
+        </p:spPr>
+        <p:style>
+          <a:lnRef idx="1">
+            <a:schemeClr val="accent1"/>
+          </a:lnRef>
+          <a:fillRef idx="3">
+            <a:schemeClr val="accent1"/>
+          </a:fillRef>
+          <a:effectRef idx="2">
+            <a:schemeClr val="accent1"/>
+          </a:effectRef>
+          <a:fontRef idx="minor">
+            <a:schemeClr val="lt1"/>
+          </a:fontRef>
+        </p:style>
+        <p:txBody>
+          <a:bodyPr rtlCol="0" anchor="ctr"/>
+          <a:lstStyle/>
+          <a:p>
+            <a:pPr marL="0" marR="0" lvl="0" indent="0" algn="ctr" defTabSz="913852" rtl="0" eaLnBrk="0" fontAlgn="base" latinLnBrk="0" hangingPunct="0">
+              <a:lnSpc>
+                <a:spcPct val="100000"/>
+              </a:lnSpc>
+              <a:spcBef>
+                <a:spcPct val="0"/>
+              </a:spcBef>
+              <a:spcAft>
+                <a:spcPct val="0"/>
+              </a:spcAft>
+              <a:buClrTx/>
+              <a:buSzTx/>
+              <a:buFontTx/>
+              <a:buNone/>
+              <a:tabLst/>
+              <a:defRPr/>
+            </a:pPr>
+            <a:r>
+              <a:rPr kumimoji="0" lang="en-US" sz="1600" b="0" i="0" u="none" strike="noStrike" kern="1200" cap="none" spc="0" normalizeH="0" baseline="0" noProof="0">
+                <a:ln>
+                  <a:noFill/>
+                </a:ln>
+                <a:solidFill>
+                  <a:prstClr val="white"/>
+                </a:solidFill>
+                <a:effectLst/>
+                <a:uLnTx/>
+                <a:uFillTx/>
+                <a:ea typeface="+mn-ea"/>
+                <a:cs typeface="+mn-cs"/>
+              </a:rPr>
+              <a:t>Attestation</a:t>
+            </a:r>
+          </a:p>
+        </p:txBody>
+      </p:sp>
+      <p:cxnSp>
+        <p:nvCxnSpPr>
+          <p:cNvPr id="46" name="Straight Connector 45">
+            <a:extLst>
+              <a:ext uri="{FF2B5EF4-FFF2-40B4-BE49-F238E27FC236}">
+                <a16:creationId xmlns:a16="http://schemas.microsoft.com/office/drawing/2014/main" id="{0DC64ACC-FD66-47E2-BEED-E0C56248FD8E}"/>
+              </a:ext>
+            </a:extLst>
+          </p:cNvPr>
+          <p:cNvCxnSpPr>
+            <a:cxnSpLocks/>
+          </p:cNvCxnSpPr>
+          <p:nvPr/>
+        </p:nvCxnSpPr>
+        <p:spPr>
+          <a:xfrm>
+            <a:off x="9397312" y="1485900"/>
+            <a:ext cx="0" cy="3619500"/>
+          </a:xfrm>
+          <a:prstGeom prst="line">
+            <a:avLst/>
+          </a:prstGeom>
+          <a:ln w="31750">
+            <a:solidFill>
+              <a:schemeClr val="tx2"/>
+            </a:solidFill>
+            <a:prstDash val="dash"/>
+          </a:ln>
+        </p:spPr>
+        <p:style>
+          <a:lnRef idx="1">
+            <a:schemeClr val="accent1"/>
+          </a:lnRef>
+          <a:fillRef idx="0">
+            <a:schemeClr val="accent1"/>
+          </a:fillRef>
+          <a:effectRef idx="0">
+            <a:schemeClr val="accent1"/>
+          </a:effectRef>
+          <a:fontRef idx="minor">
+            <a:schemeClr val="tx1"/>
+          </a:fontRef>
+        </p:style>
+      </p:cxnSp>
+      <p:sp>
+        <p:nvSpPr>
+          <p:cNvPr id="47" name="Rectangle 46">
+            <a:extLst>
+              <a:ext uri="{FF2B5EF4-FFF2-40B4-BE49-F238E27FC236}">
+                <a16:creationId xmlns:a16="http://schemas.microsoft.com/office/drawing/2014/main" id="{1927755F-4B8E-4B6D-842E-9AAA27EF9B2E}"/>
+              </a:ext>
+            </a:extLst>
+          </p:cNvPr>
+          <p:cNvSpPr/>
+          <p:nvPr/>
+        </p:nvSpPr>
+        <p:spPr>
+          <a:xfrm>
+            <a:off x="9684779" y="4302460"/>
+            <a:ext cx="2069726" cy="407754"/>
+          </a:xfrm>
+          <a:prstGeom prst="rect">
+            <a:avLst/>
+          </a:prstGeom>
+          <a:solidFill>
+            <a:schemeClr val="accent2"/>
+          </a:solidFill>
+          <a:ln>
+            <a:noFill/>
+          </a:ln>
+          <a:effectLst/>
+        </p:spPr>
+        <p:style>
+          <a:lnRef idx="1">
+            <a:schemeClr val="accent1"/>
+          </a:lnRef>
+          <a:fillRef idx="3">
+            <a:schemeClr val="accent1"/>
+          </a:fillRef>
+          <a:effectRef idx="2">
+            <a:schemeClr val="accent1"/>
+          </a:effectRef>
+          <a:fontRef idx="minor">
+            <a:schemeClr val="lt1"/>
+          </a:fontRef>
+        </p:style>
+        <p:txBody>
+          <a:bodyPr rtlCol="0" anchor="ctr"/>
+          <a:lstStyle/>
+          <a:p>
+            <a:pPr marL="0" marR="0" lvl="0" indent="0" algn="ctr" defTabSz="913852" rtl="0" eaLnBrk="0" fontAlgn="base" latinLnBrk="0" hangingPunct="0">
+              <a:lnSpc>
+                <a:spcPct val="100000"/>
+              </a:lnSpc>
+              <a:spcBef>
+                <a:spcPct val="0"/>
+              </a:spcBef>
+              <a:spcAft>
+                <a:spcPct val="0"/>
+              </a:spcAft>
+              <a:buClrTx/>
+              <a:buSzTx/>
+              <a:buFontTx/>
+              <a:buNone/>
+              <a:tabLst/>
+              <a:defRPr/>
+            </a:pPr>
+            <a:r>
+              <a:rPr kumimoji="0" lang="en-US" sz="1600" b="0" i="0" u="none" strike="noStrike" kern="1200" cap="none" spc="0" normalizeH="0" baseline="0" noProof="0">
+                <a:ln>
+                  <a:noFill/>
+                </a:ln>
+                <a:solidFill>
+                  <a:prstClr val="white"/>
+                </a:solidFill>
+                <a:effectLst/>
+                <a:uLnTx/>
+                <a:uFillTx/>
+                <a:ea typeface="+mn-ea"/>
+                <a:cs typeface="+mn-cs"/>
+              </a:rPr>
+              <a:t>Secure Boot</a:t>
+            </a:r>
+          </a:p>
+        </p:txBody>
+      </p:sp>
+      <p:sp>
+        <p:nvSpPr>
+          <p:cNvPr id="38" name="Right Brace 37">
+            <a:extLst>
+              <a:ext uri="{FF2B5EF4-FFF2-40B4-BE49-F238E27FC236}">
+                <a16:creationId xmlns:a16="http://schemas.microsoft.com/office/drawing/2014/main" id="{CCD7AC10-3263-4A71-9152-DCE894863E92}"/>
+              </a:ext>
+            </a:extLst>
+          </p:cNvPr>
+          <p:cNvSpPr/>
+          <p:nvPr/>
+        </p:nvSpPr>
+        <p:spPr>
+          <a:xfrm rot="16200000">
+            <a:off x="10563499" y="765012"/>
+            <a:ext cx="341088" cy="2421484"/>
+          </a:xfrm>
+          <a:prstGeom prst="rightBrace">
+            <a:avLst>
+              <a:gd name="adj1" fmla="val 79894"/>
+              <a:gd name="adj2" fmla="val 50784"/>
+            </a:avLst>
+          </a:prstGeom>
+          <a:ln w="28575"/>
+        </p:spPr>
+        <p:style>
+          <a:lnRef idx="1">
+            <a:schemeClr val="accent1"/>
+          </a:lnRef>
+          <a:fillRef idx="0">
+            <a:schemeClr val="accent1"/>
+          </a:fillRef>
+          <a:effectRef idx="0">
+            <a:schemeClr val="accent1"/>
+          </a:effectRef>
+          <a:fontRef idx="minor">
+            <a:schemeClr val="tx1"/>
+          </a:fontRef>
+        </p:style>
+        <p:txBody>
+          <a:bodyPr rtlCol="0" anchor="ctr"/>
+          <a:lstStyle/>
+          <a:p>
+            <a:pPr algn="ctr"/>
+            <a:endParaRPr lang="en-US" sz="2000"/>
+          </a:p>
+        </p:txBody>
+      </p:sp>
+      <p:sp>
+        <p:nvSpPr>
+          <p:cNvPr id="48" name="TextBox 47">
+            <a:extLst>
+              <a:ext uri="{FF2B5EF4-FFF2-40B4-BE49-F238E27FC236}">
+                <a16:creationId xmlns:a16="http://schemas.microsoft.com/office/drawing/2014/main" id="{0D1D4D40-5171-4513-8434-8B578C3DADB7}"/>
+              </a:ext>
+            </a:extLst>
+          </p:cNvPr>
+          <p:cNvSpPr txBox="1"/>
+          <p:nvPr/>
+        </p:nvSpPr>
+        <p:spPr>
+          <a:xfrm>
+            <a:off x="9549245" y="1462769"/>
+            <a:ext cx="2235200" cy="249299"/>
+          </a:xfrm>
+          <a:prstGeom prst="rect">
+            <a:avLst/>
+          </a:prstGeom>
+          <a:noFill/>
+        </p:spPr>
+        <p:txBody>
+          <a:bodyPr wrap="square" lIns="0" tIns="0" rIns="0" bIns="0" rtlCol="0">
+            <a:spAutoFit/>
+          </a:bodyPr>
+          <a:lstStyle/>
+          <a:p>
+            <a:pPr algn="ctr" defTabSz="914126" eaLnBrk="1" hangingPunct="1">
+              <a:lnSpc>
+                <a:spcPct val="90000"/>
+              </a:lnSpc>
+              <a:spcBef>
+                <a:spcPts val="0"/>
+              </a:spcBef>
+              <a:spcAft>
+                <a:spcPts val="600"/>
+              </a:spcAft>
+            </a:pPr>
+            <a:r>
+              <a:rPr lang="en-GB" err="1">
+                <a:solidFill>
+                  <a:schemeClr val="tx2"/>
+                </a:solidFill>
+                <a:latin typeface="+mn-lt"/>
+                <a:ea typeface="+mn-ea"/>
+              </a:rPr>
+              <a:t>TrustZone</a:t>
+            </a:r>
+            <a:r>
+              <a:rPr lang="en-GB">
+                <a:solidFill>
+                  <a:schemeClr val="tx2"/>
+                </a:solidFill>
+                <a:latin typeface="+mn-lt"/>
+                <a:ea typeface="+mn-ea"/>
+              </a:rPr>
+              <a:t> Security</a:t>
+            </a:r>
+            <a:endParaRPr lang="en-US">
+              <a:solidFill>
+                <a:schemeClr val="tx2"/>
+              </a:solidFill>
+              <a:latin typeface="+mn-lt"/>
+              <a:ea typeface="+mn-ea"/>
+            </a:endParaRPr>
+          </a:p>
+        </p:txBody>
+      </p:sp>
+      <p:sp>
+        <p:nvSpPr>
+          <p:cNvPr id="53" name="Rectangle 52">
+            <a:extLst>
+              <a:ext uri="{FF2B5EF4-FFF2-40B4-BE49-F238E27FC236}">
+                <a16:creationId xmlns:a16="http://schemas.microsoft.com/office/drawing/2014/main" id="{E4776C67-AD7C-4F51-942A-8BD54C4E6887}"/>
+              </a:ext>
+            </a:extLst>
+          </p:cNvPr>
+          <p:cNvSpPr/>
+          <p:nvPr/>
+        </p:nvSpPr>
+        <p:spPr>
+          <a:xfrm>
+            <a:off x="7516073" y="3583382"/>
+            <a:ext cx="1650489" cy="445876"/>
+          </a:xfrm>
+          <a:prstGeom prst="rect">
+            <a:avLst/>
+          </a:prstGeom>
+          <a:solidFill>
+            <a:schemeClr val="accent5">
+              <a:lumMod val="75000"/>
+            </a:schemeClr>
+          </a:solidFill>
+          <a:ln w="9525" cap="flat" cmpd="sng" algn="ctr">
+            <a:noFill/>
+            <a:prstDash val="solid"/>
+          </a:ln>
+          <a:effectLst/>
+        </p:spPr>
+        <p:txBody>
+          <a:bodyPr lIns="91444" tIns="45723" rIns="91444" bIns="45723" rtlCol="0" anchor="ctr"/>
+          <a:lstStyle/>
+          <a:p>
+            <a:pPr marL="0" marR="0" lvl="0" indent="0" algn="ctr" defTabSz="457210" rtl="0" eaLnBrk="1" fontAlgn="auto" latinLnBrk="0" hangingPunct="1">
+              <a:lnSpc>
+                <a:spcPct val="100000"/>
+              </a:lnSpc>
+              <a:spcBef>
+                <a:spcPts val="0"/>
+              </a:spcBef>
+              <a:spcAft>
+                <a:spcPts val="0"/>
+              </a:spcAft>
+              <a:buClrTx/>
+              <a:buSzTx/>
+              <a:buFontTx/>
+              <a:buNone/>
+              <a:tabLst/>
+              <a:defRPr/>
+            </a:pPr>
+            <a:r>
+              <a:rPr kumimoji="0" lang="en-US" sz="1600" b="0" i="0" u="none" strike="noStrike" kern="0" cap="none" spc="0" normalizeH="0" baseline="0" noProof="0" dirty="0" err="1">
+                <a:ln>
+                  <a:noFill/>
+                </a:ln>
+                <a:solidFill>
+                  <a:srgbClr val="FFFFFF"/>
+                </a:solidFill>
+                <a:effectLst/>
+                <a:uLnTx/>
+                <a:uFillTx/>
+                <a:latin typeface="+mn-lt"/>
+                <a:ea typeface="ＭＳ Ｐゴシック" panose="020B0600070205080204" pitchFamily="34" charset="-128"/>
+                <a:cs typeface="+mn-cs"/>
+              </a:rPr>
+              <a:t>FreeRTOS</a:t>
+            </a:r>
+            <a:r>
+              <a:rPr kumimoji="0" lang="en-US" sz="1600" b="0" i="0" u="none" strike="noStrike" kern="0" cap="none" spc="0" normalizeH="0" baseline="0" noProof="0" dirty="0">
+                <a:ln>
+                  <a:noFill/>
+                </a:ln>
+                <a:solidFill>
+                  <a:srgbClr val="FFFFFF"/>
+                </a:solidFill>
+                <a:effectLst/>
+                <a:uLnTx/>
+                <a:uFillTx/>
+                <a:latin typeface="+mn-lt"/>
+                <a:ea typeface="ＭＳ Ｐゴシック" panose="020B0600070205080204" pitchFamily="34" charset="-128"/>
+                <a:cs typeface="+mn-cs"/>
+              </a:rPr>
+              <a:t>, RTX, </a:t>
+            </a:r>
+            <a:r>
+              <a:rPr kumimoji="0" lang="en-US" sz="1100" b="0" i="0" u="none" strike="noStrike" kern="0" cap="none" spc="0" normalizeH="0" baseline="0" noProof="0" dirty="0">
+                <a:ln>
+                  <a:noFill/>
+                </a:ln>
+                <a:solidFill>
+                  <a:srgbClr val="FFFFFF"/>
+                </a:solidFill>
+                <a:effectLst/>
+                <a:uLnTx/>
+                <a:uFillTx/>
+                <a:latin typeface="+mn-lt"/>
+                <a:ea typeface="ＭＳ Ｐゴシック" panose="020B0600070205080204" pitchFamily="34" charset="-128"/>
+                <a:cs typeface="+mn-cs"/>
+              </a:rPr>
+              <a:t>…</a:t>
+            </a:r>
+          </a:p>
+        </p:txBody>
+      </p:sp>
+      <p:sp>
+        <p:nvSpPr>
+          <p:cNvPr id="59" name="Rectangle 58">
+            <a:extLst>
+              <a:ext uri="{FF2B5EF4-FFF2-40B4-BE49-F238E27FC236}">
+                <a16:creationId xmlns:a16="http://schemas.microsoft.com/office/drawing/2014/main" id="{15D0AF1A-D23A-4240-B5E3-2FEA3A4CFA96}"/>
+              </a:ext>
+            </a:extLst>
+          </p:cNvPr>
+          <p:cNvSpPr/>
+          <p:nvPr/>
+        </p:nvSpPr>
+        <p:spPr>
+          <a:xfrm>
+            <a:off x="1234083" y="5451181"/>
+            <a:ext cx="1645920" cy="1167328"/>
+          </a:xfrm>
+          <a:prstGeom prst="rect">
+            <a:avLst/>
+          </a:prstGeom>
+          <a:solidFill>
+            <a:srgbClr val="58595B"/>
+          </a:solidFill>
+          <a:ln w="9525" cap="flat" cmpd="sng" algn="ctr">
+            <a:noFill/>
+            <a:prstDash val="solid"/>
+          </a:ln>
+          <a:effectLst/>
+        </p:spPr>
+        <p:txBody>
+          <a:bodyPr lIns="91444" tIns="45723" rIns="91444" bIns="45723" rtlCol="0" anchor="t"/>
+          <a:lstStyle/>
+          <a:p>
+            <a:pPr marL="114304" marR="0" lvl="0" indent="-114304" algn="l" defTabSz="457210" rtl="0" eaLnBrk="1" fontAlgn="auto" latinLnBrk="0" hangingPunct="1">
+              <a:lnSpc>
+                <a:spcPct val="100000"/>
+              </a:lnSpc>
+              <a:spcBef>
+                <a:spcPts val="0"/>
+              </a:spcBef>
+              <a:spcAft>
+                <a:spcPts val="0"/>
+              </a:spcAft>
+              <a:buClrTx/>
+              <a:buSzTx/>
+              <a:buFont typeface="Arial" panose="020B0604020202020204" pitchFamily="34" charset="0"/>
+              <a:buChar char="•"/>
+              <a:tabLst/>
+              <a:defRPr/>
+            </a:pPr>
+            <a:r>
+              <a:rPr kumimoji="0" lang="en-US" sz="1600" b="0" i="0" u="none" strike="noStrike" kern="0" cap="none" spc="0" normalizeH="0" baseline="0" noProof="0">
+                <a:ln>
+                  <a:noFill/>
+                </a:ln>
+                <a:solidFill>
+                  <a:srgbClr val="FFFFFF"/>
+                </a:solidFill>
+                <a:effectLst/>
+                <a:uLnTx/>
+                <a:uFillTx/>
+                <a:latin typeface="+mn-lt"/>
+                <a:ea typeface="ＭＳ Ｐゴシック" panose="020B0600070205080204" pitchFamily="34" charset="-128"/>
+                <a:cs typeface="+mn-cs"/>
+              </a:rPr>
+              <a:t>SPI</a:t>
+            </a:r>
+          </a:p>
+          <a:p>
+            <a:pPr marL="114304" marR="0" lvl="0" indent="-114304" algn="l" defTabSz="457210" rtl="0" eaLnBrk="1" fontAlgn="auto" latinLnBrk="0" hangingPunct="1">
+              <a:lnSpc>
+                <a:spcPct val="100000"/>
+              </a:lnSpc>
+              <a:spcBef>
+                <a:spcPts val="0"/>
+              </a:spcBef>
+              <a:spcAft>
+                <a:spcPts val="0"/>
+              </a:spcAft>
+              <a:buClrTx/>
+              <a:buSzTx/>
+              <a:buFont typeface="Arial" panose="020B0604020202020204" pitchFamily="34" charset="0"/>
+              <a:buChar char="•"/>
+              <a:tabLst/>
+              <a:defRPr/>
+            </a:pPr>
+            <a:r>
+              <a:rPr kumimoji="0" lang="en-US" sz="1600" b="0" i="0" u="none" strike="noStrike" kern="0" cap="none" spc="0" normalizeH="0" baseline="0" noProof="0">
+                <a:ln>
+                  <a:noFill/>
+                </a:ln>
+                <a:solidFill>
+                  <a:srgbClr val="FFFFFF"/>
+                </a:solidFill>
+                <a:effectLst/>
+                <a:uLnTx/>
+                <a:uFillTx/>
+                <a:latin typeface="+mn-lt"/>
+                <a:ea typeface="ＭＳ Ｐゴシック" panose="020B0600070205080204" pitchFamily="34" charset="-128"/>
+                <a:cs typeface="+mn-cs"/>
+              </a:rPr>
+              <a:t>I2C</a:t>
+            </a:r>
+          </a:p>
+          <a:p>
+            <a:pPr marL="114304" marR="0" lvl="0" indent="-114304" algn="l" defTabSz="457210" rtl="0" eaLnBrk="1" fontAlgn="auto" latinLnBrk="0" hangingPunct="1">
+              <a:lnSpc>
+                <a:spcPct val="100000"/>
+              </a:lnSpc>
+              <a:spcBef>
+                <a:spcPts val="0"/>
+              </a:spcBef>
+              <a:spcAft>
+                <a:spcPts val="0"/>
+              </a:spcAft>
+              <a:buClrTx/>
+              <a:buSzTx/>
+              <a:buFont typeface="Arial" panose="020B0604020202020204" pitchFamily="34" charset="0"/>
+              <a:buChar char="•"/>
+              <a:tabLst/>
+              <a:defRPr/>
+            </a:pPr>
+            <a:r>
+              <a:rPr kumimoji="0" lang="en-US" sz="1600" b="0" i="0" u="none" strike="noStrike" kern="0" cap="none" spc="0" normalizeH="0" baseline="0" noProof="0">
+                <a:ln>
+                  <a:noFill/>
+                </a:ln>
+                <a:solidFill>
+                  <a:srgbClr val="FFFFFF"/>
+                </a:solidFill>
+                <a:effectLst/>
+                <a:uLnTx/>
+                <a:uFillTx/>
+                <a:latin typeface="+mn-lt"/>
+                <a:ea typeface="ＭＳ Ｐゴシック" panose="020B0600070205080204" pitchFamily="34" charset="-128"/>
+                <a:cs typeface="+mn-cs"/>
+              </a:rPr>
+              <a:t>USART</a:t>
+            </a:r>
+          </a:p>
+          <a:p>
+            <a:pPr marL="114304" marR="0" lvl="0" indent="-114304" algn="l" defTabSz="457210" rtl="0" eaLnBrk="1" fontAlgn="auto" latinLnBrk="0" hangingPunct="1">
+              <a:lnSpc>
+                <a:spcPct val="100000"/>
+              </a:lnSpc>
+              <a:spcBef>
+                <a:spcPts val="0"/>
+              </a:spcBef>
+              <a:spcAft>
+                <a:spcPts val="0"/>
+              </a:spcAft>
+              <a:buClrTx/>
+              <a:buSzTx/>
+              <a:buFont typeface="Arial" panose="020B0604020202020204" pitchFamily="34" charset="0"/>
+              <a:buChar char="•"/>
+              <a:tabLst/>
+              <a:defRPr/>
+            </a:pPr>
+            <a:r>
+              <a:rPr kumimoji="0" lang="en-US" sz="1600" b="0" i="0" u="none" strike="noStrike" kern="0" cap="none" spc="0" normalizeH="0" baseline="0" noProof="0" err="1">
+                <a:ln>
+                  <a:noFill/>
+                </a:ln>
+                <a:solidFill>
+                  <a:srgbClr val="FFFFFF"/>
+                </a:solidFill>
+                <a:effectLst/>
+                <a:uLnTx/>
+                <a:uFillTx/>
+                <a:latin typeface="+mn-lt"/>
+                <a:ea typeface="ＭＳ Ｐゴシック" panose="020B0600070205080204" pitchFamily="34" charset="-128"/>
+                <a:cs typeface="+mn-cs"/>
+              </a:rPr>
+              <a:t>WiFi</a:t>
+            </a:r>
+            <a:br>
+              <a:rPr kumimoji="0" lang="en-US" sz="1200" b="0" i="0" u="none" strike="noStrike" kern="0" cap="none" spc="0" normalizeH="0" baseline="0" noProof="0">
+                <a:ln>
+                  <a:noFill/>
+                </a:ln>
+                <a:solidFill>
+                  <a:srgbClr val="FFFFFF"/>
+                </a:solidFill>
+                <a:effectLst/>
+                <a:uLnTx/>
+                <a:uFillTx/>
+                <a:latin typeface="+mn-lt"/>
+                <a:ea typeface="ＭＳ Ｐゴシック" panose="020B0600070205080204" pitchFamily="34" charset="-128"/>
+                <a:cs typeface="+mn-cs"/>
+              </a:rPr>
+            </a:br>
+            <a:endParaRPr kumimoji="0" lang="en-US" sz="1200" b="0" i="0" u="none" strike="noStrike" kern="0" cap="none" spc="0" normalizeH="0" baseline="0" noProof="0">
+              <a:ln>
+                <a:noFill/>
+              </a:ln>
+              <a:solidFill>
+                <a:srgbClr val="FFFFFF"/>
+              </a:solidFill>
+              <a:effectLst/>
+              <a:uLnTx/>
+              <a:uFillTx/>
+              <a:latin typeface="+mn-lt"/>
+              <a:ea typeface="ＭＳ Ｐゴシック" panose="020B0600070205080204" pitchFamily="34" charset="-128"/>
+              <a:cs typeface="+mn-cs"/>
+            </a:endParaRPr>
+          </a:p>
+        </p:txBody>
+      </p:sp>
+      <p:sp>
+        <p:nvSpPr>
+          <p:cNvPr id="60" name="Down Arrow 23">
+            <a:extLst>
+              <a:ext uri="{FF2B5EF4-FFF2-40B4-BE49-F238E27FC236}">
+                <a16:creationId xmlns:a16="http://schemas.microsoft.com/office/drawing/2014/main" id="{3713E8F0-69F7-4A10-AB71-F7212563F60F}"/>
+              </a:ext>
+            </a:extLst>
+          </p:cNvPr>
+          <p:cNvSpPr/>
+          <p:nvPr/>
+        </p:nvSpPr>
+        <p:spPr>
+          <a:xfrm>
+            <a:off x="1460005" y="1631731"/>
+            <a:ext cx="1160951" cy="3819451"/>
+          </a:xfrm>
+          <a:prstGeom prst="downArrow">
+            <a:avLst>
+              <a:gd name="adj1" fmla="val 50000"/>
+              <a:gd name="adj2" fmla="val 26971"/>
+            </a:avLst>
+          </a:prstGeom>
+          <a:gradFill rotWithShape="1">
+            <a:gsLst>
+              <a:gs pos="0">
+                <a:srgbClr val="ED174F">
+                  <a:lumMod val="20000"/>
+                  <a:lumOff val="80000"/>
+                </a:srgbClr>
+              </a:gs>
+              <a:gs pos="64000">
+                <a:srgbClr val="ED174F">
+                  <a:lumMod val="40000"/>
+                  <a:lumOff val="60000"/>
+                </a:srgbClr>
+              </a:gs>
+              <a:gs pos="100000">
+                <a:srgbClr val="FF0000">
+                  <a:alpha val="60000"/>
+                </a:srgbClr>
+              </a:gs>
+            </a:gsLst>
+            <a:lin ang="5400000" scaled="0"/>
+          </a:gradFill>
+          <a:ln w="9525" cap="flat" cmpd="sng" algn="ctr">
+            <a:noFill/>
+            <a:prstDash val="solid"/>
+          </a:ln>
+          <a:effectLst/>
+        </p:spPr>
+        <p:txBody>
+          <a:bodyPr lIns="91444" tIns="45723" rIns="91444" bIns="45723" rtlCol="0" anchor="ctr"/>
+          <a:lstStyle/>
+          <a:p>
+            <a:pPr marL="0" marR="0" lvl="0" indent="0" algn="ctr" defTabSz="457210" rtl="0" eaLnBrk="1" fontAlgn="auto" latinLnBrk="0" hangingPunct="1">
+              <a:lnSpc>
+                <a:spcPct val="100000"/>
+              </a:lnSpc>
+              <a:spcBef>
+                <a:spcPts val="0"/>
+              </a:spcBef>
+              <a:spcAft>
+                <a:spcPts val="0"/>
+              </a:spcAft>
+              <a:buClrTx/>
+              <a:buSzTx/>
+              <a:buFontTx/>
+              <a:buNone/>
+              <a:tabLst/>
+              <a:defRPr/>
+            </a:pPr>
+            <a:endParaRPr kumimoji="0" lang="en-GB" sz="1467" b="0" i="0" u="none" strike="noStrike" kern="0" cap="none" spc="0" normalizeH="0" baseline="0" noProof="0">
+              <a:ln>
+                <a:noFill/>
+              </a:ln>
+              <a:solidFill>
+                <a:srgbClr val="FFFFFF"/>
+              </a:solidFill>
+              <a:effectLst/>
+              <a:uLnTx/>
+              <a:uFillTx/>
+              <a:latin typeface="+mn-lt"/>
+              <a:ea typeface="ＭＳ Ｐゴシック" panose="020B0600070205080204" pitchFamily="34" charset="-128"/>
+              <a:cs typeface="+mn-cs"/>
+            </a:endParaRPr>
+          </a:p>
+        </p:txBody>
+      </p:sp>
+      <p:sp>
+        <p:nvSpPr>
+          <p:cNvPr id="61" name="Rectangle 60">
+            <a:extLst>
+              <a:ext uri="{FF2B5EF4-FFF2-40B4-BE49-F238E27FC236}">
+                <a16:creationId xmlns:a16="http://schemas.microsoft.com/office/drawing/2014/main" id="{A474B3E5-2D4B-40B4-B5D7-0977465B1959}"/>
+              </a:ext>
+            </a:extLst>
+          </p:cNvPr>
+          <p:cNvSpPr/>
+          <p:nvPr/>
+        </p:nvSpPr>
+        <p:spPr>
+          <a:xfrm>
+            <a:off x="1246628" y="3008151"/>
+            <a:ext cx="1645920" cy="445876"/>
+          </a:xfrm>
+          <a:prstGeom prst="rect">
+            <a:avLst/>
+          </a:prstGeom>
+          <a:solidFill>
+            <a:srgbClr val="4E5584"/>
+          </a:solidFill>
+          <a:ln w="9525" cap="flat" cmpd="sng" algn="ctr">
+            <a:noFill/>
+            <a:prstDash val="solid"/>
+          </a:ln>
+          <a:effectLst/>
+        </p:spPr>
+        <p:txBody>
+          <a:bodyPr lIns="36003" tIns="45723" rIns="36003" bIns="45723" rtlCol="0" anchor="ctr"/>
+          <a:lstStyle/>
+          <a:p>
+            <a:pPr marL="0" marR="0" lvl="0" indent="0" algn="ctr" defTabSz="457210" rtl="0" eaLnBrk="1" fontAlgn="auto" latinLnBrk="0" hangingPunct="1">
+              <a:lnSpc>
+                <a:spcPct val="100000"/>
+              </a:lnSpc>
+              <a:spcBef>
+                <a:spcPts val="0"/>
+              </a:spcBef>
+              <a:spcAft>
+                <a:spcPts val="0"/>
+              </a:spcAft>
+              <a:buClrTx/>
+              <a:buSzTx/>
+              <a:buFontTx/>
+              <a:buNone/>
+              <a:tabLst/>
+              <a:defRPr/>
+            </a:pPr>
+            <a:r>
+              <a:rPr kumimoji="0" lang="en-US" sz="1600" b="0" i="0" u="none" strike="noStrike" kern="0" cap="none" spc="0" normalizeH="0" baseline="0" noProof="0">
+                <a:ln>
+                  <a:noFill/>
+                </a:ln>
+                <a:solidFill>
+                  <a:srgbClr val="FFFFFF"/>
+                </a:solidFill>
+                <a:effectLst/>
+                <a:uLnTx/>
+                <a:uFillTx/>
+                <a:latin typeface="+mn-lt"/>
+                <a:ea typeface="ＭＳ Ｐゴシック" panose="020B0600070205080204" pitchFamily="34" charset="-128"/>
+                <a:cs typeface="+mn-cs"/>
+              </a:rPr>
+              <a:t>CMSIS-Driver</a:t>
+            </a:r>
+          </a:p>
+          <a:p>
+            <a:pPr marL="0" marR="0" lvl="0" indent="0" algn="ctr" defTabSz="457210" rtl="0" eaLnBrk="1" fontAlgn="auto" latinLnBrk="0" hangingPunct="1">
+              <a:lnSpc>
+                <a:spcPct val="100000"/>
+              </a:lnSpc>
+              <a:spcBef>
+                <a:spcPts val="0"/>
+              </a:spcBef>
+              <a:spcAft>
+                <a:spcPts val="0"/>
+              </a:spcAft>
+              <a:buClrTx/>
+              <a:buSzTx/>
+              <a:buFontTx/>
+              <a:buNone/>
+              <a:tabLst/>
+              <a:defRPr/>
+            </a:pPr>
+            <a:r>
+              <a:rPr lang="en-US" sz="1300" kern="0">
+                <a:solidFill>
+                  <a:srgbClr val="FFFFFF"/>
+                </a:solidFill>
+                <a:latin typeface="+mn-lt"/>
+              </a:rPr>
+              <a:t>SPI, UART, (Ethernet)</a:t>
+            </a:r>
+            <a:endParaRPr kumimoji="0" lang="en-US" sz="1300" b="0" i="0" u="none" strike="noStrike" kern="0" cap="none" spc="0" normalizeH="0" baseline="0" noProof="0">
+              <a:ln>
+                <a:noFill/>
+              </a:ln>
+              <a:solidFill>
+                <a:srgbClr val="FFFFFF"/>
+              </a:solidFill>
+              <a:effectLst/>
+              <a:uLnTx/>
+              <a:uFillTx/>
+              <a:latin typeface="+mn-lt"/>
+              <a:ea typeface="ＭＳ Ｐゴシック" panose="020B0600070205080204" pitchFamily="34" charset="-128"/>
+              <a:cs typeface="+mn-cs"/>
+            </a:endParaRPr>
+          </a:p>
+        </p:txBody>
+      </p:sp>
+      <p:sp>
+        <p:nvSpPr>
+          <p:cNvPr id="62" name="Rectangle 61">
+            <a:extLst>
+              <a:ext uri="{FF2B5EF4-FFF2-40B4-BE49-F238E27FC236}">
+                <a16:creationId xmlns:a16="http://schemas.microsoft.com/office/drawing/2014/main" id="{DAA024B8-9479-4487-8E6B-CDC493B8AE2B}"/>
+              </a:ext>
+            </a:extLst>
+          </p:cNvPr>
+          <p:cNvSpPr/>
+          <p:nvPr/>
+        </p:nvSpPr>
+        <p:spPr>
+          <a:xfrm>
+            <a:off x="1238020" y="1351370"/>
+            <a:ext cx="1663262" cy="608484"/>
+          </a:xfrm>
+          <a:prstGeom prst="rect">
+            <a:avLst/>
+          </a:prstGeom>
+          <a:solidFill>
+            <a:srgbClr val="00958B"/>
+          </a:solidFill>
+          <a:ln w="9525" cap="flat" cmpd="sng" algn="ctr">
+            <a:noFill/>
+            <a:prstDash val="solid"/>
+          </a:ln>
+          <a:effectLst/>
+        </p:spPr>
+        <p:txBody>
+          <a:bodyPr lIns="91444" tIns="45723" rIns="91444" bIns="45723" rtlCol="0" anchor="ctr"/>
+          <a:lstStyle/>
+          <a:p>
+            <a:pPr marL="0" marR="0" lvl="0" indent="0" algn="ctr" defTabSz="457210" rtl="0" eaLnBrk="1" fontAlgn="auto" latinLnBrk="0" hangingPunct="1">
+              <a:lnSpc>
+                <a:spcPct val="100000"/>
+              </a:lnSpc>
+              <a:spcBef>
+                <a:spcPts val="0"/>
+              </a:spcBef>
+              <a:spcAft>
+                <a:spcPts val="0"/>
+              </a:spcAft>
+              <a:buClrTx/>
+              <a:buSzTx/>
+              <a:buFontTx/>
+              <a:buNone/>
+              <a:tabLst/>
+              <a:defRPr/>
+            </a:pPr>
+            <a:r>
+              <a:rPr kumimoji="0" lang="en-US" sz="1600" b="0" i="0" u="none" strike="noStrike" kern="0" cap="none" spc="0" normalizeH="0" baseline="0" noProof="0">
+                <a:ln>
+                  <a:noFill/>
+                </a:ln>
+                <a:solidFill>
+                  <a:srgbClr val="FFFFFF"/>
+                </a:solidFill>
+                <a:effectLst/>
+                <a:uLnTx/>
+                <a:uFillTx/>
+                <a:latin typeface="+mn-lt"/>
+                <a:ea typeface="ＭＳ Ｐゴシック" panose="020B0600070205080204" pitchFamily="34" charset="-128"/>
+                <a:cs typeface="+mn-cs"/>
+              </a:rPr>
+              <a:t>Cloud Connector</a:t>
+            </a:r>
+            <a:br>
+              <a:rPr kumimoji="0" lang="en-US" sz="1600" b="0" i="0" u="none" strike="noStrike" kern="0" cap="none" spc="0" normalizeH="0" baseline="0" noProof="0">
+                <a:ln>
+                  <a:noFill/>
+                </a:ln>
+                <a:solidFill>
+                  <a:srgbClr val="FFFFFF"/>
+                </a:solidFill>
+                <a:effectLst/>
+                <a:uLnTx/>
+                <a:uFillTx/>
+                <a:latin typeface="+mn-lt"/>
+                <a:ea typeface="ＭＳ Ｐゴシック" panose="020B0600070205080204" pitchFamily="34" charset="-128"/>
+                <a:cs typeface="+mn-cs"/>
+              </a:rPr>
+            </a:br>
+            <a:r>
+              <a:rPr kumimoji="0" lang="en-US" sz="1100" b="0" i="0" u="none" strike="noStrike" kern="0" cap="none" spc="0" normalizeH="0" baseline="0" noProof="0">
+                <a:ln>
+                  <a:noFill/>
+                </a:ln>
+                <a:solidFill>
+                  <a:srgbClr val="FFFFFF"/>
+                </a:solidFill>
+                <a:effectLst/>
+                <a:uLnTx/>
+                <a:uFillTx/>
+                <a:latin typeface="+mn-lt"/>
+                <a:ea typeface="ＭＳ Ｐゴシック" panose="020B0600070205080204" pitchFamily="34" charset="-128"/>
+                <a:cs typeface="+mn-cs"/>
+              </a:rPr>
+              <a:t>+ Security</a:t>
+            </a:r>
+          </a:p>
+        </p:txBody>
+      </p:sp>
+      <p:sp>
+        <p:nvSpPr>
+          <p:cNvPr id="63" name="Rectangle 62">
+            <a:extLst>
+              <a:ext uri="{FF2B5EF4-FFF2-40B4-BE49-F238E27FC236}">
+                <a16:creationId xmlns:a16="http://schemas.microsoft.com/office/drawing/2014/main" id="{8C0AA59E-D4DA-4341-ADC1-325DECB83E09}"/>
+              </a:ext>
+            </a:extLst>
+          </p:cNvPr>
+          <p:cNvSpPr/>
+          <p:nvPr/>
+        </p:nvSpPr>
+        <p:spPr>
+          <a:xfrm>
+            <a:off x="1229764" y="2165605"/>
+            <a:ext cx="1645920" cy="624227"/>
+          </a:xfrm>
+          <a:prstGeom prst="rect">
+            <a:avLst/>
+          </a:prstGeom>
+          <a:solidFill>
+            <a:schemeClr val="accent3">
+              <a:lumMod val="75000"/>
+            </a:schemeClr>
+          </a:solidFill>
+          <a:ln w="9525" cap="flat" cmpd="sng" algn="ctr">
+            <a:noFill/>
+            <a:prstDash val="solid"/>
+          </a:ln>
+          <a:effectLst/>
+        </p:spPr>
+        <p:txBody>
+          <a:bodyPr lIns="91444" tIns="45723" rIns="91444" bIns="45723" rtlCol="0" anchor="ctr"/>
+          <a:lstStyle/>
+          <a:p>
+            <a:pPr marL="0" marR="0" lvl="0" indent="0" algn="ctr" defTabSz="457210" rtl="0" eaLnBrk="1" fontAlgn="auto" latinLnBrk="0" hangingPunct="1">
+              <a:lnSpc>
+                <a:spcPct val="100000"/>
+              </a:lnSpc>
+              <a:spcBef>
+                <a:spcPts val="0"/>
+              </a:spcBef>
+              <a:spcAft>
+                <a:spcPts val="0"/>
+              </a:spcAft>
+              <a:buClrTx/>
+              <a:buSzTx/>
+              <a:buFontTx/>
+              <a:buNone/>
+              <a:tabLst/>
+              <a:defRPr/>
+            </a:pPr>
+            <a:r>
+              <a:rPr kumimoji="0" lang="en-US" sz="1400" b="0" i="0" u="none" strike="noStrike" kern="0" cap="none" spc="0" normalizeH="0" baseline="0" noProof="0">
+                <a:ln>
+                  <a:noFill/>
+                </a:ln>
+                <a:solidFill>
+                  <a:srgbClr val="FFFFFF"/>
+                </a:solidFill>
+                <a:effectLst/>
+                <a:uLnTx/>
+                <a:uFillTx/>
+                <a:latin typeface="+mn-lt"/>
+                <a:ea typeface="ＭＳ Ｐゴシック" panose="020B0600070205080204" pitchFamily="34" charset="-128"/>
+                <a:cs typeface="+mn-cs"/>
+              </a:rPr>
+              <a:t>IoT Socket</a:t>
+            </a:r>
+            <a:br>
+              <a:rPr kumimoji="0" lang="en-US" sz="1400" b="0" i="0" u="none" strike="noStrike" kern="0" cap="none" spc="0" normalizeH="0" baseline="0" noProof="0">
+                <a:ln>
+                  <a:noFill/>
+                </a:ln>
+                <a:solidFill>
+                  <a:srgbClr val="FFFFFF"/>
+                </a:solidFill>
+                <a:effectLst/>
+                <a:uLnTx/>
+                <a:uFillTx/>
+                <a:latin typeface="+mn-lt"/>
+                <a:ea typeface="ＭＳ Ｐゴシック" panose="020B0600070205080204" pitchFamily="34" charset="-128"/>
+                <a:cs typeface="+mn-cs"/>
+              </a:rPr>
+            </a:br>
+            <a:r>
+              <a:rPr kumimoji="0" lang="en-US" sz="1100" b="0" i="0" u="none" strike="noStrike" kern="0" cap="none" spc="0" normalizeH="0" baseline="0" noProof="0">
+                <a:ln>
+                  <a:noFill/>
+                </a:ln>
+                <a:solidFill>
+                  <a:srgbClr val="FFFFFF"/>
+                </a:solidFill>
+                <a:effectLst/>
+                <a:uLnTx/>
+                <a:uFillTx/>
+                <a:latin typeface="+mn-lt"/>
+                <a:ea typeface="ＭＳ Ｐゴシック" panose="020B0600070205080204" pitchFamily="34" charset="-128"/>
+                <a:cs typeface="+mn-cs"/>
+              </a:rPr>
+              <a:t>+ Communication Stack</a:t>
+            </a:r>
+            <a:endParaRPr kumimoji="0" lang="en-US" sz="1400" b="0" i="0" u="none" strike="noStrike" kern="0" cap="none" spc="0" normalizeH="0" baseline="0" noProof="0">
+              <a:ln>
+                <a:noFill/>
+              </a:ln>
+              <a:solidFill>
+                <a:srgbClr val="FFFFFF"/>
+              </a:solidFill>
+              <a:effectLst/>
+              <a:uLnTx/>
+              <a:uFillTx/>
+              <a:latin typeface="+mn-lt"/>
+              <a:ea typeface="ＭＳ Ｐゴシック" panose="020B0600070205080204" pitchFamily="34" charset="-128"/>
+              <a:cs typeface="+mn-cs"/>
+            </a:endParaRPr>
+          </a:p>
+        </p:txBody>
+      </p:sp>
+      <p:sp>
+        <p:nvSpPr>
+          <p:cNvPr id="32" name="Rectangle 31">
+            <a:extLst>
+              <a:ext uri="{FF2B5EF4-FFF2-40B4-BE49-F238E27FC236}">
+                <a16:creationId xmlns:a16="http://schemas.microsoft.com/office/drawing/2014/main" id="{DAE774E6-04AA-4E5C-94DB-2B2CE295B15E}"/>
+              </a:ext>
+            </a:extLst>
+          </p:cNvPr>
+          <p:cNvSpPr/>
+          <p:nvPr/>
+        </p:nvSpPr>
+        <p:spPr>
+          <a:xfrm>
+            <a:off x="1239716" y="4341093"/>
+            <a:ext cx="4311638" cy="624227"/>
+          </a:xfrm>
+          <a:prstGeom prst="rect">
+            <a:avLst/>
+          </a:prstGeom>
+          <a:solidFill>
+            <a:srgbClr val="808082"/>
+          </a:solidFill>
+          <a:ln w="9525" cap="flat" cmpd="sng" algn="ctr">
+            <a:noFill/>
+            <a:prstDash val="solid"/>
+          </a:ln>
+          <a:effectLst/>
+        </p:spPr>
+        <p:txBody>
+          <a:bodyPr lIns="91444" tIns="45723" rIns="91444" bIns="45723" rtlCol="0" anchor="ctr"/>
+          <a:lstStyle/>
+          <a:p>
+            <a:pPr marL="0" marR="0" lvl="0" indent="0" algn="ctr" defTabSz="457210" rtl="0" eaLnBrk="1" fontAlgn="auto" latinLnBrk="0" hangingPunct="1">
+              <a:lnSpc>
+                <a:spcPct val="100000"/>
+              </a:lnSpc>
+              <a:spcBef>
+                <a:spcPts val="0"/>
+              </a:spcBef>
+              <a:spcAft>
+                <a:spcPts val="0"/>
+              </a:spcAft>
+              <a:buClrTx/>
+              <a:buSzTx/>
+              <a:buFontTx/>
+              <a:buNone/>
+              <a:tabLst/>
+              <a:defRPr/>
+            </a:pPr>
+            <a:r>
+              <a:rPr kumimoji="0" lang="en-US" sz="1600" b="0" i="0" u="none" strike="noStrike" kern="0" cap="none" spc="0" normalizeH="0" baseline="0" noProof="0">
+                <a:ln>
+                  <a:noFill/>
+                </a:ln>
+                <a:solidFill>
+                  <a:srgbClr val="FFFFFF"/>
+                </a:solidFill>
+                <a:effectLst/>
+                <a:uLnTx/>
+                <a:uFillTx/>
+                <a:latin typeface="+mn-lt"/>
+                <a:ea typeface="ＭＳ Ｐゴシック" panose="020B0600070205080204" pitchFamily="34" charset="-128"/>
+                <a:cs typeface="+mn-cs"/>
+              </a:rPr>
+              <a:t>Peripherals covered by real</a:t>
+            </a:r>
+            <a:br>
+              <a:rPr kumimoji="0" lang="en-US" sz="1600" b="0" i="0" u="none" strike="noStrike" kern="0" cap="none" spc="0" normalizeH="0" baseline="0" noProof="0">
+                <a:ln>
+                  <a:noFill/>
+                </a:ln>
+                <a:solidFill>
+                  <a:srgbClr val="FFFFFF"/>
+                </a:solidFill>
+                <a:effectLst/>
+                <a:uLnTx/>
+                <a:uFillTx/>
+                <a:latin typeface="+mn-lt"/>
+                <a:ea typeface="ＭＳ Ｐゴシック" panose="020B0600070205080204" pitchFamily="34" charset="-128"/>
+                <a:cs typeface="+mn-cs"/>
+              </a:rPr>
+            </a:br>
+            <a:r>
+              <a:rPr kumimoji="0" lang="en-US" sz="1600" b="0" i="0" u="none" strike="noStrike" kern="0" cap="none" spc="0" normalizeH="0" baseline="0" noProof="0">
+                <a:ln>
+                  <a:noFill/>
+                </a:ln>
+                <a:solidFill>
+                  <a:srgbClr val="FFFFFF"/>
+                </a:solidFill>
+                <a:effectLst/>
+                <a:uLnTx/>
+                <a:uFillTx/>
+                <a:latin typeface="+mn-lt"/>
+                <a:ea typeface="ＭＳ Ｐゴシック" panose="020B0600070205080204" pitchFamily="34" charset="-128"/>
+                <a:cs typeface="+mn-cs"/>
+              </a:rPr>
+              <a:t>CMSIS-Driver or VIO</a:t>
+            </a:r>
+            <a:r>
+              <a:rPr lang="en-US" sz="1600" kern="0">
+                <a:solidFill>
+                  <a:srgbClr val="FFFFFF"/>
+                </a:solidFill>
+                <a:latin typeface="+mn-lt"/>
+              </a:rPr>
+              <a:t> </a:t>
+            </a:r>
+            <a:r>
+              <a:rPr kumimoji="0" lang="en-US" sz="1600" b="0" i="0" u="none" strike="noStrike" kern="0" cap="none" spc="0" normalizeH="0" baseline="0" noProof="0">
+                <a:ln>
+                  <a:noFill/>
+                </a:ln>
+                <a:solidFill>
+                  <a:srgbClr val="FFFFFF"/>
+                </a:solidFill>
+                <a:effectLst/>
+                <a:uLnTx/>
+                <a:uFillTx/>
+                <a:latin typeface="+mn-lt"/>
+                <a:ea typeface="ＭＳ Ｐゴシック" panose="020B0600070205080204" pitchFamily="34" charset="-128"/>
+                <a:cs typeface="+mn-cs"/>
+              </a:rPr>
+              <a:t>(Virtual I/O)</a:t>
+            </a:r>
+            <a:endParaRPr kumimoji="0" lang="en-GB" sz="1600" b="0" i="0" u="none" strike="noStrike" kern="0" cap="none" spc="0" normalizeH="0" baseline="0" noProof="0">
+              <a:ln>
+                <a:noFill/>
+              </a:ln>
+              <a:solidFill>
+                <a:srgbClr val="FFFFFF"/>
+              </a:solidFill>
+              <a:effectLst/>
+              <a:uLnTx/>
+              <a:uFillTx/>
+              <a:latin typeface="+mn-lt"/>
+              <a:ea typeface="ＭＳ Ｐゴシック" panose="020B0600070205080204" pitchFamily="34" charset="-128"/>
+              <a:cs typeface="+mn-cs"/>
+            </a:endParaRPr>
+          </a:p>
+        </p:txBody>
+      </p:sp>
+      <p:grpSp>
+        <p:nvGrpSpPr>
+          <p:cNvPr id="6" name="Group 5">
+            <a:extLst>
+              <a:ext uri="{FF2B5EF4-FFF2-40B4-BE49-F238E27FC236}">
+                <a16:creationId xmlns:a16="http://schemas.microsoft.com/office/drawing/2014/main" id="{2FC5C185-53B2-4398-B8AB-B5784808EF2D}"/>
+              </a:ext>
+            </a:extLst>
+          </p:cNvPr>
+          <p:cNvGrpSpPr/>
+          <p:nvPr/>
+        </p:nvGrpSpPr>
+        <p:grpSpPr>
+          <a:xfrm>
+            <a:off x="5722540" y="1366345"/>
+            <a:ext cx="3513084" cy="5252164"/>
+            <a:chOff x="4858406" y="1366345"/>
+            <a:chExt cx="3513084" cy="5252164"/>
+          </a:xfrm>
+        </p:grpSpPr>
+        <p:sp>
+          <p:nvSpPr>
+            <p:cNvPr id="26" name="Rectangle 25">
+              <a:extLst>
+                <a:ext uri="{FF2B5EF4-FFF2-40B4-BE49-F238E27FC236}">
+                  <a16:creationId xmlns:a16="http://schemas.microsoft.com/office/drawing/2014/main" id="{66B4BDEB-A29A-43AB-BCB8-160B10478CB6}"/>
+                </a:ext>
+              </a:extLst>
+            </p:cNvPr>
+            <p:cNvSpPr/>
+            <p:nvPr/>
+          </p:nvSpPr>
+          <p:spPr>
+            <a:xfrm>
+              <a:off x="4885928" y="5451181"/>
+              <a:ext cx="1645920" cy="1167328"/>
+            </a:xfrm>
+            <a:prstGeom prst="rect">
+              <a:avLst/>
+            </a:prstGeom>
+            <a:solidFill>
+              <a:srgbClr val="58595B"/>
+            </a:solidFill>
+            <a:ln w="9525" cap="flat" cmpd="sng" algn="ctr">
+              <a:noFill/>
+              <a:prstDash val="solid"/>
+            </a:ln>
+            <a:effectLst/>
+          </p:spPr>
+          <p:txBody>
+            <a:bodyPr lIns="91444" tIns="45723" rIns="91444" bIns="45723" rtlCol="0" anchor="t"/>
+            <a:lstStyle/>
+            <a:p>
+              <a:pPr marL="114304" marR="0" lvl="0" indent="-114304" algn="l" defTabSz="457210" rtl="0" eaLnBrk="1" fontAlgn="auto" latinLnBrk="0" hangingPunct="1">
+                <a:lnSpc>
+                  <a:spcPct val="100000"/>
+                </a:lnSpc>
+                <a:spcBef>
+                  <a:spcPts val="0"/>
+                </a:spcBef>
+                <a:spcAft>
+                  <a:spcPts val="0"/>
+                </a:spcAft>
+                <a:buClrTx/>
+                <a:buSzTx/>
+                <a:buFont typeface="Arial" panose="020B0604020202020204" pitchFamily="34" charset="0"/>
+                <a:buChar char="•"/>
+                <a:tabLst/>
+                <a:defRPr/>
+              </a:pPr>
+              <a:r>
+                <a:rPr kumimoji="0" lang="en-US" sz="1600" b="0" i="0" u="none" strike="noStrike" kern="0" cap="none" spc="0" normalizeH="0" baseline="0" noProof="0">
+                  <a:ln>
+                    <a:noFill/>
+                  </a:ln>
+                  <a:solidFill>
+                    <a:srgbClr val="FFFFFF"/>
+                  </a:solidFill>
+                  <a:effectLst/>
+                  <a:uLnTx/>
+                  <a:uFillTx/>
+                  <a:latin typeface="+mn-lt"/>
+                  <a:ea typeface="ＭＳ Ｐゴシック" panose="020B0600070205080204" pitchFamily="34" charset="-128"/>
+                  <a:cs typeface="+mn-cs"/>
+                </a:rPr>
+                <a:t>Timers</a:t>
+              </a:r>
+            </a:p>
+            <a:p>
+              <a:pPr marL="114304" marR="0" lvl="0" indent="-114304" algn="l" defTabSz="457210" rtl="0" eaLnBrk="1" fontAlgn="auto" latinLnBrk="0" hangingPunct="1">
+                <a:lnSpc>
+                  <a:spcPct val="100000"/>
+                </a:lnSpc>
+                <a:spcBef>
+                  <a:spcPts val="0"/>
+                </a:spcBef>
+                <a:spcAft>
+                  <a:spcPts val="0"/>
+                </a:spcAft>
+                <a:buClrTx/>
+                <a:buSzTx/>
+                <a:buFont typeface="Arial" panose="020B0604020202020204" pitchFamily="34" charset="0"/>
+                <a:buChar char="•"/>
+                <a:tabLst/>
+                <a:defRPr/>
+              </a:pPr>
+              <a:r>
+                <a:rPr kumimoji="0" lang="de-DE" sz="1600" b="0" i="0" u="none" strike="noStrike" kern="0" cap="none" spc="0" normalizeH="0" baseline="0" noProof="0">
+                  <a:ln>
+                    <a:noFill/>
+                  </a:ln>
+                  <a:solidFill>
+                    <a:srgbClr val="FFFFFF"/>
+                  </a:solidFill>
+                  <a:effectLst/>
+                  <a:uLnTx/>
+                  <a:uFillTx/>
+                  <a:latin typeface="+mn-lt"/>
+                  <a:ea typeface="ＭＳ Ｐゴシック" panose="020B0600070205080204" pitchFamily="34" charset="-128"/>
+                  <a:cs typeface="+mn-cs"/>
+                </a:rPr>
+                <a:t>Analog</a:t>
+              </a:r>
+            </a:p>
+            <a:p>
+              <a:pPr marL="114304" marR="0" lvl="0" indent="-114304" algn="l" defTabSz="457210" rtl="0" eaLnBrk="1" fontAlgn="auto" latinLnBrk="0" hangingPunct="1">
+                <a:lnSpc>
+                  <a:spcPct val="100000"/>
+                </a:lnSpc>
+                <a:spcBef>
+                  <a:spcPts val="0"/>
+                </a:spcBef>
+                <a:spcAft>
+                  <a:spcPts val="0"/>
+                </a:spcAft>
+                <a:buClrTx/>
+                <a:buSzTx/>
+                <a:buFont typeface="Arial" panose="020B0604020202020204" pitchFamily="34" charset="0"/>
+                <a:buChar char="•"/>
+                <a:tabLst/>
+                <a:defRPr/>
+              </a:pPr>
+              <a:r>
+                <a:rPr kumimoji="0" lang="de-DE" sz="1600" b="0" i="0" u="none" strike="noStrike" kern="0" cap="none" spc="0" normalizeH="0" baseline="0" noProof="0">
+                  <a:ln>
+                    <a:noFill/>
+                  </a:ln>
+                  <a:solidFill>
+                    <a:srgbClr val="FFFFFF"/>
+                  </a:solidFill>
+                  <a:effectLst/>
+                  <a:uLnTx/>
+                  <a:uFillTx/>
+                  <a:latin typeface="+mn-lt"/>
+                  <a:ea typeface="ＭＳ Ｐゴシック" panose="020B0600070205080204" pitchFamily="34" charset="-128"/>
+                  <a:cs typeface="+mn-cs"/>
+                </a:rPr>
+                <a:t>...</a:t>
+              </a:r>
+            </a:p>
+            <a:p>
+              <a:pPr marL="114304" marR="0" lvl="0" indent="-114304" algn="l" defTabSz="457210" rtl="0" eaLnBrk="1" fontAlgn="auto" latinLnBrk="0" hangingPunct="1">
+                <a:lnSpc>
+                  <a:spcPct val="100000"/>
+                </a:lnSpc>
+                <a:spcBef>
+                  <a:spcPts val="0"/>
+                </a:spcBef>
+                <a:spcAft>
+                  <a:spcPts val="0"/>
+                </a:spcAft>
+                <a:buClrTx/>
+                <a:buSzTx/>
+                <a:buFont typeface="Arial" panose="020B0604020202020204" pitchFamily="34" charset="0"/>
+                <a:buChar char="•"/>
+                <a:tabLst/>
+                <a:defRPr/>
+              </a:pPr>
+              <a:endParaRPr kumimoji="0" lang="en-US" sz="1200" b="0" i="0" u="none" strike="noStrike" kern="0" cap="none" spc="0" normalizeH="0" baseline="0" noProof="0">
+                <a:ln>
+                  <a:noFill/>
+                </a:ln>
+                <a:solidFill>
+                  <a:srgbClr val="FFFFFF"/>
+                </a:solidFill>
+                <a:effectLst/>
+                <a:uLnTx/>
+                <a:uFillTx/>
+                <a:latin typeface="+mn-lt"/>
+                <a:ea typeface="ＭＳ Ｐゴシック" panose="020B0600070205080204" pitchFamily="34" charset="-128"/>
+                <a:cs typeface="+mn-cs"/>
+              </a:endParaRPr>
+            </a:p>
+          </p:txBody>
+        </p:sp>
+        <p:sp>
+          <p:nvSpPr>
+            <p:cNvPr id="33" name="Down Arrow 28">
+              <a:extLst>
+                <a:ext uri="{FF2B5EF4-FFF2-40B4-BE49-F238E27FC236}">
+                  <a16:creationId xmlns:a16="http://schemas.microsoft.com/office/drawing/2014/main" id="{0CA77243-2CE9-4FEA-94E0-244BC67E78BD}"/>
+                </a:ext>
+              </a:extLst>
+            </p:cNvPr>
+            <p:cNvSpPr/>
+            <p:nvPr/>
+          </p:nvSpPr>
+          <p:spPr>
+            <a:xfrm>
+              <a:off x="5184209" y="1931276"/>
+              <a:ext cx="1160951" cy="3519906"/>
+            </a:xfrm>
+            <a:prstGeom prst="downArrow">
+              <a:avLst>
+                <a:gd name="adj1" fmla="val 50000"/>
+                <a:gd name="adj2" fmla="val 26971"/>
+              </a:avLst>
+            </a:prstGeom>
+            <a:gradFill rotWithShape="1">
+              <a:gsLst>
+                <a:gs pos="0">
+                  <a:srgbClr val="ED174F">
+                    <a:lumMod val="20000"/>
+                    <a:lumOff val="80000"/>
+                  </a:srgbClr>
+                </a:gs>
+                <a:gs pos="64000">
+                  <a:srgbClr val="ED174F">
+                    <a:lumMod val="40000"/>
+                    <a:lumOff val="60000"/>
+                  </a:srgbClr>
+                </a:gs>
+                <a:gs pos="100000">
+                  <a:srgbClr val="FF0000">
+                    <a:alpha val="60000"/>
+                  </a:srgbClr>
+                </a:gs>
+              </a:gsLst>
+              <a:lin ang="5400000" scaled="0"/>
+            </a:gradFill>
+            <a:ln w="9525" cap="flat" cmpd="sng" algn="ctr">
+              <a:noFill/>
+              <a:prstDash val="solid"/>
+            </a:ln>
+            <a:effectLst/>
+          </p:spPr>
+          <p:txBody>
+            <a:bodyPr lIns="91444" tIns="45723" rIns="91444" bIns="45723" rtlCol="0" anchor="ctr"/>
+            <a:lstStyle/>
+            <a:p>
+              <a:pPr marL="0" marR="0" lvl="0" indent="0" algn="ctr" defTabSz="457210" rtl="0" eaLnBrk="1" fontAlgn="auto" latinLnBrk="0" hangingPunct="1">
+                <a:lnSpc>
+                  <a:spcPct val="100000"/>
+                </a:lnSpc>
+                <a:spcBef>
+                  <a:spcPts val="0"/>
+                </a:spcBef>
+                <a:spcAft>
+                  <a:spcPts val="0"/>
+                </a:spcAft>
+                <a:buClrTx/>
+                <a:buSzTx/>
+                <a:buFontTx/>
+                <a:buNone/>
+                <a:tabLst/>
+                <a:defRPr/>
+              </a:pPr>
+              <a:endParaRPr kumimoji="0" lang="en-GB" sz="1467" b="0" i="0" u="none" strike="noStrike" kern="0" cap="none" spc="0" normalizeH="0" baseline="0" noProof="0">
+                <a:ln>
+                  <a:noFill/>
+                </a:ln>
+                <a:solidFill>
+                  <a:srgbClr val="FFFFFF"/>
+                </a:solidFill>
+                <a:effectLst/>
+                <a:uLnTx/>
+                <a:uFillTx/>
+                <a:latin typeface="+mn-lt"/>
+                <a:ea typeface="ＭＳ Ｐゴシック" panose="020B0600070205080204" pitchFamily="34" charset="-128"/>
+                <a:cs typeface="+mn-cs"/>
+              </a:endParaRPr>
+            </a:p>
+          </p:txBody>
+        </p:sp>
+        <p:sp>
+          <p:nvSpPr>
+            <p:cNvPr id="51" name="Down Arrow 28">
+              <a:extLst>
+                <a:ext uri="{FF2B5EF4-FFF2-40B4-BE49-F238E27FC236}">
+                  <a16:creationId xmlns:a16="http://schemas.microsoft.com/office/drawing/2014/main" id="{0229FC88-DE50-4447-A2FA-BD10625282A3}"/>
+                </a:ext>
+              </a:extLst>
+            </p:cNvPr>
+            <p:cNvSpPr/>
+            <p:nvPr/>
+          </p:nvSpPr>
+          <p:spPr>
+            <a:xfrm>
+              <a:off x="6921043" y="1931275"/>
+              <a:ext cx="1160951" cy="1079939"/>
+            </a:xfrm>
+            <a:prstGeom prst="downArrow">
+              <a:avLst>
+                <a:gd name="adj1" fmla="val 50000"/>
+                <a:gd name="adj2" fmla="val 26971"/>
+              </a:avLst>
+            </a:prstGeom>
+            <a:gradFill rotWithShape="1">
+              <a:gsLst>
+                <a:gs pos="0">
+                  <a:srgbClr val="ED174F">
+                    <a:lumMod val="20000"/>
+                    <a:lumOff val="80000"/>
+                  </a:srgbClr>
+                </a:gs>
+                <a:gs pos="64000">
+                  <a:srgbClr val="ED174F">
+                    <a:lumMod val="40000"/>
+                    <a:lumOff val="60000"/>
+                  </a:srgbClr>
+                </a:gs>
+                <a:gs pos="100000">
+                  <a:srgbClr val="FF0000">
+                    <a:alpha val="60000"/>
+                  </a:srgbClr>
+                </a:gs>
+              </a:gsLst>
+              <a:lin ang="5400000" scaled="0"/>
+            </a:gradFill>
+            <a:ln w="9525" cap="flat" cmpd="sng" algn="ctr">
+              <a:noFill/>
+              <a:prstDash val="solid"/>
+            </a:ln>
+            <a:effectLst/>
+          </p:spPr>
+          <p:txBody>
+            <a:bodyPr lIns="91444" tIns="45723" rIns="91444" bIns="45723" rtlCol="0" anchor="ctr"/>
+            <a:lstStyle/>
+            <a:p>
+              <a:pPr marL="0" marR="0" lvl="0" indent="0" algn="ctr" defTabSz="457210" rtl="0" eaLnBrk="1" fontAlgn="auto" latinLnBrk="0" hangingPunct="1">
+                <a:lnSpc>
+                  <a:spcPct val="100000"/>
+                </a:lnSpc>
+                <a:spcBef>
+                  <a:spcPts val="0"/>
+                </a:spcBef>
+                <a:spcAft>
+                  <a:spcPts val="0"/>
+                </a:spcAft>
+                <a:buClrTx/>
+                <a:buSzTx/>
+                <a:buFontTx/>
+                <a:buNone/>
+                <a:tabLst/>
+                <a:defRPr/>
+              </a:pPr>
+              <a:endParaRPr kumimoji="0" lang="en-GB" sz="1467" b="0" i="0" u="none" strike="noStrike" kern="0" cap="none" spc="0" normalizeH="0" baseline="0" noProof="0">
+                <a:ln>
+                  <a:noFill/>
+                </a:ln>
+                <a:solidFill>
+                  <a:srgbClr val="FFFFFF"/>
+                </a:solidFill>
+                <a:effectLst/>
+                <a:uLnTx/>
+                <a:uFillTx/>
+                <a:latin typeface="+mn-lt"/>
+                <a:ea typeface="ＭＳ Ｐゴシック" panose="020B0600070205080204" pitchFamily="34" charset="-128"/>
+                <a:cs typeface="+mn-cs"/>
+              </a:endParaRPr>
+            </a:p>
+          </p:txBody>
+        </p:sp>
+        <p:sp>
+          <p:nvSpPr>
+            <p:cNvPr id="50" name="Rectangle 49">
+              <a:extLst>
+                <a:ext uri="{FF2B5EF4-FFF2-40B4-BE49-F238E27FC236}">
+                  <a16:creationId xmlns:a16="http://schemas.microsoft.com/office/drawing/2014/main" id="{C8739E8A-1DB7-4AF4-B4F0-74A10E553C26}"/>
+                </a:ext>
+              </a:extLst>
+            </p:cNvPr>
+            <p:cNvSpPr/>
+            <p:nvPr/>
+          </p:nvSpPr>
+          <p:spPr>
+            <a:xfrm>
+              <a:off x="4858406" y="1366345"/>
+              <a:ext cx="3513084" cy="572814"/>
+            </a:xfrm>
+            <a:prstGeom prst="rect">
+              <a:avLst/>
+            </a:prstGeom>
+            <a:solidFill>
+              <a:schemeClr val="accent2">
+                <a:lumMod val="10000"/>
+                <a:lumOff val="90000"/>
+                <a:alpha val="80000"/>
+              </a:schemeClr>
+            </a:solidFill>
+            <a:ln w="28575" cap="flat" cmpd="sng" algn="ctr">
+              <a:solidFill>
+                <a:schemeClr val="tx1"/>
+              </a:solidFill>
+              <a:prstDash val="dash"/>
+            </a:ln>
+            <a:effectLst/>
+          </p:spPr>
+          <p:txBody>
+            <a:bodyPr lIns="91444" tIns="45723" rIns="91444" bIns="45723" rtlCol="0" anchor="ctr"/>
+            <a:lstStyle/>
+            <a:p>
+              <a:pPr marL="0" marR="0" lvl="0" indent="0" algn="ctr" defTabSz="457210" rtl="0" eaLnBrk="1" fontAlgn="auto" latinLnBrk="0" hangingPunct="1">
+                <a:lnSpc>
+                  <a:spcPct val="100000"/>
+                </a:lnSpc>
+                <a:spcBef>
+                  <a:spcPts val="0"/>
+                </a:spcBef>
+                <a:spcAft>
+                  <a:spcPts val="0"/>
+                </a:spcAft>
+                <a:buClrTx/>
+                <a:buSzTx/>
+                <a:buFontTx/>
+                <a:buNone/>
+                <a:tabLst/>
+                <a:defRPr/>
+              </a:pPr>
+              <a:r>
+                <a:rPr kumimoji="0" lang="en-US" sz="1600" b="0" i="0" u="none" strike="noStrike" kern="0" cap="none" spc="0" normalizeH="0" baseline="0" noProof="0">
+                  <a:ln>
+                    <a:noFill/>
+                  </a:ln>
+                  <a:solidFill>
+                    <a:schemeClr val="accent2"/>
+                  </a:solidFill>
+                  <a:effectLst/>
+                  <a:uLnTx/>
+                  <a:uFillTx/>
+                  <a:latin typeface="+mn-lt"/>
+                  <a:ea typeface="ＭＳ Ｐゴシック" panose="020B0600070205080204" pitchFamily="34" charset="-128"/>
+                  <a:cs typeface="+mn-cs"/>
+                </a:rPr>
+                <a:t>User Code</a:t>
+              </a:r>
+              <a:endParaRPr kumimoji="0" lang="en-GB" sz="1600" b="0" i="0" u="none" strike="noStrike" kern="0" cap="none" spc="0" normalizeH="0" baseline="0" noProof="0">
+                <a:ln>
+                  <a:noFill/>
+                </a:ln>
+                <a:solidFill>
+                  <a:schemeClr val="accent2"/>
+                </a:solidFill>
+                <a:effectLst/>
+                <a:uLnTx/>
+                <a:uFillTx/>
+                <a:latin typeface="+mn-lt"/>
+                <a:ea typeface="ＭＳ Ｐゴシック" panose="020B0600070205080204" pitchFamily="34" charset="-128"/>
+                <a:cs typeface="+mn-cs"/>
+              </a:endParaRPr>
+            </a:p>
+          </p:txBody>
+        </p:sp>
+        <p:sp>
+          <p:nvSpPr>
+            <p:cNvPr id="34" name="Rectangle 33">
+              <a:extLst>
+                <a:ext uri="{FF2B5EF4-FFF2-40B4-BE49-F238E27FC236}">
+                  <a16:creationId xmlns:a16="http://schemas.microsoft.com/office/drawing/2014/main" id="{2786D91C-8AE2-4BDE-9464-FC713C07BEF5}"/>
+                </a:ext>
+              </a:extLst>
+            </p:cNvPr>
+            <p:cNvSpPr/>
+            <p:nvPr/>
+          </p:nvSpPr>
+          <p:spPr>
+            <a:xfrm>
+              <a:off x="4895759" y="4341093"/>
+              <a:ext cx="1645920" cy="624227"/>
+            </a:xfrm>
+            <a:prstGeom prst="rect">
+              <a:avLst/>
+            </a:prstGeom>
+            <a:solidFill>
+              <a:srgbClr val="808082"/>
+            </a:solidFill>
+            <a:ln w="9525" cap="flat" cmpd="sng" algn="ctr">
+              <a:noFill/>
+              <a:prstDash val="solid"/>
+            </a:ln>
+            <a:effectLst/>
+          </p:spPr>
+          <p:txBody>
+            <a:bodyPr lIns="91444" tIns="45723" rIns="91444" bIns="45723" rtlCol="0" anchor="ctr"/>
+            <a:lstStyle/>
+            <a:p>
+              <a:pPr marL="0" marR="0" lvl="0" indent="0" algn="ctr" defTabSz="457210" rtl="0" eaLnBrk="1" fontAlgn="auto" latinLnBrk="0" hangingPunct="1">
+                <a:lnSpc>
+                  <a:spcPct val="100000"/>
+                </a:lnSpc>
+                <a:spcBef>
+                  <a:spcPts val="0"/>
+                </a:spcBef>
+                <a:spcAft>
+                  <a:spcPts val="0"/>
+                </a:spcAft>
+                <a:buClrTx/>
+                <a:buSzTx/>
+                <a:buFontTx/>
+                <a:buNone/>
+                <a:tabLst/>
+                <a:defRPr/>
+              </a:pPr>
+              <a:r>
+                <a:rPr kumimoji="0" lang="en-US" sz="1600" b="0" i="0" u="none" strike="noStrike" kern="0" cap="none" spc="0" normalizeH="0" baseline="0" noProof="0">
+                  <a:ln>
+                    <a:noFill/>
+                  </a:ln>
+                  <a:solidFill>
+                    <a:srgbClr val="FFFFFF"/>
+                  </a:solidFill>
+                  <a:effectLst/>
+                  <a:uLnTx/>
+                  <a:uFillTx/>
+                  <a:latin typeface="+mn-lt"/>
+                  <a:ea typeface="ＭＳ Ｐゴシック" panose="020B0600070205080204" pitchFamily="34" charset="-128"/>
+                  <a:cs typeface="+mn-cs"/>
+                </a:rPr>
+                <a:t>Specialized Peripherals</a:t>
+              </a:r>
+              <a:endParaRPr kumimoji="0" lang="en-GB" sz="1600" b="0" i="0" u="none" strike="noStrike" kern="0" cap="none" spc="0" normalizeH="0" baseline="0" noProof="0">
+                <a:ln>
+                  <a:noFill/>
+                </a:ln>
+                <a:solidFill>
+                  <a:srgbClr val="FFFFFF"/>
+                </a:solidFill>
+                <a:effectLst/>
+                <a:uLnTx/>
+                <a:uFillTx/>
+                <a:latin typeface="+mn-lt"/>
+                <a:ea typeface="ＭＳ Ｐゴシック" panose="020B0600070205080204" pitchFamily="34" charset="-128"/>
+                <a:cs typeface="+mn-cs"/>
+              </a:endParaRPr>
+            </a:p>
+          </p:txBody>
+        </p:sp>
+      </p:grpSp>
+      <p:sp>
+        <p:nvSpPr>
+          <p:cNvPr id="37" name="Rectangle 36">
+            <a:extLst>
+              <a:ext uri="{FF2B5EF4-FFF2-40B4-BE49-F238E27FC236}">
+                <a16:creationId xmlns:a16="http://schemas.microsoft.com/office/drawing/2014/main" id="{4E0ECBB6-0410-4BC5-8E16-7015795DF03F}"/>
+              </a:ext>
+            </a:extLst>
+          </p:cNvPr>
+          <p:cNvSpPr/>
+          <p:nvPr/>
+        </p:nvSpPr>
+        <p:spPr>
+          <a:xfrm>
+            <a:off x="1239715" y="3592823"/>
+            <a:ext cx="4311639" cy="445876"/>
+          </a:xfrm>
+          <a:prstGeom prst="rect">
+            <a:avLst/>
+          </a:prstGeom>
+          <a:solidFill>
+            <a:srgbClr val="F68A33"/>
+          </a:solidFill>
+          <a:ln w="9525" cap="flat" cmpd="sng" algn="ctr">
+            <a:noFill/>
+            <a:prstDash val="solid"/>
+          </a:ln>
+          <a:effectLst/>
+        </p:spPr>
+        <p:txBody>
+          <a:bodyPr lIns="91444" tIns="45723" rIns="91444" bIns="45723" rtlCol="0" anchor="ctr"/>
+          <a:lstStyle/>
+          <a:p>
+            <a:pPr marL="0" marR="0" lvl="0" indent="0" algn="ctr" defTabSz="457210" rtl="0" eaLnBrk="1" fontAlgn="auto" latinLnBrk="0" hangingPunct="1">
+              <a:lnSpc>
+                <a:spcPct val="100000"/>
+              </a:lnSpc>
+              <a:spcBef>
+                <a:spcPts val="0"/>
+              </a:spcBef>
+              <a:spcAft>
+                <a:spcPts val="0"/>
+              </a:spcAft>
+              <a:buClrTx/>
+              <a:buSzTx/>
+              <a:buFontTx/>
+              <a:buNone/>
+              <a:tabLst/>
+              <a:defRPr/>
+            </a:pPr>
+            <a:r>
+              <a:rPr kumimoji="0" lang="en-US" sz="1600" b="0" i="0" u="none" strike="noStrike" kern="0" cap="none" spc="0" normalizeH="0" baseline="0" noProof="0">
+                <a:ln>
+                  <a:noFill/>
+                </a:ln>
+                <a:solidFill>
+                  <a:srgbClr val="FFFFFF"/>
+                </a:solidFill>
+                <a:effectLst/>
+                <a:uLnTx/>
+                <a:uFillTx/>
+                <a:latin typeface="+mn-lt"/>
+                <a:ea typeface="ＭＳ Ｐゴシック" panose="020B0600070205080204" pitchFamily="34" charset="-128"/>
+                <a:cs typeface="+mn-cs"/>
+              </a:rPr>
+              <a:t>Device SDK </a:t>
+            </a:r>
+            <a:r>
+              <a:rPr lang="en-US" sz="1600" kern="0">
+                <a:solidFill>
+                  <a:srgbClr val="FFFFFF"/>
+                </a:solidFill>
+                <a:latin typeface="+mn-lt"/>
+              </a:rPr>
+              <a:t>with c</a:t>
+            </a:r>
+            <a:r>
+              <a:rPr kumimoji="0" lang="en-US" sz="1600" b="0" i="0" u="none" strike="noStrike" kern="0" cap="none" spc="0" normalizeH="0" baseline="0" noProof="0" err="1">
+                <a:ln>
+                  <a:noFill/>
+                </a:ln>
+                <a:solidFill>
+                  <a:srgbClr val="FFFFFF"/>
+                </a:solidFill>
+                <a:effectLst/>
+                <a:uLnTx/>
+                <a:uFillTx/>
+                <a:latin typeface="+mn-lt"/>
+                <a:ea typeface="ＭＳ Ｐゴシック" panose="020B0600070205080204" pitchFamily="34" charset="-128"/>
+                <a:cs typeface="+mn-cs"/>
+              </a:rPr>
+              <a:t>onfiguration</a:t>
+            </a:r>
+            <a:endParaRPr kumimoji="0" lang="en-US" sz="1600" b="0" i="0" u="none" strike="noStrike" kern="0" cap="none" spc="0" normalizeH="0" baseline="0" noProof="0">
+              <a:ln>
+                <a:noFill/>
+              </a:ln>
+              <a:solidFill>
+                <a:srgbClr val="FFFFFF"/>
+              </a:solidFill>
+              <a:effectLst/>
+              <a:uLnTx/>
+              <a:uFillTx/>
+              <a:latin typeface="+mn-lt"/>
+              <a:ea typeface="ＭＳ Ｐゴシック" panose="020B0600070205080204" pitchFamily="34" charset="-128"/>
+              <a:cs typeface="+mn-cs"/>
+            </a:endParaRPr>
+          </a:p>
+        </p:txBody>
+      </p:sp>
+      <p:sp>
+        <p:nvSpPr>
+          <p:cNvPr id="49" name="Rectangle 48">
+            <a:extLst>
+              <a:ext uri="{FF2B5EF4-FFF2-40B4-BE49-F238E27FC236}">
+                <a16:creationId xmlns:a16="http://schemas.microsoft.com/office/drawing/2014/main" id="{A013C7E0-2F0B-4D88-A2A8-4BDF55C17047}"/>
+              </a:ext>
+            </a:extLst>
+          </p:cNvPr>
+          <p:cNvSpPr/>
+          <p:nvPr/>
+        </p:nvSpPr>
+        <p:spPr>
+          <a:xfrm>
+            <a:off x="3117945" y="2091913"/>
+            <a:ext cx="1284857" cy="743952"/>
+          </a:xfrm>
+          <a:prstGeom prst="rect">
+            <a:avLst/>
+          </a:prstGeom>
+          <a:solidFill>
+            <a:schemeClr val="accent3">
+              <a:lumMod val="60000"/>
+              <a:lumOff val="40000"/>
+              <a:alpha val="20000"/>
+            </a:schemeClr>
+          </a:solidFill>
+          <a:ln w="9525" cap="flat" cmpd="sng" algn="ctr">
+            <a:noFill/>
+            <a:prstDash val="solid"/>
+          </a:ln>
+          <a:effectLst/>
+        </p:spPr>
+        <p:txBody>
+          <a:bodyPr vert="vert270" lIns="36003" tIns="45723" rIns="91444" bIns="45723" rtlCol="0" anchor="t"/>
+          <a:lstStyle/>
+          <a:p>
+            <a:pPr marL="0" marR="0" lvl="0" indent="0" algn="ctr" defTabSz="457210" rtl="0" eaLnBrk="1" fontAlgn="auto" latinLnBrk="0" hangingPunct="1">
+              <a:lnSpc>
+                <a:spcPts val="1700"/>
+              </a:lnSpc>
+              <a:spcBef>
+                <a:spcPts val="0"/>
+              </a:spcBef>
+              <a:spcAft>
+                <a:spcPts val="0"/>
+              </a:spcAft>
+              <a:buClrTx/>
+              <a:buSzTx/>
+              <a:buFontTx/>
+              <a:buNone/>
+              <a:tabLst/>
+              <a:defRPr/>
+            </a:pPr>
+            <a:r>
+              <a:rPr lang="en-US" sz="1600" kern="0" dirty="0">
+                <a:solidFill>
+                  <a:srgbClr val="000000"/>
+                </a:solidFill>
+                <a:latin typeface="+mn-lt"/>
+              </a:rPr>
+              <a:t>Module</a:t>
+            </a:r>
+            <a:br>
+              <a:rPr kumimoji="0" lang="en-US" sz="1600" b="0" i="0" u="none" strike="noStrike" kern="0" cap="none" spc="0" normalizeH="0" baseline="0" noProof="0" dirty="0">
+                <a:ln>
+                  <a:noFill/>
+                </a:ln>
+                <a:solidFill>
+                  <a:srgbClr val="000000"/>
+                </a:solidFill>
+                <a:effectLst/>
+                <a:uLnTx/>
+                <a:uFillTx/>
+                <a:latin typeface="+mn-lt"/>
+                <a:ea typeface="ＭＳ Ｐゴシック" panose="020B0600070205080204" pitchFamily="34" charset="-128"/>
+                <a:cs typeface="+mn-cs"/>
+              </a:rPr>
+            </a:br>
+            <a:r>
+              <a:rPr kumimoji="0" lang="en-US" sz="1600" b="0" i="0" u="none" strike="noStrike" kern="0" cap="none" spc="0" normalizeH="0" baseline="0" noProof="0" dirty="0">
+                <a:ln>
+                  <a:noFill/>
+                </a:ln>
+                <a:solidFill>
+                  <a:srgbClr val="000000"/>
+                </a:solidFill>
+                <a:effectLst/>
+                <a:uLnTx/>
+                <a:uFillTx/>
+                <a:latin typeface="+mn-lt"/>
+                <a:ea typeface="ＭＳ Ｐゴシック" panose="020B0600070205080204" pitchFamily="34" charset="-128"/>
+                <a:cs typeface="+mn-cs"/>
+              </a:rPr>
+              <a:t>Layer</a:t>
+            </a:r>
+            <a:endParaRPr kumimoji="0" lang="en-GB" sz="1600" b="0" i="0" u="none" strike="noStrike" kern="0" cap="none" spc="0" normalizeH="0" baseline="0" noProof="0" dirty="0">
+              <a:ln>
+                <a:noFill/>
+              </a:ln>
+              <a:solidFill>
+                <a:srgbClr val="000000"/>
+              </a:solidFill>
+              <a:effectLst/>
+              <a:uLnTx/>
+              <a:uFillTx/>
+              <a:latin typeface="+mn-lt"/>
+              <a:ea typeface="ＭＳ Ｐゴシック" panose="020B0600070205080204" pitchFamily="34" charset="-128"/>
+              <a:cs typeface="+mn-cs"/>
+            </a:endParaRPr>
+          </a:p>
+        </p:txBody>
+      </p:sp>
+      <p:sp>
+        <p:nvSpPr>
+          <p:cNvPr id="52" name="Rectangle 51">
+            <a:extLst>
+              <a:ext uri="{FF2B5EF4-FFF2-40B4-BE49-F238E27FC236}">
+                <a16:creationId xmlns:a16="http://schemas.microsoft.com/office/drawing/2014/main" id="{54FBCC9A-F729-4E91-B396-3090E299CD43}"/>
+              </a:ext>
+            </a:extLst>
+          </p:cNvPr>
+          <p:cNvSpPr/>
+          <p:nvPr/>
+        </p:nvSpPr>
+        <p:spPr>
+          <a:xfrm>
+            <a:off x="3649234" y="2148202"/>
+            <a:ext cx="588998" cy="624227"/>
+          </a:xfrm>
+          <a:prstGeom prst="rect">
+            <a:avLst/>
+          </a:prstGeom>
+          <a:solidFill>
+            <a:srgbClr val="7030A0"/>
+          </a:solidFill>
+          <a:ln w="9525" cap="flat" cmpd="sng" algn="ctr">
+            <a:noFill/>
+            <a:prstDash val="solid"/>
+          </a:ln>
+          <a:effectLst/>
+        </p:spPr>
+        <p:txBody>
+          <a:bodyPr lIns="91444" tIns="45723" rIns="91444" bIns="45723" rtlCol="0" anchor="ctr"/>
+          <a:lstStyle/>
+          <a:p>
+            <a:pPr marL="0" marR="0" lvl="0" indent="0" algn="ctr" defTabSz="457210" rtl="0" eaLnBrk="1" fontAlgn="auto" latinLnBrk="0" hangingPunct="1">
+              <a:lnSpc>
+                <a:spcPct val="100000"/>
+              </a:lnSpc>
+              <a:spcBef>
+                <a:spcPts val="0"/>
+              </a:spcBef>
+              <a:spcAft>
+                <a:spcPts val="0"/>
+              </a:spcAft>
+              <a:buClrTx/>
+              <a:buSzTx/>
+              <a:buFontTx/>
+              <a:buNone/>
+              <a:tabLst/>
+              <a:defRPr/>
+            </a:pPr>
+            <a:r>
+              <a:rPr kumimoji="0" lang="en-US" sz="1400" b="0" i="0" u="none" strike="noStrike" kern="0" cap="none" spc="0" normalizeH="0" baseline="0" noProof="0" dirty="0" err="1">
+                <a:ln>
+                  <a:noFill/>
+                </a:ln>
+                <a:solidFill>
+                  <a:srgbClr val="FFFFFF"/>
+                </a:solidFill>
+                <a:effectLst/>
+                <a:uLnTx/>
+                <a:uFillTx/>
+                <a:latin typeface="+mn-lt"/>
+                <a:ea typeface="ＭＳ Ｐゴシック" panose="020B0600070205080204" pitchFamily="34" charset="-128"/>
+                <a:cs typeface="+mn-cs"/>
+              </a:rPr>
+              <a:t>WiFi</a:t>
+            </a:r>
+            <a:endParaRPr kumimoji="0" lang="en-US" sz="1400" b="0" i="0" u="none" strike="noStrike" kern="0" cap="none" spc="0" normalizeH="0" baseline="0" noProof="0" dirty="0">
+              <a:ln>
+                <a:noFill/>
+              </a:ln>
+              <a:solidFill>
+                <a:srgbClr val="FFFFFF"/>
+              </a:solidFill>
+              <a:effectLst/>
+              <a:uLnTx/>
+              <a:uFillTx/>
+              <a:latin typeface="+mn-lt"/>
+              <a:ea typeface="ＭＳ Ｐゴシック" panose="020B0600070205080204" pitchFamily="34" charset="-128"/>
+              <a:cs typeface="+mn-cs"/>
+            </a:endParaRPr>
+          </a:p>
+        </p:txBody>
+      </p:sp>
+    </p:spTree>
+    <p:extLst>
+      <p:ext uri="{BB962C8B-B14F-4D97-AF65-F5344CB8AC3E}">
+        <p14:creationId xmlns:p14="http://schemas.microsoft.com/office/powerpoint/2010/main" val="1259605718"/>
+      </p:ext>
+    </p:extLst>
+  </p:cSld>
+  <p:clrMapOvr>
+    <a:masterClrMapping/>
+  </p:clrMapOvr>
+  <p:timing>
+    <p:tnLst>
+      <p:par>
+        <p:cTn id="1" dur="indefinite" restart="never" nodeType="tmRoot">
+          <p:childTnLst>
+            <p:seq concurrent="1" nextAc="seek">
+              <p:cTn id="2" dur="indefinite" nodeType="mainSeq">
+                <p:childTnLst>
+                  <p:par>
+                    <p:cTn id="3" fill="hold">
+                      <p:stCondLst>
+                        <p:cond delay="indefinite"/>
+                      </p:stCondLst>
+                      <p:childTnLst>
+                        <p:par>
+                          <p:cTn id="4" fill="hold">
+                            <p:stCondLst>
+                              <p:cond delay="0"/>
+                            </p:stCondLst>
+                            <p:childTnLst>
+                              <p:par>
+                                <p:cTn id="5" presetID="1" presetClass="entr" presetSubtype="0" fill="hold" nodeType="clickEffect">
+                                  <p:stCondLst>
+                                    <p:cond delay="0"/>
+                                  </p:stCondLst>
+                                  <p:childTnLst>
+                                    <p:set>
+                                      <p:cBhvr>
+                                        <p:cTn id="6" dur="1" fill="hold">
+                                          <p:stCondLst>
+                                            <p:cond delay="0"/>
+                                          </p:stCondLst>
+                                        </p:cTn>
+                                        <p:tgtEl>
+                                          <p:spTgt spid="6"/>
+                                        </p:tgtEl>
+                                        <p:attrNameLst>
+                                          <p:attrName>style.visibility</p:attrName>
+                                        </p:attrNameLst>
+                                      </p:cBhvr>
+                                      <p:to>
+                                        <p:strVal val="visible"/>
+                                      </p:to>
+                                    </p:set>
+                                  </p:childTnLst>
+                                </p:cTn>
+                              </p:par>
+                            </p:childTnLst>
+                          </p:cTn>
+                        </p:par>
+                      </p:childTnLst>
+                    </p:cTn>
+                  </p:par>
+                </p:childTnLst>
+              </p:cTn>
+              <p:prevCondLst>
+                <p:cond evt="onPrev" delay="0">
+                  <p:tgtEl>
+                    <p:sldTgt/>
+                  </p:tgtEl>
+                </p:cond>
+              </p:prevCondLst>
+              <p:nextCondLst>
+                <p:cond evt="onNext" delay="0">
+                  <p:tgtEl>
+                    <p:sldTgt/>
+                  </p:tgtEl>
+                </p:cond>
+              </p:nextCondLst>
+            </p:seq>
+          </p:childTnLst>
+        </p:cTn>
+      </p:par>
+    </p:tnLst>
+  </p:timing>
 </p:sld>
 </file>
 

</xml_diff>

<commit_message>
Several corrections, possibility to specify linker scripts added
</commit_message>
<xml_diff>
--- a/tools/projmgr/docs/Manual/images/overview.pptx
+++ b/tools/projmgr/docs/Manual/images/overview.pptx
@@ -5,10 +5,10 @@
     <p:sldMasterId id="2147483661" r:id="rId1"/>
   </p:sldMasterIdLst>
   <p:notesMasterIdLst>
-    <p:notesMasterId r:id="rId7"/>
+    <p:notesMasterId r:id="rId8"/>
   </p:notesMasterIdLst>
   <p:handoutMasterIdLst>
-    <p:handoutMasterId r:id="rId8"/>
+    <p:handoutMasterId r:id="rId9"/>
   </p:handoutMasterIdLst>
   <p:sldIdLst>
     <p:sldId id="345" r:id="rId2"/>
@@ -16,6 +16,7 @@
     <p:sldId id="14961" r:id="rId4"/>
     <p:sldId id="14942" r:id="rId5"/>
     <p:sldId id="14535" r:id="rId6"/>
+    <p:sldId id="14965" r:id="rId7"/>
   </p:sldIdLst>
   <p:sldSz cx="12192000" cy="6858000"/>
   <p:notesSz cx="6858000" cy="9144000"/>
@@ -295,7 +296,7 @@
           <a:p>
             <a:fld id="{008FFADC-39A7-449E-8C68-8776E6FB3C1A}" type="datetimeFigureOut">
               <a:rPr lang="en-GB" smtClean="0"/>
-              <a:t>12/01/2022</a:t>
+              <a:t>28/02/2022</a:t>
             </a:fld>
             <a:endParaRPr lang="en-GB"/>
           </a:p>
@@ -472,7 +473,7 @@
           <a:p>
             <a:fld id="{30B9BAAB-B703-4BB5-9D08-B460FC03C23A}" type="datetimeFigureOut">
               <a:rPr lang="en-GB" smtClean="0"/>
-              <a:t>12/01/2022</a:t>
+              <a:t>28/02/2022</a:t>
             </a:fld>
             <a:endParaRPr lang="en-GB"/>
           </a:p>
@@ -22394,6 +22395,1153 @@
       </p:par>
     </p:tnLst>
   </p:timing>
+</p:sld>
+</file>
+
+<file path=ppt/slides/slide6.xml><?xml version="1.0" encoding="utf-8"?>
+<p:sld xmlns:a="http://schemas.openxmlformats.org/drawingml/2006/main" xmlns:r="http://schemas.openxmlformats.org/officeDocument/2006/relationships" xmlns:p="http://schemas.openxmlformats.org/presentationml/2006/main">
+  <p:cSld>
+    <p:spTree>
+      <p:nvGrpSpPr>
+        <p:cNvPr id="1" name=""/>
+        <p:cNvGrpSpPr/>
+        <p:nvPr/>
+      </p:nvGrpSpPr>
+      <p:grpSpPr>
+        <a:xfrm>
+          <a:off x="0" y="0"/>
+          <a:ext cx="0" cy="0"/>
+          <a:chOff x="0" y="0"/>
+          <a:chExt cx="0" cy="0"/>
+        </a:xfrm>
+      </p:grpSpPr>
+      <p:sp>
+        <p:nvSpPr>
+          <p:cNvPr id="2" name="Title 1">
+            <a:extLst>
+              <a:ext uri="{FF2B5EF4-FFF2-40B4-BE49-F238E27FC236}">
+                <a16:creationId xmlns:a16="http://schemas.microsoft.com/office/drawing/2014/main" id="{6198A928-9849-483F-9B17-9696AA336CD6}"/>
+              </a:ext>
+            </a:extLst>
+          </p:cNvPr>
+          <p:cNvSpPr>
+            <a:spLocks noGrp="1"/>
+          </p:cNvSpPr>
+          <p:nvPr>
+            <p:ph type="title"/>
+          </p:nvPr>
+        </p:nvSpPr>
+        <p:spPr/>
+        <p:txBody>
+          <a:bodyPr/>
+          <a:lstStyle/>
+          <a:p>
+            <a:r>
+              <a:rPr lang="en-US" dirty="0" err="1"/>
+              <a:t>CSolution</a:t>
+            </a:r>
+            <a:r>
+              <a:rPr lang="en-US" dirty="0"/>
+              <a:t> / </a:t>
+            </a:r>
+            <a:r>
+              <a:rPr lang="en-US" dirty="0" err="1"/>
+              <a:t>CBuild</a:t>
+            </a:r>
+            <a:r>
+              <a:rPr lang="en-US" dirty="0"/>
+              <a:t>: Generator Workflow</a:t>
+            </a:r>
+            <a:endParaRPr lang="en-GB" dirty="0"/>
+          </a:p>
+        </p:txBody>
+      </p:sp>
+      <p:sp>
+        <p:nvSpPr>
+          <p:cNvPr id="3" name="Text Placeholder 2">
+            <a:extLst>
+              <a:ext uri="{FF2B5EF4-FFF2-40B4-BE49-F238E27FC236}">
+                <a16:creationId xmlns:a16="http://schemas.microsoft.com/office/drawing/2014/main" id="{76F78A7D-CC93-4178-85CA-9C6EFB99AFDF}"/>
+              </a:ext>
+            </a:extLst>
+          </p:cNvPr>
+          <p:cNvSpPr>
+            <a:spLocks noGrp="1"/>
+          </p:cNvSpPr>
+          <p:nvPr>
+            <p:ph type="body" sz="quarter" idx="13"/>
+          </p:nvPr>
+        </p:nvSpPr>
+        <p:spPr/>
+        <p:txBody>
+          <a:bodyPr/>
+          <a:lstStyle/>
+          <a:p>
+            <a:r>
+              <a:rPr lang="en-US" dirty="0"/>
+              <a:t>Steps for component selection and configuration</a:t>
+            </a:r>
+            <a:endParaRPr lang="en-GB" dirty="0"/>
+          </a:p>
+        </p:txBody>
+      </p:sp>
+      <p:sp>
+        <p:nvSpPr>
+          <p:cNvPr id="4" name="Content Placeholder 3">
+            <a:extLst>
+              <a:ext uri="{FF2B5EF4-FFF2-40B4-BE49-F238E27FC236}">
+                <a16:creationId xmlns:a16="http://schemas.microsoft.com/office/drawing/2014/main" id="{C04B1D94-F87A-4D2F-92EF-A90619EB7EB0}"/>
+              </a:ext>
+            </a:extLst>
+          </p:cNvPr>
+          <p:cNvSpPr>
+            <a:spLocks noGrp="1"/>
+          </p:cNvSpPr>
+          <p:nvPr>
+            <p:ph idx="1"/>
+          </p:nvPr>
+        </p:nvSpPr>
+        <p:spPr>
+          <a:xfrm>
+            <a:off x="479425" y="1554489"/>
+            <a:ext cx="2414915" cy="2715230"/>
+          </a:xfrm>
+        </p:spPr>
+        <p:txBody>
+          <a:bodyPr/>
+          <a:lstStyle/>
+          <a:p>
+            <a:pPr marL="287338" indent="-287338">
+              <a:buFont typeface="+mj-lt"/>
+              <a:buAutoNum type="arabicPeriod"/>
+            </a:pPr>
+            <a:r>
+              <a:rPr lang="en-US" sz="1600" dirty="0"/>
+              <a:t>User selects components</a:t>
+            </a:r>
+          </a:p>
+          <a:p>
+            <a:pPr indent="-169863"/>
+            <a:r>
+              <a:rPr lang="en-US" sz="1200" dirty="0"/>
+              <a:t>in </a:t>
+            </a:r>
+            <a:r>
+              <a:rPr lang="en-US" sz="1050" dirty="0">
+                <a:solidFill>
+                  <a:srgbClr val="800000"/>
+                </a:solidFill>
+                <a:latin typeface="Consolas" panose="020B0609020204030204" pitchFamily="49" charset="0"/>
+              </a:rPr>
+              <a:t>`*.</a:t>
+            </a:r>
+            <a:r>
+              <a:rPr lang="en-US" sz="1050" dirty="0" err="1">
+                <a:solidFill>
+                  <a:srgbClr val="800000"/>
+                </a:solidFill>
+                <a:latin typeface="Consolas" panose="020B0609020204030204" pitchFamily="49" charset="0"/>
+              </a:rPr>
+              <a:t>cproject.yml</a:t>
+            </a:r>
+            <a:r>
+              <a:rPr lang="en-US" sz="1050" dirty="0">
+                <a:solidFill>
+                  <a:srgbClr val="800000"/>
+                </a:solidFill>
+                <a:latin typeface="Consolas" panose="020B0609020204030204" pitchFamily="49" charset="0"/>
+              </a:rPr>
+              <a:t>`</a:t>
+            </a:r>
+            <a:r>
+              <a:rPr lang="en-US" sz="1200" dirty="0"/>
+              <a:t> under </a:t>
+            </a:r>
+            <a:r>
+              <a:rPr lang="en-US" sz="1050" dirty="0">
+                <a:solidFill>
+                  <a:srgbClr val="800000"/>
+                </a:solidFill>
+                <a:latin typeface="Consolas" panose="020B0609020204030204" pitchFamily="49" charset="0"/>
+              </a:rPr>
+              <a:t>`components:`</a:t>
+            </a:r>
+          </a:p>
+          <a:p>
+            <a:pPr indent="-169863"/>
+            <a:r>
+              <a:rPr lang="en-GB" sz="1050" dirty="0"/>
+              <a:t>When this are components that require generation, </a:t>
+            </a:r>
+            <a:r>
+              <a:rPr lang="en-GB" sz="1050" b="1" dirty="0"/>
+              <a:t>user is notified about the requirement to run </a:t>
+            </a:r>
+            <a:r>
+              <a:rPr lang="en-GB" sz="1050" dirty="0"/>
+              <a:t>a generator and users the </a:t>
+            </a:r>
+            <a:r>
+              <a:rPr lang="en-GB" sz="1050" dirty="0" err="1"/>
+              <a:t>CSolution</a:t>
+            </a:r>
+            <a:r>
+              <a:rPr lang="en-GB" sz="1050" dirty="0"/>
+              <a:t> Run command.</a:t>
+            </a:r>
+          </a:p>
+          <a:p>
+            <a:pPr indent="-169863"/>
+            <a:r>
+              <a:rPr lang="en-US" sz="1200" dirty="0"/>
+              <a:t>Run a “Generator” for a list of components.</a:t>
+            </a:r>
+          </a:p>
+          <a:p>
+            <a:pPr indent="-169863"/>
+            <a:r>
+              <a:rPr lang="en-US" sz="1200" dirty="0" err="1"/>
+              <a:t>CSolution</a:t>
+            </a:r>
+            <a:r>
+              <a:rPr lang="en-US" sz="1200" dirty="0"/>
+              <a:t> generates </a:t>
+            </a:r>
+            <a:r>
+              <a:rPr lang="en-GB" sz="1050" b="0" dirty="0">
+                <a:solidFill>
+                  <a:srgbClr val="800000"/>
+                </a:solidFill>
+                <a:effectLst/>
+                <a:latin typeface="Consolas" panose="020B0609020204030204" pitchFamily="49" charset="0"/>
+              </a:rPr>
+              <a:t>`*.</a:t>
+            </a:r>
+            <a:r>
+              <a:rPr lang="en-GB" sz="1050" b="0" dirty="0" err="1">
+                <a:solidFill>
+                  <a:srgbClr val="800000"/>
+                </a:solidFill>
+                <a:effectLst/>
+                <a:latin typeface="Consolas" panose="020B0609020204030204" pitchFamily="49" charset="0"/>
+              </a:rPr>
+              <a:t>cgen.yml</a:t>
+            </a:r>
+            <a:r>
+              <a:rPr lang="en-GB" sz="1050" b="0" dirty="0">
+                <a:solidFill>
+                  <a:srgbClr val="800000"/>
+                </a:solidFill>
+                <a:effectLst/>
+                <a:latin typeface="Consolas" panose="020B0609020204030204" pitchFamily="49" charset="0"/>
+              </a:rPr>
+              <a:t>`</a:t>
+            </a:r>
+            <a:r>
+              <a:rPr lang="en-US" sz="1050" dirty="0"/>
+              <a:t> that provides the list of user-selected components.</a:t>
+            </a:r>
+          </a:p>
+          <a:p>
+            <a:pPr indent="-169863"/>
+            <a:endParaRPr lang="en-GB" sz="1050" b="1" dirty="0">
+              <a:solidFill>
+                <a:srgbClr val="800000"/>
+              </a:solidFill>
+              <a:latin typeface="Consolas" panose="020B0609020204030204" pitchFamily="49" charset="0"/>
+            </a:endParaRPr>
+          </a:p>
+          <a:p>
+            <a:pPr marL="173037" indent="0">
+              <a:buNone/>
+            </a:pPr>
+            <a:endParaRPr lang="en-GB" sz="1050" b="1" dirty="0">
+              <a:solidFill>
+                <a:srgbClr val="800000"/>
+              </a:solidFill>
+              <a:latin typeface="Consolas" panose="020B0609020204030204" pitchFamily="49" charset="0"/>
+            </a:endParaRPr>
+          </a:p>
+        </p:txBody>
+      </p:sp>
+      <p:sp>
+        <p:nvSpPr>
+          <p:cNvPr id="5" name="Content Placeholder 3">
+            <a:extLst>
+              <a:ext uri="{FF2B5EF4-FFF2-40B4-BE49-F238E27FC236}">
+                <a16:creationId xmlns:a16="http://schemas.microsoft.com/office/drawing/2014/main" id="{5D4F432B-1207-4793-880F-63AFC41CD96E}"/>
+              </a:ext>
+            </a:extLst>
+          </p:cNvPr>
+          <p:cNvSpPr txBox="1">
+            <a:spLocks/>
+          </p:cNvSpPr>
+          <p:nvPr/>
+        </p:nvSpPr>
+        <p:spPr>
+          <a:xfrm>
+            <a:off x="3276783" y="1555748"/>
+            <a:ext cx="2414915" cy="2715230"/>
+          </a:xfrm>
+          <a:prstGeom prst="rect">
+            <a:avLst/>
+          </a:prstGeom>
+        </p:spPr>
+        <p:txBody>
+          <a:bodyPr vert="horz" lIns="0" tIns="0" rIns="0" bIns="0" rtlCol="0">
+            <a:noAutofit/>
+          </a:bodyPr>
+          <a:lstStyle>
+            <a:lvl1pPr marL="342900" indent="-342900" algn="l" rtl="0" eaLnBrk="1" fontAlgn="base" hangingPunct="1">
+              <a:lnSpc>
+                <a:spcPct val="100000"/>
+              </a:lnSpc>
+              <a:spcBef>
+                <a:spcPts val="600"/>
+              </a:spcBef>
+              <a:spcAft>
+                <a:spcPts val="0"/>
+              </a:spcAft>
+              <a:buClr>
+                <a:schemeClr val="accent1"/>
+              </a:buClr>
+              <a:buFont typeface="Arial" charset="0"/>
+              <a:buChar char="•"/>
+              <a:defRPr sz="2400" kern="1200">
+                <a:solidFill>
+                  <a:schemeClr val="tx2"/>
+                </a:solidFill>
+                <a:latin typeface="+mn-lt"/>
+                <a:ea typeface="ＭＳ Ｐゴシック" charset="0"/>
+                <a:cs typeface="ＭＳ Ｐゴシック" charset="0"/>
+              </a:defRPr>
+            </a:lvl1pPr>
+            <a:lvl2pPr marL="581343" indent="-166688" algn="l" rtl="0" eaLnBrk="1" fontAlgn="base" hangingPunct="1">
+              <a:lnSpc>
+                <a:spcPct val="100000"/>
+              </a:lnSpc>
+              <a:spcBef>
+                <a:spcPts val="0"/>
+              </a:spcBef>
+              <a:spcAft>
+                <a:spcPts val="0"/>
+              </a:spcAft>
+              <a:buClr>
+                <a:schemeClr val="accent1"/>
+              </a:buClr>
+              <a:buSzPct val="80000"/>
+              <a:buFont typeface="Arial" charset="0"/>
+              <a:buChar char="•"/>
+              <a:defRPr sz="2000" kern="1200">
+                <a:solidFill>
+                  <a:schemeClr val="tx2"/>
+                </a:solidFill>
+                <a:latin typeface="+mn-lt"/>
+                <a:ea typeface="ＭＳ Ｐゴシック" charset="0"/>
+                <a:cs typeface="+mn-cs"/>
+              </a:defRPr>
+            </a:lvl2pPr>
+            <a:lvl3pPr marL="855663" indent="-166688" algn="l" rtl="0" eaLnBrk="1" fontAlgn="base" hangingPunct="1">
+              <a:lnSpc>
+                <a:spcPct val="100000"/>
+              </a:lnSpc>
+              <a:spcBef>
+                <a:spcPts val="0"/>
+              </a:spcBef>
+              <a:spcAft>
+                <a:spcPts val="0"/>
+              </a:spcAft>
+              <a:buClr>
+                <a:schemeClr val="accent1"/>
+              </a:buClr>
+              <a:buSzPct val="80000"/>
+              <a:buFont typeface="Calibri" charset="0"/>
+              <a:buChar char="–"/>
+              <a:defRPr kern="1200">
+                <a:solidFill>
+                  <a:schemeClr val="tx2"/>
+                </a:solidFill>
+                <a:latin typeface="+mn-lt"/>
+                <a:ea typeface="ＭＳ Ｐゴシック" charset="0"/>
+                <a:cs typeface="+mn-cs"/>
+              </a:defRPr>
+            </a:lvl3pPr>
+            <a:lvl4pPr marL="1201738" indent="-173038" algn="l" rtl="0" eaLnBrk="1" fontAlgn="base" hangingPunct="1">
+              <a:lnSpc>
+                <a:spcPct val="100000"/>
+              </a:lnSpc>
+              <a:spcBef>
+                <a:spcPts val="0"/>
+              </a:spcBef>
+              <a:spcAft>
+                <a:spcPts val="0"/>
+              </a:spcAft>
+              <a:buClr>
+                <a:schemeClr val="accent1"/>
+              </a:buClr>
+              <a:buSzPct val="80000"/>
+              <a:buFont typeface="Wingdings" charset="2"/>
+              <a:buChar char="§"/>
+              <a:defRPr kern="1200">
+                <a:solidFill>
+                  <a:schemeClr val="tx2"/>
+                </a:solidFill>
+                <a:latin typeface="+mn-lt"/>
+                <a:ea typeface="ＭＳ Ｐゴシック" charset="0"/>
+                <a:cs typeface="+mn-cs"/>
+              </a:defRPr>
+            </a:lvl4pPr>
+            <a:lvl5pPr marL="1427163" indent="-168275" algn="l" rtl="0" eaLnBrk="1" fontAlgn="base" hangingPunct="1">
+              <a:lnSpc>
+                <a:spcPct val="100000"/>
+              </a:lnSpc>
+              <a:spcBef>
+                <a:spcPts val="0"/>
+              </a:spcBef>
+              <a:spcAft>
+                <a:spcPts val="0"/>
+              </a:spcAft>
+              <a:buClr>
+                <a:schemeClr val="accent1"/>
+              </a:buClr>
+              <a:buSzPct val="80000"/>
+              <a:buFont typeface="Calibri" charset="0"/>
+              <a:buChar char="–"/>
+              <a:defRPr kern="1200">
+                <a:solidFill>
+                  <a:schemeClr val="tx2"/>
+                </a:solidFill>
+                <a:latin typeface="+mn-lt"/>
+                <a:ea typeface="ＭＳ Ｐゴシック" charset="0"/>
+                <a:cs typeface="+mn-cs"/>
+              </a:defRPr>
+            </a:lvl5pPr>
+            <a:lvl6pPr marL="1655064" indent="-164592" algn="l" defTabSz="914400" rtl="0" eaLnBrk="1" latinLnBrk="0" hangingPunct="1">
+              <a:lnSpc>
+                <a:spcPct val="100000"/>
+              </a:lnSpc>
+              <a:spcBef>
+                <a:spcPts val="0"/>
+              </a:spcBef>
+              <a:spcAft>
+                <a:spcPts val="0"/>
+              </a:spcAft>
+              <a:buClr>
+                <a:schemeClr val="accent1"/>
+              </a:buClr>
+              <a:buSzPct val="80000"/>
+              <a:buFont typeface="Wingdings" panose="05000000000000000000" pitchFamily="2" charset="2"/>
+              <a:buChar char="§"/>
+              <a:defRPr lang="en-US" sz="1600" kern="1200" dirty="0" smtClean="0">
+                <a:solidFill>
+                  <a:srgbClr val="383838"/>
+                </a:solidFill>
+                <a:latin typeface="+mn-lt"/>
+                <a:ea typeface="+mn-ea"/>
+                <a:cs typeface="+mn-cs"/>
+              </a:defRPr>
+            </a:lvl6pPr>
+            <a:lvl7pPr marL="1883664" indent="-164592" algn="l" defTabSz="914400" rtl="0" eaLnBrk="1" latinLnBrk="0" hangingPunct="1">
+              <a:lnSpc>
+                <a:spcPct val="100000"/>
+              </a:lnSpc>
+              <a:spcBef>
+                <a:spcPts val="0"/>
+              </a:spcBef>
+              <a:spcAft>
+                <a:spcPts val="0"/>
+              </a:spcAft>
+              <a:buClr>
+                <a:schemeClr val="accent1"/>
+              </a:buClr>
+              <a:buSzPct val="80000"/>
+              <a:buFont typeface="Calibri" panose="020F0502020204030204" pitchFamily="34" charset="0"/>
+              <a:buChar char="–"/>
+              <a:defRPr lang="en-US" sz="1600" kern="1200" dirty="0" smtClean="0">
+                <a:solidFill>
+                  <a:srgbClr val="383838"/>
+                </a:solidFill>
+                <a:latin typeface="+mn-lt"/>
+                <a:ea typeface="+mn-ea"/>
+                <a:cs typeface="+mn-cs"/>
+              </a:defRPr>
+            </a:lvl7pPr>
+            <a:lvl8pPr marL="2112264" indent="-164592" algn="l" defTabSz="914400" rtl="0" eaLnBrk="1" latinLnBrk="0" hangingPunct="1">
+              <a:lnSpc>
+                <a:spcPct val="100000"/>
+              </a:lnSpc>
+              <a:spcBef>
+                <a:spcPts val="0"/>
+              </a:spcBef>
+              <a:spcAft>
+                <a:spcPts val="0"/>
+              </a:spcAft>
+              <a:buClr>
+                <a:schemeClr val="accent1"/>
+              </a:buClr>
+              <a:buSzPct val="80000"/>
+              <a:buFont typeface="Wingdings" panose="05000000000000000000" pitchFamily="2" charset="2"/>
+              <a:buChar char="§"/>
+              <a:defRPr lang="en-US" sz="1600" kern="1200" dirty="0" smtClean="0">
+                <a:solidFill>
+                  <a:srgbClr val="383838"/>
+                </a:solidFill>
+                <a:latin typeface="+mn-lt"/>
+                <a:ea typeface="+mn-ea"/>
+                <a:cs typeface="+mn-cs"/>
+              </a:defRPr>
+            </a:lvl8pPr>
+            <a:lvl9pPr marL="2340864" indent="-164592" algn="l" defTabSz="914400" rtl="0" eaLnBrk="1" latinLnBrk="0" hangingPunct="1">
+              <a:lnSpc>
+                <a:spcPct val="100000"/>
+              </a:lnSpc>
+              <a:spcBef>
+                <a:spcPts val="0"/>
+              </a:spcBef>
+              <a:spcAft>
+                <a:spcPts val="0"/>
+              </a:spcAft>
+              <a:buClr>
+                <a:schemeClr val="accent1"/>
+              </a:buClr>
+              <a:buSzPct val="80000"/>
+              <a:buFont typeface="Calibri" panose="020F0502020204030204" pitchFamily="34" charset="0"/>
+              <a:buChar char="–"/>
+              <a:defRPr lang="en-US" sz="1600" kern="1200" dirty="0" smtClean="0">
+                <a:solidFill>
+                  <a:srgbClr val="383838"/>
+                </a:solidFill>
+                <a:latin typeface="+mn-lt"/>
+                <a:ea typeface="+mn-ea"/>
+                <a:cs typeface="+mn-cs"/>
+              </a:defRPr>
+            </a:lvl9pPr>
+          </a:lstStyle>
+          <a:p>
+            <a:pPr>
+              <a:buFont typeface="+mj-lt"/>
+              <a:buAutoNum type="arabicPeriod" startAt="2"/>
+            </a:pPr>
+            <a:r>
+              <a:rPr lang="en-US" sz="1600" dirty="0"/>
+              <a:t>User runs Generator</a:t>
+            </a:r>
+          </a:p>
+          <a:p>
+            <a:pPr indent="-169863"/>
+            <a:r>
+              <a:rPr lang="en-GB" sz="1050" dirty="0">
+                <a:solidFill>
+                  <a:srgbClr val="800000"/>
+                </a:solidFill>
+                <a:latin typeface="Consolas" panose="020B0609020204030204" pitchFamily="49" charset="0"/>
+              </a:rPr>
+              <a:t>`*.</a:t>
+            </a:r>
+            <a:r>
+              <a:rPr lang="en-GB" sz="1050" dirty="0" err="1">
+                <a:solidFill>
+                  <a:srgbClr val="800000"/>
+                </a:solidFill>
+                <a:latin typeface="Consolas" panose="020B0609020204030204" pitchFamily="49" charset="0"/>
+              </a:rPr>
+              <a:t>cgen.yml</a:t>
+            </a:r>
+            <a:r>
+              <a:rPr lang="en-GB" sz="1050" dirty="0">
+                <a:solidFill>
+                  <a:srgbClr val="800000"/>
+                </a:solidFill>
+                <a:latin typeface="Consolas" panose="020B0609020204030204" pitchFamily="49" charset="0"/>
+              </a:rPr>
+              <a:t>`</a:t>
+            </a:r>
+            <a:r>
+              <a:rPr lang="en-US" sz="1050" dirty="0"/>
+              <a:t> provides the input to the Generator with a list of selected components</a:t>
+            </a:r>
+          </a:p>
+          <a:p>
+            <a:pPr indent="-169863"/>
+            <a:r>
+              <a:rPr lang="en-US" sz="1050" dirty="0"/>
+              <a:t>Configuration is done.  </a:t>
+            </a:r>
+          </a:p>
+          <a:p>
+            <a:pPr lvl="1" indent="-169863"/>
+            <a:r>
+              <a:rPr lang="en-US" sz="650" dirty="0"/>
+              <a:t>Interactive mode (where a settings file is generated)</a:t>
+            </a:r>
+          </a:p>
+          <a:p>
+            <a:pPr lvl="1" indent="-169863"/>
+            <a:r>
+              <a:rPr lang="en-US" sz="650" dirty="0"/>
+              <a:t>Remote mode (where a settings file is an input)</a:t>
+            </a:r>
+          </a:p>
+          <a:p>
+            <a:pPr indent="-169863"/>
+            <a:r>
+              <a:rPr lang="en-US" sz="1050" dirty="0">
+                <a:solidFill>
+                  <a:srgbClr val="000000"/>
+                </a:solidFill>
+                <a:latin typeface="Consolas" panose="020B0609020204030204" pitchFamily="49" charset="0"/>
+              </a:rPr>
+              <a:t>Generator creates the “</a:t>
+            </a:r>
+            <a:r>
+              <a:rPr lang="en-GB" sz="900" b="0" dirty="0" err="1">
+                <a:solidFill>
+                  <a:srgbClr val="0000FF"/>
+                </a:solidFill>
+                <a:effectLst/>
+                <a:latin typeface="Consolas" panose="020B0609020204030204" pitchFamily="49" charset="0"/>
+              </a:rPr>
+              <a:t>myGen.gpdsc</a:t>
+            </a:r>
+            <a:r>
+              <a:rPr lang="en-GB" sz="900" b="0" dirty="0">
+                <a:solidFill>
+                  <a:srgbClr val="0000FF"/>
+                </a:solidFill>
+                <a:effectLst/>
+                <a:latin typeface="Consolas" panose="020B0609020204030204" pitchFamily="49" charset="0"/>
+              </a:rPr>
+              <a:t>” </a:t>
+            </a:r>
+            <a:r>
+              <a:rPr lang="en-US" sz="1050" dirty="0"/>
+              <a:t>that informs the </a:t>
+            </a:r>
+            <a:r>
+              <a:rPr lang="en-US" sz="1050" dirty="0" err="1"/>
+              <a:t>CSolution</a:t>
+            </a:r>
+            <a:r>
+              <a:rPr lang="en-US" sz="1050" dirty="0"/>
+              <a:t> tool about (a) the fact that a component is configured and has generated code, (b) additional components that are the result of some user configuration.</a:t>
+            </a:r>
+          </a:p>
+          <a:p>
+            <a:pPr marL="173037" indent="0">
+              <a:buNone/>
+            </a:pPr>
+            <a:r>
+              <a:rPr lang="en-GB" sz="1050" b="1" dirty="0">
+                <a:solidFill>
+                  <a:srgbClr val="800000"/>
+                </a:solidFill>
+                <a:latin typeface="Consolas" panose="020B0609020204030204" pitchFamily="49" charset="0"/>
+              </a:rPr>
+              <a:t>Discussion: is a component list or a dependency list</a:t>
+            </a:r>
+          </a:p>
+          <a:p>
+            <a:pPr marL="173037" indent="0">
+              <a:buNone/>
+            </a:pPr>
+            <a:endParaRPr lang="en-GB" sz="1050" b="1" dirty="0">
+              <a:solidFill>
+                <a:srgbClr val="800000"/>
+              </a:solidFill>
+              <a:latin typeface="Consolas" panose="020B0609020204030204" pitchFamily="49" charset="0"/>
+            </a:endParaRPr>
+          </a:p>
+          <a:p>
+            <a:pPr marL="173037" indent="0">
+              <a:buNone/>
+            </a:pPr>
+            <a:r>
+              <a:rPr lang="en-GB" sz="1050" b="1" dirty="0">
+                <a:solidFill>
+                  <a:srgbClr val="800000"/>
+                </a:solidFill>
+                <a:latin typeface="Consolas" panose="020B0609020204030204" pitchFamily="49" charset="0"/>
+              </a:rPr>
+              <a:t>Generator might be VS Code plugin or web based.</a:t>
+            </a:r>
+          </a:p>
+          <a:p>
+            <a:pPr marL="173037" indent="0">
+              <a:buFont typeface="Arial" charset="0"/>
+              <a:buNone/>
+            </a:pPr>
+            <a:endParaRPr lang="en-GB" sz="1050" b="1" dirty="0">
+              <a:solidFill>
+                <a:srgbClr val="800000"/>
+              </a:solidFill>
+              <a:latin typeface="Consolas" panose="020B0609020204030204" pitchFamily="49" charset="0"/>
+            </a:endParaRPr>
+          </a:p>
+        </p:txBody>
+      </p:sp>
+      <p:sp>
+        <p:nvSpPr>
+          <p:cNvPr id="6" name="Content Placeholder 3">
+            <a:extLst>
+              <a:ext uri="{FF2B5EF4-FFF2-40B4-BE49-F238E27FC236}">
+                <a16:creationId xmlns:a16="http://schemas.microsoft.com/office/drawing/2014/main" id="{8D75BAFB-756B-47FC-AA7B-9A1A5A976E21}"/>
+              </a:ext>
+            </a:extLst>
+          </p:cNvPr>
+          <p:cNvSpPr txBox="1">
+            <a:spLocks/>
+          </p:cNvSpPr>
+          <p:nvPr/>
+        </p:nvSpPr>
+        <p:spPr>
+          <a:xfrm>
+            <a:off x="6164826" y="1534335"/>
+            <a:ext cx="2414915" cy="3460857"/>
+          </a:xfrm>
+          <a:prstGeom prst="rect">
+            <a:avLst/>
+          </a:prstGeom>
+        </p:spPr>
+        <p:txBody>
+          <a:bodyPr vert="horz" lIns="0" tIns="0" rIns="0" bIns="0" rtlCol="0">
+            <a:noAutofit/>
+          </a:bodyPr>
+          <a:lstStyle>
+            <a:lvl1pPr marL="342900" indent="-342900" algn="l" rtl="0" eaLnBrk="1" fontAlgn="base" hangingPunct="1">
+              <a:lnSpc>
+                <a:spcPct val="100000"/>
+              </a:lnSpc>
+              <a:spcBef>
+                <a:spcPts val="600"/>
+              </a:spcBef>
+              <a:spcAft>
+                <a:spcPts val="0"/>
+              </a:spcAft>
+              <a:buClr>
+                <a:schemeClr val="accent1"/>
+              </a:buClr>
+              <a:buFont typeface="Arial" charset="0"/>
+              <a:buChar char="•"/>
+              <a:defRPr sz="2400" kern="1200">
+                <a:solidFill>
+                  <a:schemeClr val="tx2"/>
+                </a:solidFill>
+                <a:latin typeface="+mn-lt"/>
+                <a:ea typeface="ＭＳ Ｐゴシック" charset="0"/>
+                <a:cs typeface="ＭＳ Ｐゴシック" charset="0"/>
+              </a:defRPr>
+            </a:lvl1pPr>
+            <a:lvl2pPr marL="581343" indent="-166688" algn="l" rtl="0" eaLnBrk="1" fontAlgn="base" hangingPunct="1">
+              <a:lnSpc>
+                <a:spcPct val="100000"/>
+              </a:lnSpc>
+              <a:spcBef>
+                <a:spcPts val="0"/>
+              </a:spcBef>
+              <a:spcAft>
+                <a:spcPts val="0"/>
+              </a:spcAft>
+              <a:buClr>
+                <a:schemeClr val="accent1"/>
+              </a:buClr>
+              <a:buSzPct val="80000"/>
+              <a:buFont typeface="Arial" charset="0"/>
+              <a:buChar char="•"/>
+              <a:defRPr sz="2000" kern="1200">
+                <a:solidFill>
+                  <a:schemeClr val="tx2"/>
+                </a:solidFill>
+                <a:latin typeface="+mn-lt"/>
+                <a:ea typeface="ＭＳ Ｐゴシック" charset="0"/>
+                <a:cs typeface="+mn-cs"/>
+              </a:defRPr>
+            </a:lvl2pPr>
+            <a:lvl3pPr marL="855663" indent="-166688" algn="l" rtl="0" eaLnBrk="1" fontAlgn="base" hangingPunct="1">
+              <a:lnSpc>
+                <a:spcPct val="100000"/>
+              </a:lnSpc>
+              <a:spcBef>
+                <a:spcPts val="0"/>
+              </a:spcBef>
+              <a:spcAft>
+                <a:spcPts val="0"/>
+              </a:spcAft>
+              <a:buClr>
+                <a:schemeClr val="accent1"/>
+              </a:buClr>
+              <a:buSzPct val="80000"/>
+              <a:buFont typeface="Calibri" charset="0"/>
+              <a:buChar char="–"/>
+              <a:defRPr kern="1200">
+                <a:solidFill>
+                  <a:schemeClr val="tx2"/>
+                </a:solidFill>
+                <a:latin typeface="+mn-lt"/>
+                <a:ea typeface="ＭＳ Ｐゴシック" charset="0"/>
+                <a:cs typeface="+mn-cs"/>
+              </a:defRPr>
+            </a:lvl3pPr>
+            <a:lvl4pPr marL="1201738" indent="-173038" algn="l" rtl="0" eaLnBrk="1" fontAlgn="base" hangingPunct="1">
+              <a:lnSpc>
+                <a:spcPct val="100000"/>
+              </a:lnSpc>
+              <a:spcBef>
+                <a:spcPts val="0"/>
+              </a:spcBef>
+              <a:spcAft>
+                <a:spcPts val="0"/>
+              </a:spcAft>
+              <a:buClr>
+                <a:schemeClr val="accent1"/>
+              </a:buClr>
+              <a:buSzPct val="80000"/>
+              <a:buFont typeface="Wingdings" charset="2"/>
+              <a:buChar char="§"/>
+              <a:defRPr kern="1200">
+                <a:solidFill>
+                  <a:schemeClr val="tx2"/>
+                </a:solidFill>
+                <a:latin typeface="+mn-lt"/>
+                <a:ea typeface="ＭＳ Ｐゴシック" charset="0"/>
+                <a:cs typeface="+mn-cs"/>
+              </a:defRPr>
+            </a:lvl4pPr>
+            <a:lvl5pPr marL="1427163" indent="-168275" algn="l" rtl="0" eaLnBrk="1" fontAlgn="base" hangingPunct="1">
+              <a:lnSpc>
+                <a:spcPct val="100000"/>
+              </a:lnSpc>
+              <a:spcBef>
+                <a:spcPts val="0"/>
+              </a:spcBef>
+              <a:spcAft>
+                <a:spcPts val="0"/>
+              </a:spcAft>
+              <a:buClr>
+                <a:schemeClr val="accent1"/>
+              </a:buClr>
+              <a:buSzPct val="80000"/>
+              <a:buFont typeface="Calibri" charset="0"/>
+              <a:buChar char="–"/>
+              <a:defRPr kern="1200">
+                <a:solidFill>
+                  <a:schemeClr val="tx2"/>
+                </a:solidFill>
+                <a:latin typeface="+mn-lt"/>
+                <a:ea typeface="ＭＳ Ｐゴシック" charset="0"/>
+                <a:cs typeface="+mn-cs"/>
+              </a:defRPr>
+            </a:lvl5pPr>
+            <a:lvl6pPr marL="1655064" indent="-164592" algn="l" defTabSz="914400" rtl="0" eaLnBrk="1" latinLnBrk="0" hangingPunct="1">
+              <a:lnSpc>
+                <a:spcPct val="100000"/>
+              </a:lnSpc>
+              <a:spcBef>
+                <a:spcPts val="0"/>
+              </a:spcBef>
+              <a:spcAft>
+                <a:spcPts val="0"/>
+              </a:spcAft>
+              <a:buClr>
+                <a:schemeClr val="accent1"/>
+              </a:buClr>
+              <a:buSzPct val="80000"/>
+              <a:buFont typeface="Wingdings" panose="05000000000000000000" pitchFamily="2" charset="2"/>
+              <a:buChar char="§"/>
+              <a:defRPr lang="en-US" sz="1600" kern="1200" dirty="0" smtClean="0">
+                <a:solidFill>
+                  <a:srgbClr val="383838"/>
+                </a:solidFill>
+                <a:latin typeface="+mn-lt"/>
+                <a:ea typeface="+mn-ea"/>
+                <a:cs typeface="+mn-cs"/>
+              </a:defRPr>
+            </a:lvl6pPr>
+            <a:lvl7pPr marL="1883664" indent="-164592" algn="l" defTabSz="914400" rtl="0" eaLnBrk="1" latinLnBrk="0" hangingPunct="1">
+              <a:lnSpc>
+                <a:spcPct val="100000"/>
+              </a:lnSpc>
+              <a:spcBef>
+                <a:spcPts val="0"/>
+              </a:spcBef>
+              <a:spcAft>
+                <a:spcPts val="0"/>
+              </a:spcAft>
+              <a:buClr>
+                <a:schemeClr val="accent1"/>
+              </a:buClr>
+              <a:buSzPct val="80000"/>
+              <a:buFont typeface="Calibri" panose="020F0502020204030204" pitchFamily="34" charset="0"/>
+              <a:buChar char="–"/>
+              <a:defRPr lang="en-US" sz="1600" kern="1200" dirty="0" smtClean="0">
+                <a:solidFill>
+                  <a:srgbClr val="383838"/>
+                </a:solidFill>
+                <a:latin typeface="+mn-lt"/>
+                <a:ea typeface="+mn-ea"/>
+                <a:cs typeface="+mn-cs"/>
+              </a:defRPr>
+            </a:lvl7pPr>
+            <a:lvl8pPr marL="2112264" indent="-164592" algn="l" defTabSz="914400" rtl="0" eaLnBrk="1" latinLnBrk="0" hangingPunct="1">
+              <a:lnSpc>
+                <a:spcPct val="100000"/>
+              </a:lnSpc>
+              <a:spcBef>
+                <a:spcPts val="0"/>
+              </a:spcBef>
+              <a:spcAft>
+                <a:spcPts val="0"/>
+              </a:spcAft>
+              <a:buClr>
+                <a:schemeClr val="accent1"/>
+              </a:buClr>
+              <a:buSzPct val="80000"/>
+              <a:buFont typeface="Wingdings" panose="05000000000000000000" pitchFamily="2" charset="2"/>
+              <a:buChar char="§"/>
+              <a:defRPr lang="en-US" sz="1600" kern="1200" dirty="0" smtClean="0">
+                <a:solidFill>
+                  <a:srgbClr val="383838"/>
+                </a:solidFill>
+                <a:latin typeface="+mn-lt"/>
+                <a:ea typeface="+mn-ea"/>
+                <a:cs typeface="+mn-cs"/>
+              </a:defRPr>
+            </a:lvl8pPr>
+            <a:lvl9pPr marL="2340864" indent="-164592" algn="l" defTabSz="914400" rtl="0" eaLnBrk="1" latinLnBrk="0" hangingPunct="1">
+              <a:lnSpc>
+                <a:spcPct val="100000"/>
+              </a:lnSpc>
+              <a:spcBef>
+                <a:spcPts val="0"/>
+              </a:spcBef>
+              <a:spcAft>
+                <a:spcPts val="0"/>
+              </a:spcAft>
+              <a:buClr>
+                <a:schemeClr val="accent1"/>
+              </a:buClr>
+              <a:buSzPct val="80000"/>
+              <a:buFont typeface="Calibri" panose="020F0502020204030204" pitchFamily="34" charset="0"/>
+              <a:buChar char="–"/>
+              <a:defRPr lang="en-US" sz="1600" kern="1200" dirty="0" smtClean="0">
+                <a:solidFill>
+                  <a:srgbClr val="383838"/>
+                </a:solidFill>
+                <a:latin typeface="+mn-lt"/>
+                <a:ea typeface="+mn-ea"/>
+                <a:cs typeface="+mn-cs"/>
+              </a:defRPr>
+            </a:lvl9pPr>
+          </a:lstStyle>
+          <a:p>
+            <a:pPr>
+              <a:buFont typeface="+mj-lt"/>
+              <a:buAutoNum type="arabicPeriod" startAt="3"/>
+            </a:pPr>
+            <a:r>
+              <a:rPr lang="en-US" sz="1600" dirty="0"/>
+              <a:t>User creates </a:t>
+            </a:r>
+            <a:r>
+              <a:rPr lang="en-US" sz="1600" dirty="0" err="1"/>
+              <a:t>CBuild</a:t>
+            </a:r>
+            <a:r>
+              <a:rPr lang="en-US" sz="1600" dirty="0"/>
+              <a:t> output with </a:t>
+            </a:r>
+            <a:r>
+              <a:rPr lang="en-US" sz="1600" dirty="0" err="1"/>
+              <a:t>CSolution</a:t>
+            </a:r>
+            <a:endParaRPr lang="en-US" sz="1600" dirty="0"/>
+          </a:p>
+          <a:p>
+            <a:pPr indent="-169863"/>
+            <a:r>
+              <a:rPr lang="en-US" sz="1050" dirty="0"/>
+              <a:t>Both </a:t>
+            </a:r>
+            <a:r>
+              <a:rPr lang="en-US" sz="1050" dirty="0">
+                <a:solidFill>
+                  <a:srgbClr val="800000"/>
+                </a:solidFill>
+                <a:latin typeface="Consolas" panose="020B0609020204030204" pitchFamily="49" charset="0"/>
+              </a:rPr>
+              <a:t>`*.</a:t>
+            </a:r>
+            <a:r>
+              <a:rPr lang="en-US" sz="1050" dirty="0" err="1">
+                <a:solidFill>
+                  <a:srgbClr val="800000"/>
+                </a:solidFill>
+                <a:latin typeface="Consolas" panose="020B0609020204030204" pitchFamily="49" charset="0"/>
+              </a:rPr>
+              <a:t>cproject.yml</a:t>
+            </a:r>
+            <a:r>
+              <a:rPr lang="en-US" sz="1050" dirty="0">
+                <a:solidFill>
+                  <a:srgbClr val="800000"/>
+                </a:solidFill>
+                <a:latin typeface="Consolas" panose="020B0609020204030204" pitchFamily="49" charset="0"/>
+              </a:rPr>
+              <a:t>` “</a:t>
+            </a:r>
+            <a:r>
+              <a:rPr lang="en-GB" sz="1050" dirty="0" err="1">
+                <a:solidFill>
+                  <a:srgbClr val="800000"/>
+                </a:solidFill>
+                <a:latin typeface="Consolas" panose="020B0609020204030204" pitchFamily="49" charset="0"/>
+              </a:rPr>
+              <a:t>myGen.gpdsc</a:t>
+            </a:r>
+            <a:r>
+              <a:rPr lang="en-GB" sz="1050" dirty="0">
+                <a:solidFill>
+                  <a:srgbClr val="800000"/>
+                </a:solidFill>
+                <a:latin typeface="Consolas" panose="020B0609020204030204" pitchFamily="49" charset="0"/>
+              </a:rPr>
+              <a:t>” </a:t>
+            </a:r>
+            <a:r>
+              <a:rPr lang="en-GB" sz="1050" dirty="0"/>
+              <a:t>and read by </a:t>
+            </a:r>
+            <a:r>
+              <a:rPr lang="en-GB" sz="1050" dirty="0" err="1"/>
+              <a:t>Csolution</a:t>
+            </a:r>
+            <a:r>
+              <a:rPr lang="en-GB" sz="1050" dirty="0"/>
+              <a:t> and create the complete list of selected components.</a:t>
+            </a:r>
+          </a:p>
+          <a:p>
+            <a:pPr indent="-169863"/>
+            <a:r>
+              <a:rPr lang="en-GB" sz="1050" dirty="0"/>
+              <a:t>If </a:t>
+            </a:r>
+            <a:r>
+              <a:rPr lang="en-US" sz="1050" dirty="0">
+                <a:solidFill>
+                  <a:srgbClr val="800000"/>
+                </a:solidFill>
+                <a:latin typeface="Consolas" panose="020B0609020204030204" pitchFamily="49" charset="0"/>
+              </a:rPr>
+              <a:t>“</a:t>
+            </a:r>
+            <a:r>
+              <a:rPr lang="en-GB" sz="1050" dirty="0" err="1">
+                <a:solidFill>
+                  <a:srgbClr val="800000"/>
+                </a:solidFill>
+                <a:latin typeface="Consolas" panose="020B0609020204030204" pitchFamily="49" charset="0"/>
+              </a:rPr>
+              <a:t>myGen.gpdsc</a:t>
+            </a:r>
+            <a:r>
+              <a:rPr lang="en-GB" sz="1050" dirty="0">
+                <a:solidFill>
+                  <a:srgbClr val="800000"/>
+                </a:solidFill>
+                <a:latin typeface="Consolas" panose="020B0609020204030204" pitchFamily="49" charset="0"/>
+              </a:rPr>
+              <a:t>” </a:t>
+            </a:r>
+            <a:r>
+              <a:rPr lang="en-GB" sz="1050" dirty="0"/>
+              <a:t>does not contain component information about a component with `</a:t>
+            </a:r>
+            <a:r>
+              <a:rPr lang="en-GB" sz="1050" dirty="0" err="1"/>
+              <a:t>genId</a:t>
+            </a:r>
+            <a:r>
+              <a:rPr lang="en-GB" sz="1050" dirty="0"/>
+              <a:t>` that is selected in </a:t>
+            </a:r>
+            <a:r>
+              <a:rPr lang="en-US" sz="1050" dirty="0">
+                <a:solidFill>
+                  <a:srgbClr val="800000"/>
+                </a:solidFill>
+                <a:latin typeface="Consolas" panose="020B0609020204030204" pitchFamily="49" charset="0"/>
+              </a:rPr>
+              <a:t>`*.</a:t>
+            </a:r>
+            <a:r>
+              <a:rPr lang="en-US" sz="1050" dirty="0" err="1">
+                <a:solidFill>
+                  <a:srgbClr val="800000"/>
+                </a:solidFill>
+                <a:latin typeface="Consolas" panose="020B0609020204030204" pitchFamily="49" charset="0"/>
+              </a:rPr>
+              <a:t>cproject.yml</a:t>
+            </a:r>
+            <a:r>
+              <a:rPr lang="en-US" sz="1050" dirty="0">
+                <a:solidFill>
+                  <a:srgbClr val="800000"/>
+                </a:solidFill>
+                <a:latin typeface="Consolas" panose="020B0609020204030204" pitchFamily="49" charset="0"/>
+              </a:rPr>
+              <a:t>` </a:t>
+            </a:r>
+            <a:r>
+              <a:rPr lang="en-US" sz="1050" dirty="0"/>
+              <a:t>the generator configuration is incomplete. This can happen when a component is added at a later step.</a:t>
+            </a:r>
+          </a:p>
+          <a:p>
+            <a:pPr indent="-169863"/>
+            <a:r>
+              <a:rPr lang="en-US" sz="1050" dirty="0"/>
+              <a:t>Likewise the Generator should remove components that are no longer required. An indicator is needed.  </a:t>
+            </a:r>
+            <a:r>
+              <a:rPr lang="en-US" sz="1050"/>
+              <a:t>(NOT SOLVED YET)</a:t>
+            </a:r>
+            <a:endParaRPr lang="en-US" sz="1050" dirty="0"/>
+          </a:p>
+          <a:p>
+            <a:pPr marL="173037" indent="0">
+              <a:buNone/>
+            </a:pPr>
+            <a:endParaRPr lang="en-US" sz="1050" dirty="0"/>
+          </a:p>
+          <a:p>
+            <a:pPr indent="-169863"/>
+            <a:endParaRPr lang="en-GB" sz="1050" dirty="0"/>
+          </a:p>
+          <a:p>
+            <a:pPr marL="173037" indent="0">
+              <a:buFont typeface="Arial" charset="0"/>
+              <a:buNone/>
+            </a:pPr>
+            <a:endParaRPr lang="en-GB" sz="1050" b="1" dirty="0">
+              <a:solidFill>
+                <a:srgbClr val="800000"/>
+              </a:solidFill>
+              <a:latin typeface="Consolas" panose="020B0609020204030204" pitchFamily="49" charset="0"/>
+            </a:endParaRPr>
+          </a:p>
+        </p:txBody>
+      </p:sp>
+    </p:spTree>
+    <p:extLst>
+      <p:ext uri="{BB962C8B-B14F-4D97-AF65-F5344CB8AC3E}">
+        <p14:creationId xmlns:p14="http://schemas.microsoft.com/office/powerpoint/2010/main" val="4069076353"/>
+      </p:ext>
+    </p:extLst>
+  </p:cSld>
+  <p:clrMapOvr>
+    <a:masterClrMapping/>
+  </p:clrMapOvr>
 </p:sld>
 </file>
 

</xml_diff>

<commit_message>
Tweaks to sync image and text
</commit_message>
<xml_diff>
--- a/tools/projmgr/docs/Manual/images/overview.pptx
+++ b/tools/projmgr/docs/Manual/images/overview.pptx
@@ -296,7 +296,7 @@
           <a:p>
             <a:fld id="{008FFADC-39A7-449E-8C68-8776E6FB3C1A}" type="datetimeFigureOut">
               <a:rPr lang="en-GB" smtClean="0"/>
-              <a:t>28/02/2022</a:t>
+              <a:t>24/03/2022</a:t>
             </a:fld>
             <a:endParaRPr lang="en-GB"/>
           </a:p>
@@ -473,7 +473,7 @@
           <a:p>
             <a:fld id="{30B9BAAB-B703-4BB5-9D08-B460FC03C23A}" type="datetimeFigureOut">
               <a:rPr lang="en-GB" smtClean="0"/>
-              <a:t>28/02/2022</a:t>
+              <a:t>24/03/2022</a:t>
             </a:fld>
             <a:endParaRPr lang="en-GB"/>
           </a:p>
@@ -6768,40 +6768,35 @@
           </a:fontRef>
         </p:style>
         <p:txBody>
-          <a:bodyPr rtlCol="0" anchor="ctr"/>
+          <a:bodyPr rtlCol="0" anchor="t"/>
           <a:lstStyle/>
           <a:p>
-            <a:pPr marL="0" marR="0" lvl="0" indent="0" algn="ctr" defTabSz="914400" rtl="0" eaLnBrk="0" fontAlgn="base" latinLnBrk="0" hangingPunct="0">
-              <a:lnSpc>
-                <a:spcPct val="100000"/>
-              </a:lnSpc>
+            <a:pPr algn="ctr" eaLnBrk="0" fontAlgn="base" hangingPunct="0">
               <a:spcBef>
                 <a:spcPct val="0"/>
               </a:spcBef>
               <a:spcAft>
                 <a:spcPct val="0"/>
               </a:spcAft>
-              <a:buClrTx/>
-              <a:buSzTx/>
-              <a:buFontTx/>
-              <a:buNone/>
-              <a:tabLst/>
               <a:defRPr/>
             </a:pPr>
-            <a:endParaRPr kumimoji="0" lang="en-GB" sz="1800" b="0" i="0" u="none" strike="noStrike" kern="1200" cap="none" spc="0" normalizeH="0" baseline="0" noProof="0" dirty="0">
-              <a:ln>
-                <a:noFill/>
-              </a:ln>
-              <a:solidFill>
-                <a:srgbClr val="FFFFFF"/>
-              </a:solidFill>
-              <a:effectLst/>
-              <a:uLnTx/>
-              <a:uFillTx/>
-              <a:latin typeface="Calibri"/>
-              <a:ea typeface="+mn-ea"/>
-              <a:cs typeface="+mn-cs"/>
-            </a:endParaRPr>
+            <a:r>
+              <a:rPr kumimoji="0" lang="en-US" sz="1800" b="1" i="0" u="none" strike="noStrike" kern="1200" cap="none" spc="0" normalizeH="0" baseline="0" noProof="0" dirty="0">
+                <a:ln>
+                  <a:noFill/>
+                </a:ln>
+                <a:solidFill>
+                  <a:srgbClr val="333E48"/>
+                </a:solidFill>
+                <a:effectLst/>
+                <a:uLnTx/>
+                <a:uFillTx/>
+                <a:latin typeface="Calibri"/>
+                <a:ea typeface="ＭＳ Ｐゴシック" panose="020B0600070205080204" pitchFamily="34" charset="-128"/>
+                <a:cs typeface="+mn-cs"/>
+              </a:rPr>
+              <a:t>Output Files</a:t>
+            </a:r>
           </a:p>
         </p:txBody>
       </p:sp>
@@ -6900,8 +6895,8 @@
         </p:nvSpPr>
         <p:spPr>
           <a:xfrm>
-            <a:off x="4838702" y="1311440"/>
-            <a:ext cx="1786690" cy="3761874"/>
+            <a:off x="4838702" y="1216863"/>
+            <a:ext cx="1786690" cy="3856452"/>
           </a:xfrm>
           <a:prstGeom prst="rect">
             <a:avLst/>
@@ -6934,40 +6929,35 @@
           </a:fontRef>
         </p:style>
         <p:txBody>
-          <a:bodyPr rtlCol="0" anchor="ctr"/>
+          <a:bodyPr rtlCol="0" anchor="t"/>
           <a:lstStyle/>
           <a:p>
-            <a:pPr marL="0" marR="0" lvl="0" indent="0" algn="ctr" defTabSz="914400" rtl="0" eaLnBrk="0" fontAlgn="base" latinLnBrk="0" hangingPunct="0">
-              <a:lnSpc>
-                <a:spcPct val="100000"/>
-              </a:lnSpc>
+            <a:pPr algn="ctr" eaLnBrk="0" fontAlgn="base" hangingPunct="0">
               <a:spcBef>
                 <a:spcPct val="0"/>
               </a:spcBef>
               <a:spcAft>
                 <a:spcPct val="0"/>
               </a:spcAft>
-              <a:buClrTx/>
-              <a:buSzTx/>
-              <a:buFontTx/>
-              <a:buNone/>
-              <a:tabLst/>
               <a:defRPr/>
             </a:pPr>
-            <a:endParaRPr kumimoji="0" lang="en-GB" sz="1800" b="0" i="0" u="none" strike="noStrike" kern="1200" cap="none" spc="0" normalizeH="0" baseline="0" noProof="0" dirty="0">
-              <a:ln>
-                <a:noFill/>
-              </a:ln>
-              <a:solidFill>
-                <a:srgbClr val="FFFFFF"/>
-              </a:solidFill>
-              <a:effectLst/>
-              <a:uLnTx/>
-              <a:uFillTx/>
-              <a:latin typeface="Calibri"/>
-              <a:ea typeface="+mn-ea"/>
-              <a:cs typeface="+mn-cs"/>
-            </a:endParaRPr>
+            <a:r>
+              <a:rPr kumimoji="0" lang="en-US" sz="1800" b="1" i="0" u="none" strike="noStrike" kern="1200" cap="none" spc="0" normalizeH="0" baseline="0" noProof="0" dirty="0">
+                <a:ln>
+                  <a:noFill/>
+                </a:ln>
+                <a:solidFill>
+                  <a:srgbClr val="333E48"/>
+                </a:solidFill>
+                <a:effectLst/>
+                <a:uLnTx/>
+                <a:uFillTx/>
+                <a:latin typeface="Calibri"/>
+                <a:ea typeface="ＭＳ Ｐゴシック" panose="020B0600070205080204" pitchFamily="34" charset="-128"/>
+                <a:cs typeface="+mn-cs"/>
+              </a:rPr>
+              <a:t>Input Files</a:t>
+            </a:r>
           </a:p>
         </p:txBody>
       </p:sp>
@@ -6985,8 +6975,8 @@
         </p:nvSpPr>
         <p:spPr>
           <a:xfrm>
-            <a:off x="2292018" y="309838"/>
-            <a:ext cx="1786690" cy="4725377"/>
+            <a:off x="2292018" y="274719"/>
+            <a:ext cx="1786690" cy="4798595"/>
           </a:xfrm>
           <a:prstGeom prst="rect">
             <a:avLst/>
@@ -7018,40 +7008,35 @@
           </a:fontRef>
         </p:style>
         <p:txBody>
-          <a:bodyPr rtlCol="0" anchor="ctr"/>
+          <a:bodyPr rtlCol="0" anchor="t"/>
           <a:lstStyle/>
           <a:p>
-            <a:pPr marL="0" marR="0" lvl="0" indent="0" algn="ctr" defTabSz="914400" rtl="0" eaLnBrk="0" fontAlgn="base" latinLnBrk="0" hangingPunct="0">
-              <a:lnSpc>
-                <a:spcPct val="100000"/>
-              </a:lnSpc>
+            <a:pPr algn="ctr" eaLnBrk="0" fontAlgn="base" hangingPunct="0">
               <a:spcBef>
                 <a:spcPct val="0"/>
               </a:spcBef>
               <a:spcAft>
                 <a:spcPct val="0"/>
               </a:spcAft>
-              <a:buClrTx/>
-              <a:buSzTx/>
-              <a:buFontTx/>
-              <a:buNone/>
-              <a:tabLst/>
               <a:defRPr/>
             </a:pPr>
-            <a:endParaRPr kumimoji="0" lang="en-GB" sz="1800" b="0" i="0" u="none" strike="noStrike" kern="1200" cap="none" spc="0" normalizeH="0" baseline="0" noProof="0">
-              <a:ln>
-                <a:noFill/>
-              </a:ln>
-              <a:solidFill>
-                <a:srgbClr val="FFFFFF"/>
-              </a:solidFill>
-              <a:effectLst/>
-              <a:uLnTx/>
-              <a:uFillTx/>
-              <a:latin typeface="Calibri"/>
-              <a:ea typeface="+mn-ea"/>
-              <a:cs typeface="+mn-cs"/>
-            </a:endParaRPr>
+            <a:r>
+              <a:rPr kumimoji="0" lang="en-US" sz="1800" b="1" i="0" u="none" strike="noStrike" kern="1200" cap="none" spc="0" normalizeH="0" baseline="0" noProof="0" dirty="0">
+                <a:ln>
+                  <a:noFill/>
+                </a:ln>
+                <a:solidFill>
+                  <a:srgbClr val="333E48"/>
+                </a:solidFill>
+                <a:effectLst/>
+                <a:uLnTx/>
+                <a:uFillTx/>
+                <a:latin typeface="Calibri"/>
+                <a:ea typeface="ＭＳ Ｐゴシック" panose="020B0600070205080204" pitchFamily="34" charset="-128"/>
+                <a:cs typeface="+mn-cs"/>
+              </a:rPr>
+              <a:t>Software Packs</a:t>
+            </a:r>
           </a:p>
         </p:txBody>
       </p:sp>
@@ -7189,7 +7174,16 @@
               </a:rPr>
             </a:br>
             <a:r>
-              <a:rPr kumimoji="0" lang="en-US" sz="1100" b="0" i="0" u="none" strike="noStrike" kern="1200" cap="none" spc="0" normalizeH="0" baseline="0" noProof="0" dirty="0">
+              <a:rPr lang="en-US" sz="1050" dirty="0">
+                <a:solidFill>
+                  <a:srgbClr val="FFFFFF"/>
+                </a:solidFill>
+                <a:latin typeface="Calibri"/>
+              </a:rPr>
+              <a:t>D</a:t>
+            </a:r>
+            <a:r>
+              <a:rPr kumimoji="0" lang="en-US" sz="1000" b="0" i="0" u="none" strike="noStrike" kern="1200" cap="none" spc="0" normalizeH="0" baseline="0" noProof="0" dirty="0" err="1">
                 <a:ln>
                   <a:noFill/>
                 </a:ln>
@@ -7203,10 +7197,10 @@
                 <a:ea typeface="+mn-ea"/>
                 <a:cs typeface="+mn-cs"/>
               </a:rPr>
-              <a:t>that defines </a:t>
-            </a:r>
-            <a:br>
-              <a:rPr kumimoji="0" lang="en-US" sz="1100" b="0" i="0" u="none" strike="noStrike" kern="1200" cap="none" spc="0" normalizeH="0" baseline="0" noProof="0" dirty="0">
+              <a:t>efines</a:t>
+            </a:r>
+            <a:r>
+              <a:rPr kumimoji="0" lang="en-US" sz="1000" b="0" i="0" u="none" strike="noStrike" kern="1200" cap="none" spc="0" normalizeH="0" baseline="0" noProof="0" dirty="0">
                 <a:ln>
                   <a:noFill/>
                 </a:ln>
@@ -7220,23 +7214,7 @@
                 <a:ea typeface="+mn-ea"/>
                 <a:cs typeface="+mn-cs"/>
               </a:rPr>
-            </a:br>
-            <a:r>
-              <a:rPr kumimoji="0" lang="en-US" sz="1100" b="0" i="0" u="none" strike="noStrike" kern="1200" cap="none" spc="0" normalizeH="0" baseline="0" noProof="0" dirty="0">
-                <a:ln>
-                  <a:noFill/>
-                </a:ln>
-                <a:solidFill>
-                  <a:srgbClr val="FFFFFF"/>
-                </a:solidFill>
-                <a:effectLst/>
-                <a:uLnTx/>
-                <a:uFillTx/>
-                <a:latin typeface="Calibri"/>
-                <a:ea typeface="+mn-ea"/>
-                <a:cs typeface="+mn-cs"/>
-              </a:rPr>
-              <a:t>System Resources</a:t>
+              <a:t> system resources</a:t>
             </a:r>
             <a:endParaRPr kumimoji="0" lang="en-GB" sz="1100" b="0" i="0" u="none" strike="noStrike" kern="1200" cap="none" spc="0" normalizeH="0" baseline="0" noProof="0" dirty="0">
               <a:ln>
@@ -7702,7 +7680,7 @@
           </a:fontRef>
         </p:style>
         <p:txBody>
-          <a:bodyPr rtlCol="0" anchor="ctr"/>
+          <a:bodyPr lIns="36000" rIns="36000" rtlCol="0" anchor="ctr"/>
           <a:lstStyle/>
           <a:p>
             <a:pPr marL="0" marR="0" lvl="0" indent="0" algn="ctr" defTabSz="914400" rtl="0" eaLnBrk="0" fontAlgn="base" latinLnBrk="0" hangingPunct="0">
@@ -7723,7 +7701,7 @@
               <a:defRPr/>
             </a:pPr>
             <a:r>
-              <a:rPr lang="en-US" sz="1000" dirty="0">
+              <a:rPr lang="en-US" sz="1200" dirty="0">
                 <a:solidFill>
                   <a:schemeClr val="bg2">
                     <a:lumMod val="25000"/>
@@ -8130,7 +8108,7 @@
               <a:defRPr/>
             </a:pPr>
             <a:r>
-              <a:rPr kumimoji="0" lang="en-US" sz="1100" b="0" i="0" u="none" strike="noStrike" kern="1200" cap="none" spc="0" normalizeH="0" baseline="0" noProof="0" dirty="0">
+              <a:rPr kumimoji="0" lang="en-US" sz="1000" b="0" i="0" u="none" strike="noStrike" kern="1200" cap="none" spc="0" normalizeH="0" baseline="0" noProof="0" dirty="0">
                 <a:ln>
                   <a:noFill/>
                 </a:ln>
@@ -8144,10 +8122,10 @@
                 <a:ea typeface="+mn-ea"/>
                 <a:cs typeface="+mn-cs"/>
               </a:rPr>
-              <a:t>that defines Device</a:t>
+              <a:t>Defines device</a:t>
             </a:r>
             <a:br>
-              <a:rPr kumimoji="0" lang="en-US" sz="1100" b="0" i="0" u="none" strike="noStrike" kern="1200" cap="none" spc="0" normalizeH="0" baseline="0" noProof="0" dirty="0">
+              <a:rPr kumimoji="0" lang="en-US" sz="1000" b="0" i="0" u="none" strike="noStrike" kern="1200" cap="none" spc="0" normalizeH="0" baseline="0" noProof="0" dirty="0">
                 <a:ln>
                   <a:noFill/>
                 </a:ln>
@@ -8163,7 +8141,7 @@
               </a:rPr>
             </a:br>
             <a:r>
-              <a:rPr kumimoji="0" lang="en-US" sz="1100" b="0" i="0" u="none" strike="noStrike" kern="1200" cap="none" spc="0" normalizeH="0" baseline="0" noProof="0" dirty="0">
+              <a:rPr kumimoji="0" lang="en-US" sz="1000" b="0" i="0" u="none" strike="noStrike" kern="1200" cap="none" spc="0" normalizeH="0" baseline="0" noProof="0" dirty="0">
                 <a:ln>
                   <a:noFill/>
                 </a:ln>
@@ -8177,9 +8155,9 @@
                 <a:ea typeface="+mn-ea"/>
                 <a:cs typeface="+mn-cs"/>
               </a:rPr>
-              <a:t>Properties</a:t>
-            </a:r>
-            <a:endParaRPr kumimoji="0" lang="en-GB" sz="1100" b="0" i="0" u="none" strike="noStrike" kern="1200" cap="none" spc="0" normalizeH="0" baseline="0" noProof="0" dirty="0">
+              <a:t>properties</a:t>
+            </a:r>
+            <a:endParaRPr kumimoji="0" lang="en-GB" sz="1000" b="0" i="0" u="none" strike="noStrike" kern="1200" cap="none" spc="0" normalizeH="0" baseline="0" noProof="0" dirty="0">
               <a:ln>
                 <a:noFill/>
               </a:ln>
@@ -8296,7 +8274,7 @@
               </a:rPr>
             </a:br>
             <a:r>
-              <a:rPr kumimoji="0" lang="en-US" sz="1100" b="0" i="0" u="none" strike="noStrike" kern="1200" cap="none" spc="0" normalizeH="0" baseline="0" noProof="0" dirty="0">
+              <a:rPr kumimoji="0" lang="en-US" sz="1000" b="0" i="0" u="none" strike="noStrike" kern="1200" cap="none" spc="0" normalizeH="0" baseline="0" noProof="0" dirty="0">
                 <a:ln>
                   <a:noFill/>
                 </a:ln>
@@ -8310,10 +8288,10 @@
                 <a:ea typeface="+mn-ea"/>
                 <a:cs typeface="+mn-cs"/>
               </a:rPr>
-              <a:t>that defines Board</a:t>
+              <a:t>Defines board</a:t>
             </a:r>
             <a:br>
-              <a:rPr kumimoji="0" lang="en-US" sz="1100" b="0" i="0" u="none" strike="noStrike" kern="1200" cap="none" spc="0" normalizeH="0" baseline="0" noProof="0" dirty="0">
+              <a:rPr kumimoji="0" lang="en-US" sz="1000" b="0" i="0" u="none" strike="noStrike" kern="1200" cap="none" spc="0" normalizeH="0" baseline="0" noProof="0" dirty="0">
                 <a:ln>
                   <a:noFill/>
                 </a:ln>
@@ -8329,7 +8307,7 @@
               </a:rPr>
             </a:br>
             <a:r>
-              <a:rPr kumimoji="0" lang="en-US" sz="1100" b="0" i="0" u="none" strike="noStrike" kern="1200" cap="none" spc="0" normalizeH="0" baseline="0" noProof="0" dirty="0">
+              <a:rPr kumimoji="0" lang="en-US" sz="1000" b="0" i="0" u="none" strike="noStrike" kern="1200" cap="none" spc="0" normalizeH="0" baseline="0" noProof="0" dirty="0">
                 <a:ln>
                   <a:noFill/>
                 </a:ln>
@@ -8343,9 +8321,9 @@
                 <a:ea typeface="+mn-ea"/>
                 <a:cs typeface="+mn-cs"/>
               </a:rPr>
-              <a:t>Properties</a:t>
-            </a:r>
-            <a:endParaRPr kumimoji="0" lang="en-GB" sz="1100" b="0" i="0" u="none" strike="noStrike" kern="1200" cap="none" spc="0" normalizeH="0" baseline="0" noProof="0" dirty="0">
+              <a:t>properties</a:t>
+            </a:r>
+            <a:endParaRPr kumimoji="0" lang="en-GB" sz="1000" b="0" i="0" u="none" strike="noStrike" kern="1200" cap="none" spc="0" normalizeH="0" baseline="0" noProof="0" dirty="0">
               <a:ln>
                 <a:noFill/>
               </a:ln>
@@ -8552,7 +8530,7 @@
                 <a:ea typeface="+mn-ea"/>
                 <a:cs typeface="+mn-cs"/>
               </a:rPr>
-              <a:t>Project Files *.</a:t>
+              <a:t>Project Build Files *.</a:t>
             </a:r>
             <a:r>
               <a:rPr kumimoji="0" lang="en-US" sz="1200" b="0" i="0" u="none" strike="noStrike" kern="1200" cap="none" spc="0" normalizeH="0" baseline="0" noProof="0" dirty="0" err="1">
@@ -8608,7 +8586,7 @@
                 <a:ea typeface="+mn-ea"/>
                 <a:cs typeface="+mn-cs"/>
               </a:rPr>
-              <a:t>for CMSIS Build</a:t>
+              <a:t>for CMSIS-Build</a:t>
             </a:r>
             <a:endParaRPr kumimoji="0" lang="en-GB" sz="1000" b="0" i="0" u="none" strike="noStrike" kern="1200" cap="none" spc="0" normalizeH="0" baseline="0" noProof="0" dirty="0">
               <a:ln>
@@ -8710,319 +8688,6 @@
           </a:p>
         </p:txBody>
       </p:sp>
-      <p:sp>
-        <p:nvSpPr>
-          <p:cNvPr id="34" name="TextBox 33">
-            <a:extLst>
-              <a:ext uri="{FF2B5EF4-FFF2-40B4-BE49-F238E27FC236}">
-                <a16:creationId xmlns:a16="http://schemas.microsoft.com/office/drawing/2014/main" id="{25F47231-4A7D-45B0-8E20-3DD0F0FF51BE}"/>
-              </a:ext>
-            </a:extLst>
-          </p:cNvPr>
-          <p:cNvSpPr txBox="1"/>
-          <p:nvPr/>
-        </p:nvSpPr>
-        <p:spPr>
-          <a:xfrm>
-            <a:off x="4707284" y="1373598"/>
-            <a:ext cx="1606216" cy="193899"/>
-          </a:xfrm>
-          <a:prstGeom prst="rect">
-            <a:avLst/>
-          </a:prstGeom>
-          <a:noFill/>
-        </p:spPr>
-        <p:txBody>
-          <a:bodyPr wrap="square" lIns="0" tIns="0" rIns="0" bIns="0" rtlCol="0">
-            <a:spAutoFit/>
-          </a:bodyPr>
-          <a:lstStyle/>
-          <a:p>
-            <a:pPr marL="0" marR="0" lvl="0" indent="0" algn="ctr" defTabSz="914400" rtl="0" eaLnBrk="1" fontAlgn="base" latinLnBrk="0" hangingPunct="1">
-              <a:lnSpc>
-                <a:spcPct val="90000"/>
-              </a:lnSpc>
-              <a:spcBef>
-                <a:spcPts val="0"/>
-              </a:spcBef>
-              <a:spcAft>
-                <a:spcPts val="600"/>
-              </a:spcAft>
-              <a:buClrTx/>
-              <a:buSzTx/>
-              <a:buFont typeface="Arial" panose="020B0604020202020204" pitchFamily="34" charset="0"/>
-              <a:buNone/>
-              <a:tabLst/>
-              <a:defRPr/>
-            </a:pPr>
-            <a:r>
-              <a:rPr kumimoji="0" lang="en-US" sz="1400" b="1" i="0" u="none" strike="noStrike" kern="1200" cap="none" spc="0" normalizeH="0" baseline="0" noProof="0" dirty="0">
-                <a:ln>
-                  <a:noFill/>
-                </a:ln>
-                <a:solidFill>
-                  <a:srgbClr val="333E48"/>
-                </a:solidFill>
-                <a:effectLst/>
-                <a:uLnTx/>
-                <a:uFillTx/>
-                <a:latin typeface="Calibri"/>
-                <a:ea typeface="ＭＳ Ｐゴシック" panose="020B0600070205080204" pitchFamily="34" charset="-128"/>
-                <a:cs typeface="+mn-cs"/>
-              </a:rPr>
-              <a:t>User Input Files</a:t>
-            </a:r>
-          </a:p>
-        </p:txBody>
-      </p:sp>
-      <p:sp>
-        <p:nvSpPr>
-          <p:cNvPr id="37" name="TextBox 36">
-            <a:extLst>
-              <a:ext uri="{FF2B5EF4-FFF2-40B4-BE49-F238E27FC236}">
-                <a16:creationId xmlns:a16="http://schemas.microsoft.com/office/drawing/2014/main" id="{73986861-8756-4870-AB76-3B5AD53B8E83}"/>
-              </a:ext>
-            </a:extLst>
-          </p:cNvPr>
-          <p:cNvSpPr txBox="1"/>
-          <p:nvPr/>
-        </p:nvSpPr>
-        <p:spPr>
-          <a:xfrm>
-            <a:off x="2153648" y="379300"/>
-            <a:ext cx="1606216" cy="193899"/>
-          </a:xfrm>
-          <a:prstGeom prst="rect">
-            <a:avLst/>
-          </a:prstGeom>
-          <a:noFill/>
-        </p:spPr>
-        <p:txBody>
-          <a:bodyPr wrap="square" lIns="0" tIns="0" rIns="0" bIns="0" rtlCol="0">
-            <a:spAutoFit/>
-          </a:bodyPr>
-          <a:lstStyle/>
-          <a:p>
-            <a:pPr marL="0" marR="0" lvl="0" indent="0" algn="ctr" defTabSz="914400" rtl="0" eaLnBrk="1" fontAlgn="base" latinLnBrk="0" hangingPunct="1">
-              <a:lnSpc>
-                <a:spcPct val="90000"/>
-              </a:lnSpc>
-              <a:spcBef>
-                <a:spcPts val="0"/>
-              </a:spcBef>
-              <a:spcAft>
-                <a:spcPts val="600"/>
-              </a:spcAft>
-              <a:buClrTx/>
-              <a:buSzTx/>
-              <a:buFont typeface="Arial" panose="020B0604020202020204" pitchFamily="34" charset="0"/>
-              <a:buNone/>
-              <a:tabLst/>
-              <a:defRPr/>
-            </a:pPr>
-            <a:r>
-              <a:rPr kumimoji="0" lang="en-US" sz="1400" b="1" i="0" u="none" strike="noStrike" kern="1200" cap="none" spc="0" normalizeH="0" baseline="0" noProof="0" dirty="0">
-                <a:ln>
-                  <a:noFill/>
-                </a:ln>
-                <a:solidFill>
-                  <a:srgbClr val="333E48"/>
-                </a:solidFill>
-                <a:effectLst/>
-                <a:uLnTx/>
-                <a:uFillTx/>
-                <a:latin typeface="Calibri"/>
-                <a:ea typeface="ＭＳ Ｐゴシック" panose="020B0600070205080204" pitchFamily="34" charset="-128"/>
-                <a:cs typeface="+mn-cs"/>
-              </a:rPr>
-              <a:t>Software Packs</a:t>
-            </a:r>
-          </a:p>
-        </p:txBody>
-      </p:sp>
-      <p:sp>
-        <p:nvSpPr>
-          <p:cNvPr id="38" name="Flowchart: Document 37">
-            <a:extLst>
-              <a:ext uri="{FF2B5EF4-FFF2-40B4-BE49-F238E27FC236}">
-                <a16:creationId xmlns:a16="http://schemas.microsoft.com/office/drawing/2014/main" id="{973775FC-78A5-4325-B535-441862918E54}"/>
-              </a:ext>
-            </a:extLst>
-          </p:cNvPr>
-          <p:cNvSpPr/>
-          <p:nvPr/>
-        </p:nvSpPr>
-        <p:spPr>
-          <a:xfrm>
-            <a:off x="5050566" y="274719"/>
-            <a:ext cx="1350233" cy="884321"/>
-          </a:xfrm>
-          <a:prstGeom prst="flowChartDocument">
-            <a:avLst/>
-          </a:prstGeom>
-          <a:solidFill>
-            <a:schemeClr val="accent1"/>
-          </a:solidFill>
-          <a:ln w="19050">
-            <a:solidFill>
-              <a:schemeClr val="tx1"/>
-            </a:solidFill>
-          </a:ln>
-        </p:spPr>
-        <p:style>
-          <a:lnRef idx="2">
-            <a:schemeClr val="accent1">
-              <a:shade val="50000"/>
-            </a:schemeClr>
-          </a:lnRef>
-          <a:fillRef idx="1">
-            <a:schemeClr val="accent1"/>
-          </a:fillRef>
-          <a:effectRef idx="0">
-            <a:schemeClr val="accent1"/>
-          </a:effectRef>
-          <a:fontRef idx="minor">
-            <a:schemeClr val="lt1"/>
-          </a:fontRef>
-        </p:style>
-        <p:txBody>
-          <a:bodyPr rtlCol="0" anchor="ctr"/>
-          <a:lstStyle/>
-          <a:p>
-            <a:pPr marL="0" marR="0" lvl="0" indent="0" algn="ctr" defTabSz="914400" rtl="0" eaLnBrk="0" fontAlgn="base" latinLnBrk="0" hangingPunct="0">
-              <a:lnSpc>
-                <a:spcPct val="100000"/>
-              </a:lnSpc>
-              <a:spcBef>
-                <a:spcPct val="0"/>
-              </a:spcBef>
-              <a:spcAft>
-                <a:spcPct val="0"/>
-              </a:spcAft>
-              <a:buClrTx/>
-              <a:buSzTx/>
-              <a:buFontTx/>
-              <a:buNone/>
-              <a:tabLst/>
-              <a:defRPr/>
-            </a:pPr>
-            <a:r>
-              <a:rPr kumimoji="0" lang="en-US" sz="1000" b="0" i="0" u="none" strike="noStrike" kern="1200" cap="none" spc="0" normalizeH="0" baseline="0" noProof="0" dirty="0">
-                <a:ln>
-                  <a:noFill/>
-                </a:ln>
-                <a:solidFill>
-                  <a:srgbClr val="FFFFFF"/>
-                </a:solidFill>
-                <a:effectLst/>
-                <a:uLnTx/>
-                <a:uFillTx/>
-                <a:latin typeface="Calibri"/>
-                <a:ea typeface="+mn-ea"/>
-                <a:cs typeface="+mn-cs"/>
-              </a:rPr>
-              <a:t>[default.]</a:t>
-            </a:r>
-            <a:r>
-              <a:rPr kumimoji="0" lang="en-US" sz="1000" b="0" i="0" u="none" strike="noStrike" kern="1200" cap="none" spc="0" normalizeH="0" baseline="0" noProof="0" dirty="0" err="1">
-                <a:ln>
-                  <a:noFill/>
-                </a:ln>
-                <a:solidFill>
-                  <a:srgbClr val="FFFFFF"/>
-                </a:solidFill>
-                <a:effectLst/>
-                <a:uLnTx/>
-                <a:uFillTx/>
-                <a:latin typeface="Calibri"/>
-                <a:ea typeface="+mn-ea"/>
-                <a:cs typeface="+mn-cs"/>
-              </a:rPr>
-              <a:t>csettings.yml</a:t>
-            </a:r>
-            <a:br>
-              <a:rPr kumimoji="0" lang="en-US" sz="1000" b="0" i="0" u="none" strike="noStrike" kern="1200" cap="none" spc="0" normalizeH="0" baseline="0" noProof="0" dirty="0">
-                <a:ln>
-                  <a:noFill/>
-                </a:ln>
-                <a:solidFill>
-                  <a:srgbClr val="FFFFFF"/>
-                </a:solidFill>
-                <a:effectLst/>
-                <a:uLnTx/>
-                <a:uFillTx/>
-                <a:latin typeface="Calibri"/>
-                <a:ea typeface="+mn-ea"/>
-                <a:cs typeface="+mn-cs"/>
-              </a:rPr>
-            </a:br>
-            <a:r>
-              <a:rPr kumimoji="0" lang="en-US" sz="1000" b="0" i="0" u="none" strike="noStrike" kern="1200" cap="none" spc="0" normalizeH="0" baseline="0" noProof="0" dirty="0">
-                <a:ln>
-                  <a:noFill/>
-                </a:ln>
-                <a:solidFill>
-                  <a:srgbClr val="FFFFFF"/>
-                </a:solidFill>
-                <a:effectLst/>
-                <a:uLnTx/>
-                <a:uFillTx/>
-                <a:latin typeface="Calibri"/>
-                <a:ea typeface="+mn-ea"/>
-                <a:cs typeface="+mn-cs"/>
-              </a:rPr>
-              <a:t>Global Settings</a:t>
-            </a:r>
-            <a:br>
-              <a:rPr kumimoji="0" lang="en-US" sz="1000" b="0" i="0" u="none" strike="noStrike" kern="1200" cap="none" spc="0" normalizeH="0" baseline="0" noProof="0" dirty="0">
-                <a:ln>
-                  <a:noFill/>
-                </a:ln>
-                <a:solidFill>
-                  <a:srgbClr val="FFFFFF"/>
-                </a:solidFill>
-                <a:effectLst/>
-                <a:uLnTx/>
-                <a:uFillTx/>
-                <a:latin typeface="Calibri"/>
-                <a:ea typeface="+mn-ea"/>
-                <a:cs typeface="+mn-cs"/>
-              </a:rPr>
-            </a:br>
-            <a:r>
-              <a:rPr kumimoji="0" lang="en-US" sz="1000" b="0" i="0" u="none" strike="noStrike" kern="1200" cap="none" spc="0" normalizeH="0" baseline="0" noProof="0" dirty="0">
-                <a:ln>
-                  <a:noFill/>
-                </a:ln>
-                <a:solidFill>
-                  <a:srgbClr val="FFFFFF"/>
-                </a:solidFill>
-                <a:effectLst/>
-                <a:uLnTx/>
-                <a:uFillTx/>
-                <a:latin typeface="Calibri"/>
-                <a:ea typeface="+mn-ea"/>
-                <a:cs typeface="+mn-cs"/>
-              </a:rPr>
-              <a:t>(Toolchain, Device)</a:t>
-            </a:r>
-            <a:endParaRPr kumimoji="0" lang="en-GB" sz="1000" b="0" i="0" u="none" strike="noStrike" kern="1200" cap="none" spc="0" normalizeH="0" baseline="0" noProof="0" dirty="0">
-              <a:ln>
-                <a:noFill/>
-              </a:ln>
-              <a:solidFill>
-                <a:srgbClr val="FFFFFF"/>
-              </a:solidFill>
-              <a:effectLst/>
-              <a:uLnTx/>
-              <a:uFillTx/>
-              <a:latin typeface="Calibri"/>
-              <a:ea typeface="+mn-ea"/>
-              <a:cs typeface="+mn-cs"/>
-            </a:endParaRPr>
-          </a:p>
-        </p:txBody>
-      </p:sp>
       <p:cxnSp>
         <p:nvCxnSpPr>
           <p:cNvPr id="41" name="Straight Arrow Connector 40">
@@ -9039,7 +8704,7 @@
         </p:nvCxnSpPr>
         <p:spPr>
           <a:xfrm>
-            <a:off x="5719099" y="1048751"/>
+            <a:off x="5722046" y="953351"/>
             <a:ext cx="0" cy="276726"/>
           </a:xfrm>
           <a:prstGeom prst="straightConnector1">
@@ -9323,7 +8988,7 @@
               <a:defRPr/>
             </a:pPr>
             <a:r>
-              <a:rPr kumimoji="0" lang="en-US" sz="1000" b="0" i="0" u="none" strike="noStrike" kern="1200" cap="none" spc="0" normalizeH="0" baseline="0" noProof="0" dirty="0">
+              <a:rPr kumimoji="0" lang="en-US" sz="1200" b="0" i="0" u="none" strike="noStrike" kern="1200" cap="none" spc="0" normalizeH="0" baseline="0" noProof="0" dirty="0">
                 <a:ln>
                   <a:noFill/>
                 </a:ln>
@@ -9342,7 +9007,7 @@
               <a:t>Project Resource Files *.</a:t>
             </a:r>
             <a:r>
-              <a:rPr kumimoji="0" lang="en-US" sz="1000" b="0" i="0" u="none" strike="noStrike" kern="1200" cap="none" spc="0" normalizeH="0" baseline="0" noProof="0" dirty="0" err="1">
+              <a:rPr kumimoji="0" lang="en-US" sz="1200" b="0" i="0" u="none" strike="noStrike" kern="1200" cap="none" spc="0" normalizeH="0" baseline="0" noProof="0" dirty="0" err="1">
                 <a:ln>
                   <a:noFill/>
                 </a:ln>
@@ -9413,71 +9078,6 @@
               <a:ea typeface="+mn-ea"/>
               <a:cs typeface="+mn-cs"/>
             </a:endParaRPr>
-          </a:p>
-        </p:txBody>
-      </p:sp>
-      <p:sp>
-        <p:nvSpPr>
-          <p:cNvPr id="30" name="TextBox 29">
-            <a:extLst>
-              <a:ext uri="{FF2B5EF4-FFF2-40B4-BE49-F238E27FC236}">
-                <a16:creationId xmlns:a16="http://schemas.microsoft.com/office/drawing/2014/main" id="{C20996E9-1DB5-4A9B-982F-7AE5E0FAF344}"/>
-              </a:ext>
-            </a:extLst>
-          </p:cNvPr>
-          <p:cNvSpPr txBox="1"/>
-          <p:nvPr/>
-        </p:nvSpPr>
-        <p:spPr>
-          <a:xfrm>
-            <a:off x="8992484" y="1309998"/>
-            <a:ext cx="1606216" cy="193899"/>
-          </a:xfrm>
-          <a:prstGeom prst="rect">
-            <a:avLst/>
-          </a:prstGeom>
-          <a:noFill/>
-        </p:spPr>
-        <p:txBody>
-          <a:bodyPr wrap="square" lIns="0" tIns="0" rIns="0" bIns="0" rtlCol="0">
-            <a:spAutoFit/>
-          </a:bodyPr>
-          <a:lstStyle/>
-          <a:p>
-            <a:pPr marL="0" marR="0" lvl="0" indent="0" algn="ctr" defTabSz="914400" rtl="0" eaLnBrk="1" fontAlgn="base" latinLnBrk="0" hangingPunct="1">
-              <a:lnSpc>
-                <a:spcPct val="90000"/>
-              </a:lnSpc>
-              <a:spcBef>
-                <a:spcPts val="0"/>
-              </a:spcBef>
-              <a:spcAft>
-                <a:spcPts val="600"/>
-              </a:spcAft>
-              <a:buClrTx/>
-              <a:buSzTx/>
-              <a:buFont typeface="Arial" panose="020B0604020202020204" pitchFamily="34" charset="0"/>
-              <a:buNone/>
-              <a:tabLst/>
-              <a:defRPr/>
-            </a:pPr>
-            <a:r>
-              <a:rPr kumimoji="0" lang="en-US" sz="1400" b="1" i="0" u="none" strike="noStrike" kern="1200" cap="none" spc="0" normalizeH="0" baseline="0" noProof="0" dirty="0">
-                <a:ln>
-                  <a:noFill/>
-                </a:ln>
-                <a:solidFill>
-                  <a:srgbClr val="333E48"/>
-                </a:solidFill>
-                <a:effectLst/>
-                <a:uLnTx/>
-                <a:uFillTx/>
-                <a:latin typeface="Calibri"/>
-                <a:ea typeface="ＭＳ Ｐゴシック" panose="020B0600070205080204" pitchFamily="34" charset="-128"/>
-                <a:cs typeface="+mn-cs"/>
-              </a:rPr>
-              <a:t>Output Files</a:t>
-            </a:r>
           </a:p>
         </p:txBody>
       </p:sp>
@@ -9546,6 +9146,437 @@
               <a:defRPr/>
             </a:pPr>
             <a:endParaRPr kumimoji="0" lang="en-GB" sz="1800" b="0" i="0" u="none" strike="noStrike" kern="1200" cap="none" spc="0" normalizeH="0" baseline="0" noProof="0">
+              <a:ln>
+                <a:noFill/>
+              </a:ln>
+              <a:solidFill>
+                <a:srgbClr val="FFFFFF"/>
+              </a:solidFill>
+              <a:effectLst/>
+              <a:uLnTx/>
+              <a:uFillTx/>
+              <a:latin typeface="Calibri"/>
+              <a:ea typeface="+mn-ea"/>
+              <a:cs typeface="+mn-cs"/>
+            </a:endParaRPr>
+          </a:p>
+        </p:txBody>
+      </p:sp>
+      <p:sp>
+        <p:nvSpPr>
+          <p:cNvPr id="2" name="Oval 1">
+            <a:extLst>
+              <a:ext uri="{FF2B5EF4-FFF2-40B4-BE49-F238E27FC236}">
+                <a16:creationId xmlns:a16="http://schemas.microsoft.com/office/drawing/2014/main" id="{5E657FDB-C487-44EF-8E7D-F8175C5B588B}"/>
+              </a:ext>
+            </a:extLst>
+          </p:cNvPr>
+          <p:cNvSpPr/>
+          <p:nvPr/>
+        </p:nvSpPr>
+        <p:spPr>
+          <a:xfrm>
+            <a:off x="4658702" y="94719"/>
+            <a:ext cx="360000" cy="360000"/>
+          </a:xfrm>
+          <a:prstGeom prst="ellipse">
+            <a:avLst/>
+          </a:prstGeom>
+          <a:solidFill>
+            <a:schemeClr val="accent1"/>
+          </a:solidFill>
+          <a:ln>
+            <a:noFill/>
+          </a:ln>
+        </p:spPr>
+        <p:style>
+          <a:lnRef idx="2">
+            <a:schemeClr val="accent1">
+              <a:shade val="50000"/>
+            </a:schemeClr>
+          </a:lnRef>
+          <a:fillRef idx="1">
+            <a:schemeClr val="accent1"/>
+          </a:fillRef>
+          <a:effectRef idx="0">
+            <a:schemeClr val="accent1"/>
+          </a:effectRef>
+          <a:fontRef idx="minor">
+            <a:schemeClr val="lt1"/>
+          </a:fontRef>
+        </p:style>
+        <p:txBody>
+          <a:bodyPr rtlCol="0" anchor="ctr"/>
+          <a:lstStyle/>
+          <a:p>
+            <a:pPr algn="ctr"/>
+            <a:r>
+              <a:rPr lang="en-US" dirty="0">
+                <a:latin typeface="Calibri" panose="020F0502020204030204" pitchFamily="34" charset="0"/>
+                <a:cs typeface="Calibri" panose="020F0502020204030204" pitchFamily="34" charset="0"/>
+              </a:rPr>
+              <a:t>1</a:t>
+            </a:r>
+            <a:endParaRPr lang="en-GB" dirty="0">
+              <a:latin typeface="Calibri" panose="020F0502020204030204" pitchFamily="34" charset="0"/>
+              <a:cs typeface="Calibri" panose="020F0502020204030204" pitchFamily="34" charset="0"/>
+            </a:endParaRPr>
+          </a:p>
+        </p:txBody>
+      </p:sp>
+      <p:sp>
+        <p:nvSpPr>
+          <p:cNvPr id="27" name="Oval 26">
+            <a:extLst>
+              <a:ext uri="{FF2B5EF4-FFF2-40B4-BE49-F238E27FC236}">
+                <a16:creationId xmlns:a16="http://schemas.microsoft.com/office/drawing/2014/main" id="{81407B11-6AFE-4D8A-B305-BE0AABD77969}"/>
+              </a:ext>
+            </a:extLst>
+          </p:cNvPr>
+          <p:cNvSpPr/>
+          <p:nvPr/>
+        </p:nvSpPr>
+        <p:spPr>
+          <a:xfrm>
+            <a:off x="4658702" y="1458298"/>
+            <a:ext cx="360000" cy="360000"/>
+          </a:xfrm>
+          <a:prstGeom prst="ellipse">
+            <a:avLst/>
+          </a:prstGeom>
+          <a:solidFill>
+            <a:schemeClr val="accent1"/>
+          </a:solidFill>
+          <a:ln>
+            <a:noFill/>
+          </a:ln>
+        </p:spPr>
+        <p:style>
+          <a:lnRef idx="2">
+            <a:schemeClr val="accent1">
+              <a:shade val="50000"/>
+            </a:schemeClr>
+          </a:lnRef>
+          <a:fillRef idx="1">
+            <a:schemeClr val="accent1"/>
+          </a:fillRef>
+          <a:effectRef idx="0">
+            <a:schemeClr val="accent1"/>
+          </a:effectRef>
+          <a:fontRef idx="minor">
+            <a:schemeClr val="lt1"/>
+          </a:fontRef>
+        </p:style>
+        <p:txBody>
+          <a:bodyPr rtlCol="0" anchor="ctr"/>
+          <a:lstStyle/>
+          <a:p>
+            <a:pPr algn="ctr"/>
+            <a:r>
+              <a:rPr lang="en-US" dirty="0">
+                <a:latin typeface="Calibri" panose="020F0502020204030204" pitchFamily="34" charset="0"/>
+                <a:cs typeface="Calibri" panose="020F0502020204030204" pitchFamily="34" charset="0"/>
+              </a:rPr>
+              <a:t>2</a:t>
+            </a:r>
+            <a:endParaRPr lang="en-GB" dirty="0">
+              <a:latin typeface="Calibri" panose="020F0502020204030204" pitchFamily="34" charset="0"/>
+              <a:cs typeface="Calibri" panose="020F0502020204030204" pitchFamily="34" charset="0"/>
+            </a:endParaRPr>
+          </a:p>
+        </p:txBody>
+      </p:sp>
+      <p:sp>
+        <p:nvSpPr>
+          <p:cNvPr id="33" name="Oval 32">
+            <a:extLst>
+              <a:ext uri="{FF2B5EF4-FFF2-40B4-BE49-F238E27FC236}">
+                <a16:creationId xmlns:a16="http://schemas.microsoft.com/office/drawing/2014/main" id="{589149B6-4311-43B0-8FA0-27944C657D0D}"/>
+              </a:ext>
+            </a:extLst>
+          </p:cNvPr>
+          <p:cNvSpPr/>
+          <p:nvPr/>
+        </p:nvSpPr>
+        <p:spPr>
+          <a:xfrm>
+            <a:off x="4655694" y="2754123"/>
+            <a:ext cx="360000" cy="360000"/>
+          </a:xfrm>
+          <a:prstGeom prst="ellipse">
+            <a:avLst/>
+          </a:prstGeom>
+          <a:solidFill>
+            <a:schemeClr val="accent1"/>
+          </a:solidFill>
+          <a:ln>
+            <a:noFill/>
+          </a:ln>
+        </p:spPr>
+        <p:style>
+          <a:lnRef idx="2">
+            <a:schemeClr val="accent1">
+              <a:shade val="50000"/>
+            </a:schemeClr>
+          </a:lnRef>
+          <a:fillRef idx="1">
+            <a:schemeClr val="accent1"/>
+          </a:fillRef>
+          <a:effectRef idx="0">
+            <a:schemeClr val="accent1"/>
+          </a:effectRef>
+          <a:fontRef idx="minor">
+            <a:schemeClr val="lt1"/>
+          </a:fontRef>
+        </p:style>
+        <p:txBody>
+          <a:bodyPr rtlCol="0" anchor="ctr"/>
+          <a:lstStyle/>
+          <a:p>
+            <a:pPr algn="ctr"/>
+            <a:r>
+              <a:rPr lang="en-US" dirty="0">
+                <a:latin typeface="Calibri" panose="020F0502020204030204" pitchFamily="34" charset="0"/>
+                <a:cs typeface="Calibri" panose="020F0502020204030204" pitchFamily="34" charset="0"/>
+              </a:rPr>
+              <a:t>3</a:t>
+            </a:r>
+            <a:endParaRPr lang="en-GB" dirty="0">
+              <a:latin typeface="Calibri" panose="020F0502020204030204" pitchFamily="34" charset="0"/>
+              <a:cs typeface="Calibri" panose="020F0502020204030204" pitchFamily="34" charset="0"/>
+            </a:endParaRPr>
+          </a:p>
+        </p:txBody>
+      </p:sp>
+      <p:sp>
+        <p:nvSpPr>
+          <p:cNvPr id="35" name="Oval 34">
+            <a:extLst>
+              <a:ext uri="{FF2B5EF4-FFF2-40B4-BE49-F238E27FC236}">
+                <a16:creationId xmlns:a16="http://schemas.microsoft.com/office/drawing/2014/main" id="{46A578CD-9EE0-408B-A678-0EFB17AD42CF}"/>
+              </a:ext>
+            </a:extLst>
+          </p:cNvPr>
+          <p:cNvSpPr/>
+          <p:nvPr/>
+        </p:nvSpPr>
+        <p:spPr>
+          <a:xfrm>
+            <a:off x="4655694" y="3963001"/>
+            <a:ext cx="360000" cy="360000"/>
+          </a:xfrm>
+          <a:prstGeom prst="ellipse">
+            <a:avLst/>
+          </a:prstGeom>
+          <a:solidFill>
+            <a:schemeClr val="accent1"/>
+          </a:solidFill>
+          <a:ln>
+            <a:noFill/>
+          </a:ln>
+        </p:spPr>
+        <p:style>
+          <a:lnRef idx="2">
+            <a:schemeClr val="accent1">
+              <a:shade val="50000"/>
+            </a:schemeClr>
+          </a:lnRef>
+          <a:fillRef idx="1">
+            <a:schemeClr val="accent1"/>
+          </a:fillRef>
+          <a:effectRef idx="0">
+            <a:schemeClr val="accent1"/>
+          </a:effectRef>
+          <a:fontRef idx="minor">
+            <a:schemeClr val="lt1"/>
+          </a:fontRef>
+        </p:style>
+        <p:txBody>
+          <a:bodyPr rtlCol="0" anchor="ctr"/>
+          <a:lstStyle/>
+          <a:p>
+            <a:pPr algn="ctr"/>
+            <a:r>
+              <a:rPr lang="en-US" dirty="0">
+                <a:latin typeface="Calibri" panose="020F0502020204030204" pitchFamily="34" charset="0"/>
+                <a:cs typeface="Calibri" panose="020F0502020204030204" pitchFamily="34" charset="0"/>
+              </a:rPr>
+              <a:t>4</a:t>
+            </a:r>
+            <a:endParaRPr lang="en-GB" dirty="0">
+              <a:latin typeface="Calibri" panose="020F0502020204030204" pitchFamily="34" charset="0"/>
+              <a:cs typeface="Calibri" panose="020F0502020204030204" pitchFamily="34" charset="0"/>
+            </a:endParaRPr>
+          </a:p>
+        </p:txBody>
+      </p:sp>
+      <p:sp>
+        <p:nvSpPr>
+          <p:cNvPr id="38" name="Flowchart: Document 37">
+            <a:extLst>
+              <a:ext uri="{FF2B5EF4-FFF2-40B4-BE49-F238E27FC236}">
+                <a16:creationId xmlns:a16="http://schemas.microsoft.com/office/drawing/2014/main" id="{973775FC-78A5-4325-B535-441862918E54}"/>
+              </a:ext>
+            </a:extLst>
+          </p:cNvPr>
+          <p:cNvSpPr/>
+          <p:nvPr/>
+        </p:nvSpPr>
+        <p:spPr>
+          <a:xfrm>
+            <a:off x="5050566" y="274719"/>
+            <a:ext cx="1350233" cy="768017"/>
+          </a:xfrm>
+          <a:prstGeom prst="flowChartDocument">
+            <a:avLst/>
+          </a:prstGeom>
+          <a:solidFill>
+            <a:schemeClr val="accent1"/>
+          </a:solidFill>
+          <a:ln w="19050">
+            <a:solidFill>
+              <a:schemeClr val="tx1"/>
+            </a:solidFill>
+          </a:ln>
+        </p:spPr>
+        <p:style>
+          <a:lnRef idx="2">
+            <a:schemeClr val="accent1">
+              <a:shade val="50000"/>
+            </a:schemeClr>
+          </a:lnRef>
+          <a:fillRef idx="1">
+            <a:schemeClr val="accent1"/>
+          </a:fillRef>
+          <a:effectRef idx="0">
+            <a:schemeClr val="accent1"/>
+          </a:effectRef>
+          <a:fontRef idx="minor">
+            <a:schemeClr val="lt1"/>
+          </a:fontRef>
+        </p:style>
+        <p:txBody>
+          <a:bodyPr rtlCol="0" anchor="ctr"/>
+          <a:lstStyle/>
+          <a:p>
+            <a:pPr marL="0" marR="0" lvl="0" indent="0" algn="ctr" defTabSz="914400" rtl="0" eaLnBrk="0" fontAlgn="base" latinLnBrk="0" hangingPunct="0">
+              <a:lnSpc>
+                <a:spcPct val="100000"/>
+              </a:lnSpc>
+              <a:spcBef>
+                <a:spcPct val="0"/>
+              </a:spcBef>
+              <a:spcAft>
+                <a:spcPct val="0"/>
+              </a:spcAft>
+              <a:buClrTx/>
+              <a:buSzTx/>
+              <a:buFontTx/>
+              <a:buNone/>
+              <a:tabLst/>
+              <a:defRPr/>
+            </a:pPr>
+            <a:r>
+              <a:rPr kumimoji="0" lang="en-US" sz="1200" b="0" i="0" u="none" strike="noStrike" kern="1200" cap="none" spc="0" normalizeH="0" baseline="0" noProof="0" dirty="0">
+                <a:ln>
+                  <a:noFill/>
+                </a:ln>
+                <a:solidFill>
+                  <a:srgbClr val="FFFFFF"/>
+                </a:solidFill>
+                <a:effectLst/>
+                <a:uLnTx/>
+                <a:uFillTx/>
+                <a:latin typeface="Calibri"/>
+                <a:ea typeface="+mn-ea"/>
+                <a:cs typeface="+mn-cs"/>
+              </a:rPr>
+              <a:t>*.</a:t>
+            </a:r>
+            <a:r>
+              <a:rPr kumimoji="0" lang="en-US" sz="1200" b="0" i="0" u="none" strike="noStrike" kern="1200" cap="none" spc="0" normalizeH="0" baseline="0" noProof="0" dirty="0" err="1">
+                <a:ln>
+                  <a:noFill/>
+                </a:ln>
+                <a:solidFill>
+                  <a:srgbClr val="FFFFFF"/>
+                </a:solidFill>
+                <a:effectLst/>
+                <a:uLnTx/>
+                <a:uFillTx/>
+                <a:latin typeface="Calibri"/>
+                <a:ea typeface="+mn-ea"/>
+                <a:cs typeface="+mn-cs"/>
+              </a:rPr>
+              <a:t>csettings.yml</a:t>
+            </a:r>
+            <a:br>
+              <a:rPr kumimoji="0" lang="en-US" sz="1000" b="0" i="0" u="none" strike="noStrike" kern="1200" cap="none" spc="0" normalizeH="0" baseline="0" noProof="0" dirty="0">
+                <a:ln>
+                  <a:noFill/>
+                </a:ln>
+                <a:solidFill>
+                  <a:srgbClr val="FFFFFF"/>
+                </a:solidFill>
+                <a:effectLst/>
+                <a:uLnTx/>
+                <a:uFillTx/>
+                <a:latin typeface="Calibri"/>
+                <a:ea typeface="+mn-ea"/>
+                <a:cs typeface="+mn-cs"/>
+              </a:rPr>
+            </a:br>
+            <a:r>
+              <a:rPr kumimoji="0" lang="en-US" sz="1000" b="0" i="0" u="none" strike="noStrike" kern="1200" cap="none" spc="0" normalizeH="0" baseline="0" noProof="0" dirty="0">
+                <a:ln>
+                  <a:noFill/>
+                </a:ln>
+                <a:solidFill>
+                  <a:srgbClr val="FFFFFF"/>
+                </a:solidFill>
+                <a:effectLst/>
+                <a:uLnTx/>
+                <a:uFillTx/>
+                <a:latin typeface="Calibri"/>
+                <a:ea typeface="+mn-ea"/>
+                <a:cs typeface="+mn-cs"/>
+              </a:rPr>
+              <a:t>Global Settings</a:t>
+            </a:r>
+            <a:br>
+              <a:rPr kumimoji="0" lang="en-US" sz="1000" b="0" i="0" u="none" strike="noStrike" kern="1200" cap="none" spc="0" normalizeH="0" baseline="0" noProof="0" dirty="0">
+                <a:ln>
+                  <a:noFill/>
+                </a:ln>
+                <a:solidFill>
+                  <a:srgbClr val="FFFFFF"/>
+                </a:solidFill>
+                <a:effectLst/>
+                <a:uLnTx/>
+                <a:uFillTx/>
+                <a:latin typeface="Calibri"/>
+                <a:ea typeface="+mn-ea"/>
+                <a:cs typeface="+mn-cs"/>
+              </a:rPr>
+            </a:br>
+            <a:r>
+              <a:rPr kumimoji="0" lang="en-US" sz="1000" b="0" i="0" u="none" strike="noStrike" kern="1200" cap="none" spc="0" normalizeH="0" baseline="0" noProof="0" dirty="0">
+                <a:ln>
+                  <a:noFill/>
+                </a:ln>
+                <a:solidFill>
+                  <a:srgbClr val="FFFFFF"/>
+                </a:solidFill>
+                <a:effectLst/>
+                <a:uLnTx/>
+                <a:uFillTx/>
+                <a:latin typeface="Calibri"/>
+                <a:ea typeface="+mn-ea"/>
+                <a:cs typeface="+mn-cs"/>
+              </a:rPr>
+              <a:t>(Toolchain, Device)</a:t>
+            </a:r>
+            <a:endParaRPr kumimoji="0" lang="en-GB" sz="1000" b="0" i="0" u="none" strike="noStrike" kern="1200" cap="none" spc="0" normalizeH="0" baseline="0" noProof="0" dirty="0">
               <a:ln>
                 <a:noFill/>
               </a:ln>

</xml_diff>

<commit_message>
Manual Updates to reflect current status
</commit_message>
<xml_diff>
--- a/tools/projmgr/docs/Manual/images/overview.pptx
+++ b/tools/projmgr/docs/Manual/images/overview.pptx
@@ -296,7 +296,7 @@
           <a:p>
             <a:fld id="{008FFADC-39A7-449E-8C68-8776E6FB3C1A}" type="datetimeFigureOut">
               <a:rPr lang="en-GB" smtClean="0"/>
-              <a:t>24/03/2022</a:t>
+              <a:t>08/06/2022</a:t>
             </a:fld>
             <a:endParaRPr lang="en-GB"/>
           </a:p>
@@ -473,7 +473,7 @@
           <a:p>
             <a:fld id="{30B9BAAB-B703-4BB5-9D08-B460FC03C23A}" type="datetimeFigureOut">
               <a:rPr lang="en-GB" smtClean="0"/>
-              <a:t>24/03/2022</a:t>
+              <a:t>08/06/2022</a:t>
             </a:fld>
             <a:endParaRPr lang="en-GB"/>
           </a:p>
@@ -7279,7 +7279,7 @@
           </a:fontRef>
         </p:style>
         <p:txBody>
-          <a:bodyPr rtlCol="0" anchor="ctr"/>
+          <a:bodyPr lIns="0" rIns="0" rtlCol="0" anchor="ctr"/>
           <a:lstStyle/>
           <a:p>
             <a:pPr marL="0" marR="0" lvl="0" indent="0" algn="ctr" defTabSz="914400" rtl="0" eaLnBrk="0" fontAlgn="base" latinLnBrk="0" hangingPunct="0">
@@ -7372,7 +7372,7 @@
                 <a:ea typeface="+mn-ea"/>
                 <a:cs typeface="+mn-cs"/>
               </a:rPr>
-              <a:t>Defines Target Application</a:t>
+              <a:t>Target (Device, Board) Build (Debug, Release) </a:t>
             </a:r>
             <a:endParaRPr kumimoji="0" lang="en-GB" sz="1000" b="0" i="0" u="none" strike="noStrike" kern="1200" cap="none" spc="0" normalizeH="0" baseline="0" noProof="0" dirty="0">
               <a:ln>
@@ -9508,7 +9508,7 @@
                 <a:ea typeface="+mn-ea"/>
                 <a:cs typeface="+mn-cs"/>
               </a:rPr>
-              <a:t>csettings.yml</a:t>
+              <a:t>cdefault.yml</a:t>
             </a:r>
             <a:br>
               <a:rPr kumimoji="0" lang="en-US" sz="1000" b="0" i="0" u="none" strike="noStrike" kern="1200" cap="none" spc="0" normalizeH="0" baseline="0" noProof="0" dirty="0">
@@ -9574,7 +9574,7 @@
                 <a:ea typeface="+mn-ea"/>
                 <a:cs typeface="+mn-cs"/>
               </a:rPr>
-              <a:t>(Toolchain, Device)</a:t>
+              <a:t>(Toolchain)</a:t>
             </a:r>
             <a:endParaRPr kumimoji="0" lang="en-GB" sz="1000" b="0" i="0" u="none" strike="noStrike" kern="1200" cap="none" spc="0" normalizeH="0" baseline="0" noProof="0" dirty="0">
               <a:ln>

</xml_diff>

<commit_message>
Generator Proposal reworked (now it separate *.MD file)
</commit_message>
<xml_diff>
--- a/tools/projmgr/docs/Manual/images/overview.pptx
+++ b/tools/projmgr/docs/Manual/images/overview.pptx
@@ -5,18 +5,19 @@
     <p:sldMasterId id="2147483661" r:id="rId1"/>
   </p:sldMasterIdLst>
   <p:notesMasterIdLst>
-    <p:notesMasterId r:id="rId8"/>
+    <p:notesMasterId r:id="rId9"/>
   </p:notesMasterIdLst>
   <p:handoutMasterIdLst>
-    <p:handoutMasterId r:id="rId9"/>
+    <p:handoutMasterId r:id="rId10"/>
   </p:handoutMasterIdLst>
   <p:sldIdLst>
     <p:sldId id="345" r:id="rId2"/>
-    <p:sldId id="14964" r:id="rId3"/>
-    <p:sldId id="14961" r:id="rId4"/>
-    <p:sldId id="14942" r:id="rId5"/>
-    <p:sldId id="14535" r:id="rId6"/>
-    <p:sldId id="14965" r:id="rId7"/>
+    <p:sldId id="14966" r:id="rId3"/>
+    <p:sldId id="14964" r:id="rId4"/>
+    <p:sldId id="14961" r:id="rId5"/>
+    <p:sldId id="14942" r:id="rId6"/>
+    <p:sldId id="14535" r:id="rId7"/>
+    <p:sldId id="14965" r:id="rId8"/>
   </p:sldIdLst>
   <p:sldSz cx="12192000" cy="6858000"/>
   <p:notesSz cx="6858000" cy="9144000"/>
@@ -296,7 +297,7 @@
           <a:p>
             <a:fld id="{008FFADC-39A7-449E-8C68-8776E6FB3C1A}" type="datetimeFigureOut">
               <a:rPr lang="en-GB" smtClean="0"/>
-              <a:t>08/06/2022</a:t>
+              <a:t>13/09/2022</a:t>
             </a:fld>
             <a:endParaRPr lang="en-GB"/>
           </a:p>
@@ -473,7 +474,7 @@
           <a:p>
             <a:fld id="{30B9BAAB-B703-4BB5-9D08-B460FC03C23A}" type="datetimeFigureOut">
               <a:rPr lang="en-GB" smtClean="0"/>
-              <a:t>08/06/2022</a:t>
+              <a:t>13/09/2022</a:t>
             </a:fld>
             <a:endParaRPr lang="en-GB"/>
           </a:p>
@@ -1680,7 +1681,7 @@
               <a:pPr>
                 <a:defRPr/>
               </a:pPr>
-              <a:t>3</a:t>
+              <a:t>4</a:t>
             </a:fld>
             <a:endParaRPr lang="en-US" altLang="en-US"/>
           </a:p>
@@ -1770,7 +1771,7 @@
               <a:pPr>
                 <a:defRPr/>
               </a:pPr>
-              <a:t>5</a:t>
+              <a:t>6</a:t>
             </a:fld>
             <a:endParaRPr lang="en-US" altLang="en-US"/>
           </a:p>
@@ -9625,6 +9626,3786 @@
       </p:grpSpPr>
       <p:sp>
         <p:nvSpPr>
+          <p:cNvPr id="29" name="Rectangle 28">
+            <a:extLst>
+              <a:ext uri="{FF2B5EF4-FFF2-40B4-BE49-F238E27FC236}">
+                <a16:creationId xmlns:a16="http://schemas.microsoft.com/office/drawing/2014/main" id="{EC3CC268-843C-42DC-9FAB-259824F90297}"/>
+              </a:ext>
+            </a:extLst>
+          </p:cNvPr>
+          <p:cNvSpPr/>
+          <p:nvPr/>
+        </p:nvSpPr>
+        <p:spPr>
+          <a:xfrm>
+            <a:off x="9273600" y="743902"/>
+            <a:ext cx="1786690" cy="5714048"/>
+          </a:xfrm>
+          <a:prstGeom prst="rect">
+            <a:avLst/>
+          </a:prstGeom>
+          <a:solidFill>
+            <a:schemeClr val="accent5">
+              <a:lumMod val="40000"/>
+              <a:lumOff val="60000"/>
+              <a:alpha val="50196"/>
+            </a:schemeClr>
+          </a:solidFill>
+          <a:ln>
+            <a:noFill/>
+          </a:ln>
+        </p:spPr>
+        <p:style>
+          <a:lnRef idx="2">
+            <a:schemeClr val="accent1">
+              <a:shade val="50000"/>
+            </a:schemeClr>
+          </a:lnRef>
+          <a:fillRef idx="1">
+            <a:schemeClr val="accent1"/>
+          </a:fillRef>
+          <a:effectRef idx="0">
+            <a:schemeClr val="accent1"/>
+          </a:effectRef>
+          <a:fontRef idx="minor">
+            <a:schemeClr val="lt1"/>
+          </a:fontRef>
+        </p:style>
+        <p:txBody>
+          <a:bodyPr rtlCol="0" anchor="t"/>
+          <a:lstStyle/>
+          <a:p>
+            <a:pPr algn="ctr" eaLnBrk="0" fontAlgn="base" hangingPunct="0">
+              <a:spcBef>
+                <a:spcPct val="0"/>
+              </a:spcBef>
+              <a:spcAft>
+                <a:spcPct val="0"/>
+              </a:spcAft>
+              <a:defRPr/>
+            </a:pPr>
+            <a:r>
+              <a:rPr kumimoji="0" lang="en-US" sz="1800" b="1" i="0" u="none" strike="noStrike" kern="1200" cap="none" spc="0" normalizeH="0" baseline="0" noProof="0" dirty="0">
+                <a:ln>
+                  <a:noFill/>
+                </a:ln>
+                <a:solidFill>
+                  <a:srgbClr val="333E48"/>
+                </a:solidFill>
+                <a:effectLst/>
+                <a:uLnTx/>
+                <a:uFillTx/>
+                <a:latin typeface="Calibri"/>
+                <a:ea typeface="ＭＳ Ｐゴシック" panose="020B0600070205080204" pitchFamily="34" charset="-128"/>
+                <a:cs typeface="+mn-cs"/>
+              </a:rPr>
+              <a:t>Output Files</a:t>
+            </a:r>
+          </a:p>
+        </p:txBody>
+      </p:sp>
+      <p:sp>
+        <p:nvSpPr>
+          <p:cNvPr id="26" name="Arrow: Right 25">
+            <a:extLst>
+              <a:ext uri="{FF2B5EF4-FFF2-40B4-BE49-F238E27FC236}">
+                <a16:creationId xmlns:a16="http://schemas.microsoft.com/office/drawing/2014/main" id="{553DF65A-F969-41EF-89B5-09CAFF0CC328}"/>
+              </a:ext>
+            </a:extLst>
+          </p:cNvPr>
+          <p:cNvSpPr/>
+          <p:nvPr/>
+        </p:nvSpPr>
+        <p:spPr>
+          <a:xfrm>
+            <a:off x="4078708" y="3350792"/>
+            <a:ext cx="3146258" cy="204537"/>
+          </a:xfrm>
+          <a:prstGeom prst="rightArrow">
+            <a:avLst/>
+          </a:prstGeom>
+          <a:solidFill>
+            <a:schemeClr val="accent1"/>
+          </a:solidFill>
+          <a:ln>
+            <a:noFill/>
+          </a:ln>
+        </p:spPr>
+        <p:style>
+          <a:lnRef idx="2">
+            <a:schemeClr val="accent1">
+              <a:shade val="50000"/>
+            </a:schemeClr>
+          </a:lnRef>
+          <a:fillRef idx="1">
+            <a:schemeClr val="accent1"/>
+          </a:fillRef>
+          <a:effectRef idx="0">
+            <a:schemeClr val="accent1"/>
+          </a:effectRef>
+          <a:fontRef idx="minor">
+            <a:schemeClr val="lt1"/>
+          </a:fontRef>
+        </p:style>
+        <p:txBody>
+          <a:bodyPr rtlCol="0" anchor="ctr"/>
+          <a:lstStyle/>
+          <a:p>
+            <a:pPr marL="0" marR="0" lvl="0" indent="0" algn="ctr" defTabSz="914400" rtl="0" eaLnBrk="0" fontAlgn="base" latinLnBrk="0" hangingPunct="0">
+              <a:lnSpc>
+                <a:spcPct val="100000"/>
+              </a:lnSpc>
+              <a:spcBef>
+                <a:spcPct val="0"/>
+              </a:spcBef>
+              <a:spcAft>
+                <a:spcPct val="0"/>
+              </a:spcAft>
+              <a:buClrTx/>
+              <a:buSzTx/>
+              <a:buFontTx/>
+              <a:buNone/>
+              <a:tabLst/>
+              <a:defRPr/>
+            </a:pPr>
+            <a:endParaRPr kumimoji="0" lang="en-GB" sz="1800" b="0" i="0" u="none" strike="noStrike" kern="1200" cap="none" spc="0" normalizeH="0" baseline="0" noProof="0">
+              <a:ln>
+                <a:noFill/>
+              </a:ln>
+              <a:solidFill>
+                <a:srgbClr val="FFFFFF"/>
+              </a:solidFill>
+              <a:effectLst/>
+              <a:uLnTx/>
+              <a:uFillTx/>
+              <a:latin typeface="Calibri"/>
+              <a:ea typeface="+mn-ea"/>
+              <a:cs typeface="+mn-cs"/>
+            </a:endParaRPr>
+          </a:p>
+        </p:txBody>
+      </p:sp>
+      <p:sp>
+        <p:nvSpPr>
+          <p:cNvPr id="22" name="Rectangle 21">
+            <a:extLst>
+              <a:ext uri="{FF2B5EF4-FFF2-40B4-BE49-F238E27FC236}">
+                <a16:creationId xmlns:a16="http://schemas.microsoft.com/office/drawing/2014/main" id="{5487FEAB-7D2D-4E65-8BF8-9C55DAECCD8A}"/>
+              </a:ext>
+            </a:extLst>
+          </p:cNvPr>
+          <p:cNvSpPr/>
+          <p:nvPr/>
+        </p:nvSpPr>
+        <p:spPr>
+          <a:xfrm>
+            <a:off x="4838702" y="1216862"/>
+            <a:ext cx="1786690" cy="5126787"/>
+          </a:xfrm>
+          <a:prstGeom prst="rect">
+            <a:avLst/>
+          </a:prstGeom>
+          <a:solidFill>
+            <a:schemeClr val="accent3">
+              <a:lumMod val="60000"/>
+              <a:lumOff val="40000"/>
+              <a:alpha val="50196"/>
+            </a:schemeClr>
+          </a:solidFill>
+          <a:ln>
+            <a:noFill/>
+          </a:ln>
+        </p:spPr>
+        <p:style>
+          <a:lnRef idx="2">
+            <a:schemeClr val="accent1">
+              <a:shade val="50000"/>
+            </a:schemeClr>
+          </a:lnRef>
+          <a:fillRef idx="1">
+            <a:schemeClr val="accent1"/>
+          </a:fillRef>
+          <a:effectRef idx="0">
+            <a:schemeClr val="accent1"/>
+          </a:effectRef>
+          <a:fontRef idx="minor">
+            <a:schemeClr val="lt1"/>
+          </a:fontRef>
+        </p:style>
+        <p:txBody>
+          <a:bodyPr rtlCol="0" anchor="t"/>
+          <a:lstStyle/>
+          <a:p>
+            <a:pPr algn="ctr" eaLnBrk="0" fontAlgn="base" hangingPunct="0">
+              <a:spcBef>
+                <a:spcPct val="0"/>
+              </a:spcBef>
+              <a:spcAft>
+                <a:spcPct val="0"/>
+              </a:spcAft>
+              <a:defRPr/>
+            </a:pPr>
+            <a:r>
+              <a:rPr kumimoji="0" lang="en-US" sz="1800" b="1" i="0" u="none" strike="noStrike" kern="1200" cap="none" spc="0" normalizeH="0" baseline="0" noProof="0" dirty="0">
+                <a:ln>
+                  <a:noFill/>
+                </a:ln>
+                <a:solidFill>
+                  <a:srgbClr val="333E48"/>
+                </a:solidFill>
+                <a:effectLst/>
+                <a:uLnTx/>
+                <a:uFillTx/>
+                <a:latin typeface="Calibri"/>
+                <a:ea typeface="ＭＳ Ｐゴシック" panose="020B0600070205080204" pitchFamily="34" charset="-128"/>
+                <a:cs typeface="+mn-cs"/>
+              </a:rPr>
+              <a:t>Input Files</a:t>
+            </a:r>
+          </a:p>
+        </p:txBody>
+      </p:sp>
+      <p:sp>
+        <p:nvSpPr>
+          <p:cNvPr id="21" name="Rectangle 20">
+            <a:extLst>
+              <a:ext uri="{FF2B5EF4-FFF2-40B4-BE49-F238E27FC236}">
+                <a16:creationId xmlns:a16="http://schemas.microsoft.com/office/drawing/2014/main" id="{0F8F6D10-7E91-4D68-8F46-4EF0F023AF1B}"/>
+              </a:ext>
+            </a:extLst>
+          </p:cNvPr>
+          <p:cNvSpPr/>
+          <p:nvPr/>
+        </p:nvSpPr>
+        <p:spPr>
+          <a:xfrm>
+            <a:off x="2292018" y="274719"/>
+            <a:ext cx="1786690" cy="4902864"/>
+          </a:xfrm>
+          <a:prstGeom prst="rect">
+            <a:avLst/>
+          </a:prstGeom>
+          <a:solidFill>
+            <a:schemeClr val="accent1">
+              <a:lumMod val="20000"/>
+              <a:lumOff val="80000"/>
+            </a:schemeClr>
+          </a:solidFill>
+          <a:ln>
+            <a:noFill/>
+          </a:ln>
+        </p:spPr>
+        <p:style>
+          <a:lnRef idx="2">
+            <a:schemeClr val="accent1">
+              <a:shade val="50000"/>
+            </a:schemeClr>
+          </a:lnRef>
+          <a:fillRef idx="1">
+            <a:schemeClr val="accent1"/>
+          </a:fillRef>
+          <a:effectRef idx="0">
+            <a:schemeClr val="accent1"/>
+          </a:effectRef>
+          <a:fontRef idx="minor">
+            <a:schemeClr val="lt1"/>
+          </a:fontRef>
+        </p:style>
+        <p:txBody>
+          <a:bodyPr rtlCol="0" anchor="t"/>
+          <a:lstStyle/>
+          <a:p>
+            <a:pPr algn="ctr" eaLnBrk="0" fontAlgn="base" hangingPunct="0">
+              <a:spcBef>
+                <a:spcPct val="0"/>
+              </a:spcBef>
+              <a:spcAft>
+                <a:spcPct val="0"/>
+              </a:spcAft>
+              <a:defRPr/>
+            </a:pPr>
+            <a:r>
+              <a:rPr kumimoji="0" lang="en-US" sz="1800" b="1" i="0" u="none" strike="noStrike" kern="1200" cap="none" spc="0" normalizeH="0" baseline="0" noProof="0" dirty="0">
+                <a:ln>
+                  <a:noFill/>
+                </a:ln>
+                <a:solidFill>
+                  <a:srgbClr val="333E48"/>
+                </a:solidFill>
+                <a:effectLst/>
+                <a:uLnTx/>
+                <a:uFillTx/>
+                <a:latin typeface="Calibri"/>
+                <a:ea typeface="ＭＳ Ｐゴシック" panose="020B0600070205080204" pitchFamily="34" charset="-128"/>
+                <a:cs typeface="+mn-cs"/>
+              </a:rPr>
+              <a:t>Software Packs</a:t>
+            </a:r>
+          </a:p>
+        </p:txBody>
+      </p:sp>
+      <p:sp>
+        <p:nvSpPr>
+          <p:cNvPr id="5" name="Flowchart: Document 4">
+            <a:extLst>
+              <a:ext uri="{FF2B5EF4-FFF2-40B4-BE49-F238E27FC236}">
+                <a16:creationId xmlns:a16="http://schemas.microsoft.com/office/drawing/2014/main" id="{2D3770D1-02A3-4E7A-8574-CDC5E2D313BA}"/>
+              </a:ext>
+            </a:extLst>
+          </p:cNvPr>
+          <p:cNvSpPr/>
+          <p:nvPr/>
+        </p:nvSpPr>
+        <p:spPr>
+          <a:xfrm>
+            <a:off x="2510676" y="3918641"/>
+            <a:ext cx="1333416" cy="884321"/>
+          </a:xfrm>
+          <a:prstGeom prst="flowChartDocument">
+            <a:avLst/>
+          </a:prstGeom>
+          <a:solidFill>
+            <a:schemeClr val="accent1"/>
+          </a:solidFill>
+          <a:ln w="19050">
+            <a:solidFill>
+              <a:schemeClr val="tx1"/>
+            </a:solidFill>
+          </a:ln>
+        </p:spPr>
+        <p:style>
+          <a:lnRef idx="2">
+            <a:schemeClr val="accent1">
+              <a:shade val="50000"/>
+            </a:schemeClr>
+          </a:lnRef>
+          <a:fillRef idx="1">
+            <a:schemeClr val="accent1"/>
+          </a:fillRef>
+          <a:effectRef idx="0">
+            <a:schemeClr val="accent1"/>
+          </a:effectRef>
+          <a:fontRef idx="minor">
+            <a:schemeClr val="lt1"/>
+          </a:fontRef>
+        </p:style>
+        <p:txBody>
+          <a:bodyPr rtlCol="0" anchor="ctr"/>
+          <a:lstStyle/>
+          <a:p>
+            <a:pPr marL="0" marR="0" lvl="0" indent="0" algn="ctr" defTabSz="914400" rtl="0" eaLnBrk="0" fontAlgn="base" latinLnBrk="0" hangingPunct="0">
+              <a:lnSpc>
+                <a:spcPct val="100000"/>
+              </a:lnSpc>
+              <a:spcBef>
+                <a:spcPct val="0"/>
+              </a:spcBef>
+              <a:spcAft>
+                <a:spcPct val="0"/>
+              </a:spcAft>
+              <a:buClrTx/>
+              <a:buSzTx/>
+              <a:buFontTx/>
+              <a:buNone/>
+              <a:tabLst/>
+              <a:defRPr/>
+            </a:pPr>
+            <a:r>
+              <a:rPr kumimoji="0" lang="en-US" sz="1200" b="0" i="0" u="none" strike="noStrike" kern="1200" cap="none" spc="0" normalizeH="0" baseline="0" noProof="0" dirty="0">
+                <a:ln>
+                  <a:noFill/>
+                </a:ln>
+                <a:solidFill>
+                  <a:srgbClr val="FFFFFF"/>
+                </a:solidFill>
+                <a:effectLst/>
+                <a:uLnTx/>
+                <a:uFillTx/>
+                <a:latin typeface="Calibri"/>
+                <a:ea typeface="+mn-ea"/>
+                <a:cs typeface="+mn-cs"/>
+              </a:rPr>
+              <a:t>*.</a:t>
+            </a:r>
+            <a:r>
+              <a:rPr kumimoji="0" lang="en-US" sz="1200" b="0" i="0" u="none" strike="noStrike" kern="1200" cap="none" spc="0" normalizeH="0" baseline="0" noProof="0" dirty="0" err="1">
+                <a:ln>
+                  <a:noFill/>
+                </a:ln>
+                <a:solidFill>
+                  <a:srgbClr val="FFFFFF"/>
+                </a:solidFill>
+                <a:effectLst/>
+                <a:uLnTx/>
+                <a:uFillTx/>
+                <a:latin typeface="Calibri"/>
+                <a:ea typeface="+mn-ea"/>
+                <a:cs typeface="+mn-cs"/>
+              </a:rPr>
+              <a:t>rzone</a:t>
+            </a:r>
+            <a:r>
+              <a:rPr kumimoji="0" lang="en-US" sz="1200" b="0" i="0" u="none" strike="noStrike" kern="1200" cap="none" spc="0" normalizeH="0" baseline="0" noProof="0" dirty="0">
+                <a:ln>
+                  <a:noFill/>
+                </a:ln>
+                <a:solidFill>
+                  <a:srgbClr val="FFFFFF"/>
+                </a:solidFill>
+                <a:effectLst/>
+                <a:uLnTx/>
+                <a:uFillTx/>
+                <a:latin typeface="Calibri"/>
+                <a:ea typeface="+mn-ea"/>
+                <a:cs typeface="+mn-cs"/>
+              </a:rPr>
+              <a:t> (optional)</a:t>
+            </a:r>
+            <a:br>
+              <a:rPr kumimoji="0" lang="en-US" sz="1200" b="0" i="0" u="none" strike="noStrike" kern="1200" cap="none" spc="0" normalizeH="0" baseline="0" noProof="0" dirty="0">
+                <a:ln>
+                  <a:noFill/>
+                </a:ln>
+                <a:solidFill>
+                  <a:srgbClr val="FFFFFF"/>
+                </a:solidFill>
+                <a:effectLst/>
+                <a:uLnTx/>
+                <a:uFillTx/>
+                <a:latin typeface="Calibri"/>
+                <a:ea typeface="+mn-ea"/>
+                <a:cs typeface="+mn-cs"/>
+              </a:rPr>
+            </a:br>
+            <a:r>
+              <a:rPr lang="en-US" sz="1050" dirty="0">
+                <a:solidFill>
+                  <a:srgbClr val="FFFFFF"/>
+                </a:solidFill>
+                <a:latin typeface="Calibri"/>
+              </a:rPr>
+              <a:t>D</a:t>
+            </a:r>
+            <a:r>
+              <a:rPr kumimoji="0" lang="en-US" sz="1000" b="0" i="0" u="none" strike="noStrike" kern="1200" cap="none" spc="0" normalizeH="0" baseline="0" noProof="0" dirty="0" err="1">
+                <a:ln>
+                  <a:noFill/>
+                </a:ln>
+                <a:solidFill>
+                  <a:srgbClr val="FFFFFF"/>
+                </a:solidFill>
+                <a:effectLst/>
+                <a:uLnTx/>
+                <a:uFillTx/>
+                <a:latin typeface="Calibri"/>
+                <a:ea typeface="+mn-ea"/>
+                <a:cs typeface="+mn-cs"/>
+              </a:rPr>
+              <a:t>efines</a:t>
+            </a:r>
+            <a:r>
+              <a:rPr kumimoji="0" lang="en-US" sz="1000" b="0" i="0" u="none" strike="noStrike" kern="1200" cap="none" spc="0" normalizeH="0" baseline="0" noProof="0" dirty="0">
+                <a:ln>
+                  <a:noFill/>
+                </a:ln>
+                <a:solidFill>
+                  <a:srgbClr val="FFFFFF"/>
+                </a:solidFill>
+                <a:effectLst/>
+                <a:uLnTx/>
+                <a:uFillTx/>
+                <a:latin typeface="Calibri"/>
+                <a:ea typeface="+mn-ea"/>
+                <a:cs typeface="+mn-cs"/>
+              </a:rPr>
+              <a:t> system resources</a:t>
+            </a:r>
+            <a:endParaRPr kumimoji="0" lang="en-GB" sz="1100" b="0" i="0" u="none" strike="noStrike" kern="1200" cap="none" spc="0" normalizeH="0" baseline="0" noProof="0" dirty="0">
+              <a:ln>
+                <a:noFill/>
+              </a:ln>
+              <a:solidFill>
+                <a:srgbClr val="FFFFFF"/>
+              </a:solidFill>
+              <a:effectLst/>
+              <a:uLnTx/>
+              <a:uFillTx/>
+              <a:latin typeface="Calibri"/>
+              <a:ea typeface="+mn-ea"/>
+              <a:cs typeface="+mn-cs"/>
+            </a:endParaRPr>
+          </a:p>
+        </p:txBody>
+      </p:sp>
+      <p:sp>
+        <p:nvSpPr>
+          <p:cNvPr id="6" name="Flowchart: Document 5">
+            <a:extLst>
+              <a:ext uri="{FF2B5EF4-FFF2-40B4-BE49-F238E27FC236}">
+                <a16:creationId xmlns:a16="http://schemas.microsoft.com/office/drawing/2014/main" id="{05CB531E-7400-4A1A-9853-81AF2D7E5608}"/>
+              </a:ext>
+            </a:extLst>
+          </p:cNvPr>
+          <p:cNvSpPr/>
+          <p:nvPr/>
+        </p:nvSpPr>
+        <p:spPr>
+          <a:xfrm>
+            <a:off x="5045330" y="1638298"/>
+            <a:ext cx="1333416" cy="884321"/>
+          </a:xfrm>
+          <a:prstGeom prst="flowChartDocument">
+            <a:avLst/>
+          </a:prstGeom>
+          <a:solidFill>
+            <a:schemeClr val="bg1"/>
+          </a:solidFill>
+          <a:ln w="19050">
+            <a:solidFill>
+              <a:schemeClr val="tx1"/>
+            </a:solidFill>
+          </a:ln>
+        </p:spPr>
+        <p:style>
+          <a:lnRef idx="2">
+            <a:schemeClr val="accent1">
+              <a:shade val="50000"/>
+            </a:schemeClr>
+          </a:lnRef>
+          <a:fillRef idx="1">
+            <a:schemeClr val="accent1"/>
+          </a:fillRef>
+          <a:effectRef idx="0">
+            <a:schemeClr val="accent1"/>
+          </a:effectRef>
+          <a:fontRef idx="minor">
+            <a:schemeClr val="lt1"/>
+          </a:fontRef>
+        </p:style>
+        <p:txBody>
+          <a:bodyPr lIns="0" rIns="0" rtlCol="0" anchor="ctr"/>
+          <a:lstStyle/>
+          <a:p>
+            <a:pPr marL="0" marR="0" lvl="0" indent="0" algn="ctr" defTabSz="914400" rtl="0" eaLnBrk="0" fontAlgn="base" latinLnBrk="0" hangingPunct="0">
+              <a:lnSpc>
+                <a:spcPct val="100000"/>
+              </a:lnSpc>
+              <a:spcBef>
+                <a:spcPct val="0"/>
+              </a:spcBef>
+              <a:spcAft>
+                <a:spcPct val="0"/>
+              </a:spcAft>
+              <a:buClrTx/>
+              <a:buSzTx/>
+              <a:buFontTx/>
+              <a:buNone/>
+              <a:tabLst/>
+              <a:defRPr/>
+            </a:pPr>
+            <a:r>
+              <a:rPr kumimoji="0" lang="en-US" sz="1200" b="0" i="0" u="none" strike="noStrike" kern="1200" cap="none" spc="0" normalizeH="0" baseline="0" noProof="0" dirty="0">
+                <a:ln>
+                  <a:noFill/>
+                </a:ln>
+                <a:solidFill>
+                  <a:schemeClr val="bg2">
+                    <a:lumMod val="25000"/>
+                  </a:schemeClr>
+                </a:solidFill>
+                <a:effectLst/>
+                <a:uLnTx/>
+                <a:uFillTx/>
+                <a:latin typeface="Calibri"/>
+                <a:ea typeface="+mn-ea"/>
+                <a:cs typeface="+mn-cs"/>
+              </a:rPr>
+              <a:t>*.</a:t>
+            </a:r>
+            <a:r>
+              <a:rPr kumimoji="0" lang="en-US" sz="1200" b="0" i="0" u="none" strike="noStrike" kern="1200" cap="none" spc="0" normalizeH="0" baseline="0" noProof="0" dirty="0" err="1">
+                <a:ln>
+                  <a:noFill/>
+                </a:ln>
+                <a:solidFill>
+                  <a:schemeClr val="bg2">
+                    <a:lumMod val="25000"/>
+                  </a:schemeClr>
+                </a:solidFill>
+                <a:effectLst/>
+                <a:uLnTx/>
+                <a:uFillTx/>
+                <a:latin typeface="Calibri"/>
+                <a:ea typeface="+mn-ea"/>
+                <a:cs typeface="+mn-cs"/>
+              </a:rPr>
+              <a:t>csolution.yml</a:t>
+            </a:r>
+            <a:br>
+              <a:rPr kumimoji="0" lang="en-US" sz="1200" b="0" i="0" u="none" strike="noStrike" kern="1200" cap="none" spc="0" normalizeH="0" baseline="0" noProof="0" dirty="0">
+                <a:ln>
+                  <a:noFill/>
+                </a:ln>
+                <a:solidFill>
+                  <a:schemeClr val="bg2">
+                    <a:lumMod val="25000"/>
+                  </a:schemeClr>
+                </a:solidFill>
+                <a:effectLst/>
+                <a:uLnTx/>
+                <a:uFillTx/>
+                <a:latin typeface="Calibri"/>
+                <a:ea typeface="+mn-ea"/>
+                <a:cs typeface="+mn-cs"/>
+              </a:rPr>
+            </a:br>
+            <a:r>
+              <a:rPr kumimoji="0" lang="en-US" sz="1000" b="0" i="0" u="none" strike="noStrike" kern="1200" cap="none" spc="0" normalizeH="0" baseline="0" noProof="0" dirty="0">
+                <a:ln>
+                  <a:noFill/>
+                </a:ln>
+                <a:solidFill>
+                  <a:schemeClr val="bg2">
+                    <a:lumMod val="25000"/>
+                  </a:schemeClr>
+                </a:solidFill>
+                <a:effectLst/>
+                <a:uLnTx/>
+                <a:uFillTx/>
+                <a:latin typeface="Calibri"/>
+                <a:ea typeface="+mn-ea"/>
+                <a:cs typeface="+mn-cs"/>
+              </a:rPr>
+              <a:t>Target (Device, Board) Build (Debug, Release) </a:t>
+            </a:r>
+            <a:endParaRPr kumimoji="0" lang="en-GB" sz="1000" b="0" i="0" u="none" strike="noStrike" kern="1200" cap="none" spc="0" normalizeH="0" baseline="0" noProof="0" dirty="0">
+              <a:ln>
+                <a:noFill/>
+              </a:ln>
+              <a:solidFill>
+                <a:schemeClr val="bg2">
+                  <a:lumMod val="25000"/>
+                </a:schemeClr>
+              </a:solidFill>
+              <a:effectLst/>
+              <a:uLnTx/>
+              <a:uFillTx/>
+              <a:latin typeface="Calibri"/>
+              <a:ea typeface="+mn-ea"/>
+              <a:cs typeface="+mn-cs"/>
+            </a:endParaRPr>
+          </a:p>
+        </p:txBody>
+      </p:sp>
+      <p:sp>
+        <p:nvSpPr>
+          <p:cNvPr id="7" name="Flowchart: Multidocument 6">
+            <a:extLst>
+              <a:ext uri="{FF2B5EF4-FFF2-40B4-BE49-F238E27FC236}">
+                <a16:creationId xmlns:a16="http://schemas.microsoft.com/office/drawing/2014/main" id="{0FCC1B91-99A1-4E45-AE23-2D8F8B8DFEBE}"/>
+              </a:ext>
+            </a:extLst>
+          </p:cNvPr>
+          <p:cNvSpPr/>
+          <p:nvPr/>
+        </p:nvSpPr>
+        <p:spPr>
+          <a:xfrm>
+            <a:off x="5002732" y="2755225"/>
+            <a:ext cx="1449805" cy="1010653"/>
+          </a:xfrm>
+          <a:prstGeom prst="flowChartMultidocument">
+            <a:avLst/>
+          </a:prstGeom>
+          <a:solidFill>
+            <a:schemeClr val="bg1"/>
+          </a:solidFill>
+          <a:ln w="19050">
+            <a:solidFill>
+              <a:schemeClr val="accent1">
+                <a:lumMod val="75000"/>
+              </a:schemeClr>
+            </a:solidFill>
+          </a:ln>
+        </p:spPr>
+        <p:style>
+          <a:lnRef idx="2">
+            <a:schemeClr val="accent1">
+              <a:shade val="50000"/>
+            </a:schemeClr>
+          </a:lnRef>
+          <a:fillRef idx="1">
+            <a:schemeClr val="accent1"/>
+          </a:fillRef>
+          <a:effectRef idx="0">
+            <a:schemeClr val="accent1"/>
+          </a:effectRef>
+          <a:fontRef idx="minor">
+            <a:schemeClr val="lt1"/>
+          </a:fontRef>
+        </p:style>
+        <p:txBody>
+          <a:bodyPr rtlCol="0" anchor="ctr"/>
+          <a:lstStyle/>
+          <a:p>
+            <a:pPr marL="0" marR="0" lvl="0" indent="0" algn="ctr" defTabSz="914400" rtl="0" eaLnBrk="0" fontAlgn="base" latinLnBrk="0" hangingPunct="0">
+              <a:lnSpc>
+                <a:spcPct val="100000"/>
+              </a:lnSpc>
+              <a:spcBef>
+                <a:spcPct val="0"/>
+              </a:spcBef>
+              <a:spcAft>
+                <a:spcPct val="0"/>
+              </a:spcAft>
+              <a:buClrTx/>
+              <a:buSzTx/>
+              <a:buFontTx/>
+              <a:buNone/>
+              <a:tabLst/>
+              <a:defRPr/>
+            </a:pPr>
+            <a:r>
+              <a:rPr kumimoji="0" lang="en-US" sz="1200" b="0" i="0" u="none" strike="noStrike" kern="1200" cap="none" spc="0" normalizeH="0" baseline="0" noProof="0" dirty="0">
+                <a:ln>
+                  <a:noFill/>
+                </a:ln>
+                <a:solidFill>
+                  <a:schemeClr val="bg2">
+                    <a:lumMod val="25000"/>
+                  </a:schemeClr>
+                </a:solidFill>
+                <a:effectLst/>
+                <a:uLnTx/>
+                <a:uFillTx/>
+                <a:latin typeface="Calibri"/>
+                <a:ea typeface="+mn-ea"/>
+                <a:cs typeface="+mn-cs"/>
+              </a:rPr>
+              <a:t>*.</a:t>
+            </a:r>
+            <a:r>
+              <a:rPr kumimoji="0" lang="en-US" sz="1200" b="0" i="0" u="none" strike="noStrike" kern="1200" cap="none" spc="0" normalizeH="0" baseline="0" noProof="0" dirty="0" err="1">
+                <a:ln>
+                  <a:noFill/>
+                </a:ln>
+                <a:solidFill>
+                  <a:schemeClr val="bg2">
+                    <a:lumMod val="25000"/>
+                  </a:schemeClr>
+                </a:solidFill>
+                <a:effectLst/>
+                <a:uLnTx/>
+                <a:uFillTx/>
+                <a:latin typeface="Calibri"/>
+                <a:ea typeface="+mn-ea"/>
+                <a:cs typeface="+mn-cs"/>
+              </a:rPr>
+              <a:t>cproject.yml</a:t>
+            </a:r>
+            <a:br>
+              <a:rPr kumimoji="0" lang="en-US" sz="1200" b="0" i="0" u="none" strike="noStrike" kern="1200" cap="none" spc="0" normalizeH="0" baseline="0" noProof="0" dirty="0">
+                <a:ln>
+                  <a:noFill/>
+                </a:ln>
+                <a:solidFill>
+                  <a:schemeClr val="bg2">
+                    <a:lumMod val="25000"/>
+                  </a:schemeClr>
+                </a:solidFill>
+                <a:effectLst/>
+                <a:uLnTx/>
+                <a:uFillTx/>
+                <a:latin typeface="Calibri"/>
+                <a:ea typeface="+mn-ea"/>
+                <a:cs typeface="+mn-cs"/>
+              </a:rPr>
+            </a:br>
+            <a:r>
+              <a:rPr kumimoji="0" lang="en-US" sz="1000" b="0" i="0" u="none" strike="noStrike" kern="1200" cap="none" spc="0" normalizeH="0" baseline="0" noProof="0" dirty="0">
+                <a:ln>
+                  <a:noFill/>
+                </a:ln>
+                <a:solidFill>
+                  <a:schemeClr val="bg2">
+                    <a:lumMod val="25000"/>
+                  </a:schemeClr>
+                </a:solidFill>
+                <a:effectLst/>
+                <a:uLnTx/>
+                <a:uFillTx/>
+                <a:latin typeface="Calibri"/>
+                <a:ea typeface="+mn-ea"/>
+                <a:cs typeface="+mn-cs"/>
+              </a:rPr>
+              <a:t>Manages </a:t>
+            </a:r>
+            <a:br>
+              <a:rPr kumimoji="0" lang="en-US" sz="1000" b="0" i="0" u="none" strike="noStrike" kern="1200" cap="none" spc="0" normalizeH="0" baseline="0" noProof="0" dirty="0">
+                <a:ln>
+                  <a:noFill/>
+                </a:ln>
+                <a:solidFill>
+                  <a:schemeClr val="bg2">
+                    <a:lumMod val="25000"/>
+                  </a:schemeClr>
+                </a:solidFill>
+                <a:effectLst/>
+                <a:uLnTx/>
+                <a:uFillTx/>
+                <a:latin typeface="Calibri"/>
+                <a:ea typeface="+mn-ea"/>
+                <a:cs typeface="+mn-cs"/>
+              </a:rPr>
+            </a:br>
+            <a:r>
+              <a:rPr kumimoji="0" lang="en-US" sz="1000" b="0" i="0" u="none" strike="noStrike" kern="1200" cap="none" spc="0" normalizeH="0" baseline="0" noProof="0" dirty="0">
+                <a:ln>
+                  <a:noFill/>
+                </a:ln>
+                <a:solidFill>
+                  <a:schemeClr val="bg2">
+                    <a:lumMod val="25000"/>
+                  </a:schemeClr>
+                </a:solidFill>
+                <a:effectLst/>
+                <a:uLnTx/>
+                <a:uFillTx/>
+                <a:latin typeface="Calibri"/>
+                <a:ea typeface="+mn-ea"/>
+                <a:cs typeface="+mn-cs"/>
+              </a:rPr>
+              <a:t>independent</a:t>
+            </a:r>
+            <a:br>
+              <a:rPr kumimoji="0" lang="en-US" sz="1000" b="0" i="0" u="none" strike="noStrike" kern="1200" cap="none" spc="0" normalizeH="0" baseline="0" noProof="0" dirty="0">
+                <a:ln>
+                  <a:noFill/>
+                </a:ln>
+                <a:solidFill>
+                  <a:schemeClr val="bg2">
+                    <a:lumMod val="25000"/>
+                  </a:schemeClr>
+                </a:solidFill>
+                <a:effectLst/>
+                <a:uLnTx/>
+                <a:uFillTx/>
+                <a:latin typeface="Calibri"/>
+                <a:ea typeface="+mn-ea"/>
+                <a:cs typeface="+mn-cs"/>
+              </a:rPr>
+            </a:br>
+            <a:r>
+              <a:rPr kumimoji="0" lang="en-US" sz="1000" b="0" i="0" u="none" strike="noStrike" kern="1200" cap="none" spc="0" normalizeH="0" baseline="0" noProof="0" dirty="0">
+                <a:ln>
+                  <a:noFill/>
+                </a:ln>
+                <a:solidFill>
+                  <a:schemeClr val="bg2">
+                    <a:lumMod val="25000"/>
+                  </a:schemeClr>
+                </a:solidFill>
+                <a:effectLst/>
+                <a:uLnTx/>
+                <a:uFillTx/>
+                <a:latin typeface="Calibri"/>
+                <a:ea typeface="+mn-ea"/>
+                <a:cs typeface="+mn-cs"/>
+              </a:rPr>
+              <a:t>projects</a:t>
+            </a:r>
+            <a:endParaRPr kumimoji="0" lang="en-GB" sz="1000" b="0" i="0" u="none" strike="noStrike" kern="1200" cap="none" spc="0" normalizeH="0" baseline="0" noProof="0" dirty="0">
+              <a:ln>
+                <a:noFill/>
+              </a:ln>
+              <a:solidFill>
+                <a:schemeClr val="bg2">
+                  <a:lumMod val="25000"/>
+                </a:schemeClr>
+              </a:solidFill>
+              <a:effectLst/>
+              <a:uLnTx/>
+              <a:uFillTx/>
+              <a:latin typeface="Calibri"/>
+              <a:ea typeface="+mn-ea"/>
+              <a:cs typeface="+mn-cs"/>
+            </a:endParaRPr>
+          </a:p>
+        </p:txBody>
+      </p:sp>
+      <p:sp>
+        <p:nvSpPr>
+          <p:cNvPr id="10" name="Flowchart: Multidocument 9">
+            <a:extLst>
+              <a:ext uri="{FF2B5EF4-FFF2-40B4-BE49-F238E27FC236}">
+                <a16:creationId xmlns:a16="http://schemas.microsoft.com/office/drawing/2014/main" id="{063DD4F5-6984-4CA0-9BAE-639DAB72225F}"/>
+              </a:ext>
+            </a:extLst>
+          </p:cNvPr>
+          <p:cNvSpPr/>
+          <p:nvPr/>
+        </p:nvSpPr>
+        <p:spPr>
+          <a:xfrm>
+            <a:off x="9467610" y="5300327"/>
+            <a:ext cx="1449805" cy="1010653"/>
+          </a:xfrm>
+          <a:prstGeom prst="flowChartMultidocument">
+            <a:avLst/>
+          </a:prstGeom>
+          <a:solidFill>
+            <a:schemeClr val="bg1">
+              <a:lumMod val="95000"/>
+            </a:schemeClr>
+          </a:solidFill>
+          <a:ln w="19050">
+            <a:solidFill>
+              <a:schemeClr val="accent5">
+                <a:lumMod val="50000"/>
+              </a:schemeClr>
+            </a:solidFill>
+          </a:ln>
+        </p:spPr>
+        <p:style>
+          <a:lnRef idx="2">
+            <a:schemeClr val="accent1">
+              <a:shade val="50000"/>
+            </a:schemeClr>
+          </a:lnRef>
+          <a:fillRef idx="1">
+            <a:schemeClr val="accent1"/>
+          </a:fillRef>
+          <a:effectRef idx="0">
+            <a:schemeClr val="accent1"/>
+          </a:effectRef>
+          <a:fontRef idx="minor">
+            <a:schemeClr val="lt1"/>
+          </a:fontRef>
+        </p:style>
+        <p:txBody>
+          <a:bodyPr lIns="36000" rIns="36000" rtlCol="0" anchor="ctr"/>
+          <a:lstStyle/>
+          <a:p>
+            <a:pPr marL="0" marR="0" lvl="0" indent="0" algn="ctr" defTabSz="914400" rtl="0" eaLnBrk="0" fontAlgn="base" latinLnBrk="0" hangingPunct="0">
+              <a:lnSpc>
+                <a:spcPct val="100000"/>
+              </a:lnSpc>
+              <a:spcBef>
+                <a:spcPct val="0"/>
+              </a:spcBef>
+              <a:spcAft>
+                <a:spcPct val="0"/>
+              </a:spcAft>
+              <a:buClrTx/>
+              <a:buSzTx/>
+              <a:buFontTx/>
+              <a:buNone/>
+              <a:tabLst/>
+              <a:defRPr/>
+            </a:pPr>
+            <a:r>
+              <a:rPr lang="en-US" sz="1200" dirty="0">
+                <a:solidFill>
+                  <a:schemeClr val="bg2">
+                    <a:lumMod val="25000"/>
+                  </a:schemeClr>
+                </a:solidFill>
+                <a:latin typeface="Calibri"/>
+              </a:rPr>
+              <a:t>Run-Time Environment (RTE)</a:t>
+            </a:r>
+            <a:br>
+              <a:rPr lang="en-US" sz="1000" dirty="0">
+                <a:solidFill>
+                  <a:schemeClr val="bg2">
+                    <a:lumMod val="25000"/>
+                  </a:schemeClr>
+                </a:solidFill>
+                <a:latin typeface="Calibri"/>
+              </a:rPr>
+            </a:br>
+            <a:r>
+              <a:rPr lang="en-US" sz="1000" dirty="0">
+                <a:solidFill>
+                  <a:schemeClr val="bg2">
+                    <a:lumMod val="25000"/>
+                  </a:schemeClr>
+                </a:solidFill>
+                <a:latin typeface="Calibri"/>
+              </a:rPr>
+              <a:t>(*.c / *.h files with config information)</a:t>
+            </a:r>
+            <a:br>
+              <a:rPr lang="en-US" sz="1200" dirty="0">
+                <a:solidFill>
+                  <a:schemeClr val="bg2">
+                    <a:lumMod val="25000"/>
+                  </a:schemeClr>
+                </a:solidFill>
+                <a:latin typeface="Calibri"/>
+              </a:rPr>
+            </a:br>
+            <a:endParaRPr kumimoji="0" lang="en-GB" sz="1200" b="0" i="0" u="none" strike="noStrike" kern="1200" cap="none" spc="0" normalizeH="0" baseline="0" noProof="0" dirty="0">
+              <a:ln>
+                <a:noFill/>
+              </a:ln>
+              <a:solidFill>
+                <a:schemeClr val="bg2">
+                  <a:lumMod val="25000"/>
+                </a:schemeClr>
+              </a:solidFill>
+              <a:effectLst/>
+              <a:uLnTx/>
+              <a:uFillTx/>
+              <a:latin typeface="Calibri"/>
+              <a:ea typeface="+mn-ea"/>
+              <a:cs typeface="+mn-cs"/>
+            </a:endParaRPr>
+          </a:p>
+        </p:txBody>
+      </p:sp>
+      <p:cxnSp>
+        <p:nvCxnSpPr>
+          <p:cNvPr id="14" name="Straight Arrow Connector 13">
+            <a:extLst>
+              <a:ext uri="{FF2B5EF4-FFF2-40B4-BE49-F238E27FC236}">
+                <a16:creationId xmlns:a16="http://schemas.microsoft.com/office/drawing/2014/main" id="{0CA20441-F3C2-440A-892E-1359E8990DC5}"/>
+              </a:ext>
+            </a:extLst>
+          </p:cNvPr>
+          <p:cNvCxnSpPr>
+            <a:cxnSpLocks/>
+          </p:cNvCxnSpPr>
+          <p:nvPr/>
+        </p:nvCxnSpPr>
+        <p:spPr>
+          <a:xfrm>
+            <a:off x="5693030" y="2478504"/>
+            <a:ext cx="0" cy="276726"/>
+          </a:xfrm>
+          <a:prstGeom prst="straightConnector1">
+            <a:avLst/>
+          </a:prstGeom>
+          <a:ln w="38100">
+            <a:tailEnd type="triangle"/>
+          </a:ln>
+        </p:spPr>
+        <p:style>
+          <a:lnRef idx="1">
+            <a:schemeClr val="accent1"/>
+          </a:lnRef>
+          <a:fillRef idx="0">
+            <a:schemeClr val="accent1"/>
+          </a:fillRef>
+          <a:effectRef idx="0">
+            <a:schemeClr val="accent1"/>
+          </a:effectRef>
+          <a:fontRef idx="minor">
+            <a:schemeClr val="tx1"/>
+          </a:fontRef>
+        </p:style>
+      </p:cxnSp>
+      <p:cxnSp>
+        <p:nvCxnSpPr>
+          <p:cNvPr id="17" name="Straight Arrow Connector 16">
+            <a:extLst>
+              <a:ext uri="{FF2B5EF4-FFF2-40B4-BE49-F238E27FC236}">
+                <a16:creationId xmlns:a16="http://schemas.microsoft.com/office/drawing/2014/main" id="{8700C784-4ABC-4B94-A393-C72FD280887C}"/>
+              </a:ext>
+            </a:extLst>
+          </p:cNvPr>
+          <p:cNvCxnSpPr>
+            <a:cxnSpLocks/>
+          </p:cNvCxnSpPr>
+          <p:nvPr/>
+        </p:nvCxnSpPr>
+        <p:spPr>
+          <a:xfrm>
+            <a:off x="5713083" y="3695699"/>
+            <a:ext cx="0" cy="276726"/>
+          </a:xfrm>
+          <a:prstGeom prst="straightConnector1">
+            <a:avLst/>
+          </a:prstGeom>
+          <a:ln w="38100">
+            <a:tailEnd type="triangle"/>
+          </a:ln>
+        </p:spPr>
+        <p:style>
+          <a:lnRef idx="1">
+            <a:schemeClr val="accent1"/>
+          </a:lnRef>
+          <a:fillRef idx="0">
+            <a:schemeClr val="accent1"/>
+          </a:fillRef>
+          <a:effectRef idx="0">
+            <a:schemeClr val="accent1"/>
+          </a:effectRef>
+          <a:fontRef idx="minor">
+            <a:schemeClr val="tx1"/>
+          </a:fontRef>
+        </p:style>
+      </p:cxnSp>
+      <p:sp>
+        <p:nvSpPr>
+          <p:cNvPr id="18" name="Flowchart: Multidocument 17">
+            <a:extLst>
+              <a:ext uri="{FF2B5EF4-FFF2-40B4-BE49-F238E27FC236}">
+                <a16:creationId xmlns:a16="http://schemas.microsoft.com/office/drawing/2014/main" id="{F193B99D-00C8-43D5-A8CC-0E46D2AFFC10}"/>
+              </a:ext>
+            </a:extLst>
+          </p:cNvPr>
+          <p:cNvSpPr/>
+          <p:nvPr/>
+        </p:nvSpPr>
+        <p:spPr>
+          <a:xfrm>
+            <a:off x="5052863" y="3966404"/>
+            <a:ext cx="1449805" cy="1010653"/>
+          </a:xfrm>
+          <a:prstGeom prst="flowChartMultidocument">
+            <a:avLst/>
+          </a:prstGeom>
+          <a:solidFill>
+            <a:schemeClr val="bg1"/>
+          </a:solidFill>
+          <a:ln w="19050">
+            <a:solidFill>
+              <a:schemeClr val="accent1">
+                <a:lumMod val="75000"/>
+              </a:schemeClr>
+            </a:solidFill>
+          </a:ln>
+        </p:spPr>
+        <p:style>
+          <a:lnRef idx="2">
+            <a:schemeClr val="accent1">
+              <a:shade val="50000"/>
+            </a:schemeClr>
+          </a:lnRef>
+          <a:fillRef idx="1">
+            <a:schemeClr val="accent1"/>
+          </a:fillRef>
+          <a:effectRef idx="0">
+            <a:schemeClr val="accent1"/>
+          </a:effectRef>
+          <a:fontRef idx="minor">
+            <a:schemeClr val="lt1"/>
+          </a:fontRef>
+        </p:style>
+        <p:txBody>
+          <a:bodyPr rtlCol="0" anchor="ctr"/>
+          <a:lstStyle/>
+          <a:p>
+            <a:pPr marL="0" marR="0" lvl="0" indent="0" algn="ctr" defTabSz="914400" rtl="0" eaLnBrk="0" fontAlgn="base" latinLnBrk="0" hangingPunct="0">
+              <a:lnSpc>
+                <a:spcPct val="100000"/>
+              </a:lnSpc>
+              <a:spcBef>
+                <a:spcPct val="0"/>
+              </a:spcBef>
+              <a:spcAft>
+                <a:spcPct val="0"/>
+              </a:spcAft>
+              <a:buClrTx/>
+              <a:buSzTx/>
+              <a:buFontTx/>
+              <a:buNone/>
+              <a:tabLst/>
+              <a:defRPr/>
+            </a:pPr>
+            <a:r>
+              <a:rPr kumimoji="0" lang="en-US" sz="1200" b="0" i="0" u="none" strike="noStrike" kern="1200" cap="none" spc="0" normalizeH="0" baseline="0" noProof="0" dirty="0">
+                <a:ln>
+                  <a:noFill/>
+                </a:ln>
+                <a:solidFill>
+                  <a:schemeClr val="bg2">
+                    <a:lumMod val="25000"/>
+                  </a:schemeClr>
+                </a:solidFill>
+                <a:effectLst/>
+                <a:uLnTx/>
+                <a:uFillTx/>
+                <a:latin typeface="Calibri"/>
+                <a:ea typeface="+mn-ea"/>
+                <a:cs typeface="+mn-cs"/>
+              </a:rPr>
+              <a:t>*.</a:t>
+            </a:r>
+            <a:r>
+              <a:rPr kumimoji="0" lang="en-US" sz="1200" b="0" i="0" u="none" strike="noStrike" kern="1200" cap="none" spc="0" normalizeH="0" baseline="0" noProof="0" dirty="0" err="1">
+                <a:ln>
+                  <a:noFill/>
+                </a:ln>
+                <a:solidFill>
+                  <a:schemeClr val="bg2">
+                    <a:lumMod val="25000"/>
+                  </a:schemeClr>
+                </a:solidFill>
+                <a:effectLst/>
+                <a:uLnTx/>
+                <a:uFillTx/>
+                <a:latin typeface="Calibri"/>
+                <a:ea typeface="+mn-ea"/>
+                <a:cs typeface="+mn-cs"/>
+              </a:rPr>
+              <a:t>clayer.yml</a:t>
+            </a:r>
+            <a:br>
+              <a:rPr kumimoji="0" lang="en-US" sz="1200" b="0" i="0" u="none" strike="noStrike" kern="1200" cap="none" spc="0" normalizeH="0" baseline="0" noProof="0" dirty="0">
+                <a:ln>
+                  <a:noFill/>
+                </a:ln>
+                <a:solidFill>
+                  <a:schemeClr val="bg2">
+                    <a:lumMod val="25000"/>
+                  </a:schemeClr>
+                </a:solidFill>
+                <a:effectLst/>
+                <a:uLnTx/>
+                <a:uFillTx/>
+                <a:latin typeface="Calibri"/>
+                <a:ea typeface="+mn-ea"/>
+                <a:cs typeface="+mn-cs"/>
+              </a:rPr>
+            </a:br>
+            <a:r>
+              <a:rPr kumimoji="0" lang="en-US" sz="1000" b="0" i="0" u="none" strike="noStrike" kern="1200" cap="none" spc="0" normalizeH="0" baseline="0" noProof="0" dirty="0">
+                <a:ln>
+                  <a:noFill/>
+                </a:ln>
+                <a:solidFill>
+                  <a:schemeClr val="bg2">
+                    <a:lumMod val="25000"/>
+                  </a:schemeClr>
+                </a:solidFill>
+                <a:effectLst/>
+                <a:uLnTx/>
+                <a:uFillTx/>
+                <a:latin typeface="Calibri"/>
+                <a:ea typeface="+mn-ea"/>
+                <a:cs typeface="+mn-cs"/>
+              </a:rPr>
+              <a:t>Defines re-usable project parts</a:t>
+            </a:r>
+            <a:endParaRPr kumimoji="0" lang="en-GB" sz="1000" b="0" i="0" u="none" strike="noStrike" kern="1200" cap="none" spc="0" normalizeH="0" baseline="0" noProof="0" dirty="0">
+              <a:ln>
+                <a:noFill/>
+              </a:ln>
+              <a:solidFill>
+                <a:schemeClr val="bg2">
+                  <a:lumMod val="25000"/>
+                </a:schemeClr>
+              </a:solidFill>
+              <a:effectLst/>
+              <a:uLnTx/>
+              <a:uFillTx/>
+              <a:latin typeface="Calibri"/>
+              <a:ea typeface="+mn-ea"/>
+              <a:cs typeface="+mn-cs"/>
+            </a:endParaRPr>
+          </a:p>
+        </p:txBody>
+      </p:sp>
+      <p:sp>
+        <p:nvSpPr>
+          <p:cNvPr id="19" name="Flowchart: Document 18">
+            <a:extLst>
+              <a:ext uri="{FF2B5EF4-FFF2-40B4-BE49-F238E27FC236}">
+                <a16:creationId xmlns:a16="http://schemas.microsoft.com/office/drawing/2014/main" id="{D63E43D9-EAD2-43AD-B647-C5A8C4326FDF}"/>
+              </a:ext>
+            </a:extLst>
+          </p:cNvPr>
+          <p:cNvSpPr/>
+          <p:nvPr/>
+        </p:nvSpPr>
+        <p:spPr>
+          <a:xfrm>
+            <a:off x="2510676" y="2805361"/>
+            <a:ext cx="1333416" cy="884321"/>
+          </a:xfrm>
+          <a:prstGeom prst="flowChartDocument">
+            <a:avLst/>
+          </a:prstGeom>
+          <a:solidFill>
+            <a:schemeClr val="accent1"/>
+          </a:solidFill>
+          <a:ln w="19050">
+            <a:solidFill>
+              <a:schemeClr val="tx1"/>
+            </a:solidFill>
+          </a:ln>
+        </p:spPr>
+        <p:style>
+          <a:lnRef idx="2">
+            <a:schemeClr val="accent1">
+              <a:shade val="50000"/>
+            </a:schemeClr>
+          </a:lnRef>
+          <a:fillRef idx="1">
+            <a:schemeClr val="accent1"/>
+          </a:fillRef>
+          <a:effectRef idx="0">
+            <a:schemeClr val="accent1"/>
+          </a:effectRef>
+          <a:fontRef idx="minor">
+            <a:schemeClr val="lt1"/>
+          </a:fontRef>
+        </p:style>
+        <p:txBody>
+          <a:bodyPr rtlCol="0" anchor="ctr"/>
+          <a:lstStyle/>
+          <a:p>
+            <a:pPr marL="0" marR="0" lvl="0" indent="0" algn="ctr" defTabSz="914400" rtl="0" eaLnBrk="0" fontAlgn="base" latinLnBrk="0" hangingPunct="0">
+              <a:lnSpc>
+                <a:spcPct val="100000"/>
+              </a:lnSpc>
+              <a:spcBef>
+                <a:spcPct val="0"/>
+              </a:spcBef>
+              <a:spcAft>
+                <a:spcPct val="0"/>
+              </a:spcAft>
+              <a:buClrTx/>
+              <a:buSzTx/>
+              <a:buFontTx/>
+              <a:buNone/>
+              <a:tabLst/>
+              <a:defRPr/>
+            </a:pPr>
+            <a:r>
+              <a:rPr kumimoji="0" lang="en-US" sz="1200" b="0" i="0" u="none" strike="noStrike" kern="1200" cap="none" spc="0" normalizeH="0" baseline="0" noProof="0" dirty="0">
+                <a:ln>
+                  <a:noFill/>
+                </a:ln>
+                <a:solidFill>
+                  <a:srgbClr val="FFFFFF"/>
+                </a:solidFill>
+                <a:effectLst/>
+                <a:uLnTx/>
+                <a:uFillTx/>
+                <a:latin typeface="Calibri"/>
+                <a:ea typeface="+mn-ea"/>
+                <a:cs typeface="+mn-cs"/>
+              </a:rPr>
+              <a:t>Device Family Pack (DFP) </a:t>
+            </a:r>
+          </a:p>
+          <a:p>
+            <a:pPr marL="0" marR="0" lvl="0" indent="0" algn="ctr" defTabSz="914400" rtl="0" eaLnBrk="0" fontAlgn="base" latinLnBrk="0" hangingPunct="0">
+              <a:lnSpc>
+                <a:spcPct val="100000"/>
+              </a:lnSpc>
+              <a:spcBef>
+                <a:spcPct val="0"/>
+              </a:spcBef>
+              <a:spcAft>
+                <a:spcPct val="0"/>
+              </a:spcAft>
+              <a:buClrTx/>
+              <a:buSzTx/>
+              <a:buFontTx/>
+              <a:buNone/>
+              <a:tabLst/>
+              <a:defRPr/>
+            </a:pPr>
+            <a:r>
+              <a:rPr kumimoji="0" lang="en-US" sz="1000" b="0" i="0" u="none" strike="noStrike" kern="1200" cap="none" spc="0" normalizeH="0" baseline="0" noProof="0" dirty="0">
+                <a:ln>
+                  <a:noFill/>
+                </a:ln>
+                <a:solidFill>
+                  <a:srgbClr val="FFFFFF"/>
+                </a:solidFill>
+                <a:effectLst/>
+                <a:uLnTx/>
+                <a:uFillTx/>
+                <a:latin typeface="Calibri"/>
+                <a:ea typeface="+mn-ea"/>
+                <a:cs typeface="+mn-cs"/>
+              </a:rPr>
+              <a:t>Defines device</a:t>
+            </a:r>
+            <a:br>
+              <a:rPr kumimoji="0" lang="en-US" sz="1000" b="0" i="0" u="none" strike="noStrike" kern="1200" cap="none" spc="0" normalizeH="0" baseline="0" noProof="0" dirty="0">
+                <a:ln>
+                  <a:noFill/>
+                </a:ln>
+                <a:solidFill>
+                  <a:srgbClr val="FFFFFF"/>
+                </a:solidFill>
+                <a:effectLst/>
+                <a:uLnTx/>
+                <a:uFillTx/>
+                <a:latin typeface="Calibri"/>
+                <a:ea typeface="+mn-ea"/>
+                <a:cs typeface="+mn-cs"/>
+              </a:rPr>
+            </a:br>
+            <a:r>
+              <a:rPr kumimoji="0" lang="en-US" sz="1000" b="0" i="0" u="none" strike="noStrike" kern="1200" cap="none" spc="0" normalizeH="0" baseline="0" noProof="0" dirty="0">
+                <a:ln>
+                  <a:noFill/>
+                </a:ln>
+                <a:solidFill>
+                  <a:srgbClr val="FFFFFF"/>
+                </a:solidFill>
+                <a:effectLst/>
+                <a:uLnTx/>
+                <a:uFillTx/>
+                <a:latin typeface="Calibri"/>
+                <a:ea typeface="+mn-ea"/>
+                <a:cs typeface="+mn-cs"/>
+              </a:rPr>
+              <a:t>properties</a:t>
+            </a:r>
+            <a:endParaRPr kumimoji="0" lang="en-GB" sz="1000" b="0" i="0" u="none" strike="noStrike" kern="1200" cap="none" spc="0" normalizeH="0" baseline="0" noProof="0" dirty="0">
+              <a:ln>
+                <a:noFill/>
+              </a:ln>
+              <a:solidFill>
+                <a:srgbClr val="FFFFFF"/>
+              </a:solidFill>
+              <a:effectLst/>
+              <a:uLnTx/>
+              <a:uFillTx/>
+              <a:latin typeface="Calibri"/>
+              <a:ea typeface="+mn-ea"/>
+              <a:cs typeface="+mn-cs"/>
+            </a:endParaRPr>
+          </a:p>
+        </p:txBody>
+      </p:sp>
+      <p:sp>
+        <p:nvSpPr>
+          <p:cNvPr id="20" name="Flowchart: Document 19">
+            <a:extLst>
+              <a:ext uri="{FF2B5EF4-FFF2-40B4-BE49-F238E27FC236}">
+                <a16:creationId xmlns:a16="http://schemas.microsoft.com/office/drawing/2014/main" id="{E8D155CF-279C-4302-9DE1-8F6B8DB4D1F4}"/>
+              </a:ext>
+            </a:extLst>
+          </p:cNvPr>
+          <p:cNvSpPr/>
+          <p:nvPr/>
+        </p:nvSpPr>
+        <p:spPr>
+          <a:xfrm>
+            <a:off x="2518233" y="1760222"/>
+            <a:ext cx="1333416" cy="884321"/>
+          </a:xfrm>
+          <a:prstGeom prst="flowChartDocument">
+            <a:avLst/>
+          </a:prstGeom>
+          <a:solidFill>
+            <a:schemeClr val="accent1"/>
+          </a:solidFill>
+          <a:ln w="19050">
+            <a:solidFill>
+              <a:schemeClr val="tx1"/>
+            </a:solidFill>
+          </a:ln>
+        </p:spPr>
+        <p:style>
+          <a:lnRef idx="2">
+            <a:schemeClr val="accent1">
+              <a:shade val="50000"/>
+            </a:schemeClr>
+          </a:lnRef>
+          <a:fillRef idx="1">
+            <a:schemeClr val="accent1"/>
+          </a:fillRef>
+          <a:effectRef idx="0">
+            <a:schemeClr val="accent1"/>
+          </a:effectRef>
+          <a:fontRef idx="minor">
+            <a:schemeClr val="lt1"/>
+          </a:fontRef>
+        </p:style>
+        <p:txBody>
+          <a:bodyPr rtlCol="0" anchor="ctr"/>
+          <a:lstStyle/>
+          <a:p>
+            <a:pPr marL="0" marR="0" lvl="0" indent="0" algn="ctr" defTabSz="914400" rtl="0" eaLnBrk="0" fontAlgn="base" latinLnBrk="0" hangingPunct="0">
+              <a:lnSpc>
+                <a:spcPct val="100000"/>
+              </a:lnSpc>
+              <a:spcBef>
+                <a:spcPct val="0"/>
+              </a:spcBef>
+              <a:spcAft>
+                <a:spcPct val="0"/>
+              </a:spcAft>
+              <a:buClrTx/>
+              <a:buSzTx/>
+              <a:buFontTx/>
+              <a:buNone/>
+              <a:tabLst/>
+              <a:defRPr/>
+            </a:pPr>
+            <a:r>
+              <a:rPr kumimoji="0" lang="en-US" sz="1200" b="0" i="0" u="none" strike="noStrike" kern="1200" cap="none" spc="0" normalizeH="0" baseline="0" noProof="0" dirty="0">
+                <a:ln>
+                  <a:noFill/>
+                </a:ln>
+                <a:solidFill>
+                  <a:srgbClr val="FFFFFF"/>
+                </a:solidFill>
+                <a:effectLst/>
+                <a:uLnTx/>
+                <a:uFillTx/>
+                <a:latin typeface="Calibri"/>
+                <a:ea typeface="+mn-ea"/>
+                <a:cs typeface="+mn-cs"/>
+              </a:rPr>
+              <a:t>Board Support Pack (BSP)</a:t>
+            </a:r>
+            <a:br>
+              <a:rPr kumimoji="0" lang="en-US" sz="1200" b="0" i="0" u="none" strike="noStrike" kern="1200" cap="none" spc="0" normalizeH="0" baseline="0" noProof="0" dirty="0">
+                <a:ln>
+                  <a:noFill/>
+                </a:ln>
+                <a:solidFill>
+                  <a:srgbClr val="FFFFFF"/>
+                </a:solidFill>
+                <a:effectLst/>
+                <a:uLnTx/>
+                <a:uFillTx/>
+                <a:latin typeface="Calibri"/>
+                <a:ea typeface="+mn-ea"/>
+                <a:cs typeface="+mn-cs"/>
+              </a:rPr>
+            </a:br>
+            <a:r>
+              <a:rPr kumimoji="0" lang="en-US" sz="1000" b="0" i="0" u="none" strike="noStrike" kern="1200" cap="none" spc="0" normalizeH="0" baseline="0" noProof="0" dirty="0">
+                <a:ln>
+                  <a:noFill/>
+                </a:ln>
+                <a:solidFill>
+                  <a:srgbClr val="FFFFFF"/>
+                </a:solidFill>
+                <a:effectLst/>
+                <a:uLnTx/>
+                <a:uFillTx/>
+                <a:latin typeface="Calibri"/>
+                <a:ea typeface="+mn-ea"/>
+                <a:cs typeface="+mn-cs"/>
+              </a:rPr>
+              <a:t>Defines board</a:t>
+            </a:r>
+            <a:br>
+              <a:rPr kumimoji="0" lang="en-US" sz="1000" b="0" i="0" u="none" strike="noStrike" kern="1200" cap="none" spc="0" normalizeH="0" baseline="0" noProof="0" dirty="0">
+                <a:ln>
+                  <a:noFill/>
+                </a:ln>
+                <a:solidFill>
+                  <a:srgbClr val="FFFFFF"/>
+                </a:solidFill>
+                <a:effectLst/>
+                <a:uLnTx/>
+                <a:uFillTx/>
+                <a:latin typeface="Calibri"/>
+                <a:ea typeface="+mn-ea"/>
+                <a:cs typeface="+mn-cs"/>
+              </a:rPr>
+            </a:br>
+            <a:r>
+              <a:rPr kumimoji="0" lang="en-US" sz="1000" b="0" i="0" u="none" strike="noStrike" kern="1200" cap="none" spc="0" normalizeH="0" baseline="0" noProof="0" dirty="0">
+                <a:ln>
+                  <a:noFill/>
+                </a:ln>
+                <a:solidFill>
+                  <a:srgbClr val="FFFFFF"/>
+                </a:solidFill>
+                <a:effectLst/>
+                <a:uLnTx/>
+                <a:uFillTx/>
+                <a:latin typeface="Calibri"/>
+                <a:ea typeface="+mn-ea"/>
+                <a:cs typeface="+mn-cs"/>
+              </a:rPr>
+              <a:t>properties</a:t>
+            </a:r>
+            <a:endParaRPr kumimoji="0" lang="en-GB" sz="1000" b="0" i="0" u="none" strike="noStrike" kern="1200" cap="none" spc="0" normalizeH="0" baseline="0" noProof="0" dirty="0">
+              <a:ln>
+                <a:noFill/>
+              </a:ln>
+              <a:solidFill>
+                <a:srgbClr val="FFFFFF"/>
+              </a:solidFill>
+              <a:effectLst/>
+              <a:uLnTx/>
+              <a:uFillTx/>
+              <a:latin typeface="Calibri"/>
+              <a:ea typeface="+mn-ea"/>
+              <a:cs typeface="+mn-cs"/>
+            </a:endParaRPr>
+          </a:p>
+        </p:txBody>
+      </p:sp>
+      <p:sp>
+        <p:nvSpPr>
+          <p:cNvPr id="23" name="Rectangle 22">
+            <a:extLst>
+              <a:ext uri="{FF2B5EF4-FFF2-40B4-BE49-F238E27FC236}">
+                <a16:creationId xmlns:a16="http://schemas.microsoft.com/office/drawing/2014/main" id="{8119DA75-D395-4806-9923-A60C1658B62A}"/>
+              </a:ext>
+            </a:extLst>
+          </p:cNvPr>
+          <p:cNvSpPr/>
+          <p:nvPr/>
+        </p:nvSpPr>
+        <p:spPr>
+          <a:xfrm>
+            <a:off x="7230982" y="2695071"/>
+            <a:ext cx="1540042" cy="1022685"/>
+          </a:xfrm>
+          <a:prstGeom prst="rect">
+            <a:avLst/>
+          </a:prstGeom>
+          <a:solidFill>
+            <a:srgbClr val="92D050"/>
+          </a:solidFill>
+          <a:ln>
+            <a:solidFill>
+              <a:schemeClr val="accent4">
+                <a:lumMod val="75000"/>
+              </a:schemeClr>
+            </a:solidFill>
+          </a:ln>
+        </p:spPr>
+        <p:style>
+          <a:lnRef idx="2">
+            <a:schemeClr val="accent1">
+              <a:shade val="50000"/>
+            </a:schemeClr>
+          </a:lnRef>
+          <a:fillRef idx="1">
+            <a:schemeClr val="accent1"/>
+          </a:fillRef>
+          <a:effectRef idx="0">
+            <a:schemeClr val="accent1"/>
+          </a:effectRef>
+          <a:fontRef idx="minor">
+            <a:schemeClr val="lt1"/>
+          </a:fontRef>
+        </p:style>
+        <p:txBody>
+          <a:bodyPr rtlCol="0" anchor="ctr"/>
+          <a:lstStyle/>
+          <a:p>
+            <a:pPr marL="0" marR="0" lvl="0" indent="0" algn="ctr" defTabSz="914400" rtl="0" eaLnBrk="0" fontAlgn="base" latinLnBrk="0" hangingPunct="0">
+              <a:lnSpc>
+                <a:spcPct val="100000"/>
+              </a:lnSpc>
+              <a:spcBef>
+                <a:spcPct val="0"/>
+              </a:spcBef>
+              <a:spcAft>
+                <a:spcPct val="0"/>
+              </a:spcAft>
+              <a:buClrTx/>
+              <a:buSzTx/>
+              <a:buFontTx/>
+              <a:buNone/>
+              <a:tabLst/>
+              <a:defRPr/>
+            </a:pPr>
+            <a:r>
+              <a:rPr lang="en-US" dirty="0">
+                <a:solidFill>
+                  <a:srgbClr val="FFFFFF"/>
+                </a:solidFill>
+                <a:latin typeface="Calibri"/>
+              </a:rPr>
+              <a:t>c</a:t>
+            </a:r>
+            <a:r>
+              <a:rPr kumimoji="0" lang="en-US" sz="1800" b="0" i="0" u="none" strike="noStrike" kern="1200" cap="none" spc="0" normalizeH="0" baseline="0" noProof="0" dirty="0">
+                <a:ln>
+                  <a:noFill/>
+                </a:ln>
+                <a:solidFill>
+                  <a:srgbClr val="FFFFFF"/>
+                </a:solidFill>
+                <a:effectLst/>
+                <a:uLnTx/>
+                <a:uFillTx/>
+                <a:latin typeface="Calibri"/>
+                <a:ea typeface="+mn-ea"/>
+                <a:cs typeface="+mn-cs"/>
+              </a:rPr>
+              <a:t>solution</a:t>
+            </a:r>
+            <a:br>
+              <a:rPr kumimoji="0" lang="en-US" sz="1800" b="0" i="0" u="none" strike="noStrike" kern="1200" cap="none" spc="0" normalizeH="0" baseline="0" noProof="0" dirty="0">
+                <a:ln>
+                  <a:noFill/>
+                </a:ln>
+                <a:solidFill>
+                  <a:srgbClr val="FFFFFF"/>
+                </a:solidFill>
+                <a:effectLst/>
+                <a:uLnTx/>
+                <a:uFillTx/>
+                <a:latin typeface="Calibri"/>
+                <a:ea typeface="+mn-ea"/>
+                <a:cs typeface="+mn-cs"/>
+              </a:rPr>
+            </a:br>
+            <a:r>
+              <a:rPr kumimoji="0" lang="en-US" sz="1800" b="0" i="0" u="none" strike="noStrike" kern="1200" cap="none" spc="0" normalizeH="0" baseline="0" noProof="0" dirty="0">
+                <a:ln>
+                  <a:noFill/>
+                </a:ln>
+                <a:solidFill>
+                  <a:srgbClr val="FFFFFF"/>
+                </a:solidFill>
+                <a:effectLst/>
+                <a:uLnTx/>
+                <a:uFillTx/>
+                <a:latin typeface="Calibri"/>
+                <a:ea typeface="+mn-ea"/>
+                <a:cs typeface="+mn-cs"/>
+              </a:rPr>
+              <a:t>CLI tool</a:t>
+            </a:r>
+            <a:endParaRPr kumimoji="0" lang="en-GB" sz="1800" b="0" i="0" u="none" strike="noStrike" kern="1200" cap="none" spc="0" normalizeH="0" baseline="0" noProof="0" dirty="0">
+              <a:ln>
+                <a:noFill/>
+              </a:ln>
+              <a:solidFill>
+                <a:srgbClr val="FFFFFF"/>
+              </a:solidFill>
+              <a:effectLst/>
+              <a:uLnTx/>
+              <a:uFillTx/>
+              <a:latin typeface="Calibri"/>
+              <a:ea typeface="+mn-ea"/>
+              <a:cs typeface="+mn-cs"/>
+            </a:endParaRPr>
+          </a:p>
+        </p:txBody>
+      </p:sp>
+      <p:sp>
+        <p:nvSpPr>
+          <p:cNvPr id="24" name="Flowchart: Multidocument 23">
+            <a:extLst>
+              <a:ext uri="{FF2B5EF4-FFF2-40B4-BE49-F238E27FC236}">
+                <a16:creationId xmlns:a16="http://schemas.microsoft.com/office/drawing/2014/main" id="{AC417908-17B4-4FD1-8070-B598BF19F8CD}"/>
+              </a:ext>
+            </a:extLst>
+          </p:cNvPr>
+          <p:cNvSpPr/>
+          <p:nvPr/>
+        </p:nvSpPr>
+        <p:spPr>
+          <a:xfrm>
+            <a:off x="9468194" y="1216209"/>
+            <a:ext cx="1449805" cy="1010653"/>
+          </a:xfrm>
+          <a:prstGeom prst="flowChartMultidocument">
+            <a:avLst/>
+          </a:prstGeom>
+          <a:solidFill>
+            <a:schemeClr val="bg1">
+              <a:lumMod val="95000"/>
+            </a:schemeClr>
+          </a:solidFill>
+          <a:ln w="19050">
+            <a:solidFill>
+              <a:schemeClr val="accent5">
+                <a:lumMod val="50000"/>
+              </a:schemeClr>
+            </a:solidFill>
+          </a:ln>
+        </p:spPr>
+        <p:style>
+          <a:lnRef idx="2">
+            <a:schemeClr val="accent1">
+              <a:shade val="50000"/>
+            </a:schemeClr>
+          </a:lnRef>
+          <a:fillRef idx="1">
+            <a:schemeClr val="accent1"/>
+          </a:fillRef>
+          <a:effectRef idx="0">
+            <a:schemeClr val="accent1"/>
+          </a:effectRef>
+          <a:fontRef idx="minor">
+            <a:schemeClr val="lt1"/>
+          </a:fontRef>
+        </p:style>
+        <p:txBody>
+          <a:bodyPr rtlCol="0" anchor="ctr"/>
+          <a:lstStyle/>
+          <a:p>
+            <a:pPr marL="0" marR="0" lvl="0" indent="0" algn="ctr" defTabSz="914400" rtl="0" eaLnBrk="0" fontAlgn="base" latinLnBrk="0" hangingPunct="0">
+              <a:lnSpc>
+                <a:spcPct val="100000"/>
+              </a:lnSpc>
+              <a:spcBef>
+                <a:spcPct val="0"/>
+              </a:spcBef>
+              <a:spcAft>
+                <a:spcPct val="0"/>
+              </a:spcAft>
+              <a:buClrTx/>
+              <a:buSzTx/>
+              <a:buFontTx/>
+              <a:buNone/>
+              <a:tabLst/>
+              <a:defRPr/>
+            </a:pPr>
+            <a:r>
+              <a:rPr kumimoji="0" lang="en-US" sz="1200" b="0" i="0" u="none" strike="noStrike" kern="1200" cap="none" spc="0" normalizeH="0" baseline="0" noProof="0" dirty="0">
+                <a:ln>
+                  <a:noFill/>
+                </a:ln>
+                <a:solidFill>
+                  <a:schemeClr val="bg2">
+                    <a:lumMod val="25000"/>
+                  </a:schemeClr>
+                </a:solidFill>
+                <a:effectLst/>
+                <a:uLnTx/>
+                <a:uFillTx/>
+                <a:latin typeface="Calibri"/>
+                <a:ea typeface="+mn-ea"/>
+                <a:cs typeface="+mn-cs"/>
+              </a:rPr>
+              <a:t>Project Build Files *.</a:t>
+            </a:r>
+            <a:r>
+              <a:rPr kumimoji="0" lang="en-US" sz="1200" b="0" i="0" u="none" strike="noStrike" kern="1200" cap="none" spc="0" normalizeH="0" baseline="0" noProof="0" dirty="0" err="1">
+                <a:ln>
+                  <a:noFill/>
+                </a:ln>
+                <a:solidFill>
+                  <a:schemeClr val="bg2">
+                    <a:lumMod val="25000"/>
+                  </a:schemeClr>
+                </a:solidFill>
+                <a:effectLst/>
+                <a:uLnTx/>
+                <a:uFillTx/>
+                <a:latin typeface="Calibri"/>
+                <a:ea typeface="+mn-ea"/>
+                <a:cs typeface="+mn-cs"/>
+              </a:rPr>
+              <a:t>cprj</a:t>
+            </a:r>
+            <a:br>
+              <a:rPr kumimoji="0" lang="en-US" sz="1200" b="0" i="0" u="none" strike="noStrike" kern="1200" cap="none" spc="0" normalizeH="0" baseline="0" noProof="0" dirty="0">
+                <a:ln>
+                  <a:noFill/>
+                </a:ln>
+                <a:solidFill>
+                  <a:schemeClr val="bg2">
+                    <a:lumMod val="25000"/>
+                  </a:schemeClr>
+                </a:solidFill>
+                <a:effectLst/>
+                <a:uLnTx/>
+                <a:uFillTx/>
+                <a:latin typeface="Calibri"/>
+                <a:ea typeface="+mn-ea"/>
+                <a:cs typeface="+mn-cs"/>
+              </a:rPr>
+            </a:br>
+            <a:r>
+              <a:rPr kumimoji="0" lang="en-US" sz="1000" b="0" i="0" u="none" strike="noStrike" kern="1200" cap="none" spc="0" normalizeH="0" baseline="0" noProof="0" dirty="0">
+                <a:ln>
+                  <a:noFill/>
+                </a:ln>
+                <a:solidFill>
+                  <a:schemeClr val="bg2">
+                    <a:lumMod val="25000"/>
+                  </a:schemeClr>
+                </a:solidFill>
+                <a:effectLst/>
+                <a:uLnTx/>
+                <a:uFillTx/>
+                <a:latin typeface="Calibri"/>
+                <a:ea typeface="+mn-ea"/>
+                <a:cs typeface="+mn-cs"/>
+              </a:rPr>
+              <a:t>for CMSIS-Build</a:t>
+            </a:r>
+            <a:endParaRPr kumimoji="0" lang="en-GB" sz="1000" b="0" i="0" u="none" strike="noStrike" kern="1200" cap="none" spc="0" normalizeH="0" baseline="0" noProof="0" dirty="0">
+              <a:ln>
+                <a:noFill/>
+              </a:ln>
+              <a:solidFill>
+                <a:schemeClr val="bg2">
+                  <a:lumMod val="25000"/>
+                </a:schemeClr>
+              </a:solidFill>
+              <a:effectLst/>
+              <a:uLnTx/>
+              <a:uFillTx/>
+              <a:latin typeface="Calibri"/>
+              <a:ea typeface="+mn-ea"/>
+              <a:cs typeface="+mn-cs"/>
+            </a:endParaRPr>
+          </a:p>
+        </p:txBody>
+      </p:sp>
+      <p:sp>
+        <p:nvSpPr>
+          <p:cNvPr id="32" name="Arrow: Right 31">
+            <a:extLst>
+              <a:ext uri="{FF2B5EF4-FFF2-40B4-BE49-F238E27FC236}">
+                <a16:creationId xmlns:a16="http://schemas.microsoft.com/office/drawing/2014/main" id="{8DCE06D2-5B11-472B-8D45-3B327EA1669E}"/>
+              </a:ext>
+            </a:extLst>
+          </p:cNvPr>
+          <p:cNvSpPr/>
+          <p:nvPr/>
+        </p:nvSpPr>
+        <p:spPr>
+          <a:xfrm>
+            <a:off x="6625392" y="2805360"/>
+            <a:ext cx="605587" cy="204537"/>
+          </a:xfrm>
+          <a:prstGeom prst="rightArrow">
+            <a:avLst/>
+          </a:prstGeom>
+          <a:solidFill>
+            <a:schemeClr val="accent1"/>
+          </a:solidFill>
+          <a:ln>
+            <a:noFill/>
+          </a:ln>
+        </p:spPr>
+        <p:style>
+          <a:lnRef idx="2">
+            <a:schemeClr val="accent1">
+              <a:shade val="50000"/>
+            </a:schemeClr>
+          </a:lnRef>
+          <a:fillRef idx="1">
+            <a:schemeClr val="accent1"/>
+          </a:fillRef>
+          <a:effectRef idx="0">
+            <a:schemeClr val="accent1"/>
+          </a:effectRef>
+          <a:fontRef idx="minor">
+            <a:schemeClr val="lt1"/>
+          </a:fontRef>
+        </p:style>
+        <p:txBody>
+          <a:bodyPr rtlCol="0" anchor="ctr"/>
+          <a:lstStyle/>
+          <a:p>
+            <a:pPr marL="0" marR="0" lvl="0" indent="0" algn="ctr" defTabSz="914400" rtl="0" eaLnBrk="0" fontAlgn="base" latinLnBrk="0" hangingPunct="0">
+              <a:lnSpc>
+                <a:spcPct val="100000"/>
+              </a:lnSpc>
+              <a:spcBef>
+                <a:spcPct val="0"/>
+              </a:spcBef>
+              <a:spcAft>
+                <a:spcPct val="0"/>
+              </a:spcAft>
+              <a:buClrTx/>
+              <a:buSzTx/>
+              <a:buFontTx/>
+              <a:buNone/>
+              <a:tabLst/>
+              <a:defRPr/>
+            </a:pPr>
+            <a:endParaRPr kumimoji="0" lang="en-GB" sz="1800" b="0" i="0" u="none" strike="noStrike" kern="1200" cap="none" spc="0" normalizeH="0" baseline="0" noProof="0">
+              <a:ln>
+                <a:noFill/>
+              </a:ln>
+              <a:solidFill>
+                <a:srgbClr val="FFFFFF"/>
+              </a:solidFill>
+              <a:effectLst/>
+              <a:uLnTx/>
+              <a:uFillTx/>
+              <a:latin typeface="Calibri"/>
+              <a:ea typeface="+mn-ea"/>
+              <a:cs typeface="+mn-cs"/>
+            </a:endParaRPr>
+          </a:p>
+        </p:txBody>
+      </p:sp>
+      <p:cxnSp>
+        <p:nvCxnSpPr>
+          <p:cNvPr id="41" name="Straight Arrow Connector 40">
+            <a:extLst>
+              <a:ext uri="{FF2B5EF4-FFF2-40B4-BE49-F238E27FC236}">
+                <a16:creationId xmlns:a16="http://schemas.microsoft.com/office/drawing/2014/main" id="{096E6527-5486-468E-A7EE-221C5DA1818D}"/>
+              </a:ext>
+            </a:extLst>
+          </p:cNvPr>
+          <p:cNvCxnSpPr>
+            <a:cxnSpLocks/>
+          </p:cNvCxnSpPr>
+          <p:nvPr/>
+        </p:nvCxnSpPr>
+        <p:spPr>
+          <a:xfrm>
+            <a:off x="5722046" y="953351"/>
+            <a:ext cx="0" cy="276726"/>
+          </a:xfrm>
+          <a:prstGeom prst="straightConnector1">
+            <a:avLst/>
+          </a:prstGeom>
+          <a:ln w="38100">
+            <a:tailEnd type="triangle"/>
+          </a:ln>
+        </p:spPr>
+        <p:style>
+          <a:lnRef idx="1">
+            <a:schemeClr val="accent1"/>
+          </a:lnRef>
+          <a:fillRef idx="0">
+            <a:schemeClr val="accent1"/>
+          </a:fillRef>
+          <a:effectRef idx="0">
+            <a:schemeClr val="accent1"/>
+          </a:effectRef>
+          <a:fontRef idx="minor">
+            <a:schemeClr val="tx1"/>
+          </a:fontRef>
+        </p:style>
+      </p:cxnSp>
+      <p:sp>
+        <p:nvSpPr>
+          <p:cNvPr id="40" name="Flowchart: Document 39">
+            <a:extLst>
+              <a:ext uri="{FF2B5EF4-FFF2-40B4-BE49-F238E27FC236}">
+                <a16:creationId xmlns:a16="http://schemas.microsoft.com/office/drawing/2014/main" id="{45A8C818-51F2-492B-AD63-90062B0A3BE8}"/>
+              </a:ext>
+            </a:extLst>
+          </p:cNvPr>
+          <p:cNvSpPr/>
+          <p:nvPr/>
+        </p:nvSpPr>
+        <p:spPr>
+          <a:xfrm>
+            <a:off x="2519492" y="733727"/>
+            <a:ext cx="1333416" cy="884321"/>
+          </a:xfrm>
+          <a:prstGeom prst="flowChartDocument">
+            <a:avLst/>
+          </a:prstGeom>
+          <a:solidFill>
+            <a:schemeClr val="accent1"/>
+          </a:solidFill>
+          <a:ln w="19050">
+            <a:solidFill>
+              <a:schemeClr val="tx1"/>
+            </a:solidFill>
+          </a:ln>
+        </p:spPr>
+        <p:style>
+          <a:lnRef idx="2">
+            <a:schemeClr val="accent1">
+              <a:shade val="50000"/>
+            </a:schemeClr>
+          </a:lnRef>
+          <a:fillRef idx="1">
+            <a:schemeClr val="accent1"/>
+          </a:fillRef>
+          <a:effectRef idx="0">
+            <a:schemeClr val="accent1"/>
+          </a:effectRef>
+          <a:fontRef idx="minor">
+            <a:schemeClr val="lt1"/>
+          </a:fontRef>
+        </p:style>
+        <p:txBody>
+          <a:bodyPr rtlCol="0" anchor="ctr"/>
+          <a:lstStyle/>
+          <a:p>
+            <a:pPr marL="0" marR="0" lvl="0" indent="0" algn="ctr" defTabSz="914400" rtl="0" eaLnBrk="0" fontAlgn="base" latinLnBrk="0" hangingPunct="0">
+              <a:lnSpc>
+                <a:spcPct val="100000"/>
+              </a:lnSpc>
+              <a:spcBef>
+                <a:spcPct val="0"/>
+              </a:spcBef>
+              <a:spcAft>
+                <a:spcPct val="0"/>
+              </a:spcAft>
+              <a:buClrTx/>
+              <a:buSzTx/>
+              <a:buFontTx/>
+              <a:buNone/>
+              <a:tabLst/>
+              <a:defRPr/>
+            </a:pPr>
+            <a:r>
+              <a:rPr kumimoji="0" lang="en-US" sz="1200" b="0" i="0" u="none" strike="noStrike" kern="1200" cap="none" spc="0" normalizeH="0" baseline="0" noProof="0" dirty="0">
+                <a:ln>
+                  <a:noFill/>
+                </a:ln>
+                <a:solidFill>
+                  <a:srgbClr val="FFFFFF"/>
+                </a:solidFill>
+                <a:effectLst/>
+                <a:uLnTx/>
+                <a:uFillTx/>
+                <a:latin typeface="Calibri"/>
+                <a:ea typeface="+mn-ea"/>
+                <a:cs typeface="+mn-cs"/>
+              </a:rPr>
+              <a:t>Generic </a:t>
+            </a:r>
+            <a:br>
+              <a:rPr kumimoji="0" lang="en-US" sz="1200" b="0" i="0" u="none" strike="noStrike" kern="1200" cap="none" spc="0" normalizeH="0" baseline="0" noProof="0" dirty="0">
+                <a:ln>
+                  <a:noFill/>
+                </a:ln>
+                <a:solidFill>
+                  <a:srgbClr val="FFFFFF"/>
+                </a:solidFill>
+                <a:effectLst/>
+                <a:uLnTx/>
+                <a:uFillTx/>
+                <a:latin typeface="Calibri"/>
+                <a:ea typeface="+mn-ea"/>
+                <a:cs typeface="+mn-cs"/>
+              </a:rPr>
+            </a:br>
+            <a:r>
+              <a:rPr kumimoji="0" lang="en-US" sz="1200" b="0" i="0" u="none" strike="noStrike" kern="1200" cap="none" spc="0" normalizeH="0" baseline="0" noProof="0" dirty="0">
+                <a:ln>
+                  <a:noFill/>
+                </a:ln>
+                <a:solidFill>
+                  <a:srgbClr val="FFFFFF"/>
+                </a:solidFill>
+                <a:effectLst/>
+                <a:uLnTx/>
+                <a:uFillTx/>
+                <a:latin typeface="Calibri"/>
+                <a:ea typeface="+mn-ea"/>
+                <a:cs typeface="+mn-cs"/>
+              </a:rPr>
+              <a:t>Software Packs</a:t>
+            </a:r>
+            <a:br>
+              <a:rPr kumimoji="0" lang="en-US" sz="1200" b="0" i="0" u="none" strike="noStrike" kern="1200" cap="none" spc="0" normalizeH="0" baseline="0" noProof="0" dirty="0">
+                <a:ln>
+                  <a:noFill/>
+                </a:ln>
+                <a:solidFill>
+                  <a:srgbClr val="FFFFFF"/>
+                </a:solidFill>
+                <a:effectLst/>
+                <a:uLnTx/>
+                <a:uFillTx/>
+                <a:latin typeface="Calibri"/>
+                <a:ea typeface="+mn-ea"/>
+                <a:cs typeface="+mn-cs"/>
+              </a:rPr>
+            </a:br>
+            <a:r>
+              <a:rPr kumimoji="0" lang="en-US" sz="1000" b="0" i="0" u="none" strike="noStrike" kern="1200" cap="none" spc="0" normalizeH="0" baseline="0" noProof="0" dirty="0">
+                <a:ln>
+                  <a:noFill/>
+                </a:ln>
+                <a:solidFill>
+                  <a:srgbClr val="FFFFFF"/>
+                </a:solidFill>
+                <a:effectLst/>
+                <a:uLnTx/>
+                <a:uFillTx/>
+                <a:latin typeface="Calibri"/>
+                <a:ea typeface="+mn-ea"/>
+                <a:cs typeface="+mn-cs"/>
+              </a:rPr>
+              <a:t>with drivers,</a:t>
+            </a:r>
+            <a:r>
+              <a:rPr kumimoji="0" lang="en-US" sz="1200" b="0" i="0" u="none" strike="noStrike" kern="1200" cap="none" spc="0" normalizeH="0" baseline="0" noProof="0" dirty="0">
+                <a:ln>
+                  <a:noFill/>
+                </a:ln>
+                <a:solidFill>
+                  <a:srgbClr val="FFFFFF"/>
+                </a:solidFill>
+                <a:effectLst/>
+                <a:uLnTx/>
+                <a:uFillTx/>
+                <a:latin typeface="Calibri"/>
+                <a:ea typeface="+mn-ea"/>
+                <a:cs typeface="+mn-cs"/>
+              </a:rPr>
+              <a:t> m</a:t>
+            </a:r>
+            <a:r>
+              <a:rPr lang="en-US" sz="1100" dirty="0" err="1">
+                <a:solidFill>
+                  <a:srgbClr val="FFFFFF"/>
+                </a:solidFill>
+                <a:latin typeface="Calibri"/>
+              </a:rPr>
+              <a:t>iddleware</a:t>
+            </a:r>
+            <a:r>
+              <a:rPr lang="en-US" sz="1100" dirty="0">
+                <a:solidFill>
+                  <a:srgbClr val="FFFFFF"/>
+                </a:solidFill>
+                <a:latin typeface="Calibri"/>
+              </a:rPr>
+              <a:t>, etc.</a:t>
+            </a:r>
+          </a:p>
+        </p:txBody>
+      </p:sp>
+      <p:sp>
+        <p:nvSpPr>
+          <p:cNvPr id="28" name="Flowchart: Multidocument 27">
+            <a:extLst>
+              <a:ext uri="{FF2B5EF4-FFF2-40B4-BE49-F238E27FC236}">
+                <a16:creationId xmlns:a16="http://schemas.microsoft.com/office/drawing/2014/main" id="{F0174EA1-F6A6-4697-8C2A-616FAACBE88C}"/>
+              </a:ext>
+            </a:extLst>
+          </p:cNvPr>
+          <p:cNvSpPr/>
+          <p:nvPr/>
+        </p:nvSpPr>
+        <p:spPr>
+          <a:xfrm>
+            <a:off x="9507279" y="2608796"/>
+            <a:ext cx="1449805" cy="1010653"/>
+          </a:xfrm>
+          <a:prstGeom prst="flowChartMultidocument">
+            <a:avLst/>
+          </a:prstGeom>
+          <a:solidFill>
+            <a:schemeClr val="bg1">
+              <a:lumMod val="95000"/>
+            </a:schemeClr>
+          </a:solidFill>
+          <a:ln w="19050">
+            <a:solidFill>
+              <a:schemeClr val="accent5">
+                <a:lumMod val="50000"/>
+              </a:schemeClr>
+            </a:solidFill>
+          </a:ln>
+        </p:spPr>
+        <p:style>
+          <a:lnRef idx="2">
+            <a:schemeClr val="accent1">
+              <a:shade val="50000"/>
+            </a:schemeClr>
+          </a:lnRef>
+          <a:fillRef idx="1">
+            <a:schemeClr val="accent1"/>
+          </a:fillRef>
+          <a:effectRef idx="0">
+            <a:schemeClr val="accent1"/>
+          </a:effectRef>
+          <a:fontRef idx="minor">
+            <a:schemeClr val="lt1"/>
+          </a:fontRef>
+        </p:style>
+        <p:txBody>
+          <a:bodyPr rtlCol="0" anchor="ctr"/>
+          <a:lstStyle/>
+          <a:p>
+            <a:pPr marL="0" marR="0" lvl="0" indent="0" algn="ctr" defTabSz="914400" rtl="0" eaLnBrk="0" fontAlgn="base" latinLnBrk="0" hangingPunct="0">
+              <a:lnSpc>
+                <a:spcPct val="100000"/>
+              </a:lnSpc>
+              <a:spcBef>
+                <a:spcPct val="0"/>
+              </a:spcBef>
+              <a:spcAft>
+                <a:spcPct val="0"/>
+              </a:spcAft>
+              <a:buClrTx/>
+              <a:buSzTx/>
+              <a:buFontTx/>
+              <a:buNone/>
+              <a:tabLst/>
+              <a:defRPr/>
+            </a:pPr>
+            <a:r>
+              <a:rPr kumimoji="0" lang="en-US" sz="1200" b="0" i="0" u="none" strike="noStrike" kern="1200" cap="none" spc="0" normalizeH="0" baseline="0" noProof="0" dirty="0">
+                <a:ln>
+                  <a:noFill/>
+                </a:ln>
+                <a:solidFill>
+                  <a:schemeClr val="bg2">
+                    <a:lumMod val="25000"/>
+                  </a:schemeClr>
+                </a:solidFill>
+                <a:effectLst/>
+                <a:uLnTx/>
+                <a:uFillTx/>
+                <a:latin typeface="Calibri"/>
+                <a:ea typeface="+mn-ea"/>
+                <a:cs typeface="+mn-cs"/>
+              </a:rPr>
+              <a:t>Project Resource Files *.</a:t>
+            </a:r>
+            <a:r>
+              <a:rPr kumimoji="0" lang="en-US" sz="1200" b="0" i="0" u="none" strike="noStrike" kern="1200" cap="none" spc="0" normalizeH="0" baseline="0" noProof="0" dirty="0" err="1">
+                <a:ln>
+                  <a:noFill/>
+                </a:ln>
+                <a:solidFill>
+                  <a:schemeClr val="bg2">
+                    <a:lumMod val="25000"/>
+                  </a:schemeClr>
+                </a:solidFill>
+                <a:effectLst/>
+                <a:uLnTx/>
+                <a:uFillTx/>
+                <a:latin typeface="Calibri"/>
+                <a:ea typeface="+mn-ea"/>
+                <a:cs typeface="+mn-cs"/>
+              </a:rPr>
+              <a:t>fzone</a:t>
+            </a:r>
+            <a:br>
+              <a:rPr kumimoji="0" lang="en-US" sz="1000" b="0" i="0" u="none" strike="noStrike" kern="1200" cap="none" spc="0" normalizeH="0" baseline="0" noProof="0" dirty="0">
+                <a:ln>
+                  <a:noFill/>
+                </a:ln>
+                <a:solidFill>
+                  <a:schemeClr val="bg2">
+                    <a:lumMod val="25000"/>
+                  </a:schemeClr>
+                </a:solidFill>
+                <a:effectLst/>
+                <a:uLnTx/>
+                <a:uFillTx/>
+                <a:latin typeface="Calibri"/>
+                <a:ea typeface="+mn-ea"/>
+                <a:cs typeface="+mn-cs"/>
+              </a:rPr>
+            </a:br>
+            <a:r>
+              <a:rPr kumimoji="0" lang="en-US" sz="1000" b="0" i="0" u="none" strike="noStrike" kern="1200" cap="none" spc="0" normalizeH="0" baseline="0" noProof="0" dirty="0">
+                <a:ln>
+                  <a:noFill/>
+                </a:ln>
+                <a:solidFill>
+                  <a:schemeClr val="bg2">
+                    <a:lumMod val="25000"/>
+                  </a:schemeClr>
+                </a:solidFill>
+                <a:effectLst/>
+                <a:uLnTx/>
+                <a:uFillTx/>
+                <a:latin typeface="Calibri"/>
+                <a:ea typeface="+mn-ea"/>
+                <a:cs typeface="+mn-cs"/>
+              </a:rPr>
+              <a:t>for template engines</a:t>
+            </a:r>
+            <a:endParaRPr kumimoji="0" lang="en-GB" sz="1000" b="0" i="0" u="none" strike="noStrike" kern="1200" cap="none" spc="0" normalizeH="0" baseline="0" noProof="0" dirty="0">
+              <a:ln>
+                <a:noFill/>
+              </a:ln>
+              <a:solidFill>
+                <a:schemeClr val="bg2">
+                  <a:lumMod val="25000"/>
+                </a:schemeClr>
+              </a:solidFill>
+              <a:effectLst/>
+              <a:uLnTx/>
+              <a:uFillTx/>
+              <a:latin typeface="Calibri"/>
+              <a:ea typeface="+mn-ea"/>
+              <a:cs typeface="+mn-cs"/>
+            </a:endParaRPr>
+          </a:p>
+        </p:txBody>
+      </p:sp>
+      <p:sp>
+        <p:nvSpPr>
+          <p:cNvPr id="31" name="Arrow: Right 30">
+            <a:extLst>
+              <a:ext uri="{FF2B5EF4-FFF2-40B4-BE49-F238E27FC236}">
+                <a16:creationId xmlns:a16="http://schemas.microsoft.com/office/drawing/2014/main" id="{1F9E4950-7682-4A97-95D2-18A9AEA2F368}"/>
+              </a:ext>
+            </a:extLst>
+          </p:cNvPr>
+          <p:cNvSpPr/>
+          <p:nvPr/>
+        </p:nvSpPr>
+        <p:spPr>
+          <a:xfrm>
+            <a:off x="8764993" y="3116160"/>
+            <a:ext cx="508607" cy="204537"/>
+          </a:xfrm>
+          <a:prstGeom prst="rightArrow">
+            <a:avLst/>
+          </a:prstGeom>
+          <a:solidFill>
+            <a:schemeClr val="accent1"/>
+          </a:solidFill>
+          <a:ln>
+            <a:noFill/>
+          </a:ln>
+        </p:spPr>
+        <p:style>
+          <a:lnRef idx="2">
+            <a:schemeClr val="accent1">
+              <a:shade val="50000"/>
+            </a:schemeClr>
+          </a:lnRef>
+          <a:fillRef idx="1">
+            <a:schemeClr val="accent1"/>
+          </a:fillRef>
+          <a:effectRef idx="0">
+            <a:schemeClr val="accent1"/>
+          </a:effectRef>
+          <a:fontRef idx="minor">
+            <a:schemeClr val="lt1"/>
+          </a:fontRef>
+        </p:style>
+        <p:txBody>
+          <a:bodyPr rtlCol="0" anchor="ctr"/>
+          <a:lstStyle/>
+          <a:p>
+            <a:pPr marL="0" marR="0" lvl="0" indent="0" algn="ctr" defTabSz="914400" rtl="0" eaLnBrk="0" fontAlgn="base" latinLnBrk="0" hangingPunct="0">
+              <a:lnSpc>
+                <a:spcPct val="100000"/>
+              </a:lnSpc>
+              <a:spcBef>
+                <a:spcPct val="0"/>
+              </a:spcBef>
+              <a:spcAft>
+                <a:spcPct val="0"/>
+              </a:spcAft>
+              <a:buClrTx/>
+              <a:buSzTx/>
+              <a:buFontTx/>
+              <a:buNone/>
+              <a:tabLst/>
+              <a:defRPr/>
+            </a:pPr>
+            <a:endParaRPr kumimoji="0" lang="en-GB" sz="1800" b="0" i="0" u="none" strike="noStrike" kern="1200" cap="none" spc="0" normalizeH="0" baseline="0" noProof="0">
+              <a:ln>
+                <a:noFill/>
+              </a:ln>
+              <a:solidFill>
+                <a:srgbClr val="FFFFFF"/>
+              </a:solidFill>
+              <a:effectLst/>
+              <a:uLnTx/>
+              <a:uFillTx/>
+              <a:latin typeface="Calibri"/>
+              <a:ea typeface="+mn-ea"/>
+              <a:cs typeface="+mn-cs"/>
+            </a:endParaRPr>
+          </a:p>
+        </p:txBody>
+      </p:sp>
+      <p:sp>
+        <p:nvSpPr>
+          <p:cNvPr id="2" name="Oval 1">
+            <a:extLst>
+              <a:ext uri="{FF2B5EF4-FFF2-40B4-BE49-F238E27FC236}">
+                <a16:creationId xmlns:a16="http://schemas.microsoft.com/office/drawing/2014/main" id="{5E657FDB-C487-44EF-8E7D-F8175C5B588B}"/>
+              </a:ext>
+            </a:extLst>
+          </p:cNvPr>
+          <p:cNvSpPr/>
+          <p:nvPr/>
+        </p:nvSpPr>
+        <p:spPr>
+          <a:xfrm>
+            <a:off x="4658702" y="94719"/>
+            <a:ext cx="360000" cy="360000"/>
+          </a:xfrm>
+          <a:prstGeom prst="ellipse">
+            <a:avLst/>
+          </a:prstGeom>
+          <a:solidFill>
+            <a:schemeClr val="accent1"/>
+          </a:solidFill>
+          <a:ln>
+            <a:noFill/>
+          </a:ln>
+        </p:spPr>
+        <p:style>
+          <a:lnRef idx="2">
+            <a:schemeClr val="accent1">
+              <a:shade val="50000"/>
+            </a:schemeClr>
+          </a:lnRef>
+          <a:fillRef idx="1">
+            <a:schemeClr val="accent1"/>
+          </a:fillRef>
+          <a:effectRef idx="0">
+            <a:schemeClr val="accent1"/>
+          </a:effectRef>
+          <a:fontRef idx="minor">
+            <a:schemeClr val="lt1"/>
+          </a:fontRef>
+        </p:style>
+        <p:txBody>
+          <a:bodyPr rtlCol="0" anchor="ctr"/>
+          <a:lstStyle/>
+          <a:p>
+            <a:pPr algn="ctr"/>
+            <a:r>
+              <a:rPr lang="en-US" dirty="0">
+                <a:latin typeface="Calibri" panose="020F0502020204030204" pitchFamily="34" charset="0"/>
+                <a:cs typeface="Calibri" panose="020F0502020204030204" pitchFamily="34" charset="0"/>
+              </a:rPr>
+              <a:t>1</a:t>
+            </a:r>
+            <a:endParaRPr lang="en-GB" dirty="0">
+              <a:latin typeface="Calibri" panose="020F0502020204030204" pitchFamily="34" charset="0"/>
+              <a:cs typeface="Calibri" panose="020F0502020204030204" pitchFamily="34" charset="0"/>
+            </a:endParaRPr>
+          </a:p>
+        </p:txBody>
+      </p:sp>
+      <p:sp>
+        <p:nvSpPr>
+          <p:cNvPr id="27" name="Oval 26">
+            <a:extLst>
+              <a:ext uri="{FF2B5EF4-FFF2-40B4-BE49-F238E27FC236}">
+                <a16:creationId xmlns:a16="http://schemas.microsoft.com/office/drawing/2014/main" id="{81407B11-6AFE-4D8A-B305-BE0AABD77969}"/>
+              </a:ext>
+            </a:extLst>
+          </p:cNvPr>
+          <p:cNvSpPr/>
+          <p:nvPr/>
+        </p:nvSpPr>
+        <p:spPr>
+          <a:xfrm>
+            <a:off x="4658702" y="1458298"/>
+            <a:ext cx="360000" cy="360000"/>
+          </a:xfrm>
+          <a:prstGeom prst="ellipse">
+            <a:avLst/>
+          </a:prstGeom>
+          <a:solidFill>
+            <a:schemeClr val="accent1"/>
+          </a:solidFill>
+          <a:ln>
+            <a:noFill/>
+          </a:ln>
+        </p:spPr>
+        <p:style>
+          <a:lnRef idx="2">
+            <a:schemeClr val="accent1">
+              <a:shade val="50000"/>
+            </a:schemeClr>
+          </a:lnRef>
+          <a:fillRef idx="1">
+            <a:schemeClr val="accent1"/>
+          </a:fillRef>
+          <a:effectRef idx="0">
+            <a:schemeClr val="accent1"/>
+          </a:effectRef>
+          <a:fontRef idx="minor">
+            <a:schemeClr val="lt1"/>
+          </a:fontRef>
+        </p:style>
+        <p:txBody>
+          <a:bodyPr rtlCol="0" anchor="ctr"/>
+          <a:lstStyle/>
+          <a:p>
+            <a:pPr algn="ctr"/>
+            <a:r>
+              <a:rPr lang="en-US" dirty="0">
+                <a:latin typeface="Calibri" panose="020F0502020204030204" pitchFamily="34" charset="0"/>
+                <a:cs typeface="Calibri" panose="020F0502020204030204" pitchFamily="34" charset="0"/>
+              </a:rPr>
+              <a:t>2</a:t>
+            </a:r>
+            <a:endParaRPr lang="en-GB" dirty="0">
+              <a:latin typeface="Calibri" panose="020F0502020204030204" pitchFamily="34" charset="0"/>
+              <a:cs typeface="Calibri" panose="020F0502020204030204" pitchFamily="34" charset="0"/>
+            </a:endParaRPr>
+          </a:p>
+        </p:txBody>
+      </p:sp>
+      <p:sp>
+        <p:nvSpPr>
+          <p:cNvPr id="33" name="Oval 32">
+            <a:extLst>
+              <a:ext uri="{FF2B5EF4-FFF2-40B4-BE49-F238E27FC236}">
+                <a16:creationId xmlns:a16="http://schemas.microsoft.com/office/drawing/2014/main" id="{589149B6-4311-43B0-8FA0-27944C657D0D}"/>
+              </a:ext>
+            </a:extLst>
+          </p:cNvPr>
+          <p:cNvSpPr/>
+          <p:nvPr/>
+        </p:nvSpPr>
+        <p:spPr>
+          <a:xfrm>
+            <a:off x="4655694" y="2754123"/>
+            <a:ext cx="360000" cy="360000"/>
+          </a:xfrm>
+          <a:prstGeom prst="ellipse">
+            <a:avLst/>
+          </a:prstGeom>
+          <a:solidFill>
+            <a:schemeClr val="accent1"/>
+          </a:solidFill>
+          <a:ln>
+            <a:noFill/>
+          </a:ln>
+        </p:spPr>
+        <p:style>
+          <a:lnRef idx="2">
+            <a:schemeClr val="accent1">
+              <a:shade val="50000"/>
+            </a:schemeClr>
+          </a:lnRef>
+          <a:fillRef idx="1">
+            <a:schemeClr val="accent1"/>
+          </a:fillRef>
+          <a:effectRef idx="0">
+            <a:schemeClr val="accent1"/>
+          </a:effectRef>
+          <a:fontRef idx="minor">
+            <a:schemeClr val="lt1"/>
+          </a:fontRef>
+        </p:style>
+        <p:txBody>
+          <a:bodyPr rtlCol="0" anchor="ctr"/>
+          <a:lstStyle/>
+          <a:p>
+            <a:pPr algn="ctr"/>
+            <a:r>
+              <a:rPr lang="en-US" dirty="0">
+                <a:latin typeface="Calibri" panose="020F0502020204030204" pitchFamily="34" charset="0"/>
+                <a:cs typeface="Calibri" panose="020F0502020204030204" pitchFamily="34" charset="0"/>
+              </a:rPr>
+              <a:t>3</a:t>
+            </a:r>
+            <a:endParaRPr lang="en-GB" dirty="0">
+              <a:latin typeface="Calibri" panose="020F0502020204030204" pitchFamily="34" charset="0"/>
+              <a:cs typeface="Calibri" panose="020F0502020204030204" pitchFamily="34" charset="0"/>
+            </a:endParaRPr>
+          </a:p>
+        </p:txBody>
+      </p:sp>
+      <p:sp>
+        <p:nvSpPr>
+          <p:cNvPr id="35" name="Oval 34">
+            <a:extLst>
+              <a:ext uri="{FF2B5EF4-FFF2-40B4-BE49-F238E27FC236}">
+                <a16:creationId xmlns:a16="http://schemas.microsoft.com/office/drawing/2014/main" id="{46A578CD-9EE0-408B-A678-0EFB17AD42CF}"/>
+              </a:ext>
+            </a:extLst>
+          </p:cNvPr>
+          <p:cNvSpPr/>
+          <p:nvPr/>
+        </p:nvSpPr>
+        <p:spPr>
+          <a:xfrm>
+            <a:off x="4655694" y="3963001"/>
+            <a:ext cx="360000" cy="360000"/>
+          </a:xfrm>
+          <a:prstGeom prst="ellipse">
+            <a:avLst/>
+          </a:prstGeom>
+          <a:solidFill>
+            <a:schemeClr val="accent1"/>
+          </a:solidFill>
+          <a:ln>
+            <a:noFill/>
+          </a:ln>
+        </p:spPr>
+        <p:style>
+          <a:lnRef idx="2">
+            <a:schemeClr val="accent1">
+              <a:shade val="50000"/>
+            </a:schemeClr>
+          </a:lnRef>
+          <a:fillRef idx="1">
+            <a:schemeClr val="accent1"/>
+          </a:fillRef>
+          <a:effectRef idx="0">
+            <a:schemeClr val="accent1"/>
+          </a:effectRef>
+          <a:fontRef idx="minor">
+            <a:schemeClr val="lt1"/>
+          </a:fontRef>
+        </p:style>
+        <p:txBody>
+          <a:bodyPr rtlCol="0" anchor="ctr"/>
+          <a:lstStyle/>
+          <a:p>
+            <a:pPr algn="ctr"/>
+            <a:r>
+              <a:rPr lang="en-US" dirty="0">
+                <a:latin typeface="Calibri" panose="020F0502020204030204" pitchFamily="34" charset="0"/>
+                <a:cs typeface="Calibri" panose="020F0502020204030204" pitchFamily="34" charset="0"/>
+              </a:rPr>
+              <a:t>4</a:t>
+            </a:r>
+            <a:endParaRPr lang="en-GB" dirty="0">
+              <a:latin typeface="Calibri" panose="020F0502020204030204" pitchFamily="34" charset="0"/>
+              <a:cs typeface="Calibri" panose="020F0502020204030204" pitchFamily="34" charset="0"/>
+            </a:endParaRPr>
+          </a:p>
+        </p:txBody>
+      </p:sp>
+      <p:sp>
+        <p:nvSpPr>
+          <p:cNvPr id="38" name="Flowchart: Document 37">
+            <a:extLst>
+              <a:ext uri="{FF2B5EF4-FFF2-40B4-BE49-F238E27FC236}">
+                <a16:creationId xmlns:a16="http://schemas.microsoft.com/office/drawing/2014/main" id="{973775FC-78A5-4325-B535-441862918E54}"/>
+              </a:ext>
+            </a:extLst>
+          </p:cNvPr>
+          <p:cNvSpPr/>
+          <p:nvPr/>
+        </p:nvSpPr>
+        <p:spPr>
+          <a:xfrm>
+            <a:off x="5050566" y="274719"/>
+            <a:ext cx="1350233" cy="768017"/>
+          </a:xfrm>
+          <a:prstGeom prst="flowChartDocument">
+            <a:avLst/>
+          </a:prstGeom>
+          <a:solidFill>
+            <a:schemeClr val="accent1"/>
+          </a:solidFill>
+          <a:ln w="19050">
+            <a:solidFill>
+              <a:schemeClr val="tx1"/>
+            </a:solidFill>
+          </a:ln>
+        </p:spPr>
+        <p:style>
+          <a:lnRef idx="2">
+            <a:schemeClr val="accent1">
+              <a:shade val="50000"/>
+            </a:schemeClr>
+          </a:lnRef>
+          <a:fillRef idx="1">
+            <a:schemeClr val="accent1"/>
+          </a:fillRef>
+          <a:effectRef idx="0">
+            <a:schemeClr val="accent1"/>
+          </a:effectRef>
+          <a:fontRef idx="minor">
+            <a:schemeClr val="lt1"/>
+          </a:fontRef>
+        </p:style>
+        <p:txBody>
+          <a:bodyPr rtlCol="0" anchor="ctr"/>
+          <a:lstStyle/>
+          <a:p>
+            <a:pPr marL="0" marR="0" lvl="0" indent="0" algn="ctr" defTabSz="914400" rtl="0" eaLnBrk="0" fontAlgn="base" latinLnBrk="0" hangingPunct="0">
+              <a:lnSpc>
+                <a:spcPct val="100000"/>
+              </a:lnSpc>
+              <a:spcBef>
+                <a:spcPct val="0"/>
+              </a:spcBef>
+              <a:spcAft>
+                <a:spcPct val="0"/>
+              </a:spcAft>
+              <a:buClrTx/>
+              <a:buSzTx/>
+              <a:buFontTx/>
+              <a:buNone/>
+              <a:tabLst/>
+              <a:defRPr/>
+            </a:pPr>
+            <a:r>
+              <a:rPr kumimoji="0" lang="en-US" sz="1200" b="0" i="0" u="none" strike="noStrike" kern="1200" cap="none" spc="0" normalizeH="0" baseline="0" noProof="0" dirty="0">
+                <a:ln>
+                  <a:noFill/>
+                </a:ln>
+                <a:solidFill>
+                  <a:srgbClr val="FFFFFF"/>
+                </a:solidFill>
+                <a:effectLst/>
+                <a:uLnTx/>
+                <a:uFillTx/>
+                <a:latin typeface="Calibri"/>
+                <a:ea typeface="+mn-ea"/>
+                <a:cs typeface="+mn-cs"/>
+              </a:rPr>
+              <a:t>*.</a:t>
+            </a:r>
+            <a:r>
+              <a:rPr kumimoji="0" lang="en-US" sz="1200" b="0" i="0" u="none" strike="noStrike" kern="1200" cap="none" spc="0" normalizeH="0" baseline="0" noProof="0" dirty="0" err="1">
+                <a:ln>
+                  <a:noFill/>
+                </a:ln>
+                <a:solidFill>
+                  <a:srgbClr val="FFFFFF"/>
+                </a:solidFill>
+                <a:effectLst/>
+                <a:uLnTx/>
+                <a:uFillTx/>
+                <a:latin typeface="Calibri"/>
+                <a:ea typeface="+mn-ea"/>
+                <a:cs typeface="+mn-cs"/>
+              </a:rPr>
+              <a:t>cdefault.yml</a:t>
+            </a:r>
+            <a:br>
+              <a:rPr kumimoji="0" lang="en-US" sz="1000" b="0" i="0" u="none" strike="noStrike" kern="1200" cap="none" spc="0" normalizeH="0" baseline="0" noProof="0" dirty="0">
+                <a:ln>
+                  <a:noFill/>
+                </a:ln>
+                <a:solidFill>
+                  <a:srgbClr val="FFFFFF"/>
+                </a:solidFill>
+                <a:effectLst/>
+                <a:uLnTx/>
+                <a:uFillTx/>
+                <a:latin typeface="Calibri"/>
+                <a:ea typeface="+mn-ea"/>
+                <a:cs typeface="+mn-cs"/>
+              </a:rPr>
+            </a:br>
+            <a:r>
+              <a:rPr kumimoji="0" lang="en-US" sz="1000" b="0" i="0" u="none" strike="noStrike" kern="1200" cap="none" spc="0" normalizeH="0" baseline="0" noProof="0" dirty="0">
+                <a:ln>
+                  <a:noFill/>
+                </a:ln>
+                <a:solidFill>
+                  <a:srgbClr val="FFFFFF"/>
+                </a:solidFill>
+                <a:effectLst/>
+                <a:uLnTx/>
+                <a:uFillTx/>
+                <a:latin typeface="Calibri"/>
+                <a:ea typeface="+mn-ea"/>
+                <a:cs typeface="+mn-cs"/>
+              </a:rPr>
+              <a:t>Global Settings</a:t>
+            </a:r>
+            <a:br>
+              <a:rPr kumimoji="0" lang="en-US" sz="1000" b="0" i="0" u="none" strike="noStrike" kern="1200" cap="none" spc="0" normalizeH="0" baseline="0" noProof="0" dirty="0">
+                <a:ln>
+                  <a:noFill/>
+                </a:ln>
+                <a:solidFill>
+                  <a:srgbClr val="FFFFFF"/>
+                </a:solidFill>
+                <a:effectLst/>
+                <a:uLnTx/>
+                <a:uFillTx/>
+                <a:latin typeface="Calibri"/>
+                <a:ea typeface="+mn-ea"/>
+                <a:cs typeface="+mn-cs"/>
+              </a:rPr>
+            </a:br>
+            <a:r>
+              <a:rPr kumimoji="0" lang="en-US" sz="1000" b="0" i="0" u="none" strike="noStrike" kern="1200" cap="none" spc="0" normalizeH="0" baseline="0" noProof="0" dirty="0">
+                <a:ln>
+                  <a:noFill/>
+                </a:ln>
+                <a:solidFill>
+                  <a:srgbClr val="FFFFFF"/>
+                </a:solidFill>
+                <a:effectLst/>
+                <a:uLnTx/>
+                <a:uFillTx/>
+                <a:latin typeface="Calibri"/>
+                <a:ea typeface="+mn-ea"/>
+                <a:cs typeface="+mn-cs"/>
+              </a:rPr>
+              <a:t>(Toolchain)</a:t>
+            </a:r>
+            <a:endParaRPr kumimoji="0" lang="en-GB" sz="1000" b="0" i="0" u="none" strike="noStrike" kern="1200" cap="none" spc="0" normalizeH="0" baseline="0" noProof="0" dirty="0">
+              <a:ln>
+                <a:noFill/>
+              </a:ln>
+              <a:solidFill>
+                <a:srgbClr val="FFFFFF"/>
+              </a:solidFill>
+              <a:effectLst/>
+              <a:uLnTx/>
+              <a:uFillTx/>
+              <a:latin typeface="Calibri"/>
+              <a:ea typeface="+mn-ea"/>
+              <a:cs typeface="+mn-cs"/>
+            </a:endParaRPr>
+          </a:p>
+        </p:txBody>
+      </p:sp>
+      <p:sp>
+        <p:nvSpPr>
+          <p:cNvPr id="3" name="Rectangle 2">
+            <a:extLst>
+              <a:ext uri="{FF2B5EF4-FFF2-40B4-BE49-F238E27FC236}">
+                <a16:creationId xmlns:a16="http://schemas.microsoft.com/office/drawing/2014/main" id="{370F4CCE-2B1C-035A-5D4A-81B8A6DC1905}"/>
+              </a:ext>
+            </a:extLst>
+          </p:cNvPr>
+          <p:cNvSpPr/>
+          <p:nvPr/>
+        </p:nvSpPr>
+        <p:spPr>
+          <a:xfrm>
+            <a:off x="9282684" y="2591828"/>
+            <a:ext cx="1786691" cy="1377234"/>
+          </a:xfrm>
+          <a:prstGeom prst="rect">
+            <a:avLst/>
+          </a:prstGeom>
+          <a:solidFill>
+            <a:schemeClr val="bg1">
+              <a:lumMod val="50000"/>
+              <a:alpha val="30000"/>
+            </a:schemeClr>
+          </a:solidFill>
+          <a:ln>
+            <a:noFill/>
+          </a:ln>
+        </p:spPr>
+        <p:style>
+          <a:lnRef idx="2">
+            <a:schemeClr val="accent1">
+              <a:shade val="50000"/>
+            </a:schemeClr>
+          </a:lnRef>
+          <a:fillRef idx="1">
+            <a:schemeClr val="accent1"/>
+          </a:fillRef>
+          <a:effectRef idx="0">
+            <a:schemeClr val="accent1"/>
+          </a:effectRef>
+          <a:fontRef idx="minor">
+            <a:schemeClr val="lt1"/>
+          </a:fontRef>
+        </p:style>
+        <p:txBody>
+          <a:bodyPr rtlCol="0" anchor="b" anchorCtr="1"/>
+          <a:lstStyle/>
+          <a:p>
+            <a:pPr algn="ctr"/>
+            <a:r>
+              <a:rPr lang="en-US" dirty="0"/>
+              <a:t>future extension</a:t>
+            </a:r>
+          </a:p>
+        </p:txBody>
+      </p:sp>
+      <p:sp>
+        <p:nvSpPr>
+          <p:cNvPr id="4" name="Rectangle 3">
+            <a:extLst>
+              <a:ext uri="{FF2B5EF4-FFF2-40B4-BE49-F238E27FC236}">
+                <a16:creationId xmlns:a16="http://schemas.microsoft.com/office/drawing/2014/main" id="{C5772D99-DFDE-63C8-ED0F-8913B54FFD71}"/>
+              </a:ext>
+            </a:extLst>
+          </p:cNvPr>
+          <p:cNvSpPr/>
+          <p:nvPr/>
+        </p:nvSpPr>
+        <p:spPr>
+          <a:xfrm>
+            <a:off x="7230982" y="4990622"/>
+            <a:ext cx="1540042" cy="1022685"/>
+          </a:xfrm>
+          <a:prstGeom prst="rect">
+            <a:avLst/>
+          </a:prstGeom>
+          <a:solidFill>
+            <a:schemeClr val="accent2">
+              <a:lumMod val="50000"/>
+              <a:lumOff val="50000"/>
+            </a:schemeClr>
+          </a:solidFill>
+          <a:ln>
+            <a:solidFill>
+              <a:schemeClr val="accent4">
+                <a:lumMod val="75000"/>
+              </a:schemeClr>
+            </a:solidFill>
+          </a:ln>
+        </p:spPr>
+        <p:style>
+          <a:lnRef idx="2">
+            <a:schemeClr val="accent1">
+              <a:shade val="50000"/>
+            </a:schemeClr>
+          </a:lnRef>
+          <a:fillRef idx="1">
+            <a:schemeClr val="accent1"/>
+          </a:fillRef>
+          <a:effectRef idx="0">
+            <a:schemeClr val="accent1"/>
+          </a:effectRef>
+          <a:fontRef idx="minor">
+            <a:schemeClr val="lt1"/>
+          </a:fontRef>
+        </p:style>
+        <p:txBody>
+          <a:bodyPr rtlCol="0" anchor="ctr"/>
+          <a:lstStyle/>
+          <a:p>
+            <a:pPr marL="0" marR="0" lvl="0" indent="0" algn="ctr" defTabSz="914400" rtl="0" eaLnBrk="0" fontAlgn="base" latinLnBrk="0" hangingPunct="0">
+              <a:lnSpc>
+                <a:spcPct val="100000"/>
+              </a:lnSpc>
+              <a:spcBef>
+                <a:spcPct val="0"/>
+              </a:spcBef>
+              <a:spcAft>
+                <a:spcPct val="0"/>
+              </a:spcAft>
+              <a:buClrTx/>
+              <a:buSzTx/>
+              <a:buFontTx/>
+              <a:buNone/>
+              <a:tabLst/>
+              <a:defRPr/>
+            </a:pPr>
+            <a:r>
+              <a:rPr lang="en-US" dirty="0">
+                <a:solidFill>
+                  <a:srgbClr val="FFFFFF"/>
+                </a:solidFill>
+                <a:latin typeface="Calibri"/>
+              </a:rPr>
+              <a:t>Generator</a:t>
+            </a:r>
+            <a:endParaRPr kumimoji="0" lang="en-GB" sz="1800" b="0" i="0" u="none" strike="noStrike" kern="1200" cap="none" spc="0" normalizeH="0" baseline="0" noProof="0" dirty="0">
+              <a:ln>
+                <a:noFill/>
+              </a:ln>
+              <a:solidFill>
+                <a:srgbClr val="FFFFFF"/>
+              </a:solidFill>
+              <a:effectLst/>
+              <a:uLnTx/>
+              <a:uFillTx/>
+              <a:latin typeface="Calibri"/>
+              <a:ea typeface="+mn-ea"/>
+              <a:cs typeface="+mn-cs"/>
+            </a:endParaRPr>
+          </a:p>
+        </p:txBody>
+      </p:sp>
+      <p:sp>
+        <p:nvSpPr>
+          <p:cNvPr id="8" name="Rectangle 7">
+            <a:extLst>
+              <a:ext uri="{FF2B5EF4-FFF2-40B4-BE49-F238E27FC236}">
+                <a16:creationId xmlns:a16="http://schemas.microsoft.com/office/drawing/2014/main" id="{132D24B4-9144-7276-CA05-5F9E950F9163}"/>
+              </a:ext>
+            </a:extLst>
+          </p:cNvPr>
+          <p:cNvSpPr/>
+          <p:nvPr/>
+        </p:nvSpPr>
+        <p:spPr>
+          <a:xfrm>
+            <a:off x="9283599" y="1175887"/>
+            <a:ext cx="1786691" cy="1377234"/>
+          </a:xfrm>
+          <a:prstGeom prst="rect">
+            <a:avLst/>
+          </a:prstGeom>
+          <a:solidFill>
+            <a:schemeClr val="bg1">
+              <a:lumMod val="50000"/>
+              <a:alpha val="30000"/>
+            </a:schemeClr>
+          </a:solidFill>
+          <a:ln>
+            <a:noFill/>
+          </a:ln>
+        </p:spPr>
+        <p:style>
+          <a:lnRef idx="2">
+            <a:schemeClr val="accent1">
+              <a:shade val="50000"/>
+            </a:schemeClr>
+          </a:lnRef>
+          <a:fillRef idx="1">
+            <a:schemeClr val="accent1"/>
+          </a:fillRef>
+          <a:effectRef idx="0">
+            <a:schemeClr val="accent1"/>
+          </a:effectRef>
+          <a:fontRef idx="minor">
+            <a:schemeClr val="lt1"/>
+          </a:fontRef>
+        </p:style>
+        <p:txBody>
+          <a:bodyPr rtlCol="0" anchor="b" anchorCtr="1"/>
+          <a:lstStyle/>
+          <a:p>
+            <a:pPr algn="ctr"/>
+            <a:r>
+              <a:rPr lang="en-US" dirty="0"/>
+              <a:t>legacy</a:t>
+            </a:r>
+          </a:p>
+        </p:txBody>
+      </p:sp>
+      <p:sp>
+        <p:nvSpPr>
+          <p:cNvPr id="12" name="Flowchart: Multidocument 11">
+            <a:extLst>
+              <a:ext uri="{FF2B5EF4-FFF2-40B4-BE49-F238E27FC236}">
+                <a16:creationId xmlns:a16="http://schemas.microsoft.com/office/drawing/2014/main" id="{C1D42684-F2E8-5ED1-A6D2-22AD5040CDD3}"/>
+              </a:ext>
+            </a:extLst>
+          </p:cNvPr>
+          <p:cNvSpPr/>
+          <p:nvPr/>
+        </p:nvSpPr>
+        <p:spPr>
+          <a:xfrm>
+            <a:off x="5045059" y="5177583"/>
+            <a:ext cx="1449805" cy="1010653"/>
+          </a:xfrm>
+          <a:prstGeom prst="flowChartMultidocument">
+            <a:avLst/>
+          </a:prstGeom>
+          <a:solidFill>
+            <a:schemeClr val="bg1"/>
+          </a:solidFill>
+          <a:ln w="19050">
+            <a:solidFill>
+              <a:schemeClr val="accent1">
+                <a:lumMod val="75000"/>
+              </a:schemeClr>
+            </a:solidFill>
+          </a:ln>
+        </p:spPr>
+        <p:style>
+          <a:lnRef idx="2">
+            <a:schemeClr val="accent1">
+              <a:shade val="50000"/>
+            </a:schemeClr>
+          </a:lnRef>
+          <a:fillRef idx="1">
+            <a:schemeClr val="accent1"/>
+          </a:fillRef>
+          <a:effectRef idx="0">
+            <a:schemeClr val="accent1"/>
+          </a:effectRef>
+          <a:fontRef idx="minor">
+            <a:schemeClr val="lt1"/>
+          </a:fontRef>
+        </p:style>
+        <p:txBody>
+          <a:bodyPr rtlCol="0" anchor="ctr"/>
+          <a:lstStyle/>
+          <a:p>
+            <a:pPr marL="0" marR="0" lvl="0" indent="0" algn="ctr" defTabSz="914400" rtl="0" eaLnBrk="0" fontAlgn="base" latinLnBrk="0" hangingPunct="0">
+              <a:lnSpc>
+                <a:spcPct val="100000"/>
+              </a:lnSpc>
+              <a:spcBef>
+                <a:spcPct val="0"/>
+              </a:spcBef>
+              <a:spcAft>
+                <a:spcPct val="0"/>
+              </a:spcAft>
+              <a:buClrTx/>
+              <a:buSzTx/>
+              <a:buFontTx/>
+              <a:buNone/>
+              <a:tabLst/>
+              <a:defRPr/>
+            </a:pPr>
+            <a:r>
+              <a:rPr kumimoji="0" lang="en-US" sz="1200" b="0" i="0" u="none" strike="noStrike" kern="1200" cap="none" spc="0" normalizeH="0" baseline="0" noProof="0" dirty="0">
+                <a:ln>
+                  <a:noFill/>
+                </a:ln>
+                <a:solidFill>
+                  <a:schemeClr val="bg2">
+                    <a:lumMod val="25000"/>
+                  </a:schemeClr>
+                </a:solidFill>
+                <a:effectLst/>
+                <a:uLnTx/>
+                <a:uFillTx/>
+                <a:latin typeface="Calibri"/>
+                <a:ea typeface="+mn-ea"/>
+                <a:cs typeface="+mn-cs"/>
+              </a:rPr>
+              <a:t>*.</a:t>
+            </a:r>
+            <a:r>
+              <a:rPr kumimoji="0" lang="en-US" sz="1200" b="0" i="0" u="none" strike="noStrike" kern="1200" cap="none" spc="0" normalizeH="0" baseline="0" noProof="0" dirty="0" err="1">
+                <a:ln>
+                  <a:noFill/>
+                </a:ln>
+                <a:solidFill>
+                  <a:schemeClr val="bg2">
+                    <a:lumMod val="25000"/>
+                  </a:schemeClr>
+                </a:solidFill>
+                <a:effectLst/>
+                <a:uLnTx/>
+                <a:uFillTx/>
+                <a:latin typeface="Calibri"/>
+                <a:ea typeface="+mn-ea"/>
+                <a:cs typeface="+mn-cs"/>
+              </a:rPr>
+              <a:t>generator.yml</a:t>
+            </a:r>
+            <a:br>
+              <a:rPr kumimoji="0" lang="en-US" sz="1200" b="0" i="0" u="none" strike="noStrike" kern="1200" cap="none" spc="0" normalizeH="0" baseline="0" noProof="0" dirty="0">
+                <a:ln>
+                  <a:noFill/>
+                </a:ln>
+                <a:solidFill>
+                  <a:schemeClr val="bg2">
+                    <a:lumMod val="25000"/>
+                  </a:schemeClr>
+                </a:solidFill>
+                <a:effectLst/>
+                <a:uLnTx/>
+                <a:uFillTx/>
+                <a:latin typeface="Calibri"/>
+                <a:ea typeface="+mn-ea"/>
+                <a:cs typeface="+mn-cs"/>
+              </a:rPr>
+            </a:br>
+            <a:r>
+              <a:rPr kumimoji="0" lang="en-US" sz="1000" b="0" i="0" u="none" strike="noStrike" kern="1200" cap="none" spc="0" normalizeH="0" baseline="0" noProof="0" dirty="0">
+                <a:ln>
+                  <a:noFill/>
+                </a:ln>
+                <a:solidFill>
+                  <a:schemeClr val="bg2">
+                    <a:lumMod val="25000"/>
+                  </a:schemeClr>
+                </a:solidFill>
+                <a:effectLst/>
+                <a:uLnTx/>
+                <a:uFillTx/>
+                <a:latin typeface="Calibri"/>
+                <a:ea typeface="+mn-ea"/>
+                <a:cs typeface="+mn-cs"/>
+              </a:rPr>
+              <a:t>Defines generated</a:t>
+            </a:r>
+            <a:br>
+              <a:rPr kumimoji="0" lang="en-US" sz="1000" b="0" i="0" u="none" strike="noStrike" kern="1200" cap="none" spc="0" normalizeH="0" baseline="0" noProof="0" dirty="0">
+                <a:ln>
+                  <a:noFill/>
+                </a:ln>
+                <a:solidFill>
+                  <a:schemeClr val="bg2">
+                    <a:lumMod val="25000"/>
+                  </a:schemeClr>
+                </a:solidFill>
+                <a:effectLst/>
+                <a:uLnTx/>
+                <a:uFillTx/>
+                <a:latin typeface="Calibri"/>
+                <a:ea typeface="+mn-ea"/>
+                <a:cs typeface="+mn-cs"/>
+              </a:rPr>
+            </a:br>
+            <a:r>
+              <a:rPr kumimoji="0" lang="en-US" sz="1000" b="0" i="0" u="none" strike="noStrike" kern="1200" cap="none" spc="0" normalizeH="0" baseline="0" noProof="0" dirty="0">
+                <a:ln>
+                  <a:noFill/>
+                </a:ln>
+                <a:solidFill>
+                  <a:schemeClr val="bg2">
+                    <a:lumMod val="25000"/>
+                  </a:schemeClr>
+                </a:solidFill>
+                <a:effectLst/>
+                <a:uLnTx/>
+                <a:uFillTx/>
+                <a:latin typeface="Calibri"/>
+                <a:ea typeface="+mn-ea"/>
+                <a:cs typeface="+mn-cs"/>
+              </a:rPr>
+              <a:t>project parts</a:t>
+            </a:r>
+            <a:endParaRPr kumimoji="0" lang="en-GB" sz="1000" b="0" i="0" u="none" strike="noStrike" kern="1200" cap="none" spc="0" normalizeH="0" baseline="0" noProof="0" dirty="0">
+              <a:ln>
+                <a:noFill/>
+              </a:ln>
+              <a:solidFill>
+                <a:schemeClr val="bg2">
+                  <a:lumMod val="25000"/>
+                </a:schemeClr>
+              </a:solidFill>
+              <a:effectLst/>
+              <a:uLnTx/>
+              <a:uFillTx/>
+              <a:latin typeface="Calibri"/>
+              <a:ea typeface="+mn-ea"/>
+              <a:cs typeface="+mn-cs"/>
+            </a:endParaRPr>
+          </a:p>
+        </p:txBody>
+      </p:sp>
+      <p:sp>
+        <p:nvSpPr>
+          <p:cNvPr id="13" name="Arrow: Right 12">
+            <a:extLst>
+              <a:ext uri="{FF2B5EF4-FFF2-40B4-BE49-F238E27FC236}">
+                <a16:creationId xmlns:a16="http://schemas.microsoft.com/office/drawing/2014/main" id="{3C413814-5338-0CBB-0ADF-3392B8D26B35}"/>
+              </a:ext>
+            </a:extLst>
+          </p:cNvPr>
+          <p:cNvSpPr/>
+          <p:nvPr/>
+        </p:nvSpPr>
+        <p:spPr>
+          <a:xfrm rot="10800000">
+            <a:off x="6488832" y="5414630"/>
+            <a:ext cx="742146" cy="204536"/>
+          </a:xfrm>
+          <a:prstGeom prst="rightArrow">
+            <a:avLst/>
+          </a:prstGeom>
+          <a:solidFill>
+            <a:schemeClr val="accent1"/>
+          </a:solidFill>
+          <a:ln>
+            <a:noFill/>
+          </a:ln>
+        </p:spPr>
+        <p:style>
+          <a:lnRef idx="2">
+            <a:schemeClr val="accent1">
+              <a:shade val="50000"/>
+            </a:schemeClr>
+          </a:lnRef>
+          <a:fillRef idx="1">
+            <a:schemeClr val="accent1"/>
+          </a:fillRef>
+          <a:effectRef idx="0">
+            <a:schemeClr val="accent1"/>
+          </a:effectRef>
+          <a:fontRef idx="minor">
+            <a:schemeClr val="lt1"/>
+          </a:fontRef>
+        </p:style>
+        <p:txBody>
+          <a:bodyPr rtlCol="0" anchor="ctr"/>
+          <a:lstStyle/>
+          <a:p>
+            <a:pPr marL="0" marR="0" lvl="0" indent="0" algn="ctr" defTabSz="914400" rtl="0" eaLnBrk="0" fontAlgn="base" latinLnBrk="0" hangingPunct="0">
+              <a:lnSpc>
+                <a:spcPct val="100000"/>
+              </a:lnSpc>
+              <a:spcBef>
+                <a:spcPct val="0"/>
+              </a:spcBef>
+              <a:spcAft>
+                <a:spcPct val="0"/>
+              </a:spcAft>
+              <a:buClrTx/>
+              <a:buSzTx/>
+              <a:buFontTx/>
+              <a:buNone/>
+              <a:tabLst/>
+              <a:defRPr/>
+            </a:pPr>
+            <a:endParaRPr kumimoji="0" lang="en-GB" sz="1800" b="0" i="0" u="none" strike="noStrike" kern="1200" cap="none" spc="0" normalizeH="0" baseline="0" noProof="0">
+              <a:ln>
+                <a:noFill/>
+              </a:ln>
+              <a:solidFill>
+                <a:srgbClr val="FFFFFF"/>
+              </a:solidFill>
+              <a:effectLst/>
+              <a:uLnTx/>
+              <a:uFillTx/>
+              <a:latin typeface="Calibri"/>
+              <a:ea typeface="+mn-ea"/>
+              <a:cs typeface="+mn-cs"/>
+            </a:endParaRPr>
+          </a:p>
+        </p:txBody>
+      </p:sp>
+      <p:sp>
+        <p:nvSpPr>
+          <p:cNvPr id="15" name="Arrow: Right 14">
+            <a:extLst>
+              <a:ext uri="{FF2B5EF4-FFF2-40B4-BE49-F238E27FC236}">
+                <a16:creationId xmlns:a16="http://schemas.microsoft.com/office/drawing/2014/main" id="{405B82CE-AB85-0E73-D247-5FE9D420D9EF}"/>
+              </a:ext>
+            </a:extLst>
+          </p:cNvPr>
+          <p:cNvSpPr/>
+          <p:nvPr/>
+        </p:nvSpPr>
+        <p:spPr>
+          <a:xfrm rot="9005722">
+            <a:off x="8747485" y="4640233"/>
+            <a:ext cx="937026" cy="237456"/>
+          </a:xfrm>
+          <a:prstGeom prst="rightArrow">
+            <a:avLst/>
+          </a:prstGeom>
+          <a:solidFill>
+            <a:schemeClr val="accent1"/>
+          </a:solidFill>
+          <a:ln>
+            <a:noFill/>
+          </a:ln>
+        </p:spPr>
+        <p:style>
+          <a:lnRef idx="2">
+            <a:schemeClr val="accent1">
+              <a:shade val="50000"/>
+            </a:schemeClr>
+          </a:lnRef>
+          <a:fillRef idx="1">
+            <a:schemeClr val="accent1"/>
+          </a:fillRef>
+          <a:effectRef idx="0">
+            <a:schemeClr val="accent1"/>
+          </a:effectRef>
+          <a:fontRef idx="minor">
+            <a:schemeClr val="lt1"/>
+          </a:fontRef>
+        </p:style>
+        <p:txBody>
+          <a:bodyPr rtlCol="0" anchor="ctr"/>
+          <a:lstStyle/>
+          <a:p>
+            <a:pPr marL="0" marR="0" lvl="0" indent="0" algn="ctr" defTabSz="914400" rtl="0" eaLnBrk="0" fontAlgn="base" latinLnBrk="0" hangingPunct="0">
+              <a:lnSpc>
+                <a:spcPct val="100000"/>
+              </a:lnSpc>
+              <a:spcBef>
+                <a:spcPct val="0"/>
+              </a:spcBef>
+              <a:spcAft>
+                <a:spcPct val="0"/>
+              </a:spcAft>
+              <a:buClrTx/>
+              <a:buSzTx/>
+              <a:buFontTx/>
+              <a:buNone/>
+              <a:tabLst/>
+              <a:defRPr/>
+            </a:pPr>
+            <a:endParaRPr kumimoji="0" lang="en-GB" sz="1800" b="0" i="0" u="none" strike="noStrike" kern="1200" cap="none" spc="0" normalizeH="0" baseline="0" noProof="0">
+              <a:ln>
+                <a:noFill/>
+              </a:ln>
+              <a:solidFill>
+                <a:srgbClr val="FFFFFF"/>
+              </a:solidFill>
+              <a:effectLst/>
+              <a:uLnTx/>
+              <a:uFillTx/>
+              <a:latin typeface="Calibri"/>
+              <a:ea typeface="+mn-ea"/>
+              <a:cs typeface="+mn-cs"/>
+            </a:endParaRPr>
+          </a:p>
+        </p:txBody>
+      </p:sp>
+      <p:sp>
+        <p:nvSpPr>
+          <p:cNvPr id="11" name="Flowchart: Document 10">
+            <a:extLst>
+              <a:ext uri="{FF2B5EF4-FFF2-40B4-BE49-F238E27FC236}">
+                <a16:creationId xmlns:a16="http://schemas.microsoft.com/office/drawing/2014/main" id="{057A4819-CEB0-A8FD-8A56-C9A078D7B8A2}"/>
+              </a:ext>
+            </a:extLst>
+          </p:cNvPr>
+          <p:cNvSpPr/>
+          <p:nvPr/>
+        </p:nvSpPr>
+        <p:spPr>
+          <a:xfrm>
+            <a:off x="9533850" y="4192534"/>
+            <a:ext cx="1333416" cy="884321"/>
+          </a:xfrm>
+          <a:prstGeom prst="flowChartDocument">
+            <a:avLst/>
+          </a:prstGeom>
+          <a:solidFill>
+            <a:schemeClr val="bg1">
+              <a:lumMod val="95000"/>
+            </a:schemeClr>
+          </a:solidFill>
+          <a:ln w="19050">
+            <a:solidFill>
+              <a:schemeClr val="accent5">
+                <a:lumMod val="50000"/>
+              </a:schemeClr>
+            </a:solidFill>
+          </a:ln>
+        </p:spPr>
+        <p:style>
+          <a:lnRef idx="2">
+            <a:schemeClr val="accent1">
+              <a:shade val="50000"/>
+            </a:schemeClr>
+          </a:lnRef>
+          <a:fillRef idx="1">
+            <a:schemeClr val="accent1"/>
+          </a:fillRef>
+          <a:effectRef idx="0">
+            <a:schemeClr val="accent1"/>
+          </a:effectRef>
+          <a:fontRef idx="minor">
+            <a:schemeClr val="lt1"/>
+          </a:fontRef>
+        </p:style>
+        <p:txBody>
+          <a:bodyPr lIns="0" rIns="0" rtlCol="0" anchor="ctr"/>
+          <a:lstStyle/>
+          <a:p>
+            <a:pPr marL="0" marR="0" lvl="0" indent="0" algn="ctr" defTabSz="914400" rtl="0" eaLnBrk="0" fontAlgn="base" latinLnBrk="0" hangingPunct="0">
+              <a:lnSpc>
+                <a:spcPct val="100000"/>
+              </a:lnSpc>
+              <a:spcBef>
+                <a:spcPct val="0"/>
+              </a:spcBef>
+              <a:spcAft>
+                <a:spcPct val="0"/>
+              </a:spcAft>
+              <a:buClrTx/>
+              <a:buSzTx/>
+              <a:buFontTx/>
+              <a:buNone/>
+              <a:tabLst/>
+              <a:defRPr/>
+            </a:pPr>
+            <a:r>
+              <a:rPr kumimoji="0" lang="en-US" sz="1200" b="0" i="0" u="none" strike="noStrike" kern="1200" cap="none" spc="0" normalizeH="0" baseline="0" noProof="0" dirty="0">
+                <a:ln>
+                  <a:noFill/>
+                </a:ln>
+                <a:solidFill>
+                  <a:schemeClr val="bg2">
+                    <a:lumMod val="25000"/>
+                  </a:schemeClr>
+                </a:solidFill>
+                <a:effectLst/>
+                <a:uLnTx/>
+                <a:uFillTx/>
+                <a:latin typeface="Calibri"/>
+                <a:ea typeface="+mn-ea"/>
+                <a:cs typeface="+mn-cs"/>
+              </a:rPr>
+              <a:t>*.</a:t>
+            </a:r>
+            <a:r>
+              <a:rPr kumimoji="0" lang="en-US" sz="1200" b="0" i="0" u="none" strike="noStrike" kern="1200" cap="none" spc="0" normalizeH="0" baseline="0" noProof="0" dirty="0" err="1">
+                <a:ln>
+                  <a:noFill/>
+                </a:ln>
+                <a:solidFill>
+                  <a:schemeClr val="bg2">
+                    <a:lumMod val="25000"/>
+                  </a:schemeClr>
+                </a:solidFill>
+                <a:effectLst/>
+                <a:uLnTx/>
+                <a:uFillTx/>
+                <a:latin typeface="Calibri"/>
+                <a:ea typeface="+mn-ea"/>
+                <a:cs typeface="+mn-cs"/>
+              </a:rPr>
+              <a:t>cbuild.yml</a:t>
+            </a:r>
+            <a:br>
+              <a:rPr kumimoji="0" lang="en-US" sz="1200" b="0" i="0" u="none" strike="noStrike" kern="1200" cap="none" spc="0" normalizeH="0" baseline="0" noProof="0" dirty="0">
+                <a:ln>
+                  <a:noFill/>
+                </a:ln>
+                <a:solidFill>
+                  <a:schemeClr val="bg2">
+                    <a:lumMod val="25000"/>
+                  </a:schemeClr>
+                </a:solidFill>
+                <a:effectLst/>
+                <a:uLnTx/>
+                <a:uFillTx/>
+                <a:latin typeface="Calibri"/>
+                <a:ea typeface="+mn-ea"/>
+                <a:cs typeface="+mn-cs"/>
+              </a:rPr>
+            </a:br>
+            <a:r>
+              <a:rPr kumimoji="0" lang="en-US" sz="1000" b="0" i="0" u="none" strike="noStrike" kern="1200" cap="none" spc="0" normalizeH="0" baseline="0" noProof="0" dirty="0">
+                <a:ln>
+                  <a:noFill/>
+                </a:ln>
+                <a:solidFill>
+                  <a:schemeClr val="bg2">
+                    <a:lumMod val="25000"/>
+                  </a:schemeClr>
+                </a:solidFill>
+                <a:effectLst/>
+                <a:uLnTx/>
+                <a:uFillTx/>
+                <a:latin typeface="Calibri"/>
+                <a:ea typeface="+mn-ea"/>
+                <a:cs typeface="+mn-cs"/>
+              </a:rPr>
+              <a:t>Build information</a:t>
+            </a:r>
+            <a:endParaRPr kumimoji="0" lang="en-GB" sz="1000" b="0" i="0" u="none" strike="noStrike" kern="1200" cap="none" spc="0" normalizeH="0" baseline="0" noProof="0" dirty="0">
+              <a:ln>
+                <a:noFill/>
+              </a:ln>
+              <a:solidFill>
+                <a:schemeClr val="bg2">
+                  <a:lumMod val="25000"/>
+                </a:schemeClr>
+              </a:solidFill>
+              <a:effectLst/>
+              <a:uLnTx/>
+              <a:uFillTx/>
+              <a:latin typeface="Calibri"/>
+              <a:ea typeface="+mn-ea"/>
+              <a:cs typeface="+mn-cs"/>
+            </a:endParaRPr>
+          </a:p>
+        </p:txBody>
+      </p:sp>
+      <p:cxnSp>
+        <p:nvCxnSpPr>
+          <p:cNvPr id="25" name="Straight Arrow Connector 24">
+            <a:extLst>
+              <a:ext uri="{FF2B5EF4-FFF2-40B4-BE49-F238E27FC236}">
+                <a16:creationId xmlns:a16="http://schemas.microsoft.com/office/drawing/2014/main" id="{AE60EF65-4A79-4DC7-4A62-B477FD9D9B32}"/>
+              </a:ext>
+            </a:extLst>
+          </p:cNvPr>
+          <p:cNvCxnSpPr>
+            <a:endCxn id="10" idx="1"/>
+          </p:cNvCxnSpPr>
+          <p:nvPr/>
+        </p:nvCxnSpPr>
+        <p:spPr>
+          <a:xfrm>
+            <a:off x="8764993" y="5682909"/>
+            <a:ext cx="702617" cy="122745"/>
+          </a:xfrm>
+          <a:prstGeom prst="straightConnector1">
+            <a:avLst/>
+          </a:prstGeom>
+          <a:ln w="38100">
+            <a:prstDash val="sysDot"/>
+            <a:tailEnd type="triangle"/>
+          </a:ln>
+        </p:spPr>
+        <p:style>
+          <a:lnRef idx="1">
+            <a:schemeClr val="accent1"/>
+          </a:lnRef>
+          <a:fillRef idx="0">
+            <a:schemeClr val="accent1"/>
+          </a:fillRef>
+          <a:effectRef idx="0">
+            <a:schemeClr val="accent1"/>
+          </a:effectRef>
+          <a:fontRef idx="minor">
+            <a:schemeClr val="tx1"/>
+          </a:fontRef>
+        </p:style>
+      </p:cxnSp>
+      <p:sp>
+        <p:nvSpPr>
+          <p:cNvPr id="30" name="Rectangle 29">
+            <a:extLst>
+              <a:ext uri="{FF2B5EF4-FFF2-40B4-BE49-F238E27FC236}">
+                <a16:creationId xmlns:a16="http://schemas.microsoft.com/office/drawing/2014/main" id="{DE55AD16-61F6-ECB7-E485-9CF75C1E3D3E}"/>
+              </a:ext>
+            </a:extLst>
+          </p:cNvPr>
+          <p:cNvSpPr/>
+          <p:nvPr/>
+        </p:nvSpPr>
+        <p:spPr>
+          <a:xfrm>
+            <a:off x="2296169" y="3772280"/>
+            <a:ext cx="1782539" cy="1377234"/>
+          </a:xfrm>
+          <a:prstGeom prst="rect">
+            <a:avLst/>
+          </a:prstGeom>
+          <a:solidFill>
+            <a:schemeClr val="bg1">
+              <a:lumMod val="50000"/>
+              <a:alpha val="30000"/>
+            </a:schemeClr>
+          </a:solidFill>
+          <a:ln>
+            <a:noFill/>
+          </a:ln>
+        </p:spPr>
+        <p:style>
+          <a:lnRef idx="2">
+            <a:schemeClr val="accent1">
+              <a:shade val="50000"/>
+            </a:schemeClr>
+          </a:lnRef>
+          <a:fillRef idx="1">
+            <a:schemeClr val="accent1"/>
+          </a:fillRef>
+          <a:effectRef idx="0">
+            <a:schemeClr val="accent1"/>
+          </a:effectRef>
+          <a:fontRef idx="minor">
+            <a:schemeClr val="lt1"/>
+          </a:fontRef>
+        </p:style>
+        <p:txBody>
+          <a:bodyPr rtlCol="0" anchor="b" anchorCtr="1"/>
+          <a:lstStyle/>
+          <a:p>
+            <a:pPr algn="ctr"/>
+            <a:r>
+              <a:rPr lang="en-US" dirty="0"/>
+              <a:t>future extension</a:t>
+            </a:r>
+          </a:p>
+        </p:txBody>
+      </p:sp>
+    </p:spTree>
+    <p:extLst>
+      <p:ext uri="{BB962C8B-B14F-4D97-AF65-F5344CB8AC3E}">
+        <p14:creationId xmlns:p14="http://schemas.microsoft.com/office/powerpoint/2010/main" val="2148296209"/>
+      </p:ext>
+    </p:extLst>
+  </p:cSld>
+  <p:clrMapOvr>
+    <a:masterClrMapping/>
+  </p:clrMapOvr>
+</p:sld>
+</file>
+
+<file path=ppt/slides/slide3.xml><?xml version="1.0" encoding="utf-8"?>
+<p:sld xmlns:a="http://schemas.openxmlformats.org/drawingml/2006/main" xmlns:r="http://schemas.openxmlformats.org/officeDocument/2006/relationships" xmlns:p="http://schemas.openxmlformats.org/presentationml/2006/main">
+  <p:cSld>
+    <p:spTree>
+      <p:nvGrpSpPr>
+        <p:cNvPr id="1" name=""/>
+        <p:cNvGrpSpPr/>
+        <p:nvPr/>
+      </p:nvGrpSpPr>
+      <p:grpSpPr>
+        <a:xfrm>
+          <a:off x="0" y="0"/>
+          <a:ext cx="0" cy="0"/>
+          <a:chOff x="0" y="0"/>
+          <a:chExt cx="0" cy="0"/>
+        </a:xfrm>
+      </p:grpSpPr>
+      <p:sp>
+        <p:nvSpPr>
           <p:cNvPr id="33" name="Rectangle 32">
             <a:extLst>
               <a:ext uri="{FF2B5EF4-FFF2-40B4-BE49-F238E27FC236}">
@@ -12977,7 +16758,7 @@
 </p:sld>
 </file>
 
-<file path=ppt/slides/slide3.xml><?xml version="1.0" encoding="utf-8"?>
+<file path=ppt/slides/slide4.xml><?xml version="1.0" encoding="utf-8"?>
 <p:sld xmlns:a="http://schemas.openxmlformats.org/drawingml/2006/main" xmlns:r="http://schemas.openxmlformats.org/officeDocument/2006/relationships" xmlns:p="http://schemas.openxmlformats.org/presentationml/2006/main">
   <p:cSld>
     <p:spTree>
@@ -16441,7 +20222,7 @@
 </p:sld>
 </file>
 
-<file path=ppt/slides/slide4.xml><?xml version="1.0" encoding="utf-8"?>
+<file path=ppt/slides/slide5.xml><?xml version="1.0" encoding="utf-8"?>
 <p:sld xmlns:a="http://schemas.openxmlformats.org/drawingml/2006/main" xmlns:r="http://schemas.openxmlformats.org/officeDocument/2006/relationships" xmlns:p="http://schemas.openxmlformats.org/presentationml/2006/main">
   <p:cSld>
     <p:spTree>
@@ -18731,7 +22512,7 @@
 </p:sld>
 </file>
 
-<file path=ppt/slides/slide5.xml><?xml version="1.0" encoding="utf-8"?>
+<file path=ppt/slides/slide6.xml><?xml version="1.0" encoding="utf-8"?>
 <p:sld xmlns:a="http://schemas.openxmlformats.org/drawingml/2006/main" xmlns:r="http://schemas.openxmlformats.org/officeDocument/2006/relationships" xmlns:p="http://schemas.openxmlformats.org/presentationml/2006/main">
   <p:cSld>
     <p:spTree>
@@ -22429,7 +26210,7 @@
 </p:sld>
 </file>
 
-<file path=ppt/slides/slide6.xml><?xml version="1.0" encoding="utf-8"?>
+<file path=ppt/slides/slide7.xml><?xml version="1.0" encoding="utf-8"?>
 <p:sld xmlns:a="http://schemas.openxmlformats.org/drawingml/2006/main" xmlns:r="http://schemas.openxmlformats.org/officeDocument/2006/relationships" xmlns:p="http://schemas.openxmlformats.org/presentationml/2006/main">
   <p:cSld>
     <p:spTree>

</xml_diff>

<commit_message>
in images: replaced 'generator.yml' with 'genlayer.yml'
</commit_message>
<xml_diff>
--- a/tools/projmgr/docs/Manual/images/overview.pptx
+++ b/tools/projmgr/docs/Manual/images/overview.pptx
@@ -297,7 +297,7 @@
           <a:p>
             <a:fld id="{008FFADC-39A7-449E-8C68-8776E6FB3C1A}" type="datetimeFigureOut">
               <a:rPr lang="en-GB" smtClean="0"/>
-              <a:t>13/09/2022</a:t>
+              <a:t>14/09/2022</a:t>
             </a:fld>
             <a:endParaRPr lang="en-GB"/>
           </a:p>
@@ -474,7 +474,7 @@
           <a:p>
             <a:fld id="{30B9BAAB-B703-4BB5-9D08-B460FC03C23A}" type="datetimeFigureOut">
               <a:rPr lang="en-GB" smtClean="0"/>
-              <a:t>13/09/2022</a:t>
+              <a:t>14/09/2022</a:t>
             </a:fld>
             <a:endParaRPr lang="en-GB"/>
           </a:p>
@@ -12837,7 +12837,7 @@
               <a:t>*.</a:t>
             </a:r>
             <a:r>
-              <a:rPr kumimoji="0" lang="en-US" sz="1200" b="0" i="0" u="none" strike="noStrike" kern="1200" cap="none" spc="0" normalizeH="0" baseline="0" noProof="0" dirty="0" err="1">
+              <a:rPr kumimoji="0" lang="en-US" sz="1200" b="0" i="0" u="none" strike="noStrike" kern="1200" cap="none" spc="0" normalizeH="0" baseline="0" noProof="0">
                 <a:ln>
                   <a:noFill/>
                 </a:ln>
@@ -12853,7 +12853,26 @@
                 <a:ea typeface="+mn-ea"/>
                 <a:cs typeface="+mn-cs"/>
               </a:rPr>
-              <a:t>generator.yml</a:t>
+              <a:t>genlayer.</a:t>
+            </a:r>
+            <a:r>
+              <a:rPr kumimoji="0" lang="en-US" sz="1200" b="0" i="0" u="none" strike="noStrike" kern="1200" cap="none" spc="0" normalizeH="0" baseline="0" noProof="0" dirty="0" err="1">
+                <a:ln>
+                  <a:noFill/>
+                </a:ln>
+                <a:solidFill>
+                  <a:schemeClr val="bg2">
+                    <a:lumMod val="25000"/>
+                  </a:schemeClr>
+                </a:solidFill>
+                <a:effectLst/>
+                <a:uLnTx/>
+                <a:uFillTx/>
+                <a:latin typeface="Calibri"/>
+                <a:ea typeface="+mn-ea"/>
+                <a:cs typeface="+mn-cs"/>
+              </a:rPr>
+              <a:t>yml</a:t>
             </a:r>
             <a:br>
               <a:rPr kumimoji="0" lang="en-US" sz="1200" b="0" i="0" u="none" strike="noStrike" kern="1200" cap="none" spc="0" normalizeH="0" baseline="0" noProof="0" dirty="0">

</xml_diff>

<commit_message>
in images: replaced 'generator.yml' with 'genlayer.yml' (#482)
</commit_message>
<xml_diff>
--- a/tools/projmgr/docs/Manual/images/overview.pptx
+++ b/tools/projmgr/docs/Manual/images/overview.pptx
@@ -297,7 +297,7 @@
           <a:p>
             <a:fld id="{008FFADC-39A7-449E-8C68-8776E6FB3C1A}" type="datetimeFigureOut">
               <a:rPr lang="en-GB" smtClean="0"/>
-              <a:t>13/09/2022</a:t>
+              <a:t>14/09/2022</a:t>
             </a:fld>
             <a:endParaRPr lang="en-GB"/>
           </a:p>
@@ -474,7 +474,7 @@
           <a:p>
             <a:fld id="{30B9BAAB-B703-4BB5-9D08-B460FC03C23A}" type="datetimeFigureOut">
               <a:rPr lang="en-GB" smtClean="0"/>
-              <a:t>13/09/2022</a:t>
+              <a:t>14/09/2022</a:t>
             </a:fld>
             <a:endParaRPr lang="en-GB"/>
           </a:p>
@@ -12837,7 +12837,7 @@
               <a:t>*.</a:t>
             </a:r>
             <a:r>
-              <a:rPr kumimoji="0" lang="en-US" sz="1200" b="0" i="0" u="none" strike="noStrike" kern="1200" cap="none" spc="0" normalizeH="0" baseline="0" noProof="0" dirty="0" err="1">
+              <a:rPr kumimoji="0" lang="en-US" sz="1200" b="0" i="0" u="none" strike="noStrike" kern="1200" cap="none" spc="0" normalizeH="0" baseline="0" noProof="0">
                 <a:ln>
                   <a:noFill/>
                 </a:ln>
@@ -12853,7 +12853,26 @@
                 <a:ea typeface="+mn-ea"/>
                 <a:cs typeface="+mn-cs"/>
               </a:rPr>
-              <a:t>generator.yml</a:t>
+              <a:t>genlayer.</a:t>
+            </a:r>
+            <a:r>
+              <a:rPr kumimoji="0" lang="en-US" sz="1200" b="0" i="0" u="none" strike="noStrike" kern="1200" cap="none" spc="0" normalizeH="0" baseline="0" noProof="0" dirty="0" err="1">
+                <a:ln>
+                  <a:noFill/>
+                </a:ln>
+                <a:solidFill>
+                  <a:schemeClr val="bg2">
+                    <a:lumMod val="25000"/>
+                  </a:schemeClr>
+                </a:solidFill>
+                <a:effectLst/>
+                <a:uLnTx/>
+                <a:uFillTx/>
+                <a:latin typeface="Calibri"/>
+                <a:ea typeface="+mn-ea"/>
+                <a:cs typeface="+mn-cs"/>
+              </a:rPr>
+              <a:t>yml</a:t>
             </a:r>
             <a:br>
               <a:rPr kumimoji="0" lang="en-US" sz="1200" b="0" i="0" u="none" strike="noStrike" kern="1200" cap="none" spc="0" normalizeH="0" baseline="0" noProof="0" dirty="0">

</xml_diff>

<commit_message>
Documentation Improvement: - Linker Script Handling added - YML CBuild Format reflects current status of tools
</commit_message>
<xml_diff>
--- a/tools/projmgr/docs/Manual/images/overview.pptx
+++ b/tools/projmgr/docs/Manual/images/overview.pptx
@@ -5,10 +5,10 @@
     <p:sldMasterId id="2147483661" r:id="rId1"/>
   </p:sldMasterIdLst>
   <p:notesMasterIdLst>
-    <p:notesMasterId r:id="rId12"/>
+    <p:notesMasterId r:id="rId13"/>
   </p:notesMasterIdLst>
   <p:handoutMasterIdLst>
-    <p:handoutMasterId r:id="rId13"/>
+    <p:handoutMasterId r:id="rId14"/>
   </p:handoutMasterIdLst>
   <p:sldIdLst>
     <p:sldId id="345" r:id="rId2"/>
@@ -21,6 +21,7 @@
     <p:sldId id="14965" r:id="rId9"/>
     <p:sldId id="2123260230" r:id="rId10"/>
     <p:sldId id="2123260194" r:id="rId11"/>
+    <p:sldId id="2123260231" r:id="rId12"/>
   </p:sldIdLst>
   <p:sldSz cx="12192000" cy="6858000"/>
   <p:notesSz cx="6858000" cy="9144000"/>
@@ -300,7 +301,7 @@
           <a:p>
             <a:fld id="{008FFADC-39A7-449E-8C68-8776E6FB3C1A}" type="datetimeFigureOut">
               <a:rPr lang="en-GB" smtClean="0"/>
-              <a:t>26/10/2022</a:t>
+              <a:t>29/12/2022</a:t>
             </a:fld>
             <a:endParaRPr lang="en-GB"/>
           </a:p>
@@ -477,7 +478,7 @@
           <a:p>
             <a:fld id="{30B9BAAB-B703-4BB5-9D08-B460FC03C23A}" type="datetimeFigureOut">
               <a:rPr lang="en-GB" smtClean="0"/>
-              <a:t>26/10/2022</a:t>
+              <a:t>29/12/2022</a:t>
             </a:fld>
             <a:endParaRPr lang="en-GB"/>
           </a:p>
@@ -11835,6 +11836,1052 @@
       </p:transition>
     </mc:Fallback>
   </mc:AlternateContent>
+</p:sld>
+</file>
+
+<file path=ppt/slides/slide11.xml><?xml version="1.0" encoding="utf-8"?>
+<p:sld xmlns:a="http://schemas.openxmlformats.org/drawingml/2006/main" xmlns:r="http://schemas.openxmlformats.org/officeDocument/2006/relationships" xmlns:p="http://schemas.openxmlformats.org/presentationml/2006/main">
+  <p:cSld>
+    <p:spTree>
+      <p:nvGrpSpPr>
+        <p:cNvPr id="1" name=""/>
+        <p:cNvGrpSpPr/>
+        <p:nvPr/>
+      </p:nvGrpSpPr>
+      <p:grpSpPr>
+        <a:xfrm>
+          <a:off x="0" y="0"/>
+          <a:ext cx="0" cy="0"/>
+          <a:chOff x="0" y="0"/>
+          <a:chExt cx="0" cy="0"/>
+        </a:xfrm>
+      </p:grpSpPr>
+      <p:sp>
+        <p:nvSpPr>
+          <p:cNvPr id="2" name="Title 1">
+            <a:extLst>
+              <a:ext uri="{FF2B5EF4-FFF2-40B4-BE49-F238E27FC236}">
+                <a16:creationId xmlns:a16="http://schemas.microsoft.com/office/drawing/2014/main" id="{C2722964-CE8F-0F0D-18F3-3DACB5D1E81A}"/>
+              </a:ext>
+            </a:extLst>
+          </p:cNvPr>
+          <p:cNvSpPr>
+            <a:spLocks noGrp="1"/>
+          </p:cNvSpPr>
+          <p:nvPr>
+            <p:ph type="title"/>
+          </p:nvPr>
+        </p:nvSpPr>
+        <p:spPr/>
+        <p:txBody>
+          <a:bodyPr/>
+          <a:lstStyle/>
+          <a:p>
+            <a:r>
+              <a:rPr lang="en-US" dirty="0"/>
+              <a:t>Linker Scatter File Generation (Toolchain independent)</a:t>
+            </a:r>
+          </a:p>
+        </p:txBody>
+      </p:sp>
+      <p:sp>
+        <p:nvSpPr>
+          <p:cNvPr id="3" name="Text Placeholder 2">
+            <a:extLst>
+              <a:ext uri="{FF2B5EF4-FFF2-40B4-BE49-F238E27FC236}">
+                <a16:creationId xmlns:a16="http://schemas.microsoft.com/office/drawing/2014/main" id="{D726DDF8-B5AA-8294-3DAC-751916A4B45E}"/>
+              </a:ext>
+            </a:extLst>
+          </p:cNvPr>
+          <p:cNvSpPr>
+            <a:spLocks noGrp="1"/>
+          </p:cNvSpPr>
+          <p:nvPr>
+            <p:ph type="body" sz="quarter" idx="13"/>
+          </p:nvPr>
+        </p:nvSpPr>
+        <p:spPr/>
+        <p:txBody>
+          <a:bodyPr/>
+          <a:lstStyle/>
+          <a:p>
+            <a:endParaRPr lang="en-US" dirty="0"/>
+          </a:p>
+        </p:txBody>
+      </p:sp>
+      <p:cxnSp>
+        <p:nvCxnSpPr>
+          <p:cNvPr id="21" name="Straight Arrow Connector 20">
+            <a:extLst>
+              <a:ext uri="{FF2B5EF4-FFF2-40B4-BE49-F238E27FC236}">
+                <a16:creationId xmlns:a16="http://schemas.microsoft.com/office/drawing/2014/main" id="{9327AEEF-F1DE-BBFE-F62F-A23F7E25CAB5}"/>
+              </a:ext>
+            </a:extLst>
+          </p:cNvPr>
+          <p:cNvCxnSpPr>
+            <a:cxnSpLocks/>
+          </p:cNvCxnSpPr>
+          <p:nvPr/>
+        </p:nvCxnSpPr>
+        <p:spPr>
+          <a:xfrm>
+            <a:off x="5345058" y="2525555"/>
+            <a:ext cx="0" cy="276726"/>
+          </a:xfrm>
+          <a:prstGeom prst="straightConnector1">
+            <a:avLst/>
+          </a:prstGeom>
+          <a:ln w="38100">
+            <a:tailEnd type="triangle"/>
+          </a:ln>
+        </p:spPr>
+        <p:style>
+          <a:lnRef idx="1">
+            <a:schemeClr val="accent1"/>
+          </a:lnRef>
+          <a:fillRef idx="0">
+            <a:schemeClr val="accent1"/>
+          </a:fillRef>
+          <a:effectRef idx="0">
+            <a:schemeClr val="accent1"/>
+          </a:effectRef>
+          <a:fontRef idx="minor">
+            <a:schemeClr val="tx1"/>
+          </a:fontRef>
+        </p:style>
+      </p:cxnSp>
+      <p:sp>
+        <p:nvSpPr>
+          <p:cNvPr id="22" name="Flowchart: Document 21">
+            <a:extLst>
+              <a:ext uri="{FF2B5EF4-FFF2-40B4-BE49-F238E27FC236}">
+                <a16:creationId xmlns:a16="http://schemas.microsoft.com/office/drawing/2014/main" id="{D65D5CB0-09C8-062E-4206-1CF43BB42330}"/>
+              </a:ext>
+            </a:extLst>
+          </p:cNvPr>
+          <p:cNvSpPr/>
+          <p:nvPr/>
+        </p:nvSpPr>
+        <p:spPr>
+          <a:xfrm>
+            <a:off x="4662617" y="1708476"/>
+            <a:ext cx="1333416" cy="884321"/>
+          </a:xfrm>
+          <a:prstGeom prst="flowChartDocument">
+            <a:avLst/>
+          </a:prstGeom>
+          <a:solidFill>
+            <a:schemeClr val="accent1"/>
+          </a:solidFill>
+          <a:ln w="19050">
+            <a:solidFill>
+              <a:schemeClr val="tx1"/>
+            </a:solidFill>
+          </a:ln>
+        </p:spPr>
+        <p:style>
+          <a:lnRef idx="2">
+            <a:schemeClr val="accent1">
+              <a:shade val="50000"/>
+            </a:schemeClr>
+          </a:lnRef>
+          <a:fillRef idx="1">
+            <a:schemeClr val="accent1"/>
+          </a:fillRef>
+          <a:effectRef idx="0">
+            <a:schemeClr val="accent1"/>
+          </a:effectRef>
+          <a:fontRef idx="minor">
+            <a:schemeClr val="lt1"/>
+          </a:fontRef>
+        </p:style>
+        <p:txBody>
+          <a:bodyPr rtlCol="0" anchor="ctr"/>
+          <a:lstStyle/>
+          <a:p>
+            <a:pPr marL="0" marR="0" lvl="0" indent="0" algn="ctr" defTabSz="914400" rtl="0" eaLnBrk="0" fontAlgn="base" latinLnBrk="0" hangingPunct="0">
+              <a:lnSpc>
+                <a:spcPct val="100000"/>
+              </a:lnSpc>
+              <a:spcBef>
+                <a:spcPct val="0"/>
+              </a:spcBef>
+              <a:spcAft>
+                <a:spcPct val="0"/>
+              </a:spcAft>
+              <a:buClrTx/>
+              <a:buSzTx/>
+              <a:buFontTx/>
+              <a:buNone/>
+              <a:tabLst/>
+              <a:defRPr/>
+            </a:pPr>
+            <a:r>
+              <a:rPr lang="en-US" sz="1200" b="1" dirty="0" err="1">
+                <a:solidFill>
+                  <a:srgbClr val="FFFFFF"/>
+                </a:solidFill>
+                <a:latin typeface="Calibri"/>
+              </a:rPr>
+              <a:t>region_defs.h</a:t>
+            </a:r>
+            <a:r>
+              <a:rPr kumimoji="0" lang="en-US" sz="1200" b="1" i="0" u="none" strike="noStrike" kern="1200" cap="none" spc="0" normalizeH="0" baseline="0" noProof="0" dirty="0">
+                <a:ln>
+                  <a:noFill/>
+                </a:ln>
+                <a:solidFill>
+                  <a:srgbClr val="FFFFFF"/>
+                </a:solidFill>
+                <a:effectLst/>
+                <a:uLnTx/>
+                <a:uFillTx/>
+                <a:latin typeface="Calibri"/>
+                <a:ea typeface="+mn-ea"/>
+                <a:cs typeface="+mn-cs"/>
+              </a:rPr>
+              <a:t> </a:t>
+            </a:r>
+            <a:br>
+              <a:rPr kumimoji="0" lang="en-US" sz="1200" b="1" i="0" u="none" strike="noStrike" kern="1200" cap="none" spc="0" normalizeH="0" baseline="0" noProof="0" dirty="0">
+                <a:ln>
+                  <a:noFill/>
+                </a:ln>
+                <a:solidFill>
+                  <a:srgbClr val="FFFFFF"/>
+                </a:solidFill>
+                <a:effectLst/>
+                <a:uLnTx/>
+                <a:uFillTx/>
+                <a:latin typeface="Calibri"/>
+                <a:ea typeface="+mn-ea"/>
+                <a:cs typeface="+mn-cs"/>
+              </a:rPr>
+            </a:br>
+            <a:r>
+              <a:rPr kumimoji="0" lang="en-US" sz="1100" b="0" i="0" u="none" strike="noStrike" kern="1200" cap="none" spc="0" normalizeH="0" baseline="0" noProof="0" dirty="0">
+                <a:ln>
+                  <a:noFill/>
+                </a:ln>
+                <a:solidFill>
+                  <a:srgbClr val="FFFFFF"/>
+                </a:solidFill>
+                <a:effectLst/>
+                <a:uLnTx/>
+                <a:uFillTx/>
+                <a:latin typeface="Calibri"/>
+                <a:ea typeface="+mn-ea"/>
+                <a:cs typeface="+mn-cs"/>
+              </a:rPr>
+              <a:t>Board or Device</a:t>
+            </a:r>
+            <a:br>
+              <a:rPr kumimoji="0" lang="en-US" sz="1100" b="0" i="0" u="none" strike="noStrike" kern="1200" cap="none" spc="0" normalizeH="0" baseline="0" noProof="0" dirty="0">
+                <a:ln>
+                  <a:noFill/>
+                </a:ln>
+                <a:solidFill>
+                  <a:srgbClr val="FFFFFF"/>
+                </a:solidFill>
+                <a:effectLst/>
+                <a:uLnTx/>
+                <a:uFillTx/>
+                <a:latin typeface="Calibri"/>
+                <a:ea typeface="+mn-ea"/>
+                <a:cs typeface="+mn-cs"/>
+              </a:rPr>
+            </a:br>
+            <a:r>
+              <a:rPr kumimoji="0" lang="en-US" sz="1100" b="0" i="0" u="none" strike="noStrike" kern="1200" cap="none" spc="0" normalizeH="0" baseline="0" noProof="0" dirty="0">
+                <a:ln>
+                  <a:noFill/>
+                </a:ln>
+                <a:solidFill>
+                  <a:srgbClr val="FFFFFF"/>
+                </a:solidFill>
+                <a:effectLst/>
+                <a:uLnTx/>
+                <a:uFillTx/>
+                <a:latin typeface="Calibri"/>
+                <a:ea typeface="+mn-ea"/>
+                <a:cs typeface="+mn-cs"/>
+              </a:rPr>
+              <a:t>Memory Definitions</a:t>
+            </a:r>
+            <a:endParaRPr lang="en-US" sz="1100" dirty="0">
+              <a:solidFill>
+                <a:srgbClr val="FFFFFF"/>
+              </a:solidFill>
+              <a:latin typeface="Calibri"/>
+            </a:endParaRPr>
+          </a:p>
+        </p:txBody>
+      </p:sp>
+      <p:cxnSp>
+        <p:nvCxnSpPr>
+          <p:cNvPr id="31" name="Straight Arrow Connector 30">
+            <a:extLst>
+              <a:ext uri="{FF2B5EF4-FFF2-40B4-BE49-F238E27FC236}">
+                <a16:creationId xmlns:a16="http://schemas.microsoft.com/office/drawing/2014/main" id="{762A54AC-439F-5D0C-8C39-0399B2E1B2CF}"/>
+              </a:ext>
+            </a:extLst>
+          </p:cNvPr>
+          <p:cNvCxnSpPr>
+            <a:cxnSpLocks/>
+          </p:cNvCxnSpPr>
+          <p:nvPr/>
+        </p:nvCxnSpPr>
+        <p:spPr>
+          <a:xfrm flipV="1">
+            <a:off x="5334032" y="3664807"/>
+            <a:ext cx="0" cy="276726"/>
+          </a:xfrm>
+          <a:prstGeom prst="straightConnector1">
+            <a:avLst/>
+          </a:prstGeom>
+          <a:ln w="38100">
+            <a:tailEnd type="triangle"/>
+          </a:ln>
+        </p:spPr>
+        <p:style>
+          <a:lnRef idx="1">
+            <a:schemeClr val="accent1"/>
+          </a:lnRef>
+          <a:fillRef idx="0">
+            <a:schemeClr val="accent1"/>
+          </a:fillRef>
+          <a:effectRef idx="0">
+            <a:schemeClr val="accent1"/>
+          </a:effectRef>
+          <a:fontRef idx="minor">
+            <a:schemeClr val="tx1"/>
+          </a:fontRef>
+        </p:style>
+      </p:cxnSp>
+      <p:sp>
+        <p:nvSpPr>
+          <p:cNvPr id="30" name="Flowchart: Document 29">
+            <a:extLst>
+              <a:ext uri="{FF2B5EF4-FFF2-40B4-BE49-F238E27FC236}">
+                <a16:creationId xmlns:a16="http://schemas.microsoft.com/office/drawing/2014/main" id="{680DA59D-4A81-7D47-2085-D8DB1D856722}"/>
+              </a:ext>
+            </a:extLst>
+          </p:cNvPr>
+          <p:cNvSpPr/>
+          <p:nvPr/>
+        </p:nvSpPr>
+        <p:spPr>
+          <a:xfrm>
+            <a:off x="4670188" y="3911312"/>
+            <a:ext cx="1333416" cy="873311"/>
+          </a:xfrm>
+          <a:prstGeom prst="flowChartDocument">
+            <a:avLst/>
+          </a:prstGeom>
+          <a:solidFill>
+            <a:schemeClr val="accent2">
+              <a:lumMod val="75000"/>
+              <a:lumOff val="25000"/>
+            </a:schemeClr>
+          </a:solidFill>
+          <a:ln w="19050">
+            <a:solidFill>
+              <a:schemeClr val="tx1"/>
+            </a:solidFill>
+          </a:ln>
+        </p:spPr>
+        <p:style>
+          <a:lnRef idx="2">
+            <a:schemeClr val="accent1">
+              <a:shade val="50000"/>
+            </a:schemeClr>
+          </a:lnRef>
+          <a:fillRef idx="1">
+            <a:schemeClr val="accent1"/>
+          </a:fillRef>
+          <a:effectRef idx="0">
+            <a:schemeClr val="accent1"/>
+          </a:effectRef>
+          <a:fontRef idx="minor">
+            <a:schemeClr val="lt1"/>
+          </a:fontRef>
+        </p:style>
+        <p:txBody>
+          <a:bodyPr rtlCol="0" anchor="ctr"/>
+          <a:lstStyle/>
+          <a:p>
+            <a:pPr marL="0" marR="0" lvl="0" indent="0" algn="ctr" defTabSz="914400" rtl="0" eaLnBrk="0" fontAlgn="base" latinLnBrk="0" hangingPunct="0">
+              <a:lnSpc>
+                <a:spcPct val="100000"/>
+              </a:lnSpc>
+              <a:spcBef>
+                <a:spcPct val="0"/>
+              </a:spcBef>
+              <a:spcAft>
+                <a:spcPct val="0"/>
+              </a:spcAft>
+              <a:buClrTx/>
+              <a:buSzTx/>
+              <a:buFontTx/>
+              <a:buNone/>
+              <a:tabLst/>
+              <a:defRPr/>
+            </a:pPr>
+            <a:r>
+              <a:rPr kumimoji="0" lang="en-US" sz="1200" b="0" i="0" u="none" strike="noStrike" kern="1200" cap="none" spc="0" normalizeH="0" baseline="0" noProof="0" dirty="0">
+                <a:ln>
+                  <a:noFill/>
+                </a:ln>
+                <a:solidFill>
+                  <a:srgbClr val="FFFFFF"/>
+                </a:solidFill>
+                <a:effectLst/>
+                <a:uLnTx/>
+                <a:uFillTx/>
+                <a:latin typeface="Calibri"/>
+                <a:ea typeface="+mn-ea"/>
+                <a:cs typeface="+mn-cs"/>
+              </a:rPr>
+              <a:t>Compiler specific Scatter File Template</a:t>
+            </a:r>
+            <a:endParaRPr kumimoji="0" lang="en-GB" sz="1000" b="0" i="0" u="none" strike="noStrike" kern="1200" cap="none" spc="0" normalizeH="0" baseline="0" noProof="0" dirty="0">
+              <a:ln>
+                <a:noFill/>
+              </a:ln>
+              <a:solidFill>
+                <a:srgbClr val="FFFFFF"/>
+              </a:solidFill>
+              <a:effectLst/>
+              <a:uLnTx/>
+              <a:uFillTx/>
+              <a:latin typeface="Calibri"/>
+              <a:ea typeface="+mn-ea"/>
+              <a:cs typeface="+mn-cs"/>
+            </a:endParaRPr>
+          </a:p>
+        </p:txBody>
+      </p:sp>
+      <p:sp>
+        <p:nvSpPr>
+          <p:cNvPr id="32" name="Rectangle 31">
+            <a:extLst>
+              <a:ext uri="{FF2B5EF4-FFF2-40B4-BE49-F238E27FC236}">
+                <a16:creationId xmlns:a16="http://schemas.microsoft.com/office/drawing/2014/main" id="{0956729D-4D1E-4789-E4C3-8C27991A93F0}"/>
+              </a:ext>
+            </a:extLst>
+          </p:cNvPr>
+          <p:cNvSpPr/>
+          <p:nvPr/>
+        </p:nvSpPr>
+        <p:spPr>
+          <a:xfrm>
+            <a:off x="4662617" y="2785498"/>
+            <a:ext cx="1340987" cy="884321"/>
+          </a:xfrm>
+          <a:prstGeom prst="rect">
+            <a:avLst/>
+          </a:prstGeom>
+          <a:solidFill>
+            <a:srgbClr val="92D050"/>
+          </a:solidFill>
+          <a:ln w="19050">
+            <a:solidFill>
+              <a:schemeClr val="tx1"/>
+            </a:solidFill>
+          </a:ln>
+        </p:spPr>
+        <p:style>
+          <a:lnRef idx="2">
+            <a:schemeClr val="accent1">
+              <a:shade val="50000"/>
+            </a:schemeClr>
+          </a:lnRef>
+          <a:fillRef idx="1">
+            <a:schemeClr val="accent1"/>
+          </a:fillRef>
+          <a:effectRef idx="0">
+            <a:schemeClr val="accent1"/>
+          </a:effectRef>
+          <a:fontRef idx="minor">
+            <a:schemeClr val="lt1"/>
+          </a:fontRef>
+        </p:style>
+        <p:txBody>
+          <a:bodyPr rtlCol="0" anchor="ctr"/>
+          <a:lstStyle/>
+          <a:p>
+            <a:pPr marL="0" marR="0" lvl="0" indent="0" algn="ctr" defTabSz="914400" rtl="0" eaLnBrk="0" fontAlgn="base" latinLnBrk="0" hangingPunct="0">
+              <a:lnSpc>
+                <a:spcPct val="100000"/>
+              </a:lnSpc>
+              <a:spcBef>
+                <a:spcPct val="0"/>
+              </a:spcBef>
+              <a:spcAft>
+                <a:spcPct val="0"/>
+              </a:spcAft>
+              <a:buClrTx/>
+              <a:buSzTx/>
+              <a:buFontTx/>
+              <a:buNone/>
+              <a:tabLst/>
+              <a:defRPr/>
+            </a:pPr>
+            <a:r>
+              <a:rPr kumimoji="0" lang="en-US" sz="1400" b="0" i="0" u="none" strike="noStrike" kern="1200" cap="none" spc="0" normalizeH="0" baseline="0" noProof="0" dirty="0">
+                <a:ln>
+                  <a:noFill/>
+                </a:ln>
+                <a:solidFill>
+                  <a:srgbClr val="FFFFFF"/>
+                </a:solidFill>
+                <a:effectLst/>
+                <a:uLnTx/>
+                <a:uFillTx/>
+                <a:latin typeface="Calibri"/>
+                <a:ea typeface="+mn-ea"/>
+                <a:cs typeface="+mn-cs"/>
+              </a:rPr>
+              <a:t>C </a:t>
+            </a:r>
+            <a:r>
+              <a:rPr lang="en-US" sz="1400" dirty="0">
+                <a:solidFill>
+                  <a:srgbClr val="FFFFFF"/>
+                </a:solidFill>
+                <a:latin typeface="Calibri"/>
+              </a:rPr>
+              <a:t>Preprocessor</a:t>
+            </a:r>
+            <a:endParaRPr kumimoji="0" lang="en-GB" sz="1400" b="0" i="0" u="none" strike="noStrike" kern="1200" cap="none" spc="0" normalizeH="0" baseline="0" noProof="0" dirty="0">
+              <a:ln>
+                <a:noFill/>
+              </a:ln>
+              <a:solidFill>
+                <a:srgbClr val="FFFFFF"/>
+              </a:solidFill>
+              <a:effectLst/>
+              <a:uLnTx/>
+              <a:uFillTx/>
+              <a:latin typeface="Calibri"/>
+              <a:ea typeface="+mn-ea"/>
+              <a:cs typeface="+mn-cs"/>
+            </a:endParaRPr>
+          </a:p>
+        </p:txBody>
+      </p:sp>
+      <p:sp>
+        <p:nvSpPr>
+          <p:cNvPr id="33" name="Flowchart: Document 32">
+            <a:extLst>
+              <a:ext uri="{FF2B5EF4-FFF2-40B4-BE49-F238E27FC236}">
+                <a16:creationId xmlns:a16="http://schemas.microsoft.com/office/drawing/2014/main" id="{6AB1847D-DC39-C2FC-ACB8-7546D31C5F51}"/>
+              </a:ext>
+            </a:extLst>
+          </p:cNvPr>
+          <p:cNvSpPr/>
+          <p:nvPr/>
+        </p:nvSpPr>
+        <p:spPr>
+          <a:xfrm>
+            <a:off x="6343650" y="2802282"/>
+            <a:ext cx="1340986" cy="862526"/>
+          </a:xfrm>
+          <a:prstGeom prst="flowChartDocument">
+            <a:avLst/>
+          </a:prstGeom>
+          <a:solidFill>
+            <a:schemeClr val="accent5">
+              <a:lumMod val="75000"/>
+            </a:schemeClr>
+          </a:solidFill>
+          <a:ln w="19050">
+            <a:solidFill>
+              <a:schemeClr val="tx1"/>
+            </a:solidFill>
+          </a:ln>
+        </p:spPr>
+        <p:style>
+          <a:lnRef idx="2">
+            <a:schemeClr val="accent1">
+              <a:shade val="50000"/>
+            </a:schemeClr>
+          </a:lnRef>
+          <a:fillRef idx="1">
+            <a:schemeClr val="accent1"/>
+          </a:fillRef>
+          <a:effectRef idx="0">
+            <a:schemeClr val="accent1"/>
+          </a:effectRef>
+          <a:fontRef idx="minor">
+            <a:schemeClr val="lt1"/>
+          </a:fontRef>
+        </p:style>
+        <p:txBody>
+          <a:bodyPr rtlCol="0" anchor="ctr"/>
+          <a:lstStyle/>
+          <a:p>
+            <a:pPr marL="0" marR="0" lvl="0" indent="0" algn="ctr" defTabSz="914400" rtl="0" eaLnBrk="0" fontAlgn="base" latinLnBrk="0" hangingPunct="0">
+              <a:lnSpc>
+                <a:spcPct val="100000"/>
+              </a:lnSpc>
+              <a:spcBef>
+                <a:spcPct val="0"/>
+              </a:spcBef>
+              <a:spcAft>
+                <a:spcPct val="0"/>
+              </a:spcAft>
+              <a:buClrTx/>
+              <a:buSzTx/>
+              <a:buFontTx/>
+              <a:buNone/>
+              <a:tabLst/>
+              <a:defRPr/>
+            </a:pPr>
+            <a:r>
+              <a:rPr lang="en-US" sz="1200" b="1" dirty="0">
+                <a:solidFill>
+                  <a:srgbClr val="FFFFFF"/>
+                </a:solidFill>
+                <a:latin typeface="Calibri"/>
+              </a:rPr>
+              <a:t>Linker</a:t>
+            </a:r>
+            <a:br>
+              <a:rPr lang="en-US" sz="1200" b="1" dirty="0">
+                <a:solidFill>
+                  <a:srgbClr val="FFFFFF"/>
+                </a:solidFill>
+                <a:latin typeface="Calibri"/>
+              </a:rPr>
+            </a:br>
+            <a:r>
+              <a:rPr lang="en-US" sz="1200" b="1" dirty="0">
+                <a:solidFill>
+                  <a:srgbClr val="FFFFFF"/>
+                </a:solidFill>
+                <a:latin typeface="Calibri"/>
+              </a:rPr>
+              <a:t>Scatter File</a:t>
+            </a:r>
+            <a:endParaRPr lang="en-US" sz="1100" dirty="0">
+              <a:solidFill>
+                <a:srgbClr val="FFFFFF"/>
+              </a:solidFill>
+              <a:latin typeface="Calibri"/>
+            </a:endParaRPr>
+          </a:p>
+        </p:txBody>
+      </p:sp>
+      <p:cxnSp>
+        <p:nvCxnSpPr>
+          <p:cNvPr id="34" name="Straight Arrow Connector 33">
+            <a:extLst>
+              <a:ext uri="{FF2B5EF4-FFF2-40B4-BE49-F238E27FC236}">
+                <a16:creationId xmlns:a16="http://schemas.microsoft.com/office/drawing/2014/main" id="{0EAFB0EC-0BEB-61AF-ED8E-AB8E9E397245}"/>
+              </a:ext>
+            </a:extLst>
+          </p:cNvPr>
+          <p:cNvCxnSpPr>
+            <a:cxnSpLocks/>
+          </p:cNvCxnSpPr>
+          <p:nvPr/>
+        </p:nvCxnSpPr>
+        <p:spPr>
+          <a:xfrm>
+            <a:off x="6003604" y="3241695"/>
+            <a:ext cx="340046" cy="2746"/>
+          </a:xfrm>
+          <a:prstGeom prst="straightConnector1">
+            <a:avLst/>
+          </a:prstGeom>
+          <a:ln w="38100">
+            <a:tailEnd type="triangle"/>
+          </a:ln>
+        </p:spPr>
+        <p:style>
+          <a:lnRef idx="1">
+            <a:schemeClr val="accent1"/>
+          </a:lnRef>
+          <a:fillRef idx="0">
+            <a:schemeClr val="accent1"/>
+          </a:fillRef>
+          <a:effectRef idx="0">
+            <a:schemeClr val="accent1"/>
+          </a:effectRef>
+          <a:fontRef idx="minor">
+            <a:schemeClr val="tx1"/>
+          </a:fontRef>
+        </p:style>
+      </p:cxnSp>
+      <p:sp>
+        <p:nvSpPr>
+          <p:cNvPr id="38" name="TextBox 37">
+            <a:extLst>
+              <a:ext uri="{FF2B5EF4-FFF2-40B4-BE49-F238E27FC236}">
+                <a16:creationId xmlns:a16="http://schemas.microsoft.com/office/drawing/2014/main" id="{6F9E6868-CA06-CBDB-87B1-29216E1BC75D}"/>
+              </a:ext>
+            </a:extLst>
+          </p:cNvPr>
+          <p:cNvSpPr txBox="1"/>
+          <p:nvPr/>
+        </p:nvSpPr>
+        <p:spPr>
+          <a:xfrm>
+            <a:off x="885825" y="1676400"/>
+            <a:ext cx="3438525" cy="332399"/>
+          </a:xfrm>
+          <a:prstGeom prst="rect">
+            <a:avLst/>
+          </a:prstGeom>
+          <a:noFill/>
+        </p:spPr>
+        <p:txBody>
+          <a:bodyPr wrap="square" lIns="0" tIns="0" rIns="0" bIns="0" rtlCol="0">
+            <a:spAutoFit/>
+          </a:bodyPr>
+          <a:lstStyle/>
+          <a:p>
+            <a:pPr marL="0" indent="0" algn="l" defTabSz="914400" rtl="0" eaLnBrk="1" latinLnBrk="0" hangingPunct="1">
+              <a:lnSpc>
+                <a:spcPct val="90000"/>
+              </a:lnSpc>
+              <a:spcBef>
+                <a:spcPts val="0"/>
+              </a:spcBef>
+              <a:spcAft>
+                <a:spcPts val="600"/>
+              </a:spcAft>
+              <a:buFont typeface="Arial" panose="020B0604020202020204" pitchFamily="34" charset="0"/>
+              <a:buNone/>
+            </a:pPr>
+            <a:r>
+              <a:rPr lang="en-US" sz="1200" dirty="0">
+                <a:solidFill>
+                  <a:schemeClr val="tx2"/>
+                </a:solidFill>
+              </a:rPr>
+              <a:t>If </a:t>
+            </a:r>
+            <a:r>
+              <a:rPr lang="en-US" sz="1200" b="1" dirty="0" err="1">
+                <a:solidFill>
+                  <a:schemeClr val="tx2"/>
+                </a:solidFill>
+              </a:rPr>
+              <a:t>region_defs.h</a:t>
+            </a:r>
+            <a:r>
+              <a:rPr lang="en-US" sz="1200" dirty="0">
+                <a:solidFill>
+                  <a:schemeClr val="tx2"/>
+                </a:solidFill>
+              </a:rPr>
+              <a:t> does not exist</a:t>
+            </a:r>
+            <a:br>
+              <a:rPr lang="en-US" sz="1200" dirty="0">
+                <a:solidFill>
+                  <a:schemeClr val="tx2"/>
+                </a:solidFill>
+              </a:rPr>
+            </a:br>
+            <a:r>
+              <a:rPr lang="en-US" sz="1200" dirty="0">
+                <a:solidFill>
+                  <a:schemeClr val="tx2"/>
+                </a:solidFill>
+              </a:rPr>
+              <a:t>it is generated by </a:t>
+            </a:r>
+            <a:r>
+              <a:rPr lang="en-US" sz="1200" dirty="0" err="1">
+                <a:solidFill>
+                  <a:schemeClr val="tx2"/>
+                </a:solidFill>
+              </a:rPr>
+              <a:t>csolution</a:t>
+            </a:r>
+            <a:r>
+              <a:rPr lang="en-US" sz="1200" dirty="0">
+                <a:solidFill>
+                  <a:schemeClr val="tx2"/>
+                </a:solidFill>
+              </a:rPr>
+              <a:t> based on DFP information</a:t>
+            </a:r>
+            <a:endParaRPr lang="en-US" sz="1200" kern="1200" dirty="0">
+              <a:solidFill>
+                <a:schemeClr val="tx2"/>
+              </a:solidFill>
+              <a:latin typeface="+mn-lt"/>
+              <a:ea typeface="+mn-ea"/>
+              <a:cs typeface="+mn-cs"/>
+            </a:endParaRPr>
+          </a:p>
+        </p:txBody>
+      </p:sp>
+      <p:sp>
+        <p:nvSpPr>
+          <p:cNvPr id="39" name="TextBox 38">
+            <a:extLst>
+              <a:ext uri="{FF2B5EF4-FFF2-40B4-BE49-F238E27FC236}">
+                <a16:creationId xmlns:a16="http://schemas.microsoft.com/office/drawing/2014/main" id="{563B620E-D6E7-93EA-E838-EF0AF129CC19}"/>
+              </a:ext>
+            </a:extLst>
+          </p:cNvPr>
+          <p:cNvSpPr txBox="1"/>
+          <p:nvPr/>
+        </p:nvSpPr>
+        <p:spPr>
+          <a:xfrm>
+            <a:off x="885825" y="2142149"/>
+            <a:ext cx="3438525" cy="332399"/>
+          </a:xfrm>
+          <a:prstGeom prst="rect">
+            <a:avLst/>
+          </a:prstGeom>
+          <a:noFill/>
+        </p:spPr>
+        <p:txBody>
+          <a:bodyPr wrap="square" lIns="0" tIns="0" rIns="0" bIns="0" rtlCol="0">
+            <a:spAutoFit/>
+          </a:bodyPr>
+          <a:lstStyle/>
+          <a:p>
+            <a:pPr marL="0" indent="0" algn="l" defTabSz="914400" rtl="0" eaLnBrk="1" latinLnBrk="0" hangingPunct="1">
+              <a:lnSpc>
+                <a:spcPct val="90000"/>
+              </a:lnSpc>
+              <a:spcBef>
+                <a:spcPts val="0"/>
+              </a:spcBef>
+              <a:spcAft>
+                <a:spcPts val="600"/>
+              </a:spcAft>
+              <a:buFont typeface="Arial" panose="020B0604020202020204" pitchFamily="34" charset="0"/>
+              <a:buNone/>
+            </a:pPr>
+            <a:r>
+              <a:rPr lang="en-US" sz="1200" b="1" dirty="0" err="1">
+                <a:solidFill>
+                  <a:schemeClr val="tx2"/>
+                </a:solidFill>
+              </a:rPr>
+              <a:t>region_defs.h</a:t>
+            </a:r>
+            <a:r>
+              <a:rPr lang="en-US" sz="1200" dirty="0">
+                <a:solidFill>
+                  <a:schemeClr val="tx2"/>
+                </a:solidFill>
+              </a:rPr>
+              <a:t> may be provided as part of a component or a software layer</a:t>
+            </a:r>
+            <a:endParaRPr lang="en-US" sz="1200" kern="1200" dirty="0">
+              <a:solidFill>
+                <a:schemeClr val="tx2"/>
+              </a:solidFill>
+              <a:latin typeface="+mn-lt"/>
+              <a:ea typeface="+mn-ea"/>
+              <a:cs typeface="+mn-cs"/>
+            </a:endParaRPr>
+          </a:p>
+        </p:txBody>
+      </p:sp>
+      <p:sp>
+        <p:nvSpPr>
+          <p:cNvPr id="40" name="TextBox 39">
+            <a:extLst>
+              <a:ext uri="{FF2B5EF4-FFF2-40B4-BE49-F238E27FC236}">
+                <a16:creationId xmlns:a16="http://schemas.microsoft.com/office/drawing/2014/main" id="{00523719-9ACA-9C05-94F0-52BDFABE951A}"/>
+              </a:ext>
+            </a:extLst>
+          </p:cNvPr>
+          <p:cNvSpPr txBox="1"/>
+          <p:nvPr/>
+        </p:nvSpPr>
+        <p:spPr>
+          <a:xfrm>
+            <a:off x="885824" y="4015568"/>
+            <a:ext cx="3438525" cy="332399"/>
+          </a:xfrm>
+          <a:prstGeom prst="rect">
+            <a:avLst/>
+          </a:prstGeom>
+          <a:noFill/>
+        </p:spPr>
+        <p:txBody>
+          <a:bodyPr wrap="square" lIns="0" tIns="0" rIns="0" bIns="0" rtlCol="0">
+            <a:spAutoFit/>
+          </a:bodyPr>
+          <a:lstStyle/>
+          <a:p>
+            <a:pPr marL="0" indent="0" algn="l" defTabSz="914400" rtl="0" eaLnBrk="1" latinLnBrk="0" hangingPunct="1">
+              <a:lnSpc>
+                <a:spcPct val="90000"/>
+              </a:lnSpc>
+              <a:spcBef>
+                <a:spcPts val="0"/>
+              </a:spcBef>
+              <a:spcAft>
+                <a:spcPts val="600"/>
+              </a:spcAft>
+              <a:buFont typeface="Arial" panose="020B0604020202020204" pitchFamily="34" charset="0"/>
+              <a:buNone/>
+            </a:pPr>
+            <a:r>
+              <a:rPr lang="en-US" sz="1200" b="1" dirty="0">
+                <a:solidFill>
+                  <a:schemeClr val="tx2"/>
+                </a:solidFill>
+              </a:rPr>
+              <a:t>Compiler specific scatter files</a:t>
+            </a:r>
+            <a:r>
+              <a:rPr lang="en-US" sz="1200" dirty="0">
+                <a:solidFill>
+                  <a:schemeClr val="tx2"/>
+                </a:solidFill>
+              </a:rPr>
+              <a:t> are provided in the</a:t>
+            </a:r>
+            <a:br>
+              <a:rPr lang="en-US" sz="1200" dirty="0">
+                <a:solidFill>
+                  <a:schemeClr val="tx2"/>
+                </a:solidFill>
+              </a:rPr>
+            </a:br>
+            <a:r>
+              <a:rPr lang="en-US" sz="1200" b="1" dirty="0">
+                <a:solidFill>
+                  <a:schemeClr val="tx2"/>
+                </a:solidFill>
+              </a:rPr>
+              <a:t>.\</a:t>
+            </a:r>
+            <a:r>
+              <a:rPr lang="en-US" sz="1200" b="1" dirty="0" err="1">
+                <a:solidFill>
+                  <a:schemeClr val="tx2"/>
+                </a:solidFill>
+              </a:rPr>
+              <a:t>ect</a:t>
+            </a:r>
+            <a:r>
+              <a:rPr lang="en-US" sz="1200" dirty="0">
+                <a:solidFill>
+                  <a:schemeClr val="tx2"/>
+                </a:solidFill>
+              </a:rPr>
+              <a:t> directory of </a:t>
+            </a:r>
+            <a:r>
+              <a:rPr lang="en-US" sz="1200" dirty="0" err="1">
+                <a:solidFill>
+                  <a:schemeClr val="tx2"/>
+                </a:solidFill>
+              </a:rPr>
+              <a:t>csolution</a:t>
+            </a:r>
+            <a:endParaRPr lang="en-US" sz="1200" kern="1200" dirty="0">
+              <a:solidFill>
+                <a:schemeClr val="tx2"/>
+              </a:solidFill>
+              <a:latin typeface="+mn-lt"/>
+              <a:ea typeface="+mn-ea"/>
+              <a:cs typeface="+mn-cs"/>
+            </a:endParaRPr>
+          </a:p>
+        </p:txBody>
+      </p:sp>
+      <p:sp>
+        <p:nvSpPr>
+          <p:cNvPr id="41" name="TextBox 40">
+            <a:extLst>
+              <a:ext uri="{FF2B5EF4-FFF2-40B4-BE49-F238E27FC236}">
+                <a16:creationId xmlns:a16="http://schemas.microsoft.com/office/drawing/2014/main" id="{14F1D48C-AE07-600B-28FF-10FF814886EB}"/>
+              </a:ext>
+            </a:extLst>
+          </p:cNvPr>
+          <p:cNvSpPr txBox="1"/>
+          <p:nvPr/>
+        </p:nvSpPr>
+        <p:spPr>
+          <a:xfrm>
+            <a:off x="7915274" y="2804840"/>
+            <a:ext cx="3438525" cy="332399"/>
+          </a:xfrm>
+          <a:prstGeom prst="rect">
+            <a:avLst/>
+          </a:prstGeom>
+          <a:noFill/>
+        </p:spPr>
+        <p:txBody>
+          <a:bodyPr wrap="square" lIns="0" tIns="0" rIns="0" bIns="0" rtlCol="0">
+            <a:spAutoFit/>
+          </a:bodyPr>
+          <a:lstStyle/>
+          <a:p>
+            <a:pPr marL="0" indent="0" algn="l" defTabSz="914400" rtl="0" eaLnBrk="1" latinLnBrk="0" hangingPunct="1">
+              <a:lnSpc>
+                <a:spcPct val="90000"/>
+              </a:lnSpc>
+              <a:spcBef>
+                <a:spcPts val="0"/>
+              </a:spcBef>
+              <a:spcAft>
+                <a:spcPts val="600"/>
+              </a:spcAft>
+              <a:buFont typeface="Arial" panose="020B0604020202020204" pitchFamily="34" charset="0"/>
+              <a:buNone/>
+            </a:pPr>
+            <a:r>
+              <a:rPr lang="en-US" sz="1200" dirty="0">
+                <a:solidFill>
+                  <a:schemeClr val="tx2"/>
+                </a:solidFill>
+              </a:rPr>
+              <a:t>If no </a:t>
+            </a:r>
+            <a:r>
+              <a:rPr lang="en-US" sz="1200" b="1" dirty="0">
+                <a:solidFill>
+                  <a:schemeClr val="tx2"/>
+                </a:solidFill>
+              </a:rPr>
+              <a:t>Linker Scatter File</a:t>
+            </a:r>
+            <a:r>
+              <a:rPr lang="en-US" sz="1200" dirty="0">
+                <a:solidFill>
+                  <a:schemeClr val="tx2"/>
+                </a:solidFill>
+              </a:rPr>
+              <a:t> is provided by a component or the project file, it is generated during the build process.</a:t>
+            </a:r>
+            <a:endParaRPr lang="en-US" sz="1200" kern="1200" dirty="0">
+              <a:solidFill>
+                <a:schemeClr val="tx2"/>
+              </a:solidFill>
+              <a:latin typeface="+mn-lt"/>
+              <a:ea typeface="+mn-ea"/>
+              <a:cs typeface="+mn-cs"/>
+            </a:endParaRPr>
+          </a:p>
+        </p:txBody>
+      </p:sp>
+    </p:spTree>
+    <p:extLst>
+      <p:ext uri="{BB962C8B-B14F-4D97-AF65-F5344CB8AC3E}">
+        <p14:creationId xmlns:p14="http://schemas.microsoft.com/office/powerpoint/2010/main" val="1740976106"/>
+      </p:ext>
+    </p:extLst>
+  </p:cSld>
+  <p:clrMapOvr>
+    <a:masterClrMapping/>
+  </p:clrMapOvr>
 </p:sld>
 </file>
 

</xml_diff>

<commit_message>
- Consistent name: linker script file
</commit_message>
<xml_diff>
--- a/tools/projmgr/docs/Manual/images/overview.pptx
+++ b/tools/projmgr/docs/Manual/images/overview.pptx
@@ -301,7 +301,7 @@
           <a:p>
             <a:fld id="{008FFADC-39A7-449E-8C68-8776E6FB3C1A}" type="datetimeFigureOut">
               <a:rPr lang="en-GB" smtClean="0"/>
-              <a:t>29/12/2022</a:t>
+              <a:t>02/01/2023</a:t>
             </a:fld>
             <a:endParaRPr lang="en-GB"/>
           </a:p>
@@ -478,7 +478,7 @@
           <a:p>
             <a:fld id="{30B9BAAB-B703-4BB5-9D08-B460FC03C23A}" type="datetimeFigureOut">
               <a:rPr lang="en-GB" smtClean="0"/>
-              <a:t>29/12/2022</a:t>
+              <a:t>02/01/2023</a:t>
             </a:fld>
             <a:endParaRPr lang="en-GB"/>
           </a:p>
@@ -11878,8 +11878,12 @@
           <a:lstStyle/>
           <a:p>
             <a:r>
+              <a:rPr lang="en-US"/>
+              <a:t>Linker Script File </a:t>
+            </a:r>
+            <a:r>
               <a:rPr lang="en-US" dirty="0"/>
-              <a:t>Linker Scatter File Generation (Toolchain independent)</a:t>
+              <a:t>Generation (Toolchain independent)</a:t>
             </a:r>
           </a:p>
         </p:txBody>
@@ -12242,7 +12246,7 @@
                 <a:ea typeface="+mn-ea"/>
                 <a:cs typeface="+mn-cs"/>
               </a:rPr>
-              <a:t>Compiler specific Scatter File Template</a:t>
+              <a:t>Compiler specific Script File Template</a:t>
             </a:r>
             <a:endParaRPr kumimoji="0" lang="en-GB" sz="1000" b="0" i="0" u="none" strike="noStrike" kern="1200" cap="none" spc="0" normalizeH="0" baseline="0" noProof="0" dirty="0">
               <a:ln>
@@ -12462,7 +12466,7 @@
                 </a:solidFill>
                 <a:latin typeface="Calibri"/>
               </a:rPr>
-              <a:t>Scatter File</a:t>
+              <a:t>Script File</a:t>
             </a:r>
             <a:endParaRPr lang="en-US" sz="1100" dirty="0">
               <a:solidFill>
@@ -12736,7 +12740,7 @@
                   <a:schemeClr val="tx2"/>
                 </a:solidFill>
               </a:rPr>
-              <a:t>Compiler specific scatter files</a:t>
+              <a:t>Compiler specific linker script file templates</a:t>
             </a:r>
             <a:r>
               <a:rPr lang="en-US" sz="1200" dirty="0">
@@ -12744,46 +12748,31 @@
                   <a:schemeClr val="tx2"/>
                 </a:solidFill>
               </a:rPr>
-              <a:t> are provided in the</a:t>
-            </a:r>
-            <a:br>
+              <a:t> are provided in the </a:t>
+            </a:r>
+            <a:r>
+              <a:rPr lang="en-US" sz="1200" b="1" dirty="0">
+                <a:solidFill>
+                  <a:schemeClr val="tx2"/>
+                </a:solidFill>
+              </a:rPr>
+              <a:t>.\</a:t>
+            </a:r>
+            <a:r>
+              <a:rPr lang="en-US" sz="1200" b="1" dirty="0" err="1">
+                <a:solidFill>
+                  <a:schemeClr val="tx2"/>
+                </a:solidFill>
+              </a:rPr>
+              <a:t>ect</a:t>
+            </a:r>
+            <a:r>
               <a:rPr lang="en-US" sz="1200" dirty="0">
                 <a:solidFill>
                   <a:schemeClr val="tx2"/>
                 </a:solidFill>
               </a:rPr>
-            </a:br>
-            <a:r>
-              <a:rPr lang="en-US" sz="1200" b="1" dirty="0">
-                <a:solidFill>
-                  <a:schemeClr val="tx2"/>
-                </a:solidFill>
-              </a:rPr>
-              <a:t>.\</a:t>
-            </a:r>
-            <a:r>
-              <a:rPr lang="en-US" sz="1200" b="1" dirty="0" err="1">
-                <a:solidFill>
-                  <a:schemeClr val="tx2"/>
-                </a:solidFill>
-              </a:rPr>
-              <a:t>ect</a:t>
-            </a:r>
-            <a:r>
-              <a:rPr lang="en-US" sz="1200" dirty="0">
-                <a:solidFill>
-                  <a:schemeClr val="tx2"/>
-                </a:solidFill>
-              </a:rPr>
-              <a:t> directory of </a:t>
-            </a:r>
-            <a:r>
-              <a:rPr lang="en-US" sz="1200" dirty="0" err="1">
-                <a:solidFill>
-                  <a:schemeClr val="tx2"/>
-                </a:solidFill>
-              </a:rPr>
-              <a:t>csolution</a:t>
+              <a:t> directory of CMSIS-Toolbox</a:t>
             </a:r>
             <a:endParaRPr lang="en-US" sz="1200" kern="1200" dirty="0">
               <a:solidFill>
@@ -12851,7 +12840,7 @@
                   <a:schemeClr val="tx2"/>
                 </a:solidFill>
               </a:rPr>
-              <a:t>Linker Scatter File</a:t>
+              <a:t>Linker Script File</a:t>
             </a:r>
             <a:r>
               <a:rPr lang="en-US" sz="1200" dirty="0">

</xml_diff>

<commit_message>
Linker Script File (Proposal).md refinement
</commit_message>
<xml_diff>
--- a/tools/projmgr/docs/Manual/images/overview.pptx
+++ b/tools/projmgr/docs/Manual/images/overview.pptx
@@ -301,7 +301,7 @@
           <a:p>
             <a:fld id="{008FFADC-39A7-449E-8C68-8776E6FB3C1A}" type="datetimeFigureOut">
               <a:rPr lang="en-GB" smtClean="0"/>
-              <a:t>02/01/2023</a:t>
+              <a:t>03/01/2023</a:t>
             </a:fld>
             <a:endParaRPr lang="en-GB"/>
           </a:p>
@@ -478,7 +478,7 @@
           <a:p>
             <a:fld id="{30B9BAAB-B703-4BB5-9D08-B460FC03C23A}" type="datetimeFigureOut">
               <a:rPr lang="en-GB" smtClean="0"/>
-              <a:t>02/01/2023</a:t>
+              <a:t>03/01/2023</a:t>
             </a:fld>
             <a:endParaRPr lang="en-GB"/>
           </a:p>
@@ -11858,6 +11858,170 @@
       </p:grpSpPr>
       <p:sp>
         <p:nvSpPr>
+          <p:cNvPr id="8" name="Rectangle 7">
+            <a:extLst>
+              <a:ext uri="{FF2B5EF4-FFF2-40B4-BE49-F238E27FC236}">
+                <a16:creationId xmlns:a16="http://schemas.microsoft.com/office/drawing/2014/main" id="{10B08567-B8E6-CD03-A712-283B6BED095C}"/>
+              </a:ext>
+            </a:extLst>
+          </p:cNvPr>
+          <p:cNvSpPr/>
+          <p:nvPr/>
+        </p:nvSpPr>
+        <p:spPr>
+          <a:xfrm>
+            <a:off x="2894996" y="1283722"/>
+            <a:ext cx="3201004" cy="1052187"/>
+          </a:xfrm>
+          <a:prstGeom prst="rect">
+            <a:avLst/>
+          </a:prstGeom>
+          <a:solidFill>
+            <a:srgbClr val="0091BD">
+              <a:alpha val="14902"/>
+            </a:srgbClr>
+          </a:solidFill>
+          <a:ln>
+            <a:noFill/>
+          </a:ln>
+        </p:spPr>
+        <p:style>
+          <a:lnRef idx="2">
+            <a:schemeClr val="accent1">
+              <a:shade val="50000"/>
+            </a:schemeClr>
+          </a:lnRef>
+          <a:fillRef idx="1">
+            <a:schemeClr val="accent1"/>
+          </a:fillRef>
+          <a:effectRef idx="0">
+            <a:schemeClr val="accent1"/>
+          </a:effectRef>
+          <a:fontRef idx="minor">
+            <a:schemeClr val="lt1"/>
+          </a:fontRef>
+        </p:style>
+        <p:txBody>
+          <a:bodyPr rtlCol="0" anchor="ctr"/>
+          <a:lstStyle/>
+          <a:p>
+            <a:pPr algn="ctr"/>
+            <a:endParaRPr lang="en-US" dirty="0"/>
+          </a:p>
+        </p:txBody>
+      </p:sp>
+      <p:sp>
+        <p:nvSpPr>
+          <p:cNvPr id="29" name="Rectangle 28">
+            <a:extLst>
+              <a:ext uri="{FF2B5EF4-FFF2-40B4-BE49-F238E27FC236}">
+                <a16:creationId xmlns:a16="http://schemas.microsoft.com/office/drawing/2014/main" id="{C316CA8B-2CE2-F7E5-8248-0EACB6485BF7}"/>
+              </a:ext>
+            </a:extLst>
+          </p:cNvPr>
+          <p:cNvSpPr>
+            <a:spLocks/>
+          </p:cNvSpPr>
+          <p:nvPr/>
+        </p:nvSpPr>
+        <p:spPr>
+          <a:xfrm>
+            <a:off x="557408" y="4799353"/>
+            <a:ext cx="3864279" cy="1112932"/>
+          </a:xfrm>
+          <a:prstGeom prst="rect">
+            <a:avLst/>
+          </a:prstGeom>
+          <a:solidFill>
+            <a:srgbClr val="0091BD">
+              <a:alpha val="14902"/>
+            </a:srgbClr>
+          </a:solidFill>
+          <a:ln>
+            <a:noFill/>
+          </a:ln>
+        </p:spPr>
+        <p:style>
+          <a:lnRef idx="2">
+            <a:schemeClr val="accent1">
+              <a:shade val="50000"/>
+            </a:schemeClr>
+          </a:lnRef>
+          <a:fillRef idx="1">
+            <a:schemeClr val="accent1"/>
+          </a:fillRef>
+          <a:effectRef idx="0">
+            <a:schemeClr val="accent1"/>
+          </a:effectRef>
+          <a:fontRef idx="minor">
+            <a:schemeClr val="lt1"/>
+          </a:fontRef>
+        </p:style>
+        <p:txBody>
+          <a:bodyPr rtlCol="0" anchor="ctr"/>
+          <a:lstStyle/>
+          <a:p>
+            <a:pPr algn="ctr"/>
+            <a:endParaRPr lang="en-US" dirty="0"/>
+          </a:p>
+        </p:txBody>
+      </p:sp>
+      <p:sp>
+        <p:nvSpPr>
+          <p:cNvPr id="7" name="Rectangle 6">
+            <a:extLst>
+              <a:ext uri="{FF2B5EF4-FFF2-40B4-BE49-F238E27FC236}">
+                <a16:creationId xmlns:a16="http://schemas.microsoft.com/office/drawing/2014/main" id="{2CA143BC-8541-DCE0-E095-BFFE5926D485}"/>
+              </a:ext>
+            </a:extLst>
+          </p:cNvPr>
+          <p:cNvSpPr/>
+          <p:nvPr/>
+        </p:nvSpPr>
+        <p:spPr>
+          <a:xfrm>
+            <a:off x="557408" y="2542783"/>
+            <a:ext cx="3864280" cy="1052187"/>
+          </a:xfrm>
+          <a:prstGeom prst="rect">
+            <a:avLst/>
+          </a:prstGeom>
+          <a:solidFill>
+            <a:srgbClr val="0091BD">
+              <a:alpha val="14902"/>
+            </a:srgbClr>
+          </a:solidFill>
+          <a:ln>
+            <a:noFill/>
+          </a:ln>
+        </p:spPr>
+        <p:style>
+          <a:lnRef idx="2">
+            <a:schemeClr val="accent1">
+              <a:shade val="50000"/>
+            </a:schemeClr>
+          </a:lnRef>
+          <a:fillRef idx="1">
+            <a:schemeClr val="accent1"/>
+          </a:fillRef>
+          <a:effectRef idx="0">
+            <a:schemeClr val="accent1"/>
+          </a:effectRef>
+          <a:fontRef idx="minor">
+            <a:schemeClr val="lt1"/>
+          </a:fontRef>
+        </p:style>
+        <p:txBody>
+          <a:bodyPr rtlCol="0" anchor="ctr"/>
+          <a:lstStyle/>
+          <a:p>
+            <a:pPr algn="ctr"/>
+            <a:endParaRPr lang="en-US"/>
+          </a:p>
+        </p:txBody>
+      </p:sp>
+      <p:sp>
+        <p:nvSpPr>
           <p:cNvPr id="2" name="Title 1">
             <a:extLst>
               <a:ext uri="{FF2B5EF4-FFF2-40B4-BE49-F238E27FC236}">
@@ -11878,38 +12042,9 @@
           <a:lstStyle/>
           <a:p>
             <a:r>
-              <a:rPr lang="en-US"/>
-              <a:t>Linker Script File </a:t>
-            </a:r>
-            <a:r>
               <a:rPr lang="en-US" dirty="0"/>
-              <a:t>Generation (Toolchain independent)</a:t>
-            </a:r>
-          </a:p>
-        </p:txBody>
-      </p:sp>
-      <p:sp>
-        <p:nvSpPr>
-          <p:cNvPr id="3" name="Text Placeholder 2">
-            <a:extLst>
-              <a:ext uri="{FF2B5EF4-FFF2-40B4-BE49-F238E27FC236}">
-                <a16:creationId xmlns:a16="http://schemas.microsoft.com/office/drawing/2014/main" id="{D726DDF8-B5AA-8294-3DAC-751916A4B45E}"/>
-              </a:ext>
-            </a:extLst>
-          </p:cNvPr>
-          <p:cNvSpPr>
-            <a:spLocks noGrp="1"/>
-          </p:cNvSpPr>
-          <p:nvPr>
-            <p:ph type="body" sz="quarter" idx="13"/>
-          </p:nvPr>
-        </p:nvSpPr>
-        <p:spPr/>
-        <p:txBody>
-          <a:bodyPr/>
-          <a:lstStyle/>
-          <a:p>
-            <a:endParaRPr lang="en-US" dirty="0"/>
+              <a:t>Linker Script File and Startup Code (Toolchain independent)</a:t>
+            </a:r>
           </a:p>
         </p:txBody>
       </p:sp>
@@ -11929,216 +12064,8 @@
         </p:nvCxnSpPr>
         <p:spPr>
           <a:xfrm>
-            <a:off x="5345058" y="2525555"/>
-            <a:ext cx="0" cy="276726"/>
-          </a:xfrm>
-          <a:prstGeom prst="straightConnector1">
-            <a:avLst/>
-          </a:prstGeom>
-          <a:ln w="38100">
-            <a:tailEnd type="triangle"/>
-          </a:ln>
-        </p:spPr>
-        <p:style>
-          <a:lnRef idx="1">
-            <a:schemeClr val="accent1"/>
-          </a:lnRef>
-          <a:fillRef idx="0">
-            <a:schemeClr val="accent1"/>
-          </a:fillRef>
-          <a:effectRef idx="0">
-            <a:schemeClr val="accent1"/>
-          </a:effectRef>
-          <a:fontRef idx="minor">
-            <a:schemeClr val="tx1"/>
-          </a:fontRef>
-        </p:style>
-      </p:cxnSp>
-      <p:sp>
-        <p:nvSpPr>
-          <p:cNvPr id="22" name="Flowchart: Document 21">
-            <a:extLst>
-              <a:ext uri="{FF2B5EF4-FFF2-40B4-BE49-F238E27FC236}">
-                <a16:creationId xmlns:a16="http://schemas.microsoft.com/office/drawing/2014/main" id="{D65D5CB0-09C8-062E-4206-1CF43BB42330}"/>
-              </a:ext>
-            </a:extLst>
-          </p:cNvPr>
-          <p:cNvSpPr/>
-          <p:nvPr/>
-        </p:nvSpPr>
-        <p:spPr>
-          <a:xfrm>
-            <a:off x="4662617" y="1708476"/>
-            <a:ext cx="1333416" cy="884321"/>
-          </a:xfrm>
-          <a:prstGeom prst="flowChartDocument">
-            <a:avLst/>
-          </a:prstGeom>
-          <a:solidFill>
-            <a:schemeClr val="accent1"/>
-          </a:solidFill>
-          <a:ln w="19050">
-            <a:solidFill>
-              <a:schemeClr val="tx1"/>
-            </a:solidFill>
-          </a:ln>
-        </p:spPr>
-        <p:style>
-          <a:lnRef idx="2">
-            <a:schemeClr val="accent1">
-              <a:shade val="50000"/>
-            </a:schemeClr>
-          </a:lnRef>
-          <a:fillRef idx="1">
-            <a:schemeClr val="accent1"/>
-          </a:fillRef>
-          <a:effectRef idx="0">
-            <a:schemeClr val="accent1"/>
-          </a:effectRef>
-          <a:fontRef idx="minor">
-            <a:schemeClr val="lt1"/>
-          </a:fontRef>
-        </p:style>
-        <p:txBody>
-          <a:bodyPr rtlCol="0" anchor="ctr"/>
-          <a:lstStyle/>
-          <a:p>
-            <a:pPr marL="0" marR="0" lvl="0" indent="0" algn="ctr" defTabSz="914400" rtl="0" eaLnBrk="0" fontAlgn="base" latinLnBrk="0" hangingPunct="0">
-              <a:lnSpc>
-                <a:spcPct val="100000"/>
-              </a:lnSpc>
-              <a:spcBef>
-                <a:spcPct val="0"/>
-              </a:spcBef>
-              <a:spcAft>
-                <a:spcPct val="0"/>
-              </a:spcAft>
-              <a:buClrTx/>
-              <a:buSzTx/>
-              <a:buFontTx/>
-              <a:buNone/>
-              <a:tabLst/>
-              <a:defRPr/>
-            </a:pPr>
-            <a:r>
-              <a:rPr lang="en-US" sz="1200" b="1" dirty="0" err="1">
-                <a:solidFill>
-                  <a:srgbClr val="FFFFFF"/>
-                </a:solidFill>
-                <a:latin typeface="Calibri"/>
-              </a:rPr>
-              <a:t>region_defs.h</a:t>
-            </a:r>
-            <a:r>
-              <a:rPr kumimoji="0" lang="en-US" sz="1200" b="1" i="0" u="none" strike="noStrike" kern="1200" cap="none" spc="0" normalizeH="0" baseline="0" noProof="0" dirty="0">
-                <a:ln>
-                  <a:noFill/>
-                </a:ln>
-                <a:solidFill>
-                  <a:srgbClr val="FFFFFF"/>
-                </a:solidFill>
-                <a:effectLst/>
-                <a:uLnTx/>
-                <a:uFillTx/>
-                <a:latin typeface="Calibri"/>
-                <a:ea typeface="+mn-ea"/>
-                <a:cs typeface="+mn-cs"/>
-              </a:rPr>
-              <a:t> </a:t>
-            </a:r>
-            <a:br>
-              <a:rPr kumimoji="0" lang="en-US" sz="1200" b="1" i="0" u="none" strike="noStrike" kern="1200" cap="none" spc="0" normalizeH="0" baseline="0" noProof="0" dirty="0">
-                <a:ln>
-                  <a:noFill/>
-                </a:ln>
-                <a:solidFill>
-                  <a:srgbClr val="FFFFFF"/>
-                </a:solidFill>
-                <a:effectLst/>
-                <a:uLnTx/>
-                <a:uFillTx/>
-                <a:latin typeface="Calibri"/>
-                <a:ea typeface="+mn-ea"/>
-                <a:cs typeface="+mn-cs"/>
-              </a:rPr>
-            </a:br>
-            <a:r>
-              <a:rPr kumimoji="0" lang="en-US" sz="1100" b="0" i="0" u="none" strike="noStrike" kern="1200" cap="none" spc="0" normalizeH="0" baseline="0" noProof="0" dirty="0">
-                <a:ln>
-                  <a:noFill/>
-                </a:ln>
-                <a:solidFill>
-                  <a:srgbClr val="FFFFFF"/>
-                </a:solidFill>
-                <a:effectLst/>
-                <a:uLnTx/>
-                <a:uFillTx/>
-                <a:latin typeface="Calibri"/>
-                <a:ea typeface="+mn-ea"/>
-                <a:cs typeface="+mn-cs"/>
-              </a:rPr>
-              <a:t>Board or Device</a:t>
-            </a:r>
-            <a:br>
-              <a:rPr kumimoji="0" lang="en-US" sz="1100" b="0" i="0" u="none" strike="noStrike" kern="1200" cap="none" spc="0" normalizeH="0" baseline="0" noProof="0" dirty="0">
-                <a:ln>
-                  <a:noFill/>
-                </a:ln>
-                <a:solidFill>
-                  <a:srgbClr val="FFFFFF"/>
-                </a:solidFill>
-                <a:effectLst/>
-                <a:uLnTx/>
-                <a:uFillTx/>
-                <a:latin typeface="Calibri"/>
-                <a:ea typeface="+mn-ea"/>
-                <a:cs typeface="+mn-cs"/>
-              </a:rPr>
-            </a:br>
-            <a:r>
-              <a:rPr kumimoji="0" lang="en-US" sz="1100" b="0" i="0" u="none" strike="noStrike" kern="1200" cap="none" spc="0" normalizeH="0" baseline="0" noProof="0" dirty="0">
-                <a:ln>
-                  <a:noFill/>
-                </a:ln>
-                <a:solidFill>
-                  <a:srgbClr val="FFFFFF"/>
-                </a:solidFill>
-                <a:effectLst/>
-                <a:uLnTx/>
-                <a:uFillTx/>
-                <a:latin typeface="Calibri"/>
-                <a:ea typeface="+mn-ea"/>
-                <a:cs typeface="+mn-cs"/>
-              </a:rPr>
-              <a:t>Memory Definitions</a:t>
-            </a:r>
-            <a:endParaRPr lang="en-US" sz="1100" dirty="0">
-              <a:solidFill>
-                <a:srgbClr val="FFFFFF"/>
-              </a:solidFill>
-              <a:latin typeface="Calibri"/>
-            </a:endParaRPr>
-          </a:p>
-        </p:txBody>
-      </p:sp>
-      <p:cxnSp>
-        <p:nvCxnSpPr>
-          <p:cNvPr id="31" name="Straight Arrow Connector 30">
-            <a:extLst>
-              <a:ext uri="{FF2B5EF4-FFF2-40B4-BE49-F238E27FC236}">
-                <a16:creationId xmlns:a16="http://schemas.microsoft.com/office/drawing/2014/main" id="{762A54AC-439F-5D0C-8C39-0399B2E1B2CF}"/>
-              </a:ext>
-            </a:extLst>
-          </p:cNvPr>
-          <p:cNvCxnSpPr>
-            <a:cxnSpLocks/>
-          </p:cNvCxnSpPr>
-          <p:nvPr/>
-        </p:nvCxnSpPr>
-        <p:spPr>
-          <a:xfrm flipV="1">
-            <a:off x="5334032" y="3664807"/>
-            <a:ext cx="0" cy="276726"/>
+            <a:off x="5334032" y="2206285"/>
+            <a:ext cx="11026" cy="451947"/>
           </a:xfrm>
           <a:prstGeom prst="straightConnector1">
             <a:avLst/>
@@ -12176,17 +12103,14 @@
         </p:nvSpPr>
         <p:spPr>
           <a:xfrm>
-            <a:off x="4670188" y="3911312"/>
+            <a:off x="4662617" y="1404869"/>
             <a:ext cx="1333416" cy="873311"/>
           </a:xfrm>
           <a:prstGeom prst="flowChartDocument">
             <a:avLst/>
           </a:prstGeom>
           <a:solidFill>
-            <a:schemeClr val="accent2">
-              <a:lumMod val="75000"/>
-              <a:lumOff val="25000"/>
-            </a:schemeClr>
+            <a:schemeClr val="accent1"/>
           </a:solidFill>
           <a:ln w="19050">
             <a:solidFill>
@@ -12279,7 +12203,7 @@
         </p:nvSpPr>
         <p:spPr>
           <a:xfrm>
-            <a:off x="4662617" y="2785498"/>
+            <a:off x="4662617" y="2641449"/>
             <a:ext cx="1340987" cy="884321"/>
           </a:xfrm>
           <a:prstGeom prst="rect">
@@ -12388,7 +12312,7 @@
         </p:nvSpPr>
         <p:spPr>
           <a:xfrm>
-            <a:off x="6343650" y="2802282"/>
+            <a:off x="6343650" y="2658233"/>
             <a:ext cx="1340986" cy="862526"/>
           </a:xfrm>
           <a:prstGeom prst="flowChartDocument">
@@ -12493,7 +12417,7 @@
         </p:nvCxnSpPr>
         <p:spPr>
           <a:xfrm>
-            <a:off x="6003604" y="3241695"/>
+            <a:off x="6003604" y="3097646"/>
             <a:ext cx="340046" cy="2746"/>
           </a:xfrm>
           <a:prstGeom prst="straightConnector1">
@@ -12532,8 +12456,8 @@
         </p:nvSpPr>
         <p:spPr>
           <a:xfrm>
-            <a:off x="885825" y="1676400"/>
-            <a:ext cx="3438525" cy="332399"/>
+            <a:off x="715763" y="2625380"/>
+            <a:ext cx="2179233" cy="498598"/>
           </a:xfrm>
           <a:prstGeom prst="rect">
             <a:avLst/>
@@ -12612,7 +12536,22 @@
                   <a:schemeClr val="tx2"/>
                 </a:solidFill>
               </a:rPr>
-              <a:t> based on DFP information</a:t>
+              <a:t> tool</a:t>
+            </a:r>
+            <a:br>
+              <a:rPr lang="en-US" sz="1200" dirty="0">
+                <a:solidFill>
+                  <a:schemeClr val="tx2"/>
+                </a:solidFill>
+              </a:rPr>
+            </a:br>
+            <a:r>
+              <a:rPr lang="en-US" sz="1200" dirty="0">
+                <a:solidFill>
+                  <a:schemeClr val="tx2"/>
+                </a:solidFill>
+              </a:rPr>
+              <a:t>based on DFP information.</a:t>
             </a:r>
             <a:endParaRPr lang="en-US" sz="1200" kern="1200" dirty="0">
               <a:solidFill>
@@ -12639,8 +12578,8 @@
         </p:nvSpPr>
         <p:spPr>
           <a:xfrm>
-            <a:off x="885825" y="2142149"/>
-            <a:ext cx="3438525" cy="332399"/>
+            <a:off x="713985" y="3150296"/>
+            <a:ext cx="2346850" cy="332399"/>
           </a:xfrm>
           <a:prstGeom prst="rect">
             <a:avLst/>
@@ -12680,7 +12619,7 @@
                   <a:schemeClr val="tx2"/>
                 </a:solidFill>
               </a:rPr>
-              <a:t> may be provided as part of a component or a software layer</a:t>
+              <a:t> may be part of a component or a software layer.</a:t>
             </a:r>
             <a:endParaRPr lang="en-US" sz="1200" kern="1200" dirty="0">
               <a:solidFill>
@@ -12707,8 +12646,8 @@
         </p:nvSpPr>
         <p:spPr>
           <a:xfrm>
-            <a:off x="885824" y="4015568"/>
-            <a:ext cx="3438525" cy="332399"/>
+            <a:off x="3050088" y="1375288"/>
+            <a:ext cx="1568623" cy="830997"/>
           </a:xfrm>
           <a:prstGeom prst="rect">
             <a:avLst/>
@@ -12772,7 +12711,7 @@
                   <a:schemeClr val="tx2"/>
                 </a:solidFill>
               </a:rPr>
-              <a:t> directory of CMSIS-Toolbox</a:t>
+              <a:t> directory of CMSIS-Toolbox.</a:t>
             </a:r>
             <a:endParaRPr lang="en-US" sz="1200" kern="1200" dirty="0">
               <a:solidFill>
@@ -12799,8 +12738,8 @@
         </p:nvSpPr>
         <p:spPr>
           <a:xfrm>
-            <a:off x="7915274" y="2804840"/>
-            <a:ext cx="3438525" cy="332399"/>
+            <a:off x="6289078" y="1631444"/>
+            <a:ext cx="1359855" cy="830997"/>
           </a:xfrm>
           <a:prstGeom prst="rect">
             <a:avLst/>
@@ -12848,13 +12787,753 @@
                   <a:schemeClr val="tx2"/>
                 </a:solidFill>
               </a:rPr>
-              <a:t> is provided by a component or the project file, it is generated during the build process.</a:t>
+              <a:t> is provided by a component or project file, it is generated during build process.</a:t>
             </a:r>
             <a:endParaRPr lang="en-US" sz="1200" kern="1200" dirty="0">
               <a:solidFill>
                 <a:schemeClr val="tx2"/>
               </a:solidFill>
               <a:latin typeface="+mn-lt"/>
+              <a:ea typeface="+mn-ea"/>
+              <a:cs typeface="+mn-cs"/>
+            </a:endParaRPr>
+          </a:p>
+        </p:txBody>
+      </p:sp>
+      <p:cxnSp>
+        <p:nvCxnSpPr>
+          <p:cNvPr id="4" name="Straight Arrow Connector 3">
+            <a:extLst>
+              <a:ext uri="{FF2B5EF4-FFF2-40B4-BE49-F238E27FC236}">
+                <a16:creationId xmlns:a16="http://schemas.microsoft.com/office/drawing/2014/main" id="{8B1FE01B-391C-E01A-40DC-D31263CB0315}"/>
+              </a:ext>
+            </a:extLst>
+          </p:cNvPr>
+          <p:cNvCxnSpPr>
+            <a:cxnSpLocks/>
+          </p:cNvCxnSpPr>
+          <p:nvPr/>
+        </p:nvCxnSpPr>
+        <p:spPr>
+          <a:xfrm>
+            <a:off x="4324349" y="3093004"/>
+            <a:ext cx="340046" cy="2746"/>
+          </a:xfrm>
+          <a:prstGeom prst="straightConnector1">
+            <a:avLst/>
+          </a:prstGeom>
+          <a:ln w="38100">
+            <a:tailEnd type="triangle"/>
+          </a:ln>
+        </p:spPr>
+        <p:style>
+          <a:lnRef idx="1">
+            <a:schemeClr val="accent1"/>
+          </a:lnRef>
+          <a:fillRef idx="0">
+            <a:schemeClr val="accent1"/>
+          </a:fillRef>
+          <a:effectRef idx="0">
+            <a:schemeClr val="accent1"/>
+          </a:effectRef>
+          <a:fontRef idx="minor">
+            <a:schemeClr val="tx1"/>
+          </a:fontRef>
+        </p:style>
+      </p:cxnSp>
+      <p:cxnSp>
+        <p:nvCxnSpPr>
+          <p:cNvPr id="5" name="Straight Arrow Connector 4">
+            <a:extLst>
+              <a:ext uri="{FF2B5EF4-FFF2-40B4-BE49-F238E27FC236}">
+                <a16:creationId xmlns:a16="http://schemas.microsoft.com/office/drawing/2014/main" id="{D03DF2FC-85B0-0807-1B87-189431D9CA2E}"/>
+              </a:ext>
+            </a:extLst>
+          </p:cNvPr>
+          <p:cNvCxnSpPr>
+            <a:cxnSpLocks/>
+            <a:endCxn id="12" idx="0"/>
+          </p:cNvCxnSpPr>
+          <p:nvPr/>
+        </p:nvCxnSpPr>
+        <p:spPr>
+          <a:xfrm>
+            <a:off x="3661276" y="3169086"/>
+            <a:ext cx="3633" cy="615907"/>
+          </a:xfrm>
+          <a:prstGeom prst="straightConnector1">
+            <a:avLst/>
+          </a:prstGeom>
+          <a:ln w="38100">
+            <a:tailEnd type="triangle"/>
+          </a:ln>
+        </p:spPr>
+        <p:style>
+          <a:lnRef idx="1">
+            <a:schemeClr val="accent1"/>
+          </a:lnRef>
+          <a:fillRef idx="0">
+            <a:schemeClr val="accent1"/>
+          </a:fillRef>
+          <a:effectRef idx="0">
+            <a:schemeClr val="accent1"/>
+          </a:effectRef>
+          <a:fontRef idx="minor">
+            <a:schemeClr val="tx1"/>
+          </a:fontRef>
+        </p:style>
+      </p:cxnSp>
+      <p:sp>
+        <p:nvSpPr>
+          <p:cNvPr id="10" name="Rectangle 9">
+            <a:extLst>
+              <a:ext uri="{FF2B5EF4-FFF2-40B4-BE49-F238E27FC236}">
+                <a16:creationId xmlns:a16="http://schemas.microsoft.com/office/drawing/2014/main" id="{5D45CDC4-4CFC-FBBF-C601-0E90A56861BA}"/>
+              </a:ext>
+            </a:extLst>
+          </p:cNvPr>
+          <p:cNvSpPr/>
+          <p:nvPr/>
+        </p:nvSpPr>
+        <p:spPr>
+          <a:xfrm>
+            <a:off x="6251092" y="1573194"/>
+            <a:ext cx="1533003" cy="2015514"/>
+          </a:xfrm>
+          <a:prstGeom prst="rect">
+            <a:avLst/>
+          </a:prstGeom>
+          <a:solidFill>
+            <a:schemeClr val="accent5">
+              <a:alpha val="14902"/>
+            </a:schemeClr>
+          </a:solidFill>
+          <a:ln>
+            <a:noFill/>
+          </a:ln>
+        </p:spPr>
+        <p:style>
+          <a:lnRef idx="2">
+            <a:schemeClr val="accent1">
+              <a:shade val="50000"/>
+            </a:schemeClr>
+          </a:lnRef>
+          <a:fillRef idx="1">
+            <a:schemeClr val="accent1"/>
+          </a:fillRef>
+          <a:effectRef idx="0">
+            <a:schemeClr val="accent1"/>
+          </a:effectRef>
+          <a:fontRef idx="minor">
+            <a:schemeClr val="lt1"/>
+          </a:fontRef>
+        </p:style>
+        <p:txBody>
+          <a:bodyPr rtlCol="0" anchor="ctr"/>
+          <a:lstStyle/>
+          <a:p>
+            <a:pPr algn="ctr"/>
+            <a:endParaRPr lang="en-US"/>
+          </a:p>
+        </p:txBody>
+      </p:sp>
+      <p:sp>
+        <p:nvSpPr>
+          <p:cNvPr id="12" name="Flowchart: Document 11">
+            <a:extLst>
+              <a:ext uri="{FF2B5EF4-FFF2-40B4-BE49-F238E27FC236}">
+                <a16:creationId xmlns:a16="http://schemas.microsoft.com/office/drawing/2014/main" id="{1947D630-2EE3-23D2-B8ED-8234D39B76F1}"/>
+              </a:ext>
+            </a:extLst>
+          </p:cNvPr>
+          <p:cNvSpPr/>
+          <p:nvPr/>
+        </p:nvSpPr>
+        <p:spPr>
+          <a:xfrm>
+            <a:off x="2998201" y="3784993"/>
+            <a:ext cx="1333416" cy="884321"/>
+          </a:xfrm>
+          <a:prstGeom prst="flowChartDocument">
+            <a:avLst/>
+          </a:prstGeom>
+          <a:solidFill>
+            <a:schemeClr val="accent1"/>
+          </a:solidFill>
+          <a:ln w="19050">
+            <a:solidFill>
+              <a:schemeClr val="tx1"/>
+            </a:solidFill>
+          </a:ln>
+        </p:spPr>
+        <p:style>
+          <a:lnRef idx="2">
+            <a:schemeClr val="accent1">
+              <a:shade val="50000"/>
+            </a:schemeClr>
+          </a:lnRef>
+          <a:fillRef idx="1">
+            <a:schemeClr val="accent1"/>
+          </a:fillRef>
+          <a:effectRef idx="0">
+            <a:schemeClr val="accent1"/>
+          </a:effectRef>
+          <a:fontRef idx="minor">
+            <a:schemeClr val="lt1"/>
+          </a:fontRef>
+        </p:style>
+        <p:txBody>
+          <a:bodyPr rtlCol="0" anchor="ctr"/>
+          <a:lstStyle/>
+          <a:p>
+            <a:pPr marL="0" marR="0" lvl="0" indent="0" algn="ctr" defTabSz="914400" rtl="0" eaLnBrk="0" fontAlgn="base" latinLnBrk="0" hangingPunct="0">
+              <a:lnSpc>
+                <a:spcPct val="100000"/>
+              </a:lnSpc>
+              <a:spcBef>
+                <a:spcPct val="0"/>
+              </a:spcBef>
+              <a:spcAft>
+                <a:spcPct val="0"/>
+              </a:spcAft>
+              <a:buClrTx/>
+              <a:buSzTx/>
+              <a:buFontTx/>
+              <a:buNone/>
+              <a:tabLst/>
+              <a:defRPr/>
+            </a:pPr>
+            <a:r>
+              <a:rPr lang="en-US" sz="1200" b="1" dirty="0" err="1">
+                <a:solidFill>
+                  <a:srgbClr val="FFFFFF"/>
+                </a:solidFill>
+                <a:latin typeface="Calibri"/>
+              </a:rPr>
+              <a:t>Startup.c</a:t>
+            </a:r>
+            <a:br>
+              <a:rPr kumimoji="0" lang="en-US" sz="1200" b="1" i="0" u="none" strike="noStrike" kern="1200" cap="none" spc="0" normalizeH="0" baseline="0" noProof="0" dirty="0">
+                <a:ln>
+                  <a:noFill/>
+                </a:ln>
+                <a:solidFill>
+                  <a:srgbClr val="FFFFFF"/>
+                </a:solidFill>
+                <a:effectLst/>
+                <a:uLnTx/>
+                <a:uFillTx/>
+                <a:latin typeface="Calibri"/>
+                <a:ea typeface="+mn-ea"/>
+                <a:cs typeface="+mn-cs"/>
+              </a:rPr>
+            </a:br>
+            <a:r>
+              <a:rPr lang="en-US" sz="1100" dirty="0">
+                <a:solidFill>
+                  <a:srgbClr val="FFFFFF"/>
+                </a:solidFill>
+                <a:latin typeface="Calibri"/>
+              </a:rPr>
+              <a:t>Compiler agnostic</a:t>
+            </a:r>
+          </a:p>
+        </p:txBody>
+      </p:sp>
+      <p:sp>
+        <p:nvSpPr>
+          <p:cNvPr id="22" name="Flowchart: Document 21">
+            <a:extLst>
+              <a:ext uri="{FF2B5EF4-FFF2-40B4-BE49-F238E27FC236}">
+                <a16:creationId xmlns:a16="http://schemas.microsoft.com/office/drawing/2014/main" id="{D65D5CB0-09C8-062E-4206-1CF43BB42330}"/>
+              </a:ext>
+            </a:extLst>
+          </p:cNvPr>
+          <p:cNvSpPr/>
+          <p:nvPr/>
+        </p:nvSpPr>
+        <p:spPr>
+          <a:xfrm>
+            <a:off x="2998201" y="2655485"/>
+            <a:ext cx="1333416" cy="884321"/>
+          </a:xfrm>
+          <a:prstGeom prst="flowChartDocument">
+            <a:avLst/>
+          </a:prstGeom>
+          <a:solidFill>
+            <a:srgbClr val="7030A0"/>
+          </a:solidFill>
+          <a:ln w="19050">
+            <a:solidFill>
+              <a:schemeClr val="tx1"/>
+            </a:solidFill>
+          </a:ln>
+        </p:spPr>
+        <p:style>
+          <a:lnRef idx="2">
+            <a:schemeClr val="accent1">
+              <a:shade val="50000"/>
+            </a:schemeClr>
+          </a:lnRef>
+          <a:fillRef idx="1">
+            <a:schemeClr val="accent1"/>
+          </a:fillRef>
+          <a:effectRef idx="0">
+            <a:schemeClr val="accent1"/>
+          </a:effectRef>
+          <a:fontRef idx="minor">
+            <a:schemeClr val="lt1"/>
+          </a:fontRef>
+        </p:style>
+        <p:txBody>
+          <a:bodyPr rtlCol="0" anchor="ctr"/>
+          <a:lstStyle/>
+          <a:p>
+            <a:pPr marL="0" marR="0" lvl="0" indent="0" algn="ctr" defTabSz="914400" rtl="0" eaLnBrk="0" fontAlgn="base" latinLnBrk="0" hangingPunct="0">
+              <a:lnSpc>
+                <a:spcPct val="100000"/>
+              </a:lnSpc>
+              <a:spcBef>
+                <a:spcPct val="0"/>
+              </a:spcBef>
+              <a:spcAft>
+                <a:spcPct val="0"/>
+              </a:spcAft>
+              <a:buClrTx/>
+              <a:buSzTx/>
+              <a:buFontTx/>
+              <a:buNone/>
+              <a:tabLst/>
+              <a:defRPr/>
+            </a:pPr>
+            <a:r>
+              <a:rPr lang="en-US" sz="1200" b="1" dirty="0" err="1">
+                <a:solidFill>
+                  <a:srgbClr val="FFFFFF"/>
+                </a:solidFill>
+                <a:latin typeface="Calibri"/>
+              </a:rPr>
+              <a:t>region_defs.h</a:t>
+            </a:r>
+            <a:r>
+              <a:rPr kumimoji="0" lang="en-US" sz="1200" b="1" i="0" u="none" strike="noStrike" kern="1200" cap="none" spc="0" normalizeH="0" baseline="0" noProof="0" dirty="0">
+                <a:ln>
+                  <a:noFill/>
+                </a:ln>
+                <a:solidFill>
+                  <a:srgbClr val="FFFFFF"/>
+                </a:solidFill>
+                <a:effectLst/>
+                <a:uLnTx/>
+                <a:uFillTx/>
+                <a:latin typeface="Calibri"/>
+                <a:ea typeface="+mn-ea"/>
+                <a:cs typeface="+mn-cs"/>
+              </a:rPr>
+              <a:t> </a:t>
+            </a:r>
+            <a:br>
+              <a:rPr kumimoji="0" lang="en-US" sz="1200" b="1" i="0" u="none" strike="noStrike" kern="1200" cap="none" spc="0" normalizeH="0" baseline="0" noProof="0" dirty="0">
+                <a:ln>
+                  <a:noFill/>
+                </a:ln>
+                <a:solidFill>
+                  <a:srgbClr val="FFFFFF"/>
+                </a:solidFill>
+                <a:effectLst/>
+                <a:uLnTx/>
+                <a:uFillTx/>
+                <a:latin typeface="Calibri"/>
+                <a:ea typeface="+mn-ea"/>
+                <a:cs typeface="+mn-cs"/>
+              </a:rPr>
+            </a:br>
+            <a:r>
+              <a:rPr kumimoji="0" lang="en-US" sz="1100" b="0" i="0" u="none" strike="noStrike" kern="1200" cap="none" spc="0" normalizeH="0" baseline="0" noProof="0" dirty="0">
+                <a:ln>
+                  <a:noFill/>
+                </a:ln>
+                <a:solidFill>
+                  <a:srgbClr val="FFFFFF"/>
+                </a:solidFill>
+                <a:effectLst/>
+                <a:uLnTx/>
+                <a:uFillTx/>
+                <a:latin typeface="Calibri"/>
+                <a:ea typeface="+mn-ea"/>
+                <a:cs typeface="+mn-cs"/>
+              </a:rPr>
+              <a:t>Device (and Board)</a:t>
+            </a:r>
+            <a:br>
+              <a:rPr kumimoji="0" lang="en-US" sz="1100" b="0" i="0" u="none" strike="noStrike" kern="1200" cap="none" spc="0" normalizeH="0" baseline="0" noProof="0" dirty="0">
+                <a:ln>
+                  <a:noFill/>
+                </a:ln>
+                <a:solidFill>
+                  <a:srgbClr val="FFFFFF"/>
+                </a:solidFill>
+                <a:effectLst/>
+                <a:uLnTx/>
+                <a:uFillTx/>
+                <a:latin typeface="Calibri"/>
+                <a:ea typeface="+mn-ea"/>
+                <a:cs typeface="+mn-cs"/>
+              </a:rPr>
+            </a:br>
+            <a:r>
+              <a:rPr kumimoji="0" lang="en-US" sz="1100" b="0" i="0" u="none" strike="noStrike" kern="1200" cap="none" spc="0" normalizeH="0" baseline="0" noProof="0" dirty="0">
+                <a:ln>
+                  <a:noFill/>
+                </a:ln>
+                <a:solidFill>
+                  <a:srgbClr val="FFFFFF"/>
+                </a:solidFill>
+                <a:effectLst/>
+                <a:uLnTx/>
+                <a:uFillTx/>
+                <a:latin typeface="Calibri"/>
+                <a:ea typeface="+mn-ea"/>
+                <a:cs typeface="+mn-cs"/>
+              </a:rPr>
+              <a:t>Memory Definitions</a:t>
+            </a:r>
+            <a:endParaRPr lang="en-US" sz="1100" dirty="0">
+              <a:solidFill>
+                <a:srgbClr val="FFFFFF"/>
+              </a:solidFill>
+              <a:latin typeface="Calibri"/>
+            </a:endParaRPr>
+          </a:p>
+        </p:txBody>
+      </p:sp>
+      <p:sp>
+        <p:nvSpPr>
+          <p:cNvPr id="28" name="TextBox 27">
+            <a:extLst>
+              <a:ext uri="{FF2B5EF4-FFF2-40B4-BE49-F238E27FC236}">
+                <a16:creationId xmlns:a16="http://schemas.microsoft.com/office/drawing/2014/main" id="{AD09E158-4973-3204-680C-67FD7ACB9C14}"/>
+              </a:ext>
+            </a:extLst>
+          </p:cNvPr>
+          <p:cNvSpPr txBox="1"/>
+          <p:nvPr/>
+        </p:nvSpPr>
+        <p:spPr>
+          <a:xfrm>
+            <a:off x="713985" y="5003653"/>
+            <a:ext cx="2085582" cy="498598"/>
+          </a:xfrm>
+          <a:prstGeom prst="rect">
+            <a:avLst/>
+          </a:prstGeom>
+          <a:noFill/>
+        </p:spPr>
+        <p:txBody>
+          <a:bodyPr wrap="square" lIns="0" tIns="0" rIns="0" bIns="0" rtlCol="0">
+            <a:spAutoFit/>
+          </a:bodyPr>
+          <a:lstStyle/>
+          <a:p>
+            <a:pPr marL="0" indent="0" algn="l" defTabSz="914400" rtl="0" eaLnBrk="1" latinLnBrk="0" hangingPunct="1">
+              <a:lnSpc>
+                <a:spcPct val="90000"/>
+              </a:lnSpc>
+              <a:spcBef>
+                <a:spcPts val="0"/>
+              </a:spcBef>
+              <a:spcAft>
+                <a:spcPts val="600"/>
+              </a:spcAft>
+              <a:buFont typeface="Arial" panose="020B0604020202020204" pitchFamily="34" charset="0"/>
+              <a:buNone/>
+            </a:pPr>
+            <a:r>
+              <a:rPr lang="en-US" sz="1200" b="1" dirty="0">
+                <a:solidFill>
+                  <a:schemeClr val="tx2"/>
+                </a:solidFill>
+              </a:rPr>
+              <a:t>Device specific interrupt vector </a:t>
+            </a:r>
+            <a:r>
+              <a:rPr lang="en-US" sz="1200" dirty="0">
+                <a:solidFill>
+                  <a:schemeClr val="tx2"/>
+                </a:solidFill>
+              </a:rPr>
+              <a:t>definitions can be generated by</a:t>
+            </a:r>
+            <a:br>
+              <a:rPr lang="en-US" sz="1200" dirty="0">
+                <a:solidFill>
+                  <a:schemeClr val="tx2"/>
+                </a:solidFill>
+              </a:rPr>
+            </a:br>
+            <a:r>
+              <a:rPr lang="en-US" sz="1200" dirty="0" err="1">
+                <a:solidFill>
+                  <a:schemeClr val="tx2"/>
+                </a:solidFill>
+              </a:rPr>
+              <a:t>svdconv</a:t>
+            </a:r>
+            <a:r>
+              <a:rPr lang="en-US" sz="1200" dirty="0">
+                <a:solidFill>
+                  <a:schemeClr val="tx2"/>
+                </a:solidFill>
+              </a:rPr>
+              <a:t> tool.</a:t>
+            </a:r>
+          </a:p>
+        </p:txBody>
+      </p:sp>
+      <p:cxnSp>
+        <p:nvCxnSpPr>
+          <p:cNvPr id="35" name="Straight Arrow Connector 34">
+            <a:extLst>
+              <a:ext uri="{FF2B5EF4-FFF2-40B4-BE49-F238E27FC236}">
+                <a16:creationId xmlns:a16="http://schemas.microsoft.com/office/drawing/2014/main" id="{1EB5956F-9EA9-302C-29E7-507F27CDA4AC}"/>
+              </a:ext>
+            </a:extLst>
+          </p:cNvPr>
+          <p:cNvCxnSpPr>
+            <a:cxnSpLocks/>
+          </p:cNvCxnSpPr>
+          <p:nvPr/>
+        </p:nvCxnSpPr>
+        <p:spPr>
+          <a:xfrm flipV="1">
+            <a:off x="3659192" y="4618256"/>
+            <a:ext cx="3633" cy="615907"/>
+          </a:xfrm>
+          <a:prstGeom prst="straightConnector1">
+            <a:avLst/>
+          </a:prstGeom>
+          <a:ln w="38100">
+            <a:tailEnd type="triangle"/>
+          </a:ln>
+        </p:spPr>
+        <p:style>
+          <a:lnRef idx="1">
+            <a:schemeClr val="accent1"/>
+          </a:lnRef>
+          <a:fillRef idx="0">
+            <a:schemeClr val="accent1"/>
+          </a:fillRef>
+          <a:effectRef idx="0">
+            <a:schemeClr val="accent1"/>
+          </a:effectRef>
+          <a:fontRef idx="minor">
+            <a:schemeClr val="tx1"/>
+          </a:fontRef>
+        </p:style>
+      </p:cxnSp>
+      <p:sp>
+        <p:nvSpPr>
+          <p:cNvPr id="27" name="Flowchart: Document 26">
+            <a:extLst>
+              <a:ext uri="{FF2B5EF4-FFF2-40B4-BE49-F238E27FC236}">
+                <a16:creationId xmlns:a16="http://schemas.microsoft.com/office/drawing/2014/main" id="{9DD9E0BE-F1F7-A8A1-CBC9-BC25AB4E11CB}"/>
+              </a:ext>
+            </a:extLst>
+          </p:cNvPr>
+          <p:cNvSpPr/>
+          <p:nvPr/>
+        </p:nvSpPr>
+        <p:spPr>
+          <a:xfrm>
+            <a:off x="2992484" y="4920500"/>
+            <a:ext cx="1333416" cy="873311"/>
+          </a:xfrm>
+          <a:prstGeom prst="flowChartDocument">
+            <a:avLst/>
+          </a:prstGeom>
+          <a:solidFill>
+            <a:schemeClr val="accent1"/>
+          </a:solidFill>
+          <a:ln w="19050">
+            <a:solidFill>
+              <a:schemeClr val="tx1"/>
+            </a:solidFill>
+          </a:ln>
+        </p:spPr>
+        <p:style>
+          <a:lnRef idx="2">
+            <a:schemeClr val="accent1">
+              <a:shade val="50000"/>
+            </a:schemeClr>
+          </a:lnRef>
+          <a:fillRef idx="1">
+            <a:schemeClr val="accent1"/>
+          </a:fillRef>
+          <a:effectRef idx="0">
+            <a:schemeClr val="accent1"/>
+          </a:effectRef>
+          <a:fontRef idx="minor">
+            <a:schemeClr val="lt1"/>
+          </a:fontRef>
+        </p:style>
+        <p:txBody>
+          <a:bodyPr rtlCol="0" anchor="ctr"/>
+          <a:lstStyle/>
+          <a:p>
+            <a:pPr marL="0" marR="0" lvl="0" indent="0" algn="ctr" defTabSz="914400" rtl="0" eaLnBrk="0" fontAlgn="base" latinLnBrk="0" hangingPunct="0">
+              <a:lnSpc>
+                <a:spcPct val="100000"/>
+              </a:lnSpc>
+              <a:spcBef>
+                <a:spcPct val="0"/>
+              </a:spcBef>
+              <a:spcAft>
+                <a:spcPct val="0"/>
+              </a:spcAft>
+              <a:buClrTx/>
+              <a:buSzTx/>
+              <a:buFontTx/>
+              <a:buNone/>
+              <a:tabLst/>
+              <a:defRPr/>
+            </a:pPr>
+            <a:r>
+              <a:rPr lang="en-US" sz="1200" b="1" dirty="0" err="1">
+                <a:solidFill>
+                  <a:srgbClr val="FFFFFF"/>
+                </a:solidFill>
+                <a:latin typeface="Calibri"/>
+              </a:rPr>
+              <a:t>irq</a:t>
+            </a:r>
+            <a:r>
+              <a:rPr kumimoji="0" lang="en-US" sz="1200" b="1" i="0" u="none" strike="noStrike" kern="1200" cap="none" spc="0" normalizeH="0" baseline="0" noProof="0" dirty="0">
+                <a:ln>
+                  <a:noFill/>
+                </a:ln>
+                <a:solidFill>
+                  <a:srgbClr val="FFFFFF"/>
+                </a:solidFill>
+                <a:effectLst/>
+                <a:uLnTx/>
+                <a:uFillTx/>
+                <a:latin typeface="Calibri"/>
+                <a:ea typeface="+mn-ea"/>
+                <a:cs typeface="+mn-cs"/>
+              </a:rPr>
+              <a:t>-</a:t>
+            </a:r>
+            <a:r>
+              <a:rPr kumimoji="0" lang="en-US" sz="1200" b="1" i="0" u="none" strike="noStrike" kern="1200" cap="none" spc="0" normalizeH="0" baseline="0" noProof="0" dirty="0" err="1">
+                <a:ln>
+                  <a:noFill/>
+                </a:ln>
+                <a:solidFill>
+                  <a:srgbClr val="FFFFFF"/>
+                </a:solidFill>
+                <a:effectLst/>
+                <a:uLnTx/>
+                <a:uFillTx/>
+                <a:latin typeface="Calibri"/>
+                <a:ea typeface="+mn-ea"/>
+                <a:cs typeface="+mn-cs"/>
+              </a:rPr>
+              <a:t>vectors.h</a:t>
+            </a:r>
+            <a:endParaRPr kumimoji="0" lang="en-US" sz="1200" b="1" i="0" u="none" strike="noStrike" kern="1200" cap="none" spc="0" normalizeH="0" baseline="0" noProof="0" dirty="0">
+              <a:ln>
+                <a:noFill/>
+              </a:ln>
+              <a:solidFill>
+                <a:srgbClr val="FFFFFF"/>
+              </a:solidFill>
+              <a:effectLst/>
+              <a:uLnTx/>
+              <a:uFillTx/>
+              <a:latin typeface="Calibri"/>
+              <a:ea typeface="+mn-ea"/>
+              <a:cs typeface="+mn-cs"/>
+            </a:endParaRPr>
+          </a:p>
+          <a:p>
+            <a:pPr marL="0" marR="0" lvl="0" indent="0" algn="ctr" defTabSz="914400" rtl="0" eaLnBrk="0" fontAlgn="base" latinLnBrk="0" hangingPunct="0">
+              <a:lnSpc>
+                <a:spcPct val="100000"/>
+              </a:lnSpc>
+              <a:spcBef>
+                <a:spcPct val="0"/>
+              </a:spcBef>
+              <a:spcAft>
+                <a:spcPct val="0"/>
+              </a:spcAft>
+              <a:buClrTx/>
+              <a:buSzTx/>
+              <a:buFontTx/>
+              <a:buNone/>
+              <a:tabLst/>
+              <a:defRPr/>
+            </a:pPr>
+            <a:r>
+              <a:rPr kumimoji="0" lang="en-US" sz="1200" b="0" i="0" u="none" strike="noStrike" kern="1200" cap="none" spc="0" normalizeH="0" baseline="0" noProof="0" dirty="0">
+                <a:ln>
+                  <a:noFill/>
+                </a:ln>
+                <a:solidFill>
+                  <a:srgbClr val="FFFFFF"/>
+                </a:solidFill>
+                <a:effectLst/>
+                <a:uLnTx/>
+                <a:uFillTx/>
+                <a:latin typeface="Calibri"/>
+                <a:ea typeface="+mn-ea"/>
+                <a:cs typeface="+mn-cs"/>
+              </a:rPr>
+              <a:t>Device specific</a:t>
+            </a:r>
+            <a:br>
+              <a:rPr kumimoji="0" lang="en-US" sz="1200" b="0" i="0" u="none" strike="noStrike" kern="1200" cap="none" spc="0" normalizeH="0" baseline="0" noProof="0" dirty="0">
+                <a:ln>
+                  <a:noFill/>
+                </a:ln>
+                <a:solidFill>
+                  <a:srgbClr val="FFFFFF"/>
+                </a:solidFill>
+                <a:effectLst/>
+                <a:uLnTx/>
+                <a:uFillTx/>
+                <a:latin typeface="Calibri"/>
+                <a:ea typeface="+mn-ea"/>
+                <a:cs typeface="+mn-cs"/>
+              </a:rPr>
+            </a:br>
+            <a:r>
+              <a:rPr kumimoji="0" lang="en-US" sz="1200" b="0" i="0" u="none" strike="noStrike" kern="1200" cap="none" spc="0" normalizeH="0" baseline="0" noProof="0" dirty="0">
+                <a:ln>
+                  <a:noFill/>
+                </a:ln>
+                <a:solidFill>
+                  <a:srgbClr val="FFFFFF"/>
+                </a:solidFill>
+                <a:effectLst/>
+                <a:uLnTx/>
+                <a:uFillTx/>
+                <a:latin typeface="Calibri"/>
+                <a:ea typeface="+mn-ea"/>
+                <a:cs typeface="+mn-cs"/>
+              </a:rPr>
+              <a:t>IRQ definitions</a:t>
+            </a:r>
+            <a:endParaRPr kumimoji="0" lang="en-GB" sz="1000" b="0" i="0" u="none" strike="noStrike" kern="1200" cap="none" spc="0" normalizeH="0" baseline="0" noProof="0" dirty="0">
+              <a:ln>
+                <a:noFill/>
+              </a:ln>
+              <a:solidFill>
+                <a:srgbClr val="FFFFFF"/>
+              </a:solidFill>
+              <a:effectLst/>
+              <a:uLnTx/>
+              <a:uFillTx/>
+              <a:latin typeface="Calibri"/>
               <a:ea typeface="+mn-ea"/>
               <a:cs typeface="+mn-cs"/>
             </a:endParaRPr>

</xml_diff>

<commit_message>
Linker Script File (Proposal).md revised after initial feedback
</commit_message>
<xml_diff>
--- a/tools/projmgr/docs/Manual/images/overview.pptx
+++ b/tools/projmgr/docs/Manual/images/overview.pptx
@@ -11926,7 +11926,7 @@
         </p:nvSpPr>
         <p:spPr>
           <a:xfrm>
-            <a:off x="557408" y="4799353"/>
+            <a:off x="547188" y="4083542"/>
             <a:ext cx="3864279" cy="1112932"/>
           </a:xfrm>
           <a:prstGeom prst="rect">
@@ -12457,7 +12457,7 @@
         <p:spPr>
           <a:xfrm>
             <a:off x="715763" y="2625380"/>
-            <a:ext cx="2179233" cy="498598"/>
+            <a:ext cx="2179233" cy="907941"/>
           </a:xfrm>
           <a:prstGeom prst="rect">
             <a:avLst/>
@@ -12492,12 +12492,28 @@
               <a:t>If </a:t>
             </a:r>
             <a:r>
+              <a:rPr lang="en-US" sz="1200" b="1" dirty="0">
+                <a:solidFill>
+                  <a:schemeClr val="tx2"/>
+                </a:solidFill>
+              </a:rPr>
+              <a:t>regions_&lt;</a:t>
+            </a:r>
+            <a:r>
               <a:rPr lang="en-US" sz="1200" b="1" dirty="0" err="1">
                 <a:solidFill>
                   <a:schemeClr val="tx2"/>
                 </a:solidFill>
               </a:rPr>
-              <a:t>region_defs.h</a:t>
+              <a:t>device_or_board</a:t>
+            </a:r>
+            <a:r>
+              <a:rPr lang="en-US" sz="1200" b="1" dirty="0">
+                <a:solidFill>
+                  <a:schemeClr val="tx2"/>
+                </a:solidFill>
+              </a:rPr>
+              <a:t>&gt;.h</a:t>
             </a:r>
             <a:r>
               <a:rPr lang="en-US" sz="1200" dirty="0">
@@ -12505,92 +12521,25 @@
                   <a:schemeClr val="tx2"/>
                 </a:solidFill>
               </a:rPr>
-              <a:t> does not exist</a:t>
-            </a:r>
-            <a:br>
+              <a:t> does not exist, it is generated by the </a:t>
+            </a:r>
+            <a:r>
+              <a:rPr lang="en-US" sz="1200" dirty="0" err="1">
+                <a:solidFill>
+                  <a:schemeClr val="tx2"/>
+                </a:solidFill>
+              </a:rPr>
+              <a:t>csolution</a:t>
+            </a:r>
+            <a:r>
               <a:rPr lang="en-US" sz="1200" dirty="0">
                 <a:solidFill>
                   <a:schemeClr val="tx2"/>
                 </a:solidFill>
               </a:rPr>
-            </a:br>
-            <a:r>
-              <a:rPr lang="en-US" sz="1200" dirty="0">
-                <a:solidFill>
-                  <a:schemeClr val="tx2"/>
-                </a:solidFill>
-              </a:rPr>
-              <a:t>it is generated by </a:t>
-            </a:r>
-            <a:r>
-              <a:rPr lang="en-US" sz="1200" dirty="0" err="1">
-                <a:solidFill>
-                  <a:schemeClr val="tx2"/>
-                </a:solidFill>
-              </a:rPr>
-              <a:t>csolution</a:t>
-            </a:r>
-            <a:r>
-              <a:rPr lang="en-US" sz="1200" dirty="0">
-                <a:solidFill>
-                  <a:schemeClr val="tx2"/>
-                </a:solidFill>
-              </a:rPr>
-              <a:t> tool</a:t>
-            </a:r>
-            <a:br>
-              <a:rPr lang="en-US" sz="1200" dirty="0">
-                <a:solidFill>
-                  <a:schemeClr val="tx2"/>
-                </a:solidFill>
-              </a:rPr>
-            </a:br>
-            <a:r>
-              <a:rPr lang="en-US" sz="1200" dirty="0">
-                <a:solidFill>
-                  <a:schemeClr val="tx2"/>
-                </a:solidFill>
-              </a:rPr>
-              <a:t>based on DFP information.</a:t>
-            </a:r>
-            <a:endParaRPr lang="en-US" sz="1200" kern="1200" dirty="0">
-              <a:solidFill>
-                <a:schemeClr val="tx2"/>
-              </a:solidFill>
-              <a:latin typeface="+mn-lt"/>
-              <a:ea typeface="+mn-ea"/>
-              <a:cs typeface="+mn-cs"/>
-            </a:endParaRPr>
-          </a:p>
-        </p:txBody>
-      </p:sp>
-      <p:sp>
-        <p:nvSpPr>
-          <p:cNvPr id="39" name="TextBox 38">
-            <a:extLst>
-              <a:ext uri="{FF2B5EF4-FFF2-40B4-BE49-F238E27FC236}">
-                <a16:creationId xmlns:a16="http://schemas.microsoft.com/office/drawing/2014/main" id="{563B620E-D6E7-93EA-E838-EF0AF129CC19}"/>
-              </a:ext>
-            </a:extLst>
-          </p:cNvPr>
-          <p:cNvSpPr txBox="1"/>
-          <p:nvPr/>
-        </p:nvSpPr>
-        <p:spPr>
-          <a:xfrm>
-            <a:off x="713985" y="3150296"/>
-            <a:ext cx="2346850" cy="332399"/>
-          </a:xfrm>
-          <a:prstGeom prst="rect">
-            <a:avLst/>
-          </a:prstGeom>
-          <a:noFill/>
-        </p:spPr>
-        <p:txBody>
-          <a:bodyPr wrap="square" lIns="0" tIns="0" rIns="0" bIns="0" rtlCol="0">
-            <a:spAutoFit/>
-          </a:bodyPr>
-          <a:lstStyle/>
+              <a:t> tool based on DFP information.</a:t>
+            </a:r>
+          </a:p>
           <a:p>
             <a:pPr marL="0" indent="0" algn="l" defTabSz="914400" rtl="0" eaLnBrk="1" latinLnBrk="0" hangingPunct="1">
               <a:lnSpc>
@@ -12605,22 +12554,6 @@
               <a:buFont typeface="Arial" panose="020B0604020202020204" pitchFamily="34" charset="0"/>
               <a:buNone/>
             </a:pPr>
-            <a:r>
-              <a:rPr lang="en-US" sz="1200" b="1" dirty="0" err="1">
-                <a:solidFill>
-                  <a:schemeClr val="tx2"/>
-                </a:solidFill>
-              </a:rPr>
-              <a:t>region_defs.h</a:t>
-            </a:r>
-            <a:r>
-              <a:rPr lang="en-US" sz="1200" dirty="0">
-                <a:solidFill>
-                  <a:schemeClr val="tx2"/>
-                </a:solidFill>
-              </a:rPr>
-              <a:t> may be part of a component or a software layer.</a:t>
-            </a:r>
             <a:endParaRPr lang="en-US" sz="1200" kern="1200" dirty="0">
               <a:solidFill>
                 <a:schemeClr val="tx2"/>
@@ -12818,48 +12751,6 @@
           <a:xfrm>
             <a:off x="4324349" y="3093004"/>
             <a:ext cx="340046" cy="2746"/>
-          </a:xfrm>
-          <a:prstGeom prst="straightConnector1">
-            <a:avLst/>
-          </a:prstGeom>
-          <a:ln w="38100">
-            <a:tailEnd type="triangle"/>
-          </a:ln>
-        </p:spPr>
-        <p:style>
-          <a:lnRef idx="1">
-            <a:schemeClr val="accent1"/>
-          </a:lnRef>
-          <a:fillRef idx="0">
-            <a:schemeClr val="accent1"/>
-          </a:fillRef>
-          <a:effectRef idx="0">
-            <a:schemeClr val="accent1"/>
-          </a:effectRef>
-          <a:fontRef idx="minor">
-            <a:schemeClr val="tx1"/>
-          </a:fontRef>
-        </p:style>
-      </p:cxnSp>
-      <p:cxnSp>
-        <p:nvCxnSpPr>
-          <p:cNvPr id="5" name="Straight Arrow Connector 4">
-            <a:extLst>
-              <a:ext uri="{FF2B5EF4-FFF2-40B4-BE49-F238E27FC236}">
-                <a16:creationId xmlns:a16="http://schemas.microsoft.com/office/drawing/2014/main" id="{D03DF2FC-85B0-0807-1B87-189431D9CA2E}"/>
-              </a:ext>
-            </a:extLst>
-          </p:cNvPr>
-          <p:cNvCxnSpPr>
-            <a:cxnSpLocks/>
-            <a:endCxn id="12" idx="0"/>
-          </p:cNvCxnSpPr>
-          <p:nvPr/>
-        </p:nvCxnSpPr>
-        <p:spPr>
-          <a:xfrm>
-            <a:off x="3661276" y="3169086"/>
-            <a:ext cx="3633" cy="615907"/>
           </a:xfrm>
           <a:prstGeom prst="straightConnector1">
             <a:avLst/>
@@ -12951,7 +12842,7 @@
         </p:nvSpPr>
         <p:spPr>
           <a:xfrm>
-            <a:off x="2998201" y="3784993"/>
+            <a:off x="4662617" y="4193679"/>
             <a:ext cx="1333416" cy="884321"/>
           </a:xfrm>
           <a:prstGeom prst="flowChartDocument">
@@ -13107,13 +12998,31 @@
               <a:defRPr/>
             </a:pPr>
             <a:r>
+              <a:rPr lang="en-US" sz="1200" b="1" dirty="0">
+                <a:solidFill>
+                  <a:srgbClr val="FFFFFF"/>
+                </a:solidFill>
+                <a:latin typeface="Calibri"/>
+              </a:rPr>
+              <a:t>regions_&lt;</a:t>
+            </a:r>
+            <a:r>
               <a:rPr lang="en-US" sz="1200" b="1" dirty="0" err="1">
                 <a:solidFill>
                   <a:srgbClr val="FFFFFF"/>
                 </a:solidFill>
                 <a:latin typeface="Calibri"/>
               </a:rPr>
-              <a:t>region_defs.h</a:t>
+              <a:t>device_or_board</a:t>
+            </a:r>
+            <a:r>
+              <a:rPr lang="en-US" sz="1200" b="1" dirty="0">
+                <a:solidFill>
+                  <a:srgbClr val="FFFFFF"/>
+                </a:solidFill>
+                <a:latin typeface="Calibri"/>
+              </a:rPr>
+              <a:t>&gt;.h</a:t>
             </a:r>
             <a:r>
               <a:rPr kumimoji="0" lang="en-US" sz="1200" b="1" i="0" u="none" strike="noStrike" kern="1200" cap="none" spc="0" normalizeH="0" baseline="0" noProof="0" dirty="0">
@@ -13221,7 +13130,7 @@
         </p:nvSpPr>
         <p:spPr>
           <a:xfrm>
-            <a:off x="713985" y="5003653"/>
+            <a:off x="703765" y="4287842"/>
             <a:ext cx="2085582" cy="498598"/>
           </a:xfrm>
           <a:prstGeom prst="rect">
@@ -13305,9 +13214,9 @@
           <p:nvPr/>
         </p:nvCxnSpPr>
         <p:spPr>
-          <a:xfrm flipV="1">
-            <a:off x="3659192" y="4618256"/>
-            <a:ext cx="3633" cy="615907"/>
+          <a:xfrm>
+            <a:off x="4272265" y="4610744"/>
+            <a:ext cx="390352" cy="0"/>
           </a:xfrm>
           <a:prstGeom prst="straightConnector1">
             <a:avLst/>
@@ -13345,7 +13254,7 @@
         </p:nvSpPr>
         <p:spPr>
           <a:xfrm>
-            <a:off x="2992484" y="4920500"/>
+            <a:off x="2982264" y="4204689"/>
             <a:ext cx="1333416" cy="873311"/>
           </a:xfrm>
           <a:prstGeom prst="flowChartDocument">

</xml_diff>

<commit_message>
Added: mapping of filename extensions to categories
</commit_message>
<xml_diff>
--- a/tools/projmgr/docs/Manual/images/overview.pptx
+++ b/tools/projmgr/docs/Manual/images/overview.pptx
@@ -5,10 +5,10 @@
     <p:sldMasterId id="2147483661" r:id="rId1"/>
   </p:sldMasterIdLst>
   <p:notesMasterIdLst>
-    <p:notesMasterId r:id="rId13"/>
+    <p:notesMasterId r:id="rId14"/>
   </p:notesMasterIdLst>
   <p:handoutMasterIdLst>
-    <p:handoutMasterId r:id="rId14"/>
+    <p:handoutMasterId r:id="rId15"/>
   </p:handoutMasterIdLst>
   <p:sldIdLst>
     <p:sldId id="345" r:id="rId2"/>
@@ -22,6 +22,7 @@
     <p:sldId id="2123260230" r:id="rId10"/>
     <p:sldId id="2123260194" r:id="rId11"/>
     <p:sldId id="2123260231" r:id="rId12"/>
+    <p:sldId id="2123260232" r:id="rId13"/>
   </p:sldIdLst>
   <p:sldSz cx="12192000" cy="6858000"/>
   <p:notesSz cx="6858000" cy="9144000"/>
@@ -13453,6 +13454,207 @@
     <p:extLst>
       <p:ext uri="{BB962C8B-B14F-4D97-AF65-F5344CB8AC3E}">
         <p14:creationId xmlns:p14="http://schemas.microsoft.com/office/powerpoint/2010/main" val="1740976106"/>
+      </p:ext>
+    </p:extLst>
+  </p:cSld>
+  <p:clrMapOvr>
+    <a:masterClrMapping/>
+  </p:clrMapOvr>
+</p:sld>
+</file>
+
+<file path=ppt/slides/slide12.xml><?xml version="1.0" encoding="utf-8"?>
+<p:sld xmlns:a="http://schemas.openxmlformats.org/drawingml/2006/main" xmlns:r="http://schemas.openxmlformats.org/officeDocument/2006/relationships" xmlns:p="http://schemas.openxmlformats.org/presentationml/2006/main">
+  <p:cSld>
+    <p:spTree>
+      <p:nvGrpSpPr>
+        <p:cNvPr id="1" name=""/>
+        <p:cNvGrpSpPr/>
+        <p:nvPr/>
+      </p:nvGrpSpPr>
+      <p:grpSpPr>
+        <a:xfrm>
+          <a:off x="0" y="0"/>
+          <a:ext cx="0" cy="0"/>
+          <a:chOff x="0" y="0"/>
+          <a:chExt cx="0" cy="0"/>
+        </a:xfrm>
+      </p:grpSpPr>
+      <p:sp>
+        <p:nvSpPr>
+          <p:cNvPr id="2" name="Title 1">
+            <a:extLst>
+              <a:ext uri="{FF2B5EF4-FFF2-40B4-BE49-F238E27FC236}">
+                <a16:creationId xmlns:a16="http://schemas.microsoft.com/office/drawing/2014/main" id="{529C697F-706D-2BF8-7A64-9EAC012489F7}"/>
+              </a:ext>
+            </a:extLst>
+          </p:cNvPr>
+          <p:cNvSpPr>
+            <a:spLocks noGrp="1"/>
+          </p:cNvSpPr>
+          <p:nvPr>
+            <p:ph type="title"/>
+          </p:nvPr>
+        </p:nvSpPr>
+        <p:spPr/>
+        <p:txBody>
+          <a:bodyPr/>
+          <a:lstStyle/>
+          <a:p>
+            <a:r>
+              <a:rPr lang="en-US" dirty="0"/>
+              <a:t>Roadmap H1’2023 – CMSIS-Toolbox 2.0</a:t>
+            </a:r>
+          </a:p>
+        </p:txBody>
+      </p:sp>
+      <p:sp>
+        <p:nvSpPr>
+          <p:cNvPr id="3" name="Text Placeholder 2">
+            <a:extLst>
+              <a:ext uri="{FF2B5EF4-FFF2-40B4-BE49-F238E27FC236}">
+                <a16:creationId xmlns:a16="http://schemas.microsoft.com/office/drawing/2014/main" id="{052B6CC1-9386-18A8-7FC9-9AE0369261CB}"/>
+              </a:ext>
+            </a:extLst>
+          </p:cNvPr>
+          <p:cNvSpPr>
+            <a:spLocks noGrp="1"/>
+          </p:cNvSpPr>
+          <p:nvPr>
+            <p:ph type="body" sz="quarter" idx="13"/>
+          </p:nvPr>
+        </p:nvSpPr>
+        <p:spPr/>
+        <p:txBody>
+          <a:bodyPr/>
+          <a:lstStyle/>
+          <a:p>
+            <a:endParaRPr lang="en-US"/>
+          </a:p>
+        </p:txBody>
+      </p:sp>
+      <p:sp>
+        <p:nvSpPr>
+          <p:cNvPr id="4" name="Content Placeholder 3">
+            <a:extLst>
+              <a:ext uri="{FF2B5EF4-FFF2-40B4-BE49-F238E27FC236}">
+                <a16:creationId xmlns:a16="http://schemas.microsoft.com/office/drawing/2014/main" id="{5FD07831-6602-44DC-7B4A-846C7DA456BA}"/>
+              </a:ext>
+            </a:extLst>
+          </p:cNvPr>
+          <p:cNvSpPr>
+            <a:spLocks noGrp="1"/>
+          </p:cNvSpPr>
+          <p:nvPr>
+            <p:ph idx="1"/>
+          </p:nvPr>
+        </p:nvSpPr>
+        <p:spPr/>
+        <p:txBody>
+          <a:bodyPr/>
+          <a:lstStyle/>
+          <a:p>
+            <a:r>
+              <a:rPr lang="en-US" sz="2000" dirty="0"/>
+              <a:t>Review proposals and agree on implementation timeline (until 15. Feb 2023)</a:t>
+            </a:r>
+          </a:p>
+          <a:p>
+            <a:r>
+              <a:rPr lang="en-US" sz="2000" dirty="0"/>
+              <a:t>Identify missing features for integration into VS Code</a:t>
+            </a:r>
+          </a:p>
+          <a:p>
+            <a:r>
+              <a:rPr lang="en-US" sz="2000" dirty="0"/>
+              <a:t>Work on Installer that (a) is stand-along for Linux, (b) installs CMSIS-Toolbox to VS Code</a:t>
+            </a:r>
+          </a:p>
+          <a:p>
+            <a:r>
+              <a:rPr lang="en-US" sz="2000" dirty="0"/>
+              <a:t>Implement Gaps:</a:t>
+            </a:r>
+          </a:p>
+          <a:p>
+            <a:pPr lvl="1"/>
+            <a:r>
+              <a:rPr lang="en-US" sz="1800" dirty="0" err="1"/>
+              <a:t>csolution</a:t>
+            </a:r>
+            <a:r>
+              <a:rPr lang="en-US" sz="1800" dirty="0"/>
+              <a:t> list config </a:t>
+            </a:r>
+            <a:r>
+              <a:rPr lang="en-US" sz="1800" dirty="0">
+                <a:hlinkClick r:id="rId2"/>
+              </a:rPr>
+              <a:t>#142</a:t>
+            </a:r>
+            <a:r>
+              <a:rPr lang="en-US" sz="1800" dirty="0"/>
+              <a:t>, </a:t>
+            </a:r>
+          </a:p>
+          <a:p>
+            <a:pPr marL="414655" lvl="1" indent="0">
+              <a:buNone/>
+            </a:pPr>
+            <a:endParaRPr lang="en-US" dirty="0"/>
+          </a:p>
+          <a:p>
+            <a:pPr marL="414655" lvl="1" indent="0">
+              <a:buNone/>
+            </a:pPr>
+            <a:endParaRPr lang="en-US" dirty="0"/>
+          </a:p>
+          <a:p>
+            <a:pPr marL="0" indent="0">
+              <a:buNone/>
+            </a:pPr>
+            <a:r>
+              <a:rPr lang="en-US" dirty="0"/>
+              <a:t>Out of scope (</a:t>
+            </a:r>
+            <a:r>
+              <a:rPr lang="en-US" dirty="0" err="1"/>
+              <a:t>todo</a:t>
+            </a:r>
+            <a:r>
+              <a:rPr lang="en-US" dirty="0"/>
+              <a:t> later in 2023)</a:t>
+            </a:r>
+          </a:p>
+          <a:p>
+            <a:r>
+              <a:rPr lang="en-US" sz="2000" dirty="0"/>
+              <a:t>CMSIS-Zone integration and resource management proposal</a:t>
+            </a:r>
+          </a:p>
+          <a:p>
+            <a:r>
+              <a:rPr lang="en-US" sz="2000" dirty="0"/>
+              <a:t>Command for batch delete </a:t>
+            </a:r>
+            <a:r>
+              <a:rPr lang="en-US" sz="2000" dirty="0">
+                <a:hlinkClick r:id="rId3"/>
+              </a:rPr>
+              <a:t>#143</a:t>
+            </a:r>
+            <a:endParaRPr lang="en-US" sz="2000" dirty="0"/>
+          </a:p>
+          <a:p>
+            <a:endParaRPr lang="en-US" dirty="0"/>
+          </a:p>
+        </p:txBody>
+      </p:sp>
+    </p:spTree>
+    <p:extLst>
+      <p:ext uri="{BB962C8B-B14F-4D97-AF65-F5344CB8AC3E}">
+        <p14:creationId xmlns:p14="http://schemas.microsoft.com/office/powerpoint/2010/main" val="931032530"/>
       </p:ext>
     </p:extLst>
   </p:cSld>

</xml_diff>

<commit_message>
Added information about the build process which includes the process to add new compiler toolchains
</commit_message>
<xml_diff>
--- a/tools/projmgr/docs/Manual/images/overview.pptx
+++ b/tools/projmgr/docs/Manual/images/overview.pptx
@@ -5,10 +5,10 @@
     <p:sldMasterId id="2147483661" r:id="rId1"/>
   </p:sldMasterIdLst>
   <p:notesMasterIdLst>
-    <p:notesMasterId r:id="rId14"/>
+    <p:notesMasterId r:id="rId16"/>
   </p:notesMasterIdLst>
   <p:handoutMasterIdLst>
-    <p:handoutMasterId r:id="rId15"/>
+    <p:handoutMasterId r:id="rId17"/>
   </p:handoutMasterIdLst>
   <p:sldIdLst>
     <p:sldId id="345" r:id="rId2"/>
@@ -22,7 +22,9 @@
     <p:sldId id="2123260230" r:id="rId10"/>
     <p:sldId id="2123260194" r:id="rId11"/>
     <p:sldId id="2123260231" r:id="rId12"/>
-    <p:sldId id="2123260232" r:id="rId13"/>
+    <p:sldId id="2123260234" r:id="rId13"/>
+    <p:sldId id="2123260235" r:id="rId14"/>
+    <p:sldId id="2123260232" r:id="rId15"/>
   </p:sldIdLst>
   <p:sldSz cx="12192000" cy="6858000"/>
   <p:notesSz cx="6858000" cy="9144000"/>
@@ -302,7 +304,7 @@
           <a:p>
             <a:fld id="{008FFADC-39A7-449E-8C68-8776E6FB3C1A}" type="datetimeFigureOut">
               <a:rPr lang="en-GB" smtClean="0"/>
-              <a:t>03/01/2023</a:t>
+              <a:t>04/01/2023</a:t>
             </a:fld>
             <a:endParaRPr lang="en-GB"/>
           </a:p>
@@ -479,7 +481,7 @@
           <a:p>
             <a:fld id="{30B9BAAB-B703-4BB5-9D08-B460FC03C23A}" type="datetimeFigureOut">
               <a:rPr lang="en-GB" smtClean="0"/>
-              <a:t>03/01/2023</a:t>
+              <a:t>04/01/2023</a:t>
             </a:fld>
             <a:endParaRPr lang="en-GB"/>
           </a:p>
@@ -11857,6 +11859,47 @@
           <a:chExt cx="0" cy="0"/>
         </a:xfrm>
       </p:grpSpPr>
+      <p:cxnSp>
+        <p:nvCxnSpPr>
+          <p:cNvPr id="34" name="Straight Arrow Connector 33">
+            <a:extLst>
+              <a:ext uri="{FF2B5EF4-FFF2-40B4-BE49-F238E27FC236}">
+                <a16:creationId xmlns:a16="http://schemas.microsoft.com/office/drawing/2014/main" id="{0EAFB0EC-0BEB-61AF-ED8E-AB8E9E397245}"/>
+              </a:ext>
+            </a:extLst>
+          </p:cNvPr>
+          <p:cNvCxnSpPr>
+            <a:cxnSpLocks/>
+          </p:cNvCxnSpPr>
+          <p:nvPr/>
+        </p:nvCxnSpPr>
+        <p:spPr>
+          <a:xfrm>
+            <a:off x="6003604" y="3097646"/>
+            <a:ext cx="340046" cy="2746"/>
+          </a:xfrm>
+          <a:prstGeom prst="straightConnector1">
+            <a:avLst/>
+          </a:prstGeom>
+          <a:ln w="38100">
+            <a:tailEnd type="triangle"/>
+          </a:ln>
+        </p:spPr>
+        <p:style>
+          <a:lnRef idx="1">
+            <a:schemeClr val="accent1"/>
+          </a:lnRef>
+          <a:fillRef idx="0">
+            <a:schemeClr val="accent1"/>
+          </a:fillRef>
+          <a:effectRef idx="0">
+            <a:schemeClr val="accent1"/>
+          </a:effectRef>
+          <a:fontRef idx="minor">
+            <a:schemeClr val="tx1"/>
+          </a:fontRef>
+        </p:style>
+      </p:cxnSp>
       <p:sp>
         <p:nvSpPr>
           <p:cNvPr id="8" name="Rectangle 7">
@@ -11871,8 +11914,8 @@
         </p:nvSpPr>
         <p:spPr>
           <a:xfrm>
-            <a:off x="2894996" y="1283722"/>
-            <a:ext cx="3201004" cy="1052187"/>
+            <a:off x="557409" y="1283722"/>
+            <a:ext cx="5538592" cy="1052187"/>
           </a:xfrm>
           <a:prstGeom prst="rect">
             <a:avLst/>
@@ -11927,8 +11970,8 @@
         </p:nvSpPr>
         <p:spPr>
           <a:xfrm>
-            <a:off x="547188" y="4083542"/>
-            <a:ext cx="3864279" cy="1112932"/>
+            <a:off x="557408" y="4083542"/>
+            <a:ext cx="3854059" cy="1112932"/>
           </a:xfrm>
           <a:prstGeom prst="rect">
             <a:avLst/>
@@ -12157,7 +12200,7 @@
               <a:defRPr/>
             </a:pPr>
             <a:r>
-              <a:rPr kumimoji="0" lang="en-US" sz="1200" b="0" i="0" u="none" strike="noStrike" kern="1200" cap="none" spc="0" normalizeH="0" baseline="0" noProof="0" dirty="0">
+              <a:rPr kumimoji="0" lang="en-US" sz="1200" b="1" i="0" u="none" strike="noStrike" kern="1200" cap="none" spc="0" normalizeH="0" baseline="0" noProof="0" dirty="0">
                 <a:ln>
                   <a:noFill/>
                 </a:ln>
@@ -12171,9 +12214,42 @@
                 <a:ea typeface="+mn-ea"/>
                 <a:cs typeface="+mn-cs"/>
               </a:rPr>
-              <a:t>Compiler specific Script File Template</a:t>
-            </a:r>
-            <a:endParaRPr kumimoji="0" lang="en-GB" sz="1000" b="0" i="0" u="none" strike="noStrike" kern="1200" cap="none" spc="0" normalizeH="0" baseline="0" noProof="0" dirty="0">
+              <a:t>Linker Script </a:t>
+            </a:r>
+            <a:br>
+              <a:rPr kumimoji="0" lang="en-US" sz="1200" b="1" i="0" u="none" strike="noStrike" kern="1200" cap="none" spc="0" normalizeH="0" baseline="0" noProof="0" dirty="0">
+                <a:ln>
+                  <a:noFill/>
+                </a:ln>
+                <a:solidFill>
+                  <a:srgbClr val="FFFFFF"/>
+                </a:solidFill>
+                <a:effectLst/>
+                <a:uLnTx/>
+                <a:uFillTx/>
+                <a:latin typeface="Calibri"/>
+                <a:ea typeface="+mn-ea"/>
+                <a:cs typeface="+mn-cs"/>
+              </a:rPr>
+            </a:br>
+            <a:r>
+              <a:rPr kumimoji="0" lang="en-US" sz="1200" b="1" i="0" u="none" strike="noStrike" kern="1200" cap="none" spc="0" normalizeH="0" baseline="0" noProof="0" dirty="0">
+                <a:ln>
+                  <a:noFill/>
+                </a:ln>
+                <a:solidFill>
+                  <a:srgbClr val="FFFFFF"/>
+                </a:solidFill>
+                <a:effectLst/>
+                <a:uLnTx/>
+                <a:uFillTx/>
+                <a:latin typeface="Calibri"/>
+                <a:ea typeface="+mn-ea"/>
+                <a:cs typeface="+mn-cs"/>
+              </a:rPr>
+              <a:t>File</a:t>
+            </a:r>
+            <a:endParaRPr kumimoji="0" lang="en-GB" sz="1000" b="1" i="0" u="none" strike="noStrike" kern="1200" cap="none" spc="0" normalizeH="0" baseline="0" noProof="0" dirty="0">
               <a:ln>
                 <a:noFill/>
               </a:ln>
@@ -12374,7 +12450,7 @@
                 </a:solidFill>
                 <a:latin typeface="Calibri"/>
               </a:rPr>
-              <a:t>Linker</a:t>
+              <a:t>Final </a:t>
             </a:r>
             <a:br>
               <a:rPr lang="en-US" sz="1200" b="1" dirty="0">
@@ -12391,7 +12467,24 @@
                 </a:solidFill>
                 <a:latin typeface="Calibri"/>
               </a:rPr>
-              <a:t>Script File</a:t>
+              <a:t>Linker Input</a:t>
+            </a:r>
+            <a:br>
+              <a:rPr lang="en-US" sz="1200" b="1" dirty="0">
+                <a:solidFill>
+                  <a:srgbClr val="FFFFFF"/>
+                </a:solidFill>
+                <a:latin typeface="Calibri"/>
+              </a:rPr>
+            </a:br>
+            <a:r>
+              <a:rPr lang="en-US" sz="1200" b="1" dirty="0">
+                <a:solidFill>
+                  <a:srgbClr val="FFFFFF"/>
+                </a:solidFill>
+                <a:latin typeface="Calibri"/>
+              </a:rPr>
+              <a:t>Script</a:t>
             </a:r>
             <a:endParaRPr lang="en-US" sz="1100" dirty="0">
               <a:solidFill>
@@ -12402,47 +12495,6 @@
           </a:p>
         </p:txBody>
       </p:sp>
-      <p:cxnSp>
-        <p:nvCxnSpPr>
-          <p:cNvPr id="34" name="Straight Arrow Connector 33">
-            <a:extLst>
-              <a:ext uri="{FF2B5EF4-FFF2-40B4-BE49-F238E27FC236}">
-                <a16:creationId xmlns:a16="http://schemas.microsoft.com/office/drawing/2014/main" id="{0EAFB0EC-0BEB-61AF-ED8E-AB8E9E397245}"/>
-              </a:ext>
-            </a:extLst>
-          </p:cNvPr>
-          <p:cNvCxnSpPr>
-            <a:cxnSpLocks/>
-          </p:cNvCxnSpPr>
-          <p:nvPr/>
-        </p:nvCxnSpPr>
-        <p:spPr>
-          <a:xfrm>
-            <a:off x="6003604" y="3097646"/>
-            <a:ext cx="340046" cy="2746"/>
-          </a:xfrm>
-          <a:prstGeom prst="straightConnector1">
-            <a:avLst/>
-          </a:prstGeom>
-          <a:ln w="38100">
-            <a:tailEnd type="triangle"/>
-          </a:ln>
-        </p:spPr>
-        <p:style>
-          <a:lnRef idx="1">
-            <a:schemeClr val="accent1"/>
-          </a:lnRef>
-          <a:fillRef idx="0">
-            <a:schemeClr val="accent1"/>
-          </a:fillRef>
-          <a:effectRef idx="0">
-            <a:schemeClr val="accent1"/>
-          </a:effectRef>
-          <a:fontRef idx="minor">
-            <a:schemeClr val="tx1"/>
-          </a:fontRef>
-        </p:style>
-      </p:cxnSp>
       <p:sp>
         <p:nvSpPr>
           <p:cNvPr id="38" name="TextBox 37">
@@ -12580,8 +12632,8 @@
         </p:nvSpPr>
         <p:spPr>
           <a:xfrm>
-            <a:off x="3050088" y="1375288"/>
-            <a:ext cx="1568623" cy="830997"/>
+            <a:off x="703766" y="1375288"/>
+            <a:ext cx="3914946" cy="741742"/>
           </a:xfrm>
           <a:prstGeom prst="rect">
             <a:avLst/>
@@ -12594,6 +12646,40 @@
           </a:bodyPr>
           <a:lstStyle/>
           <a:p>
+            <a:pPr>
+              <a:lnSpc>
+                <a:spcPct val="90000"/>
+              </a:lnSpc>
+              <a:spcAft>
+                <a:spcPts val="600"/>
+              </a:spcAft>
+            </a:pPr>
+            <a:r>
+              <a:rPr lang="en-US" sz="1200" dirty="0">
+                <a:solidFill>
+                  <a:schemeClr val="tx2"/>
+                </a:solidFill>
+              </a:rPr>
+              <a:t>A </a:t>
+            </a:r>
+            <a:r>
+              <a:rPr lang="en-US" sz="1200" b="1" dirty="0">
+                <a:solidFill>
+                  <a:schemeClr val="tx2"/>
+                </a:solidFill>
+              </a:rPr>
+              <a:t>Linker Script File</a:t>
+            </a:r>
+            <a:r>
+              <a:rPr lang="en-US" sz="1200" dirty="0">
+                <a:solidFill>
+                  <a:schemeClr val="tx2"/>
+                </a:solidFill>
+              </a:rPr>
+              <a:t> may be provided using a software component or an explicit file definition in a project file group.</a:t>
+            </a:r>
+          </a:p>
+          <a:p>
             <a:pPr marL="0" indent="0" algn="l" defTabSz="914400" rtl="0" eaLnBrk="1" latinLnBrk="0" hangingPunct="1">
               <a:lnSpc>
                 <a:spcPct val="90000"/>
@@ -12608,12 +12694,20 @@
               <a:buNone/>
             </a:pPr>
             <a:r>
+              <a:rPr lang="en-US" sz="1200" dirty="0">
+                <a:solidFill>
+                  <a:schemeClr val="tx2"/>
+                </a:solidFill>
+              </a:rPr>
+              <a:t>If no </a:t>
+            </a:r>
+            <a:r>
               <a:rPr lang="en-US" sz="1200" b="1" dirty="0">
                 <a:solidFill>
                   <a:schemeClr val="tx2"/>
                 </a:solidFill>
               </a:rPr>
-              <a:t>Compiler specific linker script file templates</a:t>
+              <a:t>Linker Script File</a:t>
             </a:r>
             <a:r>
               <a:rPr lang="en-US" sz="1200" dirty="0">
@@ -12621,7 +12715,7 @@
                   <a:schemeClr val="tx2"/>
                 </a:solidFill>
               </a:rPr>
-              <a:t> are provided in the </a:t>
+              <a:t> is provided, </a:t>
             </a:r>
             <a:r>
               <a:rPr lang="en-US" sz="1200" b="1" dirty="0">
@@ -12629,6 +12723,22 @@
                   <a:schemeClr val="tx2"/>
                 </a:solidFill>
               </a:rPr>
+              <a:t>compiler specific script file templates</a:t>
+            </a:r>
+            <a:r>
+              <a:rPr lang="en-US" sz="1200" dirty="0">
+                <a:solidFill>
+                  <a:schemeClr val="tx2"/>
+                </a:solidFill>
+              </a:rPr>
+              <a:t> from </a:t>
+            </a:r>
+            <a:r>
+              <a:rPr lang="en-US" sz="1200" b="1" dirty="0">
+                <a:solidFill>
+                  <a:schemeClr val="tx2"/>
+                </a:solidFill>
+              </a:rPr>
               <a:t>.\</a:t>
             </a:r>
             <a:r>
@@ -12645,83 +12755,7 @@
                   <a:schemeClr val="tx2"/>
                 </a:solidFill>
               </a:rPr>
-              <a:t> directory of CMSIS-Toolbox.</a:t>
-            </a:r>
-            <a:endParaRPr lang="en-US" sz="1200" kern="1200" dirty="0">
-              <a:solidFill>
-                <a:schemeClr val="tx2"/>
-              </a:solidFill>
-              <a:latin typeface="+mn-lt"/>
-              <a:ea typeface="+mn-ea"/>
-              <a:cs typeface="+mn-cs"/>
-            </a:endParaRPr>
-          </a:p>
-        </p:txBody>
-      </p:sp>
-      <p:sp>
-        <p:nvSpPr>
-          <p:cNvPr id="41" name="TextBox 40">
-            <a:extLst>
-              <a:ext uri="{FF2B5EF4-FFF2-40B4-BE49-F238E27FC236}">
-                <a16:creationId xmlns:a16="http://schemas.microsoft.com/office/drawing/2014/main" id="{14F1D48C-AE07-600B-28FF-10FF814886EB}"/>
-              </a:ext>
-            </a:extLst>
-          </p:cNvPr>
-          <p:cNvSpPr txBox="1"/>
-          <p:nvPr/>
-        </p:nvSpPr>
-        <p:spPr>
-          <a:xfrm>
-            <a:off x="6289078" y="1631444"/>
-            <a:ext cx="1359855" cy="830997"/>
-          </a:xfrm>
-          <a:prstGeom prst="rect">
-            <a:avLst/>
-          </a:prstGeom>
-          <a:noFill/>
-        </p:spPr>
-        <p:txBody>
-          <a:bodyPr wrap="square" lIns="0" tIns="0" rIns="0" bIns="0" rtlCol="0">
-            <a:spAutoFit/>
-          </a:bodyPr>
-          <a:lstStyle/>
-          <a:p>
-            <a:pPr marL="0" indent="0" algn="l" defTabSz="914400" rtl="0" eaLnBrk="1" latinLnBrk="0" hangingPunct="1">
-              <a:lnSpc>
-                <a:spcPct val="90000"/>
-              </a:lnSpc>
-              <a:spcBef>
-                <a:spcPts val="0"/>
-              </a:spcBef>
-              <a:spcAft>
-                <a:spcPts val="600"/>
-              </a:spcAft>
-              <a:buFont typeface="Arial" panose="020B0604020202020204" pitchFamily="34" charset="0"/>
-              <a:buNone/>
-            </a:pPr>
-            <a:r>
-              <a:rPr lang="en-US" sz="1200" dirty="0">
-                <a:solidFill>
-                  <a:schemeClr val="tx2"/>
-                </a:solidFill>
-              </a:rPr>
-              <a:t>If no </a:t>
-            </a:r>
-            <a:r>
-              <a:rPr lang="en-US" sz="1200" b="1" dirty="0">
-                <a:solidFill>
-                  <a:schemeClr val="tx2"/>
-                </a:solidFill>
-              </a:rPr>
-              <a:t>Linker Script File</a:t>
-            </a:r>
-            <a:r>
-              <a:rPr lang="en-US" sz="1200" dirty="0">
-                <a:solidFill>
-                  <a:schemeClr val="tx2"/>
-                </a:solidFill>
-              </a:rPr>
-              <a:t> is provided by a component or project file, it is generated during build process.</a:t>
+              <a:t> directory of CMSIS-Toolbox are used.</a:t>
             </a:r>
             <a:endParaRPr lang="en-US" sz="1200" kern="1200" dirty="0">
               <a:solidFill>
@@ -12775,60 +12809,6 @@
           </a:fontRef>
         </p:style>
       </p:cxnSp>
-      <p:sp>
-        <p:nvSpPr>
-          <p:cNvPr id="10" name="Rectangle 9">
-            <a:extLst>
-              <a:ext uri="{FF2B5EF4-FFF2-40B4-BE49-F238E27FC236}">
-                <a16:creationId xmlns:a16="http://schemas.microsoft.com/office/drawing/2014/main" id="{5D45CDC4-4CFC-FBBF-C601-0E90A56861BA}"/>
-              </a:ext>
-            </a:extLst>
-          </p:cNvPr>
-          <p:cNvSpPr/>
-          <p:nvPr/>
-        </p:nvSpPr>
-        <p:spPr>
-          <a:xfrm>
-            <a:off x="6251092" y="1573194"/>
-            <a:ext cx="1533003" cy="2015514"/>
-          </a:xfrm>
-          <a:prstGeom prst="rect">
-            <a:avLst/>
-          </a:prstGeom>
-          <a:solidFill>
-            <a:schemeClr val="accent5">
-              <a:alpha val="14902"/>
-            </a:schemeClr>
-          </a:solidFill>
-          <a:ln>
-            <a:noFill/>
-          </a:ln>
-        </p:spPr>
-        <p:style>
-          <a:lnRef idx="2">
-            <a:schemeClr val="accent1">
-              <a:shade val="50000"/>
-            </a:schemeClr>
-          </a:lnRef>
-          <a:fillRef idx="1">
-            <a:schemeClr val="accent1"/>
-          </a:fillRef>
-          <a:effectRef idx="0">
-            <a:schemeClr val="accent1"/>
-          </a:effectRef>
-          <a:fontRef idx="minor">
-            <a:schemeClr val="lt1"/>
-          </a:fontRef>
-        </p:style>
-        <p:txBody>
-          <a:bodyPr rtlCol="0" anchor="ctr"/>
-          <a:lstStyle/>
-          <a:p>
-            <a:pPr algn="ctr"/>
-            <a:endParaRPr lang="en-US"/>
-          </a:p>
-        </p:txBody>
-      </p:sp>
       <p:sp>
         <p:nvSpPr>
           <p:cNvPr id="12" name="Flowchart: Document 11">
@@ -13482,6 +13462,4203 @@
       </p:grpSpPr>
       <p:sp>
         <p:nvSpPr>
+          <p:cNvPr id="31" name="Arrow: Right 30">
+            <a:extLst>
+              <a:ext uri="{FF2B5EF4-FFF2-40B4-BE49-F238E27FC236}">
+                <a16:creationId xmlns:a16="http://schemas.microsoft.com/office/drawing/2014/main" id="{1F9E4950-7682-4A97-95D2-18A9AEA2F368}"/>
+              </a:ext>
+            </a:extLst>
+          </p:cNvPr>
+          <p:cNvSpPr/>
+          <p:nvPr/>
+        </p:nvSpPr>
+        <p:spPr>
+          <a:xfrm>
+            <a:off x="5489439" y="3111524"/>
+            <a:ext cx="508607" cy="204537"/>
+          </a:xfrm>
+          <a:prstGeom prst="rightArrow">
+            <a:avLst/>
+          </a:prstGeom>
+          <a:solidFill>
+            <a:schemeClr val="accent1"/>
+          </a:solidFill>
+          <a:ln>
+            <a:noFill/>
+          </a:ln>
+        </p:spPr>
+        <p:style>
+          <a:lnRef idx="2">
+            <a:schemeClr val="accent1">
+              <a:shade val="50000"/>
+            </a:schemeClr>
+          </a:lnRef>
+          <a:fillRef idx="1">
+            <a:schemeClr val="accent1"/>
+          </a:fillRef>
+          <a:effectRef idx="0">
+            <a:schemeClr val="accent1"/>
+          </a:effectRef>
+          <a:fontRef idx="minor">
+            <a:schemeClr val="lt1"/>
+          </a:fontRef>
+        </p:style>
+        <p:txBody>
+          <a:bodyPr rtlCol="0" anchor="ctr"/>
+          <a:lstStyle/>
+          <a:p>
+            <a:pPr marL="0" marR="0" lvl="0" indent="0" algn="ctr" defTabSz="914400" rtl="0" eaLnBrk="0" fontAlgn="base" latinLnBrk="0" hangingPunct="0">
+              <a:lnSpc>
+                <a:spcPct val="100000"/>
+              </a:lnSpc>
+              <a:spcBef>
+                <a:spcPct val="0"/>
+              </a:spcBef>
+              <a:spcAft>
+                <a:spcPct val="0"/>
+              </a:spcAft>
+              <a:buClrTx/>
+              <a:buSzTx/>
+              <a:buFontTx/>
+              <a:buNone/>
+              <a:tabLst/>
+              <a:defRPr/>
+            </a:pPr>
+            <a:endParaRPr kumimoji="0" lang="en-GB" sz="1800" b="0" i="0" u="none" strike="noStrike" kern="1200" cap="none" spc="0" normalizeH="0" baseline="0" noProof="0">
+              <a:ln>
+                <a:noFill/>
+              </a:ln>
+              <a:solidFill>
+                <a:srgbClr val="FFFFFF"/>
+              </a:solidFill>
+              <a:effectLst/>
+              <a:uLnTx/>
+              <a:uFillTx/>
+              <a:latin typeface="Calibri"/>
+              <a:ea typeface="+mn-ea"/>
+              <a:cs typeface="+mn-cs"/>
+            </a:endParaRPr>
+          </a:p>
+        </p:txBody>
+      </p:sp>
+      <p:sp>
+        <p:nvSpPr>
+          <p:cNvPr id="47" name="Arrow: Right 46">
+            <a:extLst>
+              <a:ext uri="{FF2B5EF4-FFF2-40B4-BE49-F238E27FC236}">
+                <a16:creationId xmlns:a16="http://schemas.microsoft.com/office/drawing/2014/main" id="{B0DA7E1C-8C5B-ABCB-BF99-C1ABD775EFFE}"/>
+              </a:ext>
+            </a:extLst>
+          </p:cNvPr>
+          <p:cNvSpPr/>
+          <p:nvPr/>
+        </p:nvSpPr>
+        <p:spPr>
+          <a:xfrm>
+            <a:off x="5495702" y="3777089"/>
+            <a:ext cx="508607" cy="204537"/>
+          </a:xfrm>
+          <a:prstGeom prst="rightArrow">
+            <a:avLst/>
+          </a:prstGeom>
+          <a:solidFill>
+            <a:schemeClr val="accent1"/>
+          </a:solidFill>
+          <a:ln>
+            <a:noFill/>
+          </a:ln>
+        </p:spPr>
+        <p:style>
+          <a:lnRef idx="2">
+            <a:schemeClr val="accent1">
+              <a:shade val="50000"/>
+            </a:schemeClr>
+          </a:lnRef>
+          <a:fillRef idx="1">
+            <a:schemeClr val="accent1"/>
+          </a:fillRef>
+          <a:effectRef idx="0">
+            <a:schemeClr val="accent1"/>
+          </a:effectRef>
+          <a:fontRef idx="minor">
+            <a:schemeClr val="lt1"/>
+          </a:fontRef>
+        </p:style>
+        <p:txBody>
+          <a:bodyPr rtlCol="0" anchor="ctr"/>
+          <a:lstStyle/>
+          <a:p>
+            <a:pPr marL="0" marR="0" lvl="0" indent="0" algn="ctr" defTabSz="914400" rtl="0" eaLnBrk="0" fontAlgn="base" latinLnBrk="0" hangingPunct="0">
+              <a:lnSpc>
+                <a:spcPct val="100000"/>
+              </a:lnSpc>
+              <a:spcBef>
+                <a:spcPct val="0"/>
+              </a:spcBef>
+              <a:spcAft>
+                <a:spcPct val="0"/>
+              </a:spcAft>
+              <a:buClrTx/>
+              <a:buSzTx/>
+              <a:buFontTx/>
+              <a:buNone/>
+              <a:tabLst/>
+              <a:defRPr/>
+            </a:pPr>
+            <a:endParaRPr kumimoji="0" lang="en-GB" sz="1800" b="0" i="0" u="none" strike="noStrike" kern="1200" cap="none" spc="0" normalizeH="0" baseline="0" noProof="0">
+              <a:ln>
+                <a:noFill/>
+              </a:ln>
+              <a:solidFill>
+                <a:srgbClr val="FFFFFF"/>
+              </a:solidFill>
+              <a:effectLst/>
+              <a:uLnTx/>
+              <a:uFillTx/>
+              <a:latin typeface="Calibri"/>
+              <a:ea typeface="+mn-ea"/>
+              <a:cs typeface="+mn-cs"/>
+            </a:endParaRPr>
+          </a:p>
+        </p:txBody>
+      </p:sp>
+      <p:sp>
+        <p:nvSpPr>
+          <p:cNvPr id="43" name="Rectangle 42">
+            <a:extLst>
+              <a:ext uri="{FF2B5EF4-FFF2-40B4-BE49-F238E27FC236}">
+                <a16:creationId xmlns:a16="http://schemas.microsoft.com/office/drawing/2014/main" id="{D5BD7878-59AF-C11D-7F30-AAA32AA06DD1}"/>
+              </a:ext>
+            </a:extLst>
+          </p:cNvPr>
+          <p:cNvSpPr/>
+          <p:nvPr/>
+        </p:nvSpPr>
+        <p:spPr>
+          <a:xfrm>
+            <a:off x="5998046" y="3589896"/>
+            <a:ext cx="1537948" cy="3106455"/>
+          </a:xfrm>
+          <a:prstGeom prst="rect">
+            <a:avLst/>
+          </a:prstGeom>
+          <a:solidFill>
+            <a:schemeClr val="accent5">
+              <a:lumMod val="40000"/>
+              <a:lumOff val="60000"/>
+              <a:alpha val="50196"/>
+            </a:schemeClr>
+          </a:solidFill>
+          <a:ln>
+            <a:noFill/>
+          </a:ln>
+        </p:spPr>
+        <p:style>
+          <a:lnRef idx="2">
+            <a:schemeClr val="accent1">
+              <a:shade val="50000"/>
+            </a:schemeClr>
+          </a:lnRef>
+          <a:fillRef idx="1">
+            <a:schemeClr val="accent1"/>
+          </a:fillRef>
+          <a:effectRef idx="0">
+            <a:schemeClr val="accent1"/>
+          </a:effectRef>
+          <a:fontRef idx="minor">
+            <a:schemeClr val="lt1"/>
+          </a:fontRef>
+        </p:style>
+        <p:txBody>
+          <a:bodyPr rtlCol="0" anchor="t"/>
+          <a:lstStyle/>
+          <a:p>
+            <a:pPr algn="ctr" eaLnBrk="0" fontAlgn="base" hangingPunct="0">
+              <a:spcBef>
+                <a:spcPct val="0"/>
+              </a:spcBef>
+              <a:spcAft>
+                <a:spcPct val="0"/>
+              </a:spcAft>
+              <a:defRPr/>
+            </a:pPr>
+            <a:r>
+              <a:rPr kumimoji="0" lang="en-US" sz="1600" b="1" i="0" u="none" strike="noStrike" kern="1200" cap="none" spc="0" normalizeH="0" baseline="0" noProof="0" dirty="0">
+                <a:ln>
+                  <a:noFill/>
+                </a:ln>
+                <a:solidFill>
+                  <a:srgbClr val="333E48"/>
+                </a:solidFill>
+                <a:effectLst/>
+                <a:uLnTx/>
+                <a:uFillTx/>
+                <a:latin typeface="Calibri"/>
+                <a:ea typeface="ＭＳ Ｐゴシック" panose="020B0600070205080204" pitchFamily="34" charset="-128"/>
+                <a:cs typeface="+mn-cs"/>
+              </a:rPr>
+              <a:t>RTE Directory</a:t>
+            </a:r>
+          </a:p>
+        </p:txBody>
+      </p:sp>
+      <p:sp>
+        <p:nvSpPr>
+          <p:cNvPr id="29" name="Rectangle 28">
+            <a:extLst>
+              <a:ext uri="{FF2B5EF4-FFF2-40B4-BE49-F238E27FC236}">
+                <a16:creationId xmlns:a16="http://schemas.microsoft.com/office/drawing/2014/main" id="{EC3CC268-843C-42DC-9FAB-259824F90297}"/>
+              </a:ext>
+            </a:extLst>
+          </p:cNvPr>
+          <p:cNvSpPr/>
+          <p:nvPr/>
+        </p:nvSpPr>
+        <p:spPr>
+          <a:xfrm>
+            <a:off x="5998046" y="313151"/>
+            <a:ext cx="1537948" cy="3106455"/>
+          </a:xfrm>
+          <a:prstGeom prst="rect">
+            <a:avLst/>
+          </a:prstGeom>
+          <a:solidFill>
+            <a:schemeClr val="accent5">
+              <a:lumMod val="40000"/>
+              <a:lumOff val="60000"/>
+              <a:alpha val="50196"/>
+            </a:schemeClr>
+          </a:solidFill>
+          <a:ln>
+            <a:noFill/>
+          </a:ln>
+        </p:spPr>
+        <p:style>
+          <a:lnRef idx="2">
+            <a:schemeClr val="accent1">
+              <a:shade val="50000"/>
+            </a:schemeClr>
+          </a:lnRef>
+          <a:fillRef idx="1">
+            <a:schemeClr val="accent1"/>
+          </a:fillRef>
+          <a:effectRef idx="0">
+            <a:schemeClr val="accent1"/>
+          </a:effectRef>
+          <a:fontRef idx="minor">
+            <a:schemeClr val="lt1"/>
+          </a:fontRef>
+        </p:style>
+        <p:txBody>
+          <a:bodyPr rtlCol="0" anchor="t"/>
+          <a:lstStyle/>
+          <a:p>
+            <a:pPr algn="ctr" eaLnBrk="0" fontAlgn="base" hangingPunct="0">
+              <a:spcBef>
+                <a:spcPct val="0"/>
+              </a:spcBef>
+              <a:spcAft>
+                <a:spcPct val="0"/>
+              </a:spcAft>
+              <a:defRPr/>
+            </a:pPr>
+            <a:r>
+              <a:rPr kumimoji="0" lang="en-US" sz="1600" b="1" i="0" u="none" strike="noStrike" kern="1200" cap="none" spc="0" normalizeH="0" baseline="0" noProof="0" dirty="0">
+                <a:ln>
+                  <a:noFill/>
+                </a:ln>
+                <a:solidFill>
+                  <a:srgbClr val="333E48"/>
+                </a:solidFill>
+                <a:effectLst/>
+                <a:uLnTx/>
+                <a:uFillTx/>
+                <a:latin typeface="Calibri"/>
+                <a:ea typeface="ＭＳ Ｐゴシック" panose="020B0600070205080204" pitchFamily="34" charset="-128"/>
+                <a:cs typeface="+mn-cs"/>
+              </a:rPr>
+              <a:t>Project Area</a:t>
+            </a:r>
+          </a:p>
+        </p:txBody>
+      </p:sp>
+      <p:sp>
+        <p:nvSpPr>
+          <p:cNvPr id="26" name="Arrow: Right 25">
+            <a:extLst>
+              <a:ext uri="{FF2B5EF4-FFF2-40B4-BE49-F238E27FC236}">
+                <a16:creationId xmlns:a16="http://schemas.microsoft.com/office/drawing/2014/main" id="{553DF65A-F969-41EF-89B5-09CAFF0CC328}"/>
+              </a:ext>
+            </a:extLst>
+          </p:cNvPr>
+          <p:cNvSpPr/>
+          <p:nvPr/>
+        </p:nvSpPr>
+        <p:spPr>
+          <a:xfrm>
+            <a:off x="3900982" y="5163604"/>
+            <a:ext cx="266656" cy="204537"/>
+          </a:xfrm>
+          <a:prstGeom prst="rightArrow">
+            <a:avLst/>
+          </a:prstGeom>
+          <a:solidFill>
+            <a:schemeClr val="accent1"/>
+          </a:solidFill>
+          <a:ln>
+            <a:noFill/>
+          </a:ln>
+        </p:spPr>
+        <p:style>
+          <a:lnRef idx="2">
+            <a:schemeClr val="accent1">
+              <a:shade val="50000"/>
+            </a:schemeClr>
+          </a:lnRef>
+          <a:fillRef idx="1">
+            <a:schemeClr val="accent1"/>
+          </a:fillRef>
+          <a:effectRef idx="0">
+            <a:schemeClr val="accent1"/>
+          </a:effectRef>
+          <a:fontRef idx="minor">
+            <a:schemeClr val="lt1"/>
+          </a:fontRef>
+        </p:style>
+        <p:txBody>
+          <a:bodyPr rtlCol="0" anchor="ctr"/>
+          <a:lstStyle/>
+          <a:p>
+            <a:pPr marL="0" marR="0" lvl="0" indent="0" algn="ctr" defTabSz="914400" rtl="0" eaLnBrk="0" fontAlgn="base" latinLnBrk="0" hangingPunct="0">
+              <a:lnSpc>
+                <a:spcPct val="100000"/>
+              </a:lnSpc>
+              <a:spcBef>
+                <a:spcPct val="0"/>
+              </a:spcBef>
+              <a:spcAft>
+                <a:spcPct val="0"/>
+              </a:spcAft>
+              <a:buClrTx/>
+              <a:buSzTx/>
+              <a:buFontTx/>
+              <a:buNone/>
+              <a:tabLst/>
+              <a:defRPr/>
+            </a:pPr>
+            <a:endParaRPr kumimoji="0" lang="en-GB" sz="1800" b="0" i="0" u="none" strike="noStrike" kern="1200" cap="none" spc="0" normalizeH="0" baseline="0" noProof="0" dirty="0">
+              <a:ln>
+                <a:noFill/>
+              </a:ln>
+              <a:solidFill>
+                <a:srgbClr val="FFFFFF"/>
+              </a:solidFill>
+              <a:effectLst/>
+              <a:uLnTx/>
+              <a:uFillTx/>
+              <a:latin typeface="Calibri"/>
+              <a:ea typeface="+mn-ea"/>
+              <a:cs typeface="+mn-cs"/>
+            </a:endParaRPr>
+          </a:p>
+        </p:txBody>
+      </p:sp>
+      <p:sp>
+        <p:nvSpPr>
+          <p:cNvPr id="22" name="Rectangle 21">
+            <a:extLst>
+              <a:ext uri="{FF2B5EF4-FFF2-40B4-BE49-F238E27FC236}">
+                <a16:creationId xmlns:a16="http://schemas.microsoft.com/office/drawing/2014/main" id="{5487FEAB-7D2D-4E65-8BF8-9C55DAECCD8A}"/>
+              </a:ext>
+            </a:extLst>
+          </p:cNvPr>
+          <p:cNvSpPr/>
+          <p:nvPr/>
+        </p:nvSpPr>
+        <p:spPr>
+          <a:xfrm>
+            <a:off x="2114292" y="1448595"/>
+            <a:ext cx="1786690" cy="4163065"/>
+          </a:xfrm>
+          <a:prstGeom prst="rect">
+            <a:avLst/>
+          </a:prstGeom>
+          <a:solidFill>
+            <a:schemeClr val="accent3">
+              <a:lumMod val="60000"/>
+              <a:lumOff val="40000"/>
+              <a:alpha val="50196"/>
+            </a:schemeClr>
+          </a:solidFill>
+          <a:ln>
+            <a:noFill/>
+          </a:ln>
+        </p:spPr>
+        <p:style>
+          <a:lnRef idx="2">
+            <a:schemeClr val="accent1">
+              <a:shade val="50000"/>
+            </a:schemeClr>
+          </a:lnRef>
+          <a:fillRef idx="1">
+            <a:schemeClr val="accent1"/>
+          </a:fillRef>
+          <a:effectRef idx="0">
+            <a:schemeClr val="accent1"/>
+          </a:effectRef>
+          <a:fontRef idx="minor">
+            <a:schemeClr val="lt1"/>
+          </a:fontRef>
+        </p:style>
+        <p:txBody>
+          <a:bodyPr rtlCol="0" anchor="t"/>
+          <a:lstStyle/>
+          <a:p>
+            <a:pPr algn="ctr" eaLnBrk="0" fontAlgn="base" hangingPunct="0">
+              <a:spcBef>
+                <a:spcPct val="0"/>
+              </a:spcBef>
+              <a:spcAft>
+                <a:spcPct val="0"/>
+              </a:spcAft>
+              <a:defRPr/>
+            </a:pPr>
+            <a:r>
+              <a:rPr kumimoji="0" lang="en-US" sz="1600" b="1" i="0" u="none" strike="noStrike" kern="1200" cap="none" spc="0" normalizeH="0" baseline="0" noProof="0" dirty="0">
+                <a:ln>
+                  <a:noFill/>
+                </a:ln>
+                <a:solidFill>
+                  <a:srgbClr val="333E48"/>
+                </a:solidFill>
+                <a:effectLst/>
+                <a:uLnTx/>
+                <a:uFillTx/>
+                <a:latin typeface="Calibri"/>
+                <a:ea typeface="ＭＳ Ｐゴシック" panose="020B0600070205080204" pitchFamily="34" charset="-128"/>
+                <a:cs typeface="+mn-cs"/>
+              </a:rPr>
+              <a:t>Input Files</a:t>
+            </a:r>
+          </a:p>
+        </p:txBody>
+      </p:sp>
+      <p:sp>
+        <p:nvSpPr>
+          <p:cNvPr id="21" name="Rectangle 20">
+            <a:extLst>
+              <a:ext uri="{FF2B5EF4-FFF2-40B4-BE49-F238E27FC236}">
+                <a16:creationId xmlns:a16="http://schemas.microsoft.com/office/drawing/2014/main" id="{0F8F6D10-7E91-4D68-8F46-4EF0F023AF1B}"/>
+              </a:ext>
+            </a:extLst>
+          </p:cNvPr>
+          <p:cNvSpPr/>
+          <p:nvPr/>
+        </p:nvSpPr>
+        <p:spPr>
+          <a:xfrm>
+            <a:off x="4162933" y="4448658"/>
+            <a:ext cx="1551974" cy="2247694"/>
+          </a:xfrm>
+          <a:prstGeom prst="rect">
+            <a:avLst/>
+          </a:prstGeom>
+          <a:solidFill>
+            <a:schemeClr val="accent1">
+              <a:lumMod val="20000"/>
+              <a:lumOff val="80000"/>
+            </a:schemeClr>
+          </a:solidFill>
+          <a:ln>
+            <a:noFill/>
+          </a:ln>
+        </p:spPr>
+        <p:style>
+          <a:lnRef idx="2">
+            <a:schemeClr val="accent1">
+              <a:shade val="50000"/>
+            </a:schemeClr>
+          </a:lnRef>
+          <a:fillRef idx="1">
+            <a:schemeClr val="accent1"/>
+          </a:fillRef>
+          <a:effectRef idx="0">
+            <a:schemeClr val="accent1"/>
+          </a:effectRef>
+          <a:fontRef idx="minor">
+            <a:schemeClr val="lt1"/>
+          </a:fontRef>
+        </p:style>
+        <p:txBody>
+          <a:bodyPr rtlCol="0" anchor="t"/>
+          <a:lstStyle/>
+          <a:p>
+            <a:pPr algn="ctr" eaLnBrk="0" fontAlgn="base" hangingPunct="0">
+              <a:spcBef>
+                <a:spcPct val="0"/>
+              </a:spcBef>
+              <a:spcAft>
+                <a:spcPct val="0"/>
+              </a:spcAft>
+              <a:defRPr/>
+            </a:pPr>
+            <a:r>
+              <a:rPr kumimoji="0" lang="en-US" sz="1600" b="1" i="0" u="none" strike="noStrike" kern="1200" cap="none" spc="0" normalizeH="0" baseline="0" noProof="0" dirty="0">
+                <a:ln>
+                  <a:noFill/>
+                </a:ln>
+                <a:solidFill>
+                  <a:srgbClr val="333E48"/>
+                </a:solidFill>
+                <a:effectLst/>
+                <a:uLnTx/>
+                <a:uFillTx/>
+                <a:latin typeface="Calibri"/>
+                <a:ea typeface="ＭＳ Ｐゴシック" panose="020B0600070205080204" pitchFamily="34" charset="-128"/>
+                <a:cs typeface="+mn-cs"/>
+              </a:rPr>
+              <a:t>Software Packs</a:t>
+            </a:r>
+          </a:p>
+        </p:txBody>
+      </p:sp>
+      <p:sp>
+        <p:nvSpPr>
+          <p:cNvPr id="6" name="Flowchart: Document 5">
+            <a:extLst>
+              <a:ext uri="{FF2B5EF4-FFF2-40B4-BE49-F238E27FC236}">
+                <a16:creationId xmlns:a16="http://schemas.microsoft.com/office/drawing/2014/main" id="{05CB531E-7400-4A1A-9853-81AF2D7E5608}"/>
+              </a:ext>
+            </a:extLst>
+          </p:cNvPr>
+          <p:cNvSpPr/>
+          <p:nvPr/>
+        </p:nvSpPr>
+        <p:spPr>
+          <a:xfrm>
+            <a:off x="2320920" y="1989028"/>
+            <a:ext cx="1333416" cy="884321"/>
+          </a:xfrm>
+          <a:prstGeom prst="flowChartDocument">
+            <a:avLst/>
+          </a:prstGeom>
+          <a:solidFill>
+            <a:schemeClr val="bg1"/>
+          </a:solidFill>
+          <a:ln w="19050">
+            <a:solidFill>
+              <a:schemeClr val="tx1"/>
+            </a:solidFill>
+          </a:ln>
+        </p:spPr>
+        <p:style>
+          <a:lnRef idx="2">
+            <a:schemeClr val="accent1">
+              <a:shade val="50000"/>
+            </a:schemeClr>
+          </a:lnRef>
+          <a:fillRef idx="1">
+            <a:schemeClr val="accent1"/>
+          </a:fillRef>
+          <a:effectRef idx="0">
+            <a:schemeClr val="accent1"/>
+          </a:effectRef>
+          <a:fontRef idx="minor">
+            <a:schemeClr val="lt1"/>
+          </a:fontRef>
+        </p:style>
+        <p:txBody>
+          <a:bodyPr lIns="0" rIns="0" rtlCol="0" anchor="ctr"/>
+          <a:lstStyle/>
+          <a:p>
+            <a:pPr marL="0" marR="0" lvl="0" indent="0" algn="ctr" defTabSz="914400" rtl="0" eaLnBrk="0" fontAlgn="base" latinLnBrk="0" hangingPunct="0">
+              <a:lnSpc>
+                <a:spcPct val="100000"/>
+              </a:lnSpc>
+              <a:spcBef>
+                <a:spcPct val="0"/>
+              </a:spcBef>
+              <a:spcAft>
+                <a:spcPct val="0"/>
+              </a:spcAft>
+              <a:buClrTx/>
+              <a:buSzTx/>
+              <a:buFontTx/>
+              <a:buNone/>
+              <a:tabLst/>
+              <a:defRPr/>
+            </a:pPr>
+            <a:r>
+              <a:rPr kumimoji="0" lang="en-US" sz="1200" b="0" i="0" u="none" strike="noStrike" kern="1200" cap="none" spc="0" normalizeH="0" baseline="0" noProof="0" dirty="0">
+                <a:ln>
+                  <a:noFill/>
+                </a:ln>
+                <a:solidFill>
+                  <a:schemeClr val="bg2">
+                    <a:lumMod val="25000"/>
+                  </a:schemeClr>
+                </a:solidFill>
+                <a:effectLst/>
+                <a:uLnTx/>
+                <a:uFillTx/>
+                <a:latin typeface="Calibri"/>
+                <a:ea typeface="+mn-ea"/>
+                <a:cs typeface="+mn-cs"/>
+              </a:rPr>
+              <a:t>*.</a:t>
+            </a:r>
+            <a:r>
+              <a:rPr kumimoji="0" lang="en-US" sz="1200" b="0" i="0" u="none" strike="noStrike" kern="1200" cap="none" spc="0" normalizeH="0" baseline="0" noProof="0" dirty="0" err="1">
+                <a:ln>
+                  <a:noFill/>
+                </a:ln>
+                <a:solidFill>
+                  <a:schemeClr val="bg2">
+                    <a:lumMod val="25000"/>
+                  </a:schemeClr>
+                </a:solidFill>
+                <a:effectLst/>
+                <a:uLnTx/>
+                <a:uFillTx/>
+                <a:latin typeface="Calibri"/>
+                <a:ea typeface="+mn-ea"/>
+                <a:cs typeface="+mn-cs"/>
+              </a:rPr>
+              <a:t>csolution.yml</a:t>
+            </a:r>
+            <a:br>
+              <a:rPr kumimoji="0" lang="en-US" sz="1200" b="0" i="0" u="none" strike="noStrike" kern="1200" cap="none" spc="0" normalizeH="0" baseline="0" noProof="0" dirty="0">
+                <a:ln>
+                  <a:noFill/>
+                </a:ln>
+                <a:solidFill>
+                  <a:schemeClr val="bg2">
+                    <a:lumMod val="25000"/>
+                  </a:schemeClr>
+                </a:solidFill>
+                <a:effectLst/>
+                <a:uLnTx/>
+                <a:uFillTx/>
+                <a:latin typeface="Calibri"/>
+                <a:ea typeface="+mn-ea"/>
+                <a:cs typeface="+mn-cs"/>
+              </a:rPr>
+            </a:br>
+            <a:r>
+              <a:rPr kumimoji="0" lang="en-US" sz="1000" b="0" i="0" u="none" strike="noStrike" kern="1200" cap="none" spc="0" normalizeH="0" baseline="0" noProof="0" dirty="0">
+                <a:ln>
+                  <a:noFill/>
+                </a:ln>
+                <a:solidFill>
+                  <a:schemeClr val="bg2">
+                    <a:lumMod val="25000"/>
+                  </a:schemeClr>
+                </a:solidFill>
+                <a:effectLst/>
+                <a:uLnTx/>
+                <a:uFillTx/>
+                <a:latin typeface="Calibri"/>
+                <a:ea typeface="+mn-ea"/>
+                <a:cs typeface="+mn-cs"/>
+              </a:rPr>
+              <a:t>Target (Device, Board) Build (Debug, Release) </a:t>
+            </a:r>
+            <a:endParaRPr kumimoji="0" lang="en-GB" sz="1000" b="0" i="0" u="none" strike="noStrike" kern="1200" cap="none" spc="0" normalizeH="0" baseline="0" noProof="0" dirty="0">
+              <a:ln>
+                <a:noFill/>
+              </a:ln>
+              <a:solidFill>
+                <a:schemeClr val="bg2">
+                  <a:lumMod val="25000"/>
+                </a:schemeClr>
+              </a:solidFill>
+              <a:effectLst/>
+              <a:uLnTx/>
+              <a:uFillTx/>
+              <a:latin typeface="Calibri"/>
+              <a:ea typeface="+mn-ea"/>
+              <a:cs typeface="+mn-cs"/>
+            </a:endParaRPr>
+          </a:p>
+        </p:txBody>
+      </p:sp>
+      <p:sp>
+        <p:nvSpPr>
+          <p:cNvPr id="7" name="Flowchart: Multidocument 6">
+            <a:extLst>
+              <a:ext uri="{FF2B5EF4-FFF2-40B4-BE49-F238E27FC236}">
+                <a16:creationId xmlns:a16="http://schemas.microsoft.com/office/drawing/2014/main" id="{0FCC1B91-99A1-4E45-AE23-2D8F8B8DFEBE}"/>
+              </a:ext>
+            </a:extLst>
+          </p:cNvPr>
+          <p:cNvSpPr/>
+          <p:nvPr/>
+        </p:nvSpPr>
+        <p:spPr>
+          <a:xfrm>
+            <a:off x="2278322" y="3105955"/>
+            <a:ext cx="1449805" cy="1010653"/>
+          </a:xfrm>
+          <a:prstGeom prst="flowChartMultidocument">
+            <a:avLst/>
+          </a:prstGeom>
+          <a:solidFill>
+            <a:schemeClr val="bg1"/>
+          </a:solidFill>
+          <a:ln w="19050">
+            <a:solidFill>
+              <a:schemeClr val="accent1">
+                <a:lumMod val="75000"/>
+              </a:schemeClr>
+            </a:solidFill>
+          </a:ln>
+        </p:spPr>
+        <p:style>
+          <a:lnRef idx="2">
+            <a:schemeClr val="accent1">
+              <a:shade val="50000"/>
+            </a:schemeClr>
+          </a:lnRef>
+          <a:fillRef idx="1">
+            <a:schemeClr val="accent1"/>
+          </a:fillRef>
+          <a:effectRef idx="0">
+            <a:schemeClr val="accent1"/>
+          </a:effectRef>
+          <a:fontRef idx="minor">
+            <a:schemeClr val="lt1"/>
+          </a:fontRef>
+        </p:style>
+        <p:txBody>
+          <a:bodyPr rtlCol="0" anchor="ctr"/>
+          <a:lstStyle/>
+          <a:p>
+            <a:pPr marL="0" marR="0" lvl="0" indent="0" algn="ctr" defTabSz="914400" rtl="0" eaLnBrk="0" fontAlgn="base" latinLnBrk="0" hangingPunct="0">
+              <a:lnSpc>
+                <a:spcPct val="100000"/>
+              </a:lnSpc>
+              <a:spcBef>
+                <a:spcPct val="0"/>
+              </a:spcBef>
+              <a:spcAft>
+                <a:spcPct val="0"/>
+              </a:spcAft>
+              <a:buClrTx/>
+              <a:buSzTx/>
+              <a:buFontTx/>
+              <a:buNone/>
+              <a:tabLst/>
+              <a:defRPr/>
+            </a:pPr>
+            <a:r>
+              <a:rPr kumimoji="0" lang="en-US" sz="1200" b="0" i="0" u="none" strike="noStrike" kern="1200" cap="none" spc="0" normalizeH="0" baseline="0" noProof="0" dirty="0">
+                <a:ln>
+                  <a:noFill/>
+                </a:ln>
+                <a:solidFill>
+                  <a:schemeClr val="bg2">
+                    <a:lumMod val="25000"/>
+                  </a:schemeClr>
+                </a:solidFill>
+                <a:effectLst/>
+                <a:uLnTx/>
+                <a:uFillTx/>
+                <a:latin typeface="Calibri"/>
+                <a:ea typeface="+mn-ea"/>
+                <a:cs typeface="+mn-cs"/>
+              </a:rPr>
+              <a:t>*.</a:t>
+            </a:r>
+            <a:r>
+              <a:rPr kumimoji="0" lang="en-US" sz="1200" b="0" i="0" u="none" strike="noStrike" kern="1200" cap="none" spc="0" normalizeH="0" baseline="0" noProof="0" dirty="0" err="1">
+                <a:ln>
+                  <a:noFill/>
+                </a:ln>
+                <a:solidFill>
+                  <a:schemeClr val="bg2">
+                    <a:lumMod val="25000"/>
+                  </a:schemeClr>
+                </a:solidFill>
+                <a:effectLst/>
+                <a:uLnTx/>
+                <a:uFillTx/>
+                <a:latin typeface="Calibri"/>
+                <a:ea typeface="+mn-ea"/>
+                <a:cs typeface="+mn-cs"/>
+              </a:rPr>
+              <a:t>cproject.yml</a:t>
+            </a:r>
+            <a:br>
+              <a:rPr kumimoji="0" lang="en-US" sz="1200" b="0" i="0" u="none" strike="noStrike" kern="1200" cap="none" spc="0" normalizeH="0" baseline="0" noProof="0" dirty="0">
+                <a:ln>
+                  <a:noFill/>
+                </a:ln>
+                <a:solidFill>
+                  <a:schemeClr val="bg2">
+                    <a:lumMod val="25000"/>
+                  </a:schemeClr>
+                </a:solidFill>
+                <a:effectLst/>
+                <a:uLnTx/>
+                <a:uFillTx/>
+                <a:latin typeface="Calibri"/>
+                <a:ea typeface="+mn-ea"/>
+                <a:cs typeface="+mn-cs"/>
+              </a:rPr>
+            </a:br>
+            <a:r>
+              <a:rPr kumimoji="0" lang="en-US" sz="1000" b="0" i="0" u="none" strike="noStrike" kern="1200" cap="none" spc="0" normalizeH="0" baseline="0" noProof="0" dirty="0">
+                <a:ln>
+                  <a:noFill/>
+                </a:ln>
+                <a:solidFill>
+                  <a:schemeClr val="bg2">
+                    <a:lumMod val="25000"/>
+                  </a:schemeClr>
+                </a:solidFill>
+                <a:effectLst/>
+                <a:uLnTx/>
+                <a:uFillTx/>
+                <a:latin typeface="Calibri"/>
+                <a:ea typeface="+mn-ea"/>
+                <a:cs typeface="+mn-cs"/>
+              </a:rPr>
+              <a:t>Manages </a:t>
+            </a:r>
+            <a:br>
+              <a:rPr kumimoji="0" lang="en-US" sz="1000" b="0" i="0" u="none" strike="noStrike" kern="1200" cap="none" spc="0" normalizeH="0" baseline="0" noProof="0" dirty="0">
+                <a:ln>
+                  <a:noFill/>
+                </a:ln>
+                <a:solidFill>
+                  <a:schemeClr val="bg2">
+                    <a:lumMod val="25000"/>
+                  </a:schemeClr>
+                </a:solidFill>
+                <a:effectLst/>
+                <a:uLnTx/>
+                <a:uFillTx/>
+                <a:latin typeface="Calibri"/>
+                <a:ea typeface="+mn-ea"/>
+                <a:cs typeface="+mn-cs"/>
+              </a:rPr>
+            </a:br>
+            <a:r>
+              <a:rPr kumimoji="0" lang="en-US" sz="1000" b="0" i="0" u="none" strike="noStrike" kern="1200" cap="none" spc="0" normalizeH="0" baseline="0" noProof="0" dirty="0">
+                <a:ln>
+                  <a:noFill/>
+                </a:ln>
+                <a:solidFill>
+                  <a:schemeClr val="bg2">
+                    <a:lumMod val="25000"/>
+                  </a:schemeClr>
+                </a:solidFill>
+                <a:effectLst/>
+                <a:uLnTx/>
+                <a:uFillTx/>
+                <a:latin typeface="Calibri"/>
+                <a:ea typeface="+mn-ea"/>
+                <a:cs typeface="+mn-cs"/>
+              </a:rPr>
+              <a:t>independent</a:t>
+            </a:r>
+            <a:br>
+              <a:rPr kumimoji="0" lang="en-US" sz="1000" b="0" i="0" u="none" strike="noStrike" kern="1200" cap="none" spc="0" normalizeH="0" baseline="0" noProof="0" dirty="0">
+                <a:ln>
+                  <a:noFill/>
+                </a:ln>
+                <a:solidFill>
+                  <a:schemeClr val="bg2">
+                    <a:lumMod val="25000"/>
+                  </a:schemeClr>
+                </a:solidFill>
+                <a:effectLst/>
+                <a:uLnTx/>
+                <a:uFillTx/>
+                <a:latin typeface="Calibri"/>
+                <a:ea typeface="+mn-ea"/>
+                <a:cs typeface="+mn-cs"/>
+              </a:rPr>
+            </a:br>
+            <a:r>
+              <a:rPr kumimoji="0" lang="en-US" sz="1000" b="0" i="0" u="none" strike="noStrike" kern="1200" cap="none" spc="0" normalizeH="0" baseline="0" noProof="0" dirty="0">
+                <a:ln>
+                  <a:noFill/>
+                </a:ln>
+                <a:solidFill>
+                  <a:schemeClr val="bg2">
+                    <a:lumMod val="25000"/>
+                  </a:schemeClr>
+                </a:solidFill>
+                <a:effectLst/>
+                <a:uLnTx/>
+                <a:uFillTx/>
+                <a:latin typeface="Calibri"/>
+                <a:ea typeface="+mn-ea"/>
+                <a:cs typeface="+mn-cs"/>
+              </a:rPr>
+              <a:t>projects</a:t>
+            </a:r>
+            <a:endParaRPr kumimoji="0" lang="en-GB" sz="1000" b="0" i="0" u="none" strike="noStrike" kern="1200" cap="none" spc="0" normalizeH="0" baseline="0" noProof="0" dirty="0">
+              <a:ln>
+                <a:noFill/>
+              </a:ln>
+              <a:solidFill>
+                <a:schemeClr val="bg2">
+                  <a:lumMod val="25000"/>
+                </a:schemeClr>
+              </a:solidFill>
+              <a:effectLst/>
+              <a:uLnTx/>
+              <a:uFillTx/>
+              <a:latin typeface="Calibri"/>
+              <a:ea typeface="+mn-ea"/>
+              <a:cs typeface="+mn-cs"/>
+            </a:endParaRPr>
+          </a:p>
+        </p:txBody>
+      </p:sp>
+      <p:cxnSp>
+        <p:nvCxnSpPr>
+          <p:cNvPr id="14" name="Straight Arrow Connector 13">
+            <a:extLst>
+              <a:ext uri="{FF2B5EF4-FFF2-40B4-BE49-F238E27FC236}">
+                <a16:creationId xmlns:a16="http://schemas.microsoft.com/office/drawing/2014/main" id="{0CA20441-F3C2-440A-892E-1359E8990DC5}"/>
+              </a:ext>
+            </a:extLst>
+          </p:cNvPr>
+          <p:cNvCxnSpPr>
+            <a:cxnSpLocks/>
+          </p:cNvCxnSpPr>
+          <p:nvPr/>
+        </p:nvCxnSpPr>
+        <p:spPr>
+          <a:xfrm>
+            <a:off x="2968620" y="2829234"/>
+            <a:ext cx="0" cy="276726"/>
+          </a:xfrm>
+          <a:prstGeom prst="straightConnector1">
+            <a:avLst/>
+          </a:prstGeom>
+          <a:ln w="38100">
+            <a:tailEnd type="triangle"/>
+          </a:ln>
+        </p:spPr>
+        <p:style>
+          <a:lnRef idx="1">
+            <a:schemeClr val="accent1"/>
+          </a:lnRef>
+          <a:fillRef idx="0">
+            <a:schemeClr val="accent1"/>
+          </a:fillRef>
+          <a:effectRef idx="0">
+            <a:schemeClr val="accent1"/>
+          </a:effectRef>
+          <a:fontRef idx="minor">
+            <a:schemeClr val="tx1"/>
+          </a:fontRef>
+        </p:style>
+      </p:cxnSp>
+      <p:cxnSp>
+        <p:nvCxnSpPr>
+          <p:cNvPr id="17" name="Straight Arrow Connector 16">
+            <a:extLst>
+              <a:ext uri="{FF2B5EF4-FFF2-40B4-BE49-F238E27FC236}">
+                <a16:creationId xmlns:a16="http://schemas.microsoft.com/office/drawing/2014/main" id="{8700C784-4ABC-4B94-A393-C72FD280887C}"/>
+              </a:ext>
+            </a:extLst>
+          </p:cNvPr>
+          <p:cNvCxnSpPr>
+            <a:cxnSpLocks/>
+          </p:cNvCxnSpPr>
+          <p:nvPr/>
+        </p:nvCxnSpPr>
+        <p:spPr>
+          <a:xfrm>
+            <a:off x="2988673" y="4046429"/>
+            <a:ext cx="0" cy="276726"/>
+          </a:xfrm>
+          <a:prstGeom prst="straightConnector1">
+            <a:avLst/>
+          </a:prstGeom>
+          <a:ln w="38100">
+            <a:tailEnd type="triangle"/>
+          </a:ln>
+        </p:spPr>
+        <p:style>
+          <a:lnRef idx="1">
+            <a:schemeClr val="accent1"/>
+          </a:lnRef>
+          <a:fillRef idx="0">
+            <a:schemeClr val="accent1"/>
+          </a:fillRef>
+          <a:effectRef idx="0">
+            <a:schemeClr val="accent1"/>
+          </a:effectRef>
+          <a:fontRef idx="minor">
+            <a:schemeClr val="tx1"/>
+          </a:fontRef>
+        </p:style>
+      </p:cxnSp>
+      <p:sp>
+        <p:nvSpPr>
+          <p:cNvPr id="18" name="Flowchart: Multidocument 17">
+            <a:extLst>
+              <a:ext uri="{FF2B5EF4-FFF2-40B4-BE49-F238E27FC236}">
+                <a16:creationId xmlns:a16="http://schemas.microsoft.com/office/drawing/2014/main" id="{F193B99D-00C8-43D5-A8CC-0E46D2AFFC10}"/>
+              </a:ext>
+            </a:extLst>
+          </p:cNvPr>
+          <p:cNvSpPr/>
+          <p:nvPr/>
+        </p:nvSpPr>
+        <p:spPr>
+          <a:xfrm>
+            <a:off x="2328453" y="4317134"/>
+            <a:ext cx="1449805" cy="1010653"/>
+          </a:xfrm>
+          <a:prstGeom prst="flowChartMultidocument">
+            <a:avLst/>
+          </a:prstGeom>
+          <a:solidFill>
+            <a:schemeClr val="bg1"/>
+          </a:solidFill>
+          <a:ln w="19050">
+            <a:solidFill>
+              <a:schemeClr val="accent1">
+                <a:lumMod val="75000"/>
+              </a:schemeClr>
+            </a:solidFill>
+          </a:ln>
+        </p:spPr>
+        <p:style>
+          <a:lnRef idx="2">
+            <a:schemeClr val="accent1">
+              <a:shade val="50000"/>
+            </a:schemeClr>
+          </a:lnRef>
+          <a:fillRef idx="1">
+            <a:schemeClr val="accent1"/>
+          </a:fillRef>
+          <a:effectRef idx="0">
+            <a:schemeClr val="accent1"/>
+          </a:effectRef>
+          <a:fontRef idx="minor">
+            <a:schemeClr val="lt1"/>
+          </a:fontRef>
+        </p:style>
+        <p:txBody>
+          <a:bodyPr rtlCol="0" anchor="ctr"/>
+          <a:lstStyle/>
+          <a:p>
+            <a:pPr marL="0" marR="0" lvl="0" indent="0" algn="ctr" defTabSz="914400" rtl="0" eaLnBrk="0" fontAlgn="base" latinLnBrk="0" hangingPunct="0">
+              <a:lnSpc>
+                <a:spcPct val="100000"/>
+              </a:lnSpc>
+              <a:spcBef>
+                <a:spcPct val="0"/>
+              </a:spcBef>
+              <a:spcAft>
+                <a:spcPct val="0"/>
+              </a:spcAft>
+              <a:buClrTx/>
+              <a:buSzTx/>
+              <a:buFontTx/>
+              <a:buNone/>
+              <a:tabLst/>
+              <a:defRPr/>
+            </a:pPr>
+            <a:r>
+              <a:rPr kumimoji="0" lang="en-US" sz="1200" b="0" i="0" u="none" strike="noStrike" kern="1200" cap="none" spc="0" normalizeH="0" baseline="0" noProof="0" dirty="0">
+                <a:ln>
+                  <a:noFill/>
+                </a:ln>
+                <a:solidFill>
+                  <a:schemeClr val="bg2">
+                    <a:lumMod val="25000"/>
+                  </a:schemeClr>
+                </a:solidFill>
+                <a:effectLst/>
+                <a:uLnTx/>
+                <a:uFillTx/>
+                <a:latin typeface="Calibri"/>
+                <a:ea typeface="+mn-ea"/>
+                <a:cs typeface="+mn-cs"/>
+              </a:rPr>
+              <a:t>*.</a:t>
+            </a:r>
+            <a:r>
+              <a:rPr kumimoji="0" lang="en-US" sz="1200" b="0" i="0" u="none" strike="noStrike" kern="1200" cap="none" spc="0" normalizeH="0" baseline="0" noProof="0" dirty="0" err="1">
+                <a:ln>
+                  <a:noFill/>
+                </a:ln>
+                <a:solidFill>
+                  <a:schemeClr val="bg2">
+                    <a:lumMod val="25000"/>
+                  </a:schemeClr>
+                </a:solidFill>
+                <a:effectLst/>
+                <a:uLnTx/>
+                <a:uFillTx/>
+                <a:latin typeface="Calibri"/>
+                <a:ea typeface="+mn-ea"/>
+                <a:cs typeface="+mn-cs"/>
+              </a:rPr>
+              <a:t>clayer.yml</a:t>
+            </a:r>
+            <a:br>
+              <a:rPr kumimoji="0" lang="en-US" sz="1200" b="0" i="0" u="none" strike="noStrike" kern="1200" cap="none" spc="0" normalizeH="0" baseline="0" noProof="0" dirty="0">
+                <a:ln>
+                  <a:noFill/>
+                </a:ln>
+                <a:solidFill>
+                  <a:schemeClr val="bg2">
+                    <a:lumMod val="25000"/>
+                  </a:schemeClr>
+                </a:solidFill>
+                <a:effectLst/>
+                <a:uLnTx/>
+                <a:uFillTx/>
+                <a:latin typeface="Calibri"/>
+                <a:ea typeface="+mn-ea"/>
+                <a:cs typeface="+mn-cs"/>
+              </a:rPr>
+            </a:br>
+            <a:r>
+              <a:rPr kumimoji="0" lang="en-US" sz="1000" b="0" i="0" u="none" strike="noStrike" kern="1200" cap="none" spc="0" normalizeH="0" baseline="0" noProof="0" dirty="0">
+                <a:ln>
+                  <a:noFill/>
+                </a:ln>
+                <a:solidFill>
+                  <a:schemeClr val="bg2">
+                    <a:lumMod val="25000"/>
+                  </a:schemeClr>
+                </a:solidFill>
+                <a:effectLst/>
+                <a:uLnTx/>
+                <a:uFillTx/>
+                <a:latin typeface="Calibri"/>
+                <a:ea typeface="+mn-ea"/>
+                <a:cs typeface="+mn-cs"/>
+              </a:rPr>
+              <a:t>Defines re-usable project parts</a:t>
+            </a:r>
+            <a:endParaRPr kumimoji="0" lang="en-GB" sz="1000" b="0" i="0" u="none" strike="noStrike" kern="1200" cap="none" spc="0" normalizeH="0" baseline="0" noProof="0" dirty="0">
+              <a:ln>
+                <a:noFill/>
+              </a:ln>
+              <a:solidFill>
+                <a:schemeClr val="bg2">
+                  <a:lumMod val="25000"/>
+                </a:schemeClr>
+              </a:solidFill>
+              <a:effectLst/>
+              <a:uLnTx/>
+              <a:uFillTx/>
+              <a:latin typeface="Calibri"/>
+              <a:ea typeface="+mn-ea"/>
+              <a:cs typeface="+mn-cs"/>
+            </a:endParaRPr>
+          </a:p>
+        </p:txBody>
+      </p:sp>
+      <p:sp>
+        <p:nvSpPr>
+          <p:cNvPr id="23" name="Rectangle 22">
+            <a:extLst>
+              <a:ext uri="{FF2B5EF4-FFF2-40B4-BE49-F238E27FC236}">
+                <a16:creationId xmlns:a16="http://schemas.microsoft.com/office/drawing/2014/main" id="{8119DA75-D395-4806-9923-A60C1658B62A}"/>
+              </a:ext>
+            </a:extLst>
+          </p:cNvPr>
+          <p:cNvSpPr/>
+          <p:nvPr/>
+        </p:nvSpPr>
+        <p:spPr>
+          <a:xfrm>
+            <a:off x="4176959" y="3027944"/>
+            <a:ext cx="1540042" cy="1022685"/>
+          </a:xfrm>
+          <a:prstGeom prst="rect">
+            <a:avLst/>
+          </a:prstGeom>
+          <a:solidFill>
+            <a:srgbClr val="92D050"/>
+          </a:solidFill>
+          <a:ln>
+            <a:solidFill>
+              <a:schemeClr val="accent4">
+                <a:lumMod val="75000"/>
+              </a:schemeClr>
+            </a:solidFill>
+          </a:ln>
+        </p:spPr>
+        <p:style>
+          <a:lnRef idx="2">
+            <a:schemeClr val="accent1">
+              <a:shade val="50000"/>
+            </a:schemeClr>
+          </a:lnRef>
+          <a:fillRef idx="1">
+            <a:schemeClr val="accent1"/>
+          </a:fillRef>
+          <a:effectRef idx="0">
+            <a:schemeClr val="accent1"/>
+          </a:effectRef>
+          <a:fontRef idx="minor">
+            <a:schemeClr val="lt1"/>
+          </a:fontRef>
+        </p:style>
+        <p:txBody>
+          <a:bodyPr rtlCol="0" anchor="ctr"/>
+          <a:lstStyle/>
+          <a:p>
+            <a:pPr marL="0" marR="0" lvl="0" indent="0" algn="ctr" defTabSz="914400" rtl="0" eaLnBrk="0" fontAlgn="base" latinLnBrk="0" hangingPunct="0">
+              <a:lnSpc>
+                <a:spcPct val="100000"/>
+              </a:lnSpc>
+              <a:spcBef>
+                <a:spcPct val="0"/>
+              </a:spcBef>
+              <a:spcAft>
+                <a:spcPct val="0"/>
+              </a:spcAft>
+              <a:buClrTx/>
+              <a:buSzTx/>
+              <a:buFontTx/>
+              <a:buNone/>
+              <a:tabLst/>
+              <a:defRPr/>
+            </a:pPr>
+            <a:r>
+              <a:rPr lang="en-US" b="1" dirty="0">
+                <a:solidFill>
+                  <a:srgbClr val="FFFFFF"/>
+                </a:solidFill>
+                <a:latin typeface="Calibri"/>
+              </a:rPr>
+              <a:t>c</a:t>
+            </a:r>
+            <a:r>
+              <a:rPr kumimoji="0" lang="en-US" sz="1800" b="1" i="0" u="none" strike="noStrike" kern="1200" cap="none" spc="0" normalizeH="0" baseline="0" noProof="0" dirty="0">
+                <a:ln>
+                  <a:noFill/>
+                </a:ln>
+                <a:solidFill>
+                  <a:srgbClr val="FFFFFF"/>
+                </a:solidFill>
+                <a:effectLst/>
+                <a:uLnTx/>
+                <a:uFillTx/>
+                <a:latin typeface="Calibri"/>
+                <a:ea typeface="+mn-ea"/>
+                <a:cs typeface="+mn-cs"/>
+              </a:rPr>
+              <a:t>solution</a:t>
+            </a:r>
+            <a:br>
+              <a:rPr kumimoji="0" lang="en-US" sz="1800" b="1" i="0" u="none" strike="noStrike" kern="1200" cap="none" spc="0" normalizeH="0" baseline="0" noProof="0" dirty="0">
+                <a:ln>
+                  <a:noFill/>
+                </a:ln>
+                <a:solidFill>
+                  <a:srgbClr val="FFFFFF"/>
+                </a:solidFill>
+                <a:effectLst/>
+                <a:uLnTx/>
+                <a:uFillTx/>
+                <a:latin typeface="Calibri"/>
+                <a:ea typeface="+mn-ea"/>
+                <a:cs typeface="+mn-cs"/>
+              </a:rPr>
+            </a:br>
+            <a:r>
+              <a:rPr kumimoji="0" lang="en-US" sz="1800" b="0" i="0" u="none" strike="noStrike" kern="1200" cap="none" spc="0" normalizeH="0" baseline="0" noProof="0" dirty="0">
+                <a:ln>
+                  <a:noFill/>
+                </a:ln>
+                <a:solidFill>
+                  <a:srgbClr val="FFFFFF"/>
+                </a:solidFill>
+                <a:effectLst/>
+                <a:uLnTx/>
+                <a:uFillTx/>
+                <a:latin typeface="Calibri"/>
+                <a:ea typeface="+mn-ea"/>
+                <a:cs typeface="+mn-cs"/>
+              </a:rPr>
+              <a:t>tool</a:t>
+            </a:r>
+            <a:endParaRPr kumimoji="0" lang="en-GB" sz="1800" b="0" i="0" u="none" strike="noStrike" kern="1200" cap="none" spc="0" normalizeH="0" baseline="0" noProof="0" dirty="0">
+              <a:ln>
+                <a:noFill/>
+              </a:ln>
+              <a:solidFill>
+                <a:srgbClr val="FFFFFF"/>
+              </a:solidFill>
+              <a:effectLst/>
+              <a:uLnTx/>
+              <a:uFillTx/>
+              <a:latin typeface="Calibri"/>
+              <a:ea typeface="+mn-ea"/>
+              <a:cs typeface="+mn-cs"/>
+            </a:endParaRPr>
+          </a:p>
+        </p:txBody>
+      </p:sp>
+      <p:sp>
+        <p:nvSpPr>
+          <p:cNvPr id="24" name="Flowchart: Multidocument 23">
+            <a:extLst>
+              <a:ext uri="{FF2B5EF4-FFF2-40B4-BE49-F238E27FC236}">
+                <a16:creationId xmlns:a16="http://schemas.microsoft.com/office/drawing/2014/main" id="{AC417908-17B4-4FD1-8070-B598BF19F8CD}"/>
+              </a:ext>
+            </a:extLst>
+          </p:cNvPr>
+          <p:cNvSpPr/>
+          <p:nvPr/>
+        </p:nvSpPr>
+        <p:spPr>
+          <a:xfrm>
+            <a:off x="6156834" y="2409588"/>
+            <a:ext cx="1285400" cy="781691"/>
+          </a:xfrm>
+          <a:prstGeom prst="flowChartMultidocument">
+            <a:avLst/>
+          </a:prstGeom>
+          <a:solidFill>
+            <a:schemeClr val="bg1">
+              <a:lumMod val="95000"/>
+            </a:schemeClr>
+          </a:solidFill>
+          <a:ln w="19050">
+            <a:solidFill>
+              <a:schemeClr val="accent5">
+                <a:lumMod val="50000"/>
+              </a:schemeClr>
+            </a:solidFill>
+          </a:ln>
+        </p:spPr>
+        <p:style>
+          <a:lnRef idx="2">
+            <a:schemeClr val="accent1">
+              <a:shade val="50000"/>
+            </a:schemeClr>
+          </a:lnRef>
+          <a:fillRef idx="1">
+            <a:schemeClr val="accent1"/>
+          </a:fillRef>
+          <a:effectRef idx="0">
+            <a:schemeClr val="accent1"/>
+          </a:effectRef>
+          <a:fontRef idx="minor">
+            <a:schemeClr val="lt1"/>
+          </a:fontRef>
+        </p:style>
+        <p:txBody>
+          <a:bodyPr rtlCol="0" anchor="ctr"/>
+          <a:lstStyle/>
+          <a:p>
+            <a:pPr marL="0" marR="0" lvl="0" indent="0" algn="ctr" defTabSz="914400" rtl="0" eaLnBrk="0" fontAlgn="base" latinLnBrk="0" hangingPunct="0">
+              <a:lnSpc>
+                <a:spcPct val="100000"/>
+              </a:lnSpc>
+              <a:spcBef>
+                <a:spcPct val="0"/>
+              </a:spcBef>
+              <a:spcAft>
+                <a:spcPct val="0"/>
+              </a:spcAft>
+              <a:buClrTx/>
+              <a:buSzTx/>
+              <a:buFontTx/>
+              <a:buNone/>
+              <a:tabLst/>
+              <a:defRPr/>
+            </a:pPr>
+            <a:r>
+              <a:rPr kumimoji="0" lang="en-US" sz="1200" b="0" i="0" u="none" strike="noStrike" kern="1200" cap="none" spc="0" normalizeH="0" baseline="0" noProof="0" dirty="0">
+                <a:ln>
+                  <a:noFill/>
+                </a:ln>
+                <a:solidFill>
+                  <a:schemeClr val="bg2">
+                    <a:lumMod val="25000"/>
+                  </a:schemeClr>
+                </a:solidFill>
+                <a:effectLst/>
+                <a:uLnTx/>
+                <a:uFillTx/>
+                <a:latin typeface="Calibri"/>
+                <a:ea typeface="+mn-ea"/>
+                <a:cs typeface="+mn-cs"/>
+              </a:rPr>
+              <a:t>*.</a:t>
+            </a:r>
+            <a:r>
+              <a:rPr kumimoji="0" lang="en-US" sz="1200" b="0" i="0" u="none" strike="noStrike" kern="1200" cap="none" spc="0" normalizeH="0" baseline="0" noProof="0" dirty="0" err="1">
+                <a:ln>
+                  <a:noFill/>
+                </a:ln>
+                <a:solidFill>
+                  <a:schemeClr val="bg2">
+                    <a:lumMod val="25000"/>
+                  </a:schemeClr>
+                </a:solidFill>
+                <a:effectLst/>
+                <a:uLnTx/>
+                <a:uFillTx/>
+                <a:latin typeface="Calibri"/>
+                <a:ea typeface="+mn-ea"/>
+                <a:cs typeface="+mn-cs"/>
+              </a:rPr>
+              <a:t>cprj</a:t>
+            </a:r>
+            <a:br>
+              <a:rPr kumimoji="0" lang="en-US" sz="1200" b="0" i="0" u="none" strike="noStrike" kern="1200" cap="none" spc="0" normalizeH="0" baseline="0" noProof="0" dirty="0">
+                <a:ln>
+                  <a:noFill/>
+                </a:ln>
+                <a:solidFill>
+                  <a:schemeClr val="bg2">
+                    <a:lumMod val="25000"/>
+                  </a:schemeClr>
+                </a:solidFill>
+                <a:effectLst/>
+                <a:uLnTx/>
+                <a:uFillTx/>
+                <a:latin typeface="Calibri"/>
+                <a:ea typeface="+mn-ea"/>
+                <a:cs typeface="+mn-cs"/>
+              </a:rPr>
+            </a:br>
+            <a:r>
+              <a:rPr kumimoji="0" lang="en-US" sz="1000" b="0" i="0" u="none" strike="noStrike" kern="1200" cap="none" spc="0" normalizeH="0" baseline="0" noProof="0" dirty="0">
+                <a:ln>
+                  <a:noFill/>
+                </a:ln>
+                <a:solidFill>
+                  <a:schemeClr val="bg2">
+                    <a:lumMod val="25000"/>
+                  </a:schemeClr>
+                </a:solidFill>
+                <a:effectLst/>
+                <a:uLnTx/>
+                <a:uFillTx/>
+                <a:latin typeface="Calibri"/>
+                <a:ea typeface="+mn-ea"/>
+                <a:cs typeface="+mn-cs"/>
+              </a:rPr>
+              <a:t>Build Information</a:t>
+            </a:r>
+            <a:endParaRPr kumimoji="0" lang="en-GB" sz="1000" b="0" i="0" u="none" strike="noStrike" kern="1200" cap="none" spc="0" normalizeH="0" baseline="0" noProof="0" dirty="0">
+              <a:ln>
+                <a:noFill/>
+              </a:ln>
+              <a:solidFill>
+                <a:schemeClr val="bg2">
+                  <a:lumMod val="25000"/>
+                </a:schemeClr>
+              </a:solidFill>
+              <a:effectLst/>
+              <a:uLnTx/>
+              <a:uFillTx/>
+              <a:latin typeface="Calibri"/>
+              <a:ea typeface="+mn-ea"/>
+              <a:cs typeface="+mn-cs"/>
+            </a:endParaRPr>
+          </a:p>
+        </p:txBody>
+      </p:sp>
+      <p:sp>
+        <p:nvSpPr>
+          <p:cNvPr id="32" name="Arrow: Right 31">
+            <a:extLst>
+              <a:ext uri="{FF2B5EF4-FFF2-40B4-BE49-F238E27FC236}">
+                <a16:creationId xmlns:a16="http://schemas.microsoft.com/office/drawing/2014/main" id="{8DCE06D2-5B11-472B-8D45-3B327EA1669E}"/>
+              </a:ext>
+            </a:extLst>
+          </p:cNvPr>
+          <p:cNvSpPr/>
+          <p:nvPr/>
+        </p:nvSpPr>
+        <p:spPr>
+          <a:xfrm>
+            <a:off x="3900982" y="3450451"/>
+            <a:ext cx="279911" cy="204537"/>
+          </a:xfrm>
+          <a:prstGeom prst="rightArrow">
+            <a:avLst/>
+          </a:prstGeom>
+          <a:solidFill>
+            <a:schemeClr val="accent1"/>
+          </a:solidFill>
+          <a:ln>
+            <a:noFill/>
+          </a:ln>
+        </p:spPr>
+        <p:style>
+          <a:lnRef idx="2">
+            <a:schemeClr val="accent1">
+              <a:shade val="50000"/>
+            </a:schemeClr>
+          </a:lnRef>
+          <a:fillRef idx="1">
+            <a:schemeClr val="accent1"/>
+          </a:fillRef>
+          <a:effectRef idx="0">
+            <a:schemeClr val="accent1"/>
+          </a:effectRef>
+          <a:fontRef idx="minor">
+            <a:schemeClr val="lt1"/>
+          </a:fontRef>
+        </p:style>
+        <p:txBody>
+          <a:bodyPr rtlCol="0" anchor="ctr"/>
+          <a:lstStyle/>
+          <a:p>
+            <a:pPr marL="0" marR="0" lvl="0" indent="0" algn="ctr" defTabSz="914400" rtl="0" eaLnBrk="0" fontAlgn="base" latinLnBrk="0" hangingPunct="0">
+              <a:lnSpc>
+                <a:spcPct val="100000"/>
+              </a:lnSpc>
+              <a:spcBef>
+                <a:spcPct val="0"/>
+              </a:spcBef>
+              <a:spcAft>
+                <a:spcPct val="0"/>
+              </a:spcAft>
+              <a:buClrTx/>
+              <a:buSzTx/>
+              <a:buFontTx/>
+              <a:buNone/>
+              <a:tabLst/>
+              <a:defRPr/>
+            </a:pPr>
+            <a:endParaRPr kumimoji="0" lang="en-GB" sz="1800" b="0" i="0" u="none" strike="noStrike" kern="1200" cap="none" spc="0" normalizeH="0" baseline="0" noProof="0">
+              <a:ln>
+                <a:noFill/>
+              </a:ln>
+              <a:solidFill>
+                <a:srgbClr val="FFFFFF"/>
+              </a:solidFill>
+              <a:effectLst/>
+              <a:uLnTx/>
+              <a:uFillTx/>
+              <a:latin typeface="Calibri"/>
+              <a:ea typeface="+mn-ea"/>
+              <a:cs typeface="+mn-cs"/>
+            </a:endParaRPr>
+          </a:p>
+        </p:txBody>
+      </p:sp>
+      <p:cxnSp>
+        <p:nvCxnSpPr>
+          <p:cNvPr id="25" name="Straight Arrow Connector 24">
+            <a:extLst>
+              <a:ext uri="{FF2B5EF4-FFF2-40B4-BE49-F238E27FC236}">
+                <a16:creationId xmlns:a16="http://schemas.microsoft.com/office/drawing/2014/main" id="{AE60EF65-4A79-4DC7-4A62-B477FD9D9B32}"/>
+              </a:ext>
+            </a:extLst>
+          </p:cNvPr>
+          <p:cNvCxnSpPr>
+            <a:cxnSpLocks/>
+            <a:endCxn id="44" idx="1"/>
+          </p:cNvCxnSpPr>
+          <p:nvPr/>
+        </p:nvCxnSpPr>
+        <p:spPr>
+          <a:xfrm>
+            <a:off x="5327580" y="6166530"/>
+            <a:ext cx="827334" cy="1"/>
+          </a:xfrm>
+          <a:prstGeom prst="straightConnector1">
+            <a:avLst/>
+          </a:prstGeom>
+          <a:ln w="38100">
+            <a:prstDash val="sysDot"/>
+            <a:tailEnd type="triangle"/>
+          </a:ln>
+        </p:spPr>
+        <p:style>
+          <a:lnRef idx="1">
+            <a:schemeClr val="accent1"/>
+          </a:lnRef>
+          <a:fillRef idx="0">
+            <a:schemeClr val="accent1"/>
+          </a:fillRef>
+          <a:effectRef idx="0">
+            <a:schemeClr val="accent1"/>
+          </a:effectRef>
+          <a:fontRef idx="minor">
+            <a:schemeClr val="tx1"/>
+          </a:fontRef>
+        </p:style>
+      </p:cxnSp>
+      <p:sp>
+        <p:nvSpPr>
+          <p:cNvPr id="9" name="Flowchart: Multidocument 8">
+            <a:extLst>
+              <a:ext uri="{FF2B5EF4-FFF2-40B4-BE49-F238E27FC236}">
+                <a16:creationId xmlns:a16="http://schemas.microsoft.com/office/drawing/2014/main" id="{46B1B0E7-09EF-7B33-5FA6-E22971CFFA8B}"/>
+              </a:ext>
+            </a:extLst>
+          </p:cNvPr>
+          <p:cNvSpPr/>
+          <p:nvPr/>
+        </p:nvSpPr>
+        <p:spPr>
+          <a:xfrm>
+            <a:off x="4290166" y="4871909"/>
+            <a:ext cx="1309094" cy="787928"/>
+          </a:xfrm>
+          <a:prstGeom prst="flowChartMultidocument">
+            <a:avLst/>
+          </a:prstGeom>
+          <a:solidFill>
+            <a:schemeClr val="bg1"/>
+          </a:solidFill>
+          <a:ln w="19050">
+            <a:solidFill>
+              <a:schemeClr val="accent1">
+                <a:lumMod val="75000"/>
+              </a:schemeClr>
+            </a:solidFill>
+          </a:ln>
+        </p:spPr>
+        <p:style>
+          <a:lnRef idx="2">
+            <a:schemeClr val="accent1">
+              <a:shade val="50000"/>
+            </a:schemeClr>
+          </a:lnRef>
+          <a:fillRef idx="1">
+            <a:schemeClr val="accent1"/>
+          </a:fillRef>
+          <a:effectRef idx="0">
+            <a:schemeClr val="accent1"/>
+          </a:effectRef>
+          <a:fontRef idx="minor">
+            <a:schemeClr val="lt1"/>
+          </a:fontRef>
+        </p:style>
+        <p:txBody>
+          <a:bodyPr rtlCol="0" anchor="ctr"/>
+          <a:lstStyle/>
+          <a:p>
+            <a:pPr marL="0" marR="0" lvl="0" indent="0" algn="ctr" defTabSz="914400" rtl="0" eaLnBrk="0" fontAlgn="base" latinLnBrk="0" hangingPunct="0">
+              <a:lnSpc>
+                <a:spcPct val="100000"/>
+              </a:lnSpc>
+              <a:spcBef>
+                <a:spcPct val="0"/>
+              </a:spcBef>
+              <a:spcAft>
+                <a:spcPct val="0"/>
+              </a:spcAft>
+              <a:buClrTx/>
+              <a:buSzTx/>
+              <a:buFontTx/>
+              <a:buNone/>
+              <a:tabLst/>
+              <a:defRPr/>
+            </a:pPr>
+            <a:r>
+              <a:rPr kumimoji="0" lang="en-US" sz="1200" b="0" i="0" u="none" strike="noStrike" kern="1200" cap="none" spc="0" normalizeH="0" baseline="0" noProof="0" dirty="0">
+                <a:ln>
+                  <a:noFill/>
+                </a:ln>
+                <a:solidFill>
+                  <a:schemeClr val="bg2">
+                    <a:lumMod val="25000"/>
+                  </a:schemeClr>
+                </a:solidFill>
+                <a:effectLst/>
+                <a:uLnTx/>
+                <a:uFillTx/>
+                <a:latin typeface="Calibri"/>
+                <a:ea typeface="+mn-ea"/>
+                <a:cs typeface="+mn-cs"/>
+              </a:rPr>
+              <a:t>*.</a:t>
+            </a:r>
+            <a:r>
+              <a:rPr kumimoji="0" lang="en-US" sz="1200" b="0" i="0" u="none" strike="noStrike" kern="1200" cap="none" spc="0" normalizeH="0" baseline="0" noProof="0" dirty="0" err="1">
+                <a:ln>
+                  <a:noFill/>
+                </a:ln>
+                <a:solidFill>
+                  <a:schemeClr val="bg2">
+                    <a:lumMod val="25000"/>
+                  </a:schemeClr>
+                </a:solidFill>
+                <a:effectLst/>
+                <a:uLnTx/>
+                <a:uFillTx/>
+                <a:latin typeface="Calibri"/>
+                <a:ea typeface="+mn-ea"/>
+                <a:cs typeface="+mn-cs"/>
+              </a:rPr>
+              <a:t>pdsc</a:t>
+            </a:r>
+            <a:br>
+              <a:rPr kumimoji="0" lang="en-US" sz="1200" b="0" i="0" u="none" strike="noStrike" kern="1200" cap="none" spc="0" normalizeH="0" baseline="0" noProof="0" dirty="0">
+                <a:ln>
+                  <a:noFill/>
+                </a:ln>
+                <a:solidFill>
+                  <a:schemeClr val="bg2">
+                    <a:lumMod val="25000"/>
+                  </a:schemeClr>
+                </a:solidFill>
+                <a:effectLst/>
+                <a:uLnTx/>
+                <a:uFillTx/>
+                <a:latin typeface="Calibri"/>
+                <a:ea typeface="+mn-ea"/>
+                <a:cs typeface="+mn-cs"/>
+              </a:rPr>
+            </a:br>
+            <a:r>
+              <a:rPr kumimoji="0" lang="en-US" sz="1200" b="0" i="0" u="none" strike="noStrike" kern="1200" cap="none" spc="0" normalizeH="0" baseline="0" noProof="0" dirty="0">
+                <a:ln>
+                  <a:noFill/>
+                </a:ln>
+                <a:solidFill>
+                  <a:schemeClr val="bg2">
+                    <a:lumMod val="25000"/>
+                  </a:schemeClr>
+                </a:solidFill>
+                <a:effectLst/>
+                <a:uLnTx/>
+                <a:uFillTx/>
+                <a:latin typeface="Calibri"/>
+                <a:ea typeface="+mn-ea"/>
+                <a:cs typeface="+mn-cs"/>
+              </a:rPr>
+              <a:t>Pack </a:t>
+            </a:r>
+            <a:r>
+              <a:rPr kumimoji="0" lang="en-US" sz="1000" b="0" i="0" u="none" strike="noStrike" kern="1200" cap="none" spc="0" normalizeH="0" baseline="0" noProof="0" dirty="0">
+                <a:ln>
+                  <a:noFill/>
+                </a:ln>
+                <a:solidFill>
+                  <a:schemeClr val="bg2">
+                    <a:lumMod val="25000"/>
+                  </a:schemeClr>
+                </a:solidFill>
+                <a:effectLst/>
+                <a:uLnTx/>
+                <a:uFillTx/>
+                <a:latin typeface="Calibri"/>
+                <a:ea typeface="+mn-ea"/>
+                <a:cs typeface="+mn-cs"/>
+              </a:rPr>
+              <a:t>Meta</a:t>
+            </a:r>
+            <a:r>
+              <a:rPr lang="en-US" sz="1000" dirty="0">
+                <a:solidFill>
+                  <a:schemeClr val="bg2">
+                    <a:lumMod val="25000"/>
+                  </a:schemeClr>
+                </a:solidFill>
+                <a:latin typeface="Calibri"/>
+              </a:rPr>
+              <a:t>data</a:t>
+            </a:r>
+            <a:endParaRPr kumimoji="0" lang="en-GB" sz="1000" b="0" i="0" u="none" strike="noStrike" kern="1200" cap="none" spc="0" normalizeH="0" baseline="0" noProof="0" dirty="0">
+              <a:ln>
+                <a:noFill/>
+              </a:ln>
+              <a:solidFill>
+                <a:schemeClr val="bg2">
+                  <a:lumMod val="25000"/>
+                </a:schemeClr>
+              </a:solidFill>
+              <a:effectLst/>
+              <a:uLnTx/>
+              <a:uFillTx/>
+              <a:latin typeface="Calibri"/>
+              <a:ea typeface="+mn-ea"/>
+              <a:cs typeface="+mn-cs"/>
+            </a:endParaRPr>
+          </a:p>
+        </p:txBody>
+      </p:sp>
+      <p:sp>
+        <p:nvSpPr>
+          <p:cNvPr id="37" name="Flowchart: Multidocument 36">
+            <a:extLst>
+              <a:ext uri="{FF2B5EF4-FFF2-40B4-BE49-F238E27FC236}">
+                <a16:creationId xmlns:a16="http://schemas.microsoft.com/office/drawing/2014/main" id="{509747E3-F920-D0CB-4726-6A19B9C67D57}"/>
+              </a:ext>
+            </a:extLst>
+          </p:cNvPr>
+          <p:cNvSpPr/>
+          <p:nvPr/>
+        </p:nvSpPr>
+        <p:spPr>
+          <a:xfrm>
+            <a:off x="6156834" y="1525163"/>
+            <a:ext cx="1285400" cy="781691"/>
+          </a:xfrm>
+          <a:prstGeom prst="flowChartMultidocument">
+            <a:avLst/>
+          </a:prstGeom>
+          <a:solidFill>
+            <a:schemeClr val="bg1">
+              <a:lumMod val="95000"/>
+            </a:schemeClr>
+          </a:solidFill>
+          <a:ln w="19050">
+            <a:solidFill>
+              <a:schemeClr val="accent5">
+                <a:lumMod val="50000"/>
+              </a:schemeClr>
+            </a:solidFill>
+          </a:ln>
+        </p:spPr>
+        <p:style>
+          <a:lnRef idx="2">
+            <a:schemeClr val="accent1">
+              <a:shade val="50000"/>
+            </a:schemeClr>
+          </a:lnRef>
+          <a:fillRef idx="1">
+            <a:schemeClr val="accent1"/>
+          </a:fillRef>
+          <a:effectRef idx="0">
+            <a:schemeClr val="accent1"/>
+          </a:effectRef>
+          <a:fontRef idx="minor">
+            <a:schemeClr val="lt1"/>
+          </a:fontRef>
+        </p:style>
+        <p:txBody>
+          <a:bodyPr rtlCol="0" anchor="ctr"/>
+          <a:lstStyle/>
+          <a:p>
+            <a:pPr marL="0" marR="0" lvl="0" indent="0" algn="ctr" defTabSz="914400" rtl="0" eaLnBrk="0" fontAlgn="base" latinLnBrk="0" hangingPunct="0">
+              <a:lnSpc>
+                <a:spcPct val="100000"/>
+              </a:lnSpc>
+              <a:spcBef>
+                <a:spcPct val="0"/>
+              </a:spcBef>
+              <a:spcAft>
+                <a:spcPct val="0"/>
+              </a:spcAft>
+              <a:buClrTx/>
+              <a:buSzTx/>
+              <a:buFontTx/>
+              <a:buNone/>
+              <a:tabLst/>
+              <a:defRPr/>
+            </a:pPr>
+            <a:r>
+              <a:rPr kumimoji="0" lang="en-US" sz="1200" b="0" i="0" u="none" strike="noStrike" kern="1200" cap="none" spc="0" normalizeH="0" baseline="0" noProof="0" dirty="0">
+                <a:ln>
+                  <a:noFill/>
+                </a:ln>
+                <a:solidFill>
+                  <a:schemeClr val="bg2">
+                    <a:lumMod val="25000"/>
+                  </a:schemeClr>
+                </a:solidFill>
+                <a:effectLst/>
+                <a:uLnTx/>
+                <a:uFillTx/>
+                <a:latin typeface="Calibri"/>
+                <a:ea typeface="+mn-ea"/>
+                <a:cs typeface="+mn-cs"/>
+              </a:rPr>
+              <a:t>*.</a:t>
+            </a:r>
+            <a:r>
+              <a:rPr kumimoji="0" lang="en-US" sz="1200" b="0" i="0" u="none" strike="noStrike" kern="1200" cap="none" spc="0" normalizeH="0" baseline="0" noProof="0" dirty="0" err="1">
+                <a:ln>
+                  <a:noFill/>
+                </a:ln>
+                <a:solidFill>
+                  <a:schemeClr val="bg2">
+                    <a:lumMod val="25000"/>
+                  </a:schemeClr>
+                </a:solidFill>
+                <a:effectLst/>
+                <a:uLnTx/>
+                <a:uFillTx/>
+                <a:latin typeface="Calibri"/>
+                <a:ea typeface="+mn-ea"/>
+                <a:cs typeface="+mn-cs"/>
+              </a:rPr>
+              <a:t>cbuild.yml</a:t>
+            </a:r>
+            <a:br>
+              <a:rPr kumimoji="0" lang="en-US" sz="1200" b="0" i="0" u="none" strike="noStrike" kern="1200" cap="none" spc="0" normalizeH="0" baseline="0" noProof="0" dirty="0">
+                <a:ln>
+                  <a:noFill/>
+                </a:ln>
+                <a:solidFill>
+                  <a:schemeClr val="bg2">
+                    <a:lumMod val="25000"/>
+                  </a:schemeClr>
+                </a:solidFill>
+                <a:effectLst/>
+                <a:uLnTx/>
+                <a:uFillTx/>
+                <a:latin typeface="Calibri"/>
+                <a:ea typeface="+mn-ea"/>
+                <a:cs typeface="+mn-cs"/>
+              </a:rPr>
+            </a:br>
+            <a:r>
+              <a:rPr kumimoji="0" lang="en-US" sz="1000" b="0" i="0" u="none" strike="noStrike" kern="1200" cap="none" spc="0" normalizeH="0" baseline="0" noProof="0" dirty="0">
+                <a:ln>
+                  <a:noFill/>
+                </a:ln>
+                <a:solidFill>
+                  <a:schemeClr val="bg2">
+                    <a:lumMod val="25000"/>
+                  </a:schemeClr>
+                </a:solidFill>
+                <a:effectLst/>
+                <a:uLnTx/>
+                <a:uFillTx/>
+                <a:latin typeface="Calibri"/>
+                <a:ea typeface="+mn-ea"/>
+                <a:cs typeface="+mn-cs"/>
+              </a:rPr>
+              <a:t>Build Information</a:t>
+            </a:r>
+            <a:endParaRPr kumimoji="0" lang="en-GB" sz="1000" b="0" i="0" u="none" strike="noStrike" kern="1200" cap="none" spc="0" normalizeH="0" baseline="0" noProof="0" dirty="0">
+              <a:ln>
+                <a:noFill/>
+              </a:ln>
+              <a:solidFill>
+                <a:schemeClr val="bg2">
+                  <a:lumMod val="25000"/>
+                </a:schemeClr>
+              </a:solidFill>
+              <a:effectLst/>
+              <a:uLnTx/>
+              <a:uFillTx/>
+              <a:latin typeface="Calibri"/>
+              <a:ea typeface="+mn-ea"/>
+              <a:cs typeface="+mn-cs"/>
+            </a:endParaRPr>
+          </a:p>
+        </p:txBody>
+      </p:sp>
+      <p:sp>
+        <p:nvSpPr>
+          <p:cNvPr id="42" name="Flowchart: Document 41">
+            <a:extLst>
+              <a:ext uri="{FF2B5EF4-FFF2-40B4-BE49-F238E27FC236}">
+                <a16:creationId xmlns:a16="http://schemas.microsoft.com/office/drawing/2014/main" id="{6B4565B0-8E87-5806-0BF7-AE85E075808D}"/>
+              </a:ext>
+            </a:extLst>
+          </p:cNvPr>
+          <p:cNvSpPr/>
+          <p:nvPr/>
+        </p:nvSpPr>
+        <p:spPr>
+          <a:xfrm>
+            <a:off x="6156834" y="635666"/>
+            <a:ext cx="1285400" cy="781692"/>
+          </a:xfrm>
+          <a:prstGeom prst="flowChartDocument">
+            <a:avLst/>
+          </a:prstGeom>
+          <a:solidFill>
+            <a:schemeClr val="bg1">
+              <a:lumMod val="95000"/>
+            </a:schemeClr>
+          </a:solidFill>
+          <a:ln w="19050">
+            <a:solidFill>
+              <a:schemeClr val="accent5">
+                <a:lumMod val="50000"/>
+              </a:schemeClr>
+            </a:solidFill>
+          </a:ln>
+        </p:spPr>
+        <p:style>
+          <a:lnRef idx="2">
+            <a:schemeClr val="accent1">
+              <a:shade val="50000"/>
+            </a:schemeClr>
+          </a:lnRef>
+          <a:fillRef idx="1">
+            <a:schemeClr val="accent1"/>
+          </a:fillRef>
+          <a:effectRef idx="0">
+            <a:schemeClr val="accent1"/>
+          </a:effectRef>
+          <a:fontRef idx="minor">
+            <a:schemeClr val="lt1"/>
+          </a:fontRef>
+        </p:style>
+        <p:txBody>
+          <a:bodyPr rtlCol="0" anchor="ctr"/>
+          <a:lstStyle/>
+          <a:p>
+            <a:pPr algn="ctr" eaLnBrk="0" fontAlgn="base" hangingPunct="0">
+              <a:spcBef>
+                <a:spcPct val="0"/>
+              </a:spcBef>
+              <a:spcAft>
+                <a:spcPct val="0"/>
+              </a:spcAft>
+            </a:pPr>
+            <a:r>
+              <a:rPr lang="en-US" sz="1200" dirty="0">
+                <a:solidFill>
+                  <a:schemeClr val="bg2">
+                    <a:lumMod val="25000"/>
+                  </a:schemeClr>
+                </a:solidFill>
+                <a:latin typeface="Calibri"/>
+              </a:rPr>
+              <a:t>*.</a:t>
+            </a:r>
+            <a:r>
+              <a:rPr lang="en-US" sz="1200" dirty="0" err="1">
+                <a:solidFill>
+                  <a:schemeClr val="bg2">
+                    <a:lumMod val="25000"/>
+                  </a:schemeClr>
+                </a:solidFill>
+                <a:latin typeface="Calibri"/>
+              </a:rPr>
+              <a:t>cbuild-idx.yml</a:t>
+            </a:r>
+            <a:br>
+              <a:rPr lang="en-US" sz="1200" dirty="0">
+                <a:solidFill>
+                  <a:schemeClr val="bg2">
+                    <a:lumMod val="25000"/>
+                  </a:schemeClr>
+                </a:solidFill>
+                <a:latin typeface="Calibri"/>
+              </a:rPr>
+            </a:br>
+            <a:r>
+              <a:rPr lang="en-US" sz="1000" dirty="0">
+                <a:solidFill>
+                  <a:schemeClr val="bg2">
+                    <a:lumMod val="25000"/>
+                  </a:schemeClr>
+                </a:solidFill>
+                <a:latin typeface="Calibri"/>
+              </a:rPr>
+              <a:t>Overall description </a:t>
+            </a:r>
+            <a:br>
+              <a:rPr lang="en-US" sz="1000" dirty="0">
+                <a:solidFill>
+                  <a:schemeClr val="bg2">
+                    <a:lumMod val="25000"/>
+                  </a:schemeClr>
+                </a:solidFill>
+                <a:latin typeface="Calibri"/>
+              </a:rPr>
+            </a:br>
+            <a:r>
+              <a:rPr lang="en-US" sz="1000" dirty="0">
+                <a:solidFill>
+                  <a:schemeClr val="bg2">
+                    <a:lumMod val="25000"/>
+                  </a:schemeClr>
+                </a:solidFill>
+                <a:latin typeface="Calibri"/>
+              </a:rPr>
+              <a:t>with project index</a:t>
+            </a:r>
+            <a:endParaRPr lang="en-GB" sz="1000" dirty="0">
+              <a:solidFill>
+                <a:schemeClr val="bg2">
+                  <a:lumMod val="25000"/>
+                </a:schemeClr>
+              </a:solidFill>
+              <a:latin typeface="Calibri"/>
+            </a:endParaRPr>
+          </a:p>
+        </p:txBody>
+      </p:sp>
+      <p:sp>
+        <p:nvSpPr>
+          <p:cNvPr id="44" name="Flowchart: Multidocument 43">
+            <a:extLst>
+              <a:ext uri="{FF2B5EF4-FFF2-40B4-BE49-F238E27FC236}">
+                <a16:creationId xmlns:a16="http://schemas.microsoft.com/office/drawing/2014/main" id="{DE1205A3-0CDC-3648-D603-621349F0F6B7}"/>
+              </a:ext>
+            </a:extLst>
+          </p:cNvPr>
+          <p:cNvSpPr/>
+          <p:nvPr/>
+        </p:nvSpPr>
+        <p:spPr>
+          <a:xfrm>
+            <a:off x="6154914" y="5775685"/>
+            <a:ext cx="1285400" cy="781691"/>
+          </a:xfrm>
+          <a:prstGeom prst="flowChartMultidocument">
+            <a:avLst/>
+          </a:prstGeom>
+          <a:solidFill>
+            <a:schemeClr val="bg1">
+              <a:lumMod val="95000"/>
+            </a:schemeClr>
+          </a:solidFill>
+          <a:ln w="19050">
+            <a:solidFill>
+              <a:schemeClr val="accent5">
+                <a:lumMod val="50000"/>
+              </a:schemeClr>
+            </a:solidFill>
+          </a:ln>
+        </p:spPr>
+        <p:style>
+          <a:lnRef idx="2">
+            <a:schemeClr val="accent1">
+              <a:shade val="50000"/>
+            </a:schemeClr>
+          </a:lnRef>
+          <a:fillRef idx="1">
+            <a:schemeClr val="accent1"/>
+          </a:fillRef>
+          <a:effectRef idx="0">
+            <a:schemeClr val="accent1"/>
+          </a:effectRef>
+          <a:fontRef idx="minor">
+            <a:schemeClr val="lt1"/>
+          </a:fontRef>
+        </p:style>
+        <p:txBody>
+          <a:bodyPr rtlCol="0" anchor="ctr"/>
+          <a:lstStyle/>
+          <a:p>
+            <a:pPr marL="0" marR="0" lvl="0" indent="0" algn="ctr" defTabSz="914400" rtl="0" eaLnBrk="0" fontAlgn="base" latinLnBrk="0" hangingPunct="0">
+              <a:lnSpc>
+                <a:spcPct val="100000"/>
+              </a:lnSpc>
+              <a:spcBef>
+                <a:spcPct val="0"/>
+              </a:spcBef>
+              <a:spcAft>
+                <a:spcPct val="0"/>
+              </a:spcAft>
+              <a:buClrTx/>
+              <a:buSzTx/>
+              <a:buFontTx/>
+              <a:buNone/>
+              <a:tabLst/>
+              <a:defRPr/>
+            </a:pPr>
+            <a:r>
+              <a:rPr kumimoji="0" lang="en-US" sz="1200" b="0" i="0" u="none" strike="noStrike" kern="1200" cap="none" spc="0" normalizeH="0" baseline="0" noProof="0" dirty="0">
+                <a:ln>
+                  <a:noFill/>
+                </a:ln>
+                <a:solidFill>
+                  <a:schemeClr val="bg2">
+                    <a:lumMod val="25000"/>
+                  </a:schemeClr>
+                </a:solidFill>
+                <a:effectLst/>
+                <a:uLnTx/>
+                <a:uFillTx/>
+                <a:latin typeface="Calibri"/>
+                <a:ea typeface="+mn-ea"/>
+                <a:cs typeface="+mn-cs"/>
+              </a:rPr>
+              <a:t>Component</a:t>
+            </a:r>
+            <a:br>
+              <a:rPr kumimoji="0" lang="en-US" sz="1200" b="0" i="0" u="none" strike="noStrike" kern="1200" cap="none" spc="0" normalizeH="0" baseline="0" noProof="0" dirty="0">
+                <a:ln>
+                  <a:noFill/>
+                </a:ln>
+                <a:solidFill>
+                  <a:schemeClr val="bg2">
+                    <a:lumMod val="25000"/>
+                  </a:schemeClr>
+                </a:solidFill>
+                <a:effectLst/>
+                <a:uLnTx/>
+                <a:uFillTx/>
+                <a:latin typeface="Calibri"/>
+                <a:ea typeface="+mn-ea"/>
+                <a:cs typeface="+mn-cs"/>
+              </a:rPr>
+            </a:br>
+            <a:r>
+              <a:rPr kumimoji="0" lang="en-US" sz="1200" b="0" i="0" u="none" strike="noStrike" kern="1200" cap="none" spc="0" normalizeH="0" baseline="0" noProof="0" dirty="0">
+                <a:ln>
+                  <a:noFill/>
+                </a:ln>
+                <a:solidFill>
+                  <a:schemeClr val="bg2">
+                    <a:lumMod val="25000"/>
+                  </a:schemeClr>
+                </a:solidFill>
+                <a:effectLst/>
+                <a:uLnTx/>
+                <a:uFillTx/>
+                <a:latin typeface="Calibri"/>
+                <a:ea typeface="+mn-ea"/>
+                <a:cs typeface="+mn-cs"/>
+              </a:rPr>
+              <a:t>Config Files</a:t>
+            </a:r>
+            <a:endParaRPr kumimoji="0" lang="en-GB" sz="1000" b="0" i="0" u="none" strike="noStrike" kern="1200" cap="none" spc="0" normalizeH="0" baseline="0" noProof="0" dirty="0">
+              <a:ln>
+                <a:noFill/>
+              </a:ln>
+              <a:solidFill>
+                <a:schemeClr val="bg2">
+                  <a:lumMod val="25000"/>
+                </a:schemeClr>
+              </a:solidFill>
+              <a:effectLst/>
+              <a:uLnTx/>
+              <a:uFillTx/>
+              <a:latin typeface="Calibri"/>
+              <a:ea typeface="+mn-ea"/>
+              <a:cs typeface="+mn-cs"/>
+            </a:endParaRPr>
+          </a:p>
+        </p:txBody>
+      </p:sp>
+      <p:sp>
+        <p:nvSpPr>
+          <p:cNvPr id="45" name="Flowchart: Multidocument 44">
+            <a:extLst>
+              <a:ext uri="{FF2B5EF4-FFF2-40B4-BE49-F238E27FC236}">
+                <a16:creationId xmlns:a16="http://schemas.microsoft.com/office/drawing/2014/main" id="{4592997C-81E8-2096-11F2-A301979AC2BF}"/>
+              </a:ext>
+            </a:extLst>
+          </p:cNvPr>
+          <p:cNvSpPr/>
+          <p:nvPr/>
+        </p:nvSpPr>
+        <p:spPr>
+          <a:xfrm>
+            <a:off x="6154914" y="3960902"/>
+            <a:ext cx="1285400" cy="781691"/>
+          </a:xfrm>
+          <a:prstGeom prst="flowChartMultidocument">
+            <a:avLst/>
+          </a:prstGeom>
+          <a:solidFill>
+            <a:schemeClr val="bg1">
+              <a:lumMod val="95000"/>
+            </a:schemeClr>
+          </a:solidFill>
+          <a:ln w="19050">
+            <a:solidFill>
+              <a:schemeClr val="accent5">
+                <a:lumMod val="50000"/>
+              </a:schemeClr>
+            </a:solidFill>
+          </a:ln>
+        </p:spPr>
+        <p:style>
+          <a:lnRef idx="2">
+            <a:schemeClr val="accent1">
+              <a:shade val="50000"/>
+            </a:schemeClr>
+          </a:lnRef>
+          <a:fillRef idx="1">
+            <a:schemeClr val="accent1"/>
+          </a:fillRef>
+          <a:effectRef idx="0">
+            <a:schemeClr val="accent1"/>
+          </a:effectRef>
+          <a:fontRef idx="minor">
+            <a:schemeClr val="lt1"/>
+          </a:fontRef>
+        </p:style>
+        <p:txBody>
+          <a:bodyPr rtlCol="0" anchor="ctr"/>
+          <a:lstStyle/>
+          <a:p>
+            <a:pPr marL="0" marR="0" lvl="0" indent="0" algn="ctr" defTabSz="914400" rtl="0" eaLnBrk="0" fontAlgn="base" latinLnBrk="0" hangingPunct="0">
+              <a:lnSpc>
+                <a:spcPct val="100000"/>
+              </a:lnSpc>
+              <a:spcBef>
+                <a:spcPct val="0"/>
+              </a:spcBef>
+              <a:spcAft>
+                <a:spcPct val="0"/>
+              </a:spcAft>
+              <a:buClrTx/>
+              <a:buSzTx/>
+              <a:buFontTx/>
+              <a:buNone/>
+              <a:tabLst/>
+              <a:defRPr/>
+            </a:pPr>
+            <a:r>
+              <a:rPr kumimoji="0" lang="en-US" sz="1200" b="0" i="0" u="none" strike="noStrike" kern="1200" cap="none" spc="0" normalizeH="0" baseline="0" noProof="0" dirty="0">
+                <a:ln>
+                  <a:noFill/>
+                </a:ln>
+                <a:solidFill>
+                  <a:schemeClr val="bg2">
+                    <a:lumMod val="25000"/>
+                  </a:schemeClr>
+                </a:solidFill>
+                <a:effectLst/>
+                <a:uLnTx/>
+                <a:uFillTx/>
+                <a:latin typeface="Calibri"/>
+                <a:ea typeface="+mn-ea"/>
+                <a:cs typeface="+mn-cs"/>
+              </a:rPr>
+              <a:t>RTE_</a:t>
+            </a:r>
+            <a:br>
+              <a:rPr kumimoji="0" lang="en-US" sz="1200" b="0" i="0" u="none" strike="noStrike" kern="1200" cap="none" spc="0" normalizeH="0" baseline="0" noProof="0" dirty="0">
+                <a:ln>
+                  <a:noFill/>
+                </a:ln>
+                <a:solidFill>
+                  <a:schemeClr val="bg2">
+                    <a:lumMod val="25000"/>
+                  </a:schemeClr>
+                </a:solidFill>
+                <a:effectLst/>
+                <a:uLnTx/>
+                <a:uFillTx/>
+                <a:latin typeface="Calibri"/>
+                <a:ea typeface="+mn-ea"/>
+                <a:cs typeface="+mn-cs"/>
+              </a:rPr>
+            </a:br>
+            <a:r>
+              <a:rPr kumimoji="0" lang="en-US" sz="1200" b="0" i="0" u="none" strike="noStrike" kern="1200" cap="none" spc="0" normalizeH="0" baseline="0" noProof="0" dirty="0" err="1">
+                <a:ln>
+                  <a:noFill/>
+                </a:ln>
+                <a:solidFill>
+                  <a:schemeClr val="bg2">
+                    <a:lumMod val="25000"/>
+                  </a:schemeClr>
+                </a:solidFill>
+                <a:effectLst/>
+                <a:uLnTx/>
+                <a:uFillTx/>
+                <a:latin typeface="Calibri"/>
+                <a:ea typeface="+mn-ea"/>
+                <a:cs typeface="+mn-cs"/>
+              </a:rPr>
+              <a:t>components.h</a:t>
+            </a:r>
+            <a:br>
+              <a:rPr kumimoji="0" lang="en-US" sz="1200" b="0" i="0" u="none" strike="noStrike" kern="1200" cap="none" spc="0" normalizeH="0" baseline="0" noProof="0" dirty="0">
+                <a:ln>
+                  <a:noFill/>
+                </a:ln>
+                <a:solidFill>
+                  <a:schemeClr val="bg2">
+                    <a:lumMod val="25000"/>
+                  </a:schemeClr>
+                </a:solidFill>
+                <a:effectLst/>
+                <a:uLnTx/>
+                <a:uFillTx/>
+                <a:latin typeface="Calibri"/>
+                <a:ea typeface="+mn-ea"/>
+                <a:cs typeface="+mn-cs"/>
+              </a:rPr>
+            </a:br>
+            <a:endParaRPr kumimoji="0" lang="en-GB" sz="1000" b="0" i="0" u="none" strike="noStrike" kern="1200" cap="none" spc="0" normalizeH="0" baseline="0" noProof="0" dirty="0">
+              <a:ln>
+                <a:noFill/>
+              </a:ln>
+              <a:solidFill>
+                <a:schemeClr val="bg2">
+                  <a:lumMod val="25000"/>
+                </a:schemeClr>
+              </a:solidFill>
+              <a:effectLst/>
+              <a:uLnTx/>
+              <a:uFillTx/>
+              <a:latin typeface="Calibri"/>
+              <a:ea typeface="+mn-ea"/>
+              <a:cs typeface="+mn-cs"/>
+            </a:endParaRPr>
+          </a:p>
+        </p:txBody>
+      </p:sp>
+      <p:sp>
+        <p:nvSpPr>
+          <p:cNvPr id="48" name="Flowchart: Multidocument 47">
+            <a:extLst>
+              <a:ext uri="{FF2B5EF4-FFF2-40B4-BE49-F238E27FC236}">
+                <a16:creationId xmlns:a16="http://schemas.microsoft.com/office/drawing/2014/main" id="{4AFF4F7C-8E60-F604-D682-1CAD021FF6AE}"/>
+              </a:ext>
+            </a:extLst>
+          </p:cNvPr>
+          <p:cNvSpPr/>
+          <p:nvPr/>
+        </p:nvSpPr>
+        <p:spPr>
+          <a:xfrm>
+            <a:off x="6154914" y="4878146"/>
+            <a:ext cx="1285400" cy="781691"/>
+          </a:xfrm>
+          <a:prstGeom prst="flowChartMultidocument">
+            <a:avLst/>
+          </a:prstGeom>
+          <a:solidFill>
+            <a:schemeClr val="bg1">
+              <a:lumMod val="95000"/>
+            </a:schemeClr>
+          </a:solidFill>
+          <a:ln w="19050">
+            <a:solidFill>
+              <a:schemeClr val="accent5">
+                <a:lumMod val="50000"/>
+              </a:schemeClr>
+            </a:solidFill>
+          </a:ln>
+        </p:spPr>
+        <p:style>
+          <a:lnRef idx="2">
+            <a:schemeClr val="accent1">
+              <a:shade val="50000"/>
+            </a:schemeClr>
+          </a:lnRef>
+          <a:fillRef idx="1">
+            <a:schemeClr val="accent1"/>
+          </a:fillRef>
+          <a:effectRef idx="0">
+            <a:schemeClr val="accent1"/>
+          </a:effectRef>
+          <a:fontRef idx="minor">
+            <a:schemeClr val="lt1"/>
+          </a:fontRef>
+        </p:style>
+        <p:txBody>
+          <a:bodyPr rtlCol="0" anchor="ctr"/>
+          <a:lstStyle/>
+          <a:p>
+            <a:pPr marL="0" marR="0" lvl="0" indent="0" algn="ctr" defTabSz="914400" rtl="0" eaLnBrk="0" fontAlgn="base" latinLnBrk="0" hangingPunct="0">
+              <a:lnSpc>
+                <a:spcPct val="100000"/>
+              </a:lnSpc>
+              <a:spcBef>
+                <a:spcPct val="0"/>
+              </a:spcBef>
+              <a:spcAft>
+                <a:spcPct val="0"/>
+              </a:spcAft>
+              <a:buClrTx/>
+              <a:buSzTx/>
+              <a:buFontTx/>
+              <a:buNone/>
+              <a:tabLst/>
+              <a:defRPr/>
+            </a:pPr>
+            <a:r>
+              <a:rPr kumimoji="0" lang="en-US" sz="1200" b="0" i="0" u="none" strike="noStrike" kern="1200" cap="none" spc="0" normalizeH="0" baseline="0" noProof="0" dirty="0">
+                <a:ln>
+                  <a:noFill/>
+                </a:ln>
+                <a:solidFill>
+                  <a:schemeClr val="bg2">
+                    <a:lumMod val="25000"/>
+                  </a:schemeClr>
+                </a:solidFill>
+                <a:effectLst/>
+                <a:uLnTx/>
+                <a:uFillTx/>
+                <a:latin typeface="Calibri"/>
+                <a:ea typeface="+mn-ea"/>
+                <a:cs typeface="+mn-cs"/>
+              </a:rPr>
+              <a:t>Pre-include </a:t>
+            </a:r>
+            <a:br>
+              <a:rPr kumimoji="0" lang="en-US" sz="1200" b="0" i="0" u="none" strike="noStrike" kern="1200" cap="none" spc="0" normalizeH="0" baseline="0" noProof="0" dirty="0">
+                <a:ln>
+                  <a:noFill/>
+                </a:ln>
+                <a:solidFill>
+                  <a:schemeClr val="bg2">
+                    <a:lumMod val="25000"/>
+                  </a:schemeClr>
+                </a:solidFill>
+                <a:effectLst/>
+                <a:uLnTx/>
+                <a:uFillTx/>
+                <a:latin typeface="Calibri"/>
+                <a:ea typeface="+mn-ea"/>
+                <a:cs typeface="+mn-cs"/>
+              </a:rPr>
+            </a:br>
+            <a:r>
+              <a:rPr kumimoji="0" lang="en-US" sz="1200" b="0" i="0" u="none" strike="noStrike" kern="1200" cap="none" spc="0" normalizeH="0" baseline="0" noProof="0" dirty="0">
+                <a:ln>
+                  <a:noFill/>
+                </a:ln>
+                <a:solidFill>
+                  <a:schemeClr val="bg2">
+                    <a:lumMod val="25000"/>
+                  </a:schemeClr>
+                </a:solidFill>
+                <a:effectLst/>
+                <a:uLnTx/>
+                <a:uFillTx/>
+                <a:latin typeface="Calibri"/>
+                <a:ea typeface="+mn-ea"/>
+                <a:cs typeface="+mn-cs"/>
+              </a:rPr>
+              <a:t>Files</a:t>
+            </a:r>
+            <a:endParaRPr kumimoji="0" lang="en-GB" sz="1000" b="0" i="0" u="none" strike="noStrike" kern="1200" cap="none" spc="0" normalizeH="0" baseline="0" noProof="0" dirty="0">
+              <a:ln>
+                <a:noFill/>
+              </a:ln>
+              <a:solidFill>
+                <a:schemeClr val="bg2">
+                  <a:lumMod val="25000"/>
+                </a:schemeClr>
+              </a:solidFill>
+              <a:effectLst/>
+              <a:uLnTx/>
+              <a:uFillTx/>
+              <a:latin typeface="Calibri"/>
+              <a:ea typeface="+mn-ea"/>
+              <a:cs typeface="+mn-cs"/>
+            </a:endParaRPr>
+          </a:p>
+        </p:txBody>
+      </p:sp>
+      <p:sp>
+        <p:nvSpPr>
+          <p:cNvPr id="49" name="Flowchart: Multidocument 48">
+            <a:extLst>
+              <a:ext uri="{FF2B5EF4-FFF2-40B4-BE49-F238E27FC236}">
+                <a16:creationId xmlns:a16="http://schemas.microsoft.com/office/drawing/2014/main" id="{94F6C09C-110C-7C2E-9C31-5970D150646B}"/>
+              </a:ext>
+            </a:extLst>
+          </p:cNvPr>
+          <p:cNvSpPr/>
+          <p:nvPr/>
+        </p:nvSpPr>
+        <p:spPr>
+          <a:xfrm>
+            <a:off x="4313255" y="5797355"/>
+            <a:ext cx="1309094" cy="787928"/>
+          </a:xfrm>
+          <a:prstGeom prst="flowChartMultidocument">
+            <a:avLst/>
+          </a:prstGeom>
+          <a:solidFill>
+            <a:schemeClr val="bg1"/>
+          </a:solidFill>
+          <a:ln w="19050">
+            <a:solidFill>
+              <a:schemeClr val="accent1">
+                <a:lumMod val="75000"/>
+              </a:schemeClr>
+            </a:solidFill>
+          </a:ln>
+        </p:spPr>
+        <p:style>
+          <a:lnRef idx="2">
+            <a:schemeClr val="accent1">
+              <a:shade val="50000"/>
+            </a:schemeClr>
+          </a:lnRef>
+          <a:fillRef idx="1">
+            <a:schemeClr val="accent1"/>
+          </a:fillRef>
+          <a:effectRef idx="0">
+            <a:schemeClr val="accent1"/>
+          </a:effectRef>
+          <a:fontRef idx="minor">
+            <a:schemeClr val="lt1"/>
+          </a:fontRef>
+        </p:style>
+        <p:txBody>
+          <a:bodyPr rtlCol="0" anchor="ctr"/>
+          <a:lstStyle/>
+          <a:p>
+            <a:pPr marL="0" marR="0" lvl="0" indent="0" algn="ctr" defTabSz="914400" rtl="0" eaLnBrk="0" fontAlgn="base" latinLnBrk="0" hangingPunct="0">
+              <a:lnSpc>
+                <a:spcPct val="100000"/>
+              </a:lnSpc>
+              <a:spcBef>
+                <a:spcPct val="0"/>
+              </a:spcBef>
+              <a:spcAft>
+                <a:spcPct val="0"/>
+              </a:spcAft>
+              <a:buClrTx/>
+              <a:buSzTx/>
+              <a:buFontTx/>
+              <a:buNone/>
+              <a:tabLst/>
+              <a:defRPr/>
+            </a:pPr>
+            <a:r>
+              <a:rPr kumimoji="0" lang="en-US" sz="1200" b="0" i="0" u="none" strike="noStrike" kern="1200" cap="none" spc="0" normalizeH="0" baseline="0" noProof="0" dirty="0">
+                <a:ln>
+                  <a:noFill/>
+                </a:ln>
+                <a:solidFill>
+                  <a:schemeClr val="bg2">
+                    <a:lumMod val="25000"/>
+                  </a:schemeClr>
+                </a:solidFill>
+                <a:effectLst/>
+                <a:uLnTx/>
+                <a:uFillTx/>
+                <a:latin typeface="Calibri"/>
+                <a:ea typeface="+mn-ea"/>
+                <a:cs typeface="+mn-cs"/>
+              </a:rPr>
+              <a:t>Component</a:t>
+            </a:r>
+            <a:br>
+              <a:rPr kumimoji="0" lang="en-US" sz="1200" b="0" i="0" u="none" strike="noStrike" kern="1200" cap="none" spc="0" normalizeH="0" baseline="0" noProof="0" dirty="0">
+                <a:ln>
+                  <a:noFill/>
+                </a:ln>
+                <a:solidFill>
+                  <a:schemeClr val="bg2">
+                    <a:lumMod val="25000"/>
+                  </a:schemeClr>
+                </a:solidFill>
+                <a:effectLst/>
+                <a:uLnTx/>
+                <a:uFillTx/>
+                <a:latin typeface="Calibri"/>
+                <a:ea typeface="+mn-ea"/>
+                <a:cs typeface="+mn-cs"/>
+              </a:rPr>
+            </a:br>
+            <a:r>
+              <a:rPr kumimoji="0" lang="en-US" sz="1200" b="0" i="0" u="none" strike="noStrike" kern="1200" cap="none" spc="0" normalizeH="0" baseline="0" noProof="0" dirty="0">
+                <a:ln>
+                  <a:noFill/>
+                </a:ln>
+                <a:solidFill>
+                  <a:schemeClr val="bg2">
+                    <a:lumMod val="25000"/>
+                  </a:schemeClr>
+                </a:solidFill>
+                <a:effectLst/>
+                <a:uLnTx/>
+                <a:uFillTx/>
+                <a:latin typeface="Calibri"/>
+                <a:ea typeface="+mn-ea"/>
+                <a:cs typeface="+mn-cs"/>
+              </a:rPr>
+              <a:t>Config Files</a:t>
+            </a:r>
+            <a:endParaRPr kumimoji="0" lang="en-GB" sz="1000" b="0" i="0" u="none" strike="noStrike" kern="1200" cap="none" spc="0" normalizeH="0" baseline="0" noProof="0" dirty="0">
+              <a:ln>
+                <a:noFill/>
+              </a:ln>
+              <a:solidFill>
+                <a:schemeClr val="bg2">
+                  <a:lumMod val="25000"/>
+                </a:schemeClr>
+              </a:solidFill>
+              <a:effectLst/>
+              <a:uLnTx/>
+              <a:uFillTx/>
+              <a:latin typeface="Calibri"/>
+              <a:ea typeface="+mn-ea"/>
+              <a:cs typeface="+mn-cs"/>
+            </a:endParaRPr>
+          </a:p>
+        </p:txBody>
+      </p:sp>
+      <p:sp>
+        <p:nvSpPr>
+          <p:cNvPr id="51" name="Arrow: Right 50">
+            <a:extLst>
+              <a:ext uri="{FF2B5EF4-FFF2-40B4-BE49-F238E27FC236}">
+                <a16:creationId xmlns:a16="http://schemas.microsoft.com/office/drawing/2014/main" id="{8374547F-BFF4-AFF4-F6FF-B40CC60806A6}"/>
+              </a:ext>
+            </a:extLst>
+          </p:cNvPr>
+          <p:cNvSpPr/>
+          <p:nvPr/>
+        </p:nvSpPr>
+        <p:spPr>
+          <a:xfrm rot="16200000">
+            <a:off x="4791741" y="4145274"/>
+            <a:ext cx="402228" cy="204537"/>
+          </a:xfrm>
+          <a:prstGeom prst="rightArrow">
+            <a:avLst/>
+          </a:prstGeom>
+          <a:solidFill>
+            <a:schemeClr val="accent1"/>
+          </a:solidFill>
+          <a:ln>
+            <a:noFill/>
+          </a:ln>
+        </p:spPr>
+        <p:style>
+          <a:lnRef idx="2">
+            <a:schemeClr val="accent1">
+              <a:shade val="50000"/>
+            </a:schemeClr>
+          </a:lnRef>
+          <a:fillRef idx="1">
+            <a:schemeClr val="accent1"/>
+          </a:fillRef>
+          <a:effectRef idx="0">
+            <a:schemeClr val="accent1"/>
+          </a:effectRef>
+          <a:fontRef idx="minor">
+            <a:schemeClr val="lt1"/>
+          </a:fontRef>
+        </p:style>
+        <p:txBody>
+          <a:bodyPr rtlCol="0" anchor="ctr"/>
+          <a:lstStyle/>
+          <a:p>
+            <a:pPr marL="0" marR="0" lvl="0" indent="0" algn="ctr" defTabSz="914400" rtl="0" eaLnBrk="0" fontAlgn="base" latinLnBrk="0" hangingPunct="0">
+              <a:lnSpc>
+                <a:spcPct val="100000"/>
+              </a:lnSpc>
+              <a:spcBef>
+                <a:spcPct val="0"/>
+              </a:spcBef>
+              <a:spcAft>
+                <a:spcPct val="0"/>
+              </a:spcAft>
+              <a:buClrTx/>
+              <a:buSzTx/>
+              <a:buFontTx/>
+              <a:buNone/>
+              <a:tabLst/>
+              <a:defRPr/>
+            </a:pPr>
+            <a:endParaRPr kumimoji="0" lang="en-GB" sz="1800" b="0" i="0" u="none" strike="noStrike" kern="1200" cap="none" spc="0" normalizeH="0" baseline="0" noProof="0" dirty="0">
+              <a:ln>
+                <a:noFill/>
+              </a:ln>
+              <a:solidFill>
+                <a:srgbClr val="FFFFFF"/>
+              </a:solidFill>
+              <a:effectLst/>
+              <a:uLnTx/>
+              <a:uFillTx/>
+              <a:latin typeface="Calibri"/>
+              <a:ea typeface="+mn-ea"/>
+              <a:cs typeface="+mn-cs"/>
+            </a:endParaRPr>
+          </a:p>
+        </p:txBody>
+      </p:sp>
+      <p:sp>
+        <p:nvSpPr>
+          <p:cNvPr id="52" name="Rectangle 51">
+            <a:extLst>
+              <a:ext uri="{FF2B5EF4-FFF2-40B4-BE49-F238E27FC236}">
+                <a16:creationId xmlns:a16="http://schemas.microsoft.com/office/drawing/2014/main" id="{1DDF6CEF-19A4-95AF-C9CE-8ECD6841E920}"/>
+              </a:ext>
+            </a:extLst>
+          </p:cNvPr>
+          <p:cNvSpPr/>
+          <p:nvPr/>
+        </p:nvSpPr>
+        <p:spPr>
+          <a:xfrm>
+            <a:off x="7814065" y="2218224"/>
+            <a:ext cx="1540042" cy="1022685"/>
+          </a:xfrm>
+          <a:prstGeom prst="rect">
+            <a:avLst/>
+          </a:prstGeom>
+          <a:solidFill>
+            <a:srgbClr val="92D050"/>
+          </a:solidFill>
+          <a:ln>
+            <a:solidFill>
+              <a:schemeClr val="accent4">
+                <a:lumMod val="75000"/>
+              </a:schemeClr>
+            </a:solidFill>
+          </a:ln>
+        </p:spPr>
+        <p:style>
+          <a:lnRef idx="2">
+            <a:schemeClr val="accent1">
+              <a:shade val="50000"/>
+            </a:schemeClr>
+          </a:lnRef>
+          <a:fillRef idx="1">
+            <a:schemeClr val="accent1"/>
+          </a:fillRef>
+          <a:effectRef idx="0">
+            <a:schemeClr val="accent1"/>
+          </a:effectRef>
+          <a:fontRef idx="minor">
+            <a:schemeClr val="lt1"/>
+          </a:fontRef>
+        </p:style>
+        <p:txBody>
+          <a:bodyPr rtlCol="0" anchor="ctr"/>
+          <a:lstStyle/>
+          <a:p>
+            <a:pPr marL="0" marR="0" lvl="0" indent="0" algn="ctr" defTabSz="914400" rtl="0" eaLnBrk="0" fontAlgn="base" latinLnBrk="0" hangingPunct="0">
+              <a:lnSpc>
+                <a:spcPct val="100000"/>
+              </a:lnSpc>
+              <a:spcBef>
+                <a:spcPct val="0"/>
+              </a:spcBef>
+              <a:spcAft>
+                <a:spcPct val="0"/>
+              </a:spcAft>
+              <a:buClrTx/>
+              <a:buSzTx/>
+              <a:buFontTx/>
+              <a:buNone/>
+              <a:tabLst/>
+              <a:defRPr/>
+            </a:pPr>
+            <a:r>
+              <a:rPr lang="en-US" b="1" dirty="0" err="1">
+                <a:solidFill>
+                  <a:srgbClr val="FFFFFF"/>
+                </a:solidFill>
+                <a:latin typeface="Calibri"/>
+              </a:rPr>
+              <a:t>cbuild</a:t>
+            </a:r>
+            <a:br>
+              <a:rPr lang="en-US" b="1" dirty="0">
+                <a:solidFill>
+                  <a:srgbClr val="FFFFFF"/>
+                </a:solidFill>
+                <a:latin typeface="Calibri"/>
+              </a:rPr>
+            </a:br>
+            <a:r>
+              <a:rPr kumimoji="0" lang="en-US" sz="1800" b="0" i="0" u="none" strike="noStrike" kern="1200" cap="none" spc="0" normalizeH="0" baseline="0" noProof="0" dirty="0">
+                <a:ln>
+                  <a:noFill/>
+                </a:ln>
+                <a:solidFill>
+                  <a:srgbClr val="FFFFFF"/>
+                </a:solidFill>
+                <a:effectLst/>
+                <a:uLnTx/>
+                <a:uFillTx/>
+                <a:latin typeface="Calibri"/>
+                <a:ea typeface="+mn-ea"/>
+                <a:cs typeface="+mn-cs"/>
+              </a:rPr>
+              <a:t>tool</a:t>
+            </a:r>
+            <a:endParaRPr kumimoji="0" lang="en-GB" sz="1800" b="0" i="0" u="none" strike="noStrike" kern="1200" cap="none" spc="0" normalizeH="0" baseline="0" noProof="0" dirty="0">
+              <a:ln>
+                <a:noFill/>
+              </a:ln>
+              <a:solidFill>
+                <a:srgbClr val="FFFFFF"/>
+              </a:solidFill>
+              <a:effectLst/>
+              <a:uLnTx/>
+              <a:uFillTx/>
+              <a:latin typeface="Calibri"/>
+              <a:ea typeface="+mn-ea"/>
+              <a:cs typeface="+mn-cs"/>
+            </a:endParaRPr>
+          </a:p>
+        </p:txBody>
+      </p:sp>
+      <p:sp>
+        <p:nvSpPr>
+          <p:cNvPr id="53" name="Arrow: Right 52">
+            <a:extLst>
+              <a:ext uri="{FF2B5EF4-FFF2-40B4-BE49-F238E27FC236}">
+                <a16:creationId xmlns:a16="http://schemas.microsoft.com/office/drawing/2014/main" id="{2AF41D39-F549-1F77-C8E5-DCA7905791A0}"/>
+              </a:ext>
+            </a:extLst>
+          </p:cNvPr>
+          <p:cNvSpPr/>
+          <p:nvPr/>
+        </p:nvSpPr>
+        <p:spPr>
+          <a:xfrm>
+            <a:off x="7440314" y="2626612"/>
+            <a:ext cx="373751" cy="204537"/>
+          </a:xfrm>
+          <a:prstGeom prst="rightArrow">
+            <a:avLst/>
+          </a:prstGeom>
+          <a:solidFill>
+            <a:schemeClr val="accent1"/>
+          </a:solidFill>
+          <a:ln>
+            <a:noFill/>
+          </a:ln>
+        </p:spPr>
+        <p:style>
+          <a:lnRef idx="2">
+            <a:schemeClr val="accent1">
+              <a:shade val="50000"/>
+            </a:schemeClr>
+          </a:lnRef>
+          <a:fillRef idx="1">
+            <a:schemeClr val="accent1"/>
+          </a:fillRef>
+          <a:effectRef idx="0">
+            <a:schemeClr val="accent1"/>
+          </a:effectRef>
+          <a:fontRef idx="minor">
+            <a:schemeClr val="lt1"/>
+          </a:fontRef>
+        </p:style>
+        <p:txBody>
+          <a:bodyPr rtlCol="0" anchor="ctr"/>
+          <a:lstStyle/>
+          <a:p>
+            <a:pPr marL="0" marR="0" lvl="0" indent="0" algn="ctr" defTabSz="914400" rtl="0" eaLnBrk="0" fontAlgn="base" latinLnBrk="0" hangingPunct="0">
+              <a:lnSpc>
+                <a:spcPct val="100000"/>
+              </a:lnSpc>
+              <a:spcBef>
+                <a:spcPct val="0"/>
+              </a:spcBef>
+              <a:spcAft>
+                <a:spcPct val="0"/>
+              </a:spcAft>
+              <a:buClrTx/>
+              <a:buSzTx/>
+              <a:buFontTx/>
+              <a:buNone/>
+              <a:tabLst/>
+              <a:defRPr/>
+            </a:pPr>
+            <a:endParaRPr kumimoji="0" lang="en-GB" sz="1800" b="0" i="0" u="none" strike="noStrike" kern="1200" cap="none" spc="0" normalizeH="0" baseline="0" noProof="0">
+              <a:ln>
+                <a:noFill/>
+              </a:ln>
+              <a:solidFill>
+                <a:srgbClr val="FFFFFF"/>
+              </a:solidFill>
+              <a:effectLst/>
+              <a:uLnTx/>
+              <a:uFillTx/>
+              <a:latin typeface="Calibri"/>
+              <a:ea typeface="+mn-ea"/>
+              <a:cs typeface="+mn-cs"/>
+            </a:endParaRPr>
+          </a:p>
+        </p:txBody>
+      </p:sp>
+    </p:spTree>
+    <p:extLst>
+      <p:ext uri="{BB962C8B-B14F-4D97-AF65-F5344CB8AC3E}">
+        <p14:creationId xmlns:p14="http://schemas.microsoft.com/office/powerpoint/2010/main" val="3194132717"/>
+      </p:ext>
+    </p:extLst>
+  </p:cSld>
+  <p:clrMapOvr>
+    <a:masterClrMapping/>
+  </p:clrMapOvr>
+</p:sld>
+</file>
+
+<file path=ppt/slides/slide13.xml><?xml version="1.0" encoding="utf-8"?>
+<p:sld xmlns:a="http://schemas.openxmlformats.org/drawingml/2006/main" xmlns:r="http://schemas.openxmlformats.org/officeDocument/2006/relationships" xmlns:p="http://schemas.openxmlformats.org/presentationml/2006/main">
+  <p:cSld>
+    <p:spTree>
+      <p:nvGrpSpPr>
+        <p:cNvPr id="1" name=""/>
+        <p:cNvGrpSpPr/>
+        <p:nvPr/>
+      </p:nvGrpSpPr>
+      <p:grpSpPr>
+        <a:xfrm>
+          <a:off x="0" y="0"/>
+          <a:ext cx="0" cy="0"/>
+          <a:chOff x="0" y="0"/>
+          <a:chExt cx="0" cy="0"/>
+        </a:xfrm>
+      </p:grpSpPr>
+      <p:sp>
+        <p:nvSpPr>
+          <p:cNvPr id="6" name="Flowchart: Document 5">
+            <a:extLst>
+              <a:ext uri="{FF2B5EF4-FFF2-40B4-BE49-F238E27FC236}">
+                <a16:creationId xmlns:a16="http://schemas.microsoft.com/office/drawing/2014/main" id="{05CB531E-7400-4A1A-9853-81AF2D7E5608}"/>
+              </a:ext>
+            </a:extLst>
+          </p:cNvPr>
+          <p:cNvSpPr/>
+          <p:nvPr/>
+        </p:nvSpPr>
+        <p:spPr>
+          <a:xfrm>
+            <a:off x="548488" y="1926398"/>
+            <a:ext cx="1333416" cy="884321"/>
+          </a:xfrm>
+          <a:prstGeom prst="flowChartDocument">
+            <a:avLst/>
+          </a:prstGeom>
+          <a:solidFill>
+            <a:schemeClr val="accent5">
+              <a:lumMod val="20000"/>
+              <a:lumOff val="80000"/>
+            </a:schemeClr>
+          </a:solidFill>
+          <a:ln w="19050">
+            <a:solidFill>
+              <a:schemeClr val="accent5">
+                <a:lumMod val="50000"/>
+              </a:schemeClr>
+            </a:solidFill>
+          </a:ln>
+        </p:spPr>
+        <p:style>
+          <a:lnRef idx="2">
+            <a:schemeClr val="accent1">
+              <a:shade val="50000"/>
+            </a:schemeClr>
+          </a:lnRef>
+          <a:fillRef idx="1">
+            <a:schemeClr val="accent1"/>
+          </a:fillRef>
+          <a:effectRef idx="0">
+            <a:schemeClr val="accent1"/>
+          </a:effectRef>
+          <a:fontRef idx="minor">
+            <a:schemeClr val="lt1"/>
+          </a:fontRef>
+        </p:style>
+        <p:txBody>
+          <a:bodyPr lIns="0" rIns="0" rtlCol="0" anchor="ctr"/>
+          <a:lstStyle/>
+          <a:p>
+            <a:pPr marL="0" marR="0" lvl="0" indent="0" algn="ctr" defTabSz="914400" rtl="0" eaLnBrk="0" fontAlgn="base" latinLnBrk="0" hangingPunct="0">
+              <a:lnSpc>
+                <a:spcPct val="100000"/>
+              </a:lnSpc>
+              <a:spcBef>
+                <a:spcPct val="0"/>
+              </a:spcBef>
+              <a:spcAft>
+                <a:spcPct val="0"/>
+              </a:spcAft>
+              <a:buClrTx/>
+              <a:buSzTx/>
+              <a:buFontTx/>
+              <a:buNone/>
+              <a:tabLst/>
+              <a:defRPr/>
+            </a:pPr>
+            <a:r>
+              <a:rPr kumimoji="0" lang="en-US" sz="1200" b="0" i="0" u="none" strike="noStrike" kern="1200" cap="none" spc="0" normalizeH="0" baseline="0" noProof="0" dirty="0">
+                <a:ln>
+                  <a:noFill/>
+                </a:ln>
+                <a:solidFill>
+                  <a:schemeClr val="bg2">
+                    <a:lumMod val="25000"/>
+                  </a:schemeClr>
+                </a:solidFill>
+                <a:effectLst/>
+                <a:uLnTx/>
+                <a:uFillTx/>
+                <a:latin typeface="Calibri"/>
+                <a:ea typeface="+mn-ea"/>
+                <a:cs typeface="+mn-cs"/>
+              </a:rPr>
+              <a:t>*.</a:t>
+            </a:r>
+            <a:r>
+              <a:rPr kumimoji="0" lang="en-US" sz="1200" b="0" i="0" u="none" strike="noStrike" kern="1200" cap="none" spc="0" normalizeH="0" baseline="0" noProof="0" dirty="0" err="1">
+                <a:ln>
+                  <a:noFill/>
+                </a:ln>
+                <a:solidFill>
+                  <a:schemeClr val="bg2">
+                    <a:lumMod val="25000"/>
+                  </a:schemeClr>
+                </a:solidFill>
+                <a:effectLst/>
+                <a:uLnTx/>
+                <a:uFillTx/>
+                <a:latin typeface="Calibri"/>
+                <a:ea typeface="+mn-ea"/>
+                <a:cs typeface="+mn-cs"/>
+              </a:rPr>
+              <a:t>cprj</a:t>
+            </a:r>
+            <a:br>
+              <a:rPr kumimoji="0" lang="en-US" sz="1200" b="0" i="0" u="none" strike="noStrike" kern="1200" cap="none" spc="0" normalizeH="0" baseline="0" noProof="0" dirty="0">
+                <a:ln>
+                  <a:noFill/>
+                </a:ln>
+                <a:solidFill>
+                  <a:schemeClr val="bg2">
+                    <a:lumMod val="25000"/>
+                  </a:schemeClr>
+                </a:solidFill>
+                <a:effectLst/>
+                <a:uLnTx/>
+                <a:uFillTx/>
+                <a:latin typeface="Calibri"/>
+                <a:ea typeface="+mn-ea"/>
+                <a:cs typeface="+mn-cs"/>
+              </a:rPr>
+            </a:br>
+            <a:r>
+              <a:rPr kumimoji="0" lang="en-US" sz="1200" b="0" i="0" u="none" strike="noStrike" kern="1200" cap="none" spc="0" normalizeH="0" baseline="0" noProof="0" dirty="0">
+                <a:ln>
+                  <a:noFill/>
+                </a:ln>
+                <a:solidFill>
+                  <a:schemeClr val="bg2">
+                    <a:lumMod val="25000"/>
+                  </a:schemeClr>
+                </a:solidFill>
+                <a:effectLst/>
+                <a:uLnTx/>
+                <a:uFillTx/>
+                <a:latin typeface="Calibri"/>
+                <a:ea typeface="+mn-ea"/>
+                <a:cs typeface="+mn-cs"/>
+              </a:rPr>
+              <a:t>Build Information</a:t>
+            </a:r>
+            <a:endParaRPr kumimoji="0" lang="en-GB" sz="1000" b="0" i="0" u="none" strike="noStrike" kern="1200" cap="none" spc="0" normalizeH="0" baseline="0" noProof="0" dirty="0">
+              <a:ln>
+                <a:noFill/>
+              </a:ln>
+              <a:solidFill>
+                <a:schemeClr val="bg2">
+                  <a:lumMod val="25000"/>
+                </a:schemeClr>
+              </a:solidFill>
+              <a:effectLst/>
+              <a:uLnTx/>
+              <a:uFillTx/>
+              <a:latin typeface="Calibri"/>
+              <a:ea typeface="+mn-ea"/>
+              <a:cs typeface="+mn-cs"/>
+            </a:endParaRPr>
+          </a:p>
+        </p:txBody>
+      </p:sp>
+      <p:cxnSp>
+        <p:nvCxnSpPr>
+          <p:cNvPr id="14" name="Straight Arrow Connector 13">
+            <a:extLst>
+              <a:ext uri="{FF2B5EF4-FFF2-40B4-BE49-F238E27FC236}">
+                <a16:creationId xmlns:a16="http://schemas.microsoft.com/office/drawing/2014/main" id="{0CA20441-F3C2-440A-892E-1359E8990DC5}"/>
+              </a:ext>
+            </a:extLst>
+          </p:cNvPr>
+          <p:cNvCxnSpPr>
+            <a:cxnSpLocks/>
+            <a:stCxn id="6" idx="3"/>
+            <a:endCxn id="52" idx="1"/>
+          </p:cNvCxnSpPr>
+          <p:nvPr/>
+        </p:nvCxnSpPr>
+        <p:spPr>
+          <a:xfrm flipV="1">
+            <a:off x="1881904" y="2368558"/>
+            <a:ext cx="321798" cy="1"/>
+          </a:xfrm>
+          <a:prstGeom prst="straightConnector1">
+            <a:avLst/>
+          </a:prstGeom>
+          <a:ln w="38100">
+            <a:tailEnd type="triangle"/>
+          </a:ln>
+        </p:spPr>
+        <p:style>
+          <a:lnRef idx="1">
+            <a:schemeClr val="accent1"/>
+          </a:lnRef>
+          <a:fillRef idx="0">
+            <a:schemeClr val="accent1"/>
+          </a:fillRef>
+          <a:effectRef idx="0">
+            <a:schemeClr val="accent1"/>
+          </a:effectRef>
+          <a:fontRef idx="minor">
+            <a:schemeClr val="tx1"/>
+          </a:fontRef>
+        </p:style>
+      </p:cxnSp>
+      <p:sp>
+        <p:nvSpPr>
+          <p:cNvPr id="52" name="Rectangle 51">
+            <a:extLst>
+              <a:ext uri="{FF2B5EF4-FFF2-40B4-BE49-F238E27FC236}">
+                <a16:creationId xmlns:a16="http://schemas.microsoft.com/office/drawing/2014/main" id="{1DDF6CEF-19A4-95AF-C9CE-8ECD6841E920}"/>
+              </a:ext>
+            </a:extLst>
+          </p:cNvPr>
+          <p:cNvSpPr/>
+          <p:nvPr/>
+        </p:nvSpPr>
+        <p:spPr>
+          <a:xfrm>
+            <a:off x="2203702" y="1924690"/>
+            <a:ext cx="1336197" cy="887736"/>
+          </a:xfrm>
+          <a:prstGeom prst="rect">
+            <a:avLst/>
+          </a:prstGeom>
+          <a:solidFill>
+            <a:srgbClr val="92D050"/>
+          </a:solidFill>
+          <a:ln>
+            <a:solidFill>
+              <a:schemeClr val="accent4">
+                <a:lumMod val="75000"/>
+              </a:schemeClr>
+            </a:solidFill>
+          </a:ln>
+        </p:spPr>
+        <p:style>
+          <a:lnRef idx="2">
+            <a:schemeClr val="accent1">
+              <a:shade val="50000"/>
+            </a:schemeClr>
+          </a:lnRef>
+          <a:fillRef idx="1">
+            <a:schemeClr val="accent1"/>
+          </a:fillRef>
+          <a:effectRef idx="0">
+            <a:schemeClr val="accent1"/>
+          </a:effectRef>
+          <a:fontRef idx="minor">
+            <a:schemeClr val="lt1"/>
+          </a:fontRef>
+        </p:style>
+        <p:txBody>
+          <a:bodyPr rtlCol="0" anchor="ctr"/>
+          <a:lstStyle/>
+          <a:p>
+            <a:pPr marL="0" marR="0" lvl="0" indent="0" algn="ctr" defTabSz="914400" rtl="0" eaLnBrk="0" fontAlgn="base" latinLnBrk="0" hangingPunct="0">
+              <a:lnSpc>
+                <a:spcPct val="100000"/>
+              </a:lnSpc>
+              <a:spcBef>
+                <a:spcPct val="0"/>
+              </a:spcBef>
+              <a:spcAft>
+                <a:spcPct val="0"/>
+              </a:spcAft>
+              <a:buClrTx/>
+              <a:buSzTx/>
+              <a:buFontTx/>
+              <a:buNone/>
+              <a:tabLst/>
+              <a:defRPr/>
+            </a:pPr>
+            <a:r>
+              <a:rPr lang="en-US" b="1" dirty="0" err="1">
+                <a:solidFill>
+                  <a:srgbClr val="FFFFFF"/>
+                </a:solidFill>
+                <a:latin typeface="Calibri"/>
+              </a:rPr>
+              <a:t>cbuild</a:t>
+            </a:r>
+            <a:br>
+              <a:rPr lang="en-US" b="1" dirty="0">
+                <a:solidFill>
+                  <a:srgbClr val="FFFFFF"/>
+                </a:solidFill>
+                <a:latin typeface="Calibri"/>
+              </a:rPr>
+            </a:br>
+            <a:r>
+              <a:rPr kumimoji="0" lang="en-US" sz="1800" b="0" i="0" u="none" strike="noStrike" kern="1200" cap="none" spc="0" normalizeH="0" baseline="0" noProof="0" dirty="0">
+                <a:ln>
+                  <a:noFill/>
+                </a:ln>
+                <a:solidFill>
+                  <a:srgbClr val="FFFFFF"/>
+                </a:solidFill>
+                <a:effectLst/>
+                <a:uLnTx/>
+                <a:uFillTx/>
+                <a:latin typeface="Calibri"/>
+                <a:ea typeface="+mn-ea"/>
+                <a:cs typeface="+mn-cs"/>
+              </a:rPr>
+              <a:t>tool</a:t>
+            </a:r>
+            <a:endParaRPr kumimoji="0" lang="en-GB" sz="1800" b="0" i="0" u="none" strike="noStrike" kern="1200" cap="none" spc="0" normalizeH="0" baseline="0" noProof="0" dirty="0">
+              <a:ln>
+                <a:noFill/>
+              </a:ln>
+              <a:solidFill>
+                <a:srgbClr val="FFFFFF"/>
+              </a:solidFill>
+              <a:effectLst/>
+              <a:uLnTx/>
+              <a:uFillTx/>
+              <a:latin typeface="Calibri"/>
+              <a:ea typeface="+mn-ea"/>
+              <a:cs typeface="+mn-cs"/>
+            </a:endParaRPr>
+          </a:p>
+        </p:txBody>
+      </p:sp>
+      <p:sp>
+        <p:nvSpPr>
+          <p:cNvPr id="5" name="Flowchart: Document 4">
+            <a:extLst>
+              <a:ext uri="{FF2B5EF4-FFF2-40B4-BE49-F238E27FC236}">
+                <a16:creationId xmlns:a16="http://schemas.microsoft.com/office/drawing/2014/main" id="{0C11656B-9672-03E7-FDF0-84E57FB03BB5}"/>
+              </a:ext>
+            </a:extLst>
+          </p:cNvPr>
+          <p:cNvSpPr/>
+          <p:nvPr/>
+        </p:nvSpPr>
+        <p:spPr>
+          <a:xfrm>
+            <a:off x="3861697" y="1926398"/>
+            <a:ext cx="1333416" cy="884321"/>
+          </a:xfrm>
+          <a:prstGeom prst="flowChartDocument">
+            <a:avLst/>
+          </a:prstGeom>
+          <a:solidFill>
+            <a:schemeClr val="accent5">
+              <a:lumMod val="20000"/>
+              <a:lumOff val="80000"/>
+            </a:schemeClr>
+          </a:solidFill>
+          <a:ln w="19050">
+            <a:solidFill>
+              <a:schemeClr val="accent5">
+                <a:lumMod val="50000"/>
+              </a:schemeClr>
+            </a:solidFill>
+          </a:ln>
+        </p:spPr>
+        <p:style>
+          <a:lnRef idx="2">
+            <a:schemeClr val="accent1">
+              <a:shade val="50000"/>
+            </a:schemeClr>
+          </a:lnRef>
+          <a:fillRef idx="1">
+            <a:schemeClr val="accent1"/>
+          </a:fillRef>
+          <a:effectRef idx="0">
+            <a:schemeClr val="accent1"/>
+          </a:effectRef>
+          <a:fontRef idx="minor">
+            <a:schemeClr val="lt1"/>
+          </a:fontRef>
+        </p:style>
+        <p:txBody>
+          <a:bodyPr lIns="0" rIns="0" rtlCol="0" anchor="ctr"/>
+          <a:lstStyle/>
+          <a:p>
+            <a:pPr marL="0" marR="0" lvl="0" indent="0" algn="ctr" defTabSz="914400" rtl="0" eaLnBrk="0" fontAlgn="base" latinLnBrk="0" hangingPunct="0">
+              <a:lnSpc>
+                <a:spcPct val="100000"/>
+              </a:lnSpc>
+              <a:spcBef>
+                <a:spcPct val="0"/>
+              </a:spcBef>
+              <a:spcAft>
+                <a:spcPct val="0"/>
+              </a:spcAft>
+              <a:buClrTx/>
+              <a:buSzTx/>
+              <a:buFontTx/>
+              <a:buNone/>
+              <a:tabLst/>
+              <a:defRPr/>
+            </a:pPr>
+            <a:r>
+              <a:rPr kumimoji="0" lang="en-US" sz="1200" b="0" i="0" u="none" strike="noStrike" kern="1200" cap="none" spc="0" normalizeH="0" baseline="0" noProof="0" dirty="0">
+                <a:ln>
+                  <a:noFill/>
+                </a:ln>
+                <a:solidFill>
+                  <a:schemeClr val="bg2">
+                    <a:lumMod val="25000"/>
+                  </a:schemeClr>
+                </a:solidFill>
+                <a:effectLst/>
+                <a:uLnTx/>
+                <a:uFillTx/>
+                <a:latin typeface="Calibri"/>
+                <a:ea typeface="+mn-ea"/>
+                <a:cs typeface="+mn-cs"/>
+              </a:rPr>
+              <a:t>cmakeLists.txt</a:t>
+            </a:r>
+            <a:endParaRPr kumimoji="0" lang="en-GB" sz="1000" b="0" i="0" u="none" strike="noStrike" kern="1200" cap="none" spc="0" normalizeH="0" baseline="0" noProof="0" dirty="0">
+              <a:ln>
+                <a:noFill/>
+              </a:ln>
+              <a:solidFill>
+                <a:schemeClr val="bg2">
+                  <a:lumMod val="25000"/>
+                </a:schemeClr>
+              </a:solidFill>
+              <a:effectLst/>
+              <a:uLnTx/>
+              <a:uFillTx/>
+              <a:latin typeface="Calibri"/>
+              <a:ea typeface="+mn-ea"/>
+              <a:cs typeface="+mn-cs"/>
+            </a:endParaRPr>
+          </a:p>
+        </p:txBody>
+      </p:sp>
+      <p:cxnSp>
+        <p:nvCxnSpPr>
+          <p:cNvPr id="8" name="Straight Arrow Connector 7">
+            <a:extLst>
+              <a:ext uri="{FF2B5EF4-FFF2-40B4-BE49-F238E27FC236}">
+                <a16:creationId xmlns:a16="http://schemas.microsoft.com/office/drawing/2014/main" id="{81500B25-99C7-2763-DC98-7F487ACB22AE}"/>
+              </a:ext>
+            </a:extLst>
+          </p:cNvPr>
+          <p:cNvCxnSpPr>
+            <a:cxnSpLocks/>
+          </p:cNvCxnSpPr>
+          <p:nvPr/>
+        </p:nvCxnSpPr>
+        <p:spPr>
+          <a:xfrm flipV="1">
+            <a:off x="3539899" y="2368557"/>
+            <a:ext cx="321798" cy="1"/>
+          </a:xfrm>
+          <a:prstGeom prst="straightConnector1">
+            <a:avLst/>
+          </a:prstGeom>
+          <a:ln w="38100">
+            <a:tailEnd type="triangle"/>
+          </a:ln>
+        </p:spPr>
+        <p:style>
+          <a:lnRef idx="1">
+            <a:schemeClr val="accent1"/>
+          </a:lnRef>
+          <a:fillRef idx="0">
+            <a:schemeClr val="accent1"/>
+          </a:fillRef>
+          <a:effectRef idx="0">
+            <a:schemeClr val="accent1"/>
+          </a:effectRef>
+          <a:fontRef idx="minor">
+            <a:schemeClr val="tx1"/>
+          </a:fontRef>
+        </p:style>
+      </p:cxnSp>
+      <p:sp>
+        <p:nvSpPr>
+          <p:cNvPr id="10" name="Flowchart: Document 9">
+            <a:extLst>
+              <a:ext uri="{FF2B5EF4-FFF2-40B4-BE49-F238E27FC236}">
+                <a16:creationId xmlns:a16="http://schemas.microsoft.com/office/drawing/2014/main" id="{68C3B83C-D107-7EBC-2A47-7E6486506688}"/>
+              </a:ext>
+            </a:extLst>
+          </p:cNvPr>
+          <p:cNvSpPr/>
+          <p:nvPr/>
+        </p:nvSpPr>
+        <p:spPr>
+          <a:xfrm>
+            <a:off x="3861697" y="3162961"/>
+            <a:ext cx="1333416" cy="884321"/>
+          </a:xfrm>
+          <a:prstGeom prst="flowChartDocument">
+            <a:avLst/>
+          </a:prstGeom>
+          <a:solidFill>
+            <a:schemeClr val="accent5">
+              <a:lumMod val="20000"/>
+              <a:lumOff val="80000"/>
+            </a:schemeClr>
+          </a:solidFill>
+          <a:ln w="19050">
+            <a:solidFill>
+              <a:schemeClr val="accent5">
+                <a:lumMod val="50000"/>
+              </a:schemeClr>
+            </a:solidFill>
+          </a:ln>
+        </p:spPr>
+        <p:style>
+          <a:lnRef idx="2">
+            <a:schemeClr val="accent1">
+              <a:shade val="50000"/>
+            </a:schemeClr>
+          </a:lnRef>
+          <a:fillRef idx="1">
+            <a:schemeClr val="accent1"/>
+          </a:fillRef>
+          <a:effectRef idx="0">
+            <a:schemeClr val="accent1"/>
+          </a:effectRef>
+          <a:fontRef idx="minor">
+            <a:schemeClr val="lt1"/>
+          </a:fontRef>
+        </p:style>
+        <p:txBody>
+          <a:bodyPr lIns="0" rIns="0" rtlCol="0" anchor="ctr"/>
+          <a:lstStyle/>
+          <a:p>
+            <a:pPr marL="0" marR="0" lvl="0" indent="0" algn="ctr" defTabSz="914400" rtl="0" eaLnBrk="0" fontAlgn="base" latinLnBrk="0" hangingPunct="0">
+              <a:lnSpc>
+                <a:spcPct val="100000"/>
+              </a:lnSpc>
+              <a:spcBef>
+                <a:spcPct val="0"/>
+              </a:spcBef>
+              <a:spcAft>
+                <a:spcPct val="0"/>
+              </a:spcAft>
+              <a:buClrTx/>
+              <a:buSzTx/>
+              <a:buFontTx/>
+              <a:buNone/>
+              <a:tabLst/>
+              <a:defRPr/>
+            </a:pPr>
+            <a:r>
+              <a:rPr kumimoji="0" lang="en-US" sz="1200" b="0" i="0" u="none" strike="noStrike" kern="1200" cap="none" spc="0" normalizeH="0" baseline="0" noProof="0" dirty="0" err="1">
+                <a:ln>
+                  <a:noFill/>
+                </a:ln>
+                <a:solidFill>
+                  <a:schemeClr val="bg2">
+                    <a:lumMod val="25000"/>
+                  </a:schemeClr>
+                </a:solidFill>
+                <a:effectLst/>
+                <a:uLnTx/>
+                <a:uFillTx/>
+                <a:latin typeface="Calibri"/>
+                <a:ea typeface="+mn-ea"/>
+                <a:cs typeface="+mn-cs"/>
+              </a:rPr>
+              <a:t>compiler_name</a:t>
+            </a:r>
+            <a:r>
+              <a:rPr lang="en-US" sz="1200" dirty="0">
+                <a:solidFill>
+                  <a:schemeClr val="bg2">
+                    <a:lumMod val="25000"/>
+                  </a:schemeClr>
+                </a:solidFill>
+                <a:latin typeface="Calibri"/>
+              </a:rPr>
+              <a:t>.</a:t>
+            </a:r>
+            <a:br>
+              <a:rPr lang="en-US" sz="1200" dirty="0">
+                <a:solidFill>
+                  <a:schemeClr val="bg2">
+                    <a:lumMod val="25000"/>
+                  </a:schemeClr>
+                </a:solidFill>
+                <a:latin typeface="Calibri"/>
+              </a:rPr>
+            </a:br>
+            <a:r>
+              <a:rPr lang="en-US" sz="1200" dirty="0">
+                <a:solidFill>
+                  <a:schemeClr val="bg2">
+                    <a:lumMod val="25000"/>
+                  </a:schemeClr>
+                </a:solidFill>
+                <a:latin typeface="Calibri"/>
+              </a:rPr>
+              <a:t>&lt;version&gt;.</a:t>
+            </a:r>
+            <a:r>
+              <a:rPr lang="en-US" sz="1200" dirty="0" err="1">
+                <a:solidFill>
+                  <a:schemeClr val="bg2">
+                    <a:lumMod val="25000"/>
+                  </a:schemeClr>
+                </a:solidFill>
+                <a:latin typeface="Calibri"/>
+              </a:rPr>
+              <a:t>cmake</a:t>
+            </a:r>
+            <a:endParaRPr kumimoji="0" lang="en-GB" sz="1000" b="0" i="0" u="none" strike="noStrike" kern="1200" cap="none" spc="0" normalizeH="0" baseline="0" noProof="0" dirty="0">
+              <a:ln>
+                <a:noFill/>
+              </a:ln>
+              <a:solidFill>
+                <a:schemeClr val="bg2">
+                  <a:lumMod val="25000"/>
+                </a:schemeClr>
+              </a:solidFill>
+              <a:effectLst/>
+              <a:uLnTx/>
+              <a:uFillTx/>
+              <a:latin typeface="Calibri"/>
+              <a:ea typeface="+mn-ea"/>
+              <a:cs typeface="+mn-cs"/>
+            </a:endParaRPr>
+          </a:p>
+        </p:txBody>
+      </p:sp>
+      <p:cxnSp>
+        <p:nvCxnSpPr>
+          <p:cNvPr id="11" name="Straight Arrow Connector 10">
+            <a:extLst>
+              <a:ext uri="{FF2B5EF4-FFF2-40B4-BE49-F238E27FC236}">
+                <a16:creationId xmlns:a16="http://schemas.microsoft.com/office/drawing/2014/main" id="{731A56F5-55E9-4785-866B-EB12D236F169}"/>
+              </a:ext>
+            </a:extLst>
+          </p:cNvPr>
+          <p:cNvCxnSpPr>
+            <a:cxnSpLocks/>
+          </p:cNvCxnSpPr>
+          <p:nvPr/>
+        </p:nvCxnSpPr>
+        <p:spPr>
+          <a:xfrm flipV="1">
+            <a:off x="4528405" y="2752829"/>
+            <a:ext cx="0" cy="410132"/>
+          </a:xfrm>
+          <a:prstGeom prst="straightConnector1">
+            <a:avLst/>
+          </a:prstGeom>
+          <a:ln w="38100">
+            <a:tailEnd type="triangle"/>
+          </a:ln>
+        </p:spPr>
+        <p:style>
+          <a:lnRef idx="1">
+            <a:schemeClr val="accent1"/>
+          </a:lnRef>
+          <a:fillRef idx="0">
+            <a:schemeClr val="accent1"/>
+          </a:fillRef>
+          <a:effectRef idx="0">
+            <a:schemeClr val="accent1"/>
+          </a:effectRef>
+          <a:fontRef idx="minor">
+            <a:schemeClr val="tx1"/>
+          </a:fontRef>
+        </p:style>
+      </p:cxnSp>
+      <p:cxnSp>
+        <p:nvCxnSpPr>
+          <p:cNvPr id="15" name="Straight Arrow Connector 14">
+            <a:extLst>
+              <a:ext uri="{FF2B5EF4-FFF2-40B4-BE49-F238E27FC236}">
+                <a16:creationId xmlns:a16="http://schemas.microsoft.com/office/drawing/2014/main" id="{6306AF35-1F98-E958-EB85-5B8517BA09C3}"/>
+              </a:ext>
+            </a:extLst>
+          </p:cNvPr>
+          <p:cNvCxnSpPr>
+            <a:cxnSpLocks/>
+            <a:endCxn id="16" idx="1"/>
+          </p:cNvCxnSpPr>
+          <p:nvPr/>
+        </p:nvCxnSpPr>
+        <p:spPr>
+          <a:xfrm flipV="1">
+            <a:off x="5193722" y="2368558"/>
+            <a:ext cx="321798" cy="1"/>
+          </a:xfrm>
+          <a:prstGeom prst="straightConnector1">
+            <a:avLst/>
+          </a:prstGeom>
+          <a:ln w="38100">
+            <a:tailEnd type="triangle"/>
+          </a:ln>
+        </p:spPr>
+        <p:style>
+          <a:lnRef idx="1">
+            <a:schemeClr val="accent1"/>
+          </a:lnRef>
+          <a:fillRef idx="0">
+            <a:schemeClr val="accent1"/>
+          </a:fillRef>
+          <a:effectRef idx="0">
+            <a:schemeClr val="accent1"/>
+          </a:effectRef>
+          <a:fontRef idx="minor">
+            <a:schemeClr val="tx1"/>
+          </a:fontRef>
+        </p:style>
+      </p:cxnSp>
+      <p:sp>
+        <p:nvSpPr>
+          <p:cNvPr id="16" name="Rectangle 15">
+            <a:extLst>
+              <a:ext uri="{FF2B5EF4-FFF2-40B4-BE49-F238E27FC236}">
+                <a16:creationId xmlns:a16="http://schemas.microsoft.com/office/drawing/2014/main" id="{4FF1D290-6BB2-718C-BD61-599B552CCA30}"/>
+              </a:ext>
+            </a:extLst>
+          </p:cNvPr>
+          <p:cNvSpPr/>
+          <p:nvPr/>
+        </p:nvSpPr>
+        <p:spPr>
+          <a:xfrm>
+            <a:off x="5515520" y="1924690"/>
+            <a:ext cx="1336197" cy="887736"/>
+          </a:xfrm>
+          <a:prstGeom prst="rect">
+            <a:avLst/>
+          </a:prstGeom>
+          <a:solidFill>
+            <a:srgbClr val="92D050"/>
+          </a:solidFill>
+          <a:ln>
+            <a:solidFill>
+              <a:schemeClr val="accent4">
+                <a:lumMod val="75000"/>
+              </a:schemeClr>
+            </a:solidFill>
+          </a:ln>
+        </p:spPr>
+        <p:style>
+          <a:lnRef idx="2">
+            <a:schemeClr val="accent1">
+              <a:shade val="50000"/>
+            </a:schemeClr>
+          </a:lnRef>
+          <a:fillRef idx="1">
+            <a:schemeClr val="accent1"/>
+          </a:fillRef>
+          <a:effectRef idx="0">
+            <a:schemeClr val="accent1"/>
+          </a:effectRef>
+          <a:fontRef idx="minor">
+            <a:schemeClr val="lt1"/>
+          </a:fontRef>
+        </p:style>
+        <p:txBody>
+          <a:bodyPr rtlCol="0" anchor="ctr"/>
+          <a:lstStyle/>
+          <a:p>
+            <a:pPr marL="0" marR="0" lvl="0" indent="0" algn="ctr" defTabSz="914400" rtl="0" eaLnBrk="0" fontAlgn="base" latinLnBrk="0" hangingPunct="0">
+              <a:lnSpc>
+                <a:spcPct val="100000"/>
+              </a:lnSpc>
+              <a:spcBef>
+                <a:spcPct val="0"/>
+              </a:spcBef>
+              <a:spcAft>
+                <a:spcPct val="0"/>
+              </a:spcAft>
+              <a:buClrTx/>
+              <a:buSzTx/>
+              <a:buFontTx/>
+              <a:buNone/>
+              <a:tabLst/>
+              <a:defRPr/>
+            </a:pPr>
+            <a:r>
+              <a:rPr lang="en-US" b="1" dirty="0" err="1">
+                <a:solidFill>
+                  <a:srgbClr val="FFFFFF"/>
+                </a:solidFill>
+                <a:latin typeface="Calibri"/>
+              </a:rPr>
+              <a:t>CMake</a:t>
+            </a:r>
+            <a:br>
+              <a:rPr lang="en-US" b="1" dirty="0">
+                <a:solidFill>
+                  <a:srgbClr val="FFFFFF"/>
+                </a:solidFill>
+                <a:latin typeface="Calibri"/>
+              </a:rPr>
+            </a:br>
+            <a:r>
+              <a:rPr kumimoji="0" lang="en-US" sz="1800" b="0" i="0" u="none" strike="noStrike" kern="1200" cap="none" spc="0" normalizeH="0" baseline="0" noProof="0" dirty="0">
+                <a:ln>
+                  <a:noFill/>
+                </a:ln>
+                <a:solidFill>
+                  <a:srgbClr val="FFFFFF"/>
+                </a:solidFill>
+                <a:effectLst/>
+                <a:uLnTx/>
+                <a:uFillTx/>
+                <a:latin typeface="Calibri"/>
+                <a:ea typeface="+mn-ea"/>
+                <a:cs typeface="+mn-cs"/>
+              </a:rPr>
+              <a:t>tool</a:t>
+            </a:r>
+            <a:endParaRPr kumimoji="0" lang="en-GB" sz="1800" b="0" i="0" u="none" strike="noStrike" kern="1200" cap="none" spc="0" normalizeH="0" baseline="0" noProof="0" dirty="0">
+              <a:ln>
+                <a:noFill/>
+              </a:ln>
+              <a:solidFill>
+                <a:srgbClr val="FFFFFF"/>
+              </a:solidFill>
+              <a:effectLst/>
+              <a:uLnTx/>
+              <a:uFillTx/>
+              <a:latin typeface="Calibri"/>
+              <a:ea typeface="+mn-ea"/>
+              <a:cs typeface="+mn-cs"/>
+            </a:endParaRPr>
+          </a:p>
+        </p:txBody>
+      </p:sp>
+      <p:cxnSp>
+        <p:nvCxnSpPr>
+          <p:cNvPr id="19" name="Straight Arrow Connector 18">
+            <a:extLst>
+              <a:ext uri="{FF2B5EF4-FFF2-40B4-BE49-F238E27FC236}">
+                <a16:creationId xmlns:a16="http://schemas.microsoft.com/office/drawing/2014/main" id="{92E530E1-F733-F274-052E-3BCBD2B41870}"/>
+              </a:ext>
+            </a:extLst>
+          </p:cNvPr>
+          <p:cNvCxnSpPr>
+            <a:cxnSpLocks/>
+          </p:cNvCxnSpPr>
+          <p:nvPr/>
+        </p:nvCxnSpPr>
+        <p:spPr>
+          <a:xfrm flipV="1">
+            <a:off x="6851717" y="2368557"/>
+            <a:ext cx="321798" cy="1"/>
+          </a:xfrm>
+          <a:prstGeom prst="straightConnector1">
+            <a:avLst/>
+          </a:prstGeom>
+          <a:ln w="38100">
+            <a:tailEnd type="triangle"/>
+          </a:ln>
+        </p:spPr>
+        <p:style>
+          <a:lnRef idx="1">
+            <a:schemeClr val="accent1"/>
+          </a:lnRef>
+          <a:fillRef idx="0">
+            <a:schemeClr val="accent1"/>
+          </a:fillRef>
+          <a:effectRef idx="0">
+            <a:schemeClr val="accent1"/>
+          </a:effectRef>
+          <a:fontRef idx="minor">
+            <a:schemeClr val="tx1"/>
+          </a:fontRef>
+        </p:style>
+      </p:cxnSp>
+      <p:sp>
+        <p:nvSpPr>
+          <p:cNvPr id="20" name="Flowchart: Document 19">
+            <a:extLst>
+              <a:ext uri="{FF2B5EF4-FFF2-40B4-BE49-F238E27FC236}">
+                <a16:creationId xmlns:a16="http://schemas.microsoft.com/office/drawing/2014/main" id="{19A265DF-EAC6-0336-A1D3-CBB5A8DA01AD}"/>
+              </a:ext>
+            </a:extLst>
+          </p:cNvPr>
+          <p:cNvSpPr/>
+          <p:nvPr/>
+        </p:nvSpPr>
+        <p:spPr>
+          <a:xfrm>
+            <a:off x="7176296" y="1926398"/>
+            <a:ext cx="1333416" cy="884321"/>
+          </a:xfrm>
+          <a:prstGeom prst="flowChartDocument">
+            <a:avLst/>
+          </a:prstGeom>
+          <a:solidFill>
+            <a:schemeClr val="accent5">
+              <a:lumMod val="20000"/>
+              <a:lumOff val="80000"/>
+            </a:schemeClr>
+          </a:solidFill>
+          <a:ln w="19050">
+            <a:solidFill>
+              <a:schemeClr val="accent5">
+                <a:lumMod val="50000"/>
+              </a:schemeClr>
+            </a:solidFill>
+          </a:ln>
+        </p:spPr>
+        <p:style>
+          <a:lnRef idx="2">
+            <a:schemeClr val="accent1">
+              <a:shade val="50000"/>
+            </a:schemeClr>
+          </a:lnRef>
+          <a:fillRef idx="1">
+            <a:schemeClr val="accent1"/>
+          </a:fillRef>
+          <a:effectRef idx="0">
+            <a:schemeClr val="accent1"/>
+          </a:effectRef>
+          <a:fontRef idx="minor">
+            <a:schemeClr val="lt1"/>
+          </a:fontRef>
+        </p:style>
+        <p:txBody>
+          <a:bodyPr lIns="0" rIns="0" rtlCol="0" anchor="ctr"/>
+          <a:lstStyle/>
+          <a:p>
+            <a:pPr marL="0" marR="0" lvl="0" indent="0" algn="ctr" defTabSz="914400" rtl="0" eaLnBrk="0" fontAlgn="base" latinLnBrk="0" hangingPunct="0">
+              <a:lnSpc>
+                <a:spcPct val="100000"/>
+              </a:lnSpc>
+              <a:spcBef>
+                <a:spcPct val="0"/>
+              </a:spcBef>
+              <a:spcAft>
+                <a:spcPct val="0"/>
+              </a:spcAft>
+              <a:buClrTx/>
+              <a:buSzTx/>
+              <a:buFontTx/>
+              <a:buNone/>
+              <a:tabLst/>
+              <a:defRPr/>
+            </a:pPr>
+            <a:r>
+              <a:rPr lang="en-US" sz="1200" dirty="0" err="1">
+                <a:solidFill>
+                  <a:schemeClr val="bg2">
+                    <a:lumMod val="25000"/>
+                  </a:schemeClr>
+                </a:solidFill>
+                <a:latin typeface="Calibri"/>
+              </a:rPr>
+              <a:t>build.ninja</a:t>
+            </a:r>
+            <a:endParaRPr kumimoji="0" lang="en-GB" sz="1000" b="0" i="0" u="none" strike="noStrike" kern="1200" cap="none" spc="0" normalizeH="0" baseline="0" noProof="0" dirty="0">
+              <a:ln>
+                <a:noFill/>
+              </a:ln>
+              <a:solidFill>
+                <a:schemeClr val="bg2">
+                  <a:lumMod val="25000"/>
+                </a:schemeClr>
+              </a:solidFill>
+              <a:effectLst/>
+              <a:uLnTx/>
+              <a:uFillTx/>
+              <a:latin typeface="Calibri"/>
+              <a:ea typeface="+mn-ea"/>
+              <a:cs typeface="+mn-cs"/>
+            </a:endParaRPr>
+          </a:p>
+        </p:txBody>
+      </p:sp>
+      <p:cxnSp>
+        <p:nvCxnSpPr>
+          <p:cNvPr id="27" name="Straight Arrow Connector 26">
+            <a:extLst>
+              <a:ext uri="{FF2B5EF4-FFF2-40B4-BE49-F238E27FC236}">
+                <a16:creationId xmlns:a16="http://schemas.microsoft.com/office/drawing/2014/main" id="{5ADB63A9-73A9-E3BE-9069-FFFB56E5F373}"/>
+              </a:ext>
+            </a:extLst>
+          </p:cNvPr>
+          <p:cNvCxnSpPr>
+            <a:cxnSpLocks/>
+            <a:endCxn id="28" idx="1"/>
+          </p:cNvCxnSpPr>
+          <p:nvPr/>
+        </p:nvCxnSpPr>
+        <p:spPr>
+          <a:xfrm flipV="1">
+            <a:off x="8505540" y="2368558"/>
+            <a:ext cx="321798" cy="1"/>
+          </a:xfrm>
+          <a:prstGeom prst="straightConnector1">
+            <a:avLst/>
+          </a:prstGeom>
+          <a:ln w="38100">
+            <a:tailEnd type="triangle"/>
+          </a:ln>
+        </p:spPr>
+        <p:style>
+          <a:lnRef idx="1">
+            <a:schemeClr val="accent1"/>
+          </a:lnRef>
+          <a:fillRef idx="0">
+            <a:schemeClr val="accent1"/>
+          </a:fillRef>
+          <a:effectRef idx="0">
+            <a:schemeClr val="accent1"/>
+          </a:effectRef>
+          <a:fontRef idx="minor">
+            <a:schemeClr val="tx1"/>
+          </a:fontRef>
+        </p:style>
+      </p:cxnSp>
+      <p:sp>
+        <p:nvSpPr>
+          <p:cNvPr id="28" name="Rectangle 27">
+            <a:extLst>
+              <a:ext uri="{FF2B5EF4-FFF2-40B4-BE49-F238E27FC236}">
+                <a16:creationId xmlns:a16="http://schemas.microsoft.com/office/drawing/2014/main" id="{0E1DEE49-C821-C90B-A93E-DD33C4029A95}"/>
+              </a:ext>
+            </a:extLst>
+          </p:cNvPr>
+          <p:cNvSpPr/>
+          <p:nvPr/>
+        </p:nvSpPr>
+        <p:spPr>
+          <a:xfrm>
+            <a:off x="8827338" y="1924690"/>
+            <a:ext cx="1336197" cy="887736"/>
+          </a:xfrm>
+          <a:prstGeom prst="rect">
+            <a:avLst/>
+          </a:prstGeom>
+          <a:solidFill>
+            <a:srgbClr val="92D050"/>
+          </a:solidFill>
+          <a:ln>
+            <a:solidFill>
+              <a:schemeClr val="accent4">
+                <a:lumMod val="75000"/>
+              </a:schemeClr>
+            </a:solidFill>
+          </a:ln>
+        </p:spPr>
+        <p:style>
+          <a:lnRef idx="2">
+            <a:schemeClr val="accent1">
+              <a:shade val="50000"/>
+            </a:schemeClr>
+          </a:lnRef>
+          <a:fillRef idx="1">
+            <a:schemeClr val="accent1"/>
+          </a:fillRef>
+          <a:effectRef idx="0">
+            <a:schemeClr val="accent1"/>
+          </a:effectRef>
+          <a:fontRef idx="minor">
+            <a:schemeClr val="lt1"/>
+          </a:fontRef>
+        </p:style>
+        <p:txBody>
+          <a:bodyPr rtlCol="0" anchor="ctr"/>
+          <a:lstStyle/>
+          <a:p>
+            <a:pPr marL="0" marR="0" lvl="0" indent="0" algn="ctr" defTabSz="914400" rtl="0" eaLnBrk="0" fontAlgn="base" latinLnBrk="0" hangingPunct="0">
+              <a:lnSpc>
+                <a:spcPct val="100000"/>
+              </a:lnSpc>
+              <a:spcBef>
+                <a:spcPct val="0"/>
+              </a:spcBef>
+              <a:spcAft>
+                <a:spcPct val="0"/>
+              </a:spcAft>
+              <a:buClrTx/>
+              <a:buSzTx/>
+              <a:buFontTx/>
+              <a:buNone/>
+              <a:tabLst/>
+              <a:defRPr/>
+            </a:pPr>
+            <a:r>
+              <a:rPr lang="en-US" b="1" dirty="0">
+                <a:solidFill>
+                  <a:srgbClr val="FFFFFF"/>
+                </a:solidFill>
+                <a:latin typeface="Calibri"/>
+              </a:rPr>
+              <a:t>Ninja</a:t>
+            </a:r>
+            <a:br>
+              <a:rPr lang="en-US" b="1" dirty="0">
+                <a:solidFill>
+                  <a:srgbClr val="FFFFFF"/>
+                </a:solidFill>
+                <a:latin typeface="Calibri"/>
+              </a:rPr>
+            </a:br>
+            <a:r>
+              <a:rPr kumimoji="0" lang="en-US" sz="1800" b="0" i="0" u="none" strike="noStrike" kern="1200" cap="none" spc="0" normalizeH="0" baseline="0" noProof="0" dirty="0">
+                <a:ln>
+                  <a:noFill/>
+                </a:ln>
+                <a:solidFill>
+                  <a:srgbClr val="FFFFFF"/>
+                </a:solidFill>
+                <a:effectLst/>
+                <a:uLnTx/>
+                <a:uFillTx/>
+                <a:latin typeface="Calibri"/>
+                <a:ea typeface="+mn-ea"/>
+                <a:cs typeface="+mn-cs"/>
+              </a:rPr>
+              <a:t>tool</a:t>
+            </a:r>
+            <a:endParaRPr kumimoji="0" lang="en-GB" sz="1800" b="0" i="0" u="none" strike="noStrike" kern="1200" cap="none" spc="0" normalizeH="0" baseline="0" noProof="0" dirty="0">
+              <a:ln>
+                <a:noFill/>
+              </a:ln>
+              <a:solidFill>
+                <a:srgbClr val="FFFFFF"/>
+              </a:solidFill>
+              <a:effectLst/>
+              <a:uLnTx/>
+              <a:uFillTx/>
+              <a:latin typeface="Calibri"/>
+              <a:ea typeface="+mn-ea"/>
+              <a:cs typeface="+mn-cs"/>
+            </a:endParaRPr>
+          </a:p>
+        </p:txBody>
+      </p:sp>
+    </p:spTree>
+    <p:extLst>
+      <p:ext uri="{BB962C8B-B14F-4D97-AF65-F5344CB8AC3E}">
+        <p14:creationId xmlns:p14="http://schemas.microsoft.com/office/powerpoint/2010/main" val="118372231"/>
+      </p:ext>
+    </p:extLst>
+  </p:cSld>
+  <p:clrMapOvr>
+    <a:masterClrMapping/>
+  </p:clrMapOvr>
+</p:sld>
+</file>
+
+<file path=ppt/slides/slide14.xml><?xml version="1.0" encoding="utf-8"?>
+<p:sld xmlns:a="http://schemas.openxmlformats.org/drawingml/2006/main" xmlns:r="http://schemas.openxmlformats.org/officeDocument/2006/relationships" xmlns:p="http://schemas.openxmlformats.org/presentationml/2006/main">
+  <p:cSld>
+    <p:spTree>
+      <p:nvGrpSpPr>
+        <p:cNvPr id="1" name=""/>
+        <p:cNvGrpSpPr/>
+        <p:nvPr/>
+      </p:nvGrpSpPr>
+      <p:grpSpPr>
+        <a:xfrm>
+          <a:off x="0" y="0"/>
+          <a:ext cx="0" cy="0"/>
+          <a:chOff x="0" y="0"/>
+          <a:chExt cx="0" cy="0"/>
+        </a:xfrm>
+      </p:grpSpPr>
+      <p:sp>
+        <p:nvSpPr>
           <p:cNvPr id="2" name="Title 1">
             <a:extLst>
               <a:ext uri="{FF2B5EF4-FFF2-40B4-BE49-F238E27FC236}">
@@ -13569,6 +17746,74 @@
             <a:r>
               <a:rPr lang="en-US" sz="2000" dirty="0"/>
               <a:t>Work on Installer that (a) is stand-along for Linux, (b) installs CMSIS-Toolbox to VS Code</a:t>
+            </a:r>
+          </a:p>
+          <a:p>
+            <a:r>
+              <a:rPr lang="en-US" sz="2000" dirty="0"/>
+              <a:t>Define an overall multi-project workflow that starts from </a:t>
+            </a:r>
+            <a:r>
+              <a:rPr lang="en-US" sz="2000" dirty="0">
+                <a:solidFill>
+                  <a:schemeClr val="bg2">
+                    <a:lumMod val="25000"/>
+                  </a:schemeClr>
+                </a:solidFill>
+                <a:latin typeface="Calibri"/>
+              </a:rPr>
+              <a:t>*.</a:t>
+            </a:r>
+            <a:r>
+              <a:rPr lang="en-US" sz="2000" dirty="0" err="1">
+                <a:solidFill>
+                  <a:schemeClr val="bg2">
+                    <a:lumMod val="25000"/>
+                  </a:schemeClr>
+                </a:solidFill>
+                <a:latin typeface="Calibri"/>
+              </a:rPr>
+              <a:t>cbuild-idx.yml</a:t>
+            </a:r>
+            <a:r>
+              <a:rPr lang="en-US" sz="2000" dirty="0">
+                <a:solidFill>
+                  <a:schemeClr val="bg2">
+                    <a:lumMod val="25000"/>
+                  </a:schemeClr>
+                </a:solidFill>
+                <a:latin typeface="Calibri"/>
+              </a:rPr>
+              <a:t> (as </a:t>
+            </a:r>
+            <a:r>
+              <a:rPr lang="en-US" sz="2000" dirty="0" err="1">
+                <a:solidFill>
+                  <a:schemeClr val="bg2">
+                    <a:lumMod val="25000"/>
+                  </a:schemeClr>
+                </a:solidFill>
+                <a:latin typeface="Calibri"/>
+              </a:rPr>
+              <a:t>cbuild</a:t>
+            </a:r>
+            <a:r>
+              <a:rPr lang="en-US" sz="2000" dirty="0">
+                <a:solidFill>
+                  <a:schemeClr val="bg2">
+                    <a:lumMod val="25000"/>
+                  </a:schemeClr>
+                </a:solidFill>
+                <a:latin typeface="Calibri"/>
+              </a:rPr>
+              <a:t> input file)</a:t>
+            </a:r>
+            <a:endParaRPr lang="en-US" sz="2000" dirty="0"/>
+          </a:p>
+          <a:p>
+            <a:r>
+              <a:rPr lang="en-US" sz="2000" dirty="0"/>
+              <a:t>Complete Generator Workflow</a:t>
             </a:r>
           </a:p>
           <a:p>

</xml_diff>

<commit_message>
Clarified scope of CMSIS-Toolbox 2.0 (see Proposals - OutofScope.md) Described Linker-Script-Management.md Change: `define:` and `add-path:` only applies to C/C++ files
</commit_message>
<xml_diff>
--- a/tools/projmgr/docs/Manual/images/overview.pptx
+++ b/tools/projmgr/docs/Manual/images/overview.pptx
@@ -307,7 +307,7 @@
           <a:p>
             <a:fld id="{008FFADC-39A7-449E-8C68-8776E6FB3C1A}" type="datetimeFigureOut">
               <a:rPr lang="en-GB" smtClean="0"/>
-              <a:t>07/02/2023</a:t>
+              <a:t>10/02/2023</a:t>
             </a:fld>
             <a:endParaRPr lang="en-GB"/>
           </a:p>
@@ -484,7 +484,7 @@
           <a:p>
             <a:fld id="{30B9BAAB-B703-4BB5-9D08-B460FC03C23A}" type="datetimeFigureOut">
               <a:rPr lang="en-GB" smtClean="0"/>
-              <a:t>07/02/2023</a:t>
+              <a:t>10/02/2023</a:t>
             </a:fld>
             <a:endParaRPr lang="en-GB"/>
           </a:p>
@@ -12603,7 +12603,7 @@
         <p:spPr>
           <a:xfrm>
             <a:off x="715763" y="2625380"/>
-            <a:ext cx="2179233" cy="907941"/>
+            <a:ext cx="2179233" cy="1151084"/>
           </a:xfrm>
           <a:prstGeom prst="rect">
             <a:avLst/>
@@ -12635,7 +12635,7 @@
                   <a:schemeClr val="tx2"/>
                 </a:solidFill>
               </a:rPr>
-              <a:t>If </a:t>
+              <a:t>A </a:t>
             </a:r>
             <a:r>
               <a:rPr lang="en-US" sz="1200" b="1" dirty="0">
@@ -12643,47 +12643,53 @@
                   <a:schemeClr val="tx2"/>
                 </a:solidFill>
               </a:rPr>
-              <a:t>regions_&lt;</a:t>
-            </a:r>
-            <a:r>
-              <a:rPr lang="en-US" sz="1200" b="1" dirty="0" err="1">
+              <a:t>&lt;regions&gt;.h</a:t>
+            </a:r>
+            <a:r>
+              <a:rPr lang="en-US" sz="1200" dirty="0">
                 <a:solidFill>
                   <a:schemeClr val="tx2"/>
                 </a:solidFill>
               </a:rPr>
-              <a:t>device_or_board</a:t>
-            </a:r>
-            <a:r>
-              <a:rPr lang="en-US" sz="1200" b="1" dirty="0">
+              <a:t> file specifies the available memory.</a:t>
+            </a:r>
+          </a:p>
+          <a:p>
+            <a:pPr marL="0" indent="0" algn="l" defTabSz="914400" rtl="0" eaLnBrk="1" latinLnBrk="0" hangingPunct="1">
+              <a:lnSpc>
+                <a:spcPct val="90000"/>
+              </a:lnSpc>
+              <a:spcBef>
+                <a:spcPts val="0"/>
+              </a:spcBef>
+              <a:spcAft>
+                <a:spcPts val="600"/>
+              </a:spcAft>
+              <a:buFont typeface="Arial" panose="020B0604020202020204" pitchFamily="34" charset="0"/>
+              <a:buNone/>
+            </a:pPr>
+            <a:r>
+              <a:rPr lang="en-US" sz="1200" dirty="0">
                 <a:solidFill>
                   <a:schemeClr val="tx2"/>
                 </a:solidFill>
               </a:rPr>
-              <a:t>&gt;.h</a:t>
-            </a:r>
-            <a:r>
+              <a:t>If this file does not exist, it is generated based on information</a:t>
+            </a:r>
+            <a:br>
               <a:rPr lang="en-US" sz="1200" dirty="0">
                 <a:solidFill>
                   <a:schemeClr val="tx2"/>
                 </a:solidFill>
               </a:rPr>
-              <a:t> does not exist, it is generated by the </a:t>
-            </a:r>
-            <a:r>
-              <a:rPr lang="en-US" sz="1200" dirty="0" err="1">
+            </a:br>
+            <a:r>
+              <a:rPr lang="en-US" sz="1200" dirty="0">
                 <a:solidFill>
                   <a:schemeClr val="tx2"/>
                 </a:solidFill>
               </a:rPr>
-              <a:t>csolution</a:t>
-            </a:r>
-            <a:r>
-              <a:rPr lang="en-US" sz="1200" dirty="0">
-                <a:solidFill>
-                  <a:schemeClr val="tx2"/>
-                </a:solidFill>
-              </a:rPr>
-              <a:t> tool based on DFP information.</a:t>
+              <a:t>in the software packs.</a:t>
             </a:r>
           </a:p>
           <a:p>
@@ -12726,7 +12732,7 @@
         <p:spPr>
           <a:xfrm>
             <a:off x="703766" y="1375288"/>
-            <a:ext cx="3914946" cy="741742"/>
+            <a:ext cx="3914946" cy="575542"/>
           </a:xfrm>
           <a:prstGeom prst="rect">
             <a:avLst/>
@@ -12769,7 +12775,7 @@
                   <a:schemeClr val="tx2"/>
                 </a:solidFill>
               </a:rPr>
-              <a:t> may be provided using a software component or an explicit file definition in a project file group.</a:t>
+              <a:t> can be provided using the `linker:` node.</a:t>
             </a:r>
           </a:p>
           <a:p>
@@ -13078,25 +13084,7 @@
                 </a:solidFill>
                 <a:latin typeface="Calibri"/>
               </a:rPr>
-              <a:t>regions_&lt;</a:t>
-            </a:r>
-            <a:r>
-              <a:rPr lang="en-US" sz="1200" b="1" dirty="0" err="1">
-                <a:solidFill>
-                  <a:srgbClr val="FFFFFF"/>
-                </a:solidFill>
-                <a:latin typeface="Calibri"/>
-              </a:rPr>
-              <a:t>device_or_board</a:t>
-            </a:r>
-            <a:r>
-              <a:rPr lang="en-US" sz="1200" b="1" dirty="0">
-                <a:solidFill>
-                  <a:srgbClr val="FFFFFF"/>
-                </a:solidFill>
-                <a:latin typeface="Calibri"/>
-              </a:rPr>
-              <a:t>&gt;.h</a:t>
+              <a:t>&lt;regions&gt;.h</a:t>
             </a:r>
             <a:r>
               <a:rPr kumimoji="0" lang="en-US" sz="1200" b="1" i="0" u="none" strike="noStrike" kern="1200" cap="none" spc="0" normalizeH="0" baseline="0" noProof="0" dirty="0">

</xml_diff>

<commit_message>
Details for the Reference Application Framework provided
</commit_message>
<xml_diff>
--- a/tools/projmgr/docs/Manual/images/overview.pptx
+++ b/tools/projmgr/docs/Manual/images/overview.pptx
@@ -307,7 +307,7 @@
           <a:p>
             <a:fld id="{008FFADC-39A7-449E-8C68-8776E6FB3C1A}" type="datetimeFigureOut">
               <a:rPr lang="en-GB" smtClean="0"/>
-              <a:t>10/02/2023</a:t>
+              <a:t>20/02/2023</a:t>
             </a:fld>
             <a:endParaRPr lang="en-GB"/>
           </a:p>
@@ -484,7 +484,7 @@
           <a:p>
             <a:fld id="{30B9BAAB-B703-4BB5-9D08-B460FC03C23A}" type="datetimeFigureOut">
               <a:rPr lang="en-GB" smtClean="0"/>
-              <a:t>10/02/2023</a:t>
+              <a:t>20/02/2023</a:t>
             </a:fld>
             <a:endParaRPr lang="en-GB"/>
           </a:p>
@@ -24544,116 +24544,6 @@
       </p:grpSpPr>
       <p:sp>
         <p:nvSpPr>
-          <p:cNvPr id="10" name="Arrow: Down 9">
-            <a:extLst>
-              <a:ext uri="{FF2B5EF4-FFF2-40B4-BE49-F238E27FC236}">
-                <a16:creationId xmlns:a16="http://schemas.microsoft.com/office/drawing/2014/main" id="{897862CB-172A-F93A-B805-F3193B8EAE5D}"/>
-              </a:ext>
-            </a:extLst>
-          </p:cNvPr>
-          <p:cNvSpPr/>
-          <p:nvPr/>
-        </p:nvSpPr>
-        <p:spPr>
-          <a:xfrm rot="5400000">
-            <a:off x="941215" y="2580518"/>
-            <a:ext cx="1113445" cy="308196"/>
-          </a:xfrm>
-          <a:prstGeom prst="downArrow">
-            <a:avLst>
-              <a:gd name="adj1" fmla="val 49815"/>
-              <a:gd name="adj2" fmla="val 51216"/>
-            </a:avLst>
-          </a:prstGeom>
-          <a:solidFill>
-            <a:schemeClr val="accent1"/>
-          </a:solidFill>
-          <a:ln>
-            <a:noFill/>
-          </a:ln>
-        </p:spPr>
-        <p:style>
-          <a:lnRef idx="2">
-            <a:schemeClr val="accent1">
-              <a:shade val="50000"/>
-            </a:schemeClr>
-          </a:lnRef>
-          <a:fillRef idx="1">
-            <a:schemeClr val="accent1"/>
-          </a:fillRef>
-          <a:effectRef idx="0">
-            <a:schemeClr val="accent1"/>
-          </a:effectRef>
-          <a:fontRef idx="minor">
-            <a:schemeClr val="lt1"/>
-          </a:fontRef>
-        </p:style>
-        <p:txBody>
-          <a:bodyPr rtlCol="0" anchor="ctr"/>
-          <a:lstStyle/>
-          <a:p>
-            <a:pPr algn="ctr"/>
-            <a:endParaRPr lang="en-US"/>
-          </a:p>
-        </p:txBody>
-      </p:sp>
-      <p:sp>
-        <p:nvSpPr>
-          <p:cNvPr id="9" name="Arrow: Down 8">
-            <a:extLst>
-              <a:ext uri="{FF2B5EF4-FFF2-40B4-BE49-F238E27FC236}">
-                <a16:creationId xmlns:a16="http://schemas.microsoft.com/office/drawing/2014/main" id="{88D8AFAE-9F83-A1A3-2C81-5987FFD53E0B}"/>
-              </a:ext>
-            </a:extLst>
-          </p:cNvPr>
-          <p:cNvSpPr/>
-          <p:nvPr/>
-        </p:nvSpPr>
-        <p:spPr>
-          <a:xfrm>
-            <a:off x="2303694" y="2111750"/>
-            <a:ext cx="959476" cy="2265400"/>
-          </a:xfrm>
-          <a:prstGeom prst="downArrow">
-            <a:avLst>
-              <a:gd name="adj1" fmla="val 50000"/>
-              <a:gd name="adj2" fmla="val 17785"/>
-            </a:avLst>
-          </a:prstGeom>
-          <a:solidFill>
-            <a:schemeClr val="accent1"/>
-          </a:solidFill>
-          <a:ln>
-            <a:noFill/>
-          </a:ln>
-        </p:spPr>
-        <p:style>
-          <a:lnRef idx="2">
-            <a:schemeClr val="accent1">
-              <a:shade val="50000"/>
-            </a:schemeClr>
-          </a:lnRef>
-          <a:fillRef idx="1">
-            <a:schemeClr val="accent1"/>
-          </a:fillRef>
-          <a:effectRef idx="0">
-            <a:schemeClr val="accent1"/>
-          </a:effectRef>
-          <a:fontRef idx="minor">
-            <a:schemeClr val="lt1"/>
-          </a:fontRef>
-        </p:style>
-        <p:txBody>
-          <a:bodyPr rtlCol="0" anchor="ctr"/>
-          <a:lstStyle/>
-          <a:p>
-            <a:pPr algn="ctr"/>
-            <a:endParaRPr lang="en-US"/>
-          </a:p>
-        </p:txBody>
-      </p:sp>
-      <p:sp>
-        <p:nvSpPr>
           <p:cNvPr id="2" name="Title 1">
             <a:extLst>
               <a:ext uri="{FF2B5EF4-FFF2-40B4-BE49-F238E27FC236}">
@@ -24723,8 +24613,8 @@
         </p:nvSpPr>
         <p:spPr>
           <a:xfrm>
-            <a:off x="1652036" y="1638300"/>
-            <a:ext cx="5320264" cy="473559"/>
+            <a:off x="1332623" y="2373671"/>
+            <a:ext cx="5639673" cy="473559"/>
           </a:xfrm>
           <a:prstGeom prst="rect">
             <a:avLst/>
@@ -24795,8 +24685,8 @@
         </p:nvSpPr>
         <p:spPr>
           <a:xfrm rot="16200000">
-            <a:off x="-512274" y="3230228"/>
-            <a:ext cx="3448049" cy="264183"/>
+            <a:off x="5969398" y="3616112"/>
+            <a:ext cx="2724807" cy="264183"/>
           </a:xfrm>
           <a:prstGeom prst="rect">
             <a:avLst/>
@@ -24832,7 +24722,7 @@
           <a:p>
             <a:pPr algn="ctr"/>
             <a:r>
-              <a:rPr lang="en-US" sz="1400"/>
+              <a:rPr lang="en-US" sz="1400" dirty="0"/>
               <a:t> PSA Interface</a:t>
             </a:r>
           </a:p>
@@ -24852,8 +24742,8 @@
         </p:nvSpPr>
         <p:spPr>
           <a:xfrm>
-            <a:off x="1652036" y="4637050"/>
-            <a:ext cx="2266950" cy="473558"/>
+            <a:off x="1332623" y="4637050"/>
+            <a:ext cx="2799306" cy="473558"/>
           </a:xfrm>
           <a:prstGeom prst="rect">
             <a:avLst/>
@@ -24890,7 +24780,7 @@
             <a:pPr algn="ctr"/>
             <a:r>
               <a:rPr lang="en-US" sz="1400" dirty="0"/>
-              <a:t>Board Layer</a:t>
+              <a:t>Layer Type: Board</a:t>
             </a:r>
             <a:br>
               <a:rPr lang="en-US" sz="1400" dirty="0"/>
@@ -24924,8 +24814,8 @@
         </p:nvSpPr>
         <p:spPr>
           <a:xfrm rot="16200000">
-            <a:off x="-944483" y="3062208"/>
-            <a:ext cx="3448050" cy="600234"/>
+            <a:off x="6668690" y="3442021"/>
+            <a:ext cx="2736936" cy="600234"/>
           </a:xfrm>
           <a:prstGeom prst="rect">
             <a:avLst/>
@@ -24979,8 +24869,8 @@
         </p:nvSpPr>
         <p:spPr>
           <a:xfrm>
-            <a:off x="1652036" y="2496612"/>
-            <a:ext cx="2266950" cy="473559"/>
+            <a:off x="1332624" y="3429000"/>
+            <a:ext cx="1776040" cy="653684"/>
           </a:xfrm>
           <a:prstGeom prst="rect">
             <a:avLst/>
@@ -25015,27 +24905,16 @@
             <a:pPr algn="ctr"/>
             <a:r>
               <a:rPr lang="en-US" sz="1400" dirty="0"/>
-              <a:t>Socket Layer</a:t>
+              <a:t>Layer Type: Socket</a:t>
             </a:r>
             <a:br>
               <a:rPr lang="en-US" sz="1400" dirty="0"/>
             </a:br>
             <a:r>
               <a:rPr lang="en-US" sz="1400" dirty="0"/>
-              <a:t>(</a:t>
-            </a:r>
-            <a:r>
-              <a:rPr lang="en-US" sz="1200" dirty="0"/>
-              <a:t>IoT Socket -&gt; </a:t>
-            </a:r>
-            <a:r>
-              <a:rPr lang="en-US" sz="1200" dirty="0" err="1"/>
-              <a:t>WiFi</a:t>
-            </a:r>
-            <a:r>
-              <a:rPr lang="en-US" sz="1200" dirty="0"/>
-              <a:t> or Ethernet)</a:t>
-            </a:r>
+              <a:t>Network Connectivity</a:t>
+            </a:r>
+            <a:endParaRPr lang="en-US" sz="1200" dirty="0"/>
           </a:p>
         </p:txBody>
       </p:sp>
@@ -25053,8 +24932,8 @@
         </p:nvSpPr>
         <p:spPr>
           <a:xfrm>
-            <a:off x="1652036" y="4377150"/>
-            <a:ext cx="2266950" cy="264183"/>
+            <a:off x="1332623" y="4377150"/>
+            <a:ext cx="2799306" cy="264183"/>
           </a:xfrm>
           <a:prstGeom prst="rect">
             <a:avLst/>
@@ -25110,8 +24989,8 @@
         </p:nvSpPr>
         <p:spPr>
           <a:xfrm>
-            <a:off x="1652036" y="2232429"/>
-            <a:ext cx="2266950" cy="264183"/>
+            <a:off x="1332624" y="3164817"/>
+            <a:ext cx="1776040" cy="264183"/>
           </a:xfrm>
           <a:prstGeom prst="rect">
             <a:avLst/>
@@ -25147,7 +25026,7 @@
           <a:p>
             <a:pPr algn="ctr"/>
             <a:r>
-              <a:rPr lang="en-US" sz="1400"/>
+              <a:rPr lang="en-US" sz="1400" dirty="0"/>
               <a:t> IoT Socket API</a:t>
             </a:r>
           </a:p>
@@ -25169,13 +25048,15 @@
         </p:nvCxnSpPr>
         <p:spPr>
           <a:xfrm>
-            <a:off x="1652036" y="1638296"/>
-            <a:ext cx="0" cy="3472312"/>
+            <a:off x="7589373" y="2373671"/>
+            <a:ext cx="0" cy="2736935"/>
           </a:xfrm>
           <a:prstGeom prst="line">
             <a:avLst/>
           </a:prstGeom>
-          <a:ln w="38100"/>
+          <a:ln w="38100">
+            <a:prstDash val="sysDash"/>
+          </a:ln>
         </p:spPr>
         <p:style>
           <a:lnRef idx="1">
@@ -25192,61 +25073,6 @@
           </a:fontRef>
         </p:style>
       </p:cxnSp>
-      <p:sp>
-        <p:nvSpPr>
-          <p:cNvPr id="12" name="Arrow: Down 11">
-            <a:extLst>
-              <a:ext uri="{FF2B5EF4-FFF2-40B4-BE49-F238E27FC236}">
-                <a16:creationId xmlns:a16="http://schemas.microsoft.com/office/drawing/2014/main" id="{226AA026-5C22-B0C0-005B-3970CBB4FC84}"/>
-              </a:ext>
-            </a:extLst>
-          </p:cNvPr>
-          <p:cNvSpPr/>
-          <p:nvPr/>
-        </p:nvSpPr>
-        <p:spPr>
-          <a:xfrm>
-            <a:off x="5293813" y="2111749"/>
-            <a:ext cx="959476" cy="2054259"/>
-          </a:xfrm>
-          <a:prstGeom prst="downArrow">
-            <a:avLst>
-              <a:gd name="adj1" fmla="val 50000"/>
-              <a:gd name="adj2" fmla="val 17785"/>
-            </a:avLst>
-          </a:prstGeom>
-          <a:solidFill>
-            <a:schemeClr val="accent1"/>
-          </a:solidFill>
-          <a:ln>
-            <a:noFill/>
-          </a:ln>
-        </p:spPr>
-        <p:style>
-          <a:lnRef idx="2">
-            <a:schemeClr val="accent1">
-              <a:shade val="50000"/>
-            </a:schemeClr>
-          </a:lnRef>
-          <a:fillRef idx="1">
-            <a:schemeClr val="accent1"/>
-          </a:fillRef>
-          <a:effectRef idx="0">
-            <a:schemeClr val="accent1"/>
-          </a:effectRef>
-          <a:fontRef idx="minor">
-            <a:schemeClr val="lt1"/>
-          </a:fontRef>
-        </p:style>
-        <p:txBody>
-          <a:bodyPr rtlCol="0" anchor="ctr"/>
-          <a:lstStyle/>
-          <a:p>
-            <a:pPr algn="ctr"/>
-            <a:endParaRPr lang="en-US"/>
-          </a:p>
-        </p:txBody>
-      </p:sp>
       <p:sp>
         <p:nvSpPr>
           <p:cNvPr id="17" name="Rectangle 16">
@@ -25261,8 +25087,8 @@
         </p:nvSpPr>
         <p:spPr>
           <a:xfrm>
-            <a:off x="4705350" y="4637050"/>
-            <a:ext cx="2266950" cy="473558"/>
+            <a:off x="4299517" y="4637050"/>
+            <a:ext cx="2685310" cy="473558"/>
           </a:xfrm>
           <a:prstGeom prst="rect">
             <a:avLst/>
@@ -25299,7 +25125,7 @@
             <a:pPr algn="ctr"/>
             <a:r>
               <a:rPr lang="en-US" sz="1400" dirty="0"/>
-              <a:t>Shield Layer</a:t>
+              <a:t>Layer Type: Shield</a:t>
             </a:r>
             <a:br>
               <a:rPr lang="en-US" sz="1400" dirty="0"/>
@@ -25316,61 +25142,6 @@
               <a:rPr lang="en-US" sz="1200" dirty="0"/>
               <a:t>)</a:t>
             </a:r>
-          </a:p>
-        </p:txBody>
-      </p:sp>
-      <p:sp>
-        <p:nvSpPr>
-          <p:cNvPr id="18" name="Arrow: Down 17">
-            <a:extLst>
-              <a:ext uri="{FF2B5EF4-FFF2-40B4-BE49-F238E27FC236}">
-                <a16:creationId xmlns:a16="http://schemas.microsoft.com/office/drawing/2014/main" id="{64333635-0C21-01F3-41FE-A650A7FAB1C3}"/>
-              </a:ext>
-            </a:extLst>
-          </p:cNvPr>
-          <p:cNvSpPr/>
-          <p:nvPr/>
-        </p:nvSpPr>
-        <p:spPr>
-          <a:xfrm rot="5400000">
-            <a:off x="4020841" y="4482789"/>
-            <a:ext cx="582652" cy="786365"/>
-          </a:xfrm>
-          <a:prstGeom prst="downArrow">
-            <a:avLst>
-              <a:gd name="adj1" fmla="val 50000"/>
-              <a:gd name="adj2" fmla="val 17785"/>
-            </a:avLst>
-          </a:prstGeom>
-          <a:solidFill>
-            <a:schemeClr val="accent1"/>
-          </a:solidFill>
-          <a:ln>
-            <a:noFill/>
-          </a:ln>
-        </p:spPr>
-        <p:style>
-          <a:lnRef idx="2">
-            <a:schemeClr val="accent1">
-              <a:shade val="50000"/>
-            </a:schemeClr>
-          </a:lnRef>
-          <a:fillRef idx="1">
-            <a:schemeClr val="accent1"/>
-          </a:fillRef>
-          <a:effectRef idx="0">
-            <a:schemeClr val="accent1"/>
-          </a:effectRef>
-          <a:fontRef idx="minor">
-            <a:schemeClr val="lt1"/>
-          </a:fontRef>
-        </p:style>
-        <p:txBody>
-          <a:bodyPr rtlCol="0" anchor="ctr"/>
-          <a:lstStyle/>
-          <a:p>
-            <a:pPr algn="ctr"/>
-            <a:endParaRPr lang="en-US"/>
           </a:p>
         </p:txBody>
       </p:sp>
@@ -25388,8 +25159,66 @@
         </p:nvSpPr>
         <p:spPr>
           <a:xfrm>
-            <a:off x="4705347" y="4166009"/>
-            <a:ext cx="2266950" cy="473559"/>
+            <a:off x="4299514" y="4375384"/>
+            <a:ext cx="2685310" cy="264184"/>
+          </a:xfrm>
+          <a:prstGeom prst="rect">
+            <a:avLst/>
+          </a:prstGeom>
+          <a:solidFill>
+            <a:schemeClr val="accent4">
+              <a:lumMod val="75000"/>
+            </a:schemeClr>
+          </a:solidFill>
+          <a:ln>
+            <a:noFill/>
+          </a:ln>
+        </p:spPr>
+        <p:style>
+          <a:lnRef idx="2">
+            <a:schemeClr val="accent1">
+              <a:shade val="50000"/>
+            </a:schemeClr>
+          </a:lnRef>
+          <a:fillRef idx="1">
+            <a:schemeClr val="accent1"/>
+          </a:fillRef>
+          <a:effectRef idx="0">
+            <a:schemeClr val="accent1"/>
+          </a:effectRef>
+          <a:fontRef idx="minor">
+            <a:schemeClr val="lt1"/>
+          </a:fontRef>
+        </p:style>
+        <p:txBody>
+          <a:bodyPr rtlCol="0" anchor="ctr"/>
+          <a:lstStyle/>
+          <a:p>
+            <a:pPr algn="ctr"/>
+            <a:r>
+              <a:rPr lang="en-US" sz="1400" dirty="0"/>
+              <a:t>Shield-specific API</a:t>
+            </a:r>
+            <a:endParaRPr lang="en-US" sz="1200" dirty="0"/>
+          </a:p>
+        </p:txBody>
+      </p:sp>
+      <p:sp>
+        <p:nvSpPr>
+          <p:cNvPr id="14" name="Rectangle 13">
+            <a:extLst>
+              <a:ext uri="{FF2B5EF4-FFF2-40B4-BE49-F238E27FC236}">
+                <a16:creationId xmlns:a16="http://schemas.microsoft.com/office/drawing/2014/main" id="{19E5BD84-2F57-B771-7D02-9688D2F7B717}"/>
+              </a:ext>
+            </a:extLst>
+          </p:cNvPr>
+          <p:cNvSpPr/>
+          <p:nvPr/>
+        </p:nvSpPr>
+        <p:spPr>
+          <a:xfrm>
+            <a:off x="3265687" y="3429000"/>
+            <a:ext cx="1776040" cy="653684"/>
           </a:xfrm>
           <a:prstGeom prst="rect">
             <a:avLst/>
@@ -25424,9 +25253,254 @@
             <a:pPr algn="ctr"/>
             <a:r>
               <a:rPr lang="en-US" sz="1400" dirty="0"/>
-              <a:t>Shield-specific software</a:t>
+              <a:t>Layer Type: RTOS</a:t>
+            </a:r>
+            <a:br>
+              <a:rPr lang="en-US" sz="1400" dirty="0"/>
+            </a:br>
+            <a:r>
+              <a:rPr lang="en-US" sz="1400" dirty="0" err="1"/>
+              <a:t>RTOS</a:t>
+            </a:r>
+            <a:r>
+              <a:rPr lang="en-US" sz="1400" dirty="0"/>
+              <a:t> Functionality</a:t>
             </a:r>
             <a:endParaRPr lang="en-US" sz="1200" dirty="0"/>
+          </a:p>
+        </p:txBody>
+      </p:sp>
+      <p:sp>
+        <p:nvSpPr>
+          <p:cNvPr id="15" name="Rectangle 14">
+            <a:extLst>
+              <a:ext uri="{FF2B5EF4-FFF2-40B4-BE49-F238E27FC236}">
+                <a16:creationId xmlns:a16="http://schemas.microsoft.com/office/drawing/2014/main" id="{AEE9D348-E1B0-D4A3-E37B-DC09E9433C4A}"/>
+              </a:ext>
+            </a:extLst>
+          </p:cNvPr>
+          <p:cNvSpPr/>
+          <p:nvPr/>
+        </p:nvSpPr>
+        <p:spPr>
+          <a:xfrm>
+            <a:off x="3265687" y="3164817"/>
+            <a:ext cx="1776040" cy="264183"/>
+          </a:xfrm>
+          <a:prstGeom prst="rect">
+            <a:avLst/>
+          </a:prstGeom>
+          <a:solidFill>
+            <a:schemeClr val="accent4">
+              <a:lumMod val="75000"/>
+            </a:schemeClr>
+          </a:solidFill>
+          <a:ln>
+            <a:noFill/>
+          </a:ln>
+        </p:spPr>
+        <p:style>
+          <a:lnRef idx="2">
+            <a:schemeClr val="accent1">
+              <a:shade val="50000"/>
+            </a:schemeClr>
+          </a:lnRef>
+          <a:fillRef idx="1">
+            <a:schemeClr val="accent1"/>
+          </a:fillRef>
+          <a:effectRef idx="0">
+            <a:schemeClr val="accent1"/>
+          </a:effectRef>
+          <a:fontRef idx="minor">
+            <a:schemeClr val="lt1"/>
+          </a:fontRef>
+        </p:style>
+        <p:txBody>
+          <a:bodyPr rtlCol="0" anchor="ctr"/>
+          <a:lstStyle/>
+          <a:p>
+            <a:pPr algn="ctr"/>
+            <a:r>
+              <a:rPr lang="en-US" sz="1400" dirty="0"/>
+              <a:t> CMSIS-RTOS2 API</a:t>
+            </a:r>
+          </a:p>
+        </p:txBody>
+      </p:sp>
+      <p:sp>
+        <p:nvSpPr>
+          <p:cNvPr id="21" name="Rectangle 20">
+            <a:extLst>
+              <a:ext uri="{FF2B5EF4-FFF2-40B4-BE49-F238E27FC236}">
+                <a16:creationId xmlns:a16="http://schemas.microsoft.com/office/drawing/2014/main" id="{BC50AE92-E425-3B8A-C506-E6AFAE3AC37E}"/>
+              </a:ext>
+            </a:extLst>
+          </p:cNvPr>
+          <p:cNvSpPr/>
+          <p:nvPr/>
+        </p:nvSpPr>
+        <p:spPr>
+          <a:xfrm>
+            <a:off x="5189393" y="3429000"/>
+            <a:ext cx="1776040" cy="653684"/>
+          </a:xfrm>
+          <a:prstGeom prst="rect">
+            <a:avLst/>
+          </a:prstGeom>
+          <a:solidFill>
+            <a:srgbClr val="7030A0"/>
+          </a:solidFill>
+          <a:ln>
+            <a:noFill/>
+          </a:ln>
+        </p:spPr>
+        <p:style>
+          <a:lnRef idx="2">
+            <a:schemeClr val="accent1">
+              <a:shade val="50000"/>
+            </a:schemeClr>
+          </a:lnRef>
+          <a:fillRef idx="1">
+            <a:schemeClr val="accent1"/>
+          </a:fillRef>
+          <a:effectRef idx="0">
+            <a:schemeClr val="accent1"/>
+          </a:effectRef>
+          <a:fontRef idx="minor">
+            <a:schemeClr val="lt1"/>
+          </a:fontRef>
+        </p:style>
+        <p:txBody>
+          <a:bodyPr rtlCol="0" anchor="ctr"/>
+          <a:lstStyle/>
+          <a:p>
+            <a:pPr algn="ctr"/>
+            <a:r>
+              <a:rPr lang="en-US" sz="1400" dirty="0"/>
+              <a:t>Layer Type: Stream</a:t>
+            </a:r>
+            <a:br>
+              <a:rPr lang="en-US" sz="1400" dirty="0"/>
+            </a:br>
+            <a:r>
+              <a:rPr lang="en-US" sz="1400" dirty="0"/>
+              <a:t>Sensor Middleware</a:t>
+            </a:r>
+            <a:endParaRPr lang="en-US" sz="1200" dirty="0"/>
+          </a:p>
+        </p:txBody>
+      </p:sp>
+      <p:sp>
+        <p:nvSpPr>
+          <p:cNvPr id="23" name="Rectangle 22">
+            <a:extLst>
+              <a:ext uri="{FF2B5EF4-FFF2-40B4-BE49-F238E27FC236}">
+                <a16:creationId xmlns:a16="http://schemas.microsoft.com/office/drawing/2014/main" id="{75B934F7-9B69-3C72-EBA1-58F3174ED732}"/>
+              </a:ext>
+            </a:extLst>
+          </p:cNvPr>
+          <p:cNvSpPr/>
+          <p:nvPr/>
+        </p:nvSpPr>
+        <p:spPr>
+          <a:xfrm>
+            <a:off x="5189393" y="3164817"/>
+            <a:ext cx="1776040" cy="264183"/>
+          </a:xfrm>
+          <a:prstGeom prst="rect">
+            <a:avLst/>
+          </a:prstGeom>
+          <a:solidFill>
+            <a:schemeClr val="accent4">
+              <a:lumMod val="75000"/>
+            </a:schemeClr>
+          </a:solidFill>
+          <a:ln>
+            <a:noFill/>
+          </a:ln>
+        </p:spPr>
+        <p:style>
+          <a:lnRef idx="2">
+            <a:schemeClr val="accent1">
+              <a:shade val="50000"/>
+            </a:schemeClr>
+          </a:lnRef>
+          <a:fillRef idx="1">
+            <a:schemeClr val="accent1"/>
+          </a:fillRef>
+          <a:effectRef idx="0">
+            <a:schemeClr val="accent1"/>
+          </a:effectRef>
+          <a:fontRef idx="minor">
+            <a:schemeClr val="lt1"/>
+          </a:fontRef>
+        </p:style>
+        <p:txBody>
+          <a:bodyPr rtlCol="0" anchor="ctr"/>
+          <a:lstStyle/>
+          <a:p>
+            <a:pPr algn="ctr"/>
+            <a:r>
+              <a:rPr lang="en-US" sz="1400" dirty="0"/>
+              <a:t> Data Stream API</a:t>
+            </a:r>
+          </a:p>
+        </p:txBody>
+      </p:sp>
+      <p:sp>
+        <p:nvSpPr>
+          <p:cNvPr id="25" name="TextBox 24">
+            <a:extLst>
+              <a:ext uri="{FF2B5EF4-FFF2-40B4-BE49-F238E27FC236}">
+                <a16:creationId xmlns:a16="http://schemas.microsoft.com/office/drawing/2014/main" id="{E5747A7F-1BA3-4D07-CE7D-A6CA0B407E20}"/>
+              </a:ext>
+            </a:extLst>
+          </p:cNvPr>
+          <p:cNvSpPr txBox="1"/>
+          <p:nvPr/>
+        </p:nvSpPr>
+        <p:spPr>
+          <a:xfrm rot="16200000">
+            <a:off x="6997558" y="3734208"/>
+            <a:ext cx="1196238" cy="166199"/>
+          </a:xfrm>
+          <a:prstGeom prst="rect">
+            <a:avLst/>
+          </a:prstGeom>
+          <a:solidFill>
+            <a:schemeClr val="bg1"/>
+          </a:solidFill>
+        </p:spPr>
+        <p:txBody>
+          <a:bodyPr wrap="square" lIns="0" tIns="0" rIns="0" bIns="0" rtlCol="0">
+            <a:spAutoFit/>
+          </a:bodyPr>
+          <a:lstStyle/>
+          <a:p>
+            <a:pPr marL="0" indent="0" algn="ctr" defTabSz="914400" rtl="0" eaLnBrk="1" latinLnBrk="0" hangingPunct="1">
+              <a:lnSpc>
+                <a:spcPct val="90000"/>
+              </a:lnSpc>
+              <a:spcBef>
+                <a:spcPts val="0"/>
+              </a:spcBef>
+              <a:spcAft>
+                <a:spcPts val="600"/>
+              </a:spcAft>
+              <a:buFont typeface="Arial" panose="020B0604020202020204" pitchFamily="34" charset="0"/>
+              <a:buNone/>
+            </a:pPr>
+            <a:r>
+              <a:rPr lang="en-US" sz="1200" kern="1200" dirty="0">
+                <a:solidFill>
+                  <a:schemeClr val="tx2"/>
+                </a:solidFill>
+                <a:latin typeface="+mn-lt"/>
+                <a:ea typeface="+mn-ea"/>
+                <a:cs typeface="+mn-cs"/>
+              </a:rPr>
+              <a:t>Security Boundary</a:t>
+            </a:r>
           </a:p>
         </p:txBody>
       </p:sp>

</xml_diff>

<commit_message>
RefApp-Framework - added information about header files, minor corrections.
</commit_message>
<xml_diff>
--- a/tools/projmgr/docs/Manual/images/overview.pptx
+++ b/tools/projmgr/docs/Manual/images/overview.pptx
@@ -307,7 +307,7 @@
           <a:p>
             <a:fld id="{008FFADC-39A7-449E-8C68-8776E6FB3C1A}" type="datetimeFigureOut">
               <a:rPr lang="en-GB" smtClean="0"/>
-              <a:t>20/02/2023</a:t>
+              <a:t>21/02/2023</a:t>
             </a:fld>
             <a:endParaRPr lang="en-GB"/>
           </a:p>
@@ -484,7 +484,7 @@
           <a:p>
             <a:fld id="{30B9BAAB-B703-4BB5-9D08-B460FC03C23A}" type="datetimeFigureOut">
               <a:rPr lang="en-GB" smtClean="0"/>
-              <a:t>20/02/2023</a:t>
+              <a:t>21/02/2023</a:t>
             </a:fld>
             <a:endParaRPr lang="en-GB"/>
           </a:p>
@@ -21995,7 +21995,7 @@
             <a:pPr algn="ctr"/>
             <a:r>
               <a:rPr lang="en-US" sz="900" dirty="0"/>
-              <a:t>SDA</a:t>
+              <a:t>RXD</a:t>
             </a:r>
           </a:p>
         </p:txBody>
@@ -22053,7 +22053,7 @@
             <a:pPr algn="ctr"/>
             <a:r>
               <a:rPr lang="en-US" sz="900" dirty="0"/>
-              <a:t>SCL</a:t>
+              <a:t>TXD</a:t>
             </a:r>
           </a:p>
         </p:txBody>
@@ -24221,7 +24221,7 @@
             <a:pPr algn="ctr"/>
             <a:r>
               <a:rPr lang="en-US" sz="900" dirty="0"/>
-              <a:t>SDA</a:t>
+              <a:t>SCL</a:t>
             </a:r>
           </a:p>
         </p:txBody>
@@ -24279,7 +24279,7 @@
             <a:pPr algn="ctr"/>
             <a:r>
               <a:rPr lang="en-US" sz="900" dirty="0"/>
-              <a:t>SCL</a:t>
+              <a:t>SDA</a:t>
             </a:r>
           </a:p>
         </p:txBody>

</xml_diff>

<commit_message>
Reference Application Framework: clarifications and technical details added (#753)
</commit_message>
<xml_diff>
--- a/tools/projmgr/docs/Manual/images/overview.pptx
+++ b/tools/projmgr/docs/Manual/images/overview.pptx
@@ -307,7 +307,7 @@
           <a:p>
             <a:fld id="{008FFADC-39A7-449E-8C68-8776E6FB3C1A}" type="datetimeFigureOut">
               <a:rPr lang="en-GB" smtClean="0"/>
-              <a:t>10/02/2023</a:t>
+              <a:t>21/02/2023</a:t>
             </a:fld>
             <a:endParaRPr lang="en-GB"/>
           </a:p>
@@ -484,7 +484,7 @@
           <a:p>
             <a:fld id="{30B9BAAB-B703-4BB5-9D08-B460FC03C23A}" type="datetimeFigureOut">
               <a:rPr lang="en-GB" smtClean="0"/>
-              <a:t>10/02/2023</a:t>
+              <a:t>21/02/2023</a:t>
             </a:fld>
             <a:endParaRPr lang="en-GB"/>
           </a:p>
@@ -21995,7 +21995,7 @@
             <a:pPr algn="ctr"/>
             <a:r>
               <a:rPr lang="en-US" sz="900" dirty="0"/>
-              <a:t>SDA</a:t>
+              <a:t>RXD</a:t>
             </a:r>
           </a:p>
         </p:txBody>
@@ -22053,7 +22053,7 @@
             <a:pPr algn="ctr"/>
             <a:r>
               <a:rPr lang="en-US" sz="900" dirty="0"/>
-              <a:t>SCL</a:t>
+              <a:t>TXD</a:t>
             </a:r>
           </a:p>
         </p:txBody>
@@ -24221,7 +24221,7 @@
             <a:pPr algn="ctr"/>
             <a:r>
               <a:rPr lang="en-US" sz="900" dirty="0"/>
-              <a:t>SDA</a:t>
+              <a:t>SCL</a:t>
             </a:r>
           </a:p>
         </p:txBody>
@@ -24279,7 +24279,7 @@
             <a:pPr algn="ctr"/>
             <a:r>
               <a:rPr lang="en-US" sz="900" dirty="0"/>
-              <a:t>SCL</a:t>
+              <a:t>SDA</a:t>
             </a:r>
           </a:p>
         </p:txBody>
@@ -24544,116 +24544,6 @@
       </p:grpSpPr>
       <p:sp>
         <p:nvSpPr>
-          <p:cNvPr id="10" name="Arrow: Down 9">
-            <a:extLst>
-              <a:ext uri="{FF2B5EF4-FFF2-40B4-BE49-F238E27FC236}">
-                <a16:creationId xmlns:a16="http://schemas.microsoft.com/office/drawing/2014/main" id="{897862CB-172A-F93A-B805-F3193B8EAE5D}"/>
-              </a:ext>
-            </a:extLst>
-          </p:cNvPr>
-          <p:cNvSpPr/>
-          <p:nvPr/>
-        </p:nvSpPr>
-        <p:spPr>
-          <a:xfrm rot="5400000">
-            <a:off x="941215" y="2580518"/>
-            <a:ext cx="1113445" cy="308196"/>
-          </a:xfrm>
-          <a:prstGeom prst="downArrow">
-            <a:avLst>
-              <a:gd name="adj1" fmla="val 49815"/>
-              <a:gd name="adj2" fmla="val 51216"/>
-            </a:avLst>
-          </a:prstGeom>
-          <a:solidFill>
-            <a:schemeClr val="accent1"/>
-          </a:solidFill>
-          <a:ln>
-            <a:noFill/>
-          </a:ln>
-        </p:spPr>
-        <p:style>
-          <a:lnRef idx="2">
-            <a:schemeClr val="accent1">
-              <a:shade val="50000"/>
-            </a:schemeClr>
-          </a:lnRef>
-          <a:fillRef idx="1">
-            <a:schemeClr val="accent1"/>
-          </a:fillRef>
-          <a:effectRef idx="0">
-            <a:schemeClr val="accent1"/>
-          </a:effectRef>
-          <a:fontRef idx="minor">
-            <a:schemeClr val="lt1"/>
-          </a:fontRef>
-        </p:style>
-        <p:txBody>
-          <a:bodyPr rtlCol="0" anchor="ctr"/>
-          <a:lstStyle/>
-          <a:p>
-            <a:pPr algn="ctr"/>
-            <a:endParaRPr lang="en-US"/>
-          </a:p>
-        </p:txBody>
-      </p:sp>
-      <p:sp>
-        <p:nvSpPr>
-          <p:cNvPr id="9" name="Arrow: Down 8">
-            <a:extLst>
-              <a:ext uri="{FF2B5EF4-FFF2-40B4-BE49-F238E27FC236}">
-                <a16:creationId xmlns:a16="http://schemas.microsoft.com/office/drawing/2014/main" id="{88D8AFAE-9F83-A1A3-2C81-5987FFD53E0B}"/>
-              </a:ext>
-            </a:extLst>
-          </p:cNvPr>
-          <p:cNvSpPr/>
-          <p:nvPr/>
-        </p:nvSpPr>
-        <p:spPr>
-          <a:xfrm>
-            <a:off x="2303694" y="2111750"/>
-            <a:ext cx="959476" cy="2265400"/>
-          </a:xfrm>
-          <a:prstGeom prst="downArrow">
-            <a:avLst>
-              <a:gd name="adj1" fmla="val 50000"/>
-              <a:gd name="adj2" fmla="val 17785"/>
-            </a:avLst>
-          </a:prstGeom>
-          <a:solidFill>
-            <a:schemeClr val="accent1"/>
-          </a:solidFill>
-          <a:ln>
-            <a:noFill/>
-          </a:ln>
-        </p:spPr>
-        <p:style>
-          <a:lnRef idx="2">
-            <a:schemeClr val="accent1">
-              <a:shade val="50000"/>
-            </a:schemeClr>
-          </a:lnRef>
-          <a:fillRef idx="1">
-            <a:schemeClr val="accent1"/>
-          </a:fillRef>
-          <a:effectRef idx="0">
-            <a:schemeClr val="accent1"/>
-          </a:effectRef>
-          <a:fontRef idx="minor">
-            <a:schemeClr val="lt1"/>
-          </a:fontRef>
-        </p:style>
-        <p:txBody>
-          <a:bodyPr rtlCol="0" anchor="ctr"/>
-          <a:lstStyle/>
-          <a:p>
-            <a:pPr algn="ctr"/>
-            <a:endParaRPr lang="en-US"/>
-          </a:p>
-        </p:txBody>
-      </p:sp>
-      <p:sp>
-        <p:nvSpPr>
           <p:cNvPr id="2" name="Title 1">
             <a:extLst>
               <a:ext uri="{FF2B5EF4-FFF2-40B4-BE49-F238E27FC236}">
@@ -24723,8 +24613,8 @@
         </p:nvSpPr>
         <p:spPr>
           <a:xfrm>
-            <a:off x="1652036" y="1638300"/>
-            <a:ext cx="5320264" cy="473559"/>
+            <a:off x="1332623" y="2373671"/>
+            <a:ext cx="5639673" cy="473559"/>
           </a:xfrm>
           <a:prstGeom prst="rect">
             <a:avLst/>
@@ -24795,8 +24685,8 @@
         </p:nvSpPr>
         <p:spPr>
           <a:xfrm rot="16200000">
-            <a:off x="-512274" y="3230228"/>
-            <a:ext cx="3448049" cy="264183"/>
+            <a:off x="5969398" y="3616112"/>
+            <a:ext cx="2724807" cy="264183"/>
           </a:xfrm>
           <a:prstGeom prst="rect">
             <a:avLst/>
@@ -24832,7 +24722,7 @@
           <a:p>
             <a:pPr algn="ctr"/>
             <a:r>
-              <a:rPr lang="en-US" sz="1400"/>
+              <a:rPr lang="en-US" sz="1400" dirty="0"/>
               <a:t> PSA Interface</a:t>
             </a:r>
           </a:p>
@@ -24852,8 +24742,8 @@
         </p:nvSpPr>
         <p:spPr>
           <a:xfrm>
-            <a:off x="1652036" y="4637050"/>
-            <a:ext cx="2266950" cy="473558"/>
+            <a:off x="1332623" y="4637050"/>
+            <a:ext cx="2799306" cy="473558"/>
           </a:xfrm>
           <a:prstGeom prst="rect">
             <a:avLst/>
@@ -24890,7 +24780,7 @@
             <a:pPr algn="ctr"/>
             <a:r>
               <a:rPr lang="en-US" sz="1400" dirty="0"/>
-              <a:t>Board Layer</a:t>
+              <a:t>Layer Type: Board</a:t>
             </a:r>
             <a:br>
               <a:rPr lang="en-US" sz="1400" dirty="0"/>
@@ -24924,8 +24814,8 @@
         </p:nvSpPr>
         <p:spPr>
           <a:xfrm rot="16200000">
-            <a:off x="-944483" y="3062208"/>
-            <a:ext cx="3448050" cy="600234"/>
+            <a:off x="6668690" y="3442021"/>
+            <a:ext cx="2736936" cy="600234"/>
           </a:xfrm>
           <a:prstGeom prst="rect">
             <a:avLst/>
@@ -24979,8 +24869,8 @@
         </p:nvSpPr>
         <p:spPr>
           <a:xfrm>
-            <a:off x="1652036" y="2496612"/>
-            <a:ext cx="2266950" cy="473559"/>
+            <a:off x="1332624" y="3429000"/>
+            <a:ext cx="1776040" cy="653684"/>
           </a:xfrm>
           <a:prstGeom prst="rect">
             <a:avLst/>
@@ -25015,27 +24905,16 @@
             <a:pPr algn="ctr"/>
             <a:r>
               <a:rPr lang="en-US" sz="1400" dirty="0"/>
-              <a:t>Socket Layer</a:t>
+              <a:t>Layer Type: Socket</a:t>
             </a:r>
             <a:br>
               <a:rPr lang="en-US" sz="1400" dirty="0"/>
             </a:br>
             <a:r>
               <a:rPr lang="en-US" sz="1400" dirty="0"/>
-              <a:t>(</a:t>
-            </a:r>
-            <a:r>
-              <a:rPr lang="en-US" sz="1200" dirty="0"/>
-              <a:t>IoT Socket -&gt; </a:t>
-            </a:r>
-            <a:r>
-              <a:rPr lang="en-US" sz="1200" dirty="0" err="1"/>
-              <a:t>WiFi</a:t>
-            </a:r>
-            <a:r>
-              <a:rPr lang="en-US" sz="1200" dirty="0"/>
-              <a:t> or Ethernet)</a:t>
-            </a:r>
+              <a:t>Network Connectivity</a:t>
+            </a:r>
+            <a:endParaRPr lang="en-US" sz="1200" dirty="0"/>
           </a:p>
         </p:txBody>
       </p:sp>
@@ -25053,8 +24932,8 @@
         </p:nvSpPr>
         <p:spPr>
           <a:xfrm>
-            <a:off x="1652036" y="4377150"/>
-            <a:ext cx="2266950" cy="264183"/>
+            <a:off x="1332623" y="4377150"/>
+            <a:ext cx="2799306" cy="264183"/>
           </a:xfrm>
           <a:prstGeom prst="rect">
             <a:avLst/>
@@ -25110,8 +24989,8 @@
         </p:nvSpPr>
         <p:spPr>
           <a:xfrm>
-            <a:off x="1652036" y="2232429"/>
-            <a:ext cx="2266950" cy="264183"/>
+            <a:off x="1332624" y="3164817"/>
+            <a:ext cx="1776040" cy="264183"/>
           </a:xfrm>
           <a:prstGeom prst="rect">
             <a:avLst/>
@@ -25147,7 +25026,7 @@
           <a:p>
             <a:pPr algn="ctr"/>
             <a:r>
-              <a:rPr lang="en-US" sz="1400"/>
+              <a:rPr lang="en-US" sz="1400" dirty="0"/>
               <a:t> IoT Socket API</a:t>
             </a:r>
           </a:p>
@@ -25169,13 +25048,15 @@
         </p:nvCxnSpPr>
         <p:spPr>
           <a:xfrm>
-            <a:off x="1652036" y="1638296"/>
-            <a:ext cx="0" cy="3472312"/>
+            <a:off x="7589373" y="2373671"/>
+            <a:ext cx="0" cy="2736935"/>
           </a:xfrm>
           <a:prstGeom prst="line">
             <a:avLst/>
           </a:prstGeom>
-          <a:ln w="38100"/>
+          <a:ln w="38100">
+            <a:prstDash val="sysDash"/>
+          </a:ln>
         </p:spPr>
         <p:style>
           <a:lnRef idx="1">
@@ -25192,61 +25073,6 @@
           </a:fontRef>
         </p:style>
       </p:cxnSp>
-      <p:sp>
-        <p:nvSpPr>
-          <p:cNvPr id="12" name="Arrow: Down 11">
-            <a:extLst>
-              <a:ext uri="{FF2B5EF4-FFF2-40B4-BE49-F238E27FC236}">
-                <a16:creationId xmlns:a16="http://schemas.microsoft.com/office/drawing/2014/main" id="{226AA026-5C22-B0C0-005B-3970CBB4FC84}"/>
-              </a:ext>
-            </a:extLst>
-          </p:cNvPr>
-          <p:cNvSpPr/>
-          <p:nvPr/>
-        </p:nvSpPr>
-        <p:spPr>
-          <a:xfrm>
-            <a:off x="5293813" y="2111749"/>
-            <a:ext cx="959476" cy="2054259"/>
-          </a:xfrm>
-          <a:prstGeom prst="downArrow">
-            <a:avLst>
-              <a:gd name="adj1" fmla="val 50000"/>
-              <a:gd name="adj2" fmla="val 17785"/>
-            </a:avLst>
-          </a:prstGeom>
-          <a:solidFill>
-            <a:schemeClr val="accent1"/>
-          </a:solidFill>
-          <a:ln>
-            <a:noFill/>
-          </a:ln>
-        </p:spPr>
-        <p:style>
-          <a:lnRef idx="2">
-            <a:schemeClr val="accent1">
-              <a:shade val="50000"/>
-            </a:schemeClr>
-          </a:lnRef>
-          <a:fillRef idx="1">
-            <a:schemeClr val="accent1"/>
-          </a:fillRef>
-          <a:effectRef idx="0">
-            <a:schemeClr val="accent1"/>
-          </a:effectRef>
-          <a:fontRef idx="minor">
-            <a:schemeClr val="lt1"/>
-          </a:fontRef>
-        </p:style>
-        <p:txBody>
-          <a:bodyPr rtlCol="0" anchor="ctr"/>
-          <a:lstStyle/>
-          <a:p>
-            <a:pPr algn="ctr"/>
-            <a:endParaRPr lang="en-US"/>
-          </a:p>
-        </p:txBody>
-      </p:sp>
       <p:sp>
         <p:nvSpPr>
           <p:cNvPr id="17" name="Rectangle 16">
@@ -25261,8 +25087,8 @@
         </p:nvSpPr>
         <p:spPr>
           <a:xfrm>
-            <a:off x="4705350" y="4637050"/>
-            <a:ext cx="2266950" cy="473558"/>
+            <a:off x="4299517" y="4637050"/>
+            <a:ext cx="2685310" cy="473558"/>
           </a:xfrm>
           <a:prstGeom prst="rect">
             <a:avLst/>
@@ -25299,7 +25125,7 @@
             <a:pPr algn="ctr"/>
             <a:r>
               <a:rPr lang="en-US" sz="1400" dirty="0"/>
-              <a:t>Shield Layer</a:t>
+              <a:t>Layer Type: Shield</a:t>
             </a:r>
             <a:br>
               <a:rPr lang="en-US" sz="1400" dirty="0"/>
@@ -25316,61 +25142,6 @@
               <a:rPr lang="en-US" sz="1200" dirty="0"/>
               <a:t>)</a:t>
             </a:r>
-          </a:p>
-        </p:txBody>
-      </p:sp>
-      <p:sp>
-        <p:nvSpPr>
-          <p:cNvPr id="18" name="Arrow: Down 17">
-            <a:extLst>
-              <a:ext uri="{FF2B5EF4-FFF2-40B4-BE49-F238E27FC236}">
-                <a16:creationId xmlns:a16="http://schemas.microsoft.com/office/drawing/2014/main" id="{64333635-0C21-01F3-41FE-A650A7FAB1C3}"/>
-              </a:ext>
-            </a:extLst>
-          </p:cNvPr>
-          <p:cNvSpPr/>
-          <p:nvPr/>
-        </p:nvSpPr>
-        <p:spPr>
-          <a:xfrm rot="5400000">
-            <a:off x="4020841" y="4482789"/>
-            <a:ext cx="582652" cy="786365"/>
-          </a:xfrm>
-          <a:prstGeom prst="downArrow">
-            <a:avLst>
-              <a:gd name="adj1" fmla="val 50000"/>
-              <a:gd name="adj2" fmla="val 17785"/>
-            </a:avLst>
-          </a:prstGeom>
-          <a:solidFill>
-            <a:schemeClr val="accent1"/>
-          </a:solidFill>
-          <a:ln>
-            <a:noFill/>
-          </a:ln>
-        </p:spPr>
-        <p:style>
-          <a:lnRef idx="2">
-            <a:schemeClr val="accent1">
-              <a:shade val="50000"/>
-            </a:schemeClr>
-          </a:lnRef>
-          <a:fillRef idx="1">
-            <a:schemeClr val="accent1"/>
-          </a:fillRef>
-          <a:effectRef idx="0">
-            <a:schemeClr val="accent1"/>
-          </a:effectRef>
-          <a:fontRef idx="minor">
-            <a:schemeClr val="lt1"/>
-          </a:fontRef>
-        </p:style>
-        <p:txBody>
-          <a:bodyPr rtlCol="0" anchor="ctr"/>
-          <a:lstStyle/>
-          <a:p>
-            <a:pPr algn="ctr"/>
-            <a:endParaRPr lang="en-US"/>
           </a:p>
         </p:txBody>
       </p:sp>
@@ -25388,8 +25159,66 @@
         </p:nvSpPr>
         <p:spPr>
           <a:xfrm>
-            <a:off x="4705347" y="4166009"/>
-            <a:ext cx="2266950" cy="473559"/>
+            <a:off x="4299514" y="4375384"/>
+            <a:ext cx="2685310" cy="264184"/>
+          </a:xfrm>
+          <a:prstGeom prst="rect">
+            <a:avLst/>
+          </a:prstGeom>
+          <a:solidFill>
+            <a:schemeClr val="accent4">
+              <a:lumMod val="75000"/>
+            </a:schemeClr>
+          </a:solidFill>
+          <a:ln>
+            <a:noFill/>
+          </a:ln>
+        </p:spPr>
+        <p:style>
+          <a:lnRef idx="2">
+            <a:schemeClr val="accent1">
+              <a:shade val="50000"/>
+            </a:schemeClr>
+          </a:lnRef>
+          <a:fillRef idx="1">
+            <a:schemeClr val="accent1"/>
+          </a:fillRef>
+          <a:effectRef idx="0">
+            <a:schemeClr val="accent1"/>
+          </a:effectRef>
+          <a:fontRef idx="minor">
+            <a:schemeClr val="lt1"/>
+          </a:fontRef>
+        </p:style>
+        <p:txBody>
+          <a:bodyPr rtlCol="0" anchor="ctr"/>
+          <a:lstStyle/>
+          <a:p>
+            <a:pPr algn="ctr"/>
+            <a:r>
+              <a:rPr lang="en-US" sz="1400" dirty="0"/>
+              <a:t>Shield-specific API</a:t>
+            </a:r>
+            <a:endParaRPr lang="en-US" sz="1200" dirty="0"/>
+          </a:p>
+        </p:txBody>
+      </p:sp>
+      <p:sp>
+        <p:nvSpPr>
+          <p:cNvPr id="14" name="Rectangle 13">
+            <a:extLst>
+              <a:ext uri="{FF2B5EF4-FFF2-40B4-BE49-F238E27FC236}">
+                <a16:creationId xmlns:a16="http://schemas.microsoft.com/office/drawing/2014/main" id="{19E5BD84-2F57-B771-7D02-9688D2F7B717}"/>
+              </a:ext>
+            </a:extLst>
+          </p:cNvPr>
+          <p:cNvSpPr/>
+          <p:nvPr/>
+        </p:nvSpPr>
+        <p:spPr>
+          <a:xfrm>
+            <a:off x="3265687" y="3429000"/>
+            <a:ext cx="1776040" cy="653684"/>
           </a:xfrm>
           <a:prstGeom prst="rect">
             <a:avLst/>
@@ -25424,9 +25253,254 @@
             <a:pPr algn="ctr"/>
             <a:r>
               <a:rPr lang="en-US" sz="1400" dirty="0"/>
-              <a:t>Shield-specific software</a:t>
+              <a:t>Layer Type: RTOS</a:t>
+            </a:r>
+            <a:br>
+              <a:rPr lang="en-US" sz="1400" dirty="0"/>
+            </a:br>
+            <a:r>
+              <a:rPr lang="en-US" sz="1400" dirty="0" err="1"/>
+              <a:t>RTOS</a:t>
+            </a:r>
+            <a:r>
+              <a:rPr lang="en-US" sz="1400" dirty="0"/>
+              <a:t> Functionality</a:t>
             </a:r>
             <a:endParaRPr lang="en-US" sz="1200" dirty="0"/>
+          </a:p>
+        </p:txBody>
+      </p:sp>
+      <p:sp>
+        <p:nvSpPr>
+          <p:cNvPr id="15" name="Rectangle 14">
+            <a:extLst>
+              <a:ext uri="{FF2B5EF4-FFF2-40B4-BE49-F238E27FC236}">
+                <a16:creationId xmlns:a16="http://schemas.microsoft.com/office/drawing/2014/main" id="{AEE9D348-E1B0-D4A3-E37B-DC09E9433C4A}"/>
+              </a:ext>
+            </a:extLst>
+          </p:cNvPr>
+          <p:cNvSpPr/>
+          <p:nvPr/>
+        </p:nvSpPr>
+        <p:spPr>
+          <a:xfrm>
+            <a:off x="3265687" y="3164817"/>
+            <a:ext cx="1776040" cy="264183"/>
+          </a:xfrm>
+          <a:prstGeom prst="rect">
+            <a:avLst/>
+          </a:prstGeom>
+          <a:solidFill>
+            <a:schemeClr val="accent4">
+              <a:lumMod val="75000"/>
+            </a:schemeClr>
+          </a:solidFill>
+          <a:ln>
+            <a:noFill/>
+          </a:ln>
+        </p:spPr>
+        <p:style>
+          <a:lnRef idx="2">
+            <a:schemeClr val="accent1">
+              <a:shade val="50000"/>
+            </a:schemeClr>
+          </a:lnRef>
+          <a:fillRef idx="1">
+            <a:schemeClr val="accent1"/>
+          </a:fillRef>
+          <a:effectRef idx="0">
+            <a:schemeClr val="accent1"/>
+          </a:effectRef>
+          <a:fontRef idx="minor">
+            <a:schemeClr val="lt1"/>
+          </a:fontRef>
+        </p:style>
+        <p:txBody>
+          <a:bodyPr rtlCol="0" anchor="ctr"/>
+          <a:lstStyle/>
+          <a:p>
+            <a:pPr algn="ctr"/>
+            <a:r>
+              <a:rPr lang="en-US" sz="1400" dirty="0"/>
+              <a:t> CMSIS-RTOS2 API</a:t>
+            </a:r>
+          </a:p>
+        </p:txBody>
+      </p:sp>
+      <p:sp>
+        <p:nvSpPr>
+          <p:cNvPr id="21" name="Rectangle 20">
+            <a:extLst>
+              <a:ext uri="{FF2B5EF4-FFF2-40B4-BE49-F238E27FC236}">
+                <a16:creationId xmlns:a16="http://schemas.microsoft.com/office/drawing/2014/main" id="{BC50AE92-E425-3B8A-C506-E6AFAE3AC37E}"/>
+              </a:ext>
+            </a:extLst>
+          </p:cNvPr>
+          <p:cNvSpPr/>
+          <p:nvPr/>
+        </p:nvSpPr>
+        <p:spPr>
+          <a:xfrm>
+            <a:off x="5189393" y="3429000"/>
+            <a:ext cx="1776040" cy="653684"/>
+          </a:xfrm>
+          <a:prstGeom prst="rect">
+            <a:avLst/>
+          </a:prstGeom>
+          <a:solidFill>
+            <a:srgbClr val="7030A0"/>
+          </a:solidFill>
+          <a:ln>
+            <a:noFill/>
+          </a:ln>
+        </p:spPr>
+        <p:style>
+          <a:lnRef idx="2">
+            <a:schemeClr val="accent1">
+              <a:shade val="50000"/>
+            </a:schemeClr>
+          </a:lnRef>
+          <a:fillRef idx="1">
+            <a:schemeClr val="accent1"/>
+          </a:fillRef>
+          <a:effectRef idx="0">
+            <a:schemeClr val="accent1"/>
+          </a:effectRef>
+          <a:fontRef idx="minor">
+            <a:schemeClr val="lt1"/>
+          </a:fontRef>
+        </p:style>
+        <p:txBody>
+          <a:bodyPr rtlCol="0" anchor="ctr"/>
+          <a:lstStyle/>
+          <a:p>
+            <a:pPr algn="ctr"/>
+            <a:r>
+              <a:rPr lang="en-US" sz="1400" dirty="0"/>
+              <a:t>Layer Type: Stream</a:t>
+            </a:r>
+            <a:br>
+              <a:rPr lang="en-US" sz="1400" dirty="0"/>
+            </a:br>
+            <a:r>
+              <a:rPr lang="en-US" sz="1400" dirty="0"/>
+              <a:t>Sensor Middleware</a:t>
+            </a:r>
+            <a:endParaRPr lang="en-US" sz="1200" dirty="0"/>
+          </a:p>
+        </p:txBody>
+      </p:sp>
+      <p:sp>
+        <p:nvSpPr>
+          <p:cNvPr id="23" name="Rectangle 22">
+            <a:extLst>
+              <a:ext uri="{FF2B5EF4-FFF2-40B4-BE49-F238E27FC236}">
+                <a16:creationId xmlns:a16="http://schemas.microsoft.com/office/drawing/2014/main" id="{75B934F7-9B69-3C72-EBA1-58F3174ED732}"/>
+              </a:ext>
+            </a:extLst>
+          </p:cNvPr>
+          <p:cNvSpPr/>
+          <p:nvPr/>
+        </p:nvSpPr>
+        <p:spPr>
+          <a:xfrm>
+            <a:off x="5189393" y="3164817"/>
+            <a:ext cx="1776040" cy="264183"/>
+          </a:xfrm>
+          <a:prstGeom prst="rect">
+            <a:avLst/>
+          </a:prstGeom>
+          <a:solidFill>
+            <a:schemeClr val="accent4">
+              <a:lumMod val="75000"/>
+            </a:schemeClr>
+          </a:solidFill>
+          <a:ln>
+            <a:noFill/>
+          </a:ln>
+        </p:spPr>
+        <p:style>
+          <a:lnRef idx="2">
+            <a:schemeClr val="accent1">
+              <a:shade val="50000"/>
+            </a:schemeClr>
+          </a:lnRef>
+          <a:fillRef idx="1">
+            <a:schemeClr val="accent1"/>
+          </a:fillRef>
+          <a:effectRef idx="0">
+            <a:schemeClr val="accent1"/>
+          </a:effectRef>
+          <a:fontRef idx="minor">
+            <a:schemeClr val="lt1"/>
+          </a:fontRef>
+        </p:style>
+        <p:txBody>
+          <a:bodyPr rtlCol="0" anchor="ctr"/>
+          <a:lstStyle/>
+          <a:p>
+            <a:pPr algn="ctr"/>
+            <a:r>
+              <a:rPr lang="en-US" sz="1400" dirty="0"/>
+              <a:t> Data Stream API</a:t>
+            </a:r>
+          </a:p>
+        </p:txBody>
+      </p:sp>
+      <p:sp>
+        <p:nvSpPr>
+          <p:cNvPr id="25" name="TextBox 24">
+            <a:extLst>
+              <a:ext uri="{FF2B5EF4-FFF2-40B4-BE49-F238E27FC236}">
+                <a16:creationId xmlns:a16="http://schemas.microsoft.com/office/drawing/2014/main" id="{E5747A7F-1BA3-4D07-CE7D-A6CA0B407E20}"/>
+              </a:ext>
+            </a:extLst>
+          </p:cNvPr>
+          <p:cNvSpPr txBox="1"/>
+          <p:nvPr/>
+        </p:nvSpPr>
+        <p:spPr>
+          <a:xfrm rot="16200000">
+            <a:off x="6997558" y="3734208"/>
+            <a:ext cx="1196238" cy="166199"/>
+          </a:xfrm>
+          <a:prstGeom prst="rect">
+            <a:avLst/>
+          </a:prstGeom>
+          <a:solidFill>
+            <a:schemeClr val="bg1"/>
+          </a:solidFill>
+        </p:spPr>
+        <p:txBody>
+          <a:bodyPr wrap="square" lIns="0" tIns="0" rIns="0" bIns="0" rtlCol="0">
+            <a:spAutoFit/>
+          </a:bodyPr>
+          <a:lstStyle/>
+          <a:p>
+            <a:pPr marL="0" indent="0" algn="ctr" defTabSz="914400" rtl="0" eaLnBrk="1" latinLnBrk="0" hangingPunct="1">
+              <a:lnSpc>
+                <a:spcPct val="90000"/>
+              </a:lnSpc>
+              <a:spcBef>
+                <a:spcPts val="0"/>
+              </a:spcBef>
+              <a:spcAft>
+                <a:spcPts val="600"/>
+              </a:spcAft>
+              <a:buFont typeface="Arial" panose="020B0604020202020204" pitchFamily="34" charset="0"/>
+              <a:buNone/>
+            </a:pPr>
+            <a:r>
+              <a:rPr lang="en-US" sz="1200" kern="1200" dirty="0">
+                <a:solidFill>
+                  <a:schemeClr val="tx2"/>
+                </a:solidFill>
+                <a:latin typeface="+mn-lt"/>
+                <a:ea typeface="+mn-ea"/>
+                <a:cs typeface="+mn-cs"/>
+              </a:rPr>
+              <a:t>Security Boundary</a:t>
+            </a:r>
           </a:p>
         </p:txBody>
       </p:sp>

</xml_diff>